<commit_message>
resolve #2, resolve #4
</commit_message>
<xml_diff>
--- a/figures/schema.pptx
+++ b/figures/schema.pptx
@@ -206,7 +206,7 @@
           <a:p>
             <a:fld id="{CAD4BD24-A097-4F9D-85E9-6A2A24CA2D98}" type="datetimeFigureOut">
               <a:rPr lang="zh-CN" altLang="en-US" smtClean="0"/>
-              <a:t>2022/3/30</a:t>
+              <a:t>2022/7/11</a:t>
             </a:fld>
             <a:endParaRPr lang="zh-CN" altLang="en-US"/>
           </a:p>
@@ -2497,10 +2497,10 @@
       </p:grpSpPr>
       <p:grpSp>
         <p:nvGrpSpPr>
-          <p:cNvPr id="81" name="Group 80">
+          <p:cNvPr id="24" name="Group 23">
             <a:extLst>
               <a:ext uri="{FF2B5EF4-FFF2-40B4-BE49-F238E27FC236}">
-                <a16:creationId xmlns:a16="http://schemas.microsoft.com/office/drawing/2014/main" id="{A6737011-F440-9C41-AED8-C35C242E062D}"/>
+                <a16:creationId xmlns:a16="http://schemas.microsoft.com/office/drawing/2014/main" id="{81B2F107-6A50-A576-0E36-C93DD7E96D8A}"/>
               </a:ext>
             </a:extLst>
           </p:cNvPr>
@@ -2510,9 +2510,9 @@
         <p:grpSpPr>
           <a:xfrm>
             <a:off x="921316" y="1301842"/>
-            <a:ext cx="9614683" cy="4254316"/>
+            <a:ext cx="9614683" cy="4482732"/>
             <a:chOff x="921316" y="1301842"/>
-            <a:chExt cx="9614683" cy="4254316"/>
+            <a:chExt cx="9614683" cy="4482732"/>
           </a:xfrm>
         </p:grpSpPr>
         <p:grpSp>
@@ -3771,9 +3771,9 @@
           <p:grpSpPr>
             <a:xfrm>
               <a:off x="5229585" y="4615873"/>
-              <a:ext cx="1992353" cy="940285"/>
+              <a:ext cx="1992353" cy="1168701"/>
               <a:chOff x="2789712" y="3039762"/>
-              <a:chExt cx="1992353" cy="940285"/>
+              <a:chExt cx="1992353" cy="1168701"/>
             </a:xfrm>
           </p:grpSpPr>
           <p:sp>
@@ -3791,7 +3791,7 @@
             <p:spPr>
               <a:xfrm>
                 <a:off x="2789712" y="3429001"/>
-                <a:ext cx="1992353" cy="551046"/>
+                <a:ext cx="1992353" cy="779462"/>
               </a:xfrm>
               <a:prstGeom prst="rect">
                 <a:avLst/>
@@ -3880,6 +3880,16 @@
                     </a:solidFill>
                   </a:rPr>
                   <a:t>Long</a:t>
+                </a:r>
+              </a:p>
+              <a:p>
+                <a:r>
+                  <a:rPr lang="en-US" sz="1400" dirty="0">
+                    <a:solidFill>
+                      <a:schemeClr val="tx1"/>
+                    </a:solidFill>
+                  </a:rPr>
+                  <a:t>balance: Long</a:t>
                 </a:r>
                 <a:endParaRPr lang="en-CN" sz="1400" dirty="0">
                   <a:solidFill>
@@ -3978,12 +3988,12 @@
           <p:spPr>
             <a:xfrm rot="10800000" flipH="1" flipV="1">
               <a:off x="1994124" y="1615706"/>
-              <a:ext cx="4231638" cy="3940452"/>
+              <a:ext cx="4231638" cy="4168868"/>
             </a:xfrm>
             <a:prstGeom prst="bentConnector4">
               <a:avLst>
-                <a:gd name="adj1" fmla="val -10968"/>
-                <a:gd name="adj2" fmla="val 105801"/>
+                <a:gd name="adj1" fmla="val -12213"/>
+                <a:gd name="adj2" fmla="val 105484"/>
               </a:avLst>
             </a:prstGeom>
             <a:ln w="19050" cmpd="sng">
@@ -4028,11 +4038,11 @@
           <p:spPr>
             <a:xfrm rot="10800000" flipH="1" flipV="1">
               <a:off x="1994123" y="3785381"/>
-              <a:ext cx="3235461" cy="1495254"/>
+              <a:ext cx="3235461" cy="1609462"/>
             </a:xfrm>
             <a:prstGeom prst="bentConnector3">
               <a:avLst>
-                <a:gd name="adj1" fmla="val -7065"/>
+                <a:gd name="adj1" fmla="val -11980"/>
               </a:avLst>
             </a:prstGeom>
             <a:ln w="19050">
@@ -4108,7 +4118,7 @@
           </p:nvSpPr>
           <p:spPr>
             <a:xfrm>
-              <a:off x="1742019" y="4748322"/>
+              <a:off x="1640403" y="5382870"/>
               <a:ext cx="603050" cy="307777"/>
             </a:xfrm>
             <a:prstGeom prst="rect">
@@ -4438,7 +4448,7 @@
             </a:xfrm>
             <a:prstGeom prst="bentConnector4">
               <a:avLst>
-                <a:gd name="adj1" fmla="val -49852"/>
+                <a:gd name="adj1" fmla="val -62890"/>
                 <a:gd name="adj2" fmla="val 122948"/>
               </a:avLst>
             </a:prstGeom>
@@ -4479,7 +4489,7 @@
           </p:nvSpPr>
           <p:spPr>
             <a:xfrm>
-              <a:off x="4233358" y="4318335"/>
+              <a:off x="3295902" y="4933177"/>
               <a:ext cx="631904" cy="307777"/>
             </a:xfrm>
             <a:prstGeom prst="rect">
@@ -4781,6 +4791,91 @@
                 <a:t>workIn</a:t>
               </a:r>
               <a:endParaRPr lang="en-CN" sz="1400" dirty="0"/>
+            </a:p>
+          </p:txBody>
+        </p:sp>
+        <p:cxnSp>
+          <p:nvCxnSpPr>
+            <p:cNvPr id="50" name="Elbow Connector 49">
+              <a:extLst>
+                <a:ext uri="{FF2B5EF4-FFF2-40B4-BE49-F238E27FC236}">
+                  <a16:creationId xmlns:a16="http://schemas.microsoft.com/office/drawing/2014/main" id="{CB1E5DDC-7474-DEA2-7987-595836A33EC7}"/>
+                </a:ext>
+              </a:extLst>
+            </p:cNvPr>
+            <p:cNvCxnSpPr>
+              <a:cxnSpLocks/>
+              <a:stCxn id="12" idx="2"/>
+              <a:endCxn id="12" idx="1"/>
+            </p:cNvCxnSpPr>
+            <p:nvPr/>
+          </p:nvCxnSpPr>
+          <p:spPr>
+            <a:xfrm rot="5400000" flipH="1">
+              <a:off x="2312560" y="4021902"/>
+              <a:ext cx="359306" cy="996177"/>
+            </a:xfrm>
+            <a:prstGeom prst="bentConnector4">
+              <a:avLst>
+                <a:gd name="adj1" fmla="val -63623"/>
+                <a:gd name="adj2" fmla="val 122948"/>
+              </a:avLst>
+            </a:prstGeom>
+            <a:ln w="19050">
+              <a:solidFill>
+                <a:schemeClr val="tx1"/>
+              </a:solidFill>
+              <a:tailEnd type="triangle"/>
+            </a:ln>
+            <a:effectLst/>
+          </p:spPr>
+          <p:style>
+            <a:lnRef idx="1">
+              <a:schemeClr val="accent1"/>
+            </a:lnRef>
+            <a:fillRef idx="0">
+              <a:schemeClr val="accent1"/>
+            </a:fillRef>
+            <a:effectRef idx="0">
+              <a:schemeClr val="accent1"/>
+            </a:effectRef>
+            <a:fontRef idx="minor">
+              <a:schemeClr val="tx1"/>
+            </a:fontRef>
+          </p:style>
+        </p:cxnSp>
+        <p:sp>
+          <p:nvSpPr>
+            <p:cNvPr id="56" name="TextBox 55">
+              <a:extLst>
+                <a:ext uri="{FF2B5EF4-FFF2-40B4-BE49-F238E27FC236}">
+                  <a16:creationId xmlns:a16="http://schemas.microsoft.com/office/drawing/2014/main" id="{C327D31E-708B-798A-94E9-45783F69B85F}"/>
+                </a:ext>
+              </a:extLst>
+            </p:cNvPr>
+            <p:cNvSpPr txBox="1"/>
+            <p:nvPr/>
+          </p:nvSpPr>
+          <p:spPr>
+            <a:xfrm>
+              <a:off x="1893074" y="4933178"/>
+              <a:ext cx="970137" cy="307777"/>
+            </a:xfrm>
+            <a:prstGeom prst="rect">
+              <a:avLst/>
+            </a:prstGeom>
+            <a:noFill/>
+          </p:spPr>
+          <p:txBody>
+            <a:bodyPr wrap="none" rtlCol="0">
+              <a:spAutoFit/>
+            </a:bodyPr>
+            <a:lstStyle/>
+            <a:p>
+              <a:r>
+                <a:rPr lang="en-US" altLang="zh-CN" sz="1400" dirty="0"/>
+                <a:t>guarantee</a:t>
+              </a:r>
             </a:p>
           </p:txBody>
         </p:sp>

</xml_diff>

<commit_message>
remove isBlocked from Person and Company
</commit_message>
<xml_diff>
--- a/figures/schema.pptx
+++ b/figures/schema.pptx
@@ -206,7 +206,7 @@
           <a:p>
             <a:fld id="{CAD4BD24-A097-4F9D-85E9-6A2A24CA2D98}" type="datetimeFigureOut">
               <a:rPr lang="zh-CN" altLang="en-US" smtClean="0"/>
-              <a:t>2022/7/11</a:t>
+              <a:t>2022/9/27</a:t>
             </a:fld>
             <a:endParaRPr lang="zh-CN" altLang="en-US"/>
           </a:p>
@@ -2530,9 +2530,9 @@
           <p:grpSpPr>
             <a:xfrm>
               <a:off x="1994124" y="1422117"/>
-              <a:ext cx="1992353" cy="1121479"/>
+              <a:ext cx="1992353" cy="850919"/>
               <a:chOff x="2789712" y="3039762"/>
-              <a:chExt cx="1992353" cy="1121479"/>
+              <a:chExt cx="1992353" cy="850919"/>
             </a:xfrm>
           </p:grpSpPr>
           <p:sp>
@@ -2550,7 +2550,7 @@
             <p:spPr>
               <a:xfrm>
                 <a:off x="2789712" y="3429001"/>
-                <a:ext cx="1992353" cy="732240"/>
+                <a:ext cx="1992353" cy="461680"/>
               </a:xfrm>
               <a:prstGeom prst="rect">
                 <a:avLst/>
@@ -2631,40 +2631,6 @@
                     </a:solidFill>
                   </a:rPr>
                   <a:t>String</a:t>
-                </a:r>
-              </a:p>
-              <a:p>
-                <a:r>
-                  <a:rPr lang="en-US" altLang="zh-CN" sz="1400" dirty="0" err="1">
-                    <a:solidFill>
-                      <a:schemeClr val="tx1"/>
-                    </a:solidFill>
-                  </a:rPr>
-                  <a:t>isBlocked</a:t>
-                </a:r>
-                <a:r>
-                  <a:rPr lang="en-US" altLang="zh-CN" sz="1400" dirty="0">
-                    <a:solidFill>
-                      <a:schemeClr val="tx1"/>
-                    </a:solidFill>
-                  </a:rPr>
-                  <a:t>:</a:t>
-                </a:r>
-                <a:r>
-                  <a:rPr lang="zh-CN" altLang="en-US" sz="1400" dirty="0">
-                    <a:solidFill>
-                      <a:schemeClr val="tx1"/>
-                    </a:solidFill>
-                  </a:rPr>
-                  <a:t> </a:t>
-                </a:r>
-                <a:r>
-                  <a:rPr lang="en-US" altLang="zh-CN" sz="1400" dirty="0">
-                    <a:solidFill>
-                      <a:schemeClr val="tx1"/>
-                    </a:solidFill>
-                  </a:rPr>
-                  <a:t>Boolean</a:t>
                 </a:r>
                 <a:endParaRPr lang="en-CN" sz="1400" dirty="0">
                   <a:solidFill>
@@ -2759,9 +2725,9 @@
           <p:grpSpPr>
             <a:xfrm>
               <a:off x="1994124" y="3591792"/>
-              <a:ext cx="1992353" cy="1107851"/>
+              <a:ext cx="1992353" cy="891637"/>
               <a:chOff x="2789712" y="3039762"/>
-              <a:chExt cx="1992353" cy="1107851"/>
+              <a:chExt cx="1992353" cy="891637"/>
             </a:xfrm>
           </p:grpSpPr>
           <p:sp>
@@ -2779,7 +2745,7 @@
             <p:spPr>
               <a:xfrm>
                 <a:off x="2789712" y="3429001"/>
-                <a:ext cx="1992353" cy="718612"/>
+                <a:ext cx="1992353" cy="502398"/>
               </a:xfrm>
               <a:prstGeom prst="rect">
                 <a:avLst/>
@@ -2861,45 +2827,6 @@
                   </a:rPr>
                   <a:t>String</a:t>
                 </a:r>
-              </a:p>
-              <a:p>
-                <a:r>
-                  <a:rPr lang="en-US" altLang="zh-CN" sz="1400" dirty="0" err="1">
-                    <a:solidFill>
-                      <a:schemeClr val="tx1"/>
-                    </a:solidFill>
-                  </a:rPr>
-                  <a:t>isBlocked</a:t>
-                </a:r>
-                <a:r>
-                  <a:rPr lang="en-US" altLang="zh-CN" sz="1400" dirty="0">
-                    <a:solidFill>
-                      <a:schemeClr val="tx1"/>
-                    </a:solidFill>
-                  </a:rPr>
-                  <a:t>:</a:t>
-                </a:r>
-                <a:r>
-                  <a:rPr lang="zh-CN" altLang="en-US" sz="1400" dirty="0">
-                    <a:solidFill>
-                      <a:schemeClr val="tx1"/>
-                    </a:solidFill>
-                  </a:rPr>
-                  <a:t> </a:t>
-                </a:r>
-                <a:r>
-                  <a:rPr lang="en-US" altLang="zh-CN" sz="1400" dirty="0">
-                    <a:solidFill>
-                      <a:schemeClr val="tx1"/>
-                    </a:solidFill>
-                  </a:rPr>
-                  <a:t>Boolean</a:t>
-                </a:r>
-                <a:endParaRPr lang="en-CN" sz="1400" dirty="0">
-                  <a:solidFill>
-                    <a:schemeClr val="tx1"/>
-                  </a:solidFill>
-                </a:endParaRPr>
               </a:p>
             </p:txBody>
           </p:sp>
@@ -3607,8 +3534,8 @@
           </p:nvCxnSpPr>
           <p:spPr>
             <a:xfrm>
-              <a:off x="2810186" y="2543596"/>
-              <a:ext cx="0" cy="1048196"/>
+              <a:off x="2810186" y="2273036"/>
+              <a:ext cx="0" cy="1318756"/>
             </a:xfrm>
             <a:prstGeom prst="straightConnector1">
               <a:avLst/>
@@ -4443,12 +4370,12 @@
           </p:nvCxnSpPr>
           <p:spPr>
             <a:xfrm rot="5400000" flipH="1" flipV="1">
-              <a:off x="3308736" y="4021902"/>
-              <a:ext cx="359306" cy="996176"/>
+              <a:off x="3362789" y="3859742"/>
+              <a:ext cx="251199" cy="996176"/>
             </a:xfrm>
             <a:prstGeom prst="bentConnector4">
               <a:avLst>
-                <a:gd name="adj1" fmla="val -62890"/>
+                <a:gd name="adj1" fmla="val -91004"/>
                 <a:gd name="adj2" fmla="val 122948"/>
               </a:avLst>
             </a:prstGeom>
@@ -4649,12 +4576,12 @@
           </p:nvCxnSpPr>
           <p:spPr>
             <a:xfrm rot="5400000" flipH="1" flipV="1">
-              <a:off x="3305329" y="1862448"/>
-              <a:ext cx="366120" cy="996176"/>
+              <a:off x="3372969" y="1659528"/>
+              <a:ext cx="230840" cy="996176"/>
             </a:xfrm>
             <a:prstGeom prst="bentConnector4">
               <a:avLst>
-                <a:gd name="adj1" fmla="val -62439"/>
+                <a:gd name="adj1" fmla="val -99030"/>
                 <a:gd name="adj2" fmla="val 122948"/>
               </a:avLst>
             </a:prstGeom>
@@ -4725,13 +4652,15 @@
                 </a:ext>
               </a:extLst>
             </p:cNvPr>
-            <p:cNvCxnSpPr/>
+            <p:cNvCxnSpPr>
+              <a:cxnSpLocks/>
+            </p:cNvCxnSpPr>
             <p:nvPr/>
           </p:nvCxnSpPr>
           <p:spPr>
             <a:xfrm>
-              <a:off x="2206519" y="2543596"/>
-              <a:ext cx="0" cy="1048196"/>
+              <a:off x="2206519" y="2273036"/>
+              <a:ext cx="0" cy="1318756"/>
             </a:xfrm>
             <a:prstGeom prst="straightConnector1">
               <a:avLst/>
@@ -4812,12 +4741,12 @@
           </p:nvCxnSpPr>
           <p:spPr>
             <a:xfrm rot="5400000" flipH="1">
-              <a:off x="2312560" y="4021902"/>
-              <a:ext cx="359306" cy="996177"/>
+              <a:off x="2366613" y="3859742"/>
+              <a:ext cx="251199" cy="996177"/>
             </a:xfrm>
             <a:prstGeom prst="bentConnector4">
               <a:avLst>
-                <a:gd name="adj1" fmla="val -63623"/>
+                <a:gd name="adj1" fmla="val -91004"/>
                 <a:gd name="adj2" fmla="val 122948"/>
               </a:avLst>
             </a:prstGeom>

</xml_diff>

<commit_message>
fix #11: add delete queries
</commit_message>
<xml_diff>
--- a/figures/schema.pptx
+++ b/figures/schema.pptx
@@ -2497,10 +2497,10 @@
       </p:grpSpPr>
       <p:grpSp>
         <p:nvGrpSpPr>
-          <p:cNvPr id="24" name="Group 23">
+          <p:cNvPr id="29" name="Group 28">
             <a:extLst>
               <a:ext uri="{FF2B5EF4-FFF2-40B4-BE49-F238E27FC236}">
-                <a16:creationId xmlns:a16="http://schemas.microsoft.com/office/drawing/2014/main" id="{81B2F107-6A50-A576-0E36-C93DD7E96D8A}"/>
+                <a16:creationId xmlns:a16="http://schemas.microsoft.com/office/drawing/2014/main" id="{2D3649A3-7B06-C0E4-E0F9-062D7B4B2F19}"/>
               </a:ext>
             </a:extLst>
           </p:cNvPr>
@@ -2509,10 +2509,10 @@
         </p:nvGrpSpPr>
         <p:grpSpPr>
           <a:xfrm>
-            <a:off x="921316" y="1301842"/>
-            <a:ext cx="9614683" cy="4482732"/>
-            <a:chOff x="921316" y="1301842"/>
-            <a:chExt cx="9614683" cy="4482732"/>
+            <a:off x="908818" y="1301842"/>
+            <a:ext cx="9627181" cy="4154743"/>
+            <a:chOff x="908818" y="1301842"/>
+            <a:chExt cx="9627181" cy="4154743"/>
           </a:xfrm>
         </p:grpSpPr>
         <p:grpSp>
@@ -3697,7 +3697,7 @@
           </p:nvGrpSpPr>
           <p:grpSpPr>
             <a:xfrm>
-              <a:off x="5229585" y="4615873"/>
+              <a:off x="5229585" y="4287884"/>
               <a:ext cx="1992353" cy="1168701"/>
               <a:chOff x="2789712" y="3039762"/>
               <a:chExt cx="1992353" cy="1168701"/>
@@ -3914,13 +3914,13 @@
           </p:nvCxnSpPr>
           <p:spPr>
             <a:xfrm rot="10800000" flipH="1" flipV="1">
-              <a:off x="1994124" y="1615706"/>
-              <a:ext cx="4231638" cy="4168868"/>
+              <a:off x="1994124" y="1615705"/>
+              <a:ext cx="4231638" cy="3840879"/>
             </a:xfrm>
             <a:prstGeom prst="bentConnector4">
               <a:avLst>
-                <a:gd name="adj1" fmla="val -12213"/>
-                <a:gd name="adj2" fmla="val 105484"/>
+                <a:gd name="adj1" fmla="val -25367"/>
+                <a:gd name="adj2" fmla="val 103105"/>
               </a:avLst>
             </a:prstGeom>
             <a:ln w="19050" cmpd="sng">
@@ -3958,18 +3958,17 @@
             <p:cNvCxnSpPr>
               <a:cxnSpLocks/>
               <a:stCxn id="13" idx="1"/>
-              <a:endCxn id="40" idx="1"/>
             </p:cNvCxnSpPr>
             <p:nvPr/>
           </p:nvCxnSpPr>
           <p:spPr>
             <a:xfrm rot="10800000" flipH="1" flipV="1">
               <a:off x="1994123" y="3785381"/>
-              <a:ext cx="3235461" cy="1609462"/>
+              <a:ext cx="3192867" cy="1579920"/>
             </a:xfrm>
             <a:prstGeom prst="bentConnector3">
               <a:avLst>
-                <a:gd name="adj1" fmla="val -11980"/>
+                <a:gd name="adj1" fmla="val -14008"/>
               </a:avLst>
             </a:prstGeom>
             <a:ln w="19050">
@@ -4009,7 +4008,7 @@
           </p:nvSpPr>
           <p:spPr>
             <a:xfrm>
-              <a:off x="921316" y="2973145"/>
+              <a:off x="908818" y="3148689"/>
               <a:ext cx="603050" cy="307777"/>
             </a:xfrm>
             <a:prstGeom prst="rect">
@@ -4045,7 +4044,7 @@
           </p:nvSpPr>
           <p:spPr>
             <a:xfrm>
-              <a:off x="1640403" y="5382870"/>
+              <a:off x="1569290" y="5018662"/>
               <a:ext cx="603050" cy="307777"/>
             </a:xfrm>
             <a:prstGeom prst="rect">
@@ -4084,7 +4083,7 @@
           <p:spPr>
             <a:xfrm flipV="1">
               <a:off x="6485349" y="3609590"/>
-              <a:ext cx="0" cy="1006283"/>
+              <a:ext cx="0" cy="678294"/>
             </a:xfrm>
             <a:prstGeom prst="straightConnector1">
               <a:avLst/>
@@ -4163,7 +4162,7 @@
           </p:nvSpPr>
           <p:spPr>
             <a:xfrm>
-              <a:off x="2209048" y="2973145"/>
+              <a:off x="2191275" y="2718052"/>
               <a:ext cx="631904" cy="307777"/>
             </a:xfrm>
             <a:prstGeom prst="rect">
@@ -4201,7 +4200,7 @@
           <p:spPr>
             <a:xfrm>
               <a:off x="5882073" y="3655239"/>
-              <a:ext cx="0" cy="960634"/>
+              <a:ext cx="0" cy="632645"/>
             </a:xfrm>
             <a:prstGeom prst="straightConnector1">
               <a:avLst/>
@@ -4375,7 +4374,7 @@
             </a:xfrm>
             <a:prstGeom prst="bentConnector4">
               <a:avLst>
-                <a:gd name="adj1" fmla="val -91004"/>
+                <a:gd name="adj1" fmla="val -178052"/>
                 <a:gd name="adj2" fmla="val 122948"/>
               </a:avLst>
             </a:prstGeom>
@@ -4416,7 +4415,7 @@
           </p:nvSpPr>
           <p:spPr>
             <a:xfrm>
-              <a:off x="3295902" y="4933177"/>
+              <a:off x="3310709" y="4580739"/>
               <a:ext cx="631904" cy="307777"/>
             </a:xfrm>
             <a:prstGeom prst="rect">
@@ -4622,7 +4621,7 @@
           </p:nvSpPr>
           <p:spPr>
             <a:xfrm>
-              <a:off x="3210945" y="2851168"/>
+              <a:off x="3149973" y="2524463"/>
               <a:ext cx="970137" cy="307777"/>
             </a:xfrm>
             <a:prstGeom prst="rect">
@@ -4702,8 +4701,8 @@
           </p:nvSpPr>
           <p:spPr>
             <a:xfrm>
-              <a:off x="1542696" y="2973145"/>
-              <a:ext cx="700757" cy="307777"/>
+              <a:off x="1282153" y="2724811"/>
+              <a:ext cx="829858" cy="307777"/>
             </a:xfrm>
             <a:prstGeom prst="rect">
               <a:avLst/>
@@ -4715,6 +4714,7 @@
             </a:bodyPr>
             <a:lstStyle/>
             <a:p>
+              <a:pPr algn="ctr"/>
               <a:r>
                 <a:rPr lang="en-US" altLang="zh-CN" sz="1400" dirty="0" err="1"/>
                 <a:t>workIn</a:t>
@@ -4746,7 +4746,7 @@
             </a:xfrm>
             <a:prstGeom prst="bentConnector4">
               <a:avLst>
-                <a:gd name="adj1" fmla="val -91004"/>
+                <a:gd name="adj1" fmla="val -178051"/>
                 <a:gd name="adj2" fmla="val 122948"/>
               </a:avLst>
             </a:prstGeom>
@@ -4787,7 +4787,7 @@
           </p:nvSpPr>
           <p:spPr>
             <a:xfrm>
-              <a:off x="1893074" y="4933178"/>
+              <a:off x="1870815" y="4580740"/>
               <a:ext cx="970137" cy="307777"/>
             </a:xfrm>
             <a:prstGeom prst="rect">

</xml_diff>

<commit_message>
unify diagrams in transaction workload (#36)
</commit_message>
<xml_diff>
--- a/figures/schema.pptx
+++ b/figures/schema.pptx
@@ -5,10 +5,11 @@
     <p:sldMasterId id="2147483648" r:id="rId1"/>
   </p:sldMasterIdLst>
   <p:notesMasterIdLst>
-    <p:notesMasterId r:id="rId3"/>
+    <p:notesMasterId r:id="rId4"/>
   </p:notesMasterIdLst>
   <p:sldIdLst>
     <p:sldId id="415" r:id="rId2"/>
+    <p:sldId id="416" r:id="rId3"/>
   </p:sldIdLst>
   <p:sldSz cx="12192000" cy="6858000"/>
   <p:notesSz cx="6858000" cy="9144000"/>
@@ -113,6 +114,7 @@
         <p14:section name="默认节" id="{1EEC304E-9EA9-44B3-83A5-4400A19A585D}">
           <p14:sldIdLst>
             <p14:sldId id="415"/>
+            <p14:sldId id="416"/>
           </p14:sldIdLst>
         </p14:section>
       </p14:sectionLst>
@@ -206,7 +208,7 @@
           <a:p>
             <a:fld id="{CAD4BD24-A097-4F9D-85E9-6A2A24CA2D98}" type="datetimeFigureOut">
               <a:rPr lang="zh-CN" altLang="en-US" smtClean="0"/>
-              <a:t>2022/9/27</a:t>
+              <a:t>2022/11/12</a:t>
             </a:fld>
             <a:endParaRPr lang="zh-CN" altLang="en-US"/>
           </a:p>
@@ -2497,10 +2499,10 @@
       </p:grpSpPr>
       <p:grpSp>
         <p:nvGrpSpPr>
-          <p:cNvPr id="29" name="Group 28">
+          <p:cNvPr id="149" name="Group 148">
             <a:extLst>
               <a:ext uri="{FF2B5EF4-FFF2-40B4-BE49-F238E27FC236}">
-                <a16:creationId xmlns:a16="http://schemas.microsoft.com/office/drawing/2014/main" id="{2D3649A3-7B06-C0E4-E0F9-062D7B4B2F19}"/>
+                <a16:creationId xmlns:a16="http://schemas.microsoft.com/office/drawing/2014/main" id="{90CE3EB4-F706-D7EE-1A82-C255B4423B9C}"/>
               </a:ext>
             </a:extLst>
           </p:cNvPr>
@@ -2509,18 +2511,631 @@
         </p:nvGrpSpPr>
         <p:grpSpPr>
           <a:xfrm>
-            <a:off x="908818" y="1301842"/>
-            <a:ext cx="9627181" cy="4154743"/>
-            <a:chOff x="908818" y="1301842"/>
-            <a:chExt cx="9627181" cy="4154743"/>
+            <a:off x="1283295" y="1301842"/>
+            <a:ext cx="8801470" cy="4063459"/>
+            <a:chOff x="1283295" y="1301842"/>
+            <a:chExt cx="8801470" cy="4063459"/>
           </a:xfrm>
         </p:grpSpPr>
+        <p:sp>
+          <p:nvSpPr>
+            <p:cNvPr id="9" name="Rectangle 8">
+              <a:extLst>
+                <a:ext uri="{FF2B5EF4-FFF2-40B4-BE49-F238E27FC236}">
+                  <a16:creationId xmlns:a16="http://schemas.microsoft.com/office/drawing/2014/main" id="{BCBA3291-885A-2045-B3B6-86254BE83E51}"/>
+                </a:ext>
+              </a:extLst>
+            </p:cNvPr>
+            <p:cNvSpPr/>
+            <p:nvPr/>
+          </p:nvSpPr>
+          <p:spPr>
+            <a:xfrm>
+              <a:off x="1994124" y="1811356"/>
+              <a:ext cx="1992353" cy="461680"/>
+            </a:xfrm>
+            <a:prstGeom prst="rect">
+              <a:avLst/>
+            </a:prstGeom>
+            <a:noFill/>
+            <a:ln w="22225">
+              <a:solidFill>
+                <a:schemeClr val="tx1"/>
+              </a:solidFill>
+            </a:ln>
+          </p:spPr>
+          <p:style>
+            <a:lnRef idx="2">
+              <a:schemeClr val="accent1">
+                <a:shade val="50000"/>
+              </a:schemeClr>
+            </a:lnRef>
+            <a:fillRef idx="1">
+              <a:schemeClr val="accent1"/>
+            </a:fillRef>
+            <a:effectRef idx="0">
+              <a:schemeClr val="accent1"/>
+            </a:effectRef>
+            <a:fontRef idx="minor">
+              <a:schemeClr val="lt1"/>
+            </a:fontRef>
+          </p:style>
+          <p:txBody>
+            <a:bodyPr rtlCol="0" anchor="ctr"/>
+            <a:lstStyle/>
+            <a:p>
+              <a:r>
+                <a:rPr lang="en-US" altLang="zh-CN" sz="1200" dirty="0">
+                  <a:solidFill>
+                    <a:schemeClr val="tx1"/>
+                  </a:solidFill>
+                </a:rPr>
+                <a:t>id:</a:t>
+              </a:r>
+              <a:r>
+                <a:rPr lang="zh-CN" altLang="en-US" sz="1200" dirty="0">
+                  <a:solidFill>
+                    <a:schemeClr val="tx1"/>
+                  </a:solidFill>
+                </a:rPr>
+                <a:t> </a:t>
+              </a:r>
+              <a:r>
+                <a:rPr lang="en-US" altLang="zh-CN" sz="1200" dirty="0">
+                  <a:solidFill>
+                    <a:schemeClr val="tx1"/>
+                  </a:solidFill>
+                </a:rPr>
+                <a:t>ID</a:t>
+              </a:r>
+            </a:p>
+            <a:p>
+              <a:r>
+                <a:rPr lang="en-US" altLang="zh-CN" sz="1200" dirty="0">
+                  <a:solidFill>
+                    <a:schemeClr val="tx1"/>
+                  </a:solidFill>
+                </a:rPr>
+                <a:t>name:</a:t>
+              </a:r>
+              <a:r>
+                <a:rPr lang="zh-CN" altLang="en-US" sz="1200" dirty="0">
+                  <a:solidFill>
+                    <a:schemeClr val="tx1"/>
+                  </a:solidFill>
+                </a:rPr>
+                <a:t> </a:t>
+              </a:r>
+              <a:r>
+                <a:rPr lang="en-US" altLang="zh-CN" sz="1200" dirty="0">
+                  <a:solidFill>
+                    <a:schemeClr val="tx1"/>
+                  </a:solidFill>
+                </a:rPr>
+                <a:t>String</a:t>
+              </a:r>
+              <a:endParaRPr lang="en-CN" sz="1200" dirty="0">
+                <a:solidFill>
+                  <a:schemeClr val="tx1"/>
+                </a:solidFill>
+              </a:endParaRPr>
+            </a:p>
+          </p:txBody>
+        </p:sp>
+        <p:sp>
+          <p:nvSpPr>
+            <p:cNvPr id="10" name="Rectangle 9">
+              <a:extLst>
+                <a:ext uri="{FF2B5EF4-FFF2-40B4-BE49-F238E27FC236}">
+                  <a16:creationId xmlns:a16="http://schemas.microsoft.com/office/drawing/2014/main" id="{B6FEE198-7C64-BF43-87DB-F86141A4C76D}"/>
+                </a:ext>
+              </a:extLst>
+            </p:cNvPr>
+            <p:cNvSpPr/>
+            <p:nvPr/>
+          </p:nvSpPr>
+          <p:spPr>
+            <a:xfrm>
+              <a:off x="1994124" y="1422117"/>
+              <a:ext cx="1992353" cy="387178"/>
+            </a:xfrm>
+            <a:prstGeom prst="rect">
+              <a:avLst/>
+            </a:prstGeom>
+            <a:solidFill>
+              <a:schemeClr val="accent6">
+                <a:lumMod val="60000"/>
+                <a:lumOff val="40000"/>
+              </a:schemeClr>
+            </a:solidFill>
+            <a:ln w="22225">
+              <a:solidFill>
+                <a:schemeClr val="tx1"/>
+              </a:solidFill>
+            </a:ln>
+          </p:spPr>
+          <p:style>
+            <a:lnRef idx="2">
+              <a:schemeClr val="accent1">
+                <a:shade val="50000"/>
+              </a:schemeClr>
+            </a:lnRef>
+            <a:fillRef idx="1">
+              <a:schemeClr val="accent1"/>
+            </a:fillRef>
+            <a:effectRef idx="0">
+              <a:schemeClr val="accent1"/>
+            </a:effectRef>
+            <a:fontRef idx="minor">
+              <a:schemeClr val="lt1"/>
+            </a:fontRef>
+          </p:style>
+          <p:txBody>
+            <a:bodyPr rtlCol="0" anchor="ctr"/>
+            <a:lstStyle/>
+            <a:p>
+              <a:pPr algn="ctr"/>
+              <a:r>
+                <a:rPr lang="en-US" altLang="zh-CN" b="1" dirty="0">
+                  <a:solidFill>
+                    <a:schemeClr val="tx1"/>
+                  </a:solidFill>
+                </a:rPr>
+                <a:t>Person</a:t>
+              </a:r>
+              <a:endParaRPr lang="en-CN" b="1" dirty="0">
+                <a:solidFill>
+                  <a:schemeClr val="tx1"/>
+                </a:solidFill>
+              </a:endParaRPr>
+            </a:p>
+          </p:txBody>
+        </p:sp>
+        <p:sp>
+          <p:nvSpPr>
+            <p:cNvPr id="12" name="Rectangle 11">
+              <a:extLst>
+                <a:ext uri="{FF2B5EF4-FFF2-40B4-BE49-F238E27FC236}">
+                  <a16:creationId xmlns:a16="http://schemas.microsoft.com/office/drawing/2014/main" id="{394BCCF7-904F-BA42-A045-62373FD79E58}"/>
+                </a:ext>
+              </a:extLst>
+            </p:cNvPr>
+            <p:cNvSpPr/>
+            <p:nvPr/>
+          </p:nvSpPr>
+          <p:spPr>
+            <a:xfrm>
+              <a:off x="1994124" y="3981031"/>
+              <a:ext cx="1992353" cy="502398"/>
+            </a:xfrm>
+            <a:prstGeom prst="rect">
+              <a:avLst/>
+            </a:prstGeom>
+            <a:noFill/>
+            <a:ln w="22225">
+              <a:solidFill>
+                <a:schemeClr val="tx1"/>
+              </a:solidFill>
+            </a:ln>
+          </p:spPr>
+          <p:style>
+            <a:lnRef idx="2">
+              <a:schemeClr val="accent1">
+                <a:shade val="50000"/>
+              </a:schemeClr>
+            </a:lnRef>
+            <a:fillRef idx="1">
+              <a:schemeClr val="accent1"/>
+            </a:fillRef>
+            <a:effectRef idx="0">
+              <a:schemeClr val="accent1"/>
+            </a:effectRef>
+            <a:fontRef idx="minor">
+              <a:schemeClr val="lt1"/>
+            </a:fontRef>
+          </p:style>
+          <p:txBody>
+            <a:bodyPr rtlCol="0" anchor="ctr"/>
+            <a:lstStyle/>
+            <a:p>
+              <a:r>
+                <a:rPr lang="en-US" altLang="zh-CN" sz="1200" dirty="0">
+                  <a:solidFill>
+                    <a:schemeClr val="tx1"/>
+                  </a:solidFill>
+                </a:rPr>
+                <a:t>id:</a:t>
+              </a:r>
+              <a:r>
+                <a:rPr lang="zh-CN" altLang="en-US" sz="1200" dirty="0">
+                  <a:solidFill>
+                    <a:schemeClr val="tx1"/>
+                  </a:solidFill>
+                </a:rPr>
+                <a:t> </a:t>
+              </a:r>
+              <a:r>
+                <a:rPr lang="en-US" altLang="zh-CN" sz="1200" dirty="0">
+                  <a:solidFill>
+                    <a:schemeClr val="tx1"/>
+                  </a:solidFill>
+                </a:rPr>
+                <a:t>ID</a:t>
+              </a:r>
+            </a:p>
+            <a:p>
+              <a:r>
+                <a:rPr lang="en-US" altLang="zh-CN" sz="1200" dirty="0">
+                  <a:solidFill>
+                    <a:schemeClr val="tx1"/>
+                  </a:solidFill>
+                </a:rPr>
+                <a:t>name:</a:t>
+              </a:r>
+              <a:r>
+                <a:rPr lang="zh-CN" altLang="en-US" sz="1200" dirty="0">
+                  <a:solidFill>
+                    <a:schemeClr val="tx1"/>
+                  </a:solidFill>
+                </a:rPr>
+                <a:t> </a:t>
+              </a:r>
+              <a:r>
+                <a:rPr lang="en-US" altLang="zh-CN" sz="1200" dirty="0">
+                  <a:solidFill>
+                    <a:schemeClr val="tx1"/>
+                  </a:solidFill>
+                </a:rPr>
+                <a:t>String</a:t>
+              </a:r>
+            </a:p>
+          </p:txBody>
+        </p:sp>
+        <p:sp>
+          <p:nvSpPr>
+            <p:cNvPr id="13" name="Rectangle 12">
+              <a:extLst>
+                <a:ext uri="{FF2B5EF4-FFF2-40B4-BE49-F238E27FC236}">
+                  <a16:creationId xmlns:a16="http://schemas.microsoft.com/office/drawing/2014/main" id="{BE5A4E8B-4642-4241-B212-ABEFC161DEC9}"/>
+                </a:ext>
+              </a:extLst>
+            </p:cNvPr>
+            <p:cNvSpPr/>
+            <p:nvPr/>
+          </p:nvSpPr>
+          <p:spPr>
+            <a:xfrm>
+              <a:off x="1994124" y="3591792"/>
+              <a:ext cx="1992353" cy="387178"/>
+            </a:xfrm>
+            <a:prstGeom prst="rect">
+              <a:avLst/>
+            </a:prstGeom>
+            <a:solidFill>
+              <a:srgbClr val="FF0000">
+                <a:alpha val="30000"/>
+              </a:srgbClr>
+            </a:solidFill>
+            <a:ln w="22225">
+              <a:solidFill>
+                <a:schemeClr val="tx1"/>
+              </a:solidFill>
+            </a:ln>
+          </p:spPr>
+          <p:style>
+            <a:lnRef idx="2">
+              <a:schemeClr val="accent1">
+                <a:shade val="50000"/>
+              </a:schemeClr>
+            </a:lnRef>
+            <a:fillRef idx="1">
+              <a:schemeClr val="accent1"/>
+            </a:fillRef>
+            <a:effectRef idx="0">
+              <a:schemeClr val="accent1"/>
+            </a:effectRef>
+            <a:fontRef idx="minor">
+              <a:schemeClr val="lt1"/>
+            </a:fontRef>
+          </p:style>
+          <p:txBody>
+            <a:bodyPr rtlCol="0" anchor="ctr"/>
+            <a:lstStyle/>
+            <a:p>
+              <a:pPr algn="ctr"/>
+              <a:r>
+                <a:rPr lang="en-US" altLang="zh-CN" b="1" dirty="0">
+                  <a:solidFill>
+                    <a:schemeClr val="tx1"/>
+                  </a:solidFill>
+                </a:rPr>
+                <a:t>Company</a:t>
+              </a:r>
+              <a:endParaRPr lang="en-CN" b="1" dirty="0">
+                <a:solidFill>
+                  <a:schemeClr val="tx1"/>
+                </a:solidFill>
+              </a:endParaRPr>
+            </a:p>
+          </p:txBody>
+        </p:sp>
+        <p:sp>
+          <p:nvSpPr>
+            <p:cNvPr id="15" name="Rectangle 14">
+              <a:extLst>
+                <a:ext uri="{FF2B5EF4-FFF2-40B4-BE49-F238E27FC236}">
+                  <a16:creationId xmlns:a16="http://schemas.microsoft.com/office/drawing/2014/main" id="{A7BE3F17-C67E-5A46-996C-67EF743EC561}"/>
+                </a:ext>
+              </a:extLst>
+            </p:cNvPr>
+            <p:cNvSpPr/>
+            <p:nvPr/>
+          </p:nvSpPr>
+          <p:spPr>
+            <a:xfrm>
+              <a:off x="5001036" y="2630368"/>
+              <a:ext cx="2010538" cy="851378"/>
+            </a:xfrm>
+            <a:prstGeom prst="rect">
+              <a:avLst/>
+            </a:prstGeom>
+            <a:noFill/>
+            <a:ln w="22225">
+              <a:solidFill>
+                <a:schemeClr val="tx1"/>
+              </a:solidFill>
+            </a:ln>
+          </p:spPr>
+          <p:style>
+            <a:lnRef idx="2">
+              <a:schemeClr val="accent1">
+                <a:shade val="50000"/>
+              </a:schemeClr>
+            </a:lnRef>
+            <a:fillRef idx="1">
+              <a:schemeClr val="accent1"/>
+            </a:fillRef>
+            <a:effectRef idx="0">
+              <a:schemeClr val="accent1"/>
+            </a:effectRef>
+            <a:fontRef idx="minor">
+              <a:schemeClr val="lt1"/>
+            </a:fontRef>
+          </p:style>
+          <p:txBody>
+            <a:bodyPr rtlCol="0" anchor="ctr"/>
+            <a:lstStyle/>
+            <a:p>
+              <a:r>
+                <a:rPr lang="en-US" altLang="zh-CN" sz="1200" dirty="0">
+                  <a:solidFill>
+                    <a:schemeClr val="tx1"/>
+                  </a:solidFill>
+                </a:rPr>
+                <a:t>id:</a:t>
+              </a:r>
+              <a:r>
+                <a:rPr lang="zh-CN" altLang="en-US" sz="1200" dirty="0">
+                  <a:solidFill>
+                    <a:schemeClr val="tx1"/>
+                  </a:solidFill>
+                </a:rPr>
+                <a:t> </a:t>
+              </a:r>
+              <a:r>
+                <a:rPr lang="en-US" altLang="zh-CN" sz="1200" dirty="0">
+                  <a:solidFill>
+                    <a:schemeClr val="tx1"/>
+                  </a:solidFill>
+                </a:rPr>
+                <a:t>ID</a:t>
+              </a:r>
+            </a:p>
+            <a:p>
+              <a:r>
+                <a:rPr lang="en-US" sz="1200" dirty="0" err="1">
+                  <a:solidFill>
+                    <a:schemeClr val="tx1"/>
+                  </a:solidFill>
+                </a:rPr>
+                <a:t>cr</a:t>
+              </a:r>
+              <a:r>
+                <a:rPr lang="en-US" altLang="zh-CN" sz="1200" dirty="0" err="1">
+                  <a:solidFill>
+                    <a:schemeClr val="tx1"/>
+                  </a:solidFill>
+                </a:rPr>
+                <a:t>eateTime</a:t>
+              </a:r>
+              <a:r>
+                <a:rPr lang="en-US" altLang="zh-CN" sz="1200" dirty="0">
+                  <a:solidFill>
+                    <a:schemeClr val="tx1"/>
+                  </a:solidFill>
+                </a:rPr>
+                <a:t>:</a:t>
+              </a:r>
+              <a:r>
+                <a:rPr lang="zh-CN" altLang="en-US" sz="1200" dirty="0">
+                  <a:solidFill>
+                    <a:schemeClr val="tx1"/>
+                  </a:solidFill>
+                </a:rPr>
+                <a:t> </a:t>
+              </a:r>
+              <a:r>
+                <a:rPr lang="en-US" altLang="zh-CN" sz="1200" dirty="0" err="1">
+                  <a:solidFill>
+                    <a:schemeClr val="tx1"/>
+                  </a:solidFill>
+                </a:rPr>
+                <a:t>DateTime</a:t>
+              </a:r>
+              <a:endParaRPr lang="en-US" altLang="zh-CN" sz="1200" dirty="0">
+                <a:solidFill>
+                  <a:schemeClr val="tx1"/>
+                </a:solidFill>
+              </a:endParaRPr>
+            </a:p>
+            <a:p>
+              <a:r>
+                <a:rPr lang="en-US" altLang="zh-CN" sz="1200" dirty="0" err="1">
+                  <a:solidFill>
+                    <a:schemeClr val="tx1"/>
+                  </a:solidFill>
+                </a:rPr>
+                <a:t>isBlocked</a:t>
+              </a:r>
+              <a:r>
+                <a:rPr lang="en-US" altLang="zh-CN" sz="1200" dirty="0">
+                  <a:solidFill>
+                    <a:schemeClr val="tx1"/>
+                  </a:solidFill>
+                </a:rPr>
+                <a:t>:</a:t>
+              </a:r>
+              <a:r>
+                <a:rPr lang="zh-CN" altLang="en-US" sz="1200" dirty="0">
+                  <a:solidFill>
+                    <a:schemeClr val="tx1"/>
+                  </a:solidFill>
+                </a:rPr>
+                <a:t> </a:t>
+              </a:r>
+              <a:r>
+                <a:rPr lang="en-US" altLang="zh-CN" sz="1200" dirty="0">
+                  <a:solidFill>
+                    <a:schemeClr val="tx1"/>
+                  </a:solidFill>
+                </a:rPr>
+                <a:t>Boolean</a:t>
+              </a:r>
+            </a:p>
+            <a:p>
+              <a:r>
+                <a:rPr lang="en-US" altLang="zh-CN" sz="1200" dirty="0">
+                  <a:solidFill>
+                    <a:schemeClr val="tx1"/>
+                  </a:solidFill>
+                </a:rPr>
+                <a:t>t</a:t>
+              </a:r>
+              <a:r>
+                <a:rPr lang="en-US" sz="1200" dirty="0">
+                  <a:solidFill>
+                    <a:schemeClr val="tx1"/>
+                  </a:solidFill>
+                </a:rPr>
+                <a:t>ype</a:t>
+              </a:r>
+              <a:r>
+                <a:rPr lang="en-US" altLang="zh-CN" sz="1200" dirty="0">
+                  <a:solidFill>
+                    <a:schemeClr val="tx1"/>
+                  </a:solidFill>
+                </a:rPr>
+                <a:t>:</a:t>
+              </a:r>
+              <a:r>
+                <a:rPr lang="zh-CN" altLang="en-US" sz="1200" dirty="0">
+                  <a:solidFill>
+                    <a:schemeClr val="tx1"/>
+                  </a:solidFill>
+                </a:rPr>
+                <a:t> </a:t>
+              </a:r>
+              <a:r>
+                <a:rPr lang="en-US" altLang="zh-CN" sz="1200" dirty="0">
+                  <a:solidFill>
+                    <a:schemeClr val="tx1"/>
+                  </a:solidFill>
+                </a:rPr>
+                <a:t>String</a:t>
+              </a:r>
+              <a:endParaRPr lang="en-CN" sz="1200" dirty="0">
+                <a:solidFill>
+                  <a:schemeClr val="tx1"/>
+                </a:solidFill>
+              </a:endParaRPr>
+            </a:p>
+          </p:txBody>
+        </p:sp>
+        <p:sp>
+          <p:nvSpPr>
+            <p:cNvPr id="16" name="Rectangle 15">
+              <a:extLst>
+                <a:ext uri="{FF2B5EF4-FFF2-40B4-BE49-F238E27FC236}">
+                  <a16:creationId xmlns:a16="http://schemas.microsoft.com/office/drawing/2014/main" id="{E7BA5DA0-5EF3-9D45-88BA-BC5BA7F3F9AB}"/>
+                </a:ext>
+              </a:extLst>
+            </p:cNvPr>
+            <p:cNvSpPr/>
+            <p:nvPr/>
+          </p:nvSpPr>
+          <p:spPr>
+            <a:xfrm>
+              <a:off x="5001036" y="2241129"/>
+              <a:ext cx="2010536" cy="387178"/>
+            </a:xfrm>
+            <a:prstGeom prst="rect">
+              <a:avLst/>
+            </a:prstGeom>
+            <a:solidFill>
+              <a:schemeClr val="accent1">
+                <a:lumMod val="60000"/>
+                <a:lumOff val="40000"/>
+              </a:schemeClr>
+            </a:solidFill>
+            <a:ln w="22225">
+              <a:solidFill>
+                <a:schemeClr val="tx1"/>
+              </a:solidFill>
+            </a:ln>
+          </p:spPr>
+          <p:style>
+            <a:lnRef idx="2">
+              <a:schemeClr val="accent1">
+                <a:shade val="50000"/>
+              </a:schemeClr>
+            </a:lnRef>
+            <a:fillRef idx="1">
+              <a:schemeClr val="accent1"/>
+            </a:fillRef>
+            <a:effectRef idx="0">
+              <a:schemeClr val="accent1"/>
+            </a:effectRef>
+            <a:fontRef idx="minor">
+              <a:schemeClr val="lt1"/>
+            </a:fontRef>
+          </p:style>
+          <p:txBody>
+            <a:bodyPr rtlCol="0" anchor="ctr"/>
+            <a:lstStyle/>
+            <a:p>
+              <a:pPr algn="ctr"/>
+              <a:r>
+                <a:rPr lang="en-US" altLang="zh-CN" b="1" dirty="0">
+                  <a:solidFill>
+                    <a:schemeClr val="tx1"/>
+                  </a:solidFill>
+                </a:rPr>
+                <a:t>Account</a:t>
+              </a:r>
+              <a:endParaRPr lang="en-CN" b="1" dirty="0">
+                <a:solidFill>
+                  <a:schemeClr val="tx1"/>
+                </a:solidFill>
+              </a:endParaRPr>
+            </a:p>
+          </p:txBody>
+        </p:sp>
         <p:grpSp>
           <p:nvGrpSpPr>
-            <p:cNvPr id="8" name="Group 7">
+            <p:cNvPr id="131" name="Group 130">
               <a:extLst>
                 <a:ext uri="{FF2B5EF4-FFF2-40B4-BE49-F238E27FC236}">
-                  <a16:creationId xmlns:a16="http://schemas.microsoft.com/office/drawing/2014/main" id="{3B4CF39A-1CF8-D148-873C-5B18130B7043}"/>
+                  <a16:creationId xmlns:a16="http://schemas.microsoft.com/office/drawing/2014/main" id="{FE002B43-4806-CE44-3E14-C8736CF4FD37}"/>
                 </a:ext>
               </a:extLst>
             </p:cNvPr>
@@ -2529,18 +3144,18 @@
           </p:nvGrpSpPr>
           <p:grpSpPr>
             <a:xfrm>
-              <a:off x="1994124" y="1422117"/>
-              <a:ext cx="1992353" cy="850919"/>
-              <a:chOff x="2789712" y="3039762"/>
-              <a:chExt cx="1992353" cy="850919"/>
+              <a:off x="8092412" y="2231373"/>
+              <a:ext cx="1992353" cy="1250373"/>
+              <a:chOff x="8543646" y="2231373"/>
+              <a:chExt cx="1992353" cy="1250373"/>
             </a:xfrm>
           </p:grpSpPr>
           <p:sp>
             <p:nvSpPr>
-              <p:cNvPr id="9" name="Rectangle 8">
+              <p:cNvPr id="21" name="Rectangle 20">
                 <a:extLst>
                   <a:ext uri="{FF2B5EF4-FFF2-40B4-BE49-F238E27FC236}">
-                    <a16:creationId xmlns:a16="http://schemas.microsoft.com/office/drawing/2014/main" id="{BCBA3291-885A-2045-B3B6-86254BE83E51}"/>
+                    <a16:creationId xmlns:a16="http://schemas.microsoft.com/office/drawing/2014/main" id="{952B3EB0-AC2E-194C-BAD9-80998F2EEF5B}"/>
                   </a:ext>
                 </a:extLst>
               </p:cNvPr>
@@ -2549,8 +3164,8 @@
             </p:nvSpPr>
             <p:spPr>
               <a:xfrm>
-                <a:off x="2789712" y="3429001"/>
-                <a:ext cx="1992353" cy="461680"/>
+                <a:off x="8543646" y="2628307"/>
+                <a:ext cx="1992353" cy="853439"/>
               </a:xfrm>
               <a:prstGeom prst="rect">
                 <a:avLst/>
@@ -2583,7 +3198,7 @@
               <a:lstStyle/>
               <a:p>
                 <a:r>
-                  <a:rPr lang="en-US" altLang="zh-CN" sz="1400" dirty="0">
+                  <a:rPr lang="en-US" altLang="zh-CN" sz="1200" dirty="0">
                     <a:solidFill>
                       <a:schemeClr val="tx1"/>
                     </a:solidFill>
@@ -2591,7 +3206,7 @@
                   <a:t>id:</a:t>
                 </a:r>
                 <a:r>
-                  <a:rPr lang="zh-CN" altLang="en-US" sz="1400" dirty="0">
+                  <a:rPr lang="zh-CN" altLang="en-US" sz="1200" dirty="0">
                     <a:solidFill>
                       <a:schemeClr val="tx1"/>
                     </a:solidFill>
@@ -2599,7 +3214,7 @@
                   <a:t> </a:t>
                 </a:r>
                 <a:r>
-                  <a:rPr lang="en-US" altLang="zh-CN" sz="1400" dirty="0">
+                  <a:rPr lang="en-US" altLang="zh-CN" sz="1200" dirty="0">
                     <a:solidFill>
                       <a:schemeClr val="tx1"/>
                     </a:solidFill>
@@ -2609,7 +3224,7 @@
               </a:p>
               <a:p>
                 <a:r>
-                  <a:rPr lang="en-US" altLang="zh-CN" sz="1400" dirty="0">
+                  <a:rPr lang="en-US" altLang="zh-CN" sz="1200" dirty="0">
                     <a:solidFill>
                       <a:schemeClr val="tx1"/>
                     </a:solidFill>
@@ -2617,7 +3232,7 @@
                   <a:t>name:</a:t>
                 </a:r>
                 <a:r>
-                  <a:rPr lang="zh-CN" altLang="en-US" sz="1400" dirty="0">
+                  <a:rPr lang="zh-CN" altLang="en-US" sz="1200" dirty="0">
                     <a:solidFill>
                       <a:schemeClr val="tx1"/>
                     </a:solidFill>
@@ -2625,684 +3240,7 @@
                   <a:t> </a:t>
                 </a:r>
                 <a:r>
-                  <a:rPr lang="en-US" altLang="zh-CN" sz="1400" dirty="0">
-                    <a:solidFill>
-                      <a:schemeClr val="tx1"/>
-                    </a:solidFill>
-                  </a:rPr>
-                  <a:t>String</a:t>
-                </a:r>
-                <a:endParaRPr lang="en-CN" sz="1400" dirty="0">
-                  <a:solidFill>
-                    <a:schemeClr val="tx1"/>
-                  </a:solidFill>
-                </a:endParaRPr>
-              </a:p>
-            </p:txBody>
-          </p:sp>
-          <p:sp>
-            <p:nvSpPr>
-              <p:cNvPr id="10" name="Rectangle 9">
-                <a:extLst>
-                  <a:ext uri="{FF2B5EF4-FFF2-40B4-BE49-F238E27FC236}">
-                    <a16:creationId xmlns:a16="http://schemas.microsoft.com/office/drawing/2014/main" id="{B6FEE198-7C64-BF43-87DB-F86141A4C76D}"/>
-                  </a:ext>
-                </a:extLst>
-              </p:cNvPr>
-              <p:cNvSpPr/>
-              <p:nvPr/>
-            </p:nvSpPr>
-            <p:spPr>
-              <a:xfrm>
-                <a:off x="2789712" y="3039762"/>
-                <a:ext cx="1992353" cy="387178"/>
-              </a:xfrm>
-              <a:prstGeom prst="rect">
-                <a:avLst/>
-              </a:prstGeom>
-              <a:solidFill>
-                <a:schemeClr val="accent6">
-                  <a:lumMod val="60000"/>
-                  <a:lumOff val="40000"/>
-                </a:schemeClr>
-              </a:solidFill>
-              <a:ln w="22225">
-                <a:solidFill>
-                  <a:schemeClr val="tx1"/>
-                </a:solidFill>
-              </a:ln>
-            </p:spPr>
-            <p:style>
-              <a:lnRef idx="2">
-                <a:schemeClr val="accent1">
-                  <a:shade val="50000"/>
-                </a:schemeClr>
-              </a:lnRef>
-              <a:fillRef idx="1">
-                <a:schemeClr val="accent1"/>
-              </a:fillRef>
-              <a:effectRef idx="0">
-                <a:schemeClr val="accent1"/>
-              </a:effectRef>
-              <a:fontRef idx="minor">
-                <a:schemeClr val="lt1"/>
-              </a:fontRef>
-            </p:style>
-            <p:txBody>
-              <a:bodyPr rtlCol="0" anchor="ctr"/>
-              <a:lstStyle/>
-              <a:p>
-                <a:pPr algn="ctr"/>
-                <a:r>
-                  <a:rPr lang="en-US" altLang="zh-CN" b="1" dirty="0">
-                    <a:solidFill>
-                      <a:schemeClr val="tx1"/>
-                    </a:solidFill>
-                  </a:rPr>
-                  <a:t>Person</a:t>
-                </a:r>
-                <a:endParaRPr lang="en-CN" b="1" dirty="0">
-                  <a:solidFill>
-                    <a:schemeClr val="tx1"/>
-                  </a:solidFill>
-                </a:endParaRPr>
-              </a:p>
-            </p:txBody>
-          </p:sp>
-        </p:grpSp>
-        <p:grpSp>
-          <p:nvGrpSpPr>
-            <p:cNvPr id="11" name="Group 10">
-              <a:extLst>
-                <a:ext uri="{FF2B5EF4-FFF2-40B4-BE49-F238E27FC236}">
-                  <a16:creationId xmlns:a16="http://schemas.microsoft.com/office/drawing/2014/main" id="{3BB1BCAA-ECBE-2548-9A19-DA363EAF14D1}"/>
-                </a:ext>
-              </a:extLst>
-            </p:cNvPr>
-            <p:cNvGrpSpPr/>
-            <p:nvPr/>
-          </p:nvGrpSpPr>
-          <p:grpSpPr>
-            <a:xfrm>
-              <a:off x="1994124" y="3591792"/>
-              <a:ext cx="1992353" cy="891637"/>
-              <a:chOff x="2789712" y="3039762"/>
-              <a:chExt cx="1992353" cy="891637"/>
-            </a:xfrm>
-          </p:grpSpPr>
-          <p:sp>
-            <p:nvSpPr>
-              <p:cNvPr id="12" name="Rectangle 11">
-                <a:extLst>
-                  <a:ext uri="{FF2B5EF4-FFF2-40B4-BE49-F238E27FC236}">
-                    <a16:creationId xmlns:a16="http://schemas.microsoft.com/office/drawing/2014/main" id="{394BCCF7-904F-BA42-A045-62373FD79E58}"/>
-                  </a:ext>
-                </a:extLst>
-              </p:cNvPr>
-              <p:cNvSpPr/>
-              <p:nvPr/>
-            </p:nvSpPr>
-            <p:spPr>
-              <a:xfrm>
-                <a:off x="2789712" y="3429001"/>
-                <a:ext cx="1992353" cy="502398"/>
-              </a:xfrm>
-              <a:prstGeom prst="rect">
-                <a:avLst/>
-              </a:prstGeom>
-              <a:noFill/>
-              <a:ln w="22225">
-                <a:solidFill>
-                  <a:schemeClr val="tx1"/>
-                </a:solidFill>
-              </a:ln>
-            </p:spPr>
-            <p:style>
-              <a:lnRef idx="2">
-                <a:schemeClr val="accent1">
-                  <a:shade val="50000"/>
-                </a:schemeClr>
-              </a:lnRef>
-              <a:fillRef idx="1">
-                <a:schemeClr val="accent1"/>
-              </a:fillRef>
-              <a:effectRef idx="0">
-                <a:schemeClr val="accent1"/>
-              </a:effectRef>
-              <a:fontRef idx="minor">
-                <a:schemeClr val="lt1"/>
-              </a:fontRef>
-            </p:style>
-            <p:txBody>
-              <a:bodyPr rtlCol="0" anchor="ctr"/>
-              <a:lstStyle/>
-              <a:p>
-                <a:r>
-                  <a:rPr lang="en-US" altLang="zh-CN" sz="1400" dirty="0">
-                    <a:solidFill>
-                      <a:schemeClr val="tx1"/>
-                    </a:solidFill>
-                  </a:rPr>
-                  <a:t>id:</a:t>
-                </a:r>
-                <a:r>
-                  <a:rPr lang="zh-CN" altLang="en-US" sz="1400" dirty="0">
-                    <a:solidFill>
-                      <a:schemeClr val="tx1"/>
-                    </a:solidFill>
-                  </a:rPr>
-                  <a:t> </a:t>
-                </a:r>
-                <a:r>
-                  <a:rPr lang="en-US" altLang="zh-CN" sz="1400" dirty="0">
-                    <a:solidFill>
-                      <a:schemeClr val="tx1"/>
-                    </a:solidFill>
-                  </a:rPr>
-                  <a:t>ID</a:t>
-                </a:r>
-              </a:p>
-              <a:p>
-                <a:r>
-                  <a:rPr lang="en-US" altLang="zh-CN" sz="1400" dirty="0">
-                    <a:solidFill>
-                      <a:schemeClr val="tx1"/>
-                    </a:solidFill>
-                  </a:rPr>
-                  <a:t>name:</a:t>
-                </a:r>
-                <a:r>
-                  <a:rPr lang="zh-CN" altLang="en-US" sz="1400" dirty="0">
-                    <a:solidFill>
-                      <a:schemeClr val="tx1"/>
-                    </a:solidFill>
-                  </a:rPr>
-                  <a:t> </a:t>
-                </a:r>
-                <a:r>
-                  <a:rPr lang="en-US" altLang="zh-CN" sz="1400" dirty="0">
-                    <a:solidFill>
-                      <a:schemeClr val="tx1"/>
-                    </a:solidFill>
-                  </a:rPr>
-                  <a:t>String</a:t>
-                </a:r>
-              </a:p>
-            </p:txBody>
-          </p:sp>
-          <p:sp>
-            <p:nvSpPr>
-              <p:cNvPr id="13" name="Rectangle 12">
-                <a:extLst>
-                  <a:ext uri="{FF2B5EF4-FFF2-40B4-BE49-F238E27FC236}">
-                    <a16:creationId xmlns:a16="http://schemas.microsoft.com/office/drawing/2014/main" id="{BE5A4E8B-4642-4241-B212-ABEFC161DEC9}"/>
-                  </a:ext>
-                </a:extLst>
-              </p:cNvPr>
-              <p:cNvSpPr/>
-              <p:nvPr/>
-            </p:nvSpPr>
-            <p:spPr>
-              <a:xfrm>
-                <a:off x="2789712" y="3039762"/>
-                <a:ext cx="1992353" cy="387178"/>
-              </a:xfrm>
-              <a:prstGeom prst="rect">
-                <a:avLst/>
-              </a:prstGeom>
-              <a:solidFill>
-                <a:schemeClr val="accent6">
-                  <a:lumMod val="60000"/>
-                  <a:lumOff val="40000"/>
-                </a:schemeClr>
-              </a:solidFill>
-              <a:ln w="22225">
-                <a:solidFill>
-                  <a:schemeClr val="tx1"/>
-                </a:solidFill>
-              </a:ln>
-            </p:spPr>
-            <p:style>
-              <a:lnRef idx="2">
-                <a:schemeClr val="accent1">
-                  <a:shade val="50000"/>
-                </a:schemeClr>
-              </a:lnRef>
-              <a:fillRef idx="1">
-                <a:schemeClr val="accent1"/>
-              </a:fillRef>
-              <a:effectRef idx="0">
-                <a:schemeClr val="accent1"/>
-              </a:effectRef>
-              <a:fontRef idx="minor">
-                <a:schemeClr val="lt1"/>
-              </a:fontRef>
-            </p:style>
-            <p:txBody>
-              <a:bodyPr rtlCol="0" anchor="ctr"/>
-              <a:lstStyle/>
-              <a:p>
-                <a:pPr algn="ctr"/>
-                <a:r>
-                  <a:rPr lang="en-US" altLang="zh-CN" b="1" dirty="0">
-                    <a:solidFill>
-                      <a:schemeClr val="tx1"/>
-                    </a:solidFill>
-                  </a:rPr>
-                  <a:t>Company</a:t>
-                </a:r>
-                <a:endParaRPr lang="en-CN" b="1" dirty="0">
-                  <a:solidFill>
-                    <a:schemeClr val="tx1"/>
-                  </a:solidFill>
-                </a:endParaRPr>
-              </a:p>
-            </p:txBody>
-          </p:sp>
-        </p:grpSp>
-        <p:grpSp>
-          <p:nvGrpSpPr>
-            <p:cNvPr id="14" name="Group 13">
-              <a:extLst>
-                <a:ext uri="{FF2B5EF4-FFF2-40B4-BE49-F238E27FC236}">
-                  <a16:creationId xmlns:a16="http://schemas.microsoft.com/office/drawing/2014/main" id="{ACB91123-C8EA-224B-B28B-A7A89EF2E2BB}"/>
-                </a:ext>
-              </a:extLst>
-            </p:cNvPr>
-            <p:cNvGrpSpPr/>
-            <p:nvPr/>
-          </p:nvGrpSpPr>
-          <p:grpSpPr>
-            <a:xfrm>
-              <a:off x="5229636" y="2241129"/>
-              <a:ext cx="1992353" cy="1368461"/>
-              <a:chOff x="2789712" y="3039762"/>
-              <a:chExt cx="1992353" cy="1368461"/>
-            </a:xfrm>
-          </p:grpSpPr>
-          <p:sp>
-            <p:nvSpPr>
-              <p:cNvPr id="15" name="Rectangle 14">
-                <a:extLst>
-                  <a:ext uri="{FF2B5EF4-FFF2-40B4-BE49-F238E27FC236}">
-                    <a16:creationId xmlns:a16="http://schemas.microsoft.com/office/drawing/2014/main" id="{A7BE3F17-C67E-5A46-996C-67EF743EC561}"/>
-                  </a:ext>
-                </a:extLst>
-              </p:cNvPr>
-              <p:cNvSpPr/>
-              <p:nvPr/>
-            </p:nvSpPr>
-            <p:spPr>
-              <a:xfrm>
-                <a:off x="2789712" y="3429001"/>
-                <a:ext cx="1992353" cy="979222"/>
-              </a:xfrm>
-              <a:prstGeom prst="rect">
-                <a:avLst/>
-              </a:prstGeom>
-              <a:noFill/>
-              <a:ln w="22225">
-                <a:solidFill>
-                  <a:schemeClr val="tx1"/>
-                </a:solidFill>
-              </a:ln>
-            </p:spPr>
-            <p:style>
-              <a:lnRef idx="2">
-                <a:schemeClr val="accent1">
-                  <a:shade val="50000"/>
-                </a:schemeClr>
-              </a:lnRef>
-              <a:fillRef idx="1">
-                <a:schemeClr val="accent1"/>
-              </a:fillRef>
-              <a:effectRef idx="0">
-                <a:schemeClr val="accent1"/>
-              </a:effectRef>
-              <a:fontRef idx="minor">
-                <a:schemeClr val="lt1"/>
-              </a:fontRef>
-            </p:style>
-            <p:txBody>
-              <a:bodyPr rtlCol="0" anchor="ctr"/>
-              <a:lstStyle/>
-              <a:p>
-                <a:r>
-                  <a:rPr lang="en-US" altLang="zh-CN" sz="1400" dirty="0">
-                    <a:solidFill>
-                      <a:schemeClr val="tx1"/>
-                    </a:solidFill>
-                  </a:rPr>
-                  <a:t>id:</a:t>
-                </a:r>
-                <a:r>
-                  <a:rPr lang="zh-CN" altLang="en-US" sz="1400" dirty="0">
-                    <a:solidFill>
-                      <a:schemeClr val="tx1"/>
-                    </a:solidFill>
-                  </a:rPr>
-                  <a:t> </a:t>
-                </a:r>
-                <a:r>
-                  <a:rPr lang="en-US" altLang="zh-CN" sz="1400" dirty="0">
-                    <a:solidFill>
-                      <a:schemeClr val="tx1"/>
-                    </a:solidFill>
-                  </a:rPr>
-                  <a:t>ID</a:t>
-                </a:r>
-              </a:p>
-              <a:p>
-                <a:r>
-                  <a:rPr lang="en-US" sz="1400" dirty="0" err="1">
-                    <a:solidFill>
-                      <a:schemeClr val="tx1"/>
-                    </a:solidFill>
-                  </a:rPr>
-                  <a:t>cr</a:t>
-                </a:r>
-                <a:r>
-                  <a:rPr lang="en-US" altLang="zh-CN" sz="1400" dirty="0" err="1">
-                    <a:solidFill>
-                      <a:schemeClr val="tx1"/>
-                    </a:solidFill>
-                  </a:rPr>
-                  <a:t>eateTime</a:t>
-                </a:r>
-                <a:r>
-                  <a:rPr lang="en-US" altLang="zh-CN" sz="1400" dirty="0">
-                    <a:solidFill>
-                      <a:schemeClr val="tx1"/>
-                    </a:solidFill>
-                  </a:rPr>
-                  <a:t>:</a:t>
-                </a:r>
-                <a:r>
-                  <a:rPr lang="zh-CN" altLang="en-US" sz="1400" dirty="0">
-                    <a:solidFill>
-                      <a:schemeClr val="tx1"/>
-                    </a:solidFill>
-                  </a:rPr>
-                  <a:t> </a:t>
-                </a:r>
-                <a:r>
-                  <a:rPr lang="en-US" altLang="zh-CN" sz="1400" dirty="0" err="1">
-                    <a:solidFill>
-                      <a:schemeClr val="tx1"/>
-                    </a:solidFill>
-                  </a:rPr>
-                  <a:t>DateTime</a:t>
-                </a:r>
-                <a:endParaRPr lang="en-US" altLang="zh-CN" sz="1400" dirty="0">
-                  <a:solidFill>
-                    <a:schemeClr val="tx1"/>
-                  </a:solidFill>
-                </a:endParaRPr>
-              </a:p>
-              <a:p>
-                <a:r>
-                  <a:rPr lang="en-US" altLang="zh-CN" sz="1400" dirty="0" err="1">
-                    <a:solidFill>
-                      <a:schemeClr val="tx1"/>
-                    </a:solidFill>
-                  </a:rPr>
-                  <a:t>isBlocked</a:t>
-                </a:r>
-                <a:r>
-                  <a:rPr lang="en-US" altLang="zh-CN" sz="1400" dirty="0">
-                    <a:solidFill>
-                      <a:schemeClr val="tx1"/>
-                    </a:solidFill>
-                  </a:rPr>
-                  <a:t>:</a:t>
-                </a:r>
-                <a:r>
-                  <a:rPr lang="zh-CN" altLang="en-US" sz="1400" dirty="0">
-                    <a:solidFill>
-                      <a:schemeClr val="tx1"/>
-                    </a:solidFill>
-                  </a:rPr>
-                  <a:t> </a:t>
-                </a:r>
-                <a:r>
-                  <a:rPr lang="en-US" altLang="zh-CN" sz="1400" dirty="0">
-                    <a:solidFill>
-                      <a:schemeClr val="tx1"/>
-                    </a:solidFill>
-                  </a:rPr>
-                  <a:t>Boolean</a:t>
-                </a:r>
-              </a:p>
-              <a:p>
-                <a:r>
-                  <a:rPr lang="en-US" altLang="zh-CN" sz="1400" dirty="0">
-                    <a:solidFill>
-                      <a:schemeClr val="tx1"/>
-                    </a:solidFill>
-                  </a:rPr>
-                  <a:t>t</a:t>
-                </a:r>
-                <a:r>
-                  <a:rPr lang="en-US" sz="1400" dirty="0">
-                    <a:solidFill>
-                      <a:schemeClr val="tx1"/>
-                    </a:solidFill>
-                  </a:rPr>
-                  <a:t>ype</a:t>
-                </a:r>
-                <a:r>
-                  <a:rPr lang="en-US" altLang="zh-CN" sz="1400" dirty="0">
-                    <a:solidFill>
-                      <a:schemeClr val="tx1"/>
-                    </a:solidFill>
-                  </a:rPr>
-                  <a:t>:</a:t>
-                </a:r>
-                <a:r>
-                  <a:rPr lang="zh-CN" altLang="en-US" sz="1400" dirty="0">
-                    <a:solidFill>
-                      <a:schemeClr val="tx1"/>
-                    </a:solidFill>
-                  </a:rPr>
-                  <a:t> </a:t>
-                </a:r>
-                <a:r>
-                  <a:rPr lang="en-US" altLang="zh-CN" sz="1400" dirty="0">
-                    <a:solidFill>
-                      <a:schemeClr val="tx1"/>
-                    </a:solidFill>
-                  </a:rPr>
-                  <a:t>String</a:t>
-                </a:r>
-                <a:endParaRPr lang="en-CN" sz="1400" dirty="0">
-                  <a:solidFill>
-                    <a:schemeClr val="tx1"/>
-                  </a:solidFill>
-                </a:endParaRPr>
-              </a:p>
-            </p:txBody>
-          </p:sp>
-          <p:sp>
-            <p:nvSpPr>
-              <p:cNvPr id="16" name="Rectangle 15">
-                <a:extLst>
-                  <a:ext uri="{FF2B5EF4-FFF2-40B4-BE49-F238E27FC236}">
-                    <a16:creationId xmlns:a16="http://schemas.microsoft.com/office/drawing/2014/main" id="{E7BA5DA0-5EF3-9D45-88BA-BC5BA7F3F9AB}"/>
-                  </a:ext>
-                </a:extLst>
-              </p:cNvPr>
-              <p:cNvSpPr/>
-              <p:nvPr/>
-            </p:nvSpPr>
-            <p:spPr>
-              <a:xfrm>
-                <a:off x="2789712" y="3039762"/>
-                <a:ext cx="1992353" cy="387178"/>
-              </a:xfrm>
-              <a:prstGeom prst="rect">
-                <a:avLst/>
-              </a:prstGeom>
-              <a:solidFill>
-                <a:schemeClr val="accent1">
-                  <a:lumMod val="60000"/>
-                  <a:lumOff val="40000"/>
-                </a:schemeClr>
-              </a:solidFill>
-              <a:ln w="22225">
-                <a:solidFill>
-                  <a:schemeClr val="tx1"/>
-                </a:solidFill>
-              </a:ln>
-            </p:spPr>
-            <p:style>
-              <a:lnRef idx="2">
-                <a:schemeClr val="accent1">
-                  <a:shade val="50000"/>
-                </a:schemeClr>
-              </a:lnRef>
-              <a:fillRef idx="1">
-                <a:schemeClr val="accent1"/>
-              </a:fillRef>
-              <a:effectRef idx="0">
-                <a:schemeClr val="accent1"/>
-              </a:effectRef>
-              <a:fontRef idx="minor">
-                <a:schemeClr val="lt1"/>
-              </a:fontRef>
-            </p:style>
-            <p:txBody>
-              <a:bodyPr rtlCol="0" anchor="ctr"/>
-              <a:lstStyle/>
-              <a:p>
-                <a:pPr algn="ctr"/>
-                <a:r>
-                  <a:rPr lang="en-US" altLang="zh-CN" b="1" dirty="0">
-                    <a:solidFill>
-                      <a:schemeClr val="tx1"/>
-                    </a:solidFill>
-                  </a:rPr>
-                  <a:t>Account</a:t>
-                </a:r>
-                <a:endParaRPr lang="en-CN" b="1" dirty="0">
-                  <a:solidFill>
-                    <a:schemeClr val="tx1"/>
-                  </a:solidFill>
-                </a:endParaRPr>
-              </a:p>
-            </p:txBody>
-          </p:sp>
-        </p:grpSp>
-        <p:grpSp>
-          <p:nvGrpSpPr>
-            <p:cNvPr id="20" name="Group 19">
-              <a:extLst>
-                <a:ext uri="{FF2B5EF4-FFF2-40B4-BE49-F238E27FC236}">
-                  <a16:creationId xmlns:a16="http://schemas.microsoft.com/office/drawing/2014/main" id="{534721F6-4CCA-B845-98BD-A2446B6BCB2F}"/>
-                </a:ext>
-              </a:extLst>
-            </p:cNvPr>
-            <p:cNvGrpSpPr/>
-            <p:nvPr/>
-          </p:nvGrpSpPr>
-          <p:grpSpPr>
-            <a:xfrm>
-              <a:off x="8543646" y="2242238"/>
-              <a:ext cx="1992353" cy="1186761"/>
-              <a:chOff x="2789712" y="3039762"/>
-              <a:chExt cx="1992353" cy="1186761"/>
-            </a:xfrm>
-          </p:grpSpPr>
-          <p:sp>
-            <p:nvSpPr>
-              <p:cNvPr id="21" name="Rectangle 20">
-                <a:extLst>
-                  <a:ext uri="{FF2B5EF4-FFF2-40B4-BE49-F238E27FC236}">
-                    <a16:creationId xmlns:a16="http://schemas.microsoft.com/office/drawing/2014/main" id="{952B3EB0-AC2E-194C-BAD9-80998F2EEF5B}"/>
-                  </a:ext>
-                </a:extLst>
-              </p:cNvPr>
-              <p:cNvSpPr/>
-              <p:nvPr/>
-            </p:nvSpPr>
-            <p:spPr>
-              <a:xfrm>
-                <a:off x="2789712" y="3429000"/>
-                <a:ext cx="1992353" cy="797523"/>
-              </a:xfrm>
-              <a:prstGeom prst="rect">
-                <a:avLst/>
-              </a:prstGeom>
-              <a:noFill/>
-              <a:ln w="22225">
-                <a:solidFill>
-                  <a:schemeClr val="tx1"/>
-                </a:solidFill>
-              </a:ln>
-            </p:spPr>
-            <p:style>
-              <a:lnRef idx="2">
-                <a:schemeClr val="accent1">
-                  <a:shade val="50000"/>
-                </a:schemeClr>
-              </a:lnRef>
-              <a:fillRef idx="1">
-                <a:schemeClr val="accent1"/>
-              </a:fillRef>
-              <a:effectRef idx="0">
-                <a:schemeClr val="accent1"/>
-              </a:effectRef>
-              <a:fontRef idx="minor">
-                <a:schemeClr val="lt1"/>
-              </a:fontRef>
-            </p:style>
-            <p:txBody>
-              <a:bodyPr rtlCol="0" anchor="ctr"/>
-              <a:lstStyle/>
-              <a:p>
-                <a:r>
-                  <a:rPr lang="en-US" altLang="zh-CN" sz="1400" dirty="0">
-                    <a:solidFill>
-                      <a:schemeClr val="tx1"/>
-                    </a:solidFill>
-                  </a:rPr>
-                  <a:t>id:</a:t>
-                </a:r>
-                <a:r>
-                  <a:rPr lang="zh-CN" altLang="en-US" sz="1400" dirty="0">
-                    <a:solidFill>
-                      <a:schemeClr val="tx1"/>
-                    </a:solidFill>
-                  </a:rPr>
-                  <a:t> </a:t>
-                </a:r>
-                <a:r>
-                  <a:rPr lang="en-US" altLang="zh-CN" sz="1400" dirty="0">
-                    <a:solidFill>
-                      <a:schemeClr val="tx1"/>
-                    </a:solidFill>
-                  </a:rPr>
-                  <a:t>ID</a:t>
-                </a:r>
-              </a:p>
-              <a:p>
-                <a:r>
-                  <a:rPr lang="en-US" altLang="zh-CN" sz="1400" dirty="0">
-                    <a:solidFill>
-                      <a:schemeClr val="tx1"/>
-                    </a:solidFill>
-                  </a:rPr>
-                  <a:t>name:</a:t>
-                </a:r>
-                <a:r>
-                  <a:rPr lang="zh-CN" altLang="en-US" sz="1400" dirty="0">
-                    <a:solidFill>
-                      <a:schemeClr val="tx1"/>
-                    </a:solidFill>
-                  </a:rPr>
-                  <a:t> </a:t>
-                </a:r>
-                <a:r>
-                  <a:rPr lang="en-US" altLang="zh-CN" sz="1400" dirty="0">
+                  <a:rPr lang="en-US" altLang="zh-CN" sz="1200" dirty="0">
                     <a:solidFill>
                       <a:schemeClr val="tx1"/>
                     </a:solidFill>
@@ -3312,7 +3250,7 @@
               </a:p>
               <a:p>
                 <a:r>
-                  <a:rPr lang="en-US" altLang="zh-CN" sz="1400" dirty="0" err="1">
+                  <a:rPr lang="en-US" altLang="zh-CN" sz="1200" dirty="0" err="1">
                     <a:solidFill>
                       <a:schemeClr val="tx1"/>
                     </a:solidFill>
@@ -3320,7 +3258,7 @@
                   <a:t>isBlocked</a:t>
                 </a:r>
                 <a:r>
-                  <a:rPr lang="en-US" altLang="zh-CN" sz="1400" dirty="0">
+                  <a:rPr lang="en-US" altLang="zh-CN" sz="1200" dirty="0">
                     <a:solidFill>
                       <a:schemeClr val="tx1"/>
                     </a:solidFill>
@@ -3328,7 +3266,7 @@
                   <a:t>:</a:t>
                 </a:r>
                 <a:r>
-                  <a:rPr lang="zh-CN" altLang="en-US" sz="1400" dirty="0">
+                  <a:rPr lang="zh-CN" altLang="en-US" sz="1200" dirty="0">
                     <a:solidFill>
                       <a:schemeClr val="tx1"/>
                     </a:solidFill>
@@ -3336,14 +3274,14 @@
                   <a:t> </a:t>
                 </a:r>
                 <a:r>
-                  <a:rPr lang="en-US" altLang="zh-CN" sz="1400" dirty="0">
+                  <a:rPr lang="en-US" altLang="zh-CN" sz="1200" dirty="0">
                     <a:solidFill>
                       <a:schemeClr val="tx1"/>
                     </a:solidFill>
                   </a:rPr>
                   <a:t>Boolean</a:t>
                 </a:r>
-                <a:endParaRPr lang="en-CN" sz="1400" dirty="0">
+                <a:endParaRPr lang="en-CN" sz="1200" dirty="0">
                   <a:solidFill>
                     <a:schemeClr val="tx1"/>
                   </a:solidFill>
@@ -3365,7 +3303,7 @@
             </p:nvSpPr>
             <p:spPr>
               <a:xfrm>
-                <a:off x="2789712" y="3039762"/>
+                <a:off x="8543646" y="2231373"/>
                 <a:ext cx="1992353" cy="387178"/>
               </a:xfrm>
               <a:prstGeom prst="rect">
@@ -3431,19 +3369,20 @@
               </a:extLst>
             </p:cNvPr>
             <p:cNvCxnSpPr>
+              <a:cxnSpLocks/>
               <a:stCxn id="10" idx="3"/>
-              <a:endCxn id="16" idx="1"/>
+              <a:endCxn id="15" idx="1"/>
             </p:cNvCxnSpPr>
             <p:nvPr/>
           </p:nvCxnSpPr>
           <p:spPr>
             <a:xfrm>
               <a:off x="3986477" y="1615706"/>
-              <a:ext cx="1243159" cy="819012"/>
+              <a:ext cx="1014559" cy="1440351"/>
             </a:xfrm>
             <a:prstGeom prst="bentConnector3">
               <a:avLst>
-                <a:gd name="adj1" fmla="val 50000"/>
+                <a:gd name="adj1" fmla="val 47296"/>
               </a:avLst>
             </a:prstGeom>
             <a:ln w="19050" cmpd="sng">
@@ -3482,17 +3421,18 @@
             <p:cNvCxnSpPr>
               <a:cxnSpLocks/>
               <a:stCxn id="13" idx="3"/>
+              <a:endCxn id="100" idx="6"/>
             </p:cNvCxnSpPr>
             <p:nvPr/>
           </p:nvCxnSpPr>
           <p:spPr>
             <a:xfrm flipV="1">
-              <a:off x="3986477" y="2800838"/>
-              <a:ext cx="1246214" cy="984543"/>
+              <a:off x="3986477" y="3249000"/>
+              <a:ext cx="1022923" cy="536381"/>
             </a:xfrm>
             <a:prstGeom prst="bentConnector3">
               <a:avLst>
-                <a:gd name="adj1" fmla="val 50000"/>
+                <a:gd name="adj1" fmla="val 46366"/>
               </a:avLst>
             </a:prstGeom>
             <a:ln w="19050">
@@ -3529,12 +3469,14 @@
             </p:cNvPr>
             <p:cNvCxnSpPr>
               <a:cxnSpLocks/>
+              <a:stCxn id="9" idx="2"/>
+              <a:endCxn id="13" idx="0"/>
             </p:cNvCxnSpPr>
             <p:nvPr/>
           </p:nvCxnSpPr>
           <p:spPr>
             <a:xfrm>
-              <a:off x="2810186" y="2273036"/>
+              <a:off x="2990301" y="2273036"/>
               <a:ext cx="0" cy="1318756"/>
             </a:xfrm>
             <a:prstGeom prst="straightConnector1">
@@ -3574,15 +3516,15 @@
             </p:cNvPr>
             <p:cNvCxnSpPr>
               <a:cxnSpLocks/>
-              <a:stCxn id="22" idx="1"/>
-              <a:endCxn id="16" idx="3"/>
+              <a:stCxn id="21" idx="1"/>
+              <a:endCxn id="15" idx="3"/>
             </p:cNvCxnSpPr>
             <p:nvPr/>
           </p:nvCxnSpPr>
           <p:spPr>
-            <a:xfrm rot="10800000">
-              <a:off x="7221990" y="2434719"/>
-              <a:ext cx="1321657" cy="1109"/>
+            <a:xfrm rot="10800000" flipV="1">
+              <a:off x="7011574" y="3055027"/>
+              <a:ext cx="1080838" cy="1030"/>
             </a:xfrm>
             <a:prstGeom prst="bentConnector3">
               <a:avLst/>
@@ -3591,7 +3533,7 @@
               <a:solidFill>
                 <a:schemeClr val="tx1"/>
               </a:solidFill>
-              <a:prstDash val="dash"/>
+              <a:prstDash val="lgDash"/>
               <a:tailEnd type="triangle"/>
             </a:ln>
             <a:effectLst/>
@@ -3625,8 +3567,8 @@
           </p:nvSpPr>
           <p:spPr>
             <a:xfrm>
-              <a:off x="4115781" y="1301842"/>
-              <a:ext cx="501356" cy="307777"/>
+              <a:off x="4001179" y="1301842"/>
+              <a:ext cx="465192" cy="276999"/>
             </a:xfrm>
             <a:prstGeom prst="rect">
               <a:avLst/>
@@ -3640,10 +3582,10 @@
             <a:lstStyle/>
             <a:p>
               <a:r>
-                <a:rPr lang="en-US" altLang="zh-CN" sz="1400" dirty="0"/>
+                <a:rPr lang="en-US" altLang="zh-CN" sz="1200" dirty="0"/>
                 <a:t>own</a:t>
               </a:r>
-              <a:endParaRPr lang="en-CN" sz="1600" dirty="0"/>
+              <a:endParaRPr lang="en-CN" sz="1400" dirty="0"/>
             </a:p>
           </p:txBody>
         </p:sp>
@@ -3661,8 +3603,8 @@
           </p:nvSpPr>
           <p:spPr>
             <a:xfrm>
-              <a:off x="7674753" y="2085181"/>
-              <a:ext cx="644728" cy="307777"/>
+              <a:off x="7263292" y="3055026"/>
+              <a:ext cx="577402" cy="276999"/>
             </a:xfrm>
             <a:prstGeom prst="rect">
               <a:avLst/>
@@ -3676,10 +3618,10 @@
             <a:lstStyle/>
             <a:p>
               <a:r>
-                <a:rPr lang="en-US" altLang="zh-CN" sz="1400" dirty="0" err="1"/>
+                <a:rPr lang="en-US" altLang="zh-CN" sz="1200" dirty="0" err="1"/>
                 <a:t>signIn</a:t>
               </a:r>
-              <a:endParaRPr lang="en-CN" sz="1400" dirty="0"/>
+              <a:endParaRPr lang="en-CN" sz="1200" dirty="0"/>
             </a:p>
           </p:txBody>
         </p:sp>
@@ -3697,10 +3639,10 @@
           </p:nvGrpSpPr>
           <p:grpSpPr>
             <a:xfrm>
-              <a:off x="5229585" y="4287884"/>
-              <a:ext cx="1992353" cy="1168701"/>
+              <a:off x="5000985" y="4287884"/>
+              <a:ext cx="2010595" cy="1077417"/>
               <a:chOff x="2789712" y="3039762"/>
-              <a:chExt cx="1992353" cy="1168701"/>
+              <a:chExt cx="2010595" cy="1077417"/>
             </a:xfrm>
           </p:grpSpPr>
           <p:sp>
@@ -3718,7 +3660,7 @@
             <p:spPr>
               <a:xfrm>
                 <a:off x="2789712" y="3429001"/>
-                <a:ext cx="1992353" cy="779462"/>
+                <a:ext cx="2010594" cy="688178"/>
               </a:xfrm>
               <a:prstGeom prst="rect">
                 <a:avLst/>
@@ -3751,7 +3693,7 @@
               <a:lstStyle/>
               <a:p>
                 <a:r>
-                  <a:rPr lang="en-US" altLang="zh-CN" sz="1400" dirty="0">
+                  <a:rPr lang="en-US" altLang="zh-CN" sz="1200" dirty="0">
                     <a:solidFill>
                       <a:schemeClr val="tx1"/>
                     </a:solidFill>
@@ -3759,7 +3701,7 @@
                   <a:t>id:</a:t>
                 </a:r>
                 <a:r>
-                  <a:rPr lang="zh-CN" altLang="en-US" sz="1400" dirty="0">
+                  <a:rPr lang="zh-CN" altLang="en-US" sz="1200" dirty="0">
                     <a:solidFill>
                       <a:schemeClr val="tx1"/>
                     </a:solidFill>
@@ -3767,7 +3709,7 @@
                   <a:t> </a:t>
                 </a:r>
                 <a:r>
-                  <a:rPr lang="en-US" altLang="zh-CN" sz="1400" dirty="0">
+                  <a:rPr lang="en-US" altLang="zh-CN" sz="1200" dirty="0">
                     <a:solidFill>
                       <a:schemeClr val="tx1"/>
                     </a:solidFill>
@@ -3777,7 +3719,7 @@
               </a:p>
               <a:p>
                 <a:r>
-                  <a:rPr lang="en-US" altLang="zh-CN" sz="1400" dirty="0" err="1">
+                  <a:rPr lang="en-US" altLang="zh-CN" sz="1200" dirty="0" err="1">
                     <a:solidFill>
                       <a:schemeClr val="tx1"/>
                     </a:solidFill>
@@ -3785,7 +3727,7 @@
                   <a:t>loanAmount</a:t>
                 </a:r>
                 <a:r>
-                  <a:rPr lang="en-US" altLang="zh-CN" sz="1400" dirty="0">
+                  <a:rPr lang="en-US" altLang="zh-CN" sz="1200" dirty="0">
                     <a:solidFill>
                       <a:schemeClr val="tx1"/>
                     </a:solidFill>
@@ -3793,7 +3735,7 @@
                   <a:t>:</a:t>
                 </a:r>
                 <a:r>
-                  <a:rPr lang="zh-CN" altLang="en-US" sz="1400" dirty="0">
+                  <a:rPr lang="zh-CN" altLang="en-US" sz="1200" dirty="0">
                     <a:solidFill>
                       <a:schemeClr val="tx1"/>
                     </a:solidFill>
@@ -3801,24 +3743,64 @@
                   <a:t> </a:t>
                 </a:r>
                 <a:r>
-                  <a:rPr lang="en-US" altLang="zh-CN" sz="1400" dirty="0">
+                  <a:rPr lang="en-US" altLang="zh-CN" sz="1200" dirty="0">
                     <a:solidFill>
                       <a:schemeClr val="tx1"/>
                     </a:solidFill>
                   </a:rPr>
-                  <a:t>Long</a:t>
+                  <a:t>64-bit</a:t>
+                </a:r>
+                <a:r>
+                  <a:rPr lang="zh-CN" altLang="en-US" sz="1200" dirty="0">
+                    <a:solidFill>
+                      <a:schemeClr val="tx1"/>
+                    </a:solidFill>
+                  </a:rPr>
+                  <a:t> </a:t>
+                </a:r>
+                <a:r>
+                  <a:rPr lang="en-US" altLang="zh-CN" sz="1200" dirty="0">
+                    <a:solidFill>
+                      <a:schemeClr val="tx1"/>
+                    </a:solidFill>
+                  </a:rPr>
+                  <a:t>Integer</a:t>
                 </a:r>
               </a:p>
               <a:p>
                 <a:r>
-                  <a:rPr lang="en-US" sz="1400" dirty="0">
+                  <a:rPr lang="en-US" sz="1200" dirty="0">
                     <a:solidFill>
                       <a:schemeClr val="tx1"/>
                     </a:solidFill>
                   </a:rPr>
-                  <a:t>balance: Long</a:t>
+                  <a:t>balance: </a:t>
                 </a:r>
-                <a:endParaRPr lang="en-CN" sz="1400" dirty="0">
+                <a:r>
+                  <a:rPr lang="en-US" altLang="zh-CN" sz="1200" dirty="0">
+                    <a:solidFill>
+                      <a:schemeClr val="tx1"/>
+                    </a:solidFill>
+                  </a:rPr>
+                  <a:t>64-bit</a:t>
+                </a:r>
+                <a:r>
+                  <a:rPr lang="zh-CN" altLang="en-US" sz="1200" dirty="0">
+                    <a:solidFill>
+                      <a:schemeClr val="tx1"/>
+                    </a:solidFill>
+                  </a:rPr>
+                  <a:t> </a:t>
+                </a:r>
+                <a:r>
+                  <a:rPr lang="en-US" altLang="zh-CN" sz="1200" dirty="0">
+                    <a:solidFill>
+                      <a:schemeClr val="tx1"/>
+                    </a:solidFill>
+                  </a:rPr>
+                  <a:t>Integer</a:t>
+                </a:r>
+                <a:endParaRPr lang="en-CN" sz="1200" dirty="0">
                   <a:solidFill>
                     <a:schemeClr val="tx1"/>
                   </a:solidFill>
@@ -3840,14 +3822,14 @@
             </p:nvSpPr>
             <p:spPr>
               <a:xfrm>
-                <a:off x="2789712" y="3039762"/>
-                <a:ext cx="1992353" cy="387178"/>
+                <a:off x="2789713" y="3039762"/>
+                <a:ext cx="2010594" cy="387178"/>
               </a:xfrm>
               <a:prstGeom prst="rect">
                 <a:avLst/>
               </a:prstGeom>
               <a:solidFill>
-                <a:schemeClr val="accent1">
+                <a:schemeClr val="accent2">
                   <a:lumMod val="60000"/>
                   <a:lumOff val="40000"/>
                 </a:schemeClr>
@@ -3908,19 +3890,18 @@
             <p:cNvCxnSpPr>
               <a:cxnSpLocks/>
               <a:stCxn id="10" idx="1"/>
-              <a:endCxn id="40" idx="2"/>
+              <a:endCxn id="112" idx="2"/>
             </p:cNvCxnSpPr>
             <p:nvPr/>
           </p:nvCxnSpPr>
           <p:spPr>
             <a:xfrm rot="10800000" flipH="1" flipV="1">
-              <a:off x="1994124" y="1615705"/>
-              <a:ext cx="4231638" cy="3840879"/>
+              <a:off x="1994124" y="1615706"/>
+              <a:ext cx="2994228" cy="3605350"/>
             </a:xfrm>
-            <a:prstGeom prst="bentConnector4">
+            <a:prstGeom prst="bentConnector3">
               <a:avLst>
-                <a:gd name="adj1" fmla="val -25367"/>
-                <a:gd name="adj2" fmla="val 103105"/>
+                <a:gd name="adj1" fmla="val -26569"/>
               </a:avLst>
             </a:prstGeom>
             <a:ln w="19050" cmpd="sng">
@@ -3958,17 +3939,18 @@
             <p:cNvCxnSpPr>
               <a:cxnSpLocks/>
               <a:stCxn id="13" idx="1"/>
+              <a:endCxn id="40" idx="1"/>
             </p:cNvCxnSpPr>
             <p:nvPr/>
           </p:nvCxnSpPr>
           <p:spPr>
             <a:xfrm rot="10800000" flipH="1" flipV="1">
-              <a:off x="1994123" y="3785381"/>
-              <a:ext cx="3192867" cy="1579920"/>
+              <a:off x="1994123" y="3785380"/>
+              <a:ext cx="3006861" cy="1235831"/>
             </a:xfrm>
             <a:prstGeom prst="bentConnector3">
               <a:avLst>
-                <a:gd name="adj1" fmla="val -14008"/>
+                <a:gd name="adj1" fmla="val -18855"/>
               </a:avLst>
             </a:prstGeom>
             <a:ln w="19050">
@@ -4008,8 +3990,8 @@
           </p:nvSpPr>
           <p:spPr>
             <a:xfrm>
-              <a:off x="908818" y="3148689"/>
-              <a:ext cx="603050" cy="307777"/>
+              <a:off x="1283295" y="1341811"/>
+              <a:ext cx="543739" cy="276999"/>
             </a:xfrm>
             <a:prstGeom prst="rect">
               <a:avLst/>
@@ -4023,10 +4005,10 @@
             <a:lstStyle/>
             <a:p>
               <a:r>
-                <a:rPr lang="en-US" altLang="zh-CN" sz="1400" dirty="0"/>
+                <a:rPr lang="en-US" altLang="zh-CN" sz="1200" dirty="0"/>
                 <a:t>apply</a:t>
               </a:r>
-              <a:endParaRPr lang="en-CN" sz="1600" dirty="0"/>
+              <a:endParaRPr lang="en-CN" sz="1400" dirty="0"/>
             </a:p>
           </p:txBody>
         </p:sp>
@@ -4044,8 +4026,8 @@
           </p:nvSpPr>
           <p:spPr>
             <a:xfrm>
-              <a:off x="1569290" y="5018662"/>
-              <a:ext cx="603050" cy="307777"/>
+              <a:off x="1388169" y="3497225"/>
+              <a:ext cx="543739" cy="276999"/>
             </a:xfrm>
             <a:prstGeom prst="rect">
               <a:avLst/>
@@ -4059,10 +4041,10 @@
             <a:lstStyle/>
             <a:p>
               <a:r>
-                <a:rPr lang="en-US" altLang="zh-CN" sz="1400" dirty="0"/>
+                <a:rPr lang="en-US" altLang="zh-CN" sz="1200" dirty="0"/>
                 <a:t>apply</a:t>
               </a:r>
-              <a:endParaRPr lang="en-CN" sz="1600" dirty="0"/>
+              <a:endParaRPr lang="en-CN" sz="1400" dirty="0"/>
             </a:p>
           </p:txBody>
         </p:sp>
@@ -4082,8 +4064,8 @@
           </p:nvCxnSpPr>
           <p:spPr>
             <a:xfrm flipV="1">
-              <a:off x="6485349" y="3609590"/>
-              <a:ext cx="0" cy="678294"/>
+              <a:off x="6235241" y="3481746"/>
+              <a:ext cx="0" cy="824620"/>
             </a:xfrm>
             <a:prstGeom prst="straightConnector1">
               <a:avLst/>
@@ -4126,8 +4108,8 @@
           </p:nvSpPr>
           <p:spPr>
             <a:xfrm>
-              <a:off x="6485349" y="3902224"/>
-              <a:ext cx="756938" cy="307777"/>
+              <a:off x="6234638" y="3724775"/>
+              <a:ext cx="673582" cy="276999"/>
             </a:xfrm>
             <a:prstGeom prst="rect">
               <a:avLst/>
@@ -4141,10 +4123,10 @@
             <a:lstStyle/>
             <a:p>
               <a:r>
-                <a:rPr lang="en-US" altLang="zh-CN" sz="1400" dirty="0"/>
+                <a:rPr lang="en-US" altLang="zh-CN" sz="1200" dirty="0"/>
                 <a:t>deposit</a:t>
               </a:r>
-              <a:endParaRPr lang="en-CN" sz="1600" dirty="0"/>
+              <a:endParaRPr lang="en-CN" sz="1400" dirty="0"/>
             </a:p>
           </p:txBody>
         </p:sp>
@@ -4162,8 +4144,8 @@
           </p:nvSpPr>
           <p:spPr>
             <a:xfrm>
-              <a:off x="2191275" y="2718052"/>
-              <a:ext cx="631904" cy="307777"/>
+              <a:off x="2429494" y="2741092"/>
+              <a:ext cx="566181" cy="276999"/>
             </a:xfrm>
             <a:prstGeom prst="rect">
               <a:avLst/>
@@ -4177,7 +4159,7 @@
             <a:lstStyle/>
             <a:p>
               <a:r>
-                <a:rPr lang="en-US" altLang="zh-CN" sz="1400" dirty="0"/>
+                <a:rPr lang="en-US" altLang="zh-CN" sz="1200" dirty="0"/>
                 <a:t>invest</a:t>
               </a:r>
             </a:p>
@@ -4199,8 +4181,8 @@
           </p:nvCxnSpPr>
           <p:spPr>
             <a:xfrm>
-              <a:off x="5882073" y="3655239"/>
-              <a:ext cx="0" cy="632645"/>
+              <a:off x="5763201" y="3521690"/>
+              <a:ext cx="0" cy="766194"/>
             </a:xfrm>
             <a:prstGeom prst="straightConnector1">
               <a:avLst/>
@@ -4243,8 +4225,8 @@
           </p:nvSpPr>
           <p:spPr>
             <a:xfrm>
-              <a:off x="5187043" y="3902224"/>
-              <a:ext cx="614271" cy="307777"/>
+              <a:off x="5205331" y="3724775"/>
+              <a:ext cx="553357" cy="276999"/>
             </a:xfrm>
             <a:prstGeom prst="rect">
               <a:avLst/>
@@ -4258,10 +4240,10 @@
             <a:lstStyle/>
             <a:p>
               <a:r>
-                <a:rPr lang="en-US" altLang="zh-CN" sz="1400" dirty="0"/>
+                <a:rPr lang="en-US" altLang="zh-CN" sz="1200" dirty="0"/>
                 <a:t>repay</a:t>
               </a:r>
-              <a:endParaRPr lang="en-CN" sz="1600" dirty="0"/>
+              <a:endParaRPr lang="en-CN" sz="1400" dirty="0"/>
             </a:p>
           </p:txBody>
         </p:sp>
@@ -4276,27 +4258,27 @@
             </p:cNvPr>
             <p:cNvCxnSpPr>
               <a:cxnSpLocks/>
-              <a:stCxn id="16" idx="0"/>
-              <a:endCxn id="15" idx="1"/>
+              <a:stCxn id="124" idx="0"/>
+              <a:endCxn id="105" idx="2"/>
             </p:cNvCxnSpPr>
             <p:nvPr/>
           </p:nvCxnSpPr>
           <p:spPr>
             <a:xfrm rot="16200000" flipH="1" flipV="1">
-              <a:off x="5288300" y="2182465"/>
-              <a:ext cx="878850" cy="996177"/>
+              <a:off x="5088274" y="2140996"/>
+              <a:ext cx="602697" cy="784253"/>
             </a:xfrm>
             <a:prstGeom prst="bentConnector4">
               <a:avLst>
-                <a:gd name="adj1" fmla="val -26011"/>
-                <a:gd name="adj2" fmla="val 122948"/>
+                <a:gd name="adj1" fmla="val -37930"/>
+                <a:gd name="adj2" fmla="val 129149"/>
               </a:avLst>
             </a:prstGeom>
             <a:ln w="19050">
               <a:solidFill>
                 <a:schemeClr val="tx1"/>
               </a:solidFill>
-              <a:prstDash val="sysDash"/>
+              <a:prstDash val="lgDash"/>
               <a:tailEnd type="triangle"/>
             </a:ln>
             <a:effectLst/>
@@ -4330,8 +4312,8 @@
           </p:nvSpPr>
           <p:spPr>
             <a:xfrm>
-              <a:off x="5134678" y="1701083"/>
-              <a:ext cx="772969" cy="307777"/>
+              <a:off x="4906078" y="1701083"/>
+              <a:ext cx="688009" cy="276999"/>
             </a:xfrm>
             <a:prstGeom prst="rect">
               <a:avLst/>
@@ -4345,7 +4327,7 @@
             <a:lstStyle/>
             <a:p>
               <a:r>
-                <a:rPr lang="en-US" altLang="zh-CN" sz="1400" dirty="0"/>
+                <a:rPr lang="en-US" altLang="zh-CN" sz="1200" dirty="0"/>
                 <a:t>transfer</a:t>
               </a:r>
             </a:p>
@@ -4362,20 +4344,20 @@
             </p:cNvPr>
             <p:cNvCxnSpPr>
               <a:cxnSpLocks/>
-              <a:stCxn id="12" idx="2"/>
+              <a:stCxn id="88" idx="4"/>
               <a:endCxn id="12" idx="3"/>
             </p:cNvCxnSpPr>
             <p:nvPr/>
           </p:nvCxnSpPr>
           <p:spPr>
             <a:xfrm rot="5400000" flipH="1" flipV="1">
-              <a:off x="3362789" y="3859742"/>
-              <a:ext cx="251199" cy="996176"/>
+              <a:off x="3592521" y="4100996"/>
+              <a:ext cx="262722" cy="525189"/>
             </a:xfrm>
             <a:prstGeom prst="bentConnector4">
               <a:avLst>
-                <a:gd name="adj1" fmla="val -178052"/>
-                <a:gd name="adj2" fmla="val 122948"/>
+                <a:gd name="adj1" fmla="val -87012"/>
+                <a:gd name="adj2" fmla="val 143527"/>
               </a:avLst>
             </a:prstGeom>
             <a:ln w="19050">
@@ -4415,8 +4397,8 @@
           </p:nvSpPr>
           <p:spPr>
             <a:xfrm>
-              <a:off x="3310709" y="4580739"/>
-              <a:ext cx="631904" cy="307777"/>
+              <a:off x="3452288" y="4722279"/>
+              <a:ext cx="764322" cy="276999"/>
             </a:xfrm>
             <a:prstGeom prst="rect">
               <a:avLst/>
@@ -4424,13 +4406,14 @@
             <a:noFill/>
           </p:spPr>
           <p:txBody>
-            <a:bodyPr wrap="none" rtlCol="0">
+            <a:bodyPr wrap="square" rtlCol="0">
               <a:spAutoFit/>
             </a:bodyPr>
             <a:lstStyle/>
             <a:p>
+              <a:pPr algn="ctr"/>
               <a:r>
-                <a:rPr lang="en-US" altLang="zh-CN" sz="1400" dirty="0"/>
+                <a:rPr lang="en-US" altLang="zh-CN" sz="1200" dirty="0"/>
                 <a:t>invest</a:t>
               </a:r>
             </a:p>
@@ -4450,8 +4433,8 @@
           </p:nvSpPr>
           <p:spPr>
             <a:xfrm>
-              <a:off x="4110907" y="3456466"/>
-              <a:ext cx="511679" cy="307777"/>
+              <a:off x="4001179" y="3456466"/>
+              <a:ext cx="465192" cy="276999"/>
             </a:xfrm>
             <a:prstGeom prst="rect">
               <a:avLst/>
@@ -4465,7 +4448,7 @@
             <a:lstStyle/>
             <a:p>
               <a:r>
-                <a:rPr lang="en-US" altLang="zh-CN" sz="1400" dirty="0"/>
+                <a:rPr lang="en-US" altLang="zh-CN" sz="1200" dirty="0"/>
                 <a:t>own</a:t>
               </a:r>
             </a:p>
@@ -4482,26 +4465,27 @@
             </p:cNvPr>
             <p:cNvCxnSpPr>
               <a:cxnSpLocks/>
-              <a:endCxn id="15" idx="3"/>
+              <a:stCxn id="122" idx="1"/>
+              <a:endCxn id="119" idx="6"/>
             </p:cNvCxnSpPr>
             <p:nvPr/>
           </p:nvCxnSpPr>
           <p:spPr>
             <a:xfrm rot="16200000" flipH="1">
-              <a:off x="6414246" y="2312235"/>
-              <a:ext cx="878849" cy="736638"/>
+              <a:off x="6339125" y="2161000"/>
+              <a:ext cx="601387" cy="745556"/>
             </a:xfrm>
             <a:prstGeom prst="bentConnector4">
               <a:avLst>
-                <a:gd name="adj1" fmla="val -26725"/>
-                <a:gd name="adj2" fmla="val 149841"/>
+                <a:gd name="adj1" fmla="val -38450"/>
+                <a:gd name="adj2" fmla="val 130662"/>
               </a:avLst>
             </a:prstGeom>
             <a:ln w="19050">
               <a:solidFill>
                 <a:schemeClr val="tx1"/>
               </a:solidFill>
-              <a:prstDash val="sysDash"/>
+              <a:prstDash val="lgDash"/>
               <a:tailEnd type="triangle"/>
             </a:ln>
             <a:effectLst/>
@@ -4535,8 +4519,8 @@
           </p:nvSpPr>
           <p:spPr>
             <a:xfrm>
-              <a:off x="6564425" y="1701083"/>
-              <a:ext cx="885179" cy="307777"/>
+              <a:off x="6335825" y="1701083"/>
+              <a:ext cx="785793" cy="276999"/>
             </a:xfrm>
             <a:prstGeom prst="rect">
               <a:avLst/>
@@ -4550,10 +4534,10 @@
             <a:lstStyle/>
             <a:p>
               <a:r>
-                <a:rPr lang="en-US" altLang="zh-CN" sz="1400" dirty="0"/>
+                <a:rPr lang="en-US" altLang="zh-CN" sz="1200" dirty="0"/>
                 <a:t>withdraw</a:t>
               </a:r>
-              <a:endParaRPr lang="en-CN" sz="1600" dirty="0"/>
+              <a:endParaRPr lang="en-CN" sz="1400" dirty="0"/>
             </a:p>
           </p:txBody>
         </p:sp>
@@ -4568,20 +4552,20 @@
             </p:cNvPr>
             <p:cNvCxnSpPr>
               <a:cxnSpLocks/>
-              <a:stCxn id="9" idx="2"/>
+              <a:stCxn id="91" idx="4"/>
               <a:endCxn id="9" idx="3"/>
             </p:cNvCxnSpPr>
             <p:nvPr/>
           </p:nvCxnSpPr>
           <p:spPr>
             <a:xfrm rot="5400000" flipH="1" flipV="1">
-              <a:off x="3372969" y="1659528"/>
-              <a:ext cx="230840" cy="996176"/>
+              <a:off x="3601116" y="1902367"/>
+              <a:ext cx="245532" cy="525189"/>
             </a:xfrm>
             <a:prstGeom prst="bentConnector4">
               <a:avLst>
-                <a:gd name="adj1" fmla="val -99030"/>
-                <a:gd name="adj2" fmla="val 122948"/>
+                <a:gd name="adj1" fmla="val -93104"/>
+                <a:gd name="adj2" fmla="val 143527"/>
               </a:avLst>
             </a:prstGeom>
             <a:ln w="19050">
@@ -4621,8 +4605,8 @@
           </p:nvSpPr>
           <p:spPr>
             <a:xfrm>
-              <a:off x="3149973" y="2524463"/>
-              <a:ext cx="970137" cy="307777"/>
+              <a:off x="3360285" y="2524463"/>
+              <a:ext cx="856325" cy="276999"/>
             </a:xfrm>
             <a:prstGeom prst="rect">
               <a:avLst/>
@@ -4636,7 +4620,7 @@
             <a:lstStyle/>
             <a:p>
               <a:r>
-                <a:rPr lang="en-US" altLang="zh-CN" sz="1400" dirty="0"/>
+                <a:rPr lang="en-US" altLang="zh-CN" sz="1200" dirty="0"/>
                 <a:t>guarantee</a:t>
               </a:r>
             </a:p>
@@ -4658,7 +4642,7 @@
           </p:nvCxnSpPr>
           <p:spPr>
             <a:xfrm>
-              <a:off x="2206519" y="2273036"/>
+              <a:off x="2380255" y="2273036"/>
               <a:ext cx="0" cy="1318756"/>
             </a:xfrm>
             <a:prstGeom prst="straightConnector1">
@@ -4701,8 +4685,8 @@
           </p:nvSpPr>
           <p:spPr>
             <a:xfrm>
-              <a:off x="1282153" y="2724811"/>
-              <a:ext cx="829858" cy="307777"/>
+              <a:off x="1730873" y="2741092"/>
+              <a:ext cx="629734" cy="276999"/>
             </a:xfrm>
             <a:prstGeom prst="rect">
               <a:avLst/>
@@ -4716,10 +4700,10 @@
             <a:p>
               <a:pPr algn="ctr"/>
               <a:r>
-                <a:rPr lang="en-US" altLang="zh-CN" sz="1400" dirty="0" err="1"/>
+                <a:rPr lang="en-US" altLang="zh-CN" sz="1200" dirty="0" err="1"/>
                 <a:t>workIn</a:t>
               </a:r>
-              <a:endParaRPr lang="en-CN" sz="1400" dirty="0"/>
+              <a:endParaRPr lang="en-CN" sz="1200" dirty="0"/>
             </a:p>
           </p:txBody>
         </p:sp>
@@ -4734,20 +4718,20 @@
             </p:cNvPr>
             <p:cNvCxnSpPr>
               <a:cxnSpLocks/>
-              <a:stCxn id="12" idx="2"/>
+              <a:stCxn id="85" idx="4"/>
               <a:endCxn id="12" idx="1"/>
             </p:cNvCxnSpPr>
             <p:nvPr/>
           </p:nvCxnSpPr>
           <p:spPr>
             <a:xfrm rot="5400000" flipH="1">
-              <a:off x="2366613" y="3859742"/>
-              <a:ext cx="251199" cy="996177"/>
+              <a:off x="2093604" y="4132750"/>
+              <a:ext cx="261263" cy="460224"/>
             </a:xfrm>
             <a:prstGeom prst="bentConnector4">
               <a:avLst>
-                <a:gd name="adj1" fmla="val -178051"/>
-                <a:gd name="adj2" fmla="val 122948"/>
+                <a:gd name="adj1" fmla="val -87498"/>
+                <a:gd name="adj2" fmla="val 183447"/>
               </a:avLst>
             </a:prstGeom>
             <a:ln w="19050">
@@ -4787,8 +4771,8 @@
           </p:nvSpPr>
           <p:spPr>
             <a:xfrm>
-              <a:off x="1870815" y="4580740"/>
-              <a:ext cx="970137" cy="307777"/>
+              <a:off x="1584924" y="4722279"/>
+              <a:ext cx="856325" cy="276999"/>
             </a:xfrm>
             <a:prstGeom prst="rect">
               <a:avLst/>
@@ -4802,17 +4786,1381 @@
             <a:lstStyle/>
             <a:p>
               <a:r>
-                <a:rPr lang="en-US" altLang="zh-CN" sz="1400" dirty="0"/>
+                <a:rPr lang="en-US" altLang="zh-CN" sz="1200" dirty="0"/>
                 <a:t>guarantee</a:t>
               </a:r>
             </a:p>
           </p:txBody>
         </p:sp>
+        <p:sp>
+          <p:nvSpPr>
+            <p:cNvPr id="85" name="Oval 84">
+              <a:extLst>
+                <a:ext uri="{FF2B5EF4-FFF2-40B4-BE49-F238E27FC236}">
+                  <a16:creationId xmlns:a16="http://schemas.microsoft.com/office/drawing/2014/main" id="{88C900CF-3D46-22BB-BE2B-F0E2A88A4C9C}"/>
+                </a:ext>
+              </a:extLst>
+            </p:cNvPr>
+            <p:cNvSpPr/>
+            <p:nvPr/>
+          </p:nvSpPr>
+          <p:spPr>
+            <a:xfrm>
+              <a:off x="2445348" y="4475493"/>
+              <a:ext cx="18000" cy="18000"/>
+            </a:xfrm>
+            <a:prstGeom prst="ellipse">
+              <a:avLst/>
+            </a:prstGeom>
+            <a:solidFill>
+              <a:schemeClr val="tx1"/>
+            </a:solidFill>
+            <a:ln>
+              <a:noFill/>
+            </a:ln>
+          </p:spPr>
+          <p:style>
+            <a:lnRef idx="2">
+              <a:schemeClr val="accent1">
+                <a:shade val="50000"/>
+              </a:schemeClr>
+            </a:lnRef>
+            <a:fillRef idx="1">
+              <a:schemeClr val="accent1"/>
+            </a:fillRef>
+            <a:effectRef idx="0">
+              <a:schemeClr val="accent1"/>
+            </a:effectRef>
+            <a:fontRef idx="minor">
+              <a:schemeClr val="lt1"/>
+            </a:fontRef>
+          </p:style>
+          <p:txBody>
+            <a:bodyPr lIns="90000" rtlCol="0" anchor="ctr"/>
+            <a:lstStyle/>
+            <a:p>
+              <a:pPr algn="ctr"/>
+              <a:endParaRPr lang="en-CN"/>
+            </a:p>
+          </p:txBody>
+        </p:sp>
+        <p:sp>
+          <p:nvSpPr>
+            <p:cNvPr id="88" name="Oval 87">
+              <a:extLst>
+                <a:ext uri="{FF2B5EF4-FFF2-40B4-BE49-F238E27FC236}">
+                  <a16:creationId xmlns:a16="http://schemas.microsoft.com/office/drawing/2014/main" id="{B1742E75-53D6-B7BC-857E-BCFC1AD7FB81}"/>
+                </a:ext>
+              </a:extLst>
+            </p:cNvPr>
+            <p:cNvSpPr/>
+            <p:nvPr/>
+          </p:nvSpPr>
+          <p:spPr>
+            <a:xfrm>
+              <a:off x="3452288" y="4476952"/>
+              <a:ext cx="18000" cy="18000"/>
+            </a:xfrm>
+            <a:prstGeom prst="ellipse">
+              <a:avLst/>
+            </a:prstGeom>
+            <a:solidFill>
+              <a:schemeClr val="tx1"/>
+            </a:solidFill>
+            <a:ln>
+              <a:noFill/>
+            </a:ln>
+          </p:spPr>
+          <p:style>
+            <a:lnRef idx="2">
+              <a:schemeClr val="accent1">
+                <a:shade val="50000"/>
+              </a:schemeClr>
+            </a:lnRef>
+            <a:fillRef idx="1">
+              <a:schemeClr val="accent1"/>
+            </a:fillRef>
+            <a:effectRef idx="0">
+              <a:schemeClr val="accent1"/>
+            </a:effectRef>
+            <a:fontRef idx="minor">
+              <a:schemeClr val="lt1"/>
+            </a:fontRef>
+          </p:style>
+          <p:txBody>
+            <a:bodyPr lIns="90000" rtlCol="0" anchor="ctr"/>
+            <a:lstStyle/>
+            <a:p>
+              <a:pPr algn="ctr"/>
+              <a:endParaRPr lang="en-CN"/>
+            </a:p>
+          </p:txBody>
+        </p:sp>
+        <p:sp>
+          <p:nvSpPr>
+            <p:cNvPr id="91" name="Oval 90">
+              <a:extLst>
+                <a:ext uri="{FF2B5EF4-FFF2-40B4-BE49-F238E27FC236}">
+                  <a16:creationId xmlns:a16="http://schemas.microsoft.com/office/drawing/2014/main" id="{6923ECC9-2D7B-1909-3FD9-33F9F9BB8A29}"/>
+                </a:ext>
+              </a:extLst>
+            </p:cNvPr>
+            <p:cNvSpPr/>
+            <p:nvPr/>
+          </p:nvSpPr>
+          <p:spPr>
+            <a:xfrm>
+              <a:off x="3452288" y="2269728"/>
+              <a:ext cx="18000" cy="18000"/>
+            </a:xfrm>
+            <a:prstGeom prst="ellipse">
+              <a:avLst/>
+            </a:prstGeom>
+            <a:solidFill>
+              <a:schemeClr val="tx1"/>
+            </a:solidFill>
+            <a:ln>
+              <a:noFill/>
+            </a:ln>
+          </p:spPr>
+          <p:style>
+            <a:lnRef idx="2">
+              <a:schemeClr val="accent1">
+                <a:shade val="50000"/>
+              </a:schemeClr>
+            </a:lnRef>
+            <a:fillRef idx="1">
+              <a:schemeClr val="accent1"/>
+            </a:fillRef>
+            <a:effectRef idx="0">
+              <a:schemeClr val="accent1"/>
+            </a:effectRef>
+            <a:fontRef idx="minor">
+              <a:schemeClr val="lt1"/>
+            </a:fontRef>
+          </p:style>
+          <p:txBody>
+            <a:bodyPr lIns="90000" rtlCol="0" anchor="ctr"/>
+            <a:lstStyle/>
+            <a:p>
+              <a:pPr algn="ctr"/>
+              <a:endParaRPr lang="en-CN"/>
+            </a:p>
+          </p:txBody>
+        </p:sp>
+        <p:sp>
+          <p:nvSpPr>
+            <p:cNvPr id="100" name="Oval 99">
+              <a:extLst>
+                <a:ext uri="{FF2B5EF4-FFF2-40B4-BE49-F238E27FC236}">
+                  <a16:creationId xmlns:a16="http://schemas.microsoft.com/office/drawing/2014/main" id="{8A1DBE11-24EB-ED63-FBFF-4FA4031AD43E}"/>
+                </a:ext>
+              </a:extLst>
+            </p:cNvPr>
+            <p:cNvSpPr/>
+            <p:nvPr/>
+          </p:nvSpPr>
+          <p:spPr>
+            <a:xfrm>
+              <a:off x="4991400" y="3240000"/>
+              <a:ext cx="18000" cy="18000"/>
+            </a:xfrm>
+            <a:prstGeom prst="ellipse">
+              <a:avLst/>
+            </a:prstGeom>
+            <a:solidFill>
+              <a:schemeClr val="tx1"/>
+            </a:solidFill>
+            <a:ln>
+              <a:noFill/>
+            </a:ln>
+          </p:spPr>
+          <p:style>
+            <a:lnRef idx="2">
+              <a:schemeClr val="accent1">
+                <a:shade val="50000"/>
+              </a:schemeClr>
+            </a:lnRef>
+            <a:fillRef idx="1">
+              <a:schemeClr val="accent1"/>
+            </a:fillRef>
+            <a:effectRef idx="0">
+              <a:schemeClr val="accent1"/>
+            </a:effectRef>
+            <a:fontRef idx="minor">
+              <a:schemeClr val="lt1"/>
+            </a:fontRef>
+          </p:style>
+          <p:txBody>
+            <a:bodyPr lIns="90000" rtlCol="0" anchor="ctr"/>
+            <a:lstStyle/>
+            <a:p>
+              <a:pPr algn="ctr"/>
+              <a:endParaRPr lang="en-CN"/>
+            </a:p>
+          </p:txBody>
+        </p:sp>
+        <p:sp>
+          <p:nvSpPr>
+            <p:cNvPr id="103" name="Oval 102">
+              <a:extLst>
+                <a:ext uri="{FF2B5EF4-FFF2-40B4-BE49-F238E27FC236}">
+                  <a16:creationId xmlns:a16="http://schemas.microsoft.com/office/drawing/2014/main" id="{EAB1111F-D4FF-F70D-F4B4-09356DD7CADE}"/>
+                </a:ext>
+              </a:extLst>
+            </p:cNvPr>
+            <p:cNvSpPr/>
+            <p:nvPr/>
+          </p:nvSpPr>
+          <p:spPr>
+            <a:xfrm>
+              <a:off x="4997496" y="3005304"/>
+              <a:ext cx="18000" cy="18000"/>
+            </a:xfrm>
+            <a:prstGeom prst="ellipse">
+              <a:avLst/>
+            </a:prstGeom>
+            <a:solidFill>
+              <a:schemeClr val="tx1"/>
+            </a:solidFill>
+            <a:ln>
+              <a:noFill/>
+            </a:ln>
+          </p:spPr>
+          <p:style>
+            <a:lnRef idx="2">
+              <a:schemeClr val="accent1">
+                <a:shade val="50000"/>
+              </a:schemeClr>
+            </a:lnRef>
+            <a:fillRef idx="1">
+              <a:schemeClr val="accent1"/>
+            </a:fillRef>
+            <a:effectRef idx="0">
+              <a:schemeClr val="accent1"/>
+            </a:effectRef>
+            <a:fontRef idx="minor">
+              <a:schemeClr val="lt1"/>
+            </a:fontRef>
+          </p:style>
+          <p:txBody>
+            <a:bodyPr lIns="90000" rtlCol="0" anchor="ctr"/>
+            <a:lstStyle/>
+            <a:p>
+              <a:pPr algn="ctr"/>
+              <a:endParaRPr lang="en-CN"/>
+            </a:p>
+          </p:txBody>
+        </p:sp>
+        <p:sp>
+          <p:nvSpPr>
+            <p:cNvPr id="105" name="Oval 104">
+              <a:extLst>
+                <a:ext uri="{FF2B5EF4-FFF2-40B4-BE49-F238E27FC236}">
+                  <a16:creationId xmlns:a16="http://schemas.microsoft.com/office/drawing/2014/main" id="{19A33579-AADC-4507-010C-6C023E469E5A}"/>
+                </a:ext>
+              </a:extLst>
+            </p:cNvPr>
+            <p:cNvSpPr/>
+            <p:nvPr/>
+          </p:nvSpPr>
+          <p:spPr>
+            <a:xfrm>
+              <a:off x="4997496" y="2825472"/>
+              <a:ext cx="18000" cy="18000"/>
+            </a:xfrm>
+            <a:prstGeom prst="ellipse">
+              <a:avLst/>
+            </a:prstGeom>
+            <a:solidFill>
+              <a:schemeClr val="tx1"/>
+            </a:solidFill>
+            <a:ln>
+              <a:noFill/>
+            </a:ln>
+          </p:spPr>
+          <p:style>
+            <a:lnRef idx="2">
+              <a:schemeClr val="accent1">
+                <a:shade val="50000"/>
+              </a:schemeClr>
+            </a:lnRef>
+            <a:fillRef idx="1">
+              <a:schemeClr val="accent1"/>
+            </a:fillRef>
+            <a:effectRef idx="0">
+              <a:schemeClr val="accent1"/>
+            </a:effectRef>
+            <a:fontRef idx="minor">
+              <a:schemeClr val="lt1"/>
+            </a:fontRef>
+          </p:style>
+          <p:txBody>
+            <a:bodyPr lIns="90000" rtlCol="0" anchor="ctr"/>
+            <a:lstStyle/>
+            <a:p>
+              <a:pPr algn="ctr"/>
+              <a:endParaRPr lang="en-CN"/>
+            </a:p>
+          </p:txBody>
+        </p:sp>
+        <p:sp>
+          <p:nvSpPr>
+            <p:cNvPr id="112" name="Oval 111">
+              <a:extLst>
+                <a:ext uri="{FF2B5EF4-FFF2-40B4-BE49-F238E27FC236}">
+                  <a16:creationId xmlns:a16="http://schemas.microsoft.com/office/drawing/2014/main" id="{5E628CD8-D99B-AD15-DF05-37ACDC9771B3}"/>
+                </a:ext>
+              </a:extLst>
+            </p:cNvPr>
+            <p:cNvSpPr/>
+            <p:nvPr/>
+          </p:nvSpPr>
+          <p:spPr>
+            <a:xfrm>
+              <a:off x="4988352" y="5212056"/>
+              <a:ext cx="18000" cy="18000"/>
+            </a:xfrm>
+            <a:prstGeom prst="ellipse">
+              <a:avLst/>
+            </a:prstGeom>
+            <a:solidFill>
+              <a:schemeClr val="tx1"/>
+            </a:solidFill>
+            <a:ln>
+              <a:noFill/>
+            </a:ln>
+          </p:spPr>
+          <p:style>
+            <a:lnRef idx="2">
+              <a:schemeClr val="accent1">
+                <a:shade val="50000"/>
+              </a:schemeClr>
+            </a:lnRef>
+            <a:fillRef idx="1">
+              <a:schemeClr val="accent1"/>
+            </a:fillRef>
+            <a:effectRef idx="0">
+              <a:schemeClr val="accent1"/>
+            </a:effectRef>
+            <a:fontRef idx="minor">
+              <a:schemeClr val="lt1"/>
+            </a:fontRef>
+          </p:style>
+          <p:txBody>
+            <a:bodyPr lIns="90000" rtlCol="0" anchor="ctr"/>
+            <a:lstStyle/>
+            <a:p>
+              <a:pPr algn="ctr"/>
+              <a:endParaRPr lang="en-CN"/>
+            </a:p>
+          </p:txBody>
+        </p:sp>
+        <p:sp>
+          <p:nvSpPr>
+            <p:cNvPr id="119" name="Oval 118">
+              <a:extLst>
+                <a:ext uri="{FF2B5EF4-FFF2-40B4-BE49-F238E27FC236}">
+                  <a16:creationId xmlns:a16="http://schemas.microsoft.com/office/drawing/2014/main" id="{D1B2FEE3-6B99-E2FA-70DA-3478F0CBB8A6}"/>
+                </a:ext>
+              </a:extLst>
+            </p:cNvPr>
+            <p:cNvSpPr/>
+            <p:nvPr/>
+          </p:nvSpPr>
+          <p:spPr>
+            <a:xfrm>
+              <a:off x="6994597" y="2825472"/>
+              <a:ext cx="18000" cy="18000"/>
+            </a:xfrm>
+            <a:prstGeom prst="ellipse">
+              <a:avLst/>
+            </a:prstGeom>
+            <a:solidFill>
+              <a:schemeClr val="tx1"/>
+            </a:solidFill>
+            <a:ln>
+              <a:noFill/>
+            </a:ln>
+          </p:spPr>
+          <p:style>
+            <a:lnRef idx="2">
+              <a:schemeClr val="accent1">
+                <a:shade val="50000"/>
+              </a:schemeClr>
+            </a:lnRef>
+            <a:fillRef idx="1">
+              <a:schemeClr val="accent1"/>
+            </a:fillRef>
+            <a:effectRef idx="0">
+              <a:schemeClr val="accent1"/>
+            </a:effectRef>
+            <a:fontRef idx="minor">
+              <a:schemeClr val="lt1"/>
+            </a:fontRef>
+          </p:style>
+          <p:txBody>
+            <a:bodyPr lIns="90000" rtlCol="0" anchor="ctr"/>
+            <a:lstStyle/>
+            <a:p>
+              <a:pPr algn="ctr"/>
+              <a:endParaRPr lang="en-CN"/>
+            </a:p>
+          </p:txBody>
+        </p:sp>
+        <p:sp>
+          <p:nvSpPr>
+            <p:cNvPr id="122" name="Oval 121">
+              <a:extLst>
+                <a:ext uri="{FF2B5EF4-FFF2-40B4-BE49-F238E27FC236}">
+                  <a16:creationId xmlns:a16="http://schemas.microsoft.com/office/drawing/2014/main" id="{51730339-FBCE-57B4-BDD1-3DAE304CB978}"/>
+                </a:ext>
+              </a:extLst>
+            </p:cNvPr>
+            <p:cNvSpPr/>
+            <p:nvPr/>
+          </p:nvSpPr>
+          <p:spPr>
+            <a:xfrm>
+              <a:off x="6264405" y="2230449"/>
+              <a:ext cx="18000" cy="18000"/>
+            </a:xfrm>
+            <a:prstGeom prst="ellipse">
+              <a:avLst/>
+            </a:prstGeom>
+            <a:solidFill>
+              <a:schemeClr val="tx1"/>
+            </a:solidFill>
+            <a:ln>
+              <a:noFill/>
+            </a:ln>
+          </p:spPr>
+          <p:style>
+            <a:lnRef idx="2">
+              <a:schemeClr val="accent1">
+                <a:shade val="50000"/>
+              </a:schemeClr>
+            </a:lnRef>
+            <a:fillRef idx="1">
+              <a:schemeClr val="accent1"/>
+            </a:fillRef>
+            <a:effectRef idx="0">
+              <a:schemeClr val="accent1"/>
+            </a:effectRef>
+            <a:fontRef idx="minor">
+              <a:schemeClr val="lt1"/>
+            </a:fontRef>
+          </p:style>
+          <p:txBody>
+            <a:bodyPr lIns="90000" rtlCol="0" anchor="ctr"/>
+            <a:lstStyle/>
+            <a:p>
+              <a:pPr algn="ctr"/>
+              <a:endParaRPr lang="en-CN"/>
+            </a:p>
+          </p:txBody>
+        </p:sp>
+        <p:sp>
+          <p:nvSpPr>
+            <p:cNvPr id="124" name="Oval 123">
+              <a:extLst>
+                <a:ext uri="{FF2B5EF4-FFF2-40B4-BE49-F238E27FC236}">
+                  <a16:creationId xmlns:a16="http://schemas.microsoft.com/office/drawing/2014/main" id="{9BEB58F4-CA93-1DF9-640E-39C5DA1ACAE7}"/>
+                </a:ext>
+              </a:extLst>
+            </p:cNvPr>
+            <p:cNvSpPr/>
+            <p:nvPr/>
+          </p:nvSpPr>
+          <p:spPr>
+            <a:xfrm>
+              <a:off x="5772749" y="2231775"/>
+              <a:ext cx="18000" cy="18000"/>
+            </a:xfrm>
+            <a:prstGeom prst="ellipse">
+              <a:avLst/>
+            </a:prstGeom>
+            <a:solidFill>
+              <a:schemeClr val="tx1"/>
+            </a:solidFill>
+            <a:ln>
+              <a:noFill/>
+            </a:ln>
+          </p:spPr>
+          <p:style>
+            <a:lnRef idx="2">
+              <a:schemeClr val="accent1">
+                <a:shade val="50000"/>
+              </a:schemeClr>
+            </a:lnRef>
+            <a:fillRef idx="1">
+              <a:schemeClr val="accent1"/>
+            </a:fillRef>
+            <a:effectRef idx="0">
+              <a:schemeClr val="accent1"/>
+            </a:effectRef>
+            <a:fontRef idx="minor">
+              <a:schemeClr val="lt1"/>
+            </a:fontRef>
+          </p:style>
+          <p:txBody>
+            <a:bodyPr lIns="90000" rtlCol="0" anchor="ctr"/>
+            <a:lstStyle/>
+            <a:p>
+              <a:pPr algn="ctr"/>
+              <a:endParaRPr lang="en-CN"/>
+            </a:p>
+          </p:txBody>
+        </p:sp>
+        <p:grpSp>
+          <p:nvGrpSpPr>
+            <p:cNvPr id="140" name="Group 139">
+              <a:extLst>
+                <a:ext uri="{FF2B5EF4-FFF2-40B4-BE49-F238E27FC236}">
+                  <a16:creationId xmlns:a16="http://schemas.microsoft.com/office/drawing/2014/main" id="{E86AA121-EF98-B911-A718-411F104F3CB0}"/>
+                </a:ext>
+              </a:extLst>
+            </p:cNvPr>
+            <p:cNvGrpSpPr/>
+            <p:nvPr/>
+          </p:nvGrpSpPr>
+          <p:grpSpPr>
+            <a:xfrm>
+              <a:off x="7743830" y="3871701"/>
+              <a:ext cx="2058538" cy="1163832"/>
+              <a:chOff x="7972430" y="3871701"/>
+              <a:chExt cx="2058538" cy="1163832"/>
+            </a:xfrm>
+          </p:grpSpPr>
+          <p:sp>
+            <p:nvSpPr>
+              <p:cNvPr id="134" name="TextBox 36">
+                <a:extLst>
+                  <a:ext uri="{FF2B5EF4-FFF2-40B4-BE49-F238E27FC236}">
+                    <a16:creationId xmlns:a16="http://schemas.microsoft.com/office/drawing/2014/main" id="{B7231477-6837-BB4A-A11C-3483873584B5}"/>
+                  </a:ext>
+                </a:extLst>
+              </p:cNvPr>
+              <p:cNvSpPr txBox="1">
+                <a:spLocks noChangeAspect="1"/>
+              </p:cNvSpPr>
+              <p:nvPr/>
+            </p:nvSpPr>
+            <p:spPr>
+              <a:xfrm>
+                <a:off x="8574063" y="3871701"/>
+                <a:ext cx="1456905" cy="607387"/>
+              </a:xfrm>
+              <a:prstGeom prst="rect">
+                <a:avLst/>
+              </a:prstGeom>
+              <a:noFill/>
+            </p:spPr>
+            <p:txBody>
+              <a:bodyPr wrap="square" rtlCol="0" anchor="ctr">
+                <a:noAutofit/>
+              </a:bodyPr>
+              <a:lstStyle>
+                <a:defPPr>
+                  <a:defRPr lang="en-US"/>
+                </a:defPPr>
+                <a:lvl1pPr>
+                  <a:lnSpc>
+                    <a:spcPct val="130000"/>
+                  </a:lnSpc>
+                  <a:defRPr sz="5400" b="1">
+                    <a:solidFill>
+                      <a:schemeClr val="tx1">
+                        <a:lumMod val="65000"/>
+                        <a:lumOff val="35000"/>
+                      </a:schemeClr>
+                    </a:solidFill>
+                    <a:latin typeface="Agency FB" pitchFamily="34" charset="0"/>
+                    <a:ea typeface="微软雅黑" pitchFamily="34" charset="-122"/>
+                    <a:cs typeface="Calibri" pitchFamily="34" charset="0"/>
+                  </a:defRPr>
+                </a:lvl1pPr>
+              </a:lstStyle>
+              <a:p>
+                <a:pPr>
+                  <a:lnSpc>
+                    <a:spcPct val="100000"/>
+                  </a:lnSpc>
+                  <a:defRPr/>
+                </a:pPr>
+                <a:r>
+                  <a:rPr lang="en-US" altLang="zh-CN" sz="1400" b="0" dirty="0">
+                    <a:solidFill>
+                      <a:srgbClr val="000000"/>
+                    </a:solidFill>
+                    <a:latin typeface="Alibaba PuHuiTi R" pitchFamily="18" charset="-122"/>
+                    <a:ea typeface="Alibaba PuHuiTi R" pitchFamily="18" charset="-122"/>
+                    <a:cs typeface="Alibaba PuHuiTi R" pitchFamily="18" charset="-122"/>
+                  </a:rPr>
+                  <a:t>Single </a:t>
+                </a:r>
+                <a:r>
+                  <a:rPr lang="en-US" sz="1400" b="0" dirty="0">
+                    <a:solidFill>
+                      <a:srgbClr val="000000"/>
+                    </a:solidFill>
+                    <a:latin typeface="Alibaba PuHuiTi R" pitchFamily="18" charset="-122"/>
+                    <a:ea typeface="Alibaba PuHuiTi R" pitchFamily="18" charset="-122"/>
+                    <a:cs typeface="Alibaba PuHuiTi R" pitchFamily="18" charset="-122"/>
+                  </a:rPr>
+                  <a:t>edges</a:t>
+                </a:r>
+                <a:r>
+                  <a:rPr lang="zh-CN" altLang="en-US" sz="1400" b="0" dirty="0">
+                    <a:solidFill>
+                      <a:srgbClr val="000000"/>
+                    </a:solidFill>
+                    <a:latin typeface="Alibaba PuHuiTi R" pitchFamily="18" charset="-122"/>
+                    <a:ea typeface="Alibaba PuHuiTi R" pitchFamily="18" charset="-122"/>
+                    <a:cs typeface="Alibaba PuHuiTi R" pitchFamily="18" charset="-122"/>
+                  </a:rPr>
+                  <a:t> </a:t>
+                </a:r>
+                <a:r>
+                  <a:rPr lang="en-US" altLang="zh-CN" sz="1400" b="0" dirty="0">
+                    <a:solidFill>
+                      <a:srgbClr val="000000"/>
+                    </a:solidFill>
+                    <a:latin typeface="Alibaba PuHuiTi R" pitchFamily="18" charset="-122"/>
+                    <a:ea typeface="Alibaba PuHuiTi R" pitchFamily="18" charset="-122"/>
+                    <a:cs typeface="Alibaba PuHuiTi R" pitchFamily="18" charset="-122"/>
+                  </a:rPr>
+                  <a:t>from</a:t>
+                </a:r>
+                <a:r>
+                  <a:rPr lang="zh-CN" altLang="en-US" sz="1400" b="0" dirty="0">
+                    <a:solidFill>
+                      <a:srgbClr val="000000"/>
+                    </a:solidFill>
+                    <a:latin typeface="Alibaba PuHuiTi R" pitchFamily="18" charset="-122"/>
+                    <a:ea typeface="Alibaba PuHuiTi R" pitchFamily="18" charset="-122"/>
+                    <a:cs typeface="Alibaba PuHuiTi R" pitchFamily="18" charset="-122"/>
+                  </a:rPr>
+                  <a:t> </a:t>
+                </a:r>
+                <a:r>
+                  <a:rPr lang="en-US" altLang="zh-CN" sz="1400" b="0" dirty="0" err="1">
+                    <a:solidFill>
+                      <a:srgbClr val="000000"/>
+                    </a:solidFill>
+                    <a:latin typeface="Alibaba PuHuiTi R" pitchFamily="18" charset="-122"/>
+                    <a:ea typeface="Alibaba PuHuiTi R" pitchFamily="18" charset="-122"/>
+                    <a:cs typeface="Alibaba PuHuiTi R" pitchFamily="18" charset="-122"/>
+                  </a:rPr>
+                  <a:t>src</a:t>
+                </a:r>
+                <a:r>
+                  <a:rPr lang="zh-CN" altLang="en-US" sz="1400" b="0" dirty="0">
+                    <a:solidFill>
+                      <a:srgbClr val="000000"/>
+                    </a:solidFill>
+                    <a:latin typeface="Alibaba PuHuiTi R" pitchFamily="18" charset="-122"/>
+                    <a:ea typeface="Alibaba PuHuiTi R" pitchFamily="18" charset="-122"/>
+                    <a:cs typeface="Alibaba PuHuiTi R" pitchFamily="18" charset="-122"/>
+                  </a:rPr>
+                  <a:t> </a:t>
+                </a:r>
+                <a:r>
+                  <a:rPr lang="en-US" altLang="zh-CN" sz="1400" b="0" dirty="0">
+                    <a:solidFill>
+                      <a:srgbClr val="000000"/>
+                    </a:solidFill>
+                    <a:latin typeface="Alibaba PuHuiTi R" pitchFamily="18" charset="-122"/>
+                    <a:ea typeface="Alibaba PuHuiTi R" pitchFamily="18" charset="-122"/>
+                    <a:cs typeface="Alibaba PuHuiTi R" pitchFamily="18" charset="-122"/>
+                  </a:rPr>
+                  <a:t>to</a:t>
+                </a:r>
+                <a:r>
+                  <a:rPr lang="zh-CN" altLang="en-US" sz="1400" b="0" dirty="0">
+                    <a:solidFill>
+                      <a:srgbClr val="000000"/>
+                    </a:solidFill>
+                    <a:latin typeface="Alibaba PuHuiTi R" pitchFamily="18" charset="-122"/>
+                    <a:ea typeface="Alibaba PuHuiTi R" pitchFamily="18" charset="-122"/>
+                    <a:cs typeface="Alibaba PuHuiTi R" pitchFamily="18" charset="-122"/>
+                  </a:rPr>
+                  <a:t> </a:t>
+                </a:r>
+                <a:r>
+                  <a:rPr lang="en-US" altLang="zh-CN" sz="1400" b="0" dirty="0" err="1">
+                    <a:solidFill>
+                      <a:srgbClr val="000000"/>
+                    </a:solidFill>
+                    <a:latin typeface="Alibaba PuHuiTi R" pitchFamily="18" charset="-122"/>
+                    <a:ea typeface="Alibaba PuHuiTi R" pitchFamily="18" charset="-122"/>
+                    <a:cs typeface="Alibaba PuHuiTi R" pitchFamily="18" charset="-122"/>
+                  </a:rPr>
+                  <a:t>dst</a:t>
+                </a:r>
+                <a:endParaRPr kumimoji="0" lang="zh-CN" altLang="en-US" sz="1400" b="0" u="none" strike="noStrike" kern="0" cap="none" spc="0" normalizeH="0" baseline="0" noProof="0" dirty="0">
+                  <a:ln>
+                    <a:noFill/>
+                  </a:ln>
+                  <a:solidFill>
+                    <a:srgbClr val="000000"/>
+                  </a:solidFill>
+                  <a:effectLst/>
+                  <a:uLnTx/>
+                  <a:uFillTx/>
+                  <a:latin typeface="Alibaba PuHuiTi R" pitchFamily="18" charset="-122"/>
+                  <a:ea typeface="Alibaba PuHuiTi R" pitchFamily="18" charset="-122"/>
+                  <a:cs typeface="Alibaba PuHuiTi R" pitchFamily="18" charset="-122"/>
+                  <a:sym typeface="Helvetica Light"/>
+                </a:endParaRPr>
+              </a:p>
+            </p:txBody>
+          </p:sp>
+          <p:cxnSp>
+            <p:nvCxnSpPr>
+              <p:cNvPr id="135" name="Straight Arrow Connector 134">
+                <a:extLst>
+                  <a:ext uri="{FF2B5EF4-FFF2-40B4-BE49-F238E27FC236}">
+                    <a16:creationId xmlns:a16="http://schemas.microsoft.com/office/drawing/2014/main" id="{187F7B78-769E-9D10-ACB2-1C7A2BDA958F}"/>
+                  </a:ext>
+                </a:extLst>
+              </p:cNvPr>
+              <p:cNvCxnSpPr>
+                <a:cxnSpLocks/>
+              </p:cNvCxnSpPr>
+              <p:nvPr/>
+            </p:nvCxnSpPr>
+            <p:spPr>
+              <a:xfrm>
+                <a:off x="7972430" y="4175395"/>
+                <a:ext cx="540000" cy="0"/>
+              </a:xfrm>
+              <a:prstGeom prst="straightConnector1">
+                <a:avLst/>
+              </a:prstGeom>
+              <a:noFill/>
+              <a:ln w="25400" cap="flat">
+                <a:solidFill>
+                  <a:srgbClr val="000000"/>
+                </a:solidFill>
+                <a:prstDash val="solid"/>
+                <a:miter lim="400000"/>
+                <a:tailEnd type="triangle"/>
+              </a:ln>
+              <a:effectLst/>
+            </p:spPr>
+            <p:style>
+              <a:lnRef idx="0">
+                <a:scrgbClr r="0" g="0" b="0"/>
+              </a:lnRef>
+              <a:fillRef idx="0">
+                <a:scrgbClr r="0" g="0" b="0"/>
+              </a:fillRef>
+              <a:effectRef idx="0">
+                <a:scrgbClr r="0" g="0" b="0"/>
+              </a:effectRef>
+              <a:fontRef idx="none"/>
+            </p:style>
+          </p:cxnSp>
+          <p:cxnSp>
+            <p:nvCxnSpPr>
+              <p:cNvPr id="136" name="Straight Arrow Connector 135">
+                <a:extLst>
+                  <a:ext uri="{FF2B5EF4-FFF2-40B4-BE49-F238E27FC236}">
+                    <a16:creationId xmlns:a16="http://schemas.microsoft.com/office/drawing/2014/main" id="{C3D8573E-D634-6E52-6698-EE163FB8B734}"/>
+                  </a:ext>
+                </a:extLst>
+              </p:cNvPr>
+              <p:cNvCxnSpPr>
+                <a:cxnSpLocks/>
+              </p:cNvCxnSpPr>
+              <p:nvPr/>
+            </p:nvCxnSpPr>
+            <p:spPr>
+              <a:xfrm>
+                <a:off x="7972430" y="4731840"/>
+                <a:ext cx="540000" cy="0"/>
+              </a:xfrm>
+              <a:prstGeom prst="straightConnector1">
+                <a:avLst/>
+              </a:prstGeom>
+              <a:noFill/>
+              <a:ln w="25400" cap="flat">
+                <a:solidFill>
+                  <a:srgbClr val="000000"/>
+                </a:solidFill>
+                <a:prstDash val="dash"/>
+                <a:miter lim="400000"/>
+                <a:tailEnd type="triangle"/>
+              </a:ln>
+              <a:effectLst/>
+            </p:spPr>
+            <p:style>
+              <a:lnRef idx="0">
+                <a:scrgbClr r="0" g="0" b="0"/>
+              </a:lnRef>
+              <a:fillRef idx="0">
+                <a:scrgbClr r="0" g="0" b="0"/>
+              </a:fillRef>
+              <a:effectRef idx="0">
+                <a:scrgbClr r="0" g="0" b="0"/>
+              </a:effectRef>
+              <a:fontRef idx="none"/>
+            </p:style>
+          </p:cxnSp>
+          <p:sp>
+            <p:nvSpPr>
+              <p:cNvPr id="137" name="TextBox 36">
+                <a:extLst>
+                  <a:ext uri="{FF2B5EF4-FFF2-40B4-BE49-F238E27FC236}">
+                    <a16:creationId xmlns:a16="http://schemas.microsoft.com/office/drawing/2014/main" id="{32B7F567-CE04-4154-BFC0-010317D92EF5}"/>
+                  </a:ext>
+                </a:extLst>
+              </p:cNvPr>
+              <p:cNvSpPr txBox="1">
+                <a:spLocks noChangeAspect="1"/>
+              </p:cNvSpPr>
+              <p:nvPr/>
+            </p:nvSpPr>
+            <p:spPr>
+              <a:xfrm>
+                <a:off x="8574062" y="4428146"/>
+                <a:ext cx="1456905" cy="607387"/>
+              </a:xfrm>
+              <a:prstGeom prst="rect">
+                <a:avLst/>
+              </a:prstGeom>
+              <a:noFill/>
+            </p:spPr>
+            <p:txBody>
+              <a:bodyPr wrap="square" rtlCol="0" anchor="ctr">
+                <a:noAutofit/>
+              </a:bodyPr>
+              <a:lstStyle>
+                <a:defPPr>
+                  <a:defRPr lang="en-US"/>
+                </a:defPPr>
+                <a:lvl1pPr>
+                  <a:lnSpc>
+                    <a:spcPct val="130000"/>
+                  </a:lnSpc>
+                  <a:defRPr sz="5400" b="1">
+                    <a:solidFill>
+                      <a:schemeClr val="tx1">
+                        <a:lumMod val="65000"/>
+                        <a:lumOff val="35000"/>
+                      </a:schemeClr>
+                    </a:solidFill>
+                    <a:latin typeface="Agency FB" pitchFamily="34" charset="0"/>
+                    <a:ea typeface="微软雅黑" pitchFamily="34" charset="-122"/>
+                    <a:cs typeface="Calibri" pitchFamily="34" charset="0"/>
+                  </a:defRPr>
+                </a:lvl1pPr>
+              </a:lstStyle>
+              <a:p>
+                <a:pPr>
+                  <a:lnSpc>
+                    <a:spcPct val="100000"/>
+                  </a:lnSpc>
+                  <a:defRPr/>
+                </a:pPr>
+                <a:r>
+                  <a:rPr lang="en-US" sz="1400" b="0" dirty="0">
+                    <a:solidFill>
+                      <a:srgbClr val="000000"/>
+                    </a:solidFill>
+                    <a:latin typeface="Alibaba PuHuiTi R" pitchFamily="18" charset="-122"/>
+                    <a:ea typeface="Alibaba PuHuiTi R" pitchFamily="18" charset="-122"/>
+                    <a:cs typeface="Alibaba PuHuiTi R" pitchFamily="18" charset="-122"/>
+                  </a:rPr>
+                  <a:t>Multiple edges</a:t>
+                </a:r>
+                <a:r>
+                  <a:rPr lang="zh-CN" altLang="en-US" sz="1400" b="0" dirty="0">
+                    <a:solidFill>
+                      <a:srgbClr val="000000"/>
+                    </a:solidFill>
+                    <a:latin typeface="Alibaba PuHuiTi R" pitchFamily="18" charset="-122"/>
+                    <a:ea typeface="Alibaba PuHuiTi R" pitchFamily="18" charset="-122"/>
+                    <a:cs typeface="Alibaba PuHuiTi R" pitchFamily="18" charset="-122"/>
+                  </a:rPr>
+                  <a:t> </a:t>
+                </a:r>
+                <a:r>
+                  <a:rPr lang="en-US" altLang="zh-CN" sz="1400" b="0" dirty="0">
+                    <a:solidFill>
+                      <a:srgbClr val="000000"/>
+                    </a:solidFill>
+                    <a:latin typeface="Alibaba PuHuiTi R" pitchFamily="18" charset="-122"/>
+                    <a:ea typeface="Alibaba PuHuiTi R" pitchFamily="18" charset="-122"/>
+                    <a:cs typeface="Alibaba PuHuiTi R" pitchFamily="18" charset="-122"/>
+                  </a:rPr>
+                  <a:t>from</a:t>
+                </a:r>
+                <a:r>
+                  <a:rPr lang="zh-CN" altLang="en-US" sz="1400" b="0" dirty="0">
+                    <a:solidFill>
+                      <a:srgbClr val="000000"/>
+                    </a:solidFill>
+                    <a:latin typeface="Alibaba PuHuiTi R" pitchFamily="18" charset="-122"/>
+                    <a:ea typeface="Alibaba PuHuiTi R" pitchFamily="18" charset="-122"/>
+                    <a:cs typeface="Alibaba PuHuiTi R" pitchFamily="18" charset="-122"/>
+                  </a:rPr>
+                  <a:t> </a:t>
+                </a:r>
+                <a:r>
+                  <a:rPr lang="en-US" altLang="zh-CN" sz="1400" b="0" dirty="0" err="1">
+                    <a:solidFill>
+                      <a:srgbClr val="000000"/>
+                    </a:solidFill>
+                    <a:latin typeface="Alibaba PuHuiTi R" pitchFamily="18" charset="-122"/>
+                    <a:ea typeface="Alibaba PuHuiTi R" pitchFamily="18" charset="-122"/>
+                    <a:cs typeface="Alibaba PuHuiTi R" pitchFamily="18" charset="-122"/>
+                  </a:rPr>
+                  <a:t>src</a:t>
+                </a:r>
+                <a:r>
+                  <a:rPr lang="zh-CN" altLang="en-US" sz="1400" b="0" dirty="0">
+                    <a:solidFill>
+                      <a:srgbClr val="000000"/>
+                    </a:solidFill>
+                    <a:latin typeface="Alibaba PuHuiTi R" pitchFamily="18" charset="-122"/>
+                    <a:ea typeface="Alibaba PuHuiTi R" pitchFamily="18" charset="-122"/>
+                    <a:cs typeface="Alibaba PuHuiTi R" pitchFamily="18" charset="-122"/>
+                  </a:rPr>
+                  <a:t> </a:t>
+                </a:r>
+                <a:r>
+                  <a:rPr lang="en-US" altLang="zh-CN" sz="1400" b="0" dirty="0">
+                    <a:solidFill>
+                      <a:srgbClr val="000000"/>
+                    </a:solidFill>
+                    <a:latin typeface="Alibaba PuHuiTi R" pitchFamily="18" charset="-122"/>
+                    <a:ea typeface="Alibaba PuHuiTi R" pitchFamily="18" charset="-122"/>
+                    <a:cs typeface="Alibaba PuHuiTi R" pitchFamily="18" charset="-122"/>
+                  </a:rPr>
+                  <a:t>to</a:t>
+                </a:r>
+                <a:r>
+                  <a:rPr lang="zh-CN" altLang="en-US" sz="1400" b="0" dirty="0">
+                    <a:solidFill>
+                      <a:srgbClr val="000000"/>
+                    </a:solidFill>
+                    <a:latin typeface="Alibaba PuHuiTi R" pitchFamily="18" charset="-122"/>
+                    <a:ea typeface="Alibaba PuHuiTi R" pitchFamily="18" charset="-122"/>
+                    <a:cs typeface="Alibaba PuHuiTi R" pitchFamily="18" charset="-122"/>
+                  </a:rPr>
+                  <a:t> </a:t>
+                </a:r>
+                <a:r>
+                  <a:rPr lang="en-US" altLang="zh-CN" sz="1400" b="0" dirty="0" err="1">
+                    <a:solidFill>
+                      <a:srgbClr val="000000"/>
+                    </a:solidFill>
+                    <a:latin typeface="Alibaba PuHuiTi R" pitchFamily="18" charset="-122"/>
+                    <a:ea typeface="Alibaba PuHuiTi R" pitchFamily="18" charset="-122"/>
+                    <a:cs typeface="Alibaba PuHuiTi R" pitchFamily="18" charset="-122"/>
+                  </a:rPr>
+                  <a:t>dst</a:t>
+                </a:r>
+                <a:endParaRPr kumimoji="0" lang="zh-CN" altLang="en-US" sz="1400" b="0" u="none" strike="noStrike" kern="0" cap="none" spc="0" normalizeH="0" baseline="0" noProof="0" dirty="0">
+                  <a:ln>
+                    <a:noFill/>
+                  </a:ln>
+                  <a:solidFill>
+                    <a:srgbClr val="000000"/>
+                  </a:solidFill>
+                  <a:effectLst/>
+                  <a:uLnTx/>
+                  <a:uFillTx/>
+                  <a:latin typeface="Alibaba PuHuiTi R" pitchFamily="18" charset="-122"/>
+                  <a:ea typeface="Alibaba PuHuiTi R" pitchFamily="18" charset="-122"/>
+                  <a:cs typeface="Alibaba PuHuiTi R" pitchFamily="18" charset="-122"/>
+                  <a:sym typeface="Helvetica Light"/>
+                </a:endParaRPr>
+              </a:p>
+            </p:txBody>
+          </p:sp>
+        </p:grpSp>
       </p:grpSp>
     </p:spTree>
     <p:extLst>
       <p:ext uri="{BB962C8B-B14F-4D97-AF65-F5344CB8AC3E}">
         <p14:creationId xmlns:p14="http://schemas.microsoft.com/office/powerpoint/2010/main" val="324972270"/>
+      </p:ext>
+    </p:extLst>
+  </p:cSld>
+  <p:clrMapOvr>
+    <a:masterClrMapping/>
+  </p:clrMapOvr>
+</p:sld>
+</file>
+
+<file path=ppt/slides/slide2.xml><?xml version="1.0" encoding="utf-8"?>
+<p:sld xmlns:a="http://schemas.openxmlformats.org/drawingml/2006/main" xmlns:r="http://schemas.openxmlformats.org/officeDocument/2006/relationships" xmlns:p="http://schemas.openxmlformats.org/presentationml/2006/main">
+  <p:cSld>
+    <p:spTree>
+      <p:nvGrpSpPr>
+        <p:cNvPr id="1" name=""/>
+        <p:cNvGrpSpPr/>
+        <p:nvPr/>
+      </p:nvGrpSpPr>
+      <p:grpSpPr>
+        <a:xfrm>
+          <a:off x="0" y="0"/>
+          <a:ext cx="0" cy="0"/>
+          <a:chOff x="0" y="0"/>
+          <a:chExt cx="0" cy="0"/>
+        </a:xfrm>
+      </p:grpSpPr>
+      <p:sp>
+        <p:nvSpPr>
+          <p:cNvPr id="4" name="Rectangle 3">
+            <a:extLst>
+              <a:ext uri="{FF2B5EF4-FFF2-40B4-BE49-F238E27FC236}">
+                <a16:creationId xmlns:a16="http://schemas.microsoft.com/office/drawing/2014/main" id="{5EFB2F0D-ABB3-D995-FA04-8C359C1827B4}"/>
+              </a:ext>
+            </a:extLst>
+          </p:cNvPr>
+          <p:cNvSpPr/>
+          <p:nvPr/>
+        </p:nvSpPr>
+        <p:spPr>
+          <a:xfrm>
+            <a:off x="2468880" y="2861420"/>
+            <a:ext cx="1215845" cy="387178"/>
+          </a:xfrm>
+          <a:prstGeom prst="rect">
+            <a:avLst/>
+          </a:prstGeom>
+          <a:solidFill>
+            <a:schemeClr val="accent6">
+              <a:lumMod val="60000"/>
+              <a:lumOff val="40000"/>
+            </a:schemeClr>
+          </a:solidFill>
+          <a:ln w="22225">
+            <a:solidFill>
+              <a:schemeClr val="tx1"/>
+            </a:solidFill>
+          </a:ln>
+        </p:spPr>
+        <p:style>
+          <a:lnRef idx="2">
+            <a:schemeClr val="accent1">
+              <a:shade val="50000"/>
+            </a:schemeClr>
+          </a:lnRef>
+          <a:fillRef idx="1">
+            <a:schemeClr val="accent1"/>
+          </a:fillRef>
+          <a:effectRef idx="0">
+            <a:schemeClr val="accent1"/>
+          </a:effectRef>
+          <a:fontRef idx="minor">
+            <a:schemeClr val="lt1"/>
+          </a:fontRef>
+        </p:style>
+        <p:txBody>
+          <a:bodyPr rtlCol="0" anchor="ctr"/>
+          <a:lstStyle/>
+          <a:p>
+            <a:pPr algn="ctr"/>
+            <a:r>
+              <a:rPr lang="en-US" altLang="zh-CN" b="1" dirty="0">
+                <a:solidFill>
+                  <a:schemeClr val="tx1"/>
+                </a:solidFill>
+              </a:rPr>
+              <a:t>Person</a:t>
+            </a:r>
+            <a:endParaRPr lang="en-CN" b="1" dirty="0">
+              <a:solidFill>
+                <a:schemeClr val="tx1"/>
+              </a:solidFill>
+            </a:endParaRPr>
+          </a:p>
+        </p:txBody>
+      </p:sp>
+      <p:sp>
+        <p:nvSpPr>
+          <p:cNvPr id="5" name="Rectangle 4">
+            <a:extLst>
+              <a:ext uri="{FF2B5EF4-FFF2-40B4-BE49-F238E27FC236}">
+                <a16:creationId xmlns:a16="http://schemas.microsoft.com/office/drawing/2014/main" id="{71799D25-8F4B-3E78-7E33-C84644F1D35C}"/>
+              </a:ext>
+            </a:extLst>
+          </p:cNvPr>
+          <p:cNvSpPr/>
+          <p:nvPr/>
+        </p:nvSpPr>
+        <p:spPr>
+          <a:xfrm>
+            <a:off x="3984346" y="2861420"/>
+            <a:ext cx="1215845" cy="387178"/>
+          </a:xfrm>
+          <a:prstGeom prst="rect">
+            <a:avLst/>
+          </a:prstGeom>
+          <a:solidFill>
+            <a:srgbClr val="FF0000">
+              <a:alpha val="30000"/>
+            </a:srgbClr>
+          </a:solidFill>
+          <a:ln w="22225">
+            <a:solidFill>
+              <a:schemeClr val="tx1"/>
+            </a:solidFill>
+          </a:ln>
+        </p:spPr>
+        <p:style>
+          <a:lnRef idx="2">
+            <a:schemeClr val="accent1">
+              <a:shade val="50000"/>
+            </a:schemeClr>
+          </a:lnRef>
+          <a:fillRef idx="1">
+            <a:schemeClr val="accent1"/>
+          </a:fillRef>
+          <a:effectRef idx="0">
+            <a:schemeClr val="accent1"/>
+          </a:effectRef>
+          <a:fontRef idx="minor">
+            <a:schemeClr val="lt1"/>
+          </a:fontRef>
+        </p:style>
+        <p:txBody>
+          <a:bodyPr rtlCol="0" anchor="ctr"/>
+          <a:lstStyle/>
+          <a:p>
+            <a:pPr algn="ctr"/>
+            <a:r>
+              <a:rPr lang="en-US" altLang="zh-CN" b="1" dirty="0">
+                <a:solidFill>
+                  <a:schemeClr val="tx1"/>
+                </a:solidFill>
+              </a:rPr>
+              <a:t>Company</a:t>
+            </a:r>
+            <a:endParaRPr lang="en-CN" b="1" dirty="0">
+              <a:solidFill>
+                <a:schemeClr val="tx1"/>
+              </a:solidFill>
+            </a:endParaRPr>
+          </a:p>
+        </p:txBody>
+      </p:sp>
+      <p:sp>
+        <p:nvSpPr>
+          <p:cNvPr id="6" name="Rectangle 5">
+            <a:extLst>
+              <a:ext uri="{FF2B5EF4-FFF2-40B4-BE49-F238E27FC236}">
+                <a16:creationId xmlns:a16="http://schemas.microsoft.com/office/drawing/2014/main" id="{4C51DCB4-07F1-ACD1-2A47-E37BE04A33BA}"/>
+              </a:ext>
+            </a:extLst>
+          </p:cNvPr>
+          <p:cNvSpPr/>
+          <p:nvPr/>
+        </p:nvSpPr>
+        <p:spPr>
+          <a:xfrm>
+            <a:off x="7040605" y="2861420"/>
+            <a:ext cx="1226941" cy="387178"/>
+          </a:xfrm>
+          <a:prstGeom prst="rect">
+            <a:avLst/>
+          </a:prstGeom>
+          <a:solidFill>
+            <a:schemeClr val="accent1">
+              <a:lumMod val="60000"/>
+              <a:lumOff val="40000"/>
+            </a:schemeClr>
+          </a:solidFill>
+          <a:ln w="22225">
+            <a:solidFill>
+              <a:schemeClr val="tx1"/>
+            </a:solidFill>
+          </a:ln>
+        </p:spPr>
+        <p:style>
+          <a:lnRef idx="2">
+            <a:schemeClr val="accent1">
+              <a:shade val="50000"/>
+            </a:schemeClr>
+          </a:lnRef>
+          <a:fillRef idx="1">
+            <a:schemeClr val="accent1"/>
+          </a:fillRef>
+          <a:effectRef idx="0">
+            <a:schemeClr val="accent1"/>
+          </a:effectRef>
+          <a:fontRef idx="minor">
+            <a:schemeClr val="lt1"/>
+          </a:fontRef>
+        </p:style>
+        <p:txBody>
+          <a:bodyPr rtlCol="0" anchor="ctr"/>
+          <a:lstStyle/>
+          <a:p>
+            <a:pPr algn="ctr"/>
+            <a:r>
+              <a:rPr lang="en-US" altLang="zh-CN" b="1" dirty="0">
+                <a:solidFill>
+                  <a:schemeClr val="tx1"/>
+                </a:solidFill>
+              </a:rPr>
+              <a:t>Account</a:t>
+            </a:r>
+            <a:endParaRPr lang="en-CN" b="1" dirty="0">
+              <a:solidFill>
+                <a:schemeClr val="tx1"/>
+              </a:solidFill>
+            </a:endParaRPr>
+          </a:p>
+        </p:txBody>
+      </p:sp>
+      <p:sp>
+        <p:nvSpPr>
+          <p:cNvPr id="9" name="Rectangle 8">
+            <a:extLst>
+              <a:ext uri="{FF2B5EF4-FFF2-40B4-BE49-F238E27FC236}">
+                <a16:creationId xmlns:a16="http://schemas.microsoft.com/office/drawing/2014/main" id="{5F68F319-B446-C876-5ECA-738B6558B6E1}"/>
+              </a:ext>
+            </a:extLst>
+          </p:cNvPr>
+          <p:cNvSpPr/>
+          <p:nvPr/>
+        </p:nvSpPr>
+        <p:spPr>
+          <a:xfrm>
+            <a:off x="8567168" y="2861420"/>
+            <a:ext cx="1215845" cy="387178"/>
+          </a:xfrm>
+          <a:prstGeom prst="rect">
+            <a:avLst/>
+          </a:prstGeom>
+          <a:solidFill>
+            <a:schemeClr val="accent4">
+              <a:lumMod val="60000"/>
+              <a:lumOff val="40000"/>
+            </a:schemeClr>
+          </a:solidFill>
+          <a:ln w="22225">
+            <a:solidFill>
+              <a:schemeClr val="tx1"/>
+            </a:solidFill>
+          </a:ln>
+        </p:spPr>
+        <p:style>
+          <a:lnRef idx="2">
+            <a:schemeClr val="accent1">
+              <a:shade val="50000"/>
+            </a:schemeClr>
+          </a:lnRef>
+          <a:fillRef idx="1">
+            <a:schemeClr val="accent1"/>
+          </a:fillRef>
+          <a:effectRef idx="0">
+            <a:schemeClr val="accent1"/>
+          </a:effectRef>
+          <a:fontRef idx="minor">
+            <a:schemeClr val="lt1"/>
+          </a:fontRef>
+        </p:style>
+        <p:txBody>
+          <a:bodyPr rtlCol="0" anchor="ctr"/>
+          <a:lstStyle/>
+          <a:p>
+            <a:pPr algn="ctr"/>
+            <a:r>
+              <a:rPr lang="en-US" altLang="zh-CN" b="1" dirty="0">
+                <a:solidFill>
+                  <a:schemeClr val="tx1"/>
+                </a:solidFill>
+              </a:rPr>
+              <a:t>Medium</a:t>
+            </a:r>
+            <a:endParaRPr lang="en-CN" b="1" dirty="0">
+              <a:solidFill>
+                <a:schemeClr val="tx1"/>
+              </a:solidFill>
+            </a:endParaRPr>
+          </a:p>
+        </p:txBody>
+      </p:sp>
+      <p:sp>
+        <p:nvSpPr>
+          <p:cNvPr id="12" name="Rectangle 11">
+            <a:extLst>
+              <a:ext uri="{FF2B5EF4-FFF2-40B4-BE49-F238E27FC236}">
+                <a16:creationId xmlns:a16="http://schemas.microsoft.com/office/drawing/2014/main" id="{74363A22-BDF1-F1C7-E411-2E379C3A7160}"/>
+              </a:ext>
+            </a:extLst>
+          </p:cNvPr>
+          <p:cNvSpPr/>
+          <p:nvPr/>
+        </p:nvSpPr>
+        <p:spPr>
+          <a:xfrm>
+            <a:off x="5506920" y="2861420"/>
+            <a:ext cx="1226977" cy="387178"/>
+          </a:xfrm>
+          <a:prstGeom prst="rect">
+            <a:avLst/>
+          </a:prstGeom>
+          <a:solidFill>
+            <a:schemeClr val="accent2">
+              <a:lumMod val="60000"/>
+              <a:lumOff val="40000"/>
+            </a:schemeClr>
+          </a:solidFill>
+          <a:ln w="22225">
+            <a:solidFill>
+              <a:schemeClr val="tx1"/>
+            </a:solidFill>
+          </a:ln>
+        </p:spPr>
+        <p:style>
+          <a:lnRef idx="2">
+            <a:schemeClr val="accent1">
+              <a:shade val="50000"/>
+            </a:schemeClr>
+          </a:lnRef>
+          <a:fillRef idx="1">
+            <a:schemeClr val="accent1"/>
+          </a:fillRef>
+          <a:effectRef idx="0">
+            <a:schemeClr val="accent1"/>
+          </a:effectRef>
+          <a:fontRef idx="minor">
+            <a:schemeClr val="lt1"/>
+          </a:fontRef>
+        </p:style>
+        <p:txBody>
+          <a:bodyPr rtlCol="0" anchor="ctr"/>
+          <a:lstStyle/>
+          <a:p>
+            <a:pPr algn="ctr"/>
+            <a:r>
+              <a:rPr lang="en-US" altLang="zh-CN" b="1" dirty="0">
+                <a:solidFill>
+                  <a:schemeClr val="tx1"/>
+                </a:solidFill>
+              </a:rPr>
+              <a:t>Loan</a:t>
+            </a:r>
+            <a:endParaRPr lang="en-CN" b="1" dirty="0">
+              <a:solidFill>
+                <a:schemeClr val="tx1"/>
+              </a:solidFill>
+            </a:endParaRPr>
+          </a:p>
+        </p:txBody>
+      </p:sp>
+    </p:spTree>
+    <p:extLst>
+      <p:ext uri="{BB962C8B-B14F-4D97-AF65-F5344CB8AC3E}">
+        <p14:creationId xmlns:p14="http://schemas.microsoft.com/office/powerpoint/2010/main" val="3265552492"/>
       </p:ext>
     </p:extLst>
   </p:cSld>

</xml_diff>

<commit_message>
add acid test chapter
</commit_message>
<xml_diff>
--- a/figures/schema.pptx
+++ b/figures/schema.pptx
@@ -1,15 +1,16 @@
 
 <file path=ppt/presentation.xml><?xml version="1.0" encoding="utf-8"?>
-<p:presentation xmlns:a="http://schemas.openxmlformats.org/drawingml/2006/main" xmlns:r="http://schemas.openxmlformats.org/officeDocument/2006/relationships" xmlns:p="http://schemas.openxmlformats.org/presentationml/2006/main" saveSubsetFonts="1">
+<p:presentation xmlns:a="http://schemas.openxmlformats.org/drawingml/2006/main" xmlns:r="http://schemas.openxmlformats.org/officeDocument/2006/relationships" xmlns:p="http://schemas.openxmlformats.org/presentationml/2006/main">
   <p:sldMasterIdLst>
     <p:sldMasterId id="2147483648" r:id="rId1"/>
   </p:sldMasterIdLst>
   <p:notesMasterIdLst>
-    <p:notesMasterId r:id="rId4"/>
+    <p:notesMasterId r:id="rId5"/>
   </p:notesMasterIdLst>
   <p:sldIdLst>
-    <p:sldId id="415" r:id="rId2"/>
-    <p:sldId id="416" r:id="rId3"/>
+    <p:sldId id="415" r:id="rId3"/>
+    <p:sldId id="417" r:id="rId4"/>
+    <p:sldId id="416" r:id="rId6"/>
   </p:sldIdLst>
   <p:sldSz cx="12192000" cy="6858000"/>
   <p:notesSz cx="6858000" cy="9144000"/>
@@ -114,13 +115,11 @@
         <p14:section name="默认节" id="{1EEC304E-9EA9-44B3-83A5-4400A19A585D}">
           <p14:sldIdLst>
             <p14:sldId id="415"/>
+            <p14:sldId id="417"/>
             <p14:sldId id="416"/>
           </p14:sldIdLst>
         </p14:section>
       </p14:sectionLst>
-    </p:ext>
-    <p:ext uri="{EFAFB233-063F-42B5-8137-9DF3F51BA10A}">
-      <p15:sldGuideLst xmlns:p15="http://schemas.microsoft.com/office/powerpoint/2012/main"/>
     </p:ext>
   </p:extLst>
 </p:presentation>
@@ -208,7 +207,6 @@
           <a:p>
             <a:fld id="{CAD4BD24-A097-4F9D-85E9-6A2A24CA2D98}" type="datetimeFigureOut">
               <a:rPr lang="zh-CN" altLang="en-US" smtClean="0"/>
-              <a:t>2022/11/12</a:t>
             </a:fld>
             <a:endParaRPr lang="zh-CN" altLang="en-US"/>
           </a:p>
@@ -275,6 +273,7 @@
               <a:rPr lang="zh-CN" altLang="en-US"/>
               <a:t>单击此处编辑母版文本样式</a:t>
             </a:r>
+            <a:endParaRPr lang="zh-CN" altLang="en-US"/>
           </a:p>
           <a:p>
             <a:pPr lvl="1"/>
@@ -282,6 +281,7 @@
               <a:rPr lang="zh-CN" altLang="en-US"/>
               <a:t>第二级</a:t>
             </a:r>
+            <a:endParaRPr lang="zh-CN" altLang="en-US"/>
           </a:p>
           <a:p>
             <a:pPr lvl="2"/>
@@ -289,6 +289,7 @@
               <a:rPr lang="zh-CN" altLang="en-US"/>
               <a:t>第三级</a:t>
             </a:r>
+            <a:endParaRPr lang="zh-CN" altLang="en-US"/>
           </a:p>
           <a:p>
             <a:pPr lvl="3"/>
@@ -296,6 +297,7 @@
               <a:rPr lang="zh-CN" altLang="en-US"/>
               <a:t>第四级</a:t>
             </a:r>
+            <a:endParaRPr lang="zh-CN" altLang="en-US"/>
           </a:p>
           <a:p>
             <a:pPr lvl="4"/>
@@ -303,6 +305,7 @@
               <a:rPr lang="zh-CN" altLang="en-US"/>
               <a:t>第五级</a:t>
             </a:r>
+            <a:endParaRPr lang="zh-CN" altLang="en-US"/>
           </a:p>
         </p:txBody>
       </p:sp>
@@ -366,18 +369,12 @@
           <a:p>
             <a:fld id="{4F292EE1-EB42-416D-BE21-6D6219010E5F}" type="slidenum">
               <a:rPr lang="zh-CN" altLang="en-US" smtClean="0"/>
-              <a:t>‹#›</a:t>
             </a:fld>
             <a:endParaRPr lang="zh-CN" altLang="en-US"/>
           </a:p>
         </p:txBody>
       </p:sp>
     </p:spTree>
-    <p:extLst>
-      <p:ext uri="{BB962C8B-B14F-4D97-AF65-F5344CB8AC3E}">
-        <p14:creationId xmlns:p14="http://schemas.microsoft.com/office/powerpoint/2010/main" val="1541082267"/>
-      </p:ext>
-    </p:extLst>
   </p:cSld>
   <p:clrMap bg1="lt1" tx1="dk1" bg2="lt2" tx2="dk2" accent1="accent1" accent2="accent2" accent3="accent3" accent4="accent4" accent5="accent5" accent6="accent6" hlink="hlink" folHlink="folHlink"/>
   <p:notesStyle>
@@ -475,6 +472,50 @@
 </p:notesMaster>
 </file>
 
+<file path=ppt/notesSlides/notesSlide1.xml><?xml version="1.0" encoding="utf-8"?>
+<p:notes xmlns:a="http://schemas.openxmlformats.org/drawingml/2006/main" xmlns:r="http://schemas.openxmlformats.org/officeDocument/2006/relationships" xmlns:p="http://schemas.openxmlformats.org/presentationml/2006/main">
+  <p:cSld>
+    <p:spTree>
+      <p:nvGrpSpPr>
+        <p:cNvPr id="1" name=""/>
+        <p:cNvGrpSpPr/>
+        <p:nvPr/>
+      </p:nvGrpSpPr>
+      <p:grpSpPr/>
+      <p:sp>
+        <p:nvSpPr>
+          <p:cNvPr id="2" name="幻灯片图像占位符 1"/>
+          <p:cNvSpPr/>
+          <p:nvPr>
+            <p:ph type="sldImg" idx="2"/>
+          </p:nvPr>
+        </p:nvSpPr>
+        <p:spPr/>
+      </p:sp>
+      <p:sp>
+        <p:nvSpPr>
+          <p:cNvPr id="3" name="文本占位符 2"/>
+          <p:cNvSpPr/>
+          <p:nvPr>
+            <p:ph type="body" idx="3"/>
+          </p:nvPr>
+        </p:nvSpPr>
+        <p:spPr/>
+        <p:txBody>
+          <a:bodyPr/>
+          <a:p>
+            <a:endParaRPr lang="zh-CN" altLang="en-US"/>
+          </a:p>
+        </p:txBody>
+      </p:sp>
+    </p:spTree>
+  </p:cSld>
+  <p:clrMapOvr>
+    <a:masterClrMapping/>
+  </p:clrMapOvr>
+</p:notes>
+</file>
+
 <file path=ppt/slideLayouts/slideLayout1.xml><?xml version="1.0" encoding="utf-8"?>
 <p:sldLayout xmlns:a="http://schemas.openxmlformats.org/drawingml/2006/main" xmlns:r="http://schemas.openxmlformats.org/officeDocument/2006/relationships" xmlns:p="http://schemas.openxmlformats.org/presentationml/2006/main" type="title" preserve="1">
   <p:cSld name="标题幻灯片">
@@ -520,6 +561,7 @@
               <a:rPr lang="zh-CN" altLang="en-US"/>
               <a:t>单击此处编辑母版标题样式</a:t>
             </a:r>
+            <a:endParaRPr lang="zh-CN" altLang="en-US"/>
           </a:p>
         </p:txBody>
       </p:sp>
@@ -584,15 +626,11 @@
               <a:rPr lang="zh-CN" altLang="en-US"/>
               <a:t>单击此处编辑母版副标题样式</a:t>
             </a:r>
+            <a:endParaRPr lang="zh-CN" altLang="en-US"/>
           </a:p>
         </p:txBody>
       </p:sp>
     </p:spTree>
-    <p:extLst>
-      <p:ext uri="{BB962C8B-B14F-4D97-AF65-F5344CB8AC3E}">
-        <p14:creationId xmlns:p14="http://schemas.microsoft.com/office/powerpoint/2010/main" val="3908105507"/>
-      </p:ext>
-    </p:extLst>
   </p:cSld>
   <p:clrMapOvr>
     <a:masterClrMapping/>
@@ -636,6 +674,7 @@
               <a:rPr lang="zh-CN" altLang="en-US"/>
               <a:t>单击此处编辑母版标题样式</a:t>
             </a:r>
+            <a:endParaRPr lang="zh-CN" altLang="en-US"/>
           </a:p>
         </p:txBody>
       </p:sp>
@@ -646,7 +685,7 @@
             <a:spLocks noGrp="1"/>
           </p:cNvSpPr>
           <p:nvPr>
-            <p:ph type="body" orient="vert" idx="1"/>
+            <p:ph type="body" orient="vert" idx="1" hasCustomPrompt="1"/>
           </p:nvPr>
         </p:nvSpPr>
         <p:spPr/>
@@ -659,6 +698,7 @@
               <a:rPr lang="zh-CN" altLang="en-US"/>
               <a:t>编辑母版文本样式</a:t>
             </a:r>
+            <a:endParaRPr lang="zh-CN" altLang="en-US"/>
           </a:p>
           <a:p>
             <a:pPr lvl="1"/>
@@ -666,6 +706,7 @@
               <a:rPr lang="zh-CN" altLang="en-US"/>
               <a:t>第二级</a:t>
             </a:r>
+            <a:endParaRPr lang="zh-CN" altLang="en-US"/>
           </a:p>
           <a:p>
             <a:pPr lvl="2"/>
@@ -673,6 +714,7 @@
               <a:rPr lang="zh-CN" altLang="en-US"/>
               <a:t>第三级</a:t>
             </a:r>
+            <a:endParaRPr lang="zh-CN" altLang="en-US"/>
           </a:p>
           <a:p>
             <a:pPr lvl="3"/>
@@ -680,6 +722,7 @@
               <a:rPr lang="zh-CN" altLang="en-US"/>
               <a:t>第四级</a:t>
             </a:r>
+            <a:endParaRPr lang="zh-CN" altLang="en-US"/>
           </a:p>
           <a:p>
             <a:pPr lvl="4"/>
@@ -687,15 +730,11 @@
               <a:rPr lang="zh-CN" altLang="en-US"/>
               <a:t>第五级</a:t>
             </a:r>
+            <a:endParaRPr lang="zh-CN" altLang="en-US"/>
           </a:p>
         </p:txBody>
       </p:sp>
     </p:spTree>
-    <p:extLst>
-      <p:ext uri="{BB962C8B-B14F-4D97-AF65-F5344CB8AC3E}">
-        <p14:creationId xmlns:p14="http://schemas.microsoft.com/office/powerpoint/2010/main" val="3805088680"/>
-      </p:ext>
-    </p:extLst>
   </p:cSld>
   <p:clrMapOvr>
     <a:masterClrMapping/>
@@ -744,6 +783,7 @@
               <a:rPr lang="zh-CN" altLang="en-US"/>
               <a:t>单击此处编辑母版标题样式</a:t>
             </a:r>
+            <a:endParaRPr lang="zh-CN" altLang="en-US"/>
           </a:p>
         </p:txBody>
       </p:sp>
@@ -754,7 +794,7 @@
             <a:spLocks noGrp="1"/>
           </p:cNvSpPr>
           <p:nvPr>
-            <p:ph type="body" orient="vert" idx="1"/>
+            <p:ph type="body" orient="vert" idx="1" hasCustomPrompt="1"/>
           </p:nvPr>
         </p:nvSpPr>
         <p:spPr>
@@ -772,6 +812,7 @@
               <a:rPr lang="zh-CN" altLang="en-US"/>
               <a:t>编辑母版文本样式</a:t>
             </a:r>
+            <a:endParaRPr lang="zh-CN" altLang="en-US"/>
           </a:p>
           <a:p>
             <a:pPr lvl="1"/>
@@ -779,6 +820,7 @@
               <a:rPr lang="zh-CN" altLang="en-US"/>
               <a:t>第二级</a:t>
             </a:r>
+            <a:endParaRPr lang="zh-CN" altLang="en-US"/>
           </a:p>
           <a:p>
             <a:pPr lvl="2"/>
@@ -786,6 +828,7 @@
               <a:rPr lang="zh-CN" altLang="en-US"/>
               <a:t>第三级</a:t>
             </a:r>
+            <a:endParaRPr lang="zh-CN" altLang="en-US"/>
           </a:p>
           <a:p>
             <a:pPr lvl="3"/>
@@ -793,6 +836,7 @@
               <a:rPr lang="zh-CN" altLang="en-US"/>
               <a:t>第四级</a:t>
             </a:r>
+            <a:endParaRPr lang="zh-CN" altLang="en-US"/>
           </a:p>
           <a:p>
             <a:pPr lvl="4"/>
@@ -800,15 +844,11 @@
               <a:rPr lang="zh-CN" altLang="en-US"/>
               <a:t>第五级</a:t>
             </a:r>
+            <a:endParaRPr lang="zh-CN" altLang="en-US"/>
           </a:p>
         </p:txBody>
       </p:sp>
     </p:spTree>
-    <p:extLst>
-      <p:ext uri="{BB962C8B-B14F-4D97-AF65-F5344CB8AC3E}">
-        <p14:creationId xmlns:p14="http://schemas.microsoft.com/office/powerpoint/2010/main" val="3288526317"/>
-      </p:ext>
-    </p:extLst>
   </p:cSld>
   <p:clrMapOvr>
     <a:masterClrMapping/>
@@ -852,6 +892,7 @@
               <a:rPr lang="zh-CN" altLang="en-US"/>
               <a:t>单击此处编辑母版标题样式</a:t>
             </a:r>
+            <a:endParaRPr lang="zh-CN" altLang="en-US"/>
           </a:p>
         </p:txBody>
       </p:sp>
@@ -862,7 +903,7 @@
             <a:spLocks noGrp="1"/>
           </p:cNvSpPr>
           <p:nvPr>
-            <p:ph idx="1"/>
+            <p:ph idx="1" hasCustomPrompt="1"/>
           </p:nvPr>
         </p:nvSpPr>
         <p:spPr/>
@@ -875,6 +916,7 @@
               <a:rPr lang="zh-CN" altLang="en-US"/>
               <a:t>编辑母版文本样式</a:t>
             </a:r>
+            <a:endParaRPr lang="zh-CN" altLang="en-US"/>
           </a:p>
           <a:p>
             <a:pPr lvl="1"/>
@@ -882,6 +924,7 @@
               <a:rPr lang="zh-CN" altLang="en-US"/>
               <a:t>第二级</a:t>
             </a:r>
+            <a:endParaRPr lang="zh-CN" altLang="en-US"/>
           </a:p>
           <a:p>
             <a:pPr lvl="2"/>
@@ -889,6 +932,7 @@
               <a:rPr lang="zh-CN" altLang="en-US"/>
               <a:t>第三级</a:t>
             </a:r>
+            <a:endParaRPr lang="zh-CN" altLang="en-US"/>
           </a:p>
           <a:p>
             <a:pPr lvl="3"/>
@@ -896,6 +940,7 @@
               <a:rPr lang="zh-CN" altLang="en-US"/>
               <a:t>第四级</a:t>
             </a:r>
+            <a:endParaRPr lang="zh-CN" altLang="en-US"/>
           </a:p>
           <a:p>
             <a:pPr lvl="4"/>
@@ -903,15 +948,11 @@
               <a:rPr lang="zh-CN" altLang="en-US"/>
               <a:t>第五级</a:t>
             </a:r>
+            <a:endParaRPr lang="zh-CN" altLang="en-US"/>
           </a:p>
         </p:txBody>
       </p:sp>
     </p:spTree>
-    <p:extLst>
-      <p:ext uri="{BB962C8B-B14F-4D97-AF65-F5344CB8AC3E}">
-        <p14:creationId xmlns:p14="http://schemas.microsoft.com/office/powerpoint/2010/main" val="4068014718"/>
-      </p:ext>
-    </p:extLst>
   </p:cSld>
   <p:clrMapOvr>
     <a:masterClrMapping/>
@@ -964,6 +1005,7 @@
               <a:rPr lang="zh-CN" altLang="en-US"/>
               <a:t>单击此处编辑母版标题样式</a:t>
             </a:r>
+            <a:endParaRPr lang="zh-CN" altLang="en-US"/>
           </a:p>
         </p:txBody>
       </p:sp>
@@ -974,7 +1016,7 @@
             <a:spLocks noGrp="1"/>
           </p:cNvSpPr>
           <p:nvPr>
-            <p:ph type="body" idx="1"/>
+            <p:ph type="body" idx="1" hasCustomPrompt="1"/>
           </p:nvPr>
         </p:nvSpPr>
         <p:spPr>
@@ -1083,15 +1125,11 @@
               <a:rPr lang="zh-CN" altLang="en-US"/>
               <a:t>编辑母版文本样式</a:t>
             </a:r>
+            <a:endParaRPr lang="zh-CN" altLang="en-US"/>
           </a:p>
         </p:txBody>
       </p:sp>
     </p:spTree>
-    <p:extLst>
-      <p:ext uri="{BB962C8B-B14F-4D97-AF65-F5344CB8AC3E}">
-        <p14:creationId xmlns:p14="http://schemas.microsoft.com/office/powerpoint/2010/main" val="4127098996"/>
-      </p:ext>
-    </p:extLst>
   </p:cSld>
   <p:clrMapOvr>
     <a:masterClrMapping/>
@@ -1135,6 +1173,7 @@
               <a:rPr lang="zh-CN" altLang="en-US"/>
               <a:t>单击此处编辑母版标题样式</a:t>
             </a:r>
+            <a:endParaRPr lang="zh-CN" altLang="en-US"/>
           </a:p>
         </p:txBody>
       </p:sp>
@@ -1145,7 +1184,7 @@
             <a:spLocks noGrp="1"/>
           </p:cNvSpPr>
           <p:nvPr>
-            <p:ph sz="half" idx="1"/>
+            <p:ph sz="half" idx="1" hasCustomPrompt="1"/>
           </p:nvPr>
         </p:nvSpPr>
         <p:spPr>
@@ -1163,6 +1202,7 @@
               <a:rPr lang="zh-CN" altLang="en-US"/>
               <a:t>编辑母版文本样式</a:t>
             </a:r>
+            <a:endParaRPr lang="zh-CN" altLang="en-US"/>
           </a:p>
           <a:p>
             <a:pPr lvl="1"/>
@@ -1170,6 +1210,7 @@
               <a:rPr lang="zh-CN" altLang="en-US"/>
               <a:t>第二级</a:t>
             </a:r>
+            <a:endParaRPr lang="zh-CN" altLang="en-US"/>
           </a:p>
           <a:p>
             <a:pPr lvl="2"/>
@@ -1177,6 +1218,7 @@
               <a:rPr lang="zh-CN" altLang="en-US"/>
               <a:t>第三级</a:t>
             </a:r>
+            <a:endParaRPr lang="zh-CN" altLang="en-US"/>
           </a:p>
           <a:p>
             <a:pPr lvl="3"/>
@@ -1184,6 +1226,7 @@
               <a:rPr lang="zh-CN" altLang="en-US"/>
               <a:t>第四级</a:t>
             </a:r>
+            <a:endParaRPr lang="zh-CN" altLang="en-US"/>
           </a:p>
           <a:p>
             <a:pPr lvl="4"/>
@@ -1191,6 +1234,7 @@
               <a:rPr lang="zh-CN" altLang="en-US"/>
               <a:t>第五级</a:t>
             </a:r>
+            <a:endParaRPr lang="zh-CN" altLang="en-US"/>
           </a:p>
         </p:txBody>
       </p:sp>
@@ -1201,7 +1245,7 @@
             <a:spLocks noGrp="1"/>
           </p:cNvSpPr>
           <p:nvPr>
-            <p:ph sz="half" idx="2"/>
+            <p:ph sz="half" idx="2" hasCustomPrompt="1"/>
           </p:nvPr>
         </p:nvSpPr>
         <p:spPr>
@@ -1219,6 +1263,7 @@
               <a:rPr lang="zh-CN" altLang="en-US"/>
               <a:t>编辑母版文本样式</a:t>
             </a:r>
+            <a:endParaRPr lang="zh-CN" altLang="en-US"/>
           </a:p>
           <a:p>
             <a:pPr lvl="1"/>
@@ -1226,6 +1271,7 @@
               <a:rPr lang="zh-CN" altLang="en-US"/>
               <a:t>第二级</a:t>
             </a:r>
+            <a:endParaRPr lang="zh-CN" altLang="en-US"/>
           </a:p>
           <a:p>
             <a:pPr lvl="2"/>
@@ -1233,6 +1279,7 @@
               <a:rPr lang="zh-CN" altLang="en-US"/>
               <a:t>第三级</a:t>
             </a:r>
+            <a:endParaRPr lang="zh-CN" altLang="en-US"/>
           </a:p>
           <a:p>
             <a:pPr lvl="3"/>
@@ -1240,6 +1287,7 @@
               <a:rPr lang="zh-CN" altLang="en-US"/>
               <a:t>第四级</a:t>
             </a:r>
+            <a:endParaRPr lang="zh-CN" altLang="en-US"/>
           </a:p>
           <a:p>
             <a:pPr lvl="4"/>
@@ -1247,15 +1295,11 @@
               <a:rPr lang="zh-CN" altLang="en-US"/>
               <a:t>第五级</a:t>
             </a:r>
+            <a:endParaRPr lang="zh-CN" altLang="en-US"/>
           </a:p>
         </p:txBody>
       </p:sp>
     </p:spTree>
-    <p:extLst>
-      <p:ext uri="{BB962C8B-B14F-4D97-AF65-F5344CB8AC3E}">
-        <p14:creationId xmlns:p14="http://schemas.microsoft.com/office/powerpoint/2010/main" val="3122155552"/>
-      </p:ext>
-    </p:extLst>
   </p:cSld>
   <p:clrMapOvr>
     <a:masterClrMapping/>
@@ -1304,6 +1348,7 @@
               <a:rPr lang="zh-CN" altLang="en-US"/>
               <a:t>单击此处编辑母版标题样式</a:t>
             </a:r>
+            <a:endParaRPr lang="zh-CN" altLang="en-US"/>
           </a:p>
         </p:txBody>
       </p:sp>
@@ -1314,7 +1359,7 @@
             <a:spLocks noGrp="1"/>
           </p:cNvSpPr>
           <p:nvPr>
-            <p:ph type="body" idx="1"/>
+            <p:ph type="body" idx="1" hasCustomPrompt="1"/>
           </p:nvPr>
         </p:nvSpPr>
         <p:spPr>
@@ -1369,6 +1414,7 @@
               <a:rPr lang="zh-CN" altLang="en-US"/>
               <a:t>编辑母版文本样式</a:t>
             </a:r>
+            <a:endParaRPr lang="zh-CN" altLang="en-US"/>
           </a:p>
         </p:txBody>
       </p:sp>
@@ -1379,7 +1425,7 @@
             <a:spLocks noGrp="1"/>
           </p:cNvSpPr>
           <p:nvPr>
-            <p:ph sz="half" idx="2"/>
+            <p:ph sz="half" idx="2" hasCustomPrompt="1"/>
           </p:nvPr>
         </p:nvSpPr>
         <p:spPr>
@@ -1397,6 +1443,7 @@
               <a:rPr lang="zh-CN" altLang="en-US"/>
               <a:t>编辑母版文本样式</a:t>
             </a:r>
+            <a:endParaRPr lang="zh-CN" altLang="en-US"/>
           </a:p>
           <a:p>
             <a:pPr lvl="1"/>
@@ -1404,6 +1451,7 @@
               <a:rPr lang="zh-CN" altLang="en-US"/>
               <a:t>第二级</a:t>
             </a:r>
+            <a:endParaRPr lang="zh-CN" altLang="en-US"/>
           </a:p>
           <a:p>
             <a:pPr lvl="2"/>
@@ -1411,6 +1459,7 @@
               <a:rPr lang="zh-CN" altLang="en-US"/>
               <a:t>第三级</a:t>
             </a:r>
+            <a:endParaRPr lang="zh-CN" altLang="en-US"/>
           </a:p>
           <a:p>
             <a:pPr lvl="3"/>
@@ -1418,6 +1467,7 @@
               <a:rPr lang="zh-CN" altLang="en-US"/>
               <a:t>第四级</a:t>
             </a:r>
+            <a:endParaRPr lang="zh-CN" altLang="en-US"/>
           </a:p>
           <a:p>
             <a:pPr lvl="4"/>
@@ -1425,6 +1475,7 @@
               <a:rPr lang="zh-CN" altLang="en-US"/>
               <a:t>第五级</a:t>
             </a:r>
+            <a:endParaRPr lang="zh-CN" altLang="en-US"/>
           </a:p>
         </p:txBody>
       </p:sp>
@@ -1435,7 +1486,7 @@
             <a:spLocks noGrp="1"/>
           </p:cNvSpPr>
           <p:nvPr>
-            <p:ph type="body" sz="quarter" idx="3"/>
+            <p:ph type="body" sz="quarter" idx="3" hasCustomPrompt="1"/>
           </p:nvPr>
         </p:nvSpPr>
         <p:spPr>
@@ -1490,6 +1541,7 @@
               <a:rPr lang="zh-CN" altLang="en-US"/>
               <a:t>编辑母版文本样式</a:t>
             </a:r>
+            <a:endParaRPr lang="zh-CN" altLang="en-US"/>
           </a:p>
         </p:txBody>
       </p:sp>
@@ -1500,7 +1552,7 @@
             <a:spLocks noGrp="1"/>
           </p:cNvSpPr>
           <p:nvPr>
-            <p:ph sz="quarter" idx="4"/>
+            <p:ph sz="quarter" idx="4" hasCustomPrompt="1"/>
           </p:nvPr>
         </p:nvSpPr>
         <p:spPr>
@@ -1518,6 +1570,7 @@
               <a:rPr lang="zh-CN" altLang="en-US"/>
               <a:t>编辑母版文本样式</a:t>
             </a:r>
+            <a:endParaRPr lang="zh-CN" altLang="en-US"/>
           </a:p>
           <a:p>
             <a:pPr lvl="1"/>
@@ -1525,6 +1578,7 @@
               <a:rPr lang="zh-CN" altLang="en-US"/>
               <a:t>第二级</a:t>
             </a:r>
+            <a:endParaRPr lang="zh-CN" altLang="en-US"/>
           </a:p>
           <a:p>
             <a:pPr lvl="2"/>
@@ -1532,6 +1586,7 @@
               <a:rPr lang="zh-CN" altLang="en-US"/>
               <a:t>第三级</a:t>
             </a:r>
+            <a:endParaRPr lang="zh-CN" altLang="en-US"/>
           </a:p>
           <a:p>
             <a:pPr lvl="3"/>
@@ -1539,6 +1594,7 @@
               <a:rPr lang="zh-CN" altLang="en-US"/>
               <a:t>第四级</a:t>
             </a:r>
+            <a:endParaRPr lang="zh-CN" altLang="en-US"/>
           </a:p>
           <a:p>
             <a:pPr lvl="4"/>
@@ -1546,15 +1602,11 @@
               <a:rPr lang="zh-CN" altLang="en-US"/>
               <a:t>第五级</a:t>
             </a:r>
+            <a:endParaRPr lang="zh-CN" altLang="en-US"/>
           </a:p>
         </p:txBody>
       </p:sp>
     </p:spTree>
-    <p:extLst>
-      <p:ext uri="{BB962C8B-B14F-4D97-AF65-F5344CB8AC3E}">
-        <p14:creationId xmlns:p14="http://schemas.microsoft.com/office/powerpoint/2010/main" val="47388910"/>
-      </p:ext>
-    </p:extLst>
   </p:cSld>
   <p:clrMapOvr>
     <a:masterClrMapping/>
@@ -1598,15 +1650,11 @@
               <a:rPr lang="zh-CN" altLang="en-US"/>
               <a:t>单击此处编辑母版标题样式</a:t>
             </a:r>
+            <a:endParaRPr lang="zh-CN" altLang="en-US"/>
           </a:p>
         </p:txBody>
       </p:sp>
     </p:spTree>
-    <p:extLst>
-      <p:ext uri="{BB962C8B-B14F-4D97-AF65-F5344CB8AC3E}">
-        <p14:creationId xmlns:p14="http://schemas.microsoft.com/office/powerpoint/2010/main" val="1758752746"/>
-      </p:ext>
-    </p:extLst>
   </p:cSld>
   <p:clrMapOvr>
     <a:masterClrMapping/>
@@ -1632,11 +1680,6 @@
         </a:xfrm>
       </p:grpSpPr>
     </p:spTree>
-    <p:extLst>
-      <p:ext uri="{BB962C8B-B14F-4D97-AF65-F5344CB8AC3E}">
-        <p14:creationId xmlns:p14="http://schemas.microsoft.com/office/powerpoint/2010/main" val="1817792897"/>
-      </p:ext>
-    </p:extLst>
   </p:cSld>
   <p:clrMapOvr>
     <a:masterClrMapping/>
@@ -1689,6 +1732,7 @@
               <a:rPr lang="zh-CN" altLang="en-US"/>
               <a:t>单击此处编辑母版标题样式</a:t>
             </a:r>
+            <a:endParaRPr lang="zh-CN" altLang="en-US"/>
           </a:p>
         </p:txBody>
       </p:sp>
@@ -1699,7 +1743,7 @@
             <a:spLocks noGrp="1"/>
           </p:cNvSpPr>
           <p:nvPr>
-            <p:ph idx="1"/>
+            <p:ph idx="1" hasCustomPrompt="1"/>
           </p:nvPr>
         </p:nvSpPr>
         <p:spPr>
@@ -1745,6 +1789,7 @@
               <a:rPr lang="zh-CN" altLang="en-US"/>
               <a:t>编辑母版文本样式</a:t>
             </a:r>
+            <a:endParaRPr lang="zh-CN" altLang="en-US"/>
           </a:p>
           <a:p>
             <a:pPr lvl="1"/>
@@ -1752,6 +1797,7 @@
               <a:rPr lang="zh-CN" altLang="en-US"/>
               <a:t>第二级</a:t>
             </a:r>
+            <a:endParaRPr lang="zh-CN" altLang="en-US"/>
           </a:p>
           <a:p>
             <a:pPr lvl="2"/>
@@ -1759,6 +1805,7 @@
               <a:rPr lang="zh-CN" altLang="en-US"/>
               <a:t>第三级</a:t>
             </a:r>
+            <a:endParaRPr lang="zh-CN" altLang="en-US"/>
           </a:p>
           <a:p>
             <a:pPr lvl="3"/>
@@ -1766,6 +1813,7 @@
               <a:rPr lang="zh-CN" altLang="en-US"/>
               <a:t>第四级</a:t>
             </a:r>
+            <a:endParaRPr lang="zh-CN" altLang="en-US"/>
           </a:p>
           <a:p>
             <a:pPr lvl="4"/>
@@ -1773,6 +1821,7 @@
               <a:rPr lang="zh-CN" altLang="en-US"/>
               <a:t>第五级</a:t>
             </a:r>
+            <a:endParaRPr lang="zh-CN" altLang="en-US"/>
           </a:p>
         </p:txBody>
       </p:sp>
@@ -1783,7 +1832,7 @@
             <a:spLocks noGrp="1"/>
           </p:cNvSpPr>
           <p:nvPr>
-            <p:ph type="body" sz="half" idx="2"/>
+            <p:ph type="body" sz="half" idx="2" hasCustomPrompt="1"/>
           </p:nvPr>
         </p:nvSpPr>
         <p:spPr>
@@ -1838,15 +1887,11 @@
               <a:rPr lang="zh-CN" altLang="en-US"/>
               <a:t>编辑母版文本样式</a:t>
             </a:r>
+            <a:endParaRPr lang="zh-CN" altLang="en-US"/>
           </a:p>
         </p:txBody>
       </p:sp>
     </p:spTree>
-    <p:extLst>
-      <p:ext uri="{BB962C8B-B14F-4D97-AF65-F5344CB8AC3E}">
-        <p14:creationId xmlns:p14="http://schemas.microsoft.com/office/powerpoint/2010/main" val="1429949822"/>
-      </p:ext>
-    </p:extLst>
   </p:cSld>
   <p:clrMapOvr>
     <a:masterClrMapping/>
@@ -1899,6 +1944,7 @@
               <a:rPr lang="zh-CN" altLang="en-US"/>
               <a:t>单击此处编辑母版标题样式</a:t>
             </a:r>
+            <a:endParaRPr lang="zh-CN" altLang="en-US"/>
           </a:p>
         </p:txBody>
       </p:sp>
@@ -1963,6 +2009,7 @@
               <a:rPr lang="zh-CN" altLang="en-US"/>
               <a:t>单击图标添加图片</a:t>
             </a:r>
+            <a:endParaRPr lang="zh-CN" altLang="en-US"/>
           </a:p>
         </p:txBody>
       </p:sp>
@@ -1973,7 +2020,7 @@
             <a:spLocks noGrp="1"/>
           </p:cNvSpPr>
           <p:nvPr>
-            <p:ph type="body" sz="half" idx="2"/>
+            <p:ph type="body" sz="half" idx="2" hasCustomPrompt="1"/>
           </p:nvPr>
         </p:nvSpPr>
         <p:spPr>
@@ -2028,15 +2075,11 @@
               <a:rPr lang="zh-CN" altLang="en-US"/>
               <a:t>编辑母版文本样式</a:t>
             </a:r>
+            <a:endParaRPr lang="zh-CN" altLang="en-US"/>
           </a:p>
         </p:txBody>
       </p:sp>
     </p:spTree>
-    <p:extLst>
-      <p:ext uri="{BB962C8B-B14F-4D97-AF65-F5344CB8AC3E}">
-        <p14:creationId xmlns:p14="http://schemas.microsoft.com/office/powerpoint/2010/main" val="3064767483"/>
-      </p:ext>
-    </p:extLst>
   </p:cSld>
   <p:clrMapOvr>
     <a:masterClrMapping/>
@@ -2095,6 +2138,7 @@
               <a:rPr lang="zh-CN" altLang="en-US"/>
               <a:t>单击此处编辑母版标题样式</a:t>
             </a:r>
+            <a:endParaRPr lang="zh-CN" altLang="en-US"/>
           </a:p>
         </p:txBody>
       </p:sp>
@@ -2128,6 +2172,7 @@
               <a:rPr lang="zh-CN" altLang="en-US" dirty="0"/>
               <a:t>编辑母版文本样式</a:t>
             </a:r>
+            <a:endParaRPr lang="zh-CN" altLang="en-US" dirty="0"/>
           </a:p>
           <a:p>
             <a:pPr lvl="1"/>
@@ -2135,6 +2180,7 @@
               <a:rPr lang="zh-CN" altLang="en-US" dirty="0"/>
               <a:t>第二级</a:t>
             </a:r>
+            <a:endParaRPr lang="zh-CN" altLang="en-US" dirty="0"/>
           </a:p>
           <a:p>
             <a:pPr lvl="2"/>
@@ -2142,6 +2188,7 @@
               <a:rPr lang="zh-CN" altLang="en-US" dirty="0"/>
               <a:t>第三级</a:t>
             </a:r>
+            <a:endParaRPr lang="zh-CN" altLang="en-US" dirty="0"/>
           </a:p>
           <a:p>
             <a:pPr lvl="3"/>
@@ -2149,6 +2196,7 @@
               <a:rPr lang="zh-CN" altLang="en-US" dirty="0"/>
               <a:t>第四级</a:t>
             </a:r>
+            <a:endParaRPr lang="zh-CN" altLang="en-US" dirty="0"/>
           </a:p>
           <a:p>
             <a:pPr lvl="4"/>
@@ -2156,15 +2204,11 @@
               <a:rPr lang="zh-CN" altLang="en-US" dirty="0"/>
               <a:t>第五级</a:t>
             </a:r>
+            <a:endParaRPr lang="zh-CN" altLang="en-US" dirty="0"/>
           </a:p>
         </p:txBody>
       </p:sp>
     </p:spTree>
-    <p:extLst>
-      <p:ext uri="{BB962C8B-B14F-4D97-AF65-F5344CB8AC3E}">
-        <p14:creationId xmlns:p14="http://schemas.microsoft.com/office/powerpoint/2010/main" val="1468480323"/>
-      </p:ext>
-    </p:extLst>
   </p:cSld>
   <p:clrMap bg1="lt1" tx1="dk1" bg2="lt2" tx2="dk2" accent1="accent1" accent2="accent2" accent3="accent3" accent4="accent4" accent5="accent5" accent6="accent6" hlink="hlink" folHlink="folHlink"/>
   <p:sldLayoutIdLst>
@@ -2209,7 +2253,7 @@
         <a:spcBef>
           <a:spcPts val="1000"/>
         </a:spcBef>
-        <a:buFont typeface="Arial" panose="020B0604020202020204" pitchFamily="34" charset="0"/>
+        <a:buFont typeface="Arial" panose="020B0604020202090204" pitchFamily="34" charset="0"/>
         <a:buChar char="•"/>
         <a:defRPr sz="2800" kern="1200">
           <a:solidFill>
@@ -2227,7 +2271,7 @@
         <a:spcBef>
           <a:spcPts val="500"/>
         </a:spcBef>
-        <a:buFont typeface="Arial" panose="020B0604020202020204" pitchFamily="34" charset="0"/>
+        <a:buFont typeface="Arial" panose="020B0604020202090204" pitchFamily="34" charset="0"/>
         <a:buChar char="•"/>
         <a:defRPr sz="2400" kern="1200">
           <a:solidFill>
@@ -2245,7 +2289,7 @@
         <a:spcBef>
           <a:spcPts val="500"/>
         </a:spcBef>
-        <a:buFont typeface="Arial" panose="020B0604020202020204" pitchFamily="34" charset="0"/>
+        <a:buFont typeface="Arial" panose="020B0604020202090204" pitchFamily="34" charset="0"/>
         <a:buChar char="•"/>
         <a:defRPr sz="2000" kern="1200">
           <a:solidFill>
@@ -2263,7 +2307,7 @@
         <a:spcBef>
           <a:spcPts val="500"/>
         </a:spcBef>
-        <a:buFont typeface="Arial" panose="020B0604020202020204" pitchFamily="34" charset="0"/>
+        <a:buFont typeface="Arial" panose="020B0604020202090204" pitchFamily="34" charset="0"/>
         <a:buChar char="•"/>
         <a:defRPr sz="1800" kern="1200">
           <a:solidFill>
@@ -2281,7 +2325,7 @@
         <a:spcBef>
           <a:spcPts val="500"/>
         </a:spcBef>
-        <a:buFont typeface="Arial" panose="020B0604020202020204" pitchFamily="34" charset="0"/>
+        <a:buFont typeface="Arial" panose="020B0604020202090204" pitchFamily="34" charset="0"/>
         <a:buChar char="•"/>
         <a:defRPr sz="1800" kern="1200">
           <a:solidFill>
@@ -2299,7 +2343,7 @@
         <a:spcBef>
           <a:spcPts val="500"/>
         </a:spcBef>
-        <a:buFont typeface="Arial" panose="020B0604020202020204" pitchFamily="34" charset="0"/>
+        <a:buFont typeface="Arial" panose="020B0604020202090204" pitchFamily="34" charset="0"/>
         <a:buChar char="•"/>
         <a:defRPr sz="1800" kern="1200">
           <a:solidFill>
@@ -2317,7 +2361,7 @@
         <a:spcBef>
           <a:spcPts val="500"/>
         </a:spcBef>
-        <a:buFont typeface="Arial" panose="020B0604020202020204" pitchFamily="34" charset="0"/>
+        <a:buFont typeface="Arial" panose="020B0604020202090204" pitchFamily="34" charset="0"/>
         <a:buChar char="•"/>
         <a:defRPr sz="1800" kern="1200">
           <a:solidFill>
@@ -2335,7 +2379,7 @@
         <a:spcBef>
           <a:spcPts val="500"/>
         </a:spcBef>
-        <a:buFont typeface="Arial" panose="020B0604020202020204" pitchFamily="34" charset="0"/>
+        <a:buFont typeface="Arial" panose="020B0604020202090204" pitchFamily="34" charset="0"/>
         <a:buChar char="•"/>
         <a:defRPr sz="1800" kern="1200">
           <a:solidFill>
@@ -2353,7 +2397,7 @@
         <a:spcBef>
           <a:spcPts val="500"/>
         </a:spcBef>
-        <a:buFont typeface="Arial" panose="020B0604020202020204" pitchFamily="34" charset="0"/>
+        <a:buFont typeface="Arial" panose="020B0604020202090204" pitchFamily="34" charset="0"/>
         <a:buChar char="•"/>
         <a:defRPr sz="1800" kern="1200">
           <a:solidFill>
@@ -2461,22 +2505,6 @@
       </a:lvl9pPr>
     </p:otherStyle>
   </p:txStyles>
-  <p:extLst>
-    <p:ext uri="{27BBF7A9-308A-43DC-89C8-2F10F3537804}">
-      <p15:sldGuideLst xmlns:p15="http://schemas.microsoft.com/office/powerpoint/2012/main">
-        <p15:guide id="1" orient="horz" pos="2160" userDrawn="1">
-          <p15:clr>
-            <a:srgbClr val="F26B43"/>
-          </p15:clr>
-        </p15:guide>
-        <p15:guide id="2" pos="3840" userDrawn="1">
-          <p15:clr>
-            <a:srgbClr val="F26B43"/>
-          </p15:clr>
-        </p15:guide>
-      </p15:sldGuideLst>
-    </p:ext>
-  </p:extLst>
 </p:sldMaster>
 </file>
 
@@ -2499,13 +2527,7 @@
       </p:grpSpPr>
       <p:grpSp>
         <p:nvGrpSpPr>
-          <p:cNvPr id="149" name="Group 148">
-            <a:extLst>
-              <a:ext uri="{FF2B5EF4-FFF2-40B4-BE49-F238E27FC236}">
-                <a16:creationId xmlns:a16="http://schemas.microsoft.com/office/drawing/2014/main" id="{90CE3EB4-F706-D7EE-1A82-C255B4423B9C}"/>
-              </a:ext>
-            </a:extLst>
-          </p:cNvPr>
+          <p:cNvPr id="149" name="Group 148"/>
           <p:cNvGrpSpPr/>
           <p:nvPr/>
         </p:nvGrpSpPr>
@@ -2519,13 +2541,7 @@
         </p:grpSpPr>
         <p:sp>
           <p:nvSpPr>
-            <p:cNvPr id="9" name="Rectangle 8">
-              <a:extLst>
-                <a:ext uri="{FF2B5EF4-FFF2-40B4-BE49-F238E27FC236}">
-                  <a16:creationId xmlns:a16="http://schemas.microsoft.com/office/drawing/2014/main" id="{BCBA3291-885A-2045-B3B6-86254BE83E51}"/>
-                </a:ext>
-              </a:extLst>
-            </p:cNvPr>
+            <p:cNvPr id="9" name="Rectangle 8"/>
             <p:cNvSpPr/>
             <p:nvPr/>
           </p:nvSpPr>
@@ -2588,6 +2604,11 @@
                 </a:rPr>
                 <a:t>ID</a:t>
               </a:r>
+              <a:endParaRPr lang="en-US" altLang="zh-CN" sz="1200" dirty="0">
+                <a:solidFill>
+                  <a:schemeClr val="tx1"/>
+                </a:solidFill>
+              </a:endParaRPr>
             </a:p>
             <a:p>
               <a:r>
@@ -2614,7 +2635,7 @@
                 </a:rPr>
                 <a:t>String</a:t>
               </a:r>
-              <a:endParaRPr lang="en-CN" sz="1200" dirty="0">
+              <a:endParaRPr lang="en-US" sz="1200" dirty="0">
                 <a:solidFill>
                   <a:schemeClr val="tx1"/>
                 </a:solidFill>
@@ -2624,13 +2645,7 @@
         </p:sp>
         <p:sp>
           <p:nvSpPr>
-            <p:cNvPr id="10" name="Rectangle 9">
-              <a:extLst>
-                <a:ext uri="{FF2B5EF4-FFF2-40B4-BE49-F238E27FC236}">
-                  <a16:creationId xmlns:a16="http://schemas.microsoft.com/office/drawing/2014/main" id="{B6FEE198-7C64-BF43-87DB-F86141A4C76D}"/>
-                </a:ext>
-              </a:extLst>
-            </p:cNvPr>
+            <p:cNvPr id="10" name="Rectangle 9"/>
             <p:cNvSpPr/>
             <p:nvPr/>
           </p:nvSpPr>
@@ -2683,7 +2698,7 @@
                 </a:rPr>
                 <a:t>Person</a:t>
               </a:r>
-              <a:endParaRPr lang="en-CN" b="1" dirty="0">
+              <a:endParaRPr lang="en-US" b="1" dirty="0">
                 <a:solidFill>
                   <a:schemeClr val="tx1"/>
                 </a:solidFill>
@@ -2693,13 +2708,7 @@
         </p:sp>
         <p:sp>
           <p:nvSpPr>
-            <p:cNvPr id="12" name="Rectangle 11">
-              <a:extLst>
-                <a:ext uri="{FF2B5EF4-FFF2-40B4-BE49-F238E27FC236}">
-                  <a16:creationId xmlns:a16="http://schemas.microsoft.com/office/drawing/2014/main" id="{394BCCF7-904F-BA42-A045-62373FD79E58}"/>
-                </a:ext>
-              </a:extLst>
-            </p:cNvPr>
+            <p:cNvPr id="12" name="Rectangle 11"/>
             <p:cNvSpPr/>
             <p:nvPr/>
           </p:nvSpPr>
@@ -2762,6 +2771,11 @@
                 </a:rPr>
                 <a:t>ID</a:t>
               </a:r>
+              <a:endParaRPr lang="en-US" altLang="zh-CN" sz="1200" dirty="0">
+                <a:solidFill>
+                  <a:schemeClr val="tx1"/>
+                </a:solidFill>
+              </a:endParaRPr>
             </a:p>
             <a:p>
               <a:r>
@@ -2788,18 +2802,17 @@
                 </a:rPr>
                 <a:t>String</a:t>
               </a:r>
+              <a:endParaRPr lang="en-US" altLang="zh-CN" sz="1200" dirty="0">
+                <a:solidFill>
+                  <a:schemeClr val="tx1"/>
+                </a:solidFill>
+              </a:endParaRPr>
             </a:p>
           </p:txBody>
         </p:sp>
         <p:sp>
           <p:nvSpPr>
-            <p:cNvPr id="13" name="Rectangle 12">
-              <a:extLst>
-                <a:ext uri="{FF2B5EF4-FFF2-40B4-BE49-F238E27FC236}">
-                  <a16:creationId xmlns:a16="http://schemas.microsoft.com/office/drawing/2014/main" id="{BE5A4E8B-4642-4241-B212-ABEFC161DEC9}"/>
-                </a:ext>
-              </a:extLst>
-            </p:cNvPr>
+            <p:cNvPr id="13" name="Rectangle 12"/>
             <p:cNvSpPr/>
             <p:nvPr/>
           </p:nvSpPr>
@@ -2851,7 +2864,7 @@
                 </a:rPr>
                 <a:t>Company</a:t>
               </a:r>
-              <a:endParaRPr lang="en-CN" b="1" dirty="0">
+              <a:endParaRPr lang="en-US" b="1" dirty="0">
                 <a:solidFill>
                   <a:schemeClr val="tx1"/>
                 </a:solidFill>
@@ -2861,13 +2874,7 @@
         </p:sp>
         <p:sp>
           <p:nvSpPr>
-            <p:cNvPr id="15" name="Rectangle 14">
-              <a:extLst>
-                <a:ext uri="{FF2B5EF4-FFF2-40B4-BE49-F238E27FC236}">
-                  <a16:creationId xmlns:a16="http://schemas.microsoft.com/office/drawing/2014/main" id="{A7BE3F17-C67E-5A46-996C-67EF743EC561}"/>
-                </a:ext>
-              </a:extLst>
-            </p:cNvPr>
+            <p:cNvPr id="15" name="Rectangle 14"/>
             <p:cNvSpPr/>
             <p:nvPr/>
           </p:nvSpPr>
@@ -2930,6 +2937,11 @@
                 </a:rPr>
                 <a:t>ID</a:t>
               </a:r>
+              <a:endParaRPr lang="en-US" altLang="zh-CN" sz="1200" dirty="0">
+                <a:solidFill>
+                  <a:schemeClr val="tx1"/>
+                </a:solidFill>
+              </a:endParaRPr>
             </a:p>
             <a:p>
               <a:r>
@@ -3011,6 +3023,11 @@
                 </a:rPr>
                 <a:t>Boolean</a:t>
               </a:r>
+              <a:endParaRPr lang="en-US" altLang="zh-CN" sz="1200" dirty="0">
+                <a:solidFill>
+                  <a:schemeClr val="tx1"/>
+                </a:solidFill>
+              </a:endParaRPr>
             </a:p>
             <a:p>
               <a:r>
@@ -3053,7 +3070,7 @@
                 </a:rPr>
                 <a:t>String</a:t>
               </a:r>
-              <a:endParaRPr lang="en-CN" sz="1200" dirty="0">
+              <a:endParaRPr lang="en-US" sz="1200" dirty="0">
                 <a:solidFill>
                   <a:schemeClr val="tx1"/>
                 </a:solidFill>
@@ -3063,13 +3080,7 @@
         </p:sp>
         <p:sp>
           <p:nvSpPr>
-            <p:cNvPr id="16" name="Rectangle 15">
-              <a:extLst>
-                <a:ext uri="{FF2B5EF4-FFF2-40B4-BE49-F238E27FC236}">
-                  <a16:creationId xmlns:a16="http://schemas.microsoft.com/office/drawing/2014/main" id="{E7BA5DA0-5EF3-9D45-88BA-BC5BA7F3F9AB}"/>
-                </a:ext>
-              </a:extLst>
-            </p:cNvPr>
+            <p:cNvPr id="16" name="Rectangle 15"/>
             <p:cNvSpPr/>
             <p:nvPr/>
           </p:nvSpPr>
@@ -3122,7 +3133,7 @@
                 </a:rPr>
                 <a:t>Account</a:t>
               </a:r>
-              <a:endParaRPr lang="en-CN" b="1" dirty="0">
+              <a:endParaRPr lang="en-US" b="1" dirty="0">
                 <a:solidFill>
                   <a:schemeClr val="tx1"/>
                 </a:solidFill>
@@ -3132,13 +3143,7 @@
         </p:sp>
         <p:grpSp>
           <p:nvGrpSpPr>
-            <p:cNvPr id="131" name="Group 130">
-              <a:extLst>
-                <a:ext uri="{FF2B5EF4-FFF2-40B4-BE49-F238E27FC236}">
-                  <a16:creationId xmlns:a16="http://schemas.microsoft.com/office/drawing/2014/main" id="{FE002B43-4806-CE44-3E14-C8736CF4FD37}"/>
-                </a:ext>
-              </a:extLst>
-            </p:cNvPr>
+            <p:cNvPr id="131" name="Group 130"/>
             <p:cNvGrpSpPr/>
             <p:nvPr/>
           </p:nvGrpSpPr>
@@ -3152,13 +3157,7 @@
           </p:grpSpPr>
           <p:sp>
             <p:nvSpPr>
-              <p:cNvPr id="21" name="Rectangle 20">
-                <a:extLst>
-                  <a:ext uri="{FF2B5EF4-FFF2-40B4-BE49-F238E27FC236}">
-                    <a16:creationId xmlns:a16="http://schemas.microsoft.com/office/drawing/2014/main" id="{952B3EB0-AC2E-194C-BAD9-80998F2EEF5B}"/>
-                  </a:ext>
-                </a:extLst>
-              </p:cNvPr>
+              <p:cNvPr id="21" name="Rectangle 20"/>
               <p:cNvSpPr/>
               <p:nvPr/>
             </p:nvSpPr>
@@ -3221,6 +3220,11 @@
                   </a:rPr>
                   <a:t>ID</a:t>
                 </a:r>
+                <a:endParaRPr lang="en-US" altLang="zh-CN" sz="1200" dirty="0">
+                  <a:solidFill>
+                    <a:schemeClr val="tx1"/>
+                  </a:solidFill>
+                </a:endParaRPr>
               </a:p>
               <a:p>
                 <a:r>
@@ -3247,6 +3251,11 @@
                   </a:rPr>
                   <a:t>String</a:t>
                 </a:r>
+                <a:endParaRPr lang="en-US" altLang="zh-CN" sz="1200" dirty="0">
+                  <a:solidFill>
+                    <a:schemeClr val="tx1"/>
+                  </a:solidFill>
+                </a:endParaRPr>
               </a:p>
               <a:p>
                 <a:r>
@@ -3281,7 +3290,7 @@
                   </a:rPr>
                   <a:t>Boolean</a:t>
                 </a:r>
-                <a:endParaRPr lang="en-CN" sz="1200" dirty="0">
+                <a:endParaRPr lang="en-US" sz="1200" dirty="0">
                   <a:solidFill>
                     <a:schemeClr val="tx1"/>
                   </a:solidFill>
@@ -3291,13 +3300,7 @@
           </p:sp>
           <p:sp>
             <p:nvSpPr>
-              <p:cNvPr id="22" name="Rectangle 21">
-                <a:extLst>
-                  <a:ext uri="{FF2B5EF4-FFF2-40B4-BE49-F238E27FC236}">
-                    <a16:creationId xmlns:a16="http://schemas.microsoft.com/office/drawing/2014/main" id="{9A1970A5-AC37-D44A-B690-5440CAAE349C}"/>
-                  </a:ext>
-                </a:extLst>
-              </p:cNvPr>
+              <p:cNvPr id="22" name="Rectangle 21"/>
               <p:cNvSpPr/>
               <p:nvPr/>
             </p:nvSpPr>
@@ -3350,7 +3353,7 @@
                   </a:rPr>
                   <a:t>Medium</a:t>
                 </a:r>
-                <a:endParaRPr lang="en-CN" b="1" dirty="0">
+                <a:endParaRPr lang="en-US" b="1" dirty="0">
                   <a:solidFill>
                     <a:schemeClr val="tx1"/>
                   </a:solidFill>
@@ -3361,15 +3364,8 @@
         </p:grpSp>
         <p:cxnSp>
           <p:nvCxnSpPr>
-            <p:cNvPr id="26" name="Elbow Connector 25">
-              <a:extLst>
-                <a:ext uri="{FF2B5EF4-FFF2-40B4-BE49-F238E27FC236}">
-                  <a16:creationId xmlns:a16="http://schemas.microsoft.com/office/drawing/2014/main" id="{3C53489C-1AD3-3D4B-A2C9-49880F18F572}"/>
-                </a:ext>
-              </a:extLst>
-            </p:cNvPr>
+            <p:cNvPr id="26" name="Elbow Connector 25"/>
             <p:cNvCxnSpPr>
-              <a:cxnSpLocks/>
               <a:stCxn id="10" idx="3"/>
               <a:endCxn id="15" idx="1"/>
             </p:cNvCxnSpPr>
@@ -3411,15 +3407,8 @@
         </p:cxnSp>
         <p:cxnSp>
           <p:nvCxnSpPr>
-            <p:cNvPr id="27" name="Elbow Connector 26">
-              <a:extLst>
-                <a:ext uri="{FF2B5EF4-FFF2-40B4-BE49-F238E27FC236}">
-                  <a16:creationId xmlns:a16="http://schemas.microsoft.com/office/drawing/2014/main" id="{F0060C30-3B44-A64C-A10B-696846E9D2CF}"/>
-                </a:ext>
-              </a:extLst>
-            </p:cNvPr>
+            <p:cNvPr id="27" name="Elbow Connector 26"/>
             <p:cNvCxnSpPr>
-              <a:cxnSpLocks/>
               <a:stCxn id="13" idx="3"/>
               <a:endCxn id="100" idx="6"/>
             </p:cNvCxnSpPr>
@@ -3460,15 +3449,8 @@
         </p:cxnSp>
         <p:cxnSp>
           <p:nvCxnSpPr>
-            <p:cNvPr id="28" name="Straight Arrow Connector 27">
-              <a:extLst>
-                <a:ext uri="{FF2B5EF4-FFF2-40B4-BE49-F238E27FC236}">
-                  <a16:creationId xmlns:a16="http://schemas.microsoft.com/office/drawing/2014/main" id="{B2BF143A-D663-5649-905F-27A0CFCDFF24}"/>
-                </a:ext>
-              </a:extLst>
-            </p:cNvPr>
+            <p:cNvPr id="28" name="Straight Arrow Connector 27"/>
             <p:cNvCxnSpPr>
-              <a:cxnSpLocks/>
               <a:stCxn id="9" idx="2"/>
               <a:endCxn id="13" idx="0"/>
             </p:cNvCxnSpPr>
@@ -3507,15 +3489,8 @@
         </p:cxnSp>
         <p:cxnSp>
           <p:nvCxnSpPr>
-            <p:cNvPr id="30" name="Elbow Connector 29">
-              <a:extLst>
-                <a:ext uri="{FF2B5EF4-FFF2-40B4-BE49-F238E27FC236}">
-                  <a16:creationId xmlns:a16="http://schemas.microsoft.com/office/drawing/2014/main" id="{453767E1-1D3F-0948-959E-087EE3A13395}"/>
-                </a:ext>
-              </a:extLst>
-            </p:cNvPr>
+            <p:cNvPr id="30" name="Elbow Connector 29"/>
             <p:cNvCxnSpPr>
-              <a:cxnSpLocks/>
               <a:stCxn id="21" idx="1"/>
               <a:endCxn id="15" idx="3"/>
             </p:cNvCxnSpPr>
@@ -3555,13 +3530,7 @@
         </p:cxnSp>
         <p:sp>
           <p:nvSpPr>
-            <p:cNvPr id="32" name="TextBox 31">
-              <a:extLst>
-                <a:ext uri="{FF2B5EF4-FFF2-40B4-BE49-F238E27FC236}">
-                  <a16:creationId xmlns:a16="http://schemas.microsoft.com/office/drawing/2014/main" id="{59A3ECDA-6BF6-B345-A195-B9F88BE95D7D}"/>
-                </a:ext>
-              </a:extLst>
-            </p:cNvPr>
+            <p:cNvPr id="32" name="TextBox 31"/>
             <p:cNvSpPr txBox="1"/>
             <p:nvPr/>
           </p:nvSpPr>
@@ -3585,19 +3554,13 @@
                 <a:rPr lang="en-US" altLang="zh-CN" sz="1200" dirty="0"/>
                 <a:t>own</a:t>
               </a:r>
-              <a:endParaRPr lang="en-CN" sz="1400" dirty="0"/>
+              <a:endParaRPr lang="en-US" sz="1400" dirty="0"/>
             </a:p>
           </p:txBody>
         </p:sp>
         <p:sp>
           <p:nvSpPr>
-            <p:cNvPr id="35" name="TextBox 34">
-              <a:extLst>
-                <a:ext uri="{FF2B5EF4-FFF2-40B4-BE49-F238E27FC236}">
-                  <a16:creationId xmlns:a16="http://schemas.microsoft.com/office/drawing/2014/main" id="{6325C393-5F86-E14C-A0C3-D733E9944141}"/>
-                </a:ext>
-              </a:extLst>
-            </p:cNvPr>
+            <p:cNvPr id="35" name="TextBox 34"/>
             <p:cNvSpPr txBox="1"/>
             <p:nvPr/>
           </p:nvSpPr>
@@ -3621,19 +3584,13 @@
                 <a:rPr lang="en-US" altLang="zh-CN" sz="1200" dirty="0" err="1"/>
                 <a:t>signIn</a:t>
               </a:r>
-              <a:endParaRPr lang="en-CN" sz="1200" dirty="0"/>
+              <a:endParaRPr lang="en-US" sz="1200" dirty="0"/>
             </a:p>
           </p:txBody>
         </p:sp>
         <p:grpSp>
           <p:nvGrpSpPr>
-            <p:cNvPr id="39" name="Group 38">
-              <a:extLst>
-                <a:ext uri="{FF2B5EF4-FFF2-40B4-BE49-F238E27FC236}">
-                  <a16:creationId xmlns:a16="http://schemas.microsoft.com/office/drawing/2014/main" id="{3C3169A4-7F78-7047-8AB5-805903530A72}"/>
-                </a:ext>
-              </a:extLst>
-            </p:cNvPr>
+            <p:cNvPr id="39" name="Group 38"/>
             <p:cNvGrpSpPr/>
             <p:nvPr/>
           </p:nvGrpSpPr>
@@ -3647,13 +3604,7 @@
           </p:grpSpPr>
           <p:sp>
             <p:nvSpPr>
-              <p:cNvPr id="40" name="Rectangle 39">
-                <a:extLst>
-                  <a:ext uri="{FF2B5EF4-FFF2-40B4-BE49-F238E27FC236}">
-                    <a16:creationId xmlns:a16="http://schemas.microsoft.com/office/drawing/2014/main" id="{96FE0172-04DB-A048-897E-4364608B5FEF}"/>
-                  </a:ext>
-                </a:extLst>
-              </p:cNvPr>
+              <p:cNvPr id="40" name="Rectangle 39"/>
               <p:cNvSpPr/>
               <p:nvPr/>
             </p:nvSpPr>
@@ -3716,6 +3667,11 @@
                   </a:rPr>
                   <a:t>ID</a:t>
                 </a:r>
+                <a:endParaRPr lang="en-US" altLang="zh-CN" sz="1200" dirty="0">
+                  <a:solidFill>
+                    <a:schemeClr val="tx1"/>
+                  </a:solidFill>
+                </a:endParaRPr>
               </a:p>
               <a:p>
                 <a:r>
@@ -3766,6 +3722,11 @@
                   </a:rPr>
                   <a:t>Integer</a:t>
                 </a:r>
+                <a:endParaRPr lang="en-US" altLang="zh-CN" sz="1200" dirty="0">
+                  <a:solidFill>
+                    <a:schemeClr val="tx1"/>
+                  </a:solidFill>
+                </a:endParaRPr>
               </a:p>
               <a:p>
                 <a:r>
@@ -3800,7 +3761,7 @@
                   </a:rPr>
                   <a:t>Integer</a:t>
                 </a:r>
-                <a:endParaRPr lang="en-CN" sz="1200" dirty="0">
+                <a:endParaRPr lang="en-US" sz="1200" dirty="0">
                   <a:solidFill>
                     <a:schemeClr val="tx1"/>
                   </a:solidFill>
@@ -3810,13 +3771,7 @@
           </p:sp>
           <p:sp>
             <p:nvSpPr>
-              <p:cNvPr id="41" name="Rectangle 40">
-                <a:extLst>
-                  <a:ext uri="{FF2B5EF4-FFF2-40B4-BE49-F238E27FC236}">
-                    <a16:creationId xmlns:a16="http://schemas.microsoft.com/office/drawing/2014/main" id="{C805CEC5-21B7-E247-ABBB-187667AB24B0}"/>
-                  </a:ext>
-                </a:extLst>
-              </p:cNvPr>
+              <p:cNvPr id="41" name="Rectangle 40"/>
               <p:cNvSpPr/>
               <p:nvPr/>
             </p:nvSpPr>
@@ -3869,7 +3824,7 @@
                   </a:rPr>
                   <a:t>Loan</a:t>
                 </a:r>
-                <a:endParaRPr lang="en-CN" b="1" dirty="0">
+                <a:endParaRPr lang="en-US" b="1" dirty="0">
                   <a:solidFill>
                     <a:schemeClr val="tx1"/>
                   </a:solidFill>
@@ -3880,15 +3835,8 @@
         </p:grpSp>
         <p:cxnSp>
           <p:nvCxnSpPr>
-            <p:cNvPr id="42" name="Elbow Connector 41">
-              <a:extLst>
-                <a:ext uri="{FF2B5EF4-FFF2-40B4-BE49-F238E27FC236}">
-                  <a16:creationId xmlns:a16="http://schemas.microsoft.com/office/drawing/2014/main" id="{74FC05B2-4F88-CF40-A026-5D85FBAE7154}"/>
-                </a:ext>
-              </a:extLst>
-            </p:cNvPr>
+            <p:cNvPr id="42" name="Elbow Connector 41"/>
             <p:cNvCxnSpPr>
-              <a:cxnSpLocks/>
               <a:stCxn id="10" idx="1"/>
               <a:endCxn id="112" idx="2"/>
             </p:cNvCxnSpPr>
@@ -3929,15 +3877,8 @@
         </p:cxnSp>
         <p:cxnSp>
           <p:nvCxnSpPr>
-            <p:cNvPr id="43" name="Elbow Connector 42">
-              <a:extLst>
-                <a:ext uri="{FF2B5EF4-FFF2-40B4-BE49-F238E27FC236}">
-                  <a16:creationId xmlns:a16="http://schemas.microsoft.com/office/drawing/2014/main" id="{F5B260C3-7950-594D-8D14-C510864E4AB4}"/>
-                </a:ext>
-              </a:extLst>
-            </p:cNvPr>
+            <p:cNvPr id="43" name="Elbow Connector 42"/>
             <p:cNvCxnSpPr>
-              <a:cxnSpLocks/>
               <a:stCxn id="13" idx="1"/>
               <a:endCxn id="40" idx="1"/>
             </p:cNvCxnSpPr>
@@ -3978,13 +3919,7 @@
         </p:cxnSp>
         <p:sp>
           <p:nvSpPr>
-            <p:cNvPr id="46" name="TextBox 45">
-              <a:extLst>
-                <a:ext uri="{FF2B5EF4-FFF2-40B4-BE49-F238E27FC236}">
-                  <a16:creationId xmlns:a16="http://schemas.microsoft.com/office/drawing/2014/main" id="{C8C8704E-CA02-884E-BA14-758B87C6E88A}"/>
-                </a:ext>
-              </a:extLst>
-            </p:cNvPr>
+            <p:cNvPr id="46" name="TextBox 45"/>
             <p:cNvSpPr txBox="1"/>
             <p:nvPr/>
           </p:nvSpPr>
@@ -4008,19 +3943,13 @@
                 <a:rPr lang="en-US" altLang="zh-CN" sz="1200" dirty="0"/>
                 <a:t>apply</a:t>
               </a:r>
-              <a:endParaRPr lang="en-CN" sz="1400" dirty="0"/>
+              <a:endParaRPr lang="en-US" sz="1400" dirty="0"/>
             </a:p>
           </p:txBody>
         </p:sp>
         <p:sp>
           <p:nvSpPr>
-            <p:cNvPr id="47" name="TextBox 46">
-              <a:extLst>
-                <a:ext uri="{FF2B5EF4-FFF2-40B4-BE49-F238E27FC236}">
-                  <a16:creationId xmlns:a16="http://schemas.microsoft.com/office/drawing/2014/main" id="{471AF359-1E07-7849-8B93-91F36663E6A9}"/>
-                </a:ext>
-              </a:extLst>
-            </p:cNvPr>
+            <p:cNvPr id="47" name="TextBox 46"/>
             <p:cNvSpPr txBox="1"/>
             <p:nvPr/>
           </p:nvSpPr>
@@ -4044,22 +3973,14 @@
                 <a:rPr lang="en-US" altLang="zh-CN" sz="1200" dirty="0"/>
                 <a:t>apply</a:t>
               </a:r>
-              <a:endParaRPr lang="en-CN" sz="1400" dirty="0"/>
+              <a:endParaRPr lang="en-US" sz="1400" dirty="0"/>
             </a:p>
           </p:txBody>
         </p:sp>
         <p:cxnSp>
           <p:nvCxnSpPr>
-            <p:cNvPr id="48" name="Straight Arrow Connector 47">
-              <a:extLst>
-                <a:ext uri="{FF2B5EF4-FFF2-40B4-BE49-F238E27FC236}">
-                  <a16:creationId xmlns:a16="http://schemas.microsoft.com/office/drawing/2014/main" id="{DEF26B6A-F6DC-614D-B833-5D80CBB5E0FA}"/>
-                </a:ext>
-              </a:extLst>
-            </p:cNvPr>
-            <p:cNvCxnSpPr>
-              <a:cxnSpLocks/>
-            </p:cNvCxnSpPr>
+            <p:cNvPr id="48" name="Straight Arrow Connector 47"/>
+            <p:cNvCxnSpPr/>
             <p:nvPr/>
           </p:nvCxnSpPr>
           <p:spPr>
@@ -4096,13 +4017,7 @@
         </p:cxnSp>
         <p:sp>
           <p:nvSpPr>
-            <p:cNvPr id="51" name="TextBox 50">
-              <a:extLst>
-                <a:ext uri="{FF2B5EF4-FFF2-40B4-BE49-F238E27FC236}">
-                  <a16:creationId xmlns:a16="http://schemas.microsoft.com/office/drawing/2014/main" id="{A9EEFE6B-5C72-DB4E-8259-8211ECB467CF}"/>
-                </a:ext>
-              </a:extLst>
-            </p:cNvPr>
+            <p:cNvPr id="51" name="TextBox 50"/>
             <p:cNvSpPr txBox="1"/>
             <p:nvPr/>
           </p:nvSpPr>
@@ -4126,19 +4041,13 @@
                 <a:rPr lang="en-US" altLang="zh-CN" sz="1200" dirty="0"/>
                 <a:t>deposit</a:t>
               </a:r>
-              <a:endParaRPr lang="en-CN" sz="1400" dirty="0"/>
+              <a:endParaRPr lang="en-US" sz="1400" dirty="0"/>
             </a:p>
           </p:txBody>
         </p:sp>
         <p:sp>
           <p:nvSpPr>
-            <p:cNvPr id="54" name="TextBox 53">
-              <a:extLst>
-                <a:ext uri="{FF2B5EF4-FFF2-40B4-BE49-F238E27FC236}">
-                  <a16:creationId xmlns:a16="http://schemas.microsoft.com/office/drawing/2014/main" id="{6A13F2F9-C170-D040-B35D-1A63345D4603}"/>
-                </a:ext>
-              </a:extLst>
-            </p:cNvPr>
+            <p:cNvPr id="54" name="TextBox 53"/>
             <p:cNvSpPr txBox="1"/>
             <p:nvPr/>
           </p:nvSpPr>
@@ -4162,21 +4071,14 @@
                 <a:rPr lang="en-US" altLang="zh-CN" sz="1200" dirty="0"/>
                 <a:t>invest</a:t>
               </a:r>
+              <a:endParaRPr lang="en-US" altLang="zh-CN" sz="1200" dirty="0"/>
             </a:p>
           </p:txBody>
         </p:sp>
         <p:cxnSp>
           <p:nvCxnSpPr>
-            <p:cNvPr id="58" name="Straight Arrow Connector 57">
-              <a:extLst>
-                <a:ext uri="{FF2B5EF4-FFF2-40B4-BE49-F238E27FC236}">
-                  <a16:creationId xmlns:a16="http://schemas.microsoft.com/office/drawing/2014/main" id="{B98DEA75-B1DE-EB46-BCC7-AAE8B7FAA619}"/>
-                </a:ext>
-              </a:extLst>
-            </p:cNvPr>
-            <p:cNvCxnSpPr>
-              <a:cxnSpLocks/>
-            </p:cNvCxnSpPr>
+            <p:cNvPr id="58" name="Straight Arrow Connector 57"/>
+            <p:cNvCxnSpPr/>
             <p:nvPr/>
           </p:nvCxnSpPr>
           <p:spPr>
@@ -4213,13 +4115,7 @@
         </p:cxnSp>
         <p:sp>
           <p:nvSpPr>
-            <p:cNvPr id="63" name="TextBox 62">
-              <a:extLst>
-                <a:ext uri="{FF2B5EF4-FFF2-40B4-BE49-F238E27FC236}">
-                  <a16:creationId xmlns:a16="http://schemas.microsoft.com/office/drawing/2014/main" id="{7762F5F5-5C98-B849-9DF3-987212DFF39F}"/>
-                </a:ext>
-              </a:extLst>
-            </p:cNvPr>
+            <p:cNvPr id="63" name="TextBox 62"/>
             <p:cNvSpPr txBox="1"/>
             <p:nvPr/>
           </p:nvSpPr>
@@ -4243,21 +4139,14 @@
                 <a:rPr lang="en-US" altLang="zh-CN" sz="1200" dirty="0"/>
                 <a:t>repay</a:t>
               </a:r>
-              <a:endParaRPr lang="en-CN" sz="1400" dirty="0"/>
+              <a:endParaRPr lang="en-US" sz="1400" dirty="0"/>
             </a:p>
           </p:txBody>
         </p:sp>
         <p:cxnSp>
           <p:nvCxnSpPr>
-            <p:cNvPr id="72" name="Elbow Connector 71">
-              <a:extLst>
-                <a:ext uri="{FF2B5EF4-FFF2-40B4-BE49-F238E27FC236}">
-                  <a16:creationId xmlns:a16="http://schemas.microsoft.com/office/drawing/2014/main" id="{74B38473-F5BB-A541-B981-B449B3E995BD}"/>
-                </a:ext>
-              </a:extLst>
-            </p:cNvPr>
+            <p:cNvPr id="72" name="Elbow Connector 71"/>
             <p:cNvCxnSpPr>
-              <a:cxnSpLocks/>
               <a:stCxn id="124" idx="0"/>
               <a:endCxn id="105" idx="2"/>
             </p:cNvCxnSpPr>
@@ -4300,13 +4189,7 @@
         </p:cxnSp>
         <p:sp>
           <p:nvSpPr>
-            <p:cNvPr id="75" name="TextBox 74">
-              <a:extLst>
-                <a:ext uri="{FF2B5EF4-FFF2-40B4-BE49-F238E27FC236}">
-                  <a16:creationId xmlns:a16="http://schemas.microsoft.com/office/drawing/2014/main" id="{91CAAE9E-A59E-664E-94E7-3D704DA97893}"/>
-                </a:ext>
-              </a:extLst>
-            </p:cNvPr>
+            <p:cNvPr id="75" name="TextBox 74"/>
             <p:cNvSpPr txBox="1"/>
             <p:nvPr/>
           </p:nvSpPr>
@@ -4330,20 +4213,14 @@
                 <a:rPr lang="en-US" altLang="zh-CN" sz="1200" dirty="0"/>
                 <a:t>transfer</a:t>
               </a:r>
+              <a:endParaRPr lang="en-US" altLang="zh-CN" sz="1200" dirty="0"/>
             </a:p>
           </p:txBody>
         </p:sp>
         <p:cxnSp>
           <p:nvCxnSpPr>
-            <p:cNvPr id="84" name="Elbow Connector 83">
-              <a:extLst>
-                <a:ext uri="{FF2B5EF4-FFF2-40B4-BE49-F238E27FC236}">
-                  <a16:creationId xmlns:a16="http://schemas.microsoft.com/office/drawing/2014/main" id="{2086D1A1-A7E6-0345-B71E-3A5D302299E3}"/>
-                </a:ext>
-              </a:extLst>
-            </p:cNvPr>
+            <p:cNvPr id="84" name="Elbow Connector 83"/>
             <p:cNvCxnSpPr>
-              <a:cxnSpLocks/>
               <a:stCxn id="88" idx="4"/>
               <a:endCxn id="12" idx="3"/>
             </p:cNvCxnSpPr>
@@ -4385,13 +4262,7 @@
         </p:cxnSp>
         <p:sp>
           <p:nvSpPr>
-            <p:cNvPr id="87" name="TextBox 86">
-              <a:extLst>
-                <a:ext uri="{FF2B5EF4-FFF2-40B4-BE49-F238E27FC236}">
-                  <a16:creationId xmlns:a16="http://schemas.microsoft.com/office/drawing/2014/main" id="{2452D27F-A347-1C4F-8C70-F9C153F3AC33}"/>
-                </a:ext>
-              </a:extLst>
-            </p:cNvPr>
+            <p:cNvPr id="87" name="TextBox 86"/>
             <p:cNvSpPr txBox="1"/>
             <p:nvPr/>
           </p:nvSpPr>
@@ -4416,18 +4287,13 @@
                 <a:rPr lang="en-US" altLang="zh-CN" sz="1200" dirty="0"/>
                 <a:t>invest</a:t>
               </a:r>
+              <a:endParaRPr lang="en-US" altLang="zh-CN" sz="1200" dirty="0"/>
             </a:p>
           </p:txBody>
         </p:sp>
         <p:sp>
           <p:nvSpPr>
-            <p:cNvPr id="69" name="TextBox 68">
-              <a:extLst>
-                <a:ext uri="{FF2B5EF4-FFF2-40B4-BE49-F238E27FC236}">
-                  <a16:creationId xmlns:a16="http://schemas.microsoft.com/office/drawing/2014/main" id="{87820A9B-EC1A-9248-9F80-A0E3332531E2}"/>
-                </a:ext>
-              </a:extLst>
-            </p:cNvPr>
+            <p:cNvPr id="69" name="TextBox 68"/>
             <p:cNvSpPr txBox="1"/>
             <p:nvPr/>
           </p:nvSpPr>
@@ -4451,20 +4317,14 @@
                 <a:rPr lang="en-US" altLang="zh-CN" sz="1200" dirty="0"/>
                 <a:t>own</a:t>
               </a:r>
+              <a:endParaRPr lang="en-US" altLang="zh-CN" sz="1200" dirty="0"/>
             </a:p>
           </p:txBody>
         </p:sp>
         <p:cxnSp>
           <p:nvCxnSpPr>
-            <p:cNvPr id="73" name="Elbow Connector 72">
-              <a:extLst>
-                <a:ext uri="{FF2B5EF4-FFF2-40B4-BE49-F238E27FC236}">
-                  <a16:creationId xmlns:a16="http://schemas.microsoft.com/office/drawing/2014/main" id="{5CAC3A81-516B-0145-A74C-03FB356B7B23}"/>
-                </a:ext>
-              </a:extLst>
-            </p:cNvPr>
+            <p:cNvPr id="73" name="Elbow Connector 72"/>
             <p:cNvCxnSpPr>
-              <a:cxnSpLocks/>
               <a:stCxn id="122" idx="1"/>
               <a:endCxn id="119" idx="6"/>
             </p:cNvCxnSpPr>
@@ -4507,13 +4367,7 @@
         </p:cxnSp>
         <p:sp>
           <p:nvSpPr>
-            <p:cNvPr id="76" name="TextBox 75">
-              <a:extLst>
-                <a:ext uri="{FF2B5EF4-FFF2-40B4-BE49-F238E27FC236}">
-                  <a16:creationId xmlns:a16="http://schemas.microsoft.com/office/drawing/2014/main" id="{9685707C-7FDD-7246-A062-F467B29818B5}"/>
-                </a:ext>
-              </a:extLst>
-            </p:cNvPr>
+            <p:cNvPr id="76" name="TextBox 75"/>
             <p:cNvSpPr txBox="1"/>
             <p:nvPr/>
           </p:nvSpPr>
@@ -4537,21 +4391,14 @@
                 <a:rPr lang="en-US" altLang="zh-CN" sz="1200" dirty="0"/>
                 <a:t>withdraw</a:t>
               </a:r>
-              <a:endParaRPr lang="en-CN" sz="1400" dirty="0"/>
+              <a:endParaRPr lang="en-US" sz="1400" dirty="0"/>
             </a:p>
           </p:txBody>
         </p:sp>
         <p:cxnSp>
           <p:nvCxnSpPr>
-            <p:cNvPr id="52" name="Elbow Connector 51">
-              <a:extLst>
-                <a:ext uri="{FF2B5EF4-FFF2-40B4-BE49-F238E27FC236}">
-                  <a16:creationId xmlns:a16="http://schemas.microsoft.com/office/drawing/2014/main" id="{8A1833F8-AC05-ED49-9288-0C166521A90C}"/>
-                </a:ext>
-              </a:extLst>
-            </p:cNvPr>
+            <p:cNvPr id="52" name="Elbow Connector 51"/>
             <p:cNvCxnSpPr>
-              <a:cxnSpLocks/>
               <a:stCxn id="91" idx="4"/>
               <a:endCxn id="9" idx="3"/>
             </p:cNvCxnSpPr>
@@ -4593,13 +4440,7 @@
         </p:cxnSp>
         <p:sp>
           <p:nvSpPr>
-            <p:cNvPr id="55" name="TextBox 54">
-              <a:extLst>
-                <a:ext uri="{FF2B5EF4-FFF2-40B4-BE49-F238E27FC236}">
-                  <a16:creationId xmlns:a16="http://schemas.microsoft.com/office/drawing/2014/main" id="{570D96A3-EE2B-9942-B62D-1CE0187BD9BC}"/>
-                </a:ext>
-              </a:extLst>
-            </p:cNvPr>
+            <p:cNvPr id="55" name="TextBox 54"/>
             <p:cNvSpPr txBox="1"/>
             <p:nvPr/>
           </p:nvSpPr>
@@ -4623,21 +4464,14 @@
                 <a:rPr lang="en-US" altLang="zh-CN" sz="1200" dirty="0"/>
                 <a:t>guarantee</a:t>
               </a:r>
+              <a:endParaRPr lang="en-US" altLang="zh-CN" sz="1200" dirty="0"/>
             </a:p>
           </p:txBody>
         </p:sp>
         <p:cxnSp>
           <p:nvCxnSpPr>
-            <p:cNvPr id="59" name="Straight Arrow Connector 58">
-              <a:extLst>
-                <a:ext uri="{FF2B5EF4-FFF2-40B4-BE49-F238E27FC236}">
-                  <a16:creationId xmlns:a16="http://schemas.microsoft.com/office/drawing/2014/main" id="{558166EF-21EE-6F41-B5AD-A3BADF4737C0}"/>
-                </a:ext>
-              </a:extLst>
-            </p:cNvPr>
-            <p:cNvCxnSpPr>
-              <a:cxnSpLocks/>
-            </p:cNvCxnSpPr>
+            <p:cNvPr id="59" name="Straight Arrow Connector 58"/>
+            <p:cNvCxnSpPr/>
             <p:nvPr/>
           </p:nvCxnSpPr>
           <p:spPr>
@@ -4673,13 +4507,7 @@
         </p:cxnSp>
         <p:sp>
           <p:nvSpPr>
-            <p:cNvPr id="7" name="Rectangle 6">
-              <a:extLst>
-                <a:ext uri="{FF2B5EF4-FFF2-40B4-BE49-F238E27FC236}">
-                  <a16:creationId xmlns:a16="http://schemas.microsoft.com/office/drawing/2014/main" id="{B69034C5-F280-4B4F-89CF-2453BB2D3375}"/>
-                </a:ext>
-              </a:extLst>
-            </p:cNvPr>
+            <p:cNvPr id="7" name="Rectangle 6"/>
             <p:cNvSpPr/>
             <p:nvPr/>
           </p:nvSpPr>
@@ -4703,21 +4531,14 @@
                 <a:rPr lang="en-US" altLang="zh-CN" sz="1200" dirty="0" err="1"/>
                 <a:t>workIn</a:t>
               </a:r>
-              <a:endParaRPr lang="en-CN" sz="1200" dirty="0"/>
+              <a:endParaRPr lang="en-US" sz="1200" dirty="0"/>
             </a:p>
           </p:txBody>
         </p:sp>
         <p:cxnSp>
           <p:nvCxnSpPr>
-            <p:cNvPr id="50" name="Elbow Connector 49">
-              <a:extLst>
-                <a:ext uri="{FF2B5EF4-FFF2-40B4-BE49-F238E27FC236}">
-                  <a16:creationId xmlns:a16="http://schemas.microsoft.com/office/drawing/2014/main" id="{CB1E5DDC-7474-DEA2-7987-595836A33EC7}"/>
-                </a:ext>
-              </a:extLst>
-            </p:cNvPr>
+            <p:cNvPr id="50" name="Elbow Connector 49"/>
             <p:cNvCxnSpPr>
-              <a:cxnSpLocks/>
               <a:stCxn id="85" idx="4"/>
               <a:endCxn id="12" idx="1"/>
             </p:cNvCxnSpPr>
@@ -4759,13 +4580,7 @@
         </p:cxnSp>
         <p:sp>
           <p:nvSpPr>
-            <p:cNvPr id="56" name="TextBox 55">
-              <a:extLst>
-                <a:ext uri="{FF2B5EF4-FFF2-40B4-BE49-F238E27FC236}">
-                  <a16:creationId xmlns:a16="http://schemas.microsoft.com/office/drawing/2014/main" id="{C327D31E-708B-798A-94E9-45783F69B85F}"/>
-                </a:ext>
-              </a:extLst>
-            </p:cNvPr>
+            <p:cNvPr id="56" name="TextBox 55"/>
             <p:cNvSpPr txBox="1"/>
             <p:nvPr/>
           </p:nvSpPr>
@@ -4789,18 +4604,13 @@
                 <a:rPr lang="en-US" altLang="zh-CN" sz="1200" dirty="0"/>
                 <a:t>guarantee</a:t>
               </a:r>
+              <a:endParaRPr lang="en-US" altLang="zh-CN" sz="1200" dirty="0"/>
             </a:p>
           </p:txBody>
         </p:sp>
         <p:sp>
           <p:nvSpPr>
-            <p:cNvPr id="85" name="Oval 84">
-              <a:extLst>
-                <a:ext uri="{FF2B5EF4-FFF2-40B4-BE49-F238E27FC236}">
-                  <a16:creationId xmlns:a16="http://schemas.microsoft.com/office/drawing/2014/main" id="{88C900CF-3D46-22BB-BE2B-F0E2A88A4C9C}"/>
-                </a:ext>
-              </a:extLst>
-            </p:cNvPr>
+            <p:cNvPr id="85" name="Oval 84"/>
             <p:cNvSpPr/>
             <p:nvPr/>
           </p:nvSpPr>
@@ -4840,19 +4650,13 @@
             <a:lstStyle/>
             <a:p>
               <a:pPr algn="ctr"/>
-              <a:endParaRPr lang="en-CN"/>
+              <a:endParaRPr lang="en-US"/>
             </a:p>
           </p:txBody>
         </p:sp>
         <p:sp>
           <p:nvSpPr>
-            <p:cNvPr id="88" name="Oval 87">
-              <a:extLst>
-                <a:ext uri="{FF2B5EF4-FFF2-40B4-BE49-F238E27FC236}">
-                  <a16:creationId xmlns:a16="http://schemas.microsoft.com/office/drawing/2014/main" id="{B1742E75-53D6-B7BC-857E-BCFC1AD7FB81}"/>
-                </a:ext>
-              </a:extLst>
-            </p:cNvPr>
+            <p:cNvPr id="88" name="Oval 87"/>
             <p:cNvSpPr/>
             <p:nvPr/>
           </p:nvSpPr>
@@ -4892,19 +4696,13 @@
             <a:lstStyle/>
             <a:p>
               <a:pPr algn="ctr"/>
-              <a:endParaRPr lang="en-CN"/>
+              <a:endParaRPr lang="en-US"/>
             </a:p>
           </p:txBody>
         </p:sp>
         <p:sp>
           <p:nvSpPr>
-            <p:cNvPr id="91" name="Oval 90">
-              <a:extLst>
-                <a:ext uri="{FF2B5EF4-FFF2-40B4-BE49-F238E27FC236}">
-                  <a16:creationId xmlns:a16="http://schemas.microsoft.com/office/drawing/2014/main" id="{6923ECC9-2D7B-1909-3FD9-33F9F9BB8A29}"/>
-                </a:ext>
-              </a:extLst>
-            </p:cNvPr>
+            <p:cNvPr id="91" name="Oval 90"/>
             <p:cNvSpPr/>
             <p:nvPr/>
           </p:nvSpPr>
@@ -4944,19 +4742,13 @@
             <a:lstStyle/>
             <a:p>
               <a:pPr algn="ctr"/>
-              <a:endParaRPr lang="en-CN"/>
+              <a:endParaRPr lang="en-US"/>
             </a:p>
           </p:txBody>
         </p:sp>
         <p:sp>
           <p:nvSpPr>
-            <p:cNvPr id="100" name="Oval 99">
-              <a:extLst>
-                <a:ext uri="{FF2B5EF4-FFF2-40B4-BE49-F238E27FC236}">
-                  <a16:creationId xmlns:a16="http://schemas.microsoft.com/office/drawing/2014/main" id="{8A1DBE11-24EB-ED63-FBFF-4FA4031AD43E}"/>
-                </a:ext>
-              </a:extLst>
-            </p:cNvPr>
+            <p:cNvPr id="100" name="Oval 99"/>
             <p:cNvSpPr/>
             <p:nvPr/>
           </p:nvSpPr>
@@ -4996,19 +4788,13 @@
             <a:lstStyle/>
             <a:p>
               <a:pPr algn="ctr"/>
-              <a:endParaRPr lang="en-CN"/>
+              <a:endParaRPr lang="en-US"/>
             </a:p>
           </p:txBody>
         </p:sp>
         <p:sp>
           <p:nvSpPr>
-            <p:cNvPr id="103" name="Oval 102">
-              <a:extLst>
-                <a:ext uri="{FF2B5EF4-FFF2-40B4-BE49-F238E27FC236}">
-                  <a16:creationId xmlns:a16="http://schemas.microsoft.com/office/drawing/2014/main" id="{EAB1111F-D4FF-F70D-F4B4-09356DD7CADE}"/>
-                </a:ext>
-              </a:extLst>
-            </p:cNvPr>
+            <p:cNvPr id="103" name="Oval 102"/>
             <p:cNvSpPr/>
             <p:nvPr/>
           </p:nvSpPr>
@@ -5048,19 +4834,13 @@
             <a:lstStyle/>
             <a:p>
               <a:pPr algn="ctr"/>
-              <a:endParaRPr lang="en-CN"/>
+              <a:endParaRPr lang="en-US"/>
             </a:p>
           </p:txBody>
         </p:sp>
         <p:sp>
           <p:nvSpPr>
-            <p:cNvPr id="105" name="Oval 104">
-              <a:extLst>
-                <a:ext uri="{FF2B5EF4-FFF2-40B4-BE49-F238E27FC236}">
-                  <a16:creationId xmlns:a16="http://schemas.microsoft.com/office/drawing/2014/main" id="{19A33579-AADC-4507-010C-6C023E469E5A}"/>
-                </a:ext>
-              </a:extLst>
-            </p:cNvPr>
+            <p:cNvPr id="105" name="Oval 104"/>
             <p:cNvSpPr/>
             <p:nvPr/>
           </p:nvSpPr>
@@ -5100,19 +4880,13 @@
             <a:lstStyle/>
             <a:p>
               <a:pPr algn="ctr"/>
-              <a:endParaRPr lang="en-CN"/>
+              <a:endParaRPr lang="en-US"/>
             </a:p>
           </p:txBody>
         </p:sp>
         <p:sp>
           <p:nvSpPr>
-            <p:cNvPr id="112" name="Oval 111">
-              <a:extLst>
-                <a:ext uri="{FF2B5EF4-FFF2-40B4-BE49-F238E27FC236}">
-                  <a16:creationId xmlns:a16="http://schemas.microsoft.com/office/drawing/2014/main" id="{5E628CD8-D99B-AD15-DF05-37ACDC9771B3}"/>
-                </a:ext>
-              </a:extLst>
-            </p:cNvPr>
+            <p:cNvPr id="112" name="Oval 111"/>
             <p:cNvSpPr/>
             <p:nvPr/>
           </p:nvSpPr>
@@ -5152,19 +4926,13 @@
             <a:lstStyle/>
             <a:p>
               <a:pPr algn="ctr"/>
-              <a:endParaRPr lang="en-CN"/>
+              <a:endParaRPr lang="en-US"/>
             </a:p>
           </p:txBody>
         </p:sp>
         <p:sp>
           <p:nvSpPr>
-            <p:cNvPr id="119" name="Oval 118">
-              <a:extLst>
-                <a:ext uri="{FF2B5EF4-FFF2-40B4-BE49-F238E27FC236}">
-                  <a16:creationId xmlns:a16="http://schemas.microsoft.com/office/drawing/2014/main" id="{D1B2FEE3-6B99-E2FA-70DA-3478F0CBB8A6}"/>
-                </a:ext>
-              </a:extLst>
-            </p:cNvPr>
+            <p:cNvPr id="119" name="Oval 118"/>
             <p:cNvSpPr/>
             <p:nvPr/>
           </p:nvSpPr>
@@ -5204,19 +4972,13 @@
             <a:lstStyle/>
             <a:p>
               <a:pPr algn="ctr"/>
-              <a:endParaRPr lang="en-CN"/>
+              <a:endParaRPr lang="en-US"/>
             </a:p>
           </p:txBody>
         </p:sp>
         <p:sp>
           <p:nvSpPr>
-            <p:cNvPr id="122" name="Oval 121">
-              <a:extLst>
-                <a:ext uri="{FF2B5EF4-FFF2-40B4-BE49-F238E27FC236}">
-                  <a16:creationId xmlns:a16="http://schemas.microsoft.com/office/drawing/2014/main" id="{51730339-FBCE-57B4-BDD1-3DAE304CB978}"/>
-                </a:ext>
-              </a:extLst>
-            </p:cNvPr>
+            <p:cNvPr id="122" name="Oval 121"/>
             <p:cNvSpPr/>
             <p:nvPr/>
           </p:nvSpPr>
@@ -5256,19 +5018,13 @@
             <a:lstStyle/>
             <a:p>
               <a:pPr algn="ctr"/>
-              <a:endParaRPr lang="en-CN"/>
+              <a:endParaRPr lang="en-US"/>
             </a:p>
           </p:txBody>
         </p:sp>
         <p:sp>
           <p:nvSpPr>
-            <p:cNvPr id="124" name="Oval 123">
-              <a:extLst>
-                <a:ext uri="{FF2B5EF4-FFF2-40B4-BE49-F238E27FC236}">
-                  <a16:creationId xmlns:a16="http://schemas.microsoft.com/office/drawing/2014/main" id="{9BEB58F4-CA93-1DF9-640E-39C5DA1ACAE7}"/>
-                </a:ext>
-              </a:extLst>
-            </p:cNvPr>
+            <p:cNvPr id="124" name="Oval 123"/>
             <p:cNvSpPr/>
             <p:nvPr/>
           </p:nvSpPr>
@@ -5308,19 +5064,13 @@
             <a:lstStyle/>
             <a:p>
               <a:pPr algn="ctr"/>
-              <a:endParaRPr lang="en-CN"/>
+              <a:endParaRPr lang="en-US"/>
             </a:p>
           </p:txBody>
         </p:sp>
         <p:grpSp>
           <p:nvGrpSpPr>
-            <p:cNvPr id="140" name="Group 139">
-              <a:extLst>
-                <a:ext uri="{FF2B5EF4-FFF2-40B4-BE49-F238E27FC236}">
-                  <a16:creationId xmlns:a16="http://schemas.microsoft.com/office/drawing/2014/main" id="{E86AA121-EF98-B911-A718-411F104F3CB0}"/>
-                </a:ext>
-              </a:extLst>
-            </p:cNvPr>
+            <p:cNvPr id="140" name="Group 139"/>
             <p:cNvGrpSpPr/>
             <p:nvPr/>
           </p:nvGrpSpPr>
@@ -5334,13 +5084,7 @@
           </p:grpSpPr>
           <p:sp>
             <p:nvSpPr>
-              <p:cNvPr id="134" name="TextBox 36">
-                <a:extLst>
-                  <a:ext uri="{FF2B5EF4-FFF2-40B4-BE49-F238E27FC236}">
-                    <a16:creationId xmlns:a16="http://schemas.microsoft.com/office/drawing/2014/main" id="{B7231477-6837-BB4A-A11C-3483873584B5}"/>
-                  </a:ext>
-                </a:extLst>
-              </p:cNvPr>
+              <p:cNvPr id="134" name="TextBox 36"/>
               <p:cNvSpPr txBox="1">
                 <a:spLocks noChangeAspect="1"/>
               </p:cNvSpPr>
@@ -5518,16 +5262,8 @@
           </p:sp>
           <p:cxnSp>
             <p:nvCxnSpPr>
-              <p:cNvPr id="135" name="Straight Arrow Connector 134">
-                <a:extLst>
-                  <a:ext uri="{FF2B5EF4-FFF2-40B4-BE49-F238E27FC236}">
-                    <a16:creationId xmlns:a16="http://schemas.microsoft.com/office/drawing/2014/main" id="{187F7B78-769E-9D10-ACB2-1C7A2BDA958F}"/>
-                  </a:ext>
-                </a:extLst>
-              </p:cNvPr>
-              <p:cNvCxnSpPr>
-                <a:cxnSpLocks/>
-              </p:cNvCxnSpPr>
+              <p:cNvPr id="135" name="Straight Arrow Connector 134"/>
+              <p:cNvCxnSpPr/>
               <p:nvPr/>
             </p:nvCxnSpPr>
             <p:spPr>
@@ -5564,16 +5300,8 @@
           </p:cxnSp>
           <p:cxnSp>
             <p:nvCxnSpPr>
-              <p:cNvPr id="136" name="Straight Arrow Connector 135">
-                <a:extLst>
-                  <a:ext uri="{FF2B5EF4-FFF2-40B4-BE49-F238E27FC236}">
-                    <a16:creationId xmlns:a16="http://schemas.microsoft.com/office/drawing/2014/main" id="{C3D8573E-D634-6E52-6698-EE163FB8B734}"/>
-                  </a:ext>
-                </a:extLst>
-              </p:cNvPr>
-              <p:cNvCxnSpPr>
-                <a:cxnSpLocks/>
-              </p:cNvCxnSpPr>
+              <p:cNvPr id="136" name="Straight Arrow Connector 135"/>
+              <p:cNvCxnSpPr/>
               <p:nvPr/>
             </p:nvCxnSpPr>
             <p:spPr>
@@ -5610,13 +5338,7 @@
           </p:cxnSp>
           <p:sp>
             <p:nvSpPr>
-              <p:cNvPr id="137" name="TextBox 36">
-                <a:extLst>
-                  <a:ext uri="{FF2B5EF4-FFF2-40B4-BE49-F238E27FC236}">
-                    <a16:creationId xmlns:a16="http://schemas.microsoft.com/office/drawing/2014/main" id="{32B7F567-CE04-4154-BFC0-010317D92EF5}"/>
-                  </a:ext>
-                </a:extLst>
-              </p:cNvPr>
+              <p:cNvPr id="137" name="TextBox 36"/>
               <p:cNvSpPr txBox="1">
                 <a:spLocks noChangeAspect="1"/>
               </p:cNvSpPr>
@@ -5784,11 +5506,6 @@
         </p:grpSp>
       </p:grpSp>
     </p:spTree>
-    <p:extLst>
-      <p:ext uri="{BB962C8B-B14F-4D97-AF65-F5344CB8AC3E}">
-        <p14:creationId xmlns:p14="http://schemas.microsoft.com/office/powerpoint/2010/main" val="324972270"/>
-      </p:ext>
-    </p:extLst>
   </p:cSld>
   <p:clrMapOvr>
     <a:masterClrMapping/>
@@ -5813,15 +5530,684 @@
           <a:chExt cx="0" cy="0"/>
         </a:xfrm>
       </p:grpSpPr>
+      <p:grpSp>
+        <p:nvGrpSpPr>
+          <p:cNvPr id="2" name="组合 1"/>
+          <p:cNvGrpSpPr/>
+          <p:nvPr/>
+        </p:nvGrpSpPr>
+        <p:grpSpPr>
+          <a:xfrm>
+            <a:off x="4793615" y="2189480"/>
+            <a:ext cx="2605405" cy="2479040"/>
+            <a:chOff x="7467" y="2215"/>
+            <a:chExt cx="4103" cy="3904"/>
+          </a:xfrm>
+        </p:grpSpPr>
+        <p:sp>
+          <p:nvSpPr>
+            <p:cNvPr id="15" name="Rectangle 14"/>
+            <p:cNvSpPr/>
+            <p:nvPr/>
+          </p:nvSpPr>
+          <p:spPr>
+            <a:xfrm>
+              <a:off x="7876" y="4159"/>
+              <a:ext cx="3694" cy="1960"/>
+            </a:xfrm>
+            <a:prstGeom prst="rect">
+              <a:avLst/>
+            </a:prstGeom>
+            <a:noFill/>
+            <a:ln w="22225">
+              <a:solidFill>
+                <a:schemeClr val="tx1"/>
+              </a:solidFill>
+            </a:ln>
+          </p:spPr>
+          <p:style>
+            <a:lnRef idx="2">
+              <a:schemeClr val="accent1">
+                <a:shade val="50000"/>
+              </a:schemeClr>
+            </a:lnRef>
+            <a:fillRef idx="1">
+              <a:schemeClr val="accent1"/>
+            </a:fillRef>
+            <a:effectRef idx="0">
+              <a:schemeClr val="accent1"/>
+            </a:effectRef>
+            <a:fontRef idx="minor">
+              <a:schemeClr val="lt1"/>
+            </a:fontRef>
+          </p:style>
+          <p:txBody>
+            <a:bodyPr rtlCol="0" anchor="ctr"/>
+            <a:lstStyle/>
+            <a:p>
+              <a:r>
+                <a:rPr lang="en-US" altLang="zh-CN" sz="1200" dirty="0">
+                  <a:solidFill>
+                    <a:schemeClr val="tx1"/>
+                  </a:solidFill>
+                </a:rPr>
+                <a:t>id:</a:t>
+              </a:r>
+              <a:r>
+                <a:rPr lang="zh-CN" altLang="en-US" sz="1200" dirty="0">
+                  <a:solidFill>
+                    <a:schemeClr val="tx1"/>
+                  </a:solidFill>
+                </a:rPr>
+                <a:t> </a:t>
+              </a:r>
+              <a:r>
+                <a:rPr lang="en-US" altLang="zh-CN" sz="1200" dirty="0">
+                  <a:solidFill>
+                    <a:schemeClr val="tx1"/>
+                  </a:solidFill>
+                </a:rPr>
+                <a:t>ID</a:t>
+              </a:r>
+              <a:endParaRPr lang="en-US" altLang="zh-CN" sz="1200" dirty="0">
+                <a:solidFill>
+                  <a:schemeClr val="tx1"/>
+                </a:solidFill>
+              </a:endParaRPr>
+            </a:p>
+            <a:p>
+              <a:r>
+                <a:rPr lang="en-US" altLang="zh-CN" sz="1200" dirty="0">
+                  <a:solidFill>
+                    <a:schemeClr val="tx1"/>
+                  </a:solidFill>
+                </a:rPr>
+                <a:t>name: String</a:t>
+              </a:r>
+              <a:endParaRPr lang="en-US" altLang="zh-CN" sz="1200" dirty="0">
+                <a:solidFill>
+                  <a:schemeClr val="tx1"/>
+                </a:solidFill>
+              </a:endParaRPr>
+            </a:p>
+            <a:p>
+              <a:r>
+                <a:rPr lang="en-US" altLang="zh-CN" sz="1200" dirty="0">
+                  <a:solidFill>
+                    <a:schemeClr val="tx1"/>
+                  </a:solidFill>
+                </a:rPr>
+                <a:t>balance</a:t>
+              </a:r>
+              <a:r>
+                <a:rPr lang="en-US" sz="1200" dirty="0">
+                  <a:solidFill>
+                    <a:schemeClr val="tx1"/>
+                  </a:solidFill>
+                  <a:sym typeface="+mn-ea"/>
+                </a:rPr>
+                <a:t>: </a:t>
+              </a:r>
+              <a:r>
+                <a:rPr lang="en-US" altLang="zh-CN" sz="1200" dirty="0">
+                  <a:solidFill>
+                    <a:schemeClr val="tx1"/>
+                  </a:solidFill>
+                  <a:sym typeface="+mn-ea"/>
+                </a:rPr>
+                <a:t>64-bit</a:t>
+              </a:r>
+              <a:r>
+                <a:rPr lang="zh-CN" altLang="en-US" sz="1200" dirty="0">
+                  <a:solidFill>
+                    <a:schemeClr val="tx1"/>
+                  </a:solidFill>
+                  <a:sym typeface="+mn-ea"/>
+                </a:rPr>
+                <a:t> </a:t>
+              </a:r>
+              <a:r>
+                <a:rPr lang="en-US" altLang="zh-CN" sz="1200" dirty="0">
+                  <a:solidFill>
+                    <a:schemeClr val="tx1"/>
+                  </a:solidFill>
+                  <a:sym typeface="+mn-ea"/>
+                </a:rPr>
+                <a:t>Integer</a:t>
+              </a:r>
+              <a:endParaRPr lang="en-US" altLang="zh-CN" sz="1200" dirty="0">
+                <a:solidFill>
+                  <a:schemeClr val="tx1"/>
+                </a:solidFill>
+                <a:sym typeface="+mn-ea"/>
+              </a:endParaRPr>
+            </a:p>
+            <a:p>
+              <a:r>
+                <a:rPr lang="en-US" sz="1200" dirty="0">
+                  <a:solidFill>
+                    <a:schemeClr val="tx1"/>
+                  </a:solidFill>
+                </a:rPr>
+                <a:t>numTransfered</a:t>
+              </a:r>
+              <a:r>
+                <a:rPr lang="en-US" sz="1200" dirty="0">
+                  <a:solidFill>
+                    <a:schemeClr val="tx1"/>
+                  </a:solidFill>
+                  <a:sym typeface="+mn-ea"/>
+                </a:rPr>
+                <a:t>: </a:t>
+              </a:r>
+              <a:r>
+                <a:rPr lang="en-US" altLang="zh-CN" sz="1200" dirty="0">
+                  <a:solidFill>
+                    <a:schemeClr val="tx1"/>
+                  </a:solidFill>
+                  <a:sym typeface="+mn-ea"/>
+                </a:rPr>
+                <a:t>64-bit</a:t>
+              </a:r>
+              <a:r>
+                <a:rPr lang="zh-CN" altLang="en-US" sz="1200" dirty="0">
+                  <a:solidFill>
+                    <a:schemeClr val="tx1"/>
+                  </a:solidFill>
+                  <a:sym typeface="+mn-ea"/>
+                </a:rPr>
+                <a:t> </a:t>
+              </a:r>
+              <a:r>
+                <a:rPr lang="en-US" altLang="zh-CN" sz="1200" dirty="0">
+                  <a:solidFill>
+                    <a:schemeClr val="tx1"/>
+                  </a:solidFill>
+                  <a:sym typeface="+mn-ea"/>
+                </a:rPr>
+                <a:t>Integer</a:t>
+              </a:r>
+              <a:endParaRPr lang="en-US" altLang="zh-CN" sz="1200" dirty="0">
+                <a:solidFill>
+                  <a:schemeClr val="tx1"/>
+                </a:solidFill>
+                <a:sym typeface="+mn-ea"/>
+              </a:endParaRPr>
+            </a:p>
+            <a:p>
+              <a:r>
+                <a:rPr lang="en-US" sz="1200" dirty="0">
+                  <a:solidFill>
+                    <a:schemeClr val="tx1"/>
+                  </a:solidFill>
+                </a:rPr>
+                <a:t>transHistory: [64-bit Integer]</a:t>
+              </a:r>
+              <a:endParaRPr lang="en-US" sz="1200" dirty="0">
+                <a:solidFill>
+                  <a:schemeClr val="tx1"/>
+                </a:solidFill>
+              </a:endParaRPr>
+            </a:p>
+            <a:p>
+              <a:r>
+                <a:rPr lang="en-US" sz="1200" dirty="0">
+                  <a:solidFill>
+                    <a:schemeClr val="tx1"/>
+                  </a:solidFill>
+                </a:rPr>
+                <a:t>versionHistory: [64-bit Integer]</a:t>
+              </a:r>
+              <a:endParaRPr lang="en-US" sz="1200" dirty="0">
+                <a:solidFill>
+                  <a:schemeClr val="tx1"/>
+                </a:solidFill>
+              </a:endParaRPr>
+            </a:p>
+          </p:txBody>
+        </p:sp>
+        <p:sp>
+          <p:nvSpPr>
+            <p:cNvPr id="16" name="Rectangle 15"/>
+            <p:cNvSpPr/>
+            <p:nvPr/>
+          </p:nvSpPr>
+          <p:spPr>
+            <a:xfrm>
+              <a:off x="7876" y="3546"/>
+              <a:ext cx="3693" cy="598"/>
+            </a:xfrm>
+            <a:prstGeom prst="rect">
+              <a:avLst/>
+            </a:prstGeom>
+            <a:solidFill>
+              <a:schemeClr val="accent1">
+                <a:lumMod val="60000"/>
+                <a:lumOff val="40000"/>
+              </a:schemeClr>
+            </a:solidFill>
+            <a:ln w="22225">
+              <a:solidFill>
+                <a:schemeClr val="tx1"/>
+              </a:solidFill>
+            </a:ln>
+          </p:spPr>
+          <p:style>
+            <a:lnRef idx="2">
+              <a:schemeClr val="accent1">
+                <a:shade val="50000"/>
+              </a:schemeClr>
+            </a:lnRef>
+            <a:fillRef idx="1">
+              <a:schemeClr val="accent1"/>
+            </a:fillRef>
+            <a:effectRef idx="0">
+              <a:schemeClr val="accent1"/>
+            </a:effectRef>
+            <a:fontRef idx="minor">
+              <a:schemeClr val="lt1"/>
+            </a:fontRef>
+          </p:style>
+          <p:txBody>
+            <a:bodyPr rtlCol="0" anchor="ctr"/>
+            <a:lstStyle/>
+            <a:p>
+              <a:pPr algn="ctr"/>
+              <a:r>
+                <a:rPr lang="en-US" altLang="zh-CN" b="1" dirty="0">
+                  <a:solidFill>
+                    <a:schemeClr val="tx1"/>
+                  </a:solidFill>
+                </a:rPr>
+                <a:t>Account</a:t>
+              </a:r>
+              <a:endParaRPr lang="en-US" b="1" dirty="0">
+                <a:solidFill>
+                  <a:schemeClr val="tx1"/>
+                </a:solidFill>
+              </a:endParaRPr>
+            </a:p>
+          </p:txBody>
+        </p:sp>
+        <p:cxnSp>
+          <p:nvCxnSpPr>
+            <p:cNvPr id="72" name="Elbow Connector 71"/>
+            <p:cNvCxnSpPr>
+              <a:stCxn id="16" idx="0"/>
+              <a:endCxn id="15" idx="1"/>
+            </p:cNvCxnSpPr>
+            <p:nvPr/>
+          </p:nvCxnSpPr>
+          <p:spPr>
+            <a:xfrm rot="16200000" flipH="1" flipV="1">
+              <a:off x="8002" y="3419"/>
+              <a:ext cx="1593" cy="1847"/>
+            </a:xfrm>
+            <a:prstGeom prst="bentConnector4">
+              <a:avLst>
+                <a:gd name="adj1" fmla="val -23540"/>
+                <a:gd name="adj2" fmla="val 120303"/>
+              </a:avLst>
+            </a:prstGeom>
+            <a:ln w="19050">
+              <a:solidFill>
+                <a:schemeClr val="tx1"/>
+              </a:solidFill>
+              <a:prstDash val="lgDash"/>
+              <a:tailEnd type="triangle"/>
+            </a:ln>
+            <a:effectLst/>
+          </p:spPr>
+          <p:style>
+            <a:lnRef idx="1">
+              <a:schemeClr val="accent1"/>
+            </a:lnRef>
+            <a:fillRef idx="0">
+              <a:schemeClr val="accent1"/>
+            </a:fillRef>
+            <a:effectRef idx="0">
+              <a:schemeClr val="accent1"/>
+            </a:effectRef>
+            <a:fontRef idx="minor">
+              <a:schemeClr val="tx1"/>
+            </a:fontRef>
+          </p:style>
+        </p:cxnSp>
+        <p:sp>
+          <p:nvSpPr>
+            <p:cNvPr id="75" name="TextBox 74"/>
+            <p:cNvSpPr txBox="1"/>
+            <p:nvPr/>
+          </p:nvSpPr>
+          <p:spPr>
+            <a:xfrm>
+              <a:off x="7467" y="2215"/>
+              <a:ext cx="3693" cy="725"/>
+            </a:xfrm>
+            <a:prstGeom prst="rect">
+              <a:avLst/>
+            </a:prstGeom>
+            <a:noFill/>
+          </p:spPr>
+          <p:txBody>
+            <a:bodyPr wrap="square" rtlCol="0">
+              <a:spAutoFit/>
+            </a:bodyPr>
+            <a:lstStyle/>
+            <a:p>
+              <a:r>
+                <a:rPr lang="en-US" altLang="zh-CN" sz="1200" dirty="0"/>
+                <a:t>transfer{amount: 64-bit Integer, versionHistory: [64-bit Integer]}</a:t>
+              </a:r>
+              <a:endParaRPr lang="en-US" altLang="zh-CN" sz="1200" dirty="0"/>
+            </a:p>
+          </p:txBody>
+        </p:sp>
+        <p:sp>
+          <p:nvSpPr>
+            <p:cNvPr id="100" name="Oval 99"/>
+            <p:cNvSpPr/>
+            <p:nvPr/>
+          </p:nvSpPr>
+          <p:spPr>
+            <a:xfrm>
+              <a:off x="7860" y="5119"/>
+              <a:ext cx="29" cy="29"/>
+            </a:xfrm>
+            <a:prstGeom prst="ellipse">
+              <a:avLst/>
+            </a:prstGeom>
+            <a:solidFill>
+              <a:schemeClr val="tx1"/>
+            </a:solidFill>
+            <a:ln>
+              <a:noFill/>
+            </a:ln>
+          </p:spPr>
+          <p:style>
+            <a:lnRef idx="2">
+              <a:schemeClr val="accent1">
+                <a:shade val="50000"/>
+              </a:schemeClr>
+            </a:lnRef>
+            <a:fillRef idx="1">
+              <a:schemeClr val="accent1"/>
+            </a:fillRef>
+            <a:effectRef idx="0">
+              <a:schemeClr val="accent1"/>
+            </a:effectRef>
+            <a:fontRef idx="minor">
+              <a:schemeClr val="lt1"/>
+            </a:fontRef>
+          </p:style>
+          <p:txBody>
+            <a:bodyPr lIns="90000" rtlCol="0" anchor="ctr"/>
+            <a:lstStyle/>
+            <a:p>
+              <a:pPr algn="ctr"/>
+              <a:endParaRPr lang="en-US"/>
+            </a:p>
+          </p:txBody>
+        </p:sp>
+        <p:sp>
+          <p:nvSpPr>
+            <p:cNvPr id="103" name="Oval 102"/>
+            <p:cNvSpPr/>
+            <p:nvPr/>
+          </p:nvSpPr>
+          <p:spPr>
+            <a:xfrm>
+              <a:off x="7870" y="4750"/>
+              <a:ext cx="28" cy="28"/>
+            </a:xfrm>
+            <a:prstGeom prst="ellipse">
+              <a:avLst/>
+            </a:prstGeom>
+            <a:solidFill>
+              <a:schemeClr val="tx1"/>
+            </a:solidFill>
+            <a:ln>
+              <a:noFill/>
+            </a:ln>
+          </p:spPr>
+          <p:style>
+            <a:lnRef idx="2">
+              <a:schemeClr val="accent1">
+                <a:shade val="50000"/>
+              </a:schemeClr>
+            </a:lnRef>
+            <a:fillRef idx="1">
+              <a:schemeClr val="accent1"/>
+            </a:fillRef>
+            <a:effectRef idx="0">
+              <a:schemeClr val="accent1"/>
+            </a:effectRef>
+            <a:fontRef idx="minor">
+              <a:schemeClr val="lt1"/>
+            </a:fontRef>
+          </p:style>
+          <p:txBody>
+            <a:bodyPr lIns="90000" rtlCol="0" anchor="ctr"/>
+            <a:lstStyle/>
+            <a:p>
+              <a:pPr algn="ctr"/>
+              <a:endParaRPr lang="en-US"/>
+            </a:p>
+          </p:txBody>
+        </p:sp>
+        <p:sp>
+          <p:nvSpPr>
+            <p:cNvPr id="105" name="Oval 104"/>
+            <p:cNvSpPr/>
+            <p:nvPr/>
+          </p:nvSpPr>
+          <p:spPr>
+            <a:xfrm>
+              <a:off x="7870" y="4467"/>
+              <a:ext cx="28" cy="28"/>
+            </a:xfrm>
+            <a:prstGeom prst="ellipse">
+              <a:avLst/>
+            </a:prstGeom>
+            <a:solidFill>
+              <a:schemeClr val="tx1"/>
+            </a:solidFill>
+            <a:ln>
+              <a:noFill/>
+            </a:ln>
+          </p:spPr>
+          <p:style>
+            <a:lnRef idx="2">
+              <a:schemeClr val="accent1">
+                <a:shade val="50000"/>
+              </a:schemeClr>
+            </a:lnRef>
+            <a:fillRef idx="1">
+              <a:schemeClr val="accent1"/>
+            </a:fillRef>
+            <a:effectRef idx="0">
+              <a:schemeClr val="accent1"/>
+            </a:effectRef>
+            <a:fontRef idx="minor">
+              <a:schemeClr val="lt1"/>
+            </a:fontRef>
+          </p:style>
+          <p:txBody>
+            <a:bodyPr lIns="90000" rtlCol="0" anchor="ctr"/>
+            <a:lstStyle/>
+            <a:p>
+              <a:pPr algn="ctr"/>
+              <a:endParaRPr lang="en-US"/>
+            </a:p>
+          </p:txBody>
+        </p:sp>
+        <p:sp>
+          <p:nvSpPr>
+            <p:cNvPr id="119" name="Oval 118"/>
+            <p:cNvSpPr/>
+            <p:nvPr/>
+          </p:nvSpPr>
+          <p:spPr>
+            <a:xfrm>
+              <a:off x="11015" y="4467"/>
+              <a:ext cx="28" cy="28"/>
+            </a:xfrm>
+            <a:prstGeom prst="ellipse">
+              <a:avLst/>
+            </a:prstGeom>
+            <a:solidFill>
+              <a:schemeClr val="tx1"/>
+            </a:solidFill>
+            <a:ln>
+              <a:noFill/>
+            </a:ln>
+          </p:spPr>
+          <p:style>
+            <a:lnRef idx="2">
+              <a:schemeClr val="accent1">
+                <a:shade val="50000"/>
+              </a:schemeClr>
+            </a:lnRef>
+            <a:fillRef idx="1">
+              <a:schemeClr val="accent1"/>
+            </a:fillRef>
+            <a:effectRef idx="0">
+              <a:schemeClr val="accent1"/>
+            </a:effectRef>
+            <a:fontRef idx="minor">
+              <a:schemeClr val="lt1"/>
+            </a:fontRef>
+          </p:style>
+          <p:txBody>
+            <a:bodyPr lIns="90000" rtlCol="0" anchor="ctr"/>
+            <a:lstStyle/>
+            <a:p>
+              <a:pPr algn="ctr"/>
+              <a:endParaRPr lang="en-US"/>
+            </a:p>
+          </p:txBody>
+        </p:sp>
+        <p:sp>
+          <p:nvSpPr>
+            <p:cNvPr id="122" name="Oval 121"/>
+            <p:cNvSpPr/>
+            <p:nvPr/>
+          </p:nvSpPr>
+          <p:spPr>
+            <a:xfrm>
+              <a:off x="9865" y="3530"/>
+              <a:ext cx="29" cy="28"/>
+            </a:xfrm>
+            <a:prstGeom prst="ellipse">
+              <a:avLst/>
+            </a:prstGeom>
+            <a:solidFill>
+              <a:schemeClr val="tx1"/>
+            </a:solidFill>
+            <a:ln>
+              <a:noFill/>
+            </a:ln>
+          </p:spPr>
+          <p:style>
+            <a:lnRef idx="2">
+              <a:schemeClr val="accent1">
+                <a:shade val="50000"/>
+              </a:schemeClr>
+            </a:lnRef>
+            <a:fillRef idx="1">
+              <a:schemeClr val="accent1"/>
+            </a:fillRef>
+            <a:effectRef idx="0">
+              <a:schemeClr val="accent1"/>
+            </a:effectRef>
+            <a:fontRef idx="minor">
+              <a:schemeClr val="lt1"/>
+            </a:fontRef>
+          </p:style>
+          <p:txBody>
+            <a:bodyPr lIns="90000" rtlCol="0" anchor="ctr"/>
+            <a:lstStyle/>
+            <a:p>
+              <a:pPr algn="ctr"/>
+              <a:endParaRPr lang="en-US"/>
+            </a:p>
+          </p:txBody>
+        </p:sp>
+        <p:sp>
+          <p:nvSpPr>
+            <p:cNvPr id="124" name="Oval 123"/>
+            <p:cNvSpPr/>
+            <p:nvPr/>
+          </p:nvSpPr>
+          <p:spPr>
+            <a:xfrm>
+              <a:off x="9091" y="3532"/>
+              <a:ext cx="28" cy="28"/>
+            </a:xfrm>
+            <a:prstGeom prst="ellipse">
+              <a:avLst/>
+            </a:prstGeom>
+            <a:solidFill>
+              <a:schemeClr val="tx1"/>
+            </a:solidFill>
+            <a:ln>
+              <a:noFill/>
+            </a:ln>
+          </p:spPr>
+          <p:style>
+            <a:lnRef idx="2">
+              <a:schemeClr val="accent1">
+                <a:shade val="50000"/>
+              </a:schemeClr>
+            </a:lnRef>
+            <a:fillRef idx="1">
+              <a:schemeClr val="accent1"/>
+            </a:fillRef>
+            <a:effectRef idx="0">
+              <a:schemeClr val="accent1"/>
+            </a:effectRef>
+            <a:fontRef idx="minor">
+              <a:schemeClr val="lt1"/>
+            </a:fontRef>
+          </p:style>
+          <p:txBody>
+            <a:bodyPr lIns="90000" rtlCol="0" anchor="ctr"/>
+            <a:lstStyle/>
+            <a:p>
+              <a:pPr algn="ctr"/>
+              <a:endParaRPr lang="en-US"/>
+            </a:p>
+          </p:txBody>
+        </p:sp>
+      </p:grpSp>
+    </p:spTree>
+  </p:cSld>
+  <p:clrMapOvr>
+    <a:masterClrMapping/>
+  </p:clrMapOvr>
+</p:sld>
+</file>
+
+<file path=ppt/slides/slide3.xml><?xml version="1.0" encoding="utf-8"?>
+<p:sld xmlns:a="http://schemas.openxmlformats.org/drawingml/2006/main" xmlns:r="http://schemas.openxmlformats.org/officeDocument/2006/relationships" xmlns:p="http://schemas.openxmlformats.org/presentationml/2006/main">
+  <p:cSld>
+    <p:spTree>
+      <p:nvGrpSpPr>
+        <p:cNvPr id="1" name=""/>
+        <p:cNvGrpSpPr/>
+        <p:nvPr/>
+      </p:nvGrpSpPr>
+      <p:grpSpPr>
+        <a:xfrm>
+          <a:off x="0" y="0"/>
+          <a:ext cx="0" cy="0"/>
+          <a:chOff x="0" y="0"/>
+          <a:chExt cx="0" cy="0"/>
+        </a:xfrm>
+      </p:grpSpPr>
       <p:sp>
         <p:nvSpPr>
-          <p:cNvPr id="4" name="Rectangle 3">
-            <a:extLst>
-              <a:ext uri="{FF2B5EF4-FFF2-40B4-BE49-F238E27FC236}">
-                <a16:creationId xmlns:a16="http://schemas.microsoft.com/office/drawing/2014/main" id="{5EFB2F0D-ABB3-D995-FA04-8C359C1827B4}"/>
-              </a:ext>
-            </a:extLst>
-          </p:cNvPr>
+          <p:cNvPr id="4" name="Rectangle 3"/>
           <p:cNvSpPr/>
           <p:nvPr/>
         </p:nvSpPr>
@@ -5874,7 +6260,7 @@
               </a:rPr>
               <a:t>Person</a:t>
             </a:r>
-            <a:endParaRPr lang="en-CN" b="1" dirty="0">
+            <a:endParaRPr lang="en-US" b="1" dirty="0">
               <a:solidFill>
                 <a:schemeClr val="tx1"/>
               </a:solidFill>
@@ -5884,13 +6270,7 @@
       </p:sp>
       <p:sp>
         <p:nvSpPr>
-          <p:cNvPr id="5" name="Rectangle 4">
-            <a:extLst>
-              <a:ext uri="{FF2B5EF4-FFF2-40B4-BE49-F238E27FC236}">
-                <a16:creationId xmlns:a16="http://schemas.microsoft.com/office/drawing/2014/main" id="{71799D25-8F4B-3E78-7E33-C84644F1D35C}"/>
-              </a:ext>
-            </a:extLst>
-          </p:cNvPr>
+          <p:cNvPr id="5" name="Rectangle 4"/>
           <p:cNvSpPr/>
           <p:nvPr/>
         </p:nvSpPr>
@@ -5942,7 +6322,7 @@
               </a:rPr>
               <a:t>Company</a:t>
             </a:r>
-            <a:endParaRPr lang="en-CN" b="1" dirty="0">
+            <a:endParaRPr lang="en-US" b="1" dirty="0">
               <a:solidFill>
                 <a:schemeClr val="tx1"/>
               </a:solidFill>
@@ -5952,13 +6332,7 @@
       </p:sp>
       <p:sp>
         <p:nvSpPr>
-          <p:cNvPr id="6" name="Rectangle 5">
-            <a:extLst>
-              <a:ext uri="{FF2B5EF4-FFF2-40B4-BE49-F238E27FC236}">
-                <a16:creationId xmlns:a16="http://schemas.microsoft.com/office/drawing/2014/main" id="{4C51DCB4-07F1-ACD1-2A47-E37BE04A33BA}"/>
-              </a:ext>
-            </a:extLst>
-          </p:cNvPr>
+          <p:cNvPr id="6" name="Rectangle 5"/>
           <p:cNvSpPr/>
           <p:nvPr/>
         </p:nvSpPr>
@@ -6011,7 +6385,7 @@
               </a:rPr>
               <a:t>Account</a:t>
             </a:r>
-            <a:endParaRPr lang="en-CN" b="1" dirty="0">
+            <a:endParaRPr lang="en-US" b="1" dirty="0">
               <a:solidFill>
                 <a:schemeClr val="tx1"/>
               </a:solidFill>
@@ -6021,13 +6395,7 @@
       </p:sp>
       <p:sp>
         <p:nvSpPr>
-          <p:cNvPr id="9" name="Rectangle 8">
-            <a:extLst>
-              <a:ext uri="{FF2B5EF4-FFF2-40B4-BE49-F238E27FC236}">
-                <a16:creationId xmlns:a16="http://schemas.microsoft.com/office/drawing/2014/main" id="{5F68F319-B446-C876-5ECA-738B6558B6E1}"/>
-              </a:ext>
-            </a:extLst>
-          </p:cNvPr>
+          <p:cNvPr id="9" name="Rectangle 8"/>
           <p:cNvSpPr/>
           <p:nvPr/>
         </p:nvSpPr>
@@ -6080,7 +6448,7 @@
               </a:rPr>
               <a:t>Medium</a:t>
             </a:r>
-            <a:endParaRPr lang="en-CN" b="1" dirty="0">
+            <a:endParaRPr lang="en-US" b="1" dirty="0">
               <a:solidFill>
                 <a:schemeClr val="tx1"/>
               </a:solidFill>
@@ -6090,13 +6458,7 @@
       </p:sp>
       <p:sp>
         <p:nvSpPr>
-          <p:cNvPr id="12" name="Rectangle 11">
-            <a:extLst>
-              <a:ext uri="{FF2B5EF4-FFF2-40B4-BE49-F238E27FC236}">
-                <a16:creationId xmlns:a16="http://schemas.microsoft.com/office/drawing/2014/main" id="{74363A22-BDF1-F1C7-E411-2E379C3A7160}"/>
-              </a:ext>
-            </a:extLst>
-          </p:cNvPr>
+          <p:cNvPr id="12" name="Rectangle 11"/>
           <p:cNvSpPr/>
           <p:nvPr/>
         </p:nvSpPr>
@@ -6149,7 +6511,7 @@
               </a:rPr>
               <a:t>Loan</a:t>
             </a:r>
-            <a:endParaRPr lang="en-CN" b="1" dirty="0">
+            <a:endParaRPr lang="en-US" b="1" dirty="0">
               <a:solidFill>
                 <a:schemeClr val="tx1"/>
               </a:solidFill>
@@ -6158,11 +6520,6 @@
         </p:txBody>
       </p:sp>
     </p:spTree>
-    <p:extLst>
-      <p:ext uri="{BB962C8B-B14F-4D97-AF65-F5344CB8AC3E}">
-        <p14:creationId xmlns:p14="http://schemas.microsoft.com/office/powerpoint/2010/main" val="3265552492"/>
-      </p:ext>
-    </p:extLst>
   </p:cSld>
   <p:clrMapOvr>
     <a:masterClrMapping/>
@@ -6213,7 +6570,7 @@
     </a:clrScheme>
     <a:fontScheme name="Office">
       <a:majorFont>
-        <a:latin typeface="等线 Light" panose="020F0302020204030204"/>
+        <a:latin typeface="等线 Light"/>
         <a:ea typeface=""/>
         <a:cs typeface=""/>
         <a:font script="Jpan" typeface="游ゴシック Light"/>
@@ -6248,7 +6605,7 @@
         <a:font script="Geor" typeface="Sylfaen"/>
       </a:majorFont>
       <a:minorFont>
-        <a:latin typeface="等线" panose="020F0502020204030204"/>
+        <a:latin typeface="等线"/>
         <a:ea typeface=""/>
         <a:cs typeface=""/>
         <a:font script="Jpan" typeface="游ゴシック"/>
@@ -6421,11 +6778,9 @@
       </a:bgFillStyleLst>
     </a:fmtScheme>
   </a:themeElements>
-  <a:objectDefaults/>
-  <a:extraClrSchemeLst/>
   <a:extLst>
     <a:ext uri="{05A4C25C-085E-4340-85A3-A5531E510DB2}">
-      <thm15:themeFamily xmlns:thm15="http://schemas.microsoft.com/office/thememl/2012/main" name="Alibaba Confidential 模板 - V2.pptx" id="{39F1ECA8-83D8-AF46-BF89-DE4A809600F5}" vid="{8FFC3335-084F-A749-B252-C3F3352952B6}"/>
+      <thm15:themeFamily xmlns:thm15="http://schemas.microsoft.com/office/thememl/2012/main" name="Office Theme" id="{62F939B6-93AF-4DB8-9C6B-D6C7DFDC589F}" vid="{4A3C46E8-61CC-4603-A589-7422A47A8E4A}"/>
     </a:ext>
   </a:extLst>
 </a:theme>
@@ -6474,7 +6829,7 @@
     </a:clrScheme>
     <a:fontScheme name="Office">
       <a:majorFont>
-        <a:latin typeface="Calibri Light" panose="020F0302020204030204"/>
+        <a:latin typeface="Calibri Light"/>
         <a:ea typeface=""/>
         <a:cs typeface=""/>
         <a:font script="Jpan" typeface="ＭＳ Ｐゴシック"/>
@@ -6509,7 +6864,7 @@
         <a:font script="Geor" typeface="Sylfaen"/>
       </a:majorFont>
       <a:minorFont>
-        <a:latin typeface="Calibri" panose="020F0502020204030204"/>
+        <a:latin typeface="Calibri"/>
         <a:ea typeface=""/>
         <a:cs typeface=""/>
         <a:font script="Jpan" typeface="ＭＳ Ｐゴシック"/>
@@ -6682,8 +7037,6 @@
       </a:bgFillStyleLst>
     </a:fmtScheme>
   </a:themeElements>
-  <a:objectDefaults/>
-  <a:extraClrSchemeLst/>
   <a:extLst>
     <a:ext uri="{05A4C25C-085E-4340-85A3-A5531E510DB2}">
       <thm15:themeFamily xmlns:thm15="http://schemas.microsoft.com/office/thememl/2012/main" name="Office Theme" id="{62F939B6-93AF-4DB8-9C6B-D6C7DFDC589F}" vid="{4A3C46E8-61CC-4603-A589-7422A47A8E4A}"/>

</xml_diff>

<commit_message>
add acid test chapter (#47)
</commit_message>
<xml_diff>
--- a/figures/schema.pptx
+++ b/figures/schema.pptx
@@ -1,15 +1,16 @@
 
 <file path=ppt/presentation.xml><?xml version="1.0" encoding="utf-8"?>
-<p:presentation xmlns:a="http://schemas.openxmlformats.org/drawingml/2006/main" xmlns:r="http://schemas.openxmlformats.org/officeDocument/2006/relationships" xmlns:p="http://schemas.openxmlformats.org/presentationml/2006/main" saveSubsetFonts="1">
+<p:presentation xmlns:a="http://schemas.openxmlformats.org/drawingml/2006/main" xmlns:r="http://schemas.openxmlformats.org/officeDocument/2006/relationships" xmlns:p="http://schemas.openxmlformats.org/presentationml/2006/main">
   <p:sldMasterIdLst>
     <p:sldMasterId id="2147483648" r:id="rId1"/>
   </p:sldMasterIdLst>
   <p:notesMasterIdLst>
-    <p:notesMasterId r:id="rId4"/>
+    <p:notesMasterId r:id="rId5"/>
   </p:notesMasterIdLst>
   <p:sldIdLst>
-    <p:sldId id="415" r:id="rId2"/>
-    <p:sldId id="416" r:id="rId3"/>
+    <p:sldId id="415" r:id="rId3"/>
+    <p:sldId id="417" r:id="rId4"/>
+    <p:sldId id="416" r:id="rId6"/>
   </p:sldIdLst>
   <p:sldSz cx="12192000" cy="6858000"/>
   <p:notesSz cx="6858000" cy="9144000"/>
@@ -114,13 +115,11 @@
         <p14:section name="默认节" id="{1EEC304E-9EA9-44B3-83A5-4400A19A585D}">
           <p14:sldIdLst>
             <p14:sldId id="415"/>
+            <p14:sldId id="417"/>
             <p14:sldId id="416"/>
           </p14:sldIdLst>
         </p14:section>
       </p14:sectionLst>
-    </p:ext>
-    <p:ext uri="{EFAFB233-063F-42B5-8137-9DF3F51BA10A}">
-      <p15:sldGuideLst xmlns:p15="http://schemas.microsoft.com/office/powerpoint/2012/main"/>
     </p:ext>
   </p:extLst>
 </p:presentation>
@@ -208,7 +207,6 @@
           <a:p>
             <a:fld id="{CAD4BD24-A097-4F9D-85E9-6A2A24CA2D98}" type="datetimeFigureOut">
               <a:rPr lang="zh-CN" altLang="en-US" smtClean="0"/>
-              <a:t>2022/11/12</a:t>
             </a:fld>
             <a:endParaRPr lang="zh-CN" altLang="en-US"/>
           </a:p>
@@ -275,6 +273,7 @@
               <a:rPr lang="zh-CN" altLang="en-US"/>
               <a:t>单击此处编辑母版文本样式</a:t>
             </a:r>
+            <a:endParaRPr lang="zh-CN" altLang="en-US"/>
           </a:p>
           <a:p>
             <a:pPr lvl="1"/>
@@ -282,6 +281,7 @@
               <a:rPr lang="zh-CN" altLang="en-US"/>
               <a:t>第二级</a:t>
             </a:r>
+            <a:endParaRPr lang="zh-CN" altLang="en-US"/>
           </a:p>
           <a:p>
             <a:pPr lvl="2"/>
@@ -289,6 +289,7 @@
               <a:rPr lang="zh-CN" altLang="en-US"/>
               <a:t>第三级</a:t>
             </a:r>
+            <a:endParaRPr lang="zh-CN" altLang="en-US"/>
           </a:p>
           <a:p>
             <a:pPr lvl="3"/>
@@ -296,6 +297,7 @@
               <a:rPr lang="zh-CN" altLang="en-US"/>
               <a:t>第四级</a:t>
             </a:r>
+            <a:endParaRPr lang="zh-CN" altLang="en-US"/>
           </a:p>
           <a:p>
             <a:pPr lvl="4"/>
@@ -303,6 +305,7 @@
               <a:rPr lang="zh-CN" altLang="en-US"/>
               <a:t>第五级</a:t>
             </a:r>
+            <a:endParaRPr lang="zh-CN" altLang="en-US"/>
           </a:p>
         </p:txBody>
       </p:sp>
@@ -366,18 +369,12 @@
           <a:p>
             <a:fld id="{4F292EE1-EB42-416D-BE21-6D6219010E5F}" type="slidenum">
               <a:rPr lang="zh-CN" altLang="en-US" smtClean="0"/>
-              <a:t>‹#›</a:t>
             </a:fld>
             <a:endParaRPr lang="zh-CN" altLang="en-US"/>
           </a:p>
         </p:txBody>
       </p:sp>
     </p:spTree>
-    <p:extLst>
-      <p:ext uri="{BB962C8B-B14F-4D97-AF65-F5344CB8AC3E}">
-        <p14:creationId xmlns:p14="http://schemas.microsoft.com/office/powerpoint/2010/main" val="1541082267"/>
-      </p:ext>
-    </p:extLst>
   </p:cSld>
   <p:clrMap bg1="lt1" tx1="dk1" bg2="lt2" tx2="dk2" accent1="accent1" accent2="accent2" accent3="accent3" accent4="accent4" accent5="accent5" accent6="accent6" hlink="hlink" folHlink="folHlink"/>
   <p:notesStyle>
@@ -475,6 +472,50 @@
 </p:notesMaster>
 </file>
 
+<file path=ppt/notesSlides/notesSlide1.xml><?xml version="1.0" encoding="utf-8"?>
+<p:notes xmlns:a="http://schemas.openxmlformats.org/drawingml/2006/main" xmlns:r="http://schemas.openxmlformats.org/officeDocument/2006/relationships" xmlns:p="http://schemas.openxmlformats.org/presentationml/2006/main">
+  <p:cSld>
+    <p:spTree>
+      <p:nvGrpSpPr>
+        <p:cNvPr id="1" name=""/>
+        <p:cNvGrpSpPr/>
+        <p:nvPr/>
+      </p:nvGrpSpPr>
+      <p:grpSpPr/>
+      <p:sp>
+        <p:nvSpPr>
+          <p:cNvPr id="2" name="幻灯片图像占位符 1"/>
+          <p:cNvSpPr/>
+          <p:nvPr>
+            <p:ph type="sldImg" idx="2"/>
+          </p:nvPr>
+        </p:nvSpPr>
+        <p:spPr/>
+      </p:sp>
+      <p:sp>
+        <p:nvSpPr>
+          <p:cNvPr id="3" name="文本占位符 2"/>
+          <p:cNvSpPr/>
+          <p:nvPr>
+            <p:ph type="body" idx="3"/>
+          </p:nvPr>
+        </p:nvSpPr>
+        <p:spPr/>
+        <p:txBody>
+          <a:bodyPr/>
+          <a:p>
+            <a:endParaRPr lang="zh-CN" altLang="en-US"/>
+          </a:p>
+        </p:txBody>
+      </p:sp>
+    </p:spTree>
+  </p:cSld>
+  <p:clrMapOvr>
+    <a:masterClrMapping/>
+  </p:clrMapOvr>
+</p:notes>
+</file>
+
 <file path=ppt/slideLayouts/slideLayout1.xml><?xml version="1.0" encoding="utf-8"?>
 <p:sldLayout xmlns:a="http://schemas.openxmlformats.org/drawingml/2006/main" xmlns:r="http://schemas.openxmlformats.org/officeDocument/2006/relationships" xmlns:p="http://schemas.openxmlformats.org/presentationml/2006/main" type="title" preserve="1">
   <p:cSld name="标题幻灯片">
@@ -520,6 +561,7 @@
               <a:rPr lang="zh-CN" altLang="en-US"/>
               <a:t>单击此处编辑母版标题样式</a:t>
             </a:r>
+            <a:endParaRPr lang="zh-CN" altLang="en-US"/>
           </a:p>
         </p:txBody>
       </p:sp>
@@ -584,15 +626,11 @@
               <a:rPr lang="zh-CN" altLang="en-US"/>
               <a:t>单击此处编辑母版副标题样式</a:t>
             </a:r>
+            <a:endParaRPr lang="zh-CN" altLang="en-US"/>
           </a:p>
         </p:txBody>
       </p:sp>
     </p:spTree>
-    <p:extLst>
-      <p:ext uri="{BB962C8B-B14F-4D97-AF65-F5344CB8AC3E}">
-        <p14:creationId xmlns:p14="http://schemas.microsoft.com/office/powerpoint/2010/main" val="3908105507"/>
-      </p:ext>
-    </p:extLst>
   </p:cSld>
   <p:clrMapOvr>
     <a:masterClrMapping/>
@@ -636,6 +674,7 @@
               <a:rPr lang="zh-CN" altLang="en-US"/>
               <a:t>单击此处编辑母版标题样式</a:t>
             </a:r>
+            <a:endParaRPr lang="zh-CN" altLang="en-US"/>
           </a:p>
         </p:txBody>
       </p:sp>
@@ -646,7 +685,7 @@
             <a:spLocks noGrp="1"/>
           </p:cNvSpPr>
           <p:nvPr>
-            <p:ph type="body" orient="vert" idx="1"/>
+            <p:ph type="body" orient="vert" idx="1" hasCustomPrompt="1"/>
           </p:nvPr>
         </p:nvSpPr>
         <p:spPr/>
@@ -659,6 +698,7 @@
               <a:rPr lang="zh-CN" altLang="en-US"/>
               <a:t>编辑母版文本样式</a:t>
             </a:r>
+            <a:endParaRPr lang="zh-CN" altLang="en-US"/>
           </a:p>
           <a:p>
             <a:pPr lvl="1"/>
@@ -666,6 +706,7 @@
               <a:rPr lang="zh-CN" altLang="en-US"/>
               <a:t>第二级</a:t>
             </a:r>
+            <a:endParaRPr lang="zh-CN" altLang="en-US"/>
           </a:p>
           <a:p>
             <a:pPr lvl="2"/>
@@ -673,6 +714,7 @@
               <a:rPr lang="zh-CN" altLang="en-US"/>
               <a:t>第三级</a:t>
             </a:r>
+            <a:endParaRPr lang="zh-CN" altLang="en-US"/>
           </a:p>
           <a:p>
             <a:pPr lvl="3"/>
@@ -680,6 +722,7 @@
               <a:rPr lang="zh-CN" altLang="en-US"/>
               <a:t>第四级</a:t>
             </a:r>
+            <a:endParaRPr lang="zh-CN" altLang="en-US"/>
           </a:p>
           <a:p>
             <a:pPr lvl="4"/>
@@ -687,15 +730,11 @@
               <a:rPr lang="zh-CN" altLang="en-US"/>
               <a:t>第五级</a:t>
             </a:r>
+            <a:endParaRPr lang="zh-CN" altLang="en-US"/>
           </a:p>
         </p:txBody>
       </p:sp>
     </p:spTree>
-    <p:extLst>
-      <p:ext uri="{BB962C8B-B14F-4D97-AF65-F5344CB8AC3E}">
-        <p14:creationId xmlns:p14="http://schemas.microsoft.com/office/powerpoint/2010/main" val="3805088680"/>
-      </p:ext>
-    </p:extLst>
   </p:cSld>
   <p:clrMapOvr>
     <a:masterClrMapping/>
@@ -744,6 +783,7 @@
               <a:rPr lang="zh-CN" altLang="en-US"/>
               <a:t>单击此处编辑母版标题样式</a:t>
             </a:r>
+            <a:endParaRPr lang="zh-CN" altLang="en-US"/>
           </a:p>
         </p:txBody>
       </p:sp>
@@ -754,7 +794,7 @@
             <a:spLocks noGrp="1"/>
           </p:cNvSpPr>
           <p:nvPr>
-            <p:ph type="body" orient="vert" idx="1"/>
+            <p:ph type="body" orient="vert" idx="1" hasCustomPrompt="1"/>
           </p:nvPr>
         </p:nvSpPr>
         <p:spPr>
@@ -772,6 +812,7 @@
               <a:rPr lang="zh-CN" altLang="en-US"/>
               <a:t>编辑母版文本样式</a:t>
             </a:r>
+            <a:endParaRPr lang="zh-CN" altLang="en-US"/>
           </a:p>
           <a:p>
             <a:pPr lvl="1"/>
@@ -779,6 +820,7 @@
               <a:rPr lang="zh-CN" altLang="en-US"/>
               <a:t>第二级</a:t>
             </a:r>
+            <a:endParaRPr lang="zh-CN" altLang="en-US"/>
           </a:p>
           <a:p>
             <a:pPr lvl="2"/>
@@ -786,6 +828,7 @@
               <a:rPr lang="zh-CN" altLang="en-US"/>
               <a:t>第三级</a:t>
             </a:r>
+            <a:endParaRPr lang="zh-CN" altLang="en-US"/>
           </a:p>
           <a:p>
             <a:pPr lvl="3"/>
@@ -793,6 +836,7 @@
               <a:rPr lang="zh-CN" altLang="en-US"/>
               <a:t>第四级</a:t>
             </a:r>
+            <a:endParaRPr lang="zh-CN" altLang="en-US"/>
           </a:p>
           <a:p>
             <a:pPr lvl="4"/>
@@ -800,15 +844,11 @@
               <a:rPr lang="zh-CN" altLang="en-US"/>
               <a:t>第五级</a:t>
             </a:r>
+            <a:endParaRPr lang="zh-CN" altLang="en-US"/>
           </a:p>
         </p:txBody>
       </p:sp>
     </p:spTree>
-    <p:extLst>
-      <p:ext uri="{BB962C8B-B14F-4D97-AF65-F5344CB8AC3E}">
-        <p14:creationId xmlns:p14="http://schemas.microsoft.com/office/powerpoint/2010/main" val="3288526317"/>
-      </p:ext>
-    </p:extLst>
   </p:cSld>
   <p:clrMapOvr>
     <a:masterClrMapping/>
@@ -852,6 +892,7 @@
               <a:rPr lang="zh-CN" altLang="en-US"/>
               <a:t>单击此处编辑母版标题样式</a:t>
             </a:r>
+            <a:endParaRPr lang="zh-CN" altLang="en-US"/>
           </a:p>
         </p:txBody>
       </p:sp>
@@ -862,7 +903,7 @@
             <a:spLocks noGrp="1"/>
           </p:cNvSpPr>
           <p:nvPr>
-            <p:ph idx="1"/>
+            <p:ph idx="1" hasCustomPrompt="1"/>
           </p:nvPr>
         </p:nvSpPr>
         <p:spPr/>
@@ -875,6 +916,7 @@
               <a:rPr lang="zh-CN" altLang="en-US"/>
               <a:t>编辑母版文本样式</a:t>
             </a:r>
+            <a:endParaRPr lang="zh-CN" altLang="en-US"/>
           </a:p>
           <a:p>
             <a:pPr lvl="1"/>
@@ -882,6 +924,7 @@
               <a:rPr lang="zh-CN" altLang="en-US"/>
               <a:t>第二级</a:t>
             </a:r>
+            <a:endParaRPr lang="zh-CN" altLang="en-US"/>
           </a:p>
           <a:p>
             <a:pPr lvl="2"/>
@@ -889,6 +932,7 @@
               <a:rPr lang="zh-CN" altLang="en-US"/>
               <a:t>第三级</a:t>
             </a:r>
+            <a:endParaRPr lang="zh-CN" altLang="en-US"/>
           </a:p>
           <a:p>
             <a:pPr lvl="3"/>
@@ -896,6 +940,7 @@
               <a:rPr lang="zh-CN" altLang="en-US"/>
               <a:t>第四级</a:t>
             </a:r>
+            <a:endParaRPr lang="zh-CN" altLang="en-US"/>
           </a:p>
           <a:p>
             <a:pPr lvl="4"/>
@@ -903,15 +948,11 @@
               <a:rPr lang="zh-CN" altLang="en-US"/>
               <a:t>第五级</a:t>
             </a:r>
+            <a:endParaRPr lang="zh-CN" altLang="en-US"/>
           </a:p>
         </p:txBody>
       </p:sp>
     </p:spTree>
-    <p:extLst>
-      <p:ext uri="{BB962C8B-B14F-4D97-AF65-F5344CB8AC3E}">
-        <p14:creationId xmlns:p14="http://schemas.microsoft.com/office/powerpoint/2010/main" val="4068014718"/>
-      </p:ext>
-    </p:extLst>
   </p:cSld>
   <p:clrMapOvr>
     <a:masterClrMapping/>
@@ -964,6 +1005,7 @@
               <a:rPr lang="zh-CN" altLang="en-US"/>
               <a:t>单击此处编辑母版标题样式</a:t>
             </a:r>
+            <a:endParaRPr lang="zh-CN" altLang="en-US"/>
           </a:p>
         </p:txBody>
       </p:sp>
@@ -974,7 +1016,7 @@
             <a:spLocks noGrp="1"/>
           </p:cNvSpPr>
           <p:nvPr>
-            <p:ph type="body" idx="1"/>
+            <p:ph type="body" idx="1" hasCustomPrompt="1"/>
           </p:nvPr>
         </p:nvSpPr>
         <p:spPr>
@@ -1083,15 +1125,11 @@
               <a:rPr lang="zh-CN" altLang="en-US"/>
               <a:t>编辑母版文本样式</a:t>
             </a:r>
+            <a:endParaRPr lang="zh-CN" altLang="en-US"/>
           </a:p>
         </p:txBody>
       </p:sp>
     </p:spTree>
-    <p:extLst>
-      <p:ext uri="{BB962C8B-B14F-4D97-AF65-F5344CB8AC3E}">
-        <p14:creationId xmlns:p14="http://schemas.microsoft.com/office/powerpoint/2010/main" val="4127098996"/>
-      </p:ext>
-    </p:extLst>
   </p:cSld>
   <p:clrMapOvr>
     <a:masterClrMapping/>
@@ -1135,6 +1173,7 @@
               <a:rPr lang="zh-CN" altLang="en-US"/>
               <a:t>单击此处编辑母版标题样式</a:t>
             </a:r>
+            <a:endParaRPr lang="zh-CN" altLang="en-US"/>
           </a:p>
         </p:txBody>
       </p:sp>
@@ -1145,7 +1184,7 @@
             <a:spLocks noGrp="1"/>
           </p:cNvSpPr>
           <p:nvPr>
-            <p:ph sz="half" idx="1"/>
+            <p:ph sz="half" idx="1" hasCustomPrompt="1"/>
           </p:nvPr>
         </p:nvSpPr>
         <p:spPr>
@@ -1163,6 +1202,7 @@
               <a:rPr lang="zh-CN" altLang="en-US"/>
               <a:t>编辑母版文本样式</a:t>
             </a:r>
+            <a:endParaRPr lang="zh-CN" altLang="en-US"/>
           </a:p>
           <a:p>
             <a:pPr lvl="1"/>
@@ -1170,6 +1210,7 @@
               <a:rPr lang="zh-CN" altLang="en-US"/>
               <a:t>第二级</a:t>
             </a:r>
+            <a:endParaRPr lang="zh-CN" altLang="en-US"/>
           </a:p>
           <a:p>
             <a:pPr lvl="2"/>
@@ -1177,6 +1218,7 @@
               <a:rPr lang="zh-CN" altLang="en-US"/>
               <a:t>第三级</a:t>
             </a:r>
+            <a:endParaRPr lang="zh-CN" altLang="en-US"/>
           </a:p>
           <a:p>
             <a:pPr lvl="3"/>
@@ -1184,6 +1226,7 @@
               <a:rPr lang="zh-CN" altLang="en-US"/>
               <a:t>第四级</a:t>
             </a:r>
+            <a:endParaRPr lang="zh-CN" altLang="en-US"/>
           </a:p>
           <a:p>
             <a:pPr lvl="4"/>
@@ -1191,6 +1234,7 @@
               <a:rPr lang="zh-CN" altLang="en-US"/>
               <a:t>第五级</a:t>
             </a:r>
+            <a:endParaRPr lang="zh-CN" altLang="en-US"/>
           </a:p>
         </p:txBody>
       </p:sp>
@@ -1201,7 +1245,7 @@
             <a:spLocks noGrp="1"/>
           </p:cNvSpPr>
           <p:nvPr>
-            <p:ph sz="half" idx="2"/>
+            <p:ph sz="half" idx="2" hasCustomPrompt="1"/>
           </p:nvPr>
         </p:nvSpPr>
         <p:spPr>
@@ -1219,6 +1263,7 @@
               <a:rPr lang="zh-CN" altLang="en-US"/>
               <a:t>编辑母版文本样式</a:t>
             </a:r>
+            <a:endParaRPr lang="zh-CN" altLang="en-US"/>
           </a:p>
           <a:p>
             <a:pPr lvl="1"/>
@@ -1226,6 +1271,7 @@
               <a:rPr lang="zh-CN" altLang="en-US"/>
               <a:t>第二级</a:t>
             </a:r>
+            <a:endParaRPr lang="zh-CN" altLang="en-US"/>
           </a:p>
           <a:p>
             <a:pPr lvl="2"/>
@@ -1233,6 +1279,7 @@
               <a:rPr lang="zh-CN" altLang="en-US"/>
               <a:t>第三级</a:t>
             </a:r>
+            <a:endParaRPr lang="zh-CN" altLang="en-US"/>
           </a:p>
           <a:p>
             <a:pPr lvl="3"/>
@@ -1240,6 +1287,7 @@
               <a:rPr lang="zh-CN" altLang="en-US"/>
               <a:t>第四级</a:t>
             </a:r>
+            <a:endParaRPr lang="zh-CN" altLang="en-US"/>
           </a:p>
           <a:p>
             <a:pPr lvl="4"/>
@@ -1247,15 +1295,11 @@
               <a:rPr lang="zh-CN" altLang="en-US"/>
               <a:t>第五级</a:t>
             </a:r>
+            <a:endParaRPr lang="zh-CN" altLang="en-US"/>
           </a:p>
         </p:txBody>
       </p:sp>
     </p:spTree>
-    <p:extLst>
-      <p:ext uri="{BB962C8B-B14F-4D97-AF65-F5344CB8AC3E}">
-        <p14:creationId xmlns:p14="http://schemas.microsoft.com/office/powerpoint/2010/main" val="3122155552"/>
-      </p:ext>
-    </p:extLst>
   </p:cSld>
   <p:clrMapOvr>
     <a:masterClrMapping/>
@@ -1304,6 +1348,7 @@
               <a:rPr lang="zh-CN" altLang="en-US"/>
               <a:t>单击此处编辑母版标题样式</a:t>
             </a:r>
+            <a:endParaRPr lang="zh-CN" altLang="en-US"/>
           </a:p>
         </p:txBody>
       </p:sp>
@@ -1314,7 +1359,7 @@
             <a:spLocks noGrp="1"/>
           </p:cNvSpPr>
           <p:nvPr>
-            <p:ph type="body" idx="1"/>
+            <p:ph type="body" idx="1" hasCustomPrompt="1"/>
           </p:nvPr>
         </p:nvSpPr>
         <p:spPr>
@@ -1369,6 +1414,7 @@
               <a:rPr lang="zh-CN" altLang="en-US"/>
               <a:t>编辑母版文本样式</a:t>
             </a:r>
+            <a:endParaRPr lang="zh-CN" altLang="en-US"/>
           </a:p>
         </p:txBody>
       </p:sp>
@@ -1379,7 +1425,7 @@
             <a:spLocks noGrp="1"/>
           </p:cNvSpPr>
           <p:nvPr>
-            <p:ph sz="half" idx="2"/>
+            <p:ph sz="half" idx="2" hasCustomPrompt="1"/>
           </p:nvPr>
         </p:nvSpPr>
         <p:spPr>
@@ -1397,6 +1443,7 @@
               <a:rPr lang="zh-CN" altLang="en-US"/>
               <a:t>编辑母版文本样式</a:t>
             </a:r>
+            <a:endParaRPr lang="zh-CN" altLang="en-US"/>
           </a:p>
           <a:p>
             <a:pPr lvl="1"/>
@@ -1404,6 +1451,7 @@
               <a:rPr lang="zh-CN" altLang="en-US"/>
               <a:t>第二级</a:t>
             </a:r>
+            <a:endParaRPr lang="zh-CN" altLang="en-US"/>
           </a:p>
           <a:p>
             <a:pPr lvl="2"/>
@@ -1411,6 +1459,7 @@
               <a:rPr lang="zh-CN" altLang="en-US"/>
               <a:t>第三级</a:t>
             </a:r>
+            <a:endParaRPr lang="zh-CN" altLang="en-US"/>
           </a:p>
           <a:p>
             <a:pPr lvl="3"/>
@@ -1418,6 +1467,7 @@
               <a:rPr lang="zh-CN" altLang="en-US"/>
               <a:t>第四级</a:t>
             </a:r>
+            <a:endParaRPr lang="zh-CN" altLang="en-US"/>
           </a:p>
           <a:p>
             <a:pPr lvl="4"/>
@@ -1425,6 +1475,7 @@
               <a:rPr lang="zh-CN" altLang="en-US"/>
               <a:t>第五级</a:t>
             </a:r>
+            <a:endParaRPr lang="zh-CN" altLang="en-US"/>
           </a:p>
         </p:txBody>
       </p:sp>
@@ -1435,7 +1486,7 @@
             <a:spLocks noGrp="1"/>
           </p:cNvSpPr>
           <p:nvPr>
-            <p:ph type="body" sz="quarter" idx="3"/>
+            <p:ph type="body" sz="quarter" idx="3" hasCustomPrompt="1"/>
           </p:nvPr>
         </p:nvSpPr>
         <p:spPr>
@@ -1490,6 +1541,7 @@
               <a:rPr lang="zh-CN" altLang="en-US"/>
               <a:t>编辑母版文本样式</a:t>
             </a:r>
+            <a:endParaRPr lang="zh-CN" altLang="en-US"/>
           </a:p>
         </p:txBody>
       </p:sp>
@@ -1500,7 +1552,7 @@
             <a:spLocks noGrp="1"/>
           </p:cNvSpPr>
           <p:nvPr>
-            <p:ph sz="quarter" idx="4"/>
+            <p:ph sz="quarter" idx="4" hasCustomPrompt="1"/>
           </p:nvPr>
         </p:nvSpPr>
         <p:spPr>
@@ -1518,6 +1570,7 @@
               <a:rPr lang="zh-CN" altLang="en-US"/>
               <a:t>编辑母版文本样式</a:t>
             </a:r>
+            <a:endParaRPr lang="zh-CN" altLang="en-US"/>
           </a:p>
           <a:p>
             <a:pPr lvl="1"/>
@@ -1525,6 +1578,7 @@
               <a:rPr lang="zh-CN" altLang="en-US"/>
               <a:t>第二级</a:t>
             </a:r>
+            <a:endParaRPr lang="zh-CN" altLang="en-US"/>
           </a:p>
           <a:p>
             <a:pPr lvl="2"/>
@@ -1532,6 +1586,7 @@
               <a:rPr lang="zh-CN" altLang="en-US"/>
               <a:t>第三级</a:t>
             </a:r>
+            <a:endParaRPr lang="zh-CN" altLang="en-US"/>
           </a:p>
           <a:p>
             <a:pPr lvl="3"/>
@@ -1539,6 +1594,7 @@
               <a:rPr lang="zh-CN" altLang="en-US"/>
               <a:t>第四级</a:t>
             </a:r>
+            <a:endParaRPr lang="zh-CN" altLang="en-US"/>
           </a:p>
           <a:p>
             <a:pPr lvl="4"/>
@@ -1546,15 +1602,11 @@
               <a:rPr lang="zh-CN" altLang="en-US"/>
               <a:t>第五级</a:t>
             </a:r>
+            <a:endParaRPr lang="zh-CN" altLang="en-US"/>
           </a:p>
         </p:txBody>
       </p:sp>
     </p:spTree>
-    <p:extLst>
-      <p:ext uri="{BB962C8B-B14F-4D97-AF65-F5344CB8AC3E}">
-        <p14:creationId xmlns:p14="http://schemas.microsoft.com/office/powerpoint/2010/main" val="47388910"/>
-      </p:ext>
-    </p:extLst>
   </p:cSld>
   <p:clrMapOvr>
     <a:masterClrMapping/>
@@ -1598,15 +1650,11 @@
               <a:rPr lang="zh-CN" altLang="en-US"/>
               <a:t>单击此处编辑母版标题样式</a:t>
             </a:r>
+            <a:endParaRPr lang="zh-CN" altLang="en-US"/>
           </a:p>
         </p:txBody>
       </p:sp>
     </p:spTree>
-    <p:extLst>
-      <p:ext uri="{BB962C8B-B14F-4D97-AF65-F5344CB8AC3E}">
-        <p14:creationId xmlns:p14="http://schemas.microsoft.com/office/powerpoint/2010/main" val="1758752746"/>
-      </p:ext>
-    </p:extLst>
   </p:cSld>
   <p:clrMapOvr>
     <a:masterClrMapping/>
@@ -1632,11 +1680,6 @@
         </a:xfrm>
       </p:grpSpPr>
     </p:spTree>
-    <p:extLst>
-      <p:ext uri="{BB962C8B-B14F-4D97-AF65-F5344CB8AC3E}">
-        <p14:creationId xmlns:p14="http://schemas.microsoft.com/office/powerpoint/2010/main" val="1817792897"/>
-      </p:ext>
-    </p:extLst>
   </p:cSld>
   <p:clrMapOvr>
     <a:masterClrMapping/>
@@ -1689,6 +1732,7 @@
               <a:rPr lang="zh-CN" altLang="en-US"/>
               <a:t>单击此处编辑母版标题样式</a:t>
             </a:r>
+            <a:endParaRPr lang="zh-CN" altLang="en-US"/>
           </a:p>
         </p:txBody>
       </p:sp>
@@ -1699,7 +1743,7 @@
             <a:spLocks noGrp="1"/>
           </p:cNvSpPr>
           <p:nvPr>
-            <p:ph idx="1"/>
+            <p:ph idx="1" hasCustomPrompt="1"/>
           </p:nvPr>
         </p:nvSpPr>
         <p:spPr>
@@ -1745,6 +1789,7 @@
               <a:rPr lang="zh-CN" altLang="en-US"/>
               <a:t>编辑母版文本样式</a:t>
             </a:r>
+            <a:endParaRPr lang="zh-CN" altLang="en-US"/>
           </a:p>
           <a:p>
             <a:pPr lvl="1"/>
@@ -1752,6 +1797,7 @@
               <a:rPr lang="zh-CN" altLang="en-US"/>
               <a:t>第二级</a:t>
             </a:r>
+            <a:endParaRPr lang="zh-CN" altLang="en-US"/>
           </a:p>
           <a:p>
             <a:pPr lvl="2"/>
@@ -1759,6 +1805,7 @@
               <a:rPr lang="zh-CN" altLang="en-US"/>
               <a:t>第三级</a:t>
             </a:r>
+            <a:endParaRPr lang="zh-CN" altLang="en-US"/>
           </a:p>
           <a:p>
             <a:pPr lvl="3"/>
@@ -1766,6 +1813,7 @@
               <a:rPr lang="zh-CN" altLang="en-US"/>
               <a:t>第四级</a:t>
             </a:r>
+            <a:endParaRPr lang="zh-CN" altLang="en-US"/>
           </a:p>
           <a:p>
             <a:pPr lvl="4"/>
@@ -1773,6 +1821,7 @@
               <a:rPr lang="zh-CN" altLang="en-US"/>
               <a:t>第五级</a:t>
             </a:r>
+            <a:endParaRPr lang="zh-CN" altLang="en-US"/>
           </a:p>
         </p:txBody>
       </p:sp>
@@ -1783,7 +1832,7 @@
             <a:spLocks noGrp="1"/>
           </p:cNvSpPr>
           <p:nvPr>
-            <p:ph type="body" sz="half" idx="2"/>
+            <p:ph type="body" sz="half" idx="2" hasCustomPrompt="1"/>
           </p:nvPr>
         </p:nvSpPr>
         <p:spPr>
@@ -1838,15 +1887,11 @@
               <a:rPr lang="zh-CN" altLang="en-US"/>
               <a:t>编辑母版文本样式</a:t>
             </a:r>
+            <a:endParaRPr lang="zh-CN" altLang="en-US"/>
           </a:p>
         </p:txBody>
       </p:sp>
     </p:spTree>
-    <p:extLst>
-      <p:ext uri="{BB962C8B-B14F-4D97-AF65-F5344CB8AC3E}">
-        <p14:creationId xmlns:p14="http://schemas.microsoft.com/office/powerpoint/2010/main" val="1429949822"/>
-      </p:ext>
-    </p:extLst>
   </p:cSld>
   <p:clrMapOvr>
     <a:masterClrMapping/>
@@ -1899,6 +1944,7 @@
               <a:rPr lang="zh-CN" altLang="en-US"/>
               <a:t>单击此处编辑母版标题样式</a:t>
             </a:r>
+            <a:endParaRPr lang="zh-CN" altLang="en-US"/>
           </a:p>
         </p:txBody>
       </p:sp>
@@ -1963,6 +2009,7 @@
               <a:rPr lang="zh-CN" altLang="en-US"/>
               <a:t>单击图标添加图片</a:t>
             </a:r>
+            <a:endParaRPr lang="zh-CN" altLang="en-US"/>
           </a:p>
         </p:txBody>
       </p:sp>
@@ -1973,7 +2020,7 @@
             <a:spLocks noGrp="1"/>
           </p:cNvSpPr>
           <p:nvPr>
-            <p:ph type="body" sz="half" idx="2"/>
+            <p:ph type="body" sz="half" idx="2" hasCustomPrompt="1"/>
           </p:nvPr>
         </p:nvSpPr>
         <p:spPr>
@@ -2028,15 +2075,11 @@
               <a:rPr lang="zh-CN" altLang="en-US"/>
               <a:t>编辑母版文本样式</a:t>
             </a:r>
+            <a:endParaRPr lang="zh-CN" altLang="en-US"/>
           </a:p>
         </p:txBody>
       </p:sp>
     </p:spTree>
-    <p:extLst>
-      <p:ext uri="{BB962C8B-B14F-4D97-AF65-F5344CB8AC3E}">
-        <p14:creationId xmlns:p14="http://schemas.microsoft.com/office/powerpoint/2010/main" val="3064767483"/>
-      </p:ext>
-    </p:extLst>
   </p:cSld>
   <p:clrMapOvr>
     <a:masterClrMapping/>
@@ -2095,6 +2138,7 @@
               <a:rPr lang="zh-CN" altLang="en-US"/>
               <a:t>单击此处编辑母版标题样式</a:t>
             </a:r>
+            <a:endParaRPr lang="zh-CN" altLang="en-US"/>
           </a:p>
         </p:txBody>
       </p:sp>
@@ -2128,6 +2172,7 @@
               <a:rPr lang="zh-CN" altLang="en-US" dirty="0"/>
               <a:t>编辑母版文本样式</a:t>
             </a:r>
+            <a:endParaRPr lang="zh-CN" altLang="en-US" dirty="0"/>
           </a:p>
           <a:p>
             <a:pPr lvl="1"/>
@@ -2135,6 +2180,7 @@
               <a:rPr lang="zh-CN" altLang="en-US" dirty="0"/>
               <a:t>第二级</a:t>
             </a:r>
+            <a:endParaRPr lang="zh-CN" altLang="en-US" dirty="0"/>
           </a:p>
           <a:p>
             <a:pPr lvl="2"/>
@@ -2142,6 +2188,7 @@
               <a:rPr lang="zh-CN" altLang="en-US" dirty="0"/>
               <a:t>第三级</a:t>
             </a:r>
+            <a:endParaRPr lang="zh-CN" altLang="en-US" dirty="0"/>
           </a:p>
           <a:p>
             <a:pPr lvl="3"/>
@@ -2149,6 +2196,7 @@
               <a:rPr lang="zh-CN" altLang="en-US" dirty="0"/>
               <a:t>第四级</a:t>
             </a:r>
+            <a:endParaRPr lang="zh-CN" altLang="en-US" dirty="0"/>
           </a:p>
           <a:p>
             <a:pPr lvl="4"/>
@@ -2156,15 +2204,11 @@
               <a:rPr lang="zh-CN" altLang="en-US" dirty="0"/>
               <a:t>第五级</a:t>
             </a:r>
+            <a:endParaRPr lang="zh-CN" altLang="en-US" dirty="0"/>
           </a:p>
         </p:txBody>
       </p:sp>
     </p:spTree>
-    <p:extLst>
-      <p:ext uri="{BB962C8B-B14F-4D97-AF65-F5344CB8AC3E}">
-        <p14:creationId xmlns:p14="http://schemas.microsoft.com/office/powerpoint/2010/main" val="1468480323"/>
-      </p:ext>
-    </p:extLst>
   </p:cSld>
   <p:clrMap bg1="lt1" tx1="dk1" bg2="lt2" tx2="dk2" accent1="accent1" accent2="accent2" accent3="accent3" accent4="accent4" accent5="accent5" accent6="accent6" hlink="hlink" folHlink="folHlink"/>
   <p:sldLayoutIdLst>
@@ -2209,7 +2253,7 @@
         <a:spcBef>
           <a:spcPts val="1000"/>
         </a:spcBef>
-        <a:buFont typeface="Arial" panose="020B0604020202020204" pitchFamily="34" charset="0"/>
+        <a:buFont typeface="Arial" panose="020B0604020202090204" pitchFamily="34" charset="0"/>
         <a:buChar char="•"/>
         <a:defRPr sz="2800" kern="1200">
           <a:solidFill>
@@ -2227,7 +2271,7 @@
         <a:spcBef>
           <a:spcPts val="500"/>
         </a:spcBef>
-        <a:buFont typeface="Arial" panose="020B0604020202020204" pitchFamily="34" charset="0"/>
+        <a:buFont typeface="Arial" panose="020B0604020202090204" pitchFamily="34" charset="0"/>
         <a:buChar char="•"/>
         <a:defRPr sz="2400" kern="1200">
           <a:solidFill>
@@ -2245,7 +2289,7 @@
         <a:spcBef>
           <a:spcPts val="500"/>
         </a:spcBef>
-        <a:buFont typeface="Arial" panose="020B0604020202020204" pitchFamily="34" charset="0"/>
+        <a:buFont typeface="Arial" panose="020B0604020202090204" pitchFamily="34" charset="0"/>
         <a:buChar char="•"/>
         <a:defRPr sz="2000" kern="1200">
           <a:solidFill>
@@ -2263,7 +2307,7 @@
         <a:spcBef>
           <a:spcPts val="500"/>
         </a:spcBef>
-        <a:buFont typeface="Arial" panose="020B0604020202020204" pitchFamily="34" charset="0"/>
+        <a:buFont typeface="Arial" panose="020B0604020202090204" pitchFamily="34" charset="0"/>
         <a:buChar char="•"/>
         <a:defRPr sz="1800" kern="1200">
           <a:solidFill>
@@ -2281,7 +2325,7 @@
         <a:spcBef>
           <a:spcPts val="500"/>
         </a:spcBef>
-        <a:buFont typeface="Arial" panose="020B0604020202020204" pitchFamily="34" charset="0"/>
+        <a:buFont typeface="Arial" panose="020B0604020202090204" pitchFamily="34" charset="0"/>
         <a:buChar char="•"/>
         <a:defRPr sz="1800" kern="1200">
           <a:solidFill>
@@ -2299,7 +2343,7 @@
         <a:spcBef>
           <a:spcPts val="500"/>
         </a:spcBef>
-        <a:buFont typeface="Arial" panose="020B0604020202020204" pitchFamily="34" charset="0"/>
+        <a:buFont typeface="Arial" panose="020B0604020202090204" pitchFamily="34" charset="0"/>
         <a:buChar char="•"/>
         <a:defRPr sz="1800" kern="1200">
           <a:solidFill>
@@ -2317,7 +2361,7 @@
         <a:spcBef>
           <a:spcPts val="500"/>
         </a:spcBef>
-        <a:buFont typeface="Arial" panose="020B0604020202020204" pitchFamily="34" charset="0"/>
+        <a:buFont typeface="Arial" panose="020B0604020202090204" pitchFamily="34" charset="0"/>
         <a:buChar char="•"/>
         <a:defRPr sz="1800" kern="1200">
           <a:solidFill>
@@ -2335,7 +2379,7 @@
         <a:spcBef>
           <a:spcPts val="500"/>
         </a:spcBef>
-        <a:buFont typeface="Arial" panose="020B0604020202020204" pitchFamily="34" charset="0"/>
+        <a:buFont typeface="Arial" panose="020B0604020202090204" pitchFamily="34" charset="0"/>
         <a:buChar char="•"/>
         <a:defRPr sz="1800" kern="1200">
           <a:solidFill>
@@ -2353,7 +2397,7 @@
         <a:spcBef>
           <a:spcPts val="500"/>
         </a:spcBef>
-        <a:buFont typeface="Arial" panose="020B0604020202020204" pitchFamily="34" charset="0"/>
+        <a:buFont typeface="Arial" panose="020B0604020202090204" pitchFamily="34" charset="0"/>
         <a:buChar char="•"/>
         <a:defRPr sz="1800" kern="1200">
           <a:solidFill>
@@ -2461,22 +2505,6 @@
       </a:lvl9pPr>
     </p:otherStyle>
   </p:txStyles>
-  <p:extLst>
-    <p:ext uri="{27BBF7A9-308A-43DC-89C8-2F10F3537804}">
-      <p15:sldGuideLst xmlns:p15="http://schemas.microsoft.com/office/powerpoint/2012/main">
-        <p15:guide id="1" orient="horz" pos="2160" userDrawn="1">
-          <p15:clr>
-            <a:srgbClr val="F26B43"/>
-          </p15:clr>
-        </p15:guide>
-        <p15:guide id="2" pos="3840" userDrawn="1">
-          <p15:clr>
-            <a:srgbClr val="F26B43"/>
-          </p15:clr>
-        </p15:guide>
-      </p15:sldGuideLst>
-    </p:ext>
-  </p:extLst>
 </p:sldMaster>
 </file>
 
@@ -2499,13 +2527,7 @@
       </p:grpSpPr>
       <p:grpSp>
         <p:nvGrpSpPr>
-          <p:cNvPr id="149" name="Group 148">
-            <a:extLst>
-              <a:ext uri="{FF2B5EF4-FFF2-40B4-BE49-F238E27FC236}">
-                <a16:creationId xmlns:a16="http://schemas.microsoft.com/office/drawing/2014/main" id="{90CE3EB4-F706-D7EE-1A82-C255B4423B9C}"/>
-              </a:ext>
-            </a:extLst>
-          </p:cNvPr>
+          <p:cNvPr id="149" name="Group 148"/>
           <p:cNvGrpSpPr/>
           <p:nvPr/>
         </p:nvGrpSpPr>
@@ -2519,13 +2541,7 @@
         </p:grpSpPr>
         <p:sp>
           <p:nvSpPr>
-            <p:cNvPr id="9" name="Rectangle 8">
-              <a:extLst>
-                <a:ext uri="{FF2B5EF4-FFF2-40B4-BE49-F238E27FC236}">
-                  <a16:creationId xmlns:a16="http://schemas.microsoft.com/office/drawing/2014/main" id="{BCBA3291-885A-2045-B3B6-86254BE83E51}"/>
-                </a:ext>
-              </a:extLst>
-            </p:cNvPr>
+            <p:cNvPr id="9" name="Rectangle 8"/>
             <p:cNvSpPr/>
             <p:nvPr/>
           </p:nvSpPr>
@@ -2588,6 +2604,11 @@
                 </a:rPr>
                 <a:t>ID</a:t>
               </a:r>
+              <a:endParaRPr lang="en-US" altLang="zh-CN" sz="1200" dirty="0">
+                <a:solidFill>
+                  <a:schemeClr val="tx1"/>
+                </a:solidFill>
+              </a:endParaRPr>
             </a:p>
             <a:p>
               <a:r>
@@ -2614,7 +2635,7 @@
                 </a:rPr>
                 <a:t>String</a:t>
               </a:r>
-              <a:endParaRPr lang="en-CN" sz="1200" dirty="0">
+              <a:endParaRPr lang="en-US" sz="1200" dirty="0">
                 <a:solidFill>
                   <a:schemeClr val="tx1"/>
                 </a:solidFill>
@@ -2624,13 +2645,7 @@
         </p:sp>
         <p:sp>
           <p:nvSpPr>
-            <p:cNvPr id="10" name="Rectangle 9">
-              <a:extLst>
-                <a:ext uri="{FF2B5EF4-FFF2-40B4-BE49-F238E27FC236}">
-                  <a16:creationId xmlns:a16="http://schemas.microsoft.com/office/drawing/2014/main" id="{B6FEE198-7C64-BF43-87DB-F86141A4C76D}"/>
-                </a:ext>
-              </a:extLst>
-            </p:cNvPr>
+            <p:cNvPr id="10" name="Rectangle 9"/>
             <p:cNvSpPr/>
             <p:nvPr/>
           </p:nvSpPr>
@@ -2683,7 +2698,7 @@
                 </a:rPr>
                 <a:t>Person</a:t>
               </a:r>
-              <a:endParaRPr lang="en-CN" b="1" dirty="0">
+              <a:endParaRPr lang="en-US" b="1" dirty="0">
                 <a:solidFill>
                   <a:schemeClr val="tx1"/>
                 </a:solidFill>
@@ -2693,13 +2708,7 @@
         </p:sp>
         <p:sp>
           <p:nvSpPr>
-            <p:cNvPr id="12" name="Rectangle 11">
-              <a:extLst>
-                <a:ext uri="{FF2B5EF4-FFF2-40B4-BE49-F238E27FC236}">
-                  <a16:creationId xmlns:a16="http://schemas.microsoft.com/office/drawing/2014/main" id="{394BCCF7-904F-BA42-A045-62373FD79E58}"/>
-                </a:ext>
-              </a:extLst>
-            </p:cNvPr>
+            <p:cNvPr id="12" name="Rectangle 11"/>
             <p:cNvSpPr/>
             <p:nvPr/>
           </p:nvSpPr>
@@ -2762,6 +2771,11 @@
                 </a:rPr>
                 <a:t>ID</a:t>
               </a:r>
+              <a:endParaRPr lang="en-US" altLang="zh-CN" sz="1200" dirty="0">
+                <a:solidFill>
+                  <a:schemeClr val="tx1"/>
+                </a:solidFill>
+              </a:endParaRPr>
             </a:p>
             <a:p>
               <a:r>
@@ -2788,18 +2802,17 @@
                 </a:rPr>
                 <a:t>String</a:t>
               </a:r>
+              <a:endParaRPr lang="en-US" altLang="zh-CN" sz="1200" dirty="0">
+                <a:solidFill>
+                  <a:schemeClr val="tx1"/>
+                </a:solidFill>
+              </a:endParaRPr>
             </a:p>
           </p:txBody>
         </p:sp>
         <p:sp>
           <p:nvSpPr>
-            <p:cNvPr id="13" name="Rectangle 12">
-              <a:extLst>
-                <a:ext uri="{FF2B5EF4-FFF2-40B4-BE49-F238E27FC236}">
-                  <a16:creationId xmlns:a16="http://schemas.microsoft.com/office/drawing/2014/main" id="{BE5A4E8B-4642-4241-B212-ABEFC161DEC9}"/>
-                </a:ext>
-              </a:extLst>
-            </p:cNvPr>
+            <p:cNvPr id="13" name="Rectangle 12"/>
             <p:cNvSpPr/>
             <p:nvPr/>
           </p:nvSpPr>
@@ -2851,7 +2864,7 @@
                 </a:rPr>
                 <a:t>Company</a:t>
               </a:r>
-              <a:endParaRPr lang="en-CN" b="1" dirty="0">
+              <a:endParaRPr lang="en-US" b="1" dirty="0">
                 <a:solidFill>
                   <a:schemeClr val="tx1"/>
                 </a:solidFill>
@@ -2861,13 +2874,7 @@
         </p:sp>
         <p:sp>
           <p:nvSpPr>
-            <p:cNvPr id="15" name="Rectangle 14">
-              <a:extLst>
-                <a:ext uri="{FF2B5EF4-FFF2-40B4-BE49-F238E27FC236}">
-                  <a16:creationId xmlns:a16="http://schemas.microsoft.com/office/drawing/2014/main" id="{A7BE3F17-C67E-5A46-996C-67EF743EC561}"/>
-                </a:ext>
-              </a:extLst>
-            </p:cNvPr>
+            <p:cNvPr id="15" name="Rectangle 14"/>
             <p:cNvSpPr/>
             <p:nvPr/>
           </p:nvSpPr>
@@ -2930,6 +2937,11 @@
                 </a:rPr>
                 <a:t>ID</a:t>
               </a:r>
+              <a:endParaRPr lang="en-US" altLang="zh-CN" sz="1200" dirty="0">
+                <a:solidFill>
+                  <a:schemeClr val="tx1"/>
+                </a:solidFill>
+              </a:endParaRPr>
             </a:p>
             <a:p>
               <a:r>
@@ -3011,6 +3023,11 @@
                 </a:rPr>
                 <a:t>Boolean</a:t>
               </a:r>
+              <a:endParaRPr lang="en-US" altLang="zh-CN" sz="1200" dirty="0">
+                <a:solidFill>
+                  <a:schemeClr val="tx1"/>
+                </a:solidFill>
+              </a:endParaRPr>
             </a:p>
             <a:p>
               <a:r>
@@ -3053,7 +3070,7 @@
                 </a:rPr>
                 <a:t>String</a:t>
               </a:r>
-              <a:endParaRPr lang="en-CN" sz="1200" dirty="0">
+              <a:endParaRPr lang="en-US" sz="1200" dirty="0">
                 <a:solidFill>
                   <a:schemeClr val="tx1"/>
                 </a:solidFill>
@@ -3063,13 +3080,7 @@
         </p:sp>
         <p:sp>
           <p:nvSpPr>
-            <p:cNvPr id="16" name="Rectangle 15">
-              <a:extLst>
-                <a:ext uri="{FF2B5EF4-FFF2-40B4-BE49-F238E27FC236}">
-                  <a16:creationId xmlns:a16="http://schemas.microsoft.com/office/drawing/2014/main" id="{E7BA5DA0-5EF3-9D45-88BA-BC5BA7F3F9AB}"/>
-                </a:ext>
-              </a:extLst>
-            </p:cNvPr>
+            <p:cNvPr id="16" name="Rectangle 15"/>
             <p:cNvSpPr/>
             <p:nvPr/>
           </p:nvSpPr>
@@ -3122,7 +3133,7 @@
                 </a:rPr>
                 <a:t>Account</a:t>
               </a:r>
-              <a:endParaRPr lang="en-CN" b="1" dirty="0">
+              <a:endParaRPr lang="en-US" b="1" dirty="0">
                 <a:solidFill>
                   <a:schemeClr val="tx1"/>
                 </a:solidFill>
@@ -3132,13 +3143,7 @@
         </p:sp>
         <p:grpSp>
           <p:nvGrpSpPr>
-            <p:cNvPr id="131" name="Group 130">
-              <a:extLst>
-                <a:ext uri="{FF2B5EF4-FFF2-40B4-BE49-F238E27FC236}">
-                  <a16:creationId xmlns:a16="http://schemas.microsoft.com/office/drawing/2014/main" id="{FE002B43-4806-CE44-3E14-C8736CF4FD37}"/>
-                </a:ext>
-              </a:extLst>
-            </p:cNvPr>
+            <p:cNvPr id="131" name="Group 130"/>
             <p:cNvGrpSpPr/>
             <p:nvPr/>
           </p:nvGrpSpPr>
@@ -3152,13 +3157,7 @@
           </p:grpSpPr>
           <p:sp>
             <p:nvSpPr>
-              <p:cNvPr id="21" name="Rectangle 20">
-                <a:extLst>
-                  <a:ext uri="{FF2B5EF4-FFF2-40B4-BE49-F238E27FC236}">
-                    <a16:creationId xmlns:a16="http://schemas.microsoft.com/office/drawing/2014/main" id="{952B3EB0-AC2E-194C-BAD9-80998F2EEF5B}"/>
-                  </a:ext>
-                </a:extLst>
-              </p:cNvPr>
+              <p:cNvPr id="21" name="Rectangle 20"/>
               <p:cNvSpPr/>
               <p:nvPr/>
             </p:nvSpPr>
@@ -3221,6 +3220,11 @@
                   </a:rPr>
                   <a:t>ID</a:t>
                 </a:r>
+                <a:endParaRPr lang="en-US" altLang="zh-CN" sz="1200" dirty="0">
+                  <a:solidFill>
+                    <a:schemeClr val="tx1"/>
+                  </a:solidFill>
+                </a:endParaRPr>
               </a:p>
               <a:p>
                 <a:r>
@@ -3247,6 +3251,11 @@
                   </a:rPr>
                   <a:t>String</a:t>
                 </a:r>
+                <a:endParaRPr lang="en-US" altLang="zh-CN" sz="1200" dirty="0">
+                  <a:solidFill>
+                    <a:schemeClr val="tx1"/>
+                  </a:solidFill>
+                </a:endParaRPr>
               </a:p>
               <a:p>
                 <a:r>
@@ -3281,7 +3290,7 @@
                   </a:rPr>
                   <a:t>Boolean</a:t>
                 </a:r>
-                <a:endParaRPr lang="en-CN" sz="1200" dirty="0">
+                <a:endParaRPr lang="en-US" sz="1200" dirty="0">
                   <a:solidFill>
                     <a:schemeClr val="tx1"/>
                   </a:solidFill>
@@ -3291,13 +3300,7 @@
           </p:sp>
           <p:sp>
             <p:nvSpPr>
-              <p:cNvPr id="22" name="Rectangle 21">
-                <a:extLst>
-                  <a:ext uri="{FF2B5EF4-FFF2-40B4-BE49-F238E27FC236}">
-                    <a16:creationId xmlns:a16="http://schemas.microsoft.com/office/drawing/2014/main" id="{9A1970A5-AC37-D44A-B690-5440CAAE349C}"/>
-                  </a:ext>
-                </a:extLst>
-              </p:cNvPr>
+              <p:cNvPr id="22" name="Rectangle 21"/>
               <p:cNvSpPr/>
               <p:nvPr/>
             </p:nvSpPr>
@@ -3350,7 +3353,7 @@
                   </a:rPr>
                   <a:t>Medium</a:t>
                 </a:r>
-                <a:endParaRPr lang="en-CN" b="1" dirty="0">
+                <a:endParaRPr lang="en-US" b="1" dirty="0">
                   <a:solidFill>
                     <a:schemeClr val="tx1"/>
                   </a:solidFill>
@@ -3361,15 +3364,8 @@
         </p:grpSp>
         <p:cxnSp>
           <p:nvCxnSpPr>
-            <p:cNvPr id="26" name="Elbow Connector 25">
-              <a:extLst>
-                <a:ext uri="{FF2B5EF4-FFF2-40B4-BE49-F238E27FC236}">
-                  <a16:creationId xmlns:a16="http://schemas.microsoft.com/office/drawing/2014/main" id="{3C53489C-1AD3-3D4B-A2C9-49880F18F572}"/>
-                </a:ext>
-              </a:extLst>
-            </p:cNvPr>
+            <p:cNvPr id="26" name="Elbow Connector 25"/>
             <p:cNvCxnSpPr>
-              <a:cxnSpLocks/>
               <a:stCxn id="10" idx="3"/>
               <a:endCxn id="15" idx="1"/>
             </p:cNvCxnSpPr>
@@ -3411,15 +3407,8 @@
         </p:cxnSp>
         <p:cxnSp>
           <p:nvCxnSpPr>
-            <p:cNvPr id="27" name="Elbow Connector 26">
-              <a:extLst>
-                <a:ext uri="{FF2B5EF4-FFF2-40B4-BE49-F238E27FC236}">
-                  <a16:creationId xmlns:a16="http://schemas.microsoft.com/office/drawing/2014/main" id="{F0060C30-3B44-A64C-A10B-696846E9D2CF}"/>
-                </a:ext>
-              </a:extLst>
-            </p:cNvPr>
+            <p:cNvPr id="27" name="Elbow Connector 26"/>
             <p:cNvCxnSpPr>
-              <a:cxnSpLocks/>
               <a:stCxn id="13" idx="3"/>
               <a:endCxn id="100" idx="6"/>
             </p:cNvCxnSpPr>
@@ -3460,15 +3449,8 @@
         </p:cxnSp>
         <p:cxnSp>
           <p:nvCxnSpPr>
-            <p:cNvPr id="28" name="Straight Arrow Connector 27">
-              <a:extLst>
-                <a:ext uri="{FF2B5EF4-FFF2-40B4-BE49-F238E27FC236}">
-                  <a16:creationId xmlns:a16="http://schemas.microsoft.com/office/drawing/2014/main" id="{B2BF143A-D663-5649-905F-27A0CFCDFF24}"/>
-                </a:ext>
-              </a:extLst>
-            </p:cNvPr>
+            <p:cNvPr id="28" name="Straight Arrow Connector 27"/>
             <p:cNvCxnSpPr>
-              <a:cxnSpLocks/>
               <a:stCxn id="9" idx="2"/>
               <a:endCxn id="13" idx="0"/>
             </p:cNvCxnSpPr>
@@ -3507,15 +3489,8 @@
         </p:cxnSp>
         <p:cxnSp>
           <p:nvCxnSpPr>
-            <p:cNvPr id="30" name="Elbow Connector 29">
-              <a:extLst>
-                <a:ext uri="{FF2B5EF4-FFF2-40B4-BE49-F238E27FC236}">
-                  <a16:creationId xmlns:a16="http://schemas.microsoft.com/office/drawing/2014/main" id="{453767E1-1D3F-0948-959E-087EE3A13395}"/>
-                </a:ext>
-              </a:extLst>
-            </p:cNvPr>
+            <p:cNvPr id="30" name="Elbow Connector 29"/>
             <p:cNvCxnSpPr>
-              <a:cxnSpLocks/>
               <a:stCxn id="21" idx="1"/>
               <a:endCxn id="15" idx="3"/>
             </p:cNvCxnSpPr>
@@ -3555,13 +3530,7 @@
         </p:cxnSp>
         <p:sp>
           <p:nvSpPr>
-            <p:cNvPr id="32" name="TextBox 31">
-              <a:extLst>
-                <a:ext uri="{FF2B5EF4-FFF2-40B4-BE49-F238E27FC236}">
-                  <a16:creationId xmlns:a16="http://schemas.microsoft.com/office/drawing/2014/main" id="{59A3ECDA-6BF6-B345-A195-B9F88BE95D7D}"/>
-                </a:ext>
-              </a:extLst>
-            </p:cNvPr>
+            <p:cNvPr id="32" name="TextBox 31"/>
             <p:cNvSpPr txBox="1"/>
             <p:nvPr/>
           </p:nvSpPr>
@@ -3585,19 +3554,13 @@
                 <a:rPr lang="en-US" altLang="zh-CN" sz="1200" dirty="0"/>
                 <a:t>own</a:t>
               </a:r>
-              <a:endParaRPr lang="en-CN" sz="1400" dirty="0"/>
+              <a:endParaRPr lang="en-US" sz="1400" dirty="0"/>
             </a:p>
           </p:txBody>
         </p:sp>
         <p:sp>
           <p:nvSpPr>
-            <p:cNvPr id="35" name="TextBox 34">
-              <a:extLst>
-                <a:ext uri="{FF2B5EF4-FFF2-40B4-BE49-F238E27FC236}">
-                  <a16:creationId xmlns:a16="http://schemas.microsoft.com/office/drawing/2014/main" id="{6325C393-5F86-E14C-A0C3-D733E9944141}"/>
-                </a:ext>
-              </a:extLst>
-            </p:cNvPr>
+            <p:cNvPr id="35" name="TextBox 34"/>
             <p:cNvSpPr txBox="1"/>
             <p:nvPr/>
           </p:nvSpPr>
@@ -3621,19 +3584,13 @@
                 <a:rPr lang="en-US" altLang="zh-CN" sz="1200" dirty="0" err="1"/>
                 <a:t>signIn</a:t>
               </a:r>
-              <a:endParaRPr lang="en-CN" sz="1200" dirty="0"/>
+              <a:endParaRPr lang="en-US" sz="1200" dirty="0"/>
             </a:p>
           </p:txBody>
         </p:sp>
         <p:grpSp>
           <p:nvGrpSpPr>
-            <p:cNvPr id="39" name="Group 38">
-              <a:extLst>
-                <a:ext uri="{FF2B5EF4-FFF2-40B4-BE49-F238E27FC236}">
-                  <a16:creationId xmlns:a16="http://schemas.microsoft.com/office/drawing/2014/main" id="{3C3169A4-7F78-7047-8AB5-805903530A72}"/>
-                </a:ext>
-              </a:extLst>
-            </p:cNvPr>
+            <p:cNvPr id="39" name="Group 38"/>
             <p:cNvGrpSpPr/>
             <p:nvPr/>
           </p:nvGrpSpPr>
@@ -3647,13 +3604,7 @@
           </p:grpSpPr>
           <p:sp>
             <p:nvSpPr>
-              <p:cNvPr id="40" name="Rectangle 39">
-                <a:extLst>
-                  <a:ext uri="{FF2B5EF4-FFF2-40B4-BE49-F238E27FC236}">
-                    <a16:creationId xmlns:a16="http://schemas.microsoft.com/office/drawing/2014/main" id="{96FE0172-04DB-A048-897E-4364608B5FEF}"/>
-                  </a:ext>
-                </a:extLst>
-              </p:cNvPr>
+              <p:cNvPr id="40" name="Rectangle 39"/>
               <p:cNvSpPr/>
               <p:nvPr/>
             </p:nvSpPr>
@@ -3716,6 +3667,11 @@
                   </a:rPr>
                   <a:t>ID</a:t>
                 </a:r>
+                <a:endParaRPr lang="en-US" altLang="zh-CN" sz="1200" dirty="0">
+                  <a:solidFill>
+                    <a:schemeClr val="tx1"/>
+                  </a:solidFill>
+                </a:endParaRPr>
               </a:p>
               <a:p>
                 <a:r>
@@ -3766,6 +3722,11 @@
                   </a:rPr>
                   <a:t>Integer</a:t>
                 </a:r>
+                <a:endParaRPr lang="en-US" altLang="zh-CN" sz="1200" dirty="0">
+                  <a:solidFill>
+                    <a:schemeClr val="tx1"/>
+                  </a:solidFill>
+                </a:endParaRPr>
               </a:p>
               <a:p>
                 <a:r>
@@ -3800,7 +3761,7 @@
                   </a:rPr>
                   <a:t>Integer</a:t>
                 </a:r>
-                <a:endParaRPr lang="en-CN" sz="1200" dirty="0">
+                <a:endParaRPr lang="en-US" sz="1200" dirty="0">
                   <a:solidFill>
                     <a:schemeClr val="tx1"/>
                   </a:solidFill>
@@ -3810,13 +3771,7 @@
           </p:sp>
           <p:sp>
             <p:nvSpPr>
-              <p:cNvPr id="41" name="Rectangle 40">
-                <a:extLst>
-                  <a:ext uri="{FF2B5EF4-FFF2-40B4-BE49-F238E27FC236}">
-                    <a16:creationId xmlns:a16="http://schemas.microsoft.com/office/drawing/2014/main" id="{C805CEC5-21B7-E247-ABBB-187667AB24B0}"/>
-                  </a:ext>
-                </a:extLst>
-              </p:cNvPr>
+              <p:cNvPr id="41" name="Rectangle 40"/>
               <p:cNvSpPr/>
               <p:nvPr/>
             </p:nvSpPr>
@@ -3869,7 +3824,7 @@
                   </a:rPr>
                   <a:t>Loan</a:t>
                 </a:r>
-                <a:endParaRPr lang="en-CN" b="1" dirty="0">
+                <a:endParaRPr lang="en-US" b="1" dirty="0">
                   <a:solidFill>
                     <a:schemeClr val="tx1"/>
                   </a:solidFill>
@@ -3880,15 +3835,8 @@
         </p:grpSp>
         <p:cxnSp>
           <p:nvCxnSpPr>
-            <p:cNvPr id="42" name="Elbow Connector 41">
-              <a:extLst>
-                <a:ext uri="{FF2B5EF4-FFF2-40B4-BE49-F238E27FC236}">
-                  <a16:creationId xmlns:a16="http://schemas.microsoft.com/office/drawing/2014/main" id="{74FC05B2-4F88-CF40-A026-5D85FBAE7154}"/>
-                </a:ext>
-              </a:extLst>
-            </p:cNvPr>
+            <p:cNvPr id="42" name="Elbow Connector 41"/>
             <p:cNvCxnSpPr>
-              <a:cxnSpLocks/>
               <a:stCxn id="10" idx="1"/>
               <a:endCxn id="112" idx="2"/>
             </p:cNvCxnSpPr>
@@ -3929,15 +3877,8 @@
         </p:cxnSp>
         <p:cxnSp>
           <p:nvCxnSpPr>
-            <p:cNvPr id="43" name="Elbow Connector 42">
-              <a:extLst>
-                <a:ext uri="{FF2B5EF4-FFF2-40B4-BE49-F238E27FC236}">
-                  <a16:creationId xmlns:a16="http://schemas.microsoft.com/office/drawing/2014/main" id="{F5B260C3-7950-594D-8D14-C510864E4AB4}"/>
-                </a:ext>
-              </a:extLst>
-            </p:cNvPr>
+            <p:cNvPr id="43" name="Elbow Connector 42"/>
             <p:cNvCxnSpPr>
-              <a:cxnSpLocks/>
               <a:stCxn id="13" idx="1"/>
               <a:endCxn id="40" idx="1"/>
             </p:cNvCxnSpPr>
@@ -3978,13 +3919,7 @@
         </p:cxnSp>
         <p:sp>
           <p:nvSpPr>
-            <p:cNvPr id="46" name="TextBox 45">
-              <a:extLst>
-                <a:ext uri="{FF2B5EF4-FFF2-40B4-BE49-F238E27FC236}">
-                  <a16:creationId xmlns:a16="http://schemas.microsoft.com/office/drawing/2014/main" id="{C8C8704E-CA02-884E-BA14-758B87C6E88A}"/>
-                </a:ext>
-              </a:extLst>
-            </p:cNvPr>
+            <p:cNvPr id="46" name="TextBox 45"/>
             <p:cNvSpPr txBox="1"/>
             <p:nvPr/>
           </p:nvSpPr>
@@ -4008,19 +3943,13 @@
                 <a:rPr lang="en-US" altLang="zh-CN" sz="1200" dirty="0"/>
                 <a:t>apply</a:t>
               </a:r>
-              <a:endParaRPr lang="en-CN" sz="1400" dirty="0"/>
+              <a:endParaRPr lang="en-US" sz="1400" dirty="0"/>
             </a:p>
           </p:txBody>
         </p:sp>
         <p:sp>
           <p:nvSpPr>
-            <p:cNvPr id="47" name="TextBox 46">
-              <a:extLst>
-                <a:ext uri="{FF2B5EF4-FFF2-40B4-BE49-F238E27FC236}">
-                  <a16:creationId xmlns:a16="http://schemas.microsoft.com/office/drawing/2014/main" id="{471AF359-1E07-7849-8B93-91F36663E6A9}"/>
-                </a:ext>
-              </a:extLst>
-            </p:cNvPr>
+            <p:cNvPr id="47" name="TextBox 46"/>
             <p:cNvSpPr txBox="1"/>
             <p:nvPr/>
           </p:nvSpPr>
@@ -4044,22 +3973,14 @@
                 <a:rPr lang="en-US" altLang="zh-CN" sz="1200" dirty="0"/>
                 <a:t>apply</a:t>
               </a:r>
-              <a:endParaRPr lang="en-CN" sz="1400" dirty="0"/>
+              <a:endParaRPr lang="en-US" sz="1400" dirty="0"/>
             </a:p>
           </p:txBody>
         </p:sp>
         <p:cxnSp>
           <p:nvCxnSpPr>
-            <p:cNvPr id="48" name="Straight Arrow Connector 47">
-              <a:extLst>
-                <a:ext uri="{FF2B5EF4-FFF2-40B4-BE49-F238E27FC236}">
-                  <a16:creationId xmlns:a16="http://schemas.microsoft.com/office/drawing/2014/main" id="{DEF26B6A-F6DC-614D-B833-5D80CBB5E0FA}"/>
-                </a:ext>
-              </a:extLst>
-            </p:cNvPr>
-            <p:cNvCxnSpPr>
-              <a:cxnSpLocks/>
-            </p:cNvCxnSpPr>
+            <p:cNvPr id="48" name="Straight Arrow Connector 47"/>
+            <p:cNvCxnSpPr/>
             <p:nvPr/>
           </p:nvCxnSpPr>
           <p:spPr>
@@ -4096,13 +4017,7 @@
         </p:cxnSp>
         <p:sp>
           <p:nvSpPr>
-            <p:cNvPr id="51" name="TextBox 50">
-              <a:extLst>
-                <a:ext uri="{FF2B5EF4-FFF2-40B4-BE49-F238E27FC236}">
-                  <a16:creationId xmlns:a16="http://schemas.microsoft.com/office/drawing/2014/main" id="{A9EEFE6B-5C72-DB4E-8259-8211ECB467CF}"/>
-                </a:ext>
-              </a:extLst>
-            </p:cNvPr>
+            <p:cNvPr id="51" name="TextBox 50"/>
             <p:cNvSpPr txBox="1"/>
             <p:nvPr/>
           </p:nvSpPr>
@@ -4126,19 +4041,13 @@
                 <a:rPr lang="en-US" altLang="zh-CN" sz="1200" dirty="0"/>
                 <a:t>deposit</a:t>
               </a:r>
-              <a:endParaRPr lang="en-CN" sz="1400" dirty="0"/>
+              <a:endParaRPr lang="en-US" sz="1400" dirty="0"/>
             </a:p>
           </p:txBody>
         </p:sp>
         <p:sp>
           <p:nvSpPr>
-            <p:cNvPr id="54" name="TextBox 53">
-              <a:extLst>
-                <a:ext uri="{FF2B5EF4-FFF2-40B4-BE49-F238E27FC236}">
-                  <a16:creationId xmlns:a16="http://schemas.microsoft.com/office/drawing/2014/main" id="{6A13F2F9-C170-D040-B35D-1A63345D4603}"/>
-                </a:ext>
-              </a:extLst>
-            </p:cNvPr>
+            <p:cNvPr id="54" name="TextBox 53"/>
             <p:cNvSpPr txBox="1"/>
             <p:nvPr/>
           </p:nvSpPr>
@@ -4162,21 +4071,14 @@
                 <a:rPr lang="en-US" altLang="zh-CN" sz="1200" dirty="0"/>
                 <a:t>invest</a:t>
               </a:r>
+              <a:endParaRPr lang="en-US" altLang="zh-CN" sz="1200" dirty="0"/>
             </a:p>
           </p:txBody>
         </p:sp>
         <p:cxnSp>
           <p:nvCxnSpPr>
-            <p:cNvPr id="58" name="Straight Arrow Connector 57">
-              <a:extLst>
-                <a:ext uri="{FF2B5EF4-FFF2-40B4-BE49-F238E27FC236}">
-                  <a16:creationId xmlns:a16="http://schemas.microsoft.com/office/drawing/2014/main" id="{B98DEA75-B1DE-EB46-BCC7-AAE8B7FAA619}"/>
-                </a:ext>
-              </a:extLst>
-            </p:cNvPr>
-            <p:cNvCxnSpPr>
-              <a:cxnSpLocks/>
-            </p:cNvCxnSpPr>
+            <p:cNvPr id="58" name="Straight Arrow Connector 57"/>
+            <p:cNvCxnSpPr/>
             <p:nvPr/>
           </p:nvCxnSpPr>
           <p:spPr>
@@ -4213,13 +4115,7 @@
         </p:cxnSp>
         <p:sp>
           <p:nvSpPr>
-            <p:cNvPr id="63" name="TextBox 62">
-              <a:extLst>
-                <a:ext uri="{FF2B5EF4-FFF2-40B4-BE49-F238E27FC236}">
-                  <a16:creationId xmlns:a16="http://schemas.microsoft.com/office/drawing/2014/main" id="{7762F5F5-5C98-B849-9DF3-987212DFF39F}"/>
-                </a:ext>
-              </a:extLst>
-            </p:cNvPr>
+            <p:cNvPr id="63" name="TextBox 62"/>
             <p:cNvSpPr txBox="1"/>
             <p:nvPr/>
           </p:nvSpPr>
@@ -4243,21 +4139,14 @@
                 <a:rPr lang="en-US" altLang="zh-CN" sz="1200" dirty="0"/>
                 <a:t>repay</a:t>
               </a:r>
-              <a:endParaRPr lang="en-CN" sz="1400" dirty="0"/>
+              <a:endParaRPr lang="en-US" sz="1400" dirty="0"/>
             </a:p>
           </p:txBody>
         </p:sp>
         <p:cxnSp>
           <p:nvCxnSpPr>
-            <p:cNvPr id="72" name="Elbow Connector 71">
-              <a:extLst>
-                <a:ext uri="{FF2B5EF4-FFF2-40B4-BE49-F238E27FC236}">
-                  <a16:creationId xmlns:a16="http://schemas.microsoft.com/office/drawing/2014/main" id="{74B38473-F5BB-A541-B981-B449B3E995BD}"/>
-                </a:ext>
-              </a:extLst>
-            </p:cNvPr>
+            <p:cNvPr id="72" name="Elbow Connector 71"/>
             <p:cNvCxnSpPr>
-              <a:cxnSpLocks/>
               <a:stCxn id="124" idx="0"/>
               <a:endCxn id="105" idx="2"/>
             </p:cNvCxnSpPr>
@@ -4300,13 +4189,7 @@
         </p:cxnSp>
         <p:sp>
           <p:nvSpPr>
-            <p:cNvPr id="75" name="TextBox 74">
-              <a:extLst>
-                <a:ext uri="{FF2B5EF4-FFF2-40B4-BE49-F238E27FC236}">
-                  <a16:creationId xmlns:a16="http://schemas.microsoft.com/office/drawing/2014/main" id="{91CAAE9E-A59E-664E-94E7-3D704DA97893}"/>
-                </a:ext>
-              </a:extLst>
-            </p:cNvPr>
+            <p:cNvPr id="75" name="TextBox 74"/>
             <p:cNvSpPr txBox="1"/>
             <p:nvPr/>
           </p:nvSpPr>
@@ -4330,20 +4213,14 @@
                 <a:rPr lang="en-US" altLang="zh-CN" sz="1200" dirty="0"/>
                 <a:t>transfer</a:t>
               </a:r>
+              <a:endParaRPr lang="en-US" altLang="zh-CN" sz="1200" dirty="0"/>
             </a:p>
           </p:txBody>
         </p:sp>
         <p:cxnSp>
           <p:nvCxnSpPr>
-            <p:cNvPr id="84" name="Elbow Connector 83">
-              <a:extLst>
-                <a:ext uri="{FF2B5EF4-FFF2-40B4-BE49-F238E27FC236}">
-                  <a16:creationId xmlns:a16="http://schemas.microsoft.com/office/drawing/2014/main" id="{2086D1A1-A7E6-0345-B71E-3A5D302299E3}"/>
-                </a:ext>
-              </a:extLst>
-            </p:cNvPr>
+            <p:cNvPr id="84" name="Elbow Connector 83"/>
             <p:cNvCxnSpPr>
-              <a:cxnSpLocks/>
               <a:stCxn id="88" idx="4"/>
               <a:endCxn id="12" idx="3"/>
             </p:cNvCxnSpPr>
@@ -4385,13 +4262,7 @@
         </p:cxnSp>
         <p:sp>
           <p:nvSpPr>
-            <p:cNvPr id="87" name="TextBox 86">
-              <a:extLst>
-                <a:ext uri="{FF2B5EF4-FFF2-40B4-BE49-F238E27FC236}">
-                  <a16:creationId xmlns:a16="http://schemas.microsoft.com/office/drawing/2014/main" id="{2452D27F-A347-1C4F-8C70-F9C153F3AC33}"/>
-                </a:ext>
-              </a:extLst>
-            </p:cNvPr>
+            <p:cNvPr id="87" name="TextBox 86"/>
             <p:cNvSpPr txBox="1"/>
             <p:nvPr/>
           </p:nvSpPr>
@@ -4416,18 +4287,13 @@
                 <a:rPr lang="en-US" altLang="zh-CN" sz="1200" dirty="0"/>
                 <a:t>invest</a:t>
               </a:r>
+              <a:endParaRPr lang="en-US" altLang="zh-CN" sz="1200" dirty="0"/>
             </a:p>
           </p:txBody>
         </p:sp>
         <p:sp>
           <p:nvSpPr>
-            <p:cNvPr id="69" name="TextBox 68">
-              <a:extLst>
-                <a:ext uri="{FF2B5EF4-FFF2-40B4-BE49-F238E27FC236}">
-                  <a16:creationId xmlns:a16="http://schemas.microsoft.com/office/drawing/2014/main" id="{87820A9B-EC1A-9248-9F80-A0E3332531E2}"/>
-                </a:ext>
-              </a:extLst>
-            </p:cNvPr>
+            <p:cNvPr id="69" name="TextBox 68"/>
             <p:cNvSpPr txBox="1"/>
             <p:nvPr/>
           </p:nvSpPr>
@@ -4451,20 +4317,14 @@
                 <a:rPr lang="en-US" altLang="zh-CN" sz="1200" dirty="0"/>
                 <a:t>own</a:t>
               </a:r>
+              <a:endParaRPr lang="en-US" altLang="zh-CN" sz="1200" dirty="0"/>
             </a:p>
           </p:txBody>
         </p:sp>
         <p:cxnSp>
           <p:nvCxnSpPr>
-            <p:cNvPr id="73" name="Elbow Connector 72">
-              <a:extLst>
-                <a:ext uri="{FF2B5EF4-FFF2-40B4-BE49-F238E27FC236}">
-                  <a16:creationId xmlns:a16="http://schemas.microsoft.com/office/drawing/2014/main" id="{5CAC3A81-516B-0145-A74C-03FB356B7B23}"/>
-                </a:ext>
-              </a:extLst>
-            </p:cNvPr>
+            <p:cNvPr id="73" name="Elbow Connector 72"/>
             <p:cNvCxnSpPr>
-              <a:cxnSpLocks/>
               <a:stCxn id="122" idx="1"/>
               <a:endCxn id="119" idx="6"/>
             </p:cNvCxnSpPr>
@@ -4507,13 +4367,7 @@
         </p:cxnSp>
         <p:sp>
           <p:nvSpPr>
-            <p:cNvPr id="76" name="TextBox 75">
-              <a:extLst>
-                <a:ext uri="{FF2B5EF4-FFF2-40B4-BE49-F238E27FC236}">
-                  <a16:creationId xmlns:a16="http://schemas.microsoft.com/office/drawing/2014/main" id="{9685707C-7FDD-7246-A062-F467B29818B5}"/>
-                </a:ext>
-              </a:extLst>
-            </p:cNvPr>
+            <p:cNvPr id="76" name="TextBox 75"/>
             <p:cNvSpPr txBox="1"/>
             <p:nvPr/>
           </p:nvSpPr>
@@ -4537,21 +4391,14 @@
                 <a:rPr lang="en-US" altLang="zh-CN" sz="1200" dirty="0"/>
                 <a:t>withdraw</a:t>
               </a:r>
-              <a:endParaRPr lang="en-CN" sz="1400" dirty="0"/>
+              <a:endParaRPr lang="en-US" sz="1400" dirty="0"/>
             </a:p>
           </p:txBody>
         </p:sp>
         <p:cxnSp>
           <p:nvCxnSpPr>
-            <p:cNvPr id="52" name="Elbow Connector 51">
-              <a:extLst>
-                <a:ext uri="{FF2B5EF4-FFF2-40B4-BE49-F238E27FC236}">
-                  <a16:creationId xmlns:a16="http://schemas.microsoft.com/office/drawing/2014/main" id="{8A1833F8-AC05-ED49-9288-0C166521A90C}"/>
-                </a:ext>
-              </a:extLst>
-            </p:cNvPr>
+            <p:cNvPr id="52" name="Elbow Connector 51"/>
             <p:cNvCxnSpPr>
-              <a:cxnSpLocks/>
               <a:stCxn id="91" idx="4"/>
               <a:endCxn id="9" idx="3"/>
             </p:cNvCxnSpPr>
@@ -4593,13 +4440,7 @@
         </p:cxnSp>
         <p:sp>
           <p:nvSpPr>
-            <p:cNvPr id="55" name="TextBox 54">
-              <a:extLst>
-                <a:ext uri="{FF2B5EF4-FFF2-40B4-BE49-F238E27FC236}">
-                  <a16:creationId xmlns:a16="http://schemas.microsoft.com/office/drawing/2014/main" id="{570D96A3-EE2B-9942-B62D-1CE0187BD9BC}"/>
-                </a:ext>
-              </a:extLst>
-            </p:cNvPr>
+            <p:cNvPr id="55" name="TextBox 54"/>
             <p:cNvSpPr txBox="1"/>
             <p:nvPr/>
           </p:nvSpPr>
@@ -4623,21 +4464,14 @@
                 <a:rPr lang="en-US" altLang="zh-CN" sz="1200" dirty="0"/>
                 <a:t>guarantee</a:t>
               </a:r>
+              <a:endParaRPr lang="en-US" altLang="zh-CN" sz="1200" dirty="0"/>
             </a:p>
           </p:txBody>
         </p:sp>
         <p:cxnSp>
           <p:nvCxnSpPr>
-            <p:cNvPr id="59" name="Straight Arrow Connector 58">
-              <a:extLst>
-                <a:ext uri="{FF2B5EF4-FFF2-40B4-BE49-F238E27FC236}">
-                  <a16:creationId xmlns:a16="http://schemas.microsoft.com/office/drawing/2014/main" id="{558166EF-21EE-6F41-B5AD-A3BADF4737C0}"/>
-                </a:ext>
-              </a:extLst>
-            </p:cNvPr>
-            <p:cNvCxnSpPr>
-              <a:cxnSpLocks/>
-            </p:cNvCxnSpPr>
+            <p:cNvPr id="59" name="Straight Arrow Connector 58"/>
+            <p:cNvCxnSpPr/>
             <p:nvPr/>
           </p:nvCxnSpPr>
           <p:spPr>
@@ -4673,13 +4507,7 @@
         </p:cxnSp>
         <p:sp>
           <p:nvSpPr>
-            <p:cNvPr id="7" name="Rectangle 6">
-              <a:extLst>
-                <a:ext uri="{FF2B5EF4-FFF2-40B4-BE49-F238E27FC236}">
-                  <a16:creationId xmlns:a16="http://schemas.microsoft.com/office/drawing/2014/main" id="{B69034C5-F280-4B4F-89CF-2453BB2D3375}"/>
-                </a:ext>
-              </a:extLst>
-            </p:cNvPr>
+            <p:cNvPr id="7" name="Rectangle 6"/>
             <p:cNvSpPr/>
             <p:nvPr/>
           </p:nvSpPr>
@@ -4703,21 +4531,14 @@
                 <a:rPr lang="en-US" altLang="zh-CN" sz="1200" dirty="0" err="1"/>
                 <a:t>workIn</a:t>
               </a:r>
-              <a:endParaRPr lang="en-CN" sz="1200" dirty="0"/>
+              <a:endParaRPr lang="en-US" sz="1200" dirty="0"/>
             </a:p>
           </p:txBody>
         </p:sp>
         <p:cxnSp>
           <p:nvCxnSpPr>
-            <p:cNvPr id="50" name="Elbow Connector 49">
-              <a:extLst>
-                <a:ext uri="{FF2B5EF4-FFF2-40B4-BE49-F238E27FC236}">
-                  <a16:creationId xmlns:a16="http://schemas.microsoft.com/office/drawing/2014/main" id="{CB1E5DDC-7474-DEA2-7987-595836A33EC7}"/>
-                </a:ext>
-              </a:extLst>
-            </p:cNvPr>
+            <p:cNvPr id="50" name="Elbow Connector 49"/>
             <p:cNvCxnSpPr>
-              <a:cxnSpLocks/>
               <a:stCxn id="85" idx="4"/>
               <a:endCxn id="12" idx="1"/>
             </p:cNvCxnSpPr>
@@ -4759,13 +4580,7 @@
         </p:cxnSp>
         <p:sp>
           <p:nvSpPr>
-            <p:cNvPr id="56" name="TextBox 55">
-              <a:extLst>
-                <a:ext uri="{FF2B5EF4-FFF2-40B4-BE49-F238E27FC236}">
-                  <a16:creationId xmlns:a16="http://schemas.microsoft.com/office/drawing/2014/main" id="{C327D31E-708B-798A-94E9-45783F69B85F}"/>
-                </a:ext>
-              </a:extLst>
-            </p:cNvPr>
+            <p:cNvPr id="56" name="TextBox 55"/>
             <p:cNvSpPr txBox="1"/>
             <p:nvPr/>
           </p:nvSpPr>
@@ -4789,18 +4604,13 @@
                 <a:rPr lang="en-US" altLang="zh-CN" sz="1200" dirty="0"/>
                 <a:t>guarantee</a:t>
               </a:r>
+              <a:endParaRPr lang="en-US" altLang="zh-CN" sz="1200" dirty="0"/>
             </a:p>
           </p:txBody>
         </p:sp>
         <p:sp>
           <p:nvSpPr>
-            <p:cNvPr id="85" name="Oval 84">
-              <a:extLst>
-                <a:ext uri="{FF2B5EF4-FFF2-40B4-BE49-F238E27FC236}">
-                  <a16:creationId xmlns:a16="http://schemas.microsoft.com/office/drawing/2014/main" id="{88C900CF-3D46-22BB-BE2B-F0E2A88A4C9C}"/>
-                </a:ext>
-              </a:extLst>
-            </p:cNvPr>
+            <p:cNvPr id="85" name="Oval 84"/>
             <p:cNvSpPr/>
             <p:nvPr/>
           </p:nvSpPr>
@@ -4840,19 +4650,13 @@
             <a:lstStyle/>
             <a:p>
               <a:pPr algn="ctr"/>
-              <a:endParaRPr lang="en-CN"/>
+              <a:endParaRPr lang="en-US"/>
             </a:p>
           </p:txBody>
         </p:sp>
         <p:sp>
           <p:nvSpPr>
-            <p:cNvPr id="88" name="Oval 87">
-              <a:extLst>
-                <a:ext uri="{FF2B5EF4-FFF2-40B4-BE49-F238E27FC236}">
-                  <a16:creationId xmlns:a16="http://schemas.microsoft.com/office/drawing/2014/main" id="{B1742E75-53D6-B7BC-857E-BCFC1AD7FB81}"/>
-                </a:ext>
-              </a:extLst>
-            </p:cNvPr>
+            <p:cNvPr id="88" name="Oval 87"/>
             <p:cNvSpPr/>
             <p:nvPr/>
           </p:nvSpPr>
@@ -4892,19 +4696,13 @@
             <a:lstStyle/>
             <a:p>
               <a:pPr algn="ctr"/>
-              <a:endParaRPr lang="en-CN"/>
+              <a:endParaRPr lang="en-US"/>
             </a:p>
           </p:txBody>
         </p:sp>
         <p:sp>
           <p:nvSpPr>
-            <p:cNvPr id="91" name="Oval 90">
-              <a:extLst>
-                <a:ext uri="{FF2B5EF4-FFF2-40B4-BE49-F238E27FC236}">
-                  <a16:creationId xmlns:a16="http://schemas.microsoft.com/office/drawing/2014/main" id="{6923ECC9-2D7B-1909-3FD9-33F9F9BB8A29}"/>
-                </a:ext>
-              </a:extLst>
-            </p:cNvPr>
+            <p:cNvPr id="91" name="Oval 90"/>
             <p:cNvSpPr/>
             <p:nvPr/>
           </p:nvSpPr>
@@ -4944,19 +4742,13 @@
             <a:lstStyle/>
             <a:p>
               <a:pPr algn="ctr"/>
-              <a:endParaRPr lang="en-CN"/>
+              <a:endParaRPr lang="en-US"/>
             </a:p>
           </p:txBody>
         </p:sp>
         <p:sp>
           <p:nvSpPr>
-            <p:cNvPr id="100" name="Oval 99">
-              <a:extLst>
-                <a:ext uri="{FF2B5EF4-FFF2-40B4-BE49-F238E27FC236}">
-                  <a16:creationId xmlns:a16="http://schemas.microsoft.com/office/drawing/2014/main" id="{8A1DBE11-24EB-ED63-FBFF-4FA4031AD43E}"/>
-                </a:ext>
-              </a:extLst>
-            </p:cNvPr>
+            <p:cNvPr id="100" name="Oval 99"/>
             <p:cNvSpPr/>
             <p:nvPr/>
           </p:nvSpPr>
@@ -4996,19 +4788,13 @@
             <a:lstStyle/>
             <a:p>
               <a:pPr algn="ctr"/>
-              <a:endParaRPr lang="en-CN"/>
+              <a:endParaRPr lang="en-US"/>
             </a:p>
           </p:txBody>
         </p:sp>
         <p:sp>
           <p:nvSpPr>
-            <p:cNvPr id="103" name="Oval 102">
-              <a:extLst>
-                <a:ext uri="{FF2B5EF4-FFF2-40B4-BE49-F238E27FC236}">
-                  <a16:creationId xmlns:a16="http://schemas.microsoft.com/office/drawing/2014/main" id="{EAB1111F-D4FF-F70D-F4B4-09356DD7CADE}"/>
-                </a:ext>
-              </a:extLst>
-            </p:cNvPr>
+            <p:cNvPr id="103" name="Oval 102"/>
             <p:cNvSpPr/>
             <p:nvPr/>
           </p:nvSpPr>
@@ -5048,19 +4834,13 @@
             <a:lstStyle/>
             <a:p>
               <a:pPr algn="ctr"/>
-              <a:endParaRPr lang="en-CN"/>
+              <a:endParaRPr lang="en-US"/>
             </a:p>
           </p:txBody>
         </p:sp>
         <p:sp>
           <p:nvSpPr>
-            <p:cNvPr id="105" name="Oval 104">
-              <a:extLst>
-                <a:ext uri="{FF2B5EF4-FFF2-40B4-BE49-F238E27FC236}">
-                  <a16:creationId xmlns:a16="http://schemas.microsoft.com/office/drawing/2014/main" id="{19A33579-AADC-4507-010C-6C023E469E5A}"/>
-                </a:ext>
-              </a:extLst>
-            </p:cNvPr>
+            <p:cNvPr id="105" name="Oval 104"/>
             <p:cNvSpPr/>
             <p:nvPr/>
           </p:nvSpPr>
@@ -5100,19 +4880,13 @@
             <a:lstStyle/>
             <a:p>
               <a:pPr algn="ctr"/>
-              <a:endParaRPr lang="en-CN"/>
+              <a:endParaRPr lang="en-US"/>
             </a:p>
           </p:txBody>
         </p:sp>
         <p:sp>
           <p:nvSpPr>
-            <p:cNvPr id="112" name="Oval 111">
-              <a:extLst>
-                <a:ext uri="{FF2B5EF4-FFF2-40B4-BE49-F238E27FC236}">
-                  <a16:creationId xmlns:a16="http://schemas.microsoft.com/office/drawing/2014/main" id="{5E628CD8-D99B-AD15-DF05-37ACDC9771B3}"/>
-                </a:ext>
-              </a:extLst>
-            </p:cNvPr>
+            <p:cNvPr id="112" name="Oval 111"/>
             <p:cNvSpPr/>
             <p:nvPr/>
           </p:nvSpPr>
@@ -5152,19 +4926,13 @@
             <a:lstStyle/>
             <a:p>
               <a:pPr algn="ctr"/>
-              <a:endParaRPr lang="en-CN"/>
+              <a:endParaRPr lang="en-US"/>
             </a:p>
           </p:txBody>
         </p:sp>
         <p:sp>
           <p:nvSpPr>
-            <p:cNvPr id="119" name="Oval 118">
-              <a:extLst>
-                <a:ext uri="{FF2B5EF4-FFF2-40B4-BE49-F238E27FC236}">
-                  <a16:creationId xmlns:a16="http://schemas.microsoft.com/office/drawing/2014/main" id="{D1B2FEE3-6B99-E2FA-70DA-3478F0CBB8A6}"/>
-                </a:ext>
-              </a:extLst>
-            </p:cNvPr>
+            <p:cNvPr id="119" name="Oval 118"/>
             <p:cNvSpPr/>
             <p:nvPr/>
           </p:nvSpPr>
@@ -5204,19 +4972,13 @@
             <a:lstStyle/>
             <a:p>
               <a:pPr algn="ctr"/>
-              <a:endParaRPr lang="en-CN"/>
+              <a:endParaRPr lang="en-US"/>
             </a:p>
           </p:txBody>
         </p:sp>
         <p:sp>
           <p:nvSpPr>
-            <p:cNvPr id="122" name="Oval 121">
-              <a:extLst>
-                <a:ext uri="{FF2B5EF4-FFF2-40B4-BE49-F238E27FC236}">
-                  <a16:creationId xmlns:a16="http://schemas.microsoft.com/office/drawing/2014/main" id="{51730339-FBCE-57B4-BDD1-3DAE304CB978}"/>
-                </a:ext>
-              </a:extLst>
-            </p:cNvPr>
+            <p:cNvPr id="122" name="Oval 121"/>
             <p:cNvSpPr/>
             <p:nvPr/>
           </p:nvSpPr>
@@ -5256,19 +5018,13 @@
             <a:lstStyle/>
             <a:p>
               <a:pPr algn="ctr"/>
-              <a:endParaRPr lang="en-CN"/>
+              <a:endParaRPr lang="en-US"/>
             </a:p>
           </p:txBody>
         </p:sp>
         <p:sp>
           <p:nvSpPr>
-            <p:cNvPr id="124" name="Oval 123">
-              <a:extLst>
-                <a:ext uri="{FF2B5EF4-FFF2-40B4-BE49-F238E27FC236}">
-                  <a16:creationId xmlns:a16="http://schemas.microsoft.com/office/drawing/2014/main" id="{9BEB58F4-CA93-1DF9-640E-39C5DA1ACAE7}"/>
-                </a:ext>
-              </a:extLst>
-            </p:cNvPr>
+            <p:cNvPr id="124" name="Oval 123"/>
             <p:cNvSpPr/>
             <p:nvPr/>
           </p:nvSpPr>
@@ -5308,19 +5064,13 @@
             <a:lstStyle/>
             <a:p>
               <a:pPr algn="ctr"/>
-              <a:endParaRPr lang="en-CN"/>
+              <a:endParaRPr lang="en-US"/>
             </a:p>
           </p:txBody>
         </p:sp>
         <p:grpSp>
           <p:nvGrpSpPr>
-            <p:cNvPr id="140" name="Group 139">
-              <a:extLst>
-                <a:ext uri="{FF2B5EF4-FFF2-40B4-BE49-F238E27FC236}">
-                  <a16:creationId xmlns:a16="http://schemas.microsoft.com/office/drawing/2014/main" id="{E86AA121-EF98-B911-A718-411F104F3CB0}"/>
-                </a:ext>
-              </a:extLst>
-            </p:cNvPr>
+            <p:cNvPr id="140" name="Group 139"/>
             <p:cNvGrpSpPr/>
             <p:nvPr/>
           </p:nvGrpSpPr>
@@ -5334,13 +5084,7 @@
           </p:grpSpPr>
           <p:sp>
             <p:nvSpPr>
-              <p:cNvPr id="134" name="TextBox 36">
-                <a:extLst>
-                  <a:ext uri="{FF2B5EF4-FFF2-40B4-BE49-F238E27FC236}">
-                    <a16:creationId xmlns:a16="http://schemas.microsoft.com/office/drawing/2014/main" id="{B7231477-6837-BB4A-A11C-3483873584B5}"/>
-                  </a:ext>
-                </a:extLst>
-              </p:cNvPr>
+              <p:cNvPr id="134" name="TextBox 36"/>
               <p:cNvSpPr txBox="1">
                 <a:spLocks noChangeAspect="1"/>
               </p:cNvSpPr>
@@ -5518,16 +5262,8 @@
           </p:sp>
           <p:cxnSp>
             <p:nvCxnSpPr>
-              <p:cNvPr id="135" name="Straight Arrow Connector 134">
-                <a:extLst>
-                  <a:ext uri="{FF2B5EF4-FFF2-40B4-BE49-F238E27FC236}">
-                    <a16:creationId xmlns:a16="http://schemas.microsoft.com/office/drawing/2014/main" id="{187F7B78-769E-9D10-ACB2-1C7A2BDA958F}"/>
-                  </a:ext>
-                </a:extLst>
-              </p:cNvPr>
-              <p:cNvCxnSpPr>
-                <a:cxnSpLocks/>
-              </p:cNvCxnSpPr>
+              <p:cNvPr id="135" name="Straight Arrow Connector 134"/>
+              <p:cNvCxnSpPr/>
               <p:nvPr/>
             </p:nvCxnSpPr>
             <p:spPr>
@@ -5564,16 +5300,8 @@
           </p:cxnSp>
           <p:cxnSp>
             <p:nvCxnSpPr>
-              <p:cNvPr id="136" name="Straight Arrow Connector 135">
-                <a:extLst>
-                  <a:ext uri="{FF2B5EF4-FFF2-40B4-BE49-F238E27FC236}">
-                    <a16:creationId xmlns:a16="http://schemas.microsoft.com/office/drawing/2014/main" id="{C3D8573E-D634-6E52-6698-EE163FB8B734}"/>
-                  </a:ext>
-                </a:extLst>
-              </p:cNvPr>
-              <p:cNvCxnSpPr>
-                <a:cxnSpLocks/>
-              </p:cNvCxnSpPr>
+              <p:cNvPr id="136" name="Straight Arrow Connector 135"/>
+              <p:cNvCxnSpPr/>
               <p:nvPr/>
             </p:nvCxnSpPr>
             <p:spPr>
@@ -5610,13 +5338,7 @@
           </p:cxnSp>
           <p:sp>
             <p:nvSpPr>
-              <p:cNvPr id="137" name="TextBox 36">
-                <a:extLst>
-                  <a:ext uri="{FF2B5EF4-FFF2-40B4-BE49-F238E27FC236}">
-                    <a16:creationId xmlns:a16="http://schemas.microsoft.com/office/drawing/2014/main" id="{32B7F567-CE04-4154-BFC0-010317D92EF5}"/>
-                  </a:ext>
-                </a:extLst>
-              </p:cNvPr>
+              <p:cNvPr id="137" name="TextBox 36"/>
               <p:cNvSpPr txBox="1">
                 <a:spLocks noChangeAspect="1"/>
               </p:cNvSpPr>
@@ -5784,11 +5506,6 @@
         </p:grpSp>
       </p:grpSp>
     </p:spTree>
-    <p:extLst>
-      <p:ext uri="{BB962C8B-B14F-4D97-AF65-F5344CB8AC3E}">
-        <p14:creationId xmlns:p14="http://schemas.microsoft.com/office/powerpoint/2010/main" val="324972270"/>
-      </p:ext>
-    </p:extLst>
   </p:cSld>
   <p:clrMapOvr>
     <a:masterClrMapping/>
@@ -5813,15 +5530,684 @@
           <a:chExt cx="0" cy="0"/>
         </a:xfrm>
       </p:grpSpPr>
+      <p:grpSp>
+        <p:nvGrpSpPr>
+          <p:cNvPr id="2" name="组合 1"/>
+          <p:cNvGrpSpPr/>
+          <p:nvPr/>
+        </p:nvGrpSpPr>
+        <p:grpSpPr>
+          <a:xfrm>
+            <a:off x="4793615" y="2189480"/>
+            <a:ext cx="2605405" cy="2479040"/>
+            <a:chOff x="7467" y="2215"/>
+            <a:chExt cx="4103" cy="3904"/>
+          </a:xfrm>
+        </p:grpSpPr>
+        <p:sp>
+          <p:nvSpPr>
+            <p:cNvPr id="15" name="Rectangle 14"/>
+            <p:cNvSpPr/>
+            <p:nvPr/>
+          </p:nvSpPr>
+          <p:spPr>
+            <a:xfrm>
+              <a:off x="7876" y="4159"/>
+              <a:ext cx="3694" cy="1960"/>
+            </a:xfrm>
+            <a:prstGeom prst="rect">
+              <a:avLst/>
+            </a:prstGeom>
+            <a:noFill/>
+            <a:ln w="22225">
+              <a:solidFill>
+                <a:schemeClr val="tx1"/>
+              </a:solidFill>
+            </a:ln>
+          </p:spPr>
+          <p:style>
+            <a:lnRef idx="2">
+              <a:schemeClr val="accent1">
+                <a:shade val="50000"/>
+              </a:schemeClr>
+            </a:lnRef>
+            <a:fillRef idx="1">
+              <a:schemeClr val="accent1"/>
+            </a:fillRef>
+            <a:effectRef idx="0">
+              <a:schemeClr val="accent1"/>
+            </a:effectRef>
+            <a:fontRef idx="minor">
+              <a:schemeClr val="lt1"/>
+            </a:fontRef>
+          </p:style>
+          <p:txBody>
+            <a:bodyPr rtlCol="0" anchor="ctr"/>
+            <a:lstStyle/>
+            <a:p>
+              <a:r>
+                <a:rPr lang="en-US" altLang="zh-CN" sz="1200" dirty="0">
+                  <a:solidFill>
+                    <a:schemeClr val="tx1"/>
+                  </a:solidFill>
+                </a:rPr>
+                <a:t>id:</a:t>
+              </a:r>
+              <a:r>
+                <a:rPr lang="zh-CN" altLang="en-US" sz="1200" dirty="0">
+                  <a:solidFill>
+                    <a:schemeClr val="tx1"/>
+                  </a:solidFill>
+                </a:rPr>
+                <a:t> </a:t>
+              </a:r>
+              <a:r>
+                <a:rPr lang="en-US" altLang="zh-CN" sz="1200" dirty="0">
+                  <a:solidFill>
+                    <a:schemeClr val="tx1"/>
+                  </a:solidFill>
+                </a:rPr>
+                <a:t>ID</a:t>
+              </a:r>
+              <a:endParaRPr lang="en-US" altLang="zh-CN" sz="1200" dirty="0">
+                <a:solidFill>
+                  <a:schemeClr val="tx1"/>
+                </a:solidFill>
+              </a:endParaRPr>
+            </a:p>
+            <a:p>
+              <a:r>
+                <a:rPr lang="en-US" altLang="zh-CN" sz="1200" dirty="0">
+                  <a:solidFill>
+                    <a:schemeClr val="tx1"/>
+                  </a:solidFill>
+                </a:rPr>
+                <a:t>name: String</a:t>
+              </a:r>
+              <a:endParaRPr lang="en-US" altLang="zh-CN" sz="1200" dirty="0">
+                <a:solidFill>
+                  <a:schemeClr val="tx1"/>
+                </a:solidFill>
+              </a:endParaRPr>
+            </a:p>
+            <a:p>
+              <a:r>
+                <a:rPr lang="en-US" altLang="zh-CN" sz="1200" dirty="0">
+                  <a:solidFill>
+                    <a:schemeClr val="tx1"/>
+                  </a:solidFill>
+                </a:rPr>
+                <a:t>balance</a:t>
+              </a:r>
+              <a:r>
+                <a:rPr lang="en-US" sz="1200" dirty="0">
+                  <a:solidFill>
+                    <a:schemeClr val="tx1"/>
+                  </a:solidFill>
+                  <a:sym typeface="+mn-ea"/>
+                </a:rPr>
+                <a:t>: </a:t>
+              </a:r>
+              <a:r>
+                <a:rPr lang="en-US" altLang="zh-CN" sz="1200" dirty="0">
+                  <a:solidFill>
+                    <a:schemeClr val="tx1"/>
+                  </a:solidFill>
+                  <a:sym typeface="+mn-ea"/>
+                </a:rPr>
+                <a:t>64-bit</a:t>
+              </a:r>
+              <a:r>
+                <a:rPr lang="zh-CN" altLang="en-US" sz="1200" dirty="0">
+                  <a:solidFill>
+                    <a:schemeClr val="tx1"/>
+                  </a:solidFill>
+                  <a:sym typeface="+mn-ea"/>
+                </a:rPr>
+                <a:t> </a:t>
+              </a:r>
+              <a:r>
+                <a:rPr lang="en-US" altLang="zh-CN" sz="1200" dirty="0">
+                  <a:solidFill>
+                    <a:schemeClr val="tx1"/>
+                  </a:solidFill>
+                  <a:sym typeface="+mn-ea"/>
+                </a:rPr>
+                <a:t>Integer</a:t>
+              </a:r>
+              <a:endParaRPr lang="en-US" altLang="zh-CN" sz="1200" dirty="0">
+                <a:solidFill>
+                  <a:schemeClr val="tx1"/>
+                </a:solidFill>
+                <a:sym typeface="+mn-ea"/>
+              </a:endParaRPr>
+            </a:p>
+            <a:p>
+              <a:r>
+                <a:rPr lang="en-US" sz="1200" dirty="0">
+                  <a:solidFill>
+                    <a:schemeClr val="tx1"/>
+                  </a:solidFill>
+                </a:rPr>
+                <a:t>numTransfered</a:t>
+              </a:r>
+              <a:r>
+                <a:rPr lang="en-US" sz="1200" dirty="0">
+                  <a:solidFill>
+                    <a:schemeClr val="tx1"/>
+                  </a:solidFill>
+                  <a:sym typeface="+mn-ea"/>
+                </a:rPr>
+                <a:t>: </a:t>
+              </a:r>
+              <a:r>
+                <a:rPr lang="en-US" altLang="zh-CN" sz="1200" dirty="0">
+                  <a:solidFill>
+                    <a:schemeClr val="tx1"/>
+                  </a:solidFill>
+                  <a:sym typeface="+mn-ea"/>
+                </a:rPr>
+                <a:t>64-bit</a:t>
+              </a:r>
+              <a:r>
+                <a:rPr lang="zh-CN" altLang="en-US" sz="1200" dirty="0">
+                  <a:solidFill>
+                    <a:schemeClr val="tx1"/>
+                  </a:solidFill>
+                  <a:sym typeface="+mn-ea"/>
+                </a:rPr>
+                <a:t> </a:t>
+              </a:r>
+              <a:r>
+                <a:rPr lang="en-US" altLang="zh-CN" sz="1200" dirty="0">
+                  <a:solidFill>
+                    <a:schemeClr val="tx1"/>
+                  </a:solidFill>
+                  <a:sym typeface="+mn-ea"/>
+                </a:rPr>
+                <a:t>Integer</a:t>
+              </a:r>
+              <a:endParaRPr lang="en-US" altLang="zh-CN" sz="1200" dirty="0">
+                <a:solidFill>
+                  <a:schemeClr val="tx1"/>
+                </a:solidFill>
+                <a:sym typeface="+mn-ea"/>
+              </a:endParaRPr>
+            </a:p>
+            <a:p>
+              <a:r>
+                <a:rPr lang="en-US" sz="1200" dirty="0">
+                  <a:solidFill>
+                    <a:schemeClr val="tx1"/>
+                  </a:solidFill>
+                </a:rPr>
+                <a:t>transHistory: [64-bit Integer]</a:t>
+              </a:r>
+              <a:endParaRPr lang="en-US" sz="1200" dirty="0">
+                <a:solidFill>
+                  <a:schemeClr val="tx1"/>
+                </a:solidFill>
+              </a:endParaRPr>
+            </a:p>
+            <a:p>
+              <a:r>
+                <a:rPr lang="en-US" sz="1200" dirty="0">
+                  <a:solidFill>
+                    <a:schemeClr val="tx1"/>
+                  </a:solidFill>
+                </a:rPr>
+                <a:t>versionHistory: [64-bit Integer]</a:t>
+              </a:r>
+              <a:endParaRPr lang="en-US" sz="1200" dirty="0">
+                <a:solidFill>
+                  <a:schemeClr val="tx1"/>
+                </a:solidFill>
+              </a:endParaRPr>
+            </a:p>
+          </p:txBody>
+        </p:sp>
+        <p:sp>
+          <p:nvSpPr>
+            <p:cNvPr id="16" name="Rectangle 15"/>
+            <p:cNvSpPr/>
+            <p:nvPr/>
+          </p:nvSpPr>
+          <p:spPr>
+            <a:xfrm>
+              <a:off x="7876" y="3546"/>
+              <a:ext cx="3693" cy="598"/>
+            </a:xfrm>
+            <a:prstGeom prst="rect">
+              <a:avLst/>
+            </a:prstGeom>
+            <a:solidFill>
+              <a:schemeClr val="accent1">
+                <a:lumMod val="60000"/>
+                <a:lumOff val="40000"/>
+              </a:schemeClr>
+            </a:solidFill>
+            <a:ln w="22225">
+              <a:solidFill>
+                <a:schemeClr val="tx1"/>
+              </a:solidFill>
+            </a:ln>
+          </p:spPr>
+          <p:style>
+            <a:lnRef idx="2">
+              <a:schemeClr val="accent1">
+                <a:shade val="50000"/>
+              </a:schemeClr>
+            </a:lnRef>
+            <a:fillRef idx="1">
+              <a:schemeClr val="accent1"/>
+            </a:fillRef>
+            <a:effectRef idx="0">
+              <a:schemeClr val="accent1"/>
+            </a:effectRef>
+            <a:fontRef idx="minor">
+              <a:schemeClr val="lt1"/>
+            </a:fontRef>
+          </p:style>
+          <p:txBody>
+            <a:bodyPr rtlCol="0" anchor="ctr"/>
+            <a:lstStyle/>
+            <a:p>
+              <a:pPr algn="ctr"/>
+              <a:r>
+                <a:rPr lang="en-US" altLang="zh-CN" b="1" dirty="0">
+                  <a:solidFill>
+                    <a:schemeClr val="tx1"/>
+                  </a:solidFill>
+                </a:rPr>
+                <a:t>Account</a:t>
+              </a:r>
+              <a:endParaRPr lang="en-US" b="1" dirty="0">
+                <a:solidFill>
+                  <a:schemeClr val="tx1"/>
+                </a:solidFill>
+              </a:endParaRPr>
+            </a:p>
+          </p:txBody>
+        </p:sp>
+        <p:cxnSp>
+          <p:nvCxnSpPr>
+            <p:cNvPr id="72" name="Elbow Connector 71"/>
+            <p:cNvCxnSpPr>
+              <a:stCxn id="16" idx="0"/>
+              <a:endCxn id="15" idx="1"/>
+            </p:cNvCxnSpPr>
+            <p:nvPr/>
+          </p:nvCxnSpPr>
+          <p:spPr>
+            <a:xfrm rot="16200000" flipH="1" flipV="1">
+              <a:off x="8002" y="3419"/>
+              <a:ext cx="1593" cy="1847"/>
+            </a:xfrm>
+            <a:prstGeom prst="bentConnector4">
+              <a:avLst>
+                <a:gd name="adj1" fmla="val -23540"/>
+                <a:gd name="adj2" fmla="val 120303"/>
+              </a:avLst>
+            </a:prstGeom>
+            <a:ln w="19050">
+              <a:solidFill>
+                <a:schemeClr val="tx1"/>
+              </a:solidFill>
+              <a:prstDash val="lgDash"/>
+              <a:tailEnd type="triangle"/>
+            </a:ln>
+            <a:effectLst/>
+          </p:spPr>
+          <p:style>
+            <a:lnRef idx="1">
+              <a:schemeClr val="accent1"/>
+            </a:lnRef>
+            <a:fillRef idx="0">
+              <a:schemeClr val="accent1"/>
+            </a:fillRef>
+            <a:effectRef idx="0">
+              <a:schemeClr val="accent1"/>
+            </a:effectRef>
+            <a:fontRef idx="minor">
+              <a:schemeClr val="tx1"/>
+            </a:fontRef>
+          </p:style>
+        </p:cxnSp>
+        <p:sp>
+          <p:nvSpPr>
+            <p:cNvPr id="75" name="TextBox 74"/>
+            <p:cNvSpPr txBox="1"/>
+            <p:nvPr/>
+          </p:nvSpPr>
+          <p:spPr>
+            <a:xfrm>
+              <a:off x="7467" y="2215"/>
+              <a:ext cx="3693" cy="725"/>
+            </a:xfrm>
+            <a:prstGeom prst="rect">
+              <a:avLst/>
+            </a:prstGeom>
+            <a:noFill/>
+          </p:spPr>
+          <p:txBody>
+            <a:bodyPr wrap="square" rtlCol="0">
+              <a:spAutoFit/>
+            </a:bodyPr>
+            <a:lstStyle/>
+            <a:p>
+              <a:r>
+                <a:rPr lang="en-US" altLang="zh-CN" sz="1200" dirty="0"/>
+                <a:t>transfer{amount: 64-bit Integer, versionHistory: [64-bit Integer]}</a:t>
+              </a:r>
+              <a:endParaRPr lang="en-US" altLang="zh-CN" sz="1200" dirty="0"/>
+            </a:p>
+          </p:txBody>
+        </p:sp>
+        <p:sp>
+          <p:nvSpPr>
+            <p:cNvPr id="100" name="Oval 99"/>
+            <p:cNvSpPr/>
+            <p:nvPr/>
+          </p:nvSpPr>
+          <p:spPr>
+            <a:xfrm>
+              <a:off x="7860" y="5119"/>
+              <a:ext cx="29" cy="29"/>
+            </a:xfrm>
+            <a:prstGeom prst="ellipse">
+              <a:avLst/>
+            </a:prstGeom>
+            <a:solidFill>
+              <a:schemeClr val="tx1"/>
+            </a:solidFill>
+            <a:ln>
+              <a:noFill/>
+            </a:ln>
+          </p:spPr>
+          <p:style>
+            <a:lnRef idx="2">
+              <a:schemeClr val="accent1">
+                <a:shade val="50000"/>
+              </a:schemeClr>
+            </a:lnRef>
+            <a:fillRef idx="1">
+              <a:schemeClr val="accent1"/>
+            </a:fillRef>
+            <a:effectRef idx="0">
+              <a:schemeClr val="accent1"/>
+            </a:effectRef>
+            <a:fontRef idx="minor">
+              <a:schemeClr val="lt1"/>
+            </a:fontRef>
+          </p:style>
+          <p:txBody>
+            <a:bodyPr lIns="90000" rtlCol="0" anchor="ctr"/>
+            <a:lstStyle/>
+            <a:p>
+              <a:pPr algn="ctr"/>
+              <a:endParaRPr lang="en-US"/>
+            </a:p>
+          </p:txBody>
+        </p:sp>
+        <p:sp>
+          <p:nvSpPr>
+            <p:cNvPr id="103" name="Oval 102"/>
+            <p:cNvSpPr/>
+            <p:nvPr/>
+          </p:nvSpPr>
+          <p:spPr>
+            <a:xfrm>
+              <a:off x="7870" y="4750"/>
+              <a:ext cx="28" cy="28"/>
+            </a:xfrm>
+            <a:prstGeom prst="ellipse">
+              <a:avLst/>
+            </a:prstGeom>
+            <a:solidFill>
+              <a:schemeClr val="tx1"/>
+            </a:solidFill>
+            <a:ln>
+              <a:noFill/>
+            </a:ln>
+          </p:spPr>
+          <p:style>
+            <a:lnRef idx="2">
+              <a:schemeClr val="accent1">
+                <a:shade val="50000"/>
+              </a:schemeClr>
+            </a:lnRef>
+            <a:fillRef idx="1">
+              <a:schemeClr val="accent1"/>
+            </a:fillRef>
+            <a:effectRef idx="0">
+              <a:schemeClr val="accent1"/>
+            </a:effectRef>
+            <a:fontRef idx="minor">
+              <a:schemeClr val="lt1"/>
+            </a:fontRef>
+          </p:style>
+          <p:txBody>
+            <a:bodyPr lIns="90000" rtlCol="0" anchor="ctr"/>
+            <a:lstStyle/>
+            <a:p>
+              <a:pPr algn="ctr"/>
+              <a:endParaRPr lang="en-US"/>
+            </a:p>
+          </p:txBody>
+        </p:sp>
+        <p:sp>
+          <p:nvSpPr>
+            <p:cNvPr id="105" name="Oval 104"/>
+            <p:cNvSpPr/>
+            <p:nvPr/>
+          </p:nvSpPr>
+          <p:spPr>
+            <a:xfrm>
+              <a:off x="7870" y="4467"/>
+              <a:ext cx="28" cy="28"/>
+            </a:xfrm>
+            <a:prstGeom prst="ellipse">
+              <a:avLst/>
+            </a:prstGeom>
+            <a:solidFill>
+              <a:schemeClr val="tx1"/>
+            </a:solidFill>
+            <a:ln>
+              <a:noFill/>
+            </a:ln>
+          </p:spPr>
+          <p:style>
+            <a:lnRef idx="2">
+              <a:schemeClr val="accent1">
+                <a:shade val="50000"/>
+              </a:schemeClr>
+            </a:lnRef>
+            <a:fillRef idx="1">
+              <a:schemeClr val="accent1"/>
+            </a:fillRef>
+            <a:effectRef idx="0">
+              <a:schemeClr val="accent1"/>
+            </a:effectRef>
+            <a:fontRef idx="minor">
+              <a:schemeClr val="lt1"/>
+            </a:fontRef>
+          </p:style>
+          <p:txBody>
+            <a:bodyPr lIns="90000" rtlCol="0" anchor="ctr"/>
+            <a:lstStyle/>
+            <a:p>
+              <a:pPr algn="ctr"/>
+              <a:endParaRPr lang="en-US"/>
+            </a:p>
+          </p:txBody>
+        </p:sp>
+        <p:sp>
+          <p:nvSpPr>
+            <p:cNvPr id="119" name="Oval 118"/>
+            <p:cNvSpPr/>
+            <p:nvPr/>
+          </p:nvSpPr>
+          <p:spPr>
+            <a:xfrm>
+              <a:off x="11015" y="4467"/>
+              <a:ext cx="28" cy="28"/>
+            </a:xfrm>
+            <a:prstGeom prst="ellipse">
+              <a:avLst/>
+            </a:prstGeom>
+            <a:solidFill>
+              <a:schemeClr val="tx1"/>
+            </a:solidFill>
+            <a:ln>
+              <a:noFill/>
+            </a:ln>
+          </p:spPr>
+          <p:style>
+            <a:lnRef idx="2">
+              <a:schemeClr val="accent1">
+                <a:shade val="50000"/>
+              </a:schemeClr>
+            </a:lnRef>
+            <a:fillRef idx="1">
+              <a:schemeClr val="accent1"/>
+            </a:fillRef>
+            <a:effectRef idx="0">
+              <a:schemeClr val="accent1"/>
+            </a:effectRef>
+            <a:fontRef idx="minor">
+              <a:schemeClr val="lt1"/>
+            </a:fontRef>
+          </p:style>
+          <p:txBody>
+            <a:bodyPr lIns="90000" rtlCol="0" anchor="ctr"/>
+            <a:lstStyle/>
+            <a:p>
+              <a:pPr algn="ctr"/>
+              <a:endParaRPr lang="en-US"/>
+            </a:p>
+          </p:txBody>
+        </p:sp>
+        <p:sp>
+          <p:nvSpPr>
+            <p:cNvPr id="122" name="Oval 121"/>
+            <p:cNvSpPr/>
+            <p:nvPr/>
+          </p:nvSpPr>
+          <p:spPr>
+            <a:xfrm>
+              <a:off x="9865" y="3530"/>
+              <a:ext cx="29" cy="28"/>
+            </a:xfrm>
+            <a:prstGeom prst="ellipse">
+              <a:avLst/>
+            </a:prstGeom>
+            <a:solidFill>
+              <a:schemeClr val="tx1"/>
+            </a:solidFill>
+            <a:ln>
+              <a:noFill/>
+            </a:ln>
+          </p:spPr>
+          <p:style>
+            <a:lnRef idx="2">
+              <a:schemeClr val="accent1">
+                <a:shade val="50000"/>
+              </a:schemeClr>
+            </a:lnRef>
+            <a:fillRef idx="1">
+              <a:schemeClr val="accent1"/>
+            </a:fillRef>
+            <a:effectRef idx="0">
+              <a:schemeClr val="accent1"/>
+            </a:effectRef>
+            <a:fontRef idx="minor">
+              <a:schemeClr val="lt1"/>
+            </a:fontRef>
+          </p:style>
+          <p:txBody>
+            <a:bodyPr lIns="90000" rtlCol="0" anchor="ctr"/>
+            <a:lstStyle/>
+            <a:p>
+              <a:pPr algn="ctr"/>
+              <a:endParaRPr lang="en-US"/>
+            </a:p>
+          </p:txBody>
+        </p:sp>
+        <p:sp>
+          <p:nvSpPr>
+            <p:cNvPr id="124" name="Oval 123"/>
+            <p:cNvSpPr/>
+            <p:nvPr/>
+          </p:nvSpPr>
+          <p:spPr>
+            <a:xfrm>
+              <a:off x="9091" y="3532"/>
+              <a:ext cx="28" cy="28"/>
+            </a:xfrm>
+            <a:prstGeom prst="ellipse">
+              <a:avLst/>
+            </a:prstGeom>
+            <a:solidFill>
+              <a:schemeClr val="tx1"/>
+            </a:solidFill>
+            <a:ln>
+              <a:noFill/>
+            </a:ln>
+          </p:spPr>
+          <p:style>
+            <a:lnRef idx="2">
+              <a:schemeClr val="accent1">
+                <a:shade val="50000"/>
+              </a:schemeClr>
+            </a:lnRef>
+            <a:fillRef idx="1">
+              <a:schemeClr val="accent1"/>
+            </a:fillRef>
+            <a:effectRef idx="0">
+              <a:schemeClr val="accent1"/>
+            </a:effectRef>
+            <a:fontRef idx="minor">
+              <a:schemeClr val="lt1"/>
+            </a:fontRef>
+          </p:style>
+          <p:txBody>
+            <a:bodyPr lIns="90000" rtlCol="0" anchor="ctr"/>
+            <a:lstStyle/>
+            <a:p>
+              <a:pPr algn="ctr"/>
+              <a:endParaRPr lang="en-US"/>
+            </a:p>
+          </p:txBody>
+        </p:sp>
+      </p:grpSp>
+    </p:spTree>
+  </p:cSld>
+  <p:clrMapOvr>
+    <a:masterClrMapping/>
+  </p:clrMapOvr>
+</p:sld>
+</file>
+
+<file path=ppt/slides/slide3.xml><?xml version="1.0" encoding="utf-8"?>
+<p:sld xmlns:a="http://schemas.openxmlformats.org/drawingml/2006/main" xmlns:r="http://schemas.openxmlformats.org/officeDocument/2006/relationships" xmlns:p="http://schemas.openxmlformats.org/presentationml/2006/main">
+  <p:cSld>
+    <p:spTree>
+      <p:nvGrpSpPr>
+        <p:cNvPr id="1" name=""/>
+        <p:cNvGrpSpPr/>
+        <p:nvPr/>
+      </p:nvGrpSpPr>
+      <p:grpSpPr>
+        <a:xfrm>
+          <a:off x="0" y="0"/>
+          <a:ext cx="0" cy="0"/>
+          <a:chOff x="0" y="0"/>
+          <a:chExt cx="0" cy="0"/>
+        </a:xfrm>
+      </p:grpSpPr>
       <p:sp>
         <p:nvSpPr>
-          <p:cNvPr id="4" name="Rectangle 3">
-            <a:extLst>
-              <a:ext uri="{FF2B5EF4-FFF2-40B4-BE49-F238E27FC236}">
-                <a16:creationId xmlns:a16="http://schemas.microsoft.com/office/drawing/2014/main" id="{5EFB2F0D-ABB3-D995-FA04-8C359C1827B4}"/>
-              </a:ext>
-            </a:extLst>
-          </p:cNvPr>
+          <p:cNvPr id="4" name="Rectangle 3"/>
           <p:cNvSpPr/>
           <p:nvPr/>
         </p:nvSpPr>
@@ -5874,7 +6260,7 @@
               </a:rPr>
               <a:t>Person</a:t>
             </a:r>
-            <a:endParaRPr lang="en-CN" b="1" dirty="0">
+            <a:endParaRPr lang="en-US" b="1" dirty="0">
               <a:solidFill>
                 <a:schemeClr val="tx1"/>
               </a:solidFill>
@@ -5884,13 +6270,7 @@
       </p:sp>
       <p:sp>
         <p:nvSpPr>
-          <p:cNvPr id="5" name="Rectangle 4">
-            <a:extLst>
-              <a:ext uri="{FF2B5EF4-FFF2-40B4-BE49-F238E27FC236}">
-                <a16:creationId xmlns:a16="http://schemas.microsoft.com/office/drawing/2014/main" id="{71799D25-8F4B-3E78-7E33-C84644F1D35C}"/>
-              </a:ext>
-            </a:extLst>
-          </p:cNvPr>
+          <p:cNvPr id="5" name="Rectangle 4"/>
           <p:cNvSpPr/>
           <p:nvPr/>
         </p:nvSpPr>
@@ -5942,7 +6322,7 @@
               </a:rPr>
               <a:t>Company</a:t>
             </a:r>
-            <a:endParaRPr lang="en-CN" b="1" dirty="0">
+            <a:endParaRPr lang="en-US" b="1" dirty="0">
               <a:solidFill>
                 <a:schemeClr val="tx1"/>
               </a:solidFill>
@@ -5952,13 +6332,7 @@
       </p:sp>
       <p:sp>
         <p:nvSpPr>
-          <p:cNvPr id="6" name="Rectangle 5">
-            <a:extLst>
-              <a:ext uri="{FF2B5EF4-FFF2-40B4-BE49-F238E27FC236}">
-                <a16:creationId xmlns:a16="http://schemas.microsoft.com/office/drawing/2014/main" id="{4C51DCB4-07F1-ACD1-2A47-E37BE04A33BA}"/>
-              </a:ext>
-            </a:extLst>
-          </p:cNvPr>
+          <p:cNvPr id="6" name="Rectangle 5"/>
           <p:cNvSpPr/>
           <p:nvPr/>
         </p:nvSpPr>
@@ -6011,7 +6385,7 @@
               </a:rPr>
               <a:t>Account</a:t>
             </a:r>
-            <a:endParaRPr lang="en-CN" b="1" dirty="0">
+            <a:endParaRPr lang="en-US" b="1" dirty="0">
               <a:solidFill>
                 <a:schemeClr val="tx1"/>
               </a:solidFill>
@@ -6021,13 +6395,7 @@
       </p:sp>
       <p:sp>
         <p:nvSpPr>
-          <p:cNvPr id="9" name="Rectangle 8">
-            <a:extLst>
-              <a:ext uri="{FF2B5EF4-FFF2-40B4-BE49-F238E27FC236}">
-                <a16:creationId xmlns:a16="http://schemas.microsoft.com/office/drawing/2014/main" id="{5F68F319-B446-C876-5ECA-738B6558B6E1}"/>
-              </a:ext>
-            </a:extLst>
-          </p:cNvPr>
+          <p:cNvPr id="9" name="Rectangle 8"/>
           <p:cNvSpPr/>
           <p:nvPr/>
         </p:nvSpPr>
@@ -6080,7 +6448,7 @@
               </a:rPr>
               <a:t>Medium</a:t>
             </a:r>
-            <a:endParaRPr lang="en-CN" b="1" dirty="0">
+            <a:endParaRPr lang="en-US" b="1" dirty="0">
               <a:solidFill>
                 <a:schemeClr val="tx1"/>
               </a:solidFill>
@@ -6090,13 +6458,7 @@
       </p:sp>
       <p:sp>
         <p:nvSpPr>
-          <p:cNvPr id="12" name="Rectangle 11">
-            <a:extLst>
-              <a:ext uri="{FF2B5EF4-FFF2-40B4-BE49-F238E27FC236}">
-                <a16:creationId xmlns:a16="http://schemas.microsoft.com/office/drawing/2014/main" id="{74363A22-BDF1-F1C7-E411-2E379C3A7160}"/>
-              </a:ext>
-            </a:extLst>
-          </p:cNvPr>
+          <p:cNvPr id="12" name="Rectangle 11"/>
           <p:cNvSpPr/>
           <p:nvPr/>
         </p:nvSpPr>
@@ -6149,7 +6511,7 @@
               </a:rPr>
               <a:t>Loan</a:t>
             </a:r>
-            <a:endParaRPr lang="en-CN" b="1" dirty="0">
+            <a:endParaRPr lang="en-US" b="1" dirty="0">
               <a:solidFill>
                 <a:schemeClr val="tx1"/>
               </a:solidFill>
@@ -6158,11 +6520,6 @@
         </p:txBody>
       </p:sp>
     </p:spTree>
-    <p:extLst>
-      <p:ext uri="{BB962C8B-B14F-4D97-AF65-F5344CB8AC3E}">
-        <p14:creationId xmlns:p14="http://schemas.microsoft.com/office/powerpoint/2010/main" val="3265552492"/>
-      </p:ext>
-    </p:extLst>
   </p:cSld>
   <p:clrMapOvr>
     <a:masterClrMapping/>
@@ -6213,7 +6570,7 @@
     </a:clrScheme>
     <a:fontScheme name="Office">
       <a:majorFont>
-        <a:latin typeface="等线 Light" panose="020F0302020204030204"/>
+        <a:latin typeface="等线 Light"/>
         <a:ea typeface=""/>
         <a:cs typeface=""/>
         <a:font script="Jpan" typeface="游ゴシック Light"/>
@@ -6248,7 +6605,7 @@
         <a:font script="Geor" typeface="Sylfaen"/>
       </a:majorFont>
       <a:minorFont>
-        <a:latin typeface="等线" panose="020F0502020204030204"/>
+        <a:latin typeface="等线"/>
         <a:ea typeface=""/>
         <a:cs typeface=""/>
         <a:font script="Jpan" typeface="游ゴシック"/>
@@ -6421,11 +6778,9 @@
       </a:bgFillStyleLst>
     </a:fmtScheme>
   </a:themeElements>
-  <a:objectDefaults/>
-  <a:extraClrSchemeLst/>
   <a:extLst>
     <a:ext uri="{05A4C25C-085E-4340-85A3-A5531E510DB2}">
-      <thm15:themeFamily xmlns:thm15="http://schemas.microsoft.com/office/thememl/2012/main" name="Alibaba Confidential 模板 - V2.pptx" id="{39F1ECA8-83D8-AF46-BF89-DE4A809600F5}" vid="{8FFC3335-084F-A749-B252-C3F3352952B6}"/>
+      <thm15:themeFamily xmlns:thm15="http://schemas.microsoft.com/office/thememl/2012/main" name="Office Theme" id="{62F939B6-93AF-4DB8-9C6B-D6C7DFDC589F}" vid="{4A3C46E8-61CC-4603-A589-7422A47A8E4A}"/>
     </a:ext>
   </a:extLst>
 </a:theme>
@@ -6474,7 +6829,7 @@
     </a:clrScheme>
     <a:fontScheme name="Office">
       <a:majorFont>
-        <a:latin typeface="Calibri Light" panose="020F0302020204030204"/>
+        <a:latin typeface="Calibri Light"/>
         <a:ea typeface=""/>
         <a:cs typeface=""/>
         <a:font script="Jpan" typeface="ＭＳ Ｐゴシック"/>
@@ -6509,7 +6864,7 @@
         <a:font script="Geor" typeface="Sylfaen"/>
       </a:majorFont>
       <a:minorFont>
-        <a:latin typeface="Calibri" panose="020F0502020204030204"/>
+        <a:latin typeface="Calibri"/>
         <a:ea typeface=""/>
         <a:cs typeface=""/>
         <a:font script="Jpan" typeface="ＭＳ Ｐゴシック"/>
@@ -6682,8 +7037,6 @@
       </a:bgFillStyleLst>
     </a:fmtScheme>
   </a:themeElements>
-  <a:objectDefaults/>
-  <a:extraClrSchemeLst/>
   <a:extLst>
     <a:ext uri="{05A4C25C-085E-4340-85A3-A5531E510DB2}">
       <thm15:themeFamily xmlns:thm15="http://schemas.microsoft.com/office/thememl/2012/main" name="Office Theme" id="{62F939B6-93AF-4DB8-9C6B-D6C7DFDC589F}" vid="{4A3C46E8-61CC-4603-A589-7422A47A8E4A}"/>

</xml_diff>

<commit_message>
add missing attrs and relation in data chapter
</commit_message>
<xml_diff>
--- a/figures/schema.pptx
+++ b/figures/schema.pptx
@@ -8,9 +8,9 @@
     <p:notesMasterId r:id="rId5"/>
   </p:notesMasterIdLst>
   <p:sldIdLst>
-    <p:sldId id="415" r:id="rId3"/>
-    <p:sldId id="417" r:id="rId4"/>
-    <p:sldId id="416" r:id="rId6"/>
+    <p:sldId id="415" r:id="rId2"/>
+    <p:sldId id="417" r:id="rId3"/>
+    <p:sldId id="416" r:id="rId4"/>
   </p:sldIdLst>
   <p:sldSz cx="12192000" cy="6858000"/>
   <p:notesSz cx="6858000" cy="9144000"/>
@@ -121,6 +121,9 @@
         </p14:section>
       </p14:sectionLst>
     </p:ext>
+    <p:ext uri="{EFAFB233-063F-42B5-8137-9DF3F51BA10A}">
+      <p15:sldGuideLst xmlns:p15="http://schemas.microsoft.com/office/powerpoint/2012/main"/>
+    </p:ext>
   </p:extLst>
 </p:presentation>
 </file>
@@ -207,6 +210,7 @@
           <a:p>
             <a:fld id="{CAD4BD24-A097-4F9D-85E9-6A2A24CA2D98}" type="datetimeFigureOut">
               <a:rPr lang="zh-CN" altLang="en-US" smtClean="0"/>
+              <a:t>2023/2/28</a:t>
             </a:fld>
             <a:endParaRPr lang="zh-CN" altLang="en-US"/>
           </a:p>
@@ -273,7 +277,6 @@
               <a:rPr lang="zh-CN" altLang="en-US"/>
               <a:t>单击此处编辑母版文本样式</a:t>
             </a:r>
-            <a:endParaRPr lang="zh-CN" altLang="en-US"/>
           </a:p>
           <a:p>
             <a:pPr lvl="1"/>
@@ -281,7 +284,6 @@
               <a:rPr lang="zh-CN" altLang="en-US"/>
               <a:t>第二级</a:t>
             </a:r>
-            <a:endParaRPr lang="zh-CN" altLang="en-US"/>
           </a:p>
           <a:p>
             <a:pPr lvl="2"/>
@@ -289,7 +291,6 @@
               <a:rPr lang="zh-CN" altLang="en-US"/>
               <a:t>第三级</a:t>
             </a:r>
-            <a:endParaRPr lang="zh-CN" altLang="en-US"/>
           </a:p>
           <a:p>
             <a:pPr lvl="3"/>
@@ -297,7 +298,6 @@
               <a:rPr lang="zh-CN" altLang="en-US"/>
               <a:t>第四级</a:t>
             </a:r>
-            <a:endParaRPr lang="zh-CN" altLang="en-US"/>
           </a:p>
           <a:p>
             <a:pPr lvl="4"/>
@@ -305,7 +305,6 @@
               <a:rPr lang="zh-CN" altLang="en-US"/>
               <a:t>第五级</a:t>
             </a:r>
-            <a:endParaRPr lang="zh-CN" altLang="en-US"/>
           </a:p>
         </p:txBody>
       </p:sp>
@@ -369,6 +368,7 @@
           <a:p>
             <a:fld id="{4F292EE1-EB42-416D-BE21-6D6219010E5F}" type="slidenum">
               <a:rPr lang="zh-CN" altLang="en-US" smtClean="0"/>
+              <a:t>‹#›</a:t>
             </a:fld>
             <a:endParaRPr lang="zh-CN" altLang="en-US"/>
           </a:p>
@@ -481,11 +481,20 @@
         <p:cNvGrpSpPr/>
         <p:nvPr/>
       </p:nvGrpSpPr>
-      <p:grpSpPr/>
+      <p:grpSpPr>
+        <a:xfrm>
+          <a:off x="0" y="0"/>
+          <a:ext cx="0" cy="0"/>
+          <a:chOff x="0" y="0"/>
+          <a:chExt cx="0" cy="0"/>
+        </a:xfrm>
+      </p:grpSpPr>
       <p:sp>
         <p:nvSpPr>
           <p:cNvPr id="2" name="幻灯片图像占位符 1"/>
-          <p:cNvSpPr/>
+          <p:cNvSpPr>
+            <a:spLocks noGrp="1" noRot="1" noChangeAspect="1"/>
+          </p:cNvSpPr>
           <p:nvPr>
             <p:ph type="sldImg" idx="2"/>
           </p:nvPr>
@@ -495,7 +504,9 @@
       <p:sp>
         <p:nvSpPr>
           <p:cNvPr id="3" name="文本占位符 2"/>
-          <p:cNvSpPr/>
+          <p:cNvSpPr>
+            <a:spLocks noGrp="1"/>
+          </p:cNvSpPr>
           <p:nvPr>
             <p:ph type="body" idx="3"/>
           </p:nvPr>
@@ -503,6 +514,7 @@
         <p:spPr/>
         <p:txBody>
           <a:bodyPr/>
+          <a:lstStyle/>
           <a:p>
             <a:endParaRPr lang="zh-CN" altLang="en-US"/>
           </a:p>
@@ -561,7 +573,6 @@
               <a:rPr lang="zh-CN" altLang="en-US"/>
               <a:t>单击此处编辑母版标题样式</a:t>
             </a:r>
-            <a:endParaRPr lang="zh-CN" altLang="en-US"/>
           </a:p>
         </p:txBody>
       </p:sp>
@@ -626,7 +637,6 @@
               <a:rPr lang="zh-CN" altLang="en-US"/>
               <a:t>单击此处编辑母版副标题样式</a:t>
             </a:r>
-            <a:endParaRPr lang="zh-CN" altLang="en-US"/>
           </a:p>
         </p:txBody>
       </p:sp>
@@ -674,7 +684,6 @@
               <a:rPr lang="zh-CN" altLang="en-US"/>
               <a:t>单击此处编辑母版标题样式</a:t>
             </a:r>
-            <a:endParaRPr lang="zh-CN" altLang="en-US"/>
           </a:p>
         </p:txBody>
       </p:sp>
@@ -698,7 +707,6 @@
               <a:rPr lang="zh-CN" altLang="en-US"/>
               <a:t>编辑母版文本样式</a:t>
             </a:r>
-            <a:endParaRPr lang="zh-CN" altLang="en-US"/>
           </a:p>
           <a:p>
             <a:pPr lvl="1"/>
@@ -706,7 +714,6 @@
               <a:rPr lang="zh-CN" altLang="en-US"/>
               <a:t>第二级</a:t>
             </a:r>
-            <a:endParaRPr lang="zh-CN" altLang="en-US"/>
           </a:p>
           <a:p>
             <a:pPr lvl="2"/>
@@ -714,7 +721,6 @@
               <a:rPr lang="zh-CN" altLang="en-US"/>
               <a:t>第三级</a:t>
             </a:r>
-            <a:endParaRPr lang="zh-CN" altLang="en-US"/>
           </a:p>
           <a:p>
             <a:pPr lvl="3"/>
@@ -722,7 +728,6 @@
               <a:rPr lang="zh-CN" altLang="en-US"/>
               <a:t>第四级</a:t>
             </a:r>
-            <a:endParaRPr lang="zh-CN" altLang="en-US"/>
           </a:p>
           <a:p>
             <a:pPr lvl="4"/>
@@ -730,7 +735,6 @@
               <a:rPr lang="zh-CN" altLang="en-US"/>
               <a:t>第五级</a:t>
             </a:r>
-            <a:endParaRPr lang="zh-CN" altLang="en-US"/>
           </a:p>
         </p:txBody>
       </p:sp>
@@ -783,7 +787,6 @@
               <a:rPr lang="zh-CN" altLang="en-US"/>
               <a:t>单击此处编辑母版标题样式</a:t>
             </a:r>
-            <a:endParaRPr lang="zh-CN" altLang="en-US"/>
           </a:p>
         </p:txBody>
       </p:sp>
@@ -812,7 +815,6 @@
               <a:rPr lang="zh-CN" altLang="en-US"/>
               <a:t>编辑母版文本样式</a:t>
             </a:r>
-            <a:endParaRPr lang="zh-CN" altLang="en-US"/>
           </a:p>
           <a:p>
             <a:pPr lvl="1"/>
@@ -820,7 +822,6 @@
               <a:rPr lang="zh-CN" altLang="en-US"/>
               <a:t>第二级</a:t>
             </a:r>
-            <a:endParaRPr lang="zh-CN" altLang="en-US"/>
           </a:p>
           <a:p>
             <a:pPr lvl="2"/>
@@ -828,7 +829,6 @@
               <a:rPr lang="zh-CN" altLang="en-US"/>
               <a:t>第三级</a:t>
             </a:r>
-            <a:endParaRPr lang="zh-CN" altLang="en-US"/>
           </a:p>
           <a:p>
             <a:pPr lvl="3"/>
@@ -836,7 +836,6 @@
               <a:rPr lang="zh-CN" altLang="en-US"/>
               <a:t>第四级</a:t>
             </a:r>
-            <a:endParaRPr lang="zh-CN" altLang="en-US"/>
           </a:p>
           <a:p>
             <a:pPr lvl="4"/>
@@ -844,7 +843,6 @@
               <a:rPr lang="zh-CN" altLang="en-US"/>
               <a:t>第五级</a:t>
             </a:r>
-            <a:endParaRPr lang="zh-CN" altLang="en-US"/>
           </a:p>
         </p:txBody>
       </p:sp>
@@ -892,7 +890,6 @@
               <a:rPr lang="zh-CN" altLang="en-US"/>
               <a:t>单击此处编辑母版标题样式</a:t>
             </a:r>
-            <a:endParaRPr lang="zh-CN" altLang="en-US"/>
           </a:p>
         </p:txBody>
       </p:sp>
@@ -916,7 +913,6 @@
               <a:rPr lang="zh-CN" altLang="en-US"/>
               <a:t>编辑母版文本样式</a:t>
             </a:r>
-            <a:endParaRPr lang="zh-CN" altLang="en-US"/>
           </a:p>
           <a:p>
             <a:pPr lvl="1"/>
@@ -924,7 +920,6 @@
               <a:rPr lang="zh-CN" altLang="en-US"/>
               <a:t>第二级</a:t>
             </a:r>
-            <a:endParaRPr lang="zh-CN" altLang="en-US"/>
           </a:p>
           <a:p>
             <a:pPr lvl="2"/>
@@ -932,7 +927,6 @@
               <a:rPr lang="zh-CN" altLang="en-US"/>
               <a:t>第三级</a:t>
             </a:r>
-            <a:endParaRPr lang="zh-CN" altLang="en-US"/>
           </a:p>
           <a:p>
             <a:pPr lvl="3"/>
@@ -940,7 +934,6 @@
               <a:rPr lang="zh-CN" altLang="en-US"/>
               <a:t>第四级</a:t>
             </a:r>
-            <a:endParaRPr lang="zh-CN" altLang="en-US"/>
           </a:p>
           <a:p>
             <a:pPr lvl="4"/>
@@ -948,7 +941,6 @@
               <a:rPr lang="zh-CN" altLang="en-US"/>
               <a:t>第五级</a:t>
             </a:r>
-            <a:endParaRPr lang="zh-CN" altLang="en-US"/>
           </a:p>
         </p:txBody>
       </p:sp>
@@ -1005,7 +997,6 @@
               <a:rPr lang="zh-CN" altLang="en-US"/>
               <a:t>单击此处编辑母版标题样式</a:t>
             </a:r>
-            <a:endParaRPr lang="zh-CN" altLang="en-US"/>
           </a:p>
         </p:txBody>
       </p:sp>
@@ -1125,7 +1116,6 @@
               <a:rPr lang="zh-CN" altLang="en-US"/>
               <a:t>编辑母版文本样式</a:t>
             </a:r>
-            <a:endParaRPr lang="zh-CN" altLang="en-US"/>
           </a:p>
         </p:txBody>
       </p:sp>
@@ -1173,7 +1163,6 @@
               <a:rPr lang="zh-CN" altLang="en-US"/>
               <a:t>单击此处编辑母版标题样式</a:t>
             </a:r>
-            <a:endParaRPr lang="zh-CN" altLang="en-US"/>
           </a:p>
         </p:txBody>
       </p:sp>
@@ -1202,7 +1191,6 @@
               <a:rPr lang="zh-CN" altLang="en-US"/>
               <a:t>编辑母版文本样式</a:t>
             </a:r>
-            <a:endParaRPr lang="zh-CN" altLang="en-US"/>
           </a:p>
           <a:p>
             <a:pPr lvl="1"/>
@@ -1210,7 +1198,6 @@
               <a:rPr lang="zh-CN" altLang="en-US"/>
               <a:t>第二级</a:t>
             </a:r>
-            <a:endParaRPr lang="zh-CN" altLang="en-US"/>
           </a:p>
           <a:p>
             <a:pPr lvl="2"/>
@@ -1218,7 +1205,6 @@
               <a:rPr lang="zh-CN" altLang="en-US"/>
               <a:t>第三级</a:t>
             </a:r>
-            <a:endParaRPr lang="zh-CN" altLang="en-US"/>
           </a:p>
           <a:p>
             <a:pPr lvl="3"/>
@@ -1226,7 +1212,6 @@
               <a:rPr lang="zh-CN" altLang="en-US"/>
               <a:t>第四级</a:t>
             </a:r>
-            <a:endParaRPr lang="zh-CN" altLang="en-US"/>
           </a:p>
           <a:p>
             <a:pPr lvl="4"/>
@@ -1234,7 +1219,6 @@
               <a:rPr lang="zh-CN" altLang="en-US"/>
               <a:t>第五级</a:t>
             </a:r>
-            <a:endParaRPr lang="zh-CN" altLang="en-US"/>
           </a:p>
         </p:txBody>
       </p:sp>
@@ -1263,7 +1247,6 @@
               <a:rPr lang="zh-CN" altLang="en-US"/>
               <a:t>编辑母版文本样式</a:t>
             </a:r>
-            <a:endParaRPr lang="zh-CN" altLang="en-US"/>
           </a:p>
           <a:p>
             <a:pPr lvl="1"/>
@@ -1271,7 +1254,6 @@
               <a:rPr lang="zh-CN" altLang="en-US"/>
               <a:t>第二级</a:t>
             </a:r>
-            <a:endParaRPr lang="zh-CN" altLang="en-US"/>
           </a:p>
           <a:p>
             <a:pPr lvl="2"/>
@@ -1279,7 +1261,6 @@
               <a:rPr lang="zh-CN" altLang="en-US"/>
               <a:t>第三级</a:t>
             </a:r>
-            <a:endParaRPr lang="zh-CN" altLang="en-US"/>
           </a:p>
           <a:p>
             <a:pPr lvl="3"/>
@@ -1287,7 +1268,6 @@
               <a:rPr lang="zh-CN" altLang="en-US"/>
               <a:t>第四级</a:t>
             </a:r>
-            <a:endParaRPr lang="zh-CN" altLang="en-US"/>
           </a:p>
           <a:p>
             <a:pPr lvl="4"/>
@@ -1295,7 +1275,6 @@
               <a:rPr lang="zh-CN" altLang="en-US"/>
               <a:t>第五级</a:t>
             </a:r>
-            <a:endParaRPr lang="zh-CN" altLang="en-US"/>
           </a:p>
         </p:txBody>
       </p:sp>
@@ -1348,7 +1327,6 @@
               <a:rPr lang="zh-CN" altLang="en-US"/>
               <a:t>单击此处编辑母版标题样式</a:t>
             </a:r>
-            <a:endParaRPr lang="zh-CN" altLang="en-US"/>
           </a:p>
         </p:txBody>
       </p:sp>
@@ -1414,7 +1392,6 @@
               <a:rPr lang="zh-CN" altLang="en-US"/>
               <a:t>编辑母版文本样式</a:t>
             </a:r>
-            <a:endParaRPr lang="zh-CN" altLang="en-US"/>
           </a:p>
         </p:txBody>
       </p:sp>
@@ -1443,7 +1420,6 @@
               <a:rPr lang="zh-CN" altLang="en-US"/>
               <a:t>编辑母版文本样式</a:t>
             </a:r>
-            <a:endParaRPr lang="zh-CN" altLang="en-US"/>
           </a:p>
           <a:p>
             <a:pPr lvl="1"/>
@@ -1451,7 +1427,6 @@
               <a:rPr lang="zh-CN" altLang="en-US"/>
               <a:t>第二级</a:t>
             </a:r>
-            <a:endParaRPr lang="zh-CN" altLang="en-US"/>
           </a:p>
           <a:p>
             <a:pPr lvl="2"/>
@@ -1459,7 +1434,6 @@
               <a:rPr lang="zh-CN" altLang="en-US"/>
               <a:t>第三级</a:t>
             </a:r>
-            <a:endParaRPr lang="zh-CN" altLang="en-US"/>
           </a:p>
           <a:p>
             <a:pPr lvl="3"/>
@@ -1467,7 +1441,6 @@
               <a:rPr lang="zh-CN" altLang="en-US"/>
               <a:t>第四级</a:t>
             </a:r>
-            <a:endParaRPr lang="zh-CN" altLang="en-US"/>
           </a:p>
           <a:p>
             <a:pPr lvl="4"/>
@@ -1475,7 +1448,6 @@
               <a:rPr lang="zh-CN" altLang="en-US"/>
               <a:t>第五级</a:t>
             </a:r>
-            <a:endParaRPr lang="zh-CN" altLang="en-US"/>
           </a:p>
         </p:txBody>
       </p:sp>
@@ -1541,7 +1513,6 @@
               <a:rPr lang="zh-CN" altLang="en-US"/>
               <a:t>编辑母版文本样式</a:t>
             </a:r>
-            <a:endParaRPr lang="zh-CN" altLang="en-US"/>
           </a:p>
         </p:txBody>
       </p:sp>
@@ -1570,7 +1541,6 @@
               <a:rPr lang="zh-CN" altLang="en-US"/>
               <a:t>编辑母版文本样式</a:t>
             </a:r>
-            <a:endParaRPr lang="zh-CN" altLang="en-US"/>
           </a:p>
           <a:p>
             <a:pPr lvl="1"/>
@@ -1578,7 +1548,6 @@
               <a:rPr lang="zh-CN" altLang="en-US"/>
               <a:t>第二级</a:t>
             </a:r>
-            <a:endParaRPr lang="zh-CN" altLang="en-US"/>
           </a:p>
           <a:p>
             <a:pPr lvl="2"/>
@@ -1586,7 +1555,6 @@
               <a:rPr lang="zh-CN" altLang="en-US"/>
               <a:t>第三级</a:t>
             </a:r>
-            <a:endParaRPr lang="zh-CN" altLang="en-US"/>
           </a:p>
           <a:p>
             <a:pPr lvl="3"/>
@@ -1594,7 +1562,6 @@
               <a:rPr lang="zh-CN" altLang="en-US"/>
               <a:t>第四级</a:t>
             </a:r>
-            <a:endParaRPr lang="zh-CN" altLang="en-US"/>
           </a:p>
           <a:p>
             <a:pPr lvl="4"/>
@@ -1602,7 +1569,6 @@
               <a:rPr lang="zh-CN" altLang="en-US"/>
               <a:t>第五级</a:t>
             </a:r>
-            <a:endParaRPr lang="zh-CN" altLang="en-US"/>
           </a:p>
         </p:txBody>
       </p:sp>
@@ -1650,7 +1616,6 @@
               <a:rPr lang="zh-CN" altLang="en-US"/>
               <a:t>单击此处编辑母版标题样式</a:t>
             </a:r>
-            <a:endParaRPr lang="zh-CN" altLang="en-US"/>
           </a:p>
         </p:txBody>
       </p:sp>
@@ -1732,7 +1697,6 @@
               <a:rPr lang="zh-CN" altLang="en-US"/>
               <a:t>单击此处编辑母版标题样式</a:t>
             </a:r>
-            <a:endParaRPr lang="zh-CN" altLang="en-US"/>
           </a:p>
         </p:txBody>
       </p:sp>
@@ -1789,7 +1753,6 @@
               <a:rPr lang="zh-CN" altLang="en-US"/>
               <a:t>编辑母版文本样式</a:t>
             </a:r>
-            <a:endParaRPr lang="zh-CN" altLang="en-US"/>
           </a:p>
           <a:p>
             <a:pPr lvl="1"/>
@@ -1797,7 +1760,6 @@
               <a:rPr lang="zh-CN" altLang="en-US"/>
               <a:t>第二级</a:t>
             </a:r>
-            <a:endParaRPr lang="zh-CN" altLang="en-US"/>
           </a:p>
           <a:p>
             <a:pPr lvl="2"/>
@@ -1805,7 +1767,6 @@
               <a:rPr lang="zh-CN" altLang="en-US"/>
               <a:t>第三级</a:t>
             </a:r>
-            <a:endParaRPr lang="zh-CN" altLang="en-US"/>
           </a:p>
           <a:p>
             <a:pPr lvl="3"/>
@@ -1813,7 +1774,6 @@
               <a:rPr lang="zh-CN" altLang="en-US"/>
               <a:t>第四级</a:t>
             </a:r>
-            <a:endParaRPr lang="zh-CN" altLang="en-US"/>
           </a:p>
           <a:p>
             <a:pPr lvl="4"/>
@@ -1821,7 +1781,6 @@
               <a:rPr lang="zh-CN" altLang="en-US"/>
               <a:t>第五级</a:t>
             </a:r>
-            <a:endParaRPr lang="zh-CN" altLang="en-US"/>
           </a:p>
         </p:txBody>
       </p:sp>
@@ -1887,7 +1846,6 @@
               <a:rPr lang="zh-CN" altLang="en-US"/>
               <a:t>编辑母版文本样式</a:t>
             </a:r>
-            <a:endParaRPr lang="zh-CN" altLang="en-US"/>
           </a:p>
         </p:txBody>
       </p:sp>
@@ -1944,7 +1902,6 @@
               <a:rPr lang="zh-CN" altLang="en-US"/>
               <a:t>单击此处编辑母版标题样式</a:t>
             </a:r>
-            <a:endParaRPr lang="zh-CN" altLang="en-US"/>
           </a:p>
         </p:txBody>
       </p:sp>
@@ -2009,7 +1966,6 @@
               <a:rPr lang="zh-CN" altLang="en-US"/>
               <a:t>单击图标添加图片</a:t>
             </a:r>
-            <a:endParaRPr lang="zh-CN" altLang="en-US"/>
           </a:p>
         </p:txBody>
       </p:sp>
@@ -2075,7 +2031,6 @@
               <a:rPr lang="zh-CN" altLang="en-US"/>
               <a:t>编辑母版文本样式</a:t>
             </a:r>
-            <a:endParaRPr lang="zh-CN" altLang="en-US"/>
           </a:p>
         </p:txBody>
       </p:sp>
@@ -2138,7 +2093,6 @@
               <a:rPr lang="zh-CN" altLang="en-US"/>
               <a:t>单击此处编辑母版标题样式</a:t>
             </a:r>
-            <a:endParaRPr lang="zh-CN" altLang="en-US"/>
           </a:p>
         </p:txBody>
       </p:sp>
@@ -2172,7 +2126,6 @@
               <a:rPr lang="zh-CN" altLang="en-US" dirty="0"/>
               <a:t>编辑母版文本样式</a:t>
             </a:r>
-            <a:endParaRPr lang="zh-CN" altLang="en-US" dirty="0"/>
           </a:p>
           <a:p>
             <a:pPr lvl="1"/>
@@ -2180,7 +2133,6 @@
               <a:rPr lang="zh-CN" altLang="en-US" dirty="0"/>
               <a:t>第二级</a:t>
             </a:r>
-            <a:endParaRPr lang="zh-CN" altLang="en-US" dirty="0"/>
           </a:p>
           <a:p>
             <a:pPr lvl="2"/>
@@ -2188,7 +2140,6 @@
               <a:rPr lang="zh-CN" altLang="en-US" dirty="0"/>
               <a:t>第三级</a:t>
             </a:r>
-            <a:endParaRPr lang="zh-CN" altLang="en-US" dirty="0"/>
           </a:p>
           <a:p>
             <a:pPr lvl="3"/>
@@ -2196,7 +2147,6 @@
               <a:rPr lang="zh-CN" altLang="en-US" dirty="0"/>
               <a:t>第四级</a:t>
             </a:r>
-            <a:endParaRPr lang="zh-CN" altLang="en-US" dirty="0"/>
           </a:p>
           <a:p>
             <a:pPr lvl="4"/>
@@ -2204,7 +2154,6 @@
               <a:rPr lang="zh-CN" altLang="en-US" dirty="0"/>
               <a:t>第五级</a:t>
             </a:r>
-            <a:endParaRPr lang="zh-CN" altLang="en-US" dirty="0"/>
           </a:p>
         </p:txBody>
       </p:sp>
@@ -2547,8 +2496,8 @@
           </p:nvSpPr>
           <p:spPr>
             <a:xfrm>
-              <a:off x="1994124" y="1811356"/>
-              <a:ext cx="1992353" cy="461680"/>
+              <a:off x="1994124" y="1811355"/>
+              <a:ext cx="1992353" cy="626555"/>
             </a:xfrm>
             <a:prstGeom prst="rect">
               <a:avLst/>
@@ -2604,11 +2553,6 @@
                 </a:rPr>
                 <a:t>ID</a:t>
               </a:r>
-              <a:endParaRPr lang="en-US" altLang="zh-CN" sz="1200" dirty="0">
-                <a:solidFill>
-                  <a:schemeClr val="tx1"/>
-                </a:solidFill>
-              </a:endParaRPr>
             </a:p>
             <a:p>
               <a:r>
@@ -2635,11 +2579,40 @@
                 </a:rPr>
                 <a:t>String</a:t>
               </a:r>
-              <a:endParaRPr lang="en-US" sz="1200" dirty="0">
-                <a:solidFill>
-                  <a:schemeClr val="tx1"/>
-                </a:solidFill>
-              </a:endParaRPr>
+            </a:p>
+            <a:p>
+              <a:r>
+                <a:rPr lang="en-US" altLang="zh-CN" sz="1200" dirty="0" err="1">
+                  <a:solidFill>
+                    <a:schemeClr val="tx1"/>
+                  </a:solidFill>
+                </a:rPr>
+                <a:t>isBlocked</a:t>
+              </a:r>
+              <a:r>
+                <a:rPr lang="en-US" altLang="zh-CN" sz="1200" dirty="0">
+                  <a:solidFill>
+                    <a:schemeClr val="tx1"/>
+                  </a:solidFill>
+                </a:rPr>
+                <a:t>:</a:t>
+              </a:r>
+              <a:r>
+                <a:rPr lang="zh-CN" altLang="en-US" sz="1200" dirty="0">
+                  <a:solidFill>
+                    <a:schemeClr val="tx1"/>
+                  </a:solidFill>
+                </a:rPr>
+                <a:t> </a:t>
+              </a:r>
+              <a:r>
+                <a:rPr lang="en-US" altLang="zh-CN" sz="1200" dirty="0">
+                  <a:solidFill>
+                    <a:schemeClr val="tx1"/>
+                  </a:solidFill>
+                </a:rPr>
+                <a:t>Boolean</a:t>
+              </a:r>
             </a:p>
           </p:txBody>
         </p:sp>
@@ -2714,8 +2687,8 @@
           </p:nvSpPr>
           <p:spPr>
             <a:xfrm>
-              <a:off x="1994124" y="3981031"/>
-              <a:ext cx="1992353" cy="502398"/>
+              <a:off x="1994124" y="3981030"/>
+              <a:ext cx="1992353" cy="694031"/>
             </a:xfrm>
             <a:prstGeom prst="rect">
               <a:avLst/>
@@ -2771,11 +2744,6 @@
                 </a:rPr>
                 <a:t>ID</a:t>
               </a:r>
-              <a:endParaRPr lang="en-US" altLang="zh-CN" sz="1200" dirty="0">
-                <a:solidFill>
-                  <a:schemeClr val="tx1"/>
-                </a:solidFill>
-              </a:endParaRPr>
             </a:p>
             <a:p>
               <a:r>
@@ -2802,11 +2770,40 @@
                 </a:rPr>
                 <a:t>String</a:t>
               </a:r>
-              <a:endParaRPr lang="en-US" altLang="zh-CN" sz="1200" dirty="0">
-                <a:solidFill>
-                  <a:schemeClr val="tx1"/>
-                </a:solidFill>
-              </a:endParaRPr>
+            </a:p>
+            <a:p>
+              <a:r>
+                <a:rPr lang="en-US" altLang="zh-CN" sz="1200" dirty="0" err="1">
+                  <a:solidFill>
+                    <a:schemeClr val="tx1"/>
+                  </a:solidFill>
+                </a:rPr>
+                <a:t>isBlocked</a:t>
+              </a:r>
+              <a:r>
+                <a:rPr lang="en-US" altLang="zh-CN" sz="1200" dirty="0">
+                  <a:solidFill>
+                    <a:schemeClr val="tx1"/>
+                  </a:solidFill>
+                </a:rPr>
+                <a:t>:</a:t>
+              </a:r>
+              <a:r>
+                <a:rPr lang="zh-CN" altLang="en-US" sz="1200" dirty="0">
+                  <a:solidFill>
+                    <a:schemeClr val="tx1"/>
+                  </a:solidFill>
+                </a:rPr>
+                <a:t> </a:t>
+              </a:r>
+              <a:r>
+                <a:rPr lang="en-US" altLang="zh-CN" sz="1200" dirty="0">
+                  <a:solidFill>
+                    <a:schemeClr val="tx1"/>
+                  </a:solidFill>
+                </a:rPr>
+                <a:t>Boolean</a:t>
+              </a:r>
             </a:p>
           </p:txBody>
         </p:sp>
@@ -2937,6 +2934,48 @@
                 </a:rPr>
                 <a:t>ID</a:t>
               </a:r>
+            </a:p>
+            <a:p>
+              <a:r>
+                <a:rPr lang="en-US" sz="1200" dirty="0" err="1">
+                  <a:solidFill>
+                    <a:schemeClr val="tx1"/>
+                  </a:solidFill>
+                </a:rPr>
+                <a:t>cr</a:t>
+              </a:r>
+              <a:r>
+                <a:rPr lang="en-US" altLang="zh-CN" sz="1200" dirty="0" err="1">
+                  <a:solidFill>
+                    <a:schemeClr val="tx1"/>
+                  </a:solidFill>
+                </a:rPr>
+                <a:t>eateTime</a:t>
+              </a:r>
+              <a:r>
+                <a:rPr lang="en-US" altLang="zh-CN" sz="1200" dirty="0">
+                  <a:solidFill>
+                    <a:schemeClr val="tx1"/>
+                  </a:solidFill>
+                </a:rPr>
+                <a:t>:</a:t>
+              </a:r>
+              <a:r>
+                <a:rPr lang="zh-CN" altLang="en-US" sz="1200" dirty="0">
+                  <a:solidFill>
+                    <a:schemeClr val="tx1"/>
+                  </a:solidFill>
+                </a:rPr>
+                <a:t> </a:t>
+              </a:r>
+              <a:r>
+                <a:rPr lang="en-US" altLang="zh-CN" sz="1200" dirty="0" err="1">
+                  <a:solidFill>
+                    <a:schemeClr val="tx1"/>
+                  </a:solidFill>
+                </a:rPr>
+                <a:t>DateTime</a:t>
+              </a:r>
               <a:endParaRPr lang="en-US" altLang="zh-CN" sz="1200" dirty="0">
                 <a:solidFill>
                   <a:schemeClr val="tx1"/>
@@ -2945,20 +2984,12 @@
             </a:p>
             <a:p>
               <a:r>
-                <a:rPr lang="en-US" sz="1200" dirty="0" err="1">
-                  <a:solidFill>
-                    <a:schemeClr val="tx1"/>
-                  </a:solidFill>
-                </a:rPr>
-                <a:t>cr</a:t>
-              </a:r>
-              <a:r>
                 <a:rPr lang="en-US" altLang="zh-CN" sz="1200" dirty="0" err="1">
                   <a:solidFill>
                     <a:schemeClr val="tx1"/>
                   </a:solidFill>
                 </a:rPr>
-                <a:t>eateTime</a:t>
+                <a:t>isBlocked</a:t>
               </a:r>
               <a:r>
                 <a:rPr lang="en-US" altLang="zh-CN" sz="1200" dirty="0">
@@ -2977,45 +3008,6 @@
                 <a:t> </a:t>
               </a:r>
               <a:r>
-                <a:rPr lang="en-US" altLang="zh-CN" sz="1200" dirty="0" err="1">
-                  <a:solidFill>
-                    <a:schemeClr val="tx1"/>
-                  </a:solidFill>
-                </a:rPr>
-                <a:t>DateTime</a:t>
-              </a:r>
-              <a:endParaRPr lang="en-US" altLang="zh-CN" sz="1200" dirty="0">
-                <a:solidFill>
-                  <a:schemeClr val="tx1"/>
-                </a:solidFill>
-              </a:endParaRPr>
-            </a:p>
-            <a:p>
-              <a:r>
-                <a:rPr lang="en-US" altLang="zh-CN" sz="1200" dirty="0" err="1">
-                  <a:solidFill>
-                    <a:schemeClr val="tx1"/>
-                  </a:solidFill>
-                </a:rPr>
-                <a:t>isBlocked</a:t>
-              </a:r>
-              <a:r>
-                <a:rPr lang="en-US" altLang="zh-CN" sz="1200" dirty="0">
-                  <a:solidFill>
-                    <a:schemeClr val="tx1"/>
-                  </a:solidFill>
-                </a:rPr>
-                <a:t>:</a:t>
-              </a:r>
-              <a:r>
-                <a:rPr lang="zh-CN" altLang="en-US" sz="1200" dirty="0">
-                  <a:solidFill>
-                    <a:schemeClr val="tx1"/>
-                  </a:solidFill>
-                </a:rPr>
-                <a:t> </a:t>
-              </a:r>
-              <a:r>
                 <a:rPr lang="en-US" altLang="zh-CN" sz="1200" dirty="0">
                   <a:solidFill>
                     <a:schemeClr val="tx1"/>
@@ -3023,11 +3015,6 @@
                 </a:rPr>
                 <a:t>Boolean</a:t>
               </a:r>
-              <a:endParaRPr lang="en-US" altLang="zh-CN" sz="1200" dirty="0">
-                <a:solidFill>
-                  <a:schemeClr val="tx1"/>
-                </a:solidFill>
-              </a:endParaRPr>
             </a:p>
             <a:p>
               <a:r>
@@ -3220,11 +3207,6 @@
                   </a:rPr>
                   <a:t>ID</a:t>
                 </a:r>
-                <a:endParaRPr lang="en-US" altLang="zh-CN" sz="1200" dirty="0">
-                  <a:solidFill>
-                    <a:schemeClr val="tx1"/>
-                  </a:solidFill>
-                </a:endParaRPr>
               </a:p>
               <a:p>
                 <a:r>
@@ -3251,11 +3233,6 @@
                   </a:rPr>
                   <a:t>String</a:t>
                 </a:r>
-                <a:endParaRPr lang="en-US" altLang="zh-CN" sz="1200" dirty="0">
-                  <a:solidFill>
-                    <a:schemeClr val="tx1"/>
-                  </a:solidFill>
-                </a:endParaRPr>
               </a:p>
               <a:p>
                 <a:r>
@@ -3451,6 +3428,7 @@
           <p:nvCxnSpPr>
             <p:cNvPr id="28" name="Straight Arrow Connector 27"/>
             <p:cNvCxnSpPr>
+              <a:cxnSpLocks/>
               <a:stCxn id="9" idx="2"/>
               <a:endCxn id="13" idx="0"/>
             </p:cNvCxnSpPr>
@@ -3458,8 +3436,8 @@
           </p:nvCxnSpPr>
           <p:spPr>
             <a:xfrm>
-              <a:off x="2990301" y="2273036"/>
-              <a:ext cx="0" cy="1318756"/>
+              <a:off x="2990301" y="2437910"/>
+              <a:ext cx="0" cy="1153882"/>
             </a:xfrm>
             <a:prstGeom prst="straightConnector1">
               <a:avLst/>
@@ -3667,11 +3645,6 @@
                   </a:rPr>
                   <a:t>ID</a:t>
                 </a:r>
-                <a:endParaRPr lang="en-US" altLang="zh-CN" sz="1200" dirty="0">
-                  <a:solidFill>
-                    <a:schemeClr val="tx1"/>
-                  </a:solidFill>
-                </a:endParaRPr>
               </a:p>
               <a:p>
                 <a:r>
@@ -3722,11 +3695,6 @@
                   </a:rPr>
                   <a:t>Integer</a:t>
                 </a:r>
-                <a:endParaRPr lang="en-US" altLang="zh-CN" sz="1200" dirty="0">
-                  <a:solidFill>
-                    <a:schemeClr val="tx1"/>
-                  </a:solidFill>
-                </a:endParaRPr>
               </a:p>
               <a:p>
                 <a:r>
@@ -4071,7 +4039,6 @@
                 <a:rPr lang="en-US" altLang="zh-CN" sz="1200" dirty="0"/>
                 <a:t>invest</a:t>
               </a:r>
-              <a:endParaRPr lang="en-US" altLang="zh-CN" sz="1200" dirty="0"/>
             </a:p>
           </p:txBody>
         </p:sp>
@@ -4213,7 +4180,6 @@
                 <a:rPr lang="en-US" altLang="zh-CN" sz="1200" dirty="0"/>
                 <a:t>transfer</a:t>
               </a:r>
-              <a:endParaRPr lang="en-US" altLang="zh-CN" sz="1200" dirty="0"/>
             </a:p>
           </p:txBody>
         </p:sp>
@@ -4221,20 +4187,21 @@
           <p:nvCxnSpPr>
             <p:cNvPr id="84" name="Elbow Connector 83"/>
             <p:cNvCxnSpPr>
-              <a:stCxn id="88" idx="4"/>
+              <a:cxnSpLocks/>
+              <a:stCxn id="12" idx="2"/>
               <a:endCxn id="12" idx="3"/>
             </p:cNvCxnSpPr>
             <p:nvPr/>
           </p:nvCxnSpPr>
           <p:spPr>
             <a:xfrm rot="5400000" flipH="1" flipV="1">
-              <a:off x="3592521" y="4100996"/>
-              <a:ext cx="262722" cy="525189"/>
+              <a:off x="3314881" y="4003466"/>
+              <a:ext cx="347015" cy="996176"/>
             </a:xfrm>
             <a:prstGeom prst="bentConnector4">
               <a:avLst>
-                <a:gd name="adj1" fmla="val -87012"/>
-                <a:gd name="adj2" fmla="val 143527"/>
+                <a:gd name="adj1" fmla="val -65876"/>
+                <a:gd name="adj2" fmla="val 122948"/>
               </a:avLst>
             </a:prstGeom>
             <a:ln w="19050">
@@ -4268,7 +4235,7 @@
           </p:nvSpPr>
           <p:spPr>
             <a:xfrm>
-              <a:off x="3452288" y="4722279"/>
+              <a:off x="3187561" y="4650497"/>
               <a:ext cx="764322" cy="276999"/>
             </a:xfrm>
             <a:prstGeom prst="rect">
@@ -4287,7 +4254,6 @@
                 <a:rPr lang="en-US" altLang="zh-CN" sz="1200" dirty="0"/>
                 <a:t>invest</a:t>
               </a:r>
-              <a:endParaRPr lang="en-US" altLang="zh-CN" sz="1200" dirty="0"/>
             </a:p>
           </p:txBody>
         </p:sp>
@@ -4317,7 +4283,6 @@
                 <a:rPr lang="en-US" altLang="zh-CN" sz="1200" dirty="0"/>
                 <a:t>own</a:t>
               </a:r>
-              <a:endParaRPr lang="en-US" altLang="zh-CN" sz="1200" dirty="0"/>
             </a:p>
           </p:txBody>
         </p:sp>
@@ -4399,20 +4364,21 @@
           <p:nvCxnSpPr>
             <p:cNvPr id="52" name="Elbow Connector 51"/>
             <p:cNvCxnSpPr>
-              <a:stCxn id="91" idx="4"/>
+              <a:cxnSpLocks/>
+              <a:stCxn id="9" idx="2"/>
               <a:endCxn id="9" idx="3"/>
             </p:cNvCxnSpPr>
             <p:nvPr/>
           </p:nvCxnSpPr>
           <p:spPr>
             <a:xfrm rot="5400000" flipH="1" flipV="1">
-              <a:off x="3601116" y="1902367"/>
-              <a:ext cx="245532" cy="525189"/>
+              <a:off x="3331750" y="1783184"/>
+              <a:ext cx="313277" cy="996176"/>
             </a:xfrm>
             <a:prstGeom prst="bentConnector4">
               <a:avLst>
-                <a:gd name="adj1" fmla="val -93104"/>
-                <a:gd name="adj2" fmla="val 143527"/>
+                <a:gd name="adj1" fmla="val -72971"/>
+                <a:gd name="adj2" fmla="val 122948"/>
               </a:avLst>
             </a:prstGeom>
             <a:ln w="19050">
@@ -4446,7 +4412,7 @@
           </p:nvSpPr>
           <p:spPr>
             <a:xfrm>
-              <a:off x="3360285" y="2524463"/>
+              <a:off x="3194536" y="2669914"/>
               <a:ext cx="856325" cy="276999"/>
             </a:xfrm>
             <a:prstGeom prst="rect">
@@ -4464,20 +4430,21 @@
                 <a:rPr lang="en-US" altLang="zh-CN" sz="1200" dirty="0"/>
                 <a:t>guarantee</a:t>
               </a:r>
-              <a:endParaRPr lang="en-US" altLang="zh-CN" sz="1200" dirty="0"/>
             </a:p>
           </p:txBody>
         </p:sp>
         <p:cxnSp>
           <p:nvCxnSpPr>
             <p:cNvPr id="59" name="Straight Arrow Connector 58"/>
-            <p:cNvCxnSpPr/>
+            <p:cNvCxnSpPr>
+              <a:cxnSpLocks/>
+            </p:cNvCxnSpPr>
             <p:nvPr/>
           </p:nvCxnSpPr>
           <p:spPr>
             <a:xfrm>
-              <a:off x="2380255" y="2273036"/>
-              <a:ext cx="0" cy="1318756"/>
+              <a:off x="2380255" y="2437910"/>
+              <a:ext cx="0" cy="1153882"/>
             </a:xfrm>
             <a:prstGeom prst="straightConnector1">
               <a:avLst/>
@@ -4539,20 +4506,21 @@
           <p:nvCxnSpPr>
             <p:cNvPr id="50" name="Elbow Connector 49"/>
             <p:cNvCxnSpPr>
-              <a:stCxn id="85" idx="4"/>
+              <a:cxnSpLocks/>
+              <a:stCxn id="12" idx="2"/>
               <a:endCxn id="12" idx="1"/>
             </p:cNvCxnSpPr>
             <p:nvPr/>
           </p:nvCxnSpPr>
           <p:spPr>
             <a:xfrm rot="5400000" flipH="1">
-              <a:off x="2093604" y="4132750"/>
-              <a:ext cx="261263" cy="460224"/>
+              <a:off x="2318705" y="4003466"/>
+              <a:ext cx="347015" cy="996177"/>
             </a:xfrm>
             <a:prstGeom prst="bentConnector4">
               <a:avLst>
-                <a:gd name="adj1" fmla="val -87498"/>
-                <a:gd name="adj2" fmla="val 183447"/>
+                <a:gd name="adj1" fmla="val -65876"/>
+                <a:gd name="adj2" fmla="val 122948"/>
               </a:avLst>
             </a:prstGeom>
             <a:ln w="19050">
@@ -4586,7 +4554,7 @@
           </p:nvSpPr>
           <p:spPr>
             <a:xfrm>
-              <a:off x="1584924" y="4722279"/>
+              <a:off x="1929021" y="4640877"/>
               <a:ext cx="856325" cy="276999"/>
             </a:xfrm>
             <a:prstGeom prst="rect">
@@ -4604,7 +4572,6 @@
                 <a:rPr lang="en-US" altLang="zh-CN" sz="1200" dirty="0"/>
                 <a:t>guarantee</a:t>
               </a:r>
-              <a:endParaRPr lang="en-US" altLang="zh-CN" sz="1200" dirty="0"/>
             </a:p>
           </p:txBody>
         </p:sp>
@@ -5609,11 +5576,6 @@
                 </a:rPr>
                 <a:t>ID</a:t>
               </a:r>
-              <a:endParaRPr lang="en-US" altLang="zh-CN" sz="1200" dirty="0">
-                <a:solidFill>
-                  <a:schemeClr val="tx1"/>
-                </a:solidFill>
-              </a:endParaRPr>
             </a:p>
             <a:p>
               <a:r>
@@ -5624,11 +5586,6 @@
                 </a:rPr>
                 <a:t>name: String</a:t>
               </a:r>
-              <a:endParaRPr lang="en-US" altLang="zh-CN" sz="1200" dirty="0">
-                <a:solidFill>
-                  <a:schemeClr val="tx1"/>
-                </a:solidFill>
-              </a:endParaRPr>
             </a:p>
             <a:p>
               <a:r>
@@ -5675,12 +5632,6 @@
                 </a:rPr>
                 <a:t>Integer</a:t>
               </a:r>
-              <a:endParaRPr lang="en-US" altLang="zh-CN" sz="1200" dirty="0">
-                <a:solidFill>
-                  <a:schemeClr val="tx1"/>
-                </a:solidFill>
-                <a:sym typeface="+mn-ea"/>
-              </a:endParaRPr>
             </a:p>
             <a:p>
               <a:r>
@@ -5727,12 +5678,6 @@
                 </a:rPr>
                 <a:t>Integer</a:t>
               </a:r>
-              <a:endParaRPr lang="en-US" altLang="zh-CN" sz="1200" dirty="0">
-                <a:solidFill>
-                  <a:schemeClr val="tx1"/>
-                </a:solidFill>
-                <a:sym typeface="+mn-ea"/>
-              </a:endParaRPr>
             </a:p>
             <a:p>
               <a:r>
@@ -5743,11 +5688,6 @@
                 </a:rPr>
                 <a:t>transHistory: [64-bit Integer]</a:t>
               </a:r>
-              <a:endParaRPr lang="en-US" sz="1200" dirty="0">
-                <a:solidFill>
-                  <a:schemeClr val="tx1"/>
-                </a:solidFill>
-              </a:endParaRPr>
             </a:p>
             <a:p>
               <a:r>
@@ -5758,11 +5698,6 @@
                 </a:rPr>
                 <a:t>versionHistory: [64-bit Integer]</a:t>
               </a:r>
-              <a:endParaRPr lang="en-US" sz="1200" dirty="0">
-                <a:solidFill>
-                  <a:schemeClr val="tx1"/>
-                </a:solidFill>
-              </a:endParaRPr>
             </a:p>
           </p:txBody>
         </p:sp>
@@ -5899,7 +5834,6 @@
                 <a:rPr lang="en-US" altLang="zh-CN" sz="1200" dirty="0"/>
                 <a:t>transfer{amount: 64-bit Integer, versionHistory: [64-bit Integer]}</a:t>
               </a:r>
-              <a:endParaRPr lang="en-US" altLang="zh-CN" sz="1200" dirty="0"/>
             </a:p>
           </p:txBody>
         </p:sp>
@@ -6778,6 +6712,8 @@
       </a:bgFillStyleLst>
     </a:fmtScheme>
   </a:themeElements>
+  <a:objectDefaults/>
+  <a:extraClrSchemeLst/>
   <a:extLst>
     <a:ext uri="{05A4C25C-085E-4340-85A3-A5531E510DB2}">
       <thm15:themeFamily xmlns:thm15="http://schemas.microsoft.com/office/thememl/2012/main" name="Office Theme" id="{62F939B6-93AF-4DB8-9C6B-D6C7DFDC589F}" vid="{4A3C46E8-61CC-4603-A589-7422A47A8E4A}"/>
@@ -7037,6 +6973,8 @@
       </a:bgFillStyleLst>
     </a:fmtScheme>
   </a:themeElements>
+  <a:objectDefaults/>
+  <a:extraClrSchemeLst/>
   <a:extLst>
     <a:ext uri="{05A4C25C-085E-4340-85A3-A5531E510DB2}">
       <thm15:themeFamily xmlns:thm15="http://schemas.microsoft.com/office/thememl/2012/main" name="Office Theme" id="{62F939B6-93AF-4DB8-9C6B-D6C7DFDC589F}" vid="{4A3C46E8-61CC-4603-A589-7422A47A8E4A}"/>

</xml_diff>

<commit_message>
fix other issues in #67
</commit_message>
<xml_diff>
--- a/figures/schema.pptx
+++ b/figures/schema.pptx
@@ -210,7 +210,7 @@
           <a:p>
             <a:fld id="{CAD4BD24-A097-4F9D-85E9-6A2A24CA2D98}" type="datetimeFigureOut">
               <a:rPr lang="zh-CN" altLang="en-US" smtClean="0"/>
-              <a:t>2023/2/28</a:t>
+              <a:t>2023/5/4</a:t>
             </a:fld>
             <a:endParaRPr lang="zh-CN" altLang="en-US"/>
           </a:p>
@@ -3215,7 +3215,7 @@
                       <a:schemeClr val="tx1"/>
                     </a:solidFill>
                   </a:rPr>
-                  <a:t>name:</a:t>
+                  <a:t>type:</a:t>
                 </a:r>
                 <a:r>
                   <a:rPr lang="zh-CN" altLang="en-US" sz="1200" dirty="0">

</xml_diff>

<commit_message>
fix other issues in #67 (#73)
</commit_message>
<xml_diff>
--- a/figures/schema.pptx
+++ b/figures/schema.pptx
@@ -210,7 +210,7 @@
           <a:p>
             <a:fld id="{CAD4BD24-A097-4F9D-85E9-6A2A24CA2D98}" type="datetimeFigureOut">
               <a:rPr lang="zh-CN" altLang="en-US" smtClean="0"/>
-              <a:t>2023/2/28</a:t>
+              <a:t>2023/5/4</a:t>
             </a:fld>
             <a:endParaRPr lang="zh-CN" altLang="en-US"/>
           </a:p>
@@ -3215,7 +3215,7 @@
                       <a:schemeClr val="tx1"/>
                     </a:solidFill>
                   </a:rPr>
-                  <a:t>name:</a:t>
+                  <a:t>type:</a:t>
                 </a:r>
                 <a:r>
                   <a:rPr lang="zh-CN" altLang="en-US" sz="1200" dirty="0">

</xml_diff>

<commit_message>
update pattern and schema line
</commit_message>
<xml_diff>
--- a/figures/schema.pptx
+++ b/figures/schema.pptx
@@ -8,12 +8,15 @@
     <p:notesMasterId r:id="rId5"/>
   </p:notesMasterIdLst>
   <p:sldIdLst>
-    <p:sldId id="415" r:id="rId2"/>
-    <p:sldId id="417" r:id="rId3"/>
-    <p:sldId id="416" r:id="rId4"/>
+    <p:sldId id="415" r:id="rId3"/>
+    <p:sldId id="417" r:id="rId4"/>
+    <p:sldId id="416" r:id="rId6"/>
   </p:sldIdLst>
   <p:sldSz cx="12192000" cy="6858000"/>
   <p:notesSz cx="6858000" cy="9144000"/>
+  <p:custDataLst>
+    <p:tags r:id="rId10"/>
+  </p:custDataLst>
   <p:defaultTextStyle>
     <a:defPPr>
       <a:defRPr lang="zh-CN"/>
@@ -121,9 +124,6 @@
         </p14:section>
       </p14:sectionLst>
     </p:ext>
-    <p:ext uri="{EFAFB233-063F-42B5-8137-9DF3F51BA10A}">
-      <p15:sldGuideLst xmlns:p15="http://schemas.microsoft.com/office/powerpoint/2012/main"/>
-    </p:ext>
   </p:extLst>
 </p:presentation>
 </file>
@@ -210,7 +210,6 @@
           <a:p>
             <a:fld id="{CAD4BD24-A097-4F9D-85E9-6A2A24CA2D98}" type="datetimeFigureOut">
               <a:rPr lang="zh-CN" altLang="en-US" smtClean="0"/>
-              <a:t>2023/5/4</a:t>
             </a:fld>
             <a:endParaRPr lang="zh-CN" altLang="en-US"/>
           </a:p>
@@ -277,6 +276,7 @@
               <a:rPr lang="zh-CN" altLang="en-US"/>
               <a:t>单击此处编辑母版文本样式</a:t>
             </a:r>
+            <a:endParaRPr lang="zh-CN" altLang="en-US"/>
           </a:p>
           <a:p>
             <a:pPr lvl="1"/>
@@ -284,6 +284,7 @@
               <a:rPr lang="zh-CN" altLang="en-US"/>
               <a:t>第二级</a:t>
             </a:r>
+            <a:endParaRPr lang="zh-CN" altLang="en-US"/>
           </a:p>
           <a:p>
             <a:pPr lvl="2"/>
@@ -291,6 +292,7 @@
               <a:rPr lang="zh-CN" altLang="en-US"/>
               <a:t>第三级</a:t>
             </a:r>
+            <a:endParaRPr lang="zh-CN" altLang="en-US"/>
           </a:p>
           <a:p>
             <a:pPr lvl="3"/>
@@ -298,6 +300,7 @@
               <a:rPr lang="zh-CN" altLang="en-US"/>
               <a:t>第四级</a:t>
             </a:r>
+            <a:endParaRPr lang="zh-CN" altLang="en-US"/>
           </a:p>
           <a:p>
             <a:pPr lvl="4"/>
@@ -305,6 +308,7 @@
               <a:rPr lang="zh-CN" altLang="en-US"/>
               <a:t>第五级</a:t>
             </a:r>
+            <a:endParaRPr lang="zh-CN" altLang="en-US"/>
           </a:p>
         </p:txBody>
       </p:sp>
@@ -368,7 +372,6 @@
           <a:p>
             <a:fld id="{4F292EE1-EB42-416D-BE21-6D6219010E5F}" type="slidenum">
               <a:rPr lang="zh-CN" altLang="en-US" smtClean="0"/>
-              <a:t>‹#›</a:t>
             </a:fld>
             <a:endParaRPr lang="zh-CN" altLang="en-US"/>
           </a:p>
@@ -573,6 +576,7 @@
               <a:rPr lang="zh-CN" altLang="en-US"/>
               <a:t>单击此处编辑母版标题样式</a:t>
             </a:r>
+            <a:endParaRPr lang="zh-CN" altLang="en-US"/>
           </a:p>
         </p:txBody>
       </p:sp>
@@ -637,6 +641,7 @@
               <a:rPr lang="zh-CN" altLang="en-US"/>
               <a:t>单击此处编辑母版副标题样式</a:t>
             </a:r>
+            <a:endParaRPr lang="zh-CN" altLang="en-US"/>
           </a:p>
         </p:txBody>
       </p:sp>
@@ -684,6 +689,7 @@
               <a:rPr lang="zh-CN" altLang="en-US"/>
               <a:t>单击此处编辑母版标题样式</a:t>
             </a:r>
+            <a:endParaRPr lang="zh-CN" altLang="en-US"/>
           </a:p>
         </p:txBody>
       </p:sp>
@@ -707,6 +713,7 @@
               <a:rPr lang="zh-CN" altLang="en-US"/>
               <a:t>编辑母版文本样式</a:t>
             </a:r>
+            <a:endParaRPr lang="zh-CN" altLang="en-US"/>
           </a:p>
           <a:p>
             <a:pPr lvl="1"/>
@@ -714,6 +721,7 @@
               <a:rPr lang="zh-CN" altLang="en-US"/>
               <a:t>第二级</a:t>
             </a:r>
+            <a:endParaRPr lang="zh-CN" altLang="en-US"/>
           </a:p>
           <a:p>
             <a:pPr lvl="2"/>
@@ -721,6 +729,7 @@
               <a:rPr lang="zh-CN" altLang="en-US"/>
               <a:t>第三级</a:t>
             </a:r>
+            <a:endParaRPr lang="zh-CN" altLang="en-US"/>
           </a:p>
           <a:p>
             <a:pPr lvl="3"/>
@@ -728,6 +737,7 @@
               <a:rPr lang="zh-CN" altLang="en-US"/>
               <a:t>第四级</a:t>
             </a:r>
+            <a:endParaRPr lang="zh-CN" altLang="en-US"/>
           </a:p>
           <a:p>
             <a:pPr lvl="4"/>
@@ -735,6 +745,7 @@
               <a:rPr lang="zh-CN" altLang="en-US"/>
               <a:t>第五级</a:t>
             </a:r>
+            <a:endParaRPr lang="zh-CN" altLang="en-US"/>
           </a:p>
         </p:txBody>
       </p:sp>
@@ -787,6 +798,7 @@
               <a:rPr lang="zh-CN" altLang="en-US"/>
               <a:t>单击此处编辑母版标题样式</a:t>
             </a:r>
+            <a:endParaRPr lang="zh-CN" altLang="en-US"/>
           </a:p>
         </p:txBody>
       </p:sp>
@@ -815,6 +827,7 @@
               <a:rPr lang="zh-CN" altLang="en-US"/>
               <a:t>编辑母版文本样式</a:t>
             </a:r>
+            <a:endParaRPr lang="zh-CN" altLang="en-US"/>
           </a:p>
           <a:p>
             <a:pPr lvl="1"/>
@@ -822,6 +835,7 @@
               <a:rPr lang="zh-CN" altLang="en-US"/>
               <a:t>第二级</a:t>
             </a:r>
+            <a:endParaRPr lang="zh-CN" altLang="en-US"/>
           </a:p>
           <a:p>
             <a:pPr lvl="2"/>
@@ -829,6 +843,7 @@
               <a:rPr lang="zh-CN" altLang="en-US"/>
               <a:t>第三级</a:t>
             </a:r>
+            <a:endParaRPr lang="zh-CN" altLang="en-US"/>
           </a:p>
           <a:p>
             <a:pPr lvl="3"/>
@@ -836,6 +851,7 @@
               <a:rPr lang="zh-CN" altLang="en-US"/>
               <a:t>第四级</a:t>
             </a:r>
+            <a:endParaRPr lang="zh-CN" altLang="en-US"/>
           </a:p>
           <a:p>
             <a:pPr lvl="4"/>
@@ -843,6 +859,7 @@
               <a:rPr lang="zh-CN" altLang="en-US"/>
               <a:t>第五级</a:t>
             </a:r>
+            <a:endParaRPr lang="zh-CN" altLang="en-US"/>
           </a:p>
         </p:txBody>
       </p:sp>
@@ -890,6 +907,7 @@
               <a:rPr lang="zh-CN" altLang="en-US"/>
               <a:t>单击此处编辑母版标题样式</a:t>
             </a:r>
+            <a:endParaRPr lang="zh-CN" altLang="en-US"/>
           </a:p>
         </p:txBody>
       </p:sp>
@@ -913,6 +931,7 @@
               <a:rPr lang="zh-CN" altLang="en-US"/>
               <a:t>编辑母版文本样式</a:t>
             </a:r>
+            <a:endParaRPr lang="zh-CN" altLang="en-US"/>
           </a:p>
           <a:p>
             <a:pPr lvl="1"/>
@@ -920,6 +939,7 @@
               <a:rPr lang="zh-CN" altLang="en-US"/>
               <a:t>第二级</a:t>
             </a:r>
+            <a:endParaRPr lang="zh-CN" altLang="en-US"/>
           </a:p>
           <a:p>
             <a:pPr lvl="2"/>
@@ -927,6 +947,7 @@
               <a:rPr lang="zh-CN" altLang="en-US"/>
               <a:t>第三级</a:t>
             </a:r>
+            <a:endParaRPr lang="zh-CN" altLang="en-US"/>
           </a:p>
           <a:p>
             <a:pPr lvl="3"/>
@@ -934,6 +955,7 @@
               <a:rPr lang="zh-CN" altLang="en-US"/>
               <a:t>第四级</a:t>
             </a:r>
+            <a:endParaRPr lang="zh-CN" altLang="en-US"/>
           </a:p>
           <a:p>
             <a:pPr lvl="4"/>
@@ -941,6 +963,7 @@
               <a:rPr lang="zh-CN" altLang="en-US"/>
               <a:t>第五级</a:t>
             </a:r>
+            <a:endParaRPr lang="zh-CN" altLang="en-US"/>
           </a:p>
         </p:txBody>
       </p:sp>
@@ -997,6 +1020,7 @@
               <a:rPr lang="zh-CN" altLang="en-US"/>
               <a:t>单击此处编辑母版标题样式</a:t>
             </a:r>
+            <a:endParaRPr lang="zh-CN" altLang="en-US"/>
           </a:p>
         </p:txBody>
       </p:sp>
@@ -1116,6 +1140,7 @@
               <a:rPr lang="zh-CN" altLang="en-US"/>
               <a:t>编辑母版文本样式</a:t>
             </a:r>
+            <a:endParaRPr lang="zh-CN" altLang="en-US"/>
           </a:p>
         </p:txBody>
       </p:sp>
@@ -1163,6 +1188,7 @@
               <a:rPr lang="zh-CN" altLang="en-US"/>
               <a:t>单击此处编辑母版标题样式</a:t>
             </a:r>
+            <a:endParaRPr lang="zh-CN" altLang="en-US"/>
           </a:p>
         </p:txBody>
       </p:sp>
@@ -1191,6 +1217,7 @@
               <a:rPr lang="zh-CN" altLang="en-US"/>
               <a:t>编辑母版文本样式</a:t>
             </a:r>
+            <a:endParaRPr lang="zh-CN" altLang="en-US"/>
           </a:p>
           <a:p>
             <a:pPr lvl="1"/>
@@ -1198,6 +1225,7 @@
               <a:rPr lang="zh-CN" altLang="en-US"/>
               <a:t>第二级</a:t>
             </a:r>
+            <a:endParaRPr lang="zh-CN" altLang="en-US"/>
           </a:p>
           <a:p>
             <a:pPr lvl="2"/>
@@ -1205,6 +1233,7 @@
               <a:rPr lang="zh-CN" altLang="en-US"/>
               <a:t>第三级</a:t>
             </a:r>
+            <a:endParaRPr lang="zh-CN" altLang="en-US"/>
           </a:p>
           <a:p>
             <a:pPr lvl="3"/>
@@ -1212,6 +1241,7 @@
               <a:rPr lang="zh-CN" altLang="en-US"/>
               <a:t>第四级</a:t>
             </a:r>
+            <a:endParaRPr lang="zh-CN" altLang="en-US"/>
           </a:p>
           <a:p>
             <a:pPr lvl="4"/>
@@ -1219,6 +1249,7 @@
               <a:rPr lang="zh-CN" altLang="en-US"/>
               <a:t>第五级</a:t>
             </a:r>
+            <a:endParaRPr lang="zh-CN" altLang="en-US"/>
           </a:p>
         </p:txBody>
       </p:sp>
@@ -1247,6 +1278,7 @@
               <a:rPr lang="zh-CN" altLang="en-US"/>
               <a:t>编辑母版文本样式</a:t>
             </a:r>
+            <a:endParaRPr lang="zh-CN" altLang="en-US"/>
           </a:p>
           <a:p>
             <a:pPr lvl="1"/>
@@ -1254,6 +1286,7 @@
               <a:rPr lang="zh-CN" altLang="en-US"/>
               <a:t>第二级</a:t>
             </a:r>
+            <a:endParaRPr lang="zh-CN" altLang="en-US"/>
           </a:p>
           <a:p>
             <a:pPr lvl="2"/>
@@ -1261,6 +1294,7 @@
               <a:rPr lang="zh-CN" altLang="en-US"/>
               <a:t>第三级</a:t>
             </a:r>
+            <a:endParaRPr lang="zh-CN" altLang="en-US"/>
           </a:p>
           <a:p>
             <a:pPr lvl="3"/>
@@ -1268,6 +1302,7 @@
               <a:rPr lang="zh-CN" altLang="en-US"/>
               <a:t>第四级</a:t>
             </a:r>
+            <a:endParaRPr lang="zh-CN" altLang="en-US"/>
           </a:p>
           <a:p>
             <a:pPr lvl="4"/>
@@ -1275,6 +1310,7 @@
               <a:rPr lang="zh-CN" altLang="en-US"/>
               <a:t>第五级</a:t>
             </a:r>
+            <a:endParaRPr lang="zh-CN" altLang="en-US"/>
           </a:p>
         </p:txBody>
       </p:sp>
@@ -1327,6 +1363,7 @@
               <a:rPr lang="zh-CN" altLang="en-US"/>
               <a:t>单击此处编辑母版标题样式</a:t>
             </a:r>
+            <a:endParaRPr lang="zh-CN" altLang="en-US"/>
           </a:p>
         </p:txBody>
       </p:sp>
@@ -1392,6 +1429,7 @@
               <a:rPr lang="zh-CN" altLang="en-US"/>
               <a:t>编辑母版文本样式</a:t>
             </a:r>
+            <a:endParaRPr lang="zh-CN" altLang="en-US"/>
           </a:p>
         </p:txBody>
       </p:sp>
@@ -1420,6 +1458,7 @@
               <a:rPr lang="zh-CN" altLang="en-US"/>
               <a:t>编辑母版文本样式</a:t>
             </a:r>
+            <a:endParaRPr lang="zh-CN" altLang="en-US"/>
           </a:p>
           <a:p>
             <a:pPr lvl="1"/>
@@ -1427,6 +1466,7 @@
               <a:rPr lang="zh-CN" altLang="en-US"/>
               <a:t>第二级</a:t>
             </a:r>
+            <a:endParaRPr lang="zh-CN" altLang="en-US"/>
           </a:p>
           <a:p>
             <a:pPr lvl="2"/>
@@ -1434,6 +1474,7 @@
               <a:rPr lang="zh-CN" altLang="en-US"/>
               <a:t>第三级</a:t>
             </a:r>
+            <a:endParaRPr lang="zh-CN" altLang="en-US"/>
           </a:p>
           <a:p>
             <a:pPr lvl="3"/>
@@ -1441,6 +1482,7 @@
               <a:rPr lang="zh-CN" altLang="en-US"/>
               <a:t>第四级</a:t>
             </a:r>
+            <a:endParaRPr lang="zh-CN" altLang="en-US"/>
           </a:p>
           <a:p>
             <a:pPr lvl="4"/>
@@ -1448,6 +1490,7 @@
               <a:rPr lang="zh-CN" altLang="en-US"/>
               <a:t>第五级</a:t>
             </a:r>
+            <a:endParaRPr lang="zh-CN" altLang="en-US"/>
           </a:p>
         </p:txBody>
       </p:sp>
@@ -1513,6 +1556,7 @@
               <a:rPr lang="zh-CN" altLang="en-US"/>
               <a:t>编辑母版文本样式</a:t>
             </a:r>
+            <a:endParaRPr lang="zh-CN" altLang="en-US"/>
           </a:p>
         </p:txBody>
       </p:sp>
@@ -1541,6 +1585,7 @@
               <a:rPr lang="zh-CN" altLang="en-US"/>
               <a:t>编辑母版文本样式</a:t>
             </a:r>
+            <a:endParaRPr lang="zh-CN" altLang="en-US"/>
           </a:p>
           <a:p>
             <a:pPr lvl="1"/>
@@ -1548,6 +1593,7 @@
               <a:rPr lang="zh-CN" altLang="en-US"/>
               <a:t>第二级</a:t>
             </a:r>
+            <a:endParaRPr lang="zh-CN" altLang="en-US"/>
           </a:p>
           <a:p>
             <a:pPr lvl="2"/>
@@ -1555,6 +1601,7 @@
               <a:rPr lang="zh-CN" altLang="en-US"/>
               <a:t>第三级</a:t>
             </a:r>
+            <a:endParaRPr lang="zh-CN" altLang="en-US"/>
           </a:p>
           <a:p>
             <a:pPr lvl="3"/>
@@ -1562,6 +1609,7 @@
               <a:rPr lang="zh-CN" altLang="en-US"/>
               <a:t>第四级</a:t>
             </a:r>
+            <a:endParaRPr lang="zh-CN" altLang="en-US"/>
           </a:p>
           <a:p>
             <a:pPr lvl="4"/>
@@ -1569,6 +1617,7 @@
               <a:rPr lang="zh-CN" altLang="en-US"/>
               <a:t>第五级</a:t>
             </a:r>
+            <a:endParaRPr lang="zh-CN" altLang="en-US"/>
           </a:p>
         </p:txBody>
       </p:sp>
@@ -1616,6 +1665,7 @@
               <a:rPr lang="zh-CN" altLang="en-US"/>
               <a:t>单击此处编辑母版标题样式</a:t>
             </a:r>
+            <a:endParaRPr lang="zh-CN" altLang="en-US"/>
           </a:p>
         </p:txBody>
       </p:sp>
@@ -1697,6 +1747,7 @@
               <a:rPr lang="zh-CN" altLang="en-US"/>
               <a:t>单击此处编辑母版标题样式</a:t>
             </a:r>
+            <a:endParaRPr lang="zh-CN" altLang="en-US"/>
           </a:p>
         </p:txBody>
       </p:sp>
@@ -1753,6 +1804,7 @@
               <a:rPr lang="zh-CN" altLang="en-US"/>
               <a:t>编辑母版文本样式</a:t>
             </a:r>
+            <a:endParaRPr lang="zh-CN" altLang="en-US"/>
           </a:p>
           <a:p>
             <a:pPr lvl="1"/>
@@ -1760,6 +1812,7 @@
               <a:rPr lang="zh-CN" altLang="en-US"/>
               <a:t>第二级</a:t>
             </a:r>
+            <a:endParaRPr lang="zh-CN" altLang="en-US"/>
           </a:p>
           <a:p>
             <a:pPr lvl="2"/>
@@ -1767,6 +1820,7 @@
               <a:rPr lang="zh-CN" altLang="en-US"/>
               <a:t>第三级</a:t>
             </a:r>
+            <a:endParaRPr lang="zh-CN" altLang="en-US"/>
           </a:p>
           <a:p>
             <a:pPr lvl="3"/>
@@ -1774,6 +1828,7 @@
               <a:rPr lang="zh-CN" altLang="en-US"/>
               <a:t>第四级</a:t>
             </a:r>
+            <a:endParaRPr lang="zh-CN" altLang="en-US"/>
           </a:p>
           <a:p>
             <a:pPr lvl="4"/>
@@ -1781,6 +1836,7 @@
               <a:rPr lang="zh-CN" altLang="en-US"/>
               <a:t>第五级</a:t>
             </a:r>
+            <a:endParaRPr lang="zh-CN" altLang="en-US"/>
           </a:p>
         </p:txBody>
       </p:sp>
@@ -1846,6 +1902,7 @@
               <a:rPr lang="zh-CN" altLang="en-US"/>
               <a:t>编辑母版文本样式</a:t>
             </a:r>
+            <a:endParaRPr lang="zh-CN" altLang="en-US"/>
           </a:p>
         </p:txBody>
       </p:sp>
@@ -1902,6 +1959,7 @@
               <a:rPr lang="zh-CN" altLang="en-US"/>
               <a:t>单击此处编辑母版标题样式</a:t>
             </a:r>
+            <a:endParaRPr lang="zh-CN" altLang="en-US"/>
           </a:p>
         </p:txBody>
       </p:sp>
@@ -1966,6 +2024,7 @@
               <a:rPr lang="zh-CN" altLang="en-US"/>
               <a:t>单击图标添加图片</a:t>
             </a:r>
+            <a:endParaRPr lang="zh-CN" altLang="en-US"/>
           </a:p>
         </p:txBody>
       </p:sp>
@@ -2031,6 +2090,7 @@
               <a:rPr lang="zh-CN" altLang="en-US"/>
               <a:t>编辑母版文本样式</a:t>
             </a:r>
+            <a:endParaRPr lang="zh-CN" altLang="en-US"/>
           </a:p>
         </p:txBody>
       </p:sp>
@@ -2093,6 +2153,7 @@
               <a:rPr lang="zh-CN" altLang="en-US"/>
               <a:t>单击此处编辑母版标题样式</a:t>
             </a:r>
+            <a:endParaRPr lang="zh-CN" altLang="en-US"/>
           </a:p>
         </p:txBody>
       </p:sp>
@@ -2126,6 +2187,7 @@
               <a:rPr lang="zh-CN" altLang="en-US" dirty="0"/>
               <a:t>编辑母版文本样式</a:t>
             </a:r>
+            <a:endParaRPr lang="zh-CN" altLang="en-US" dirty="0"/>
           </a:p>
           <a:p>
             <a:pPr lvl="1"/>
@@ -2133,6 +2195,7 @@
               <a:rPr lang="zh-CN" altLang="en-US" dirty="0"/>
               <a:t>第二级</a:t>
             </a:r>
+            <a:endParaRPr lang="zh-CN" altLang="en-US" dirty="0"/>
           </a:p>
           <a:p>
             <a:pPr lvl="2"/>
@@ -2140,6 +2203,7 @@
               <a:rPr lang="zh-CN" altLang="en-US" dirty="0"/>
               <a:t>第三级</a:t>
             </a:r>
+            <a:endParaRPr lang="zh-CN" altLang="en-US" dirty="0"/>
           </a:p>
           <a:p>
             <a:pPr lvl="3"/>
@@ -2147,6 +2211,7 @@
               <a:rPr lang="zh-CN" altLang="en-US" dirty="0"/>
               <a:t>第四级</a:t>
             </a:r>
+            <a:endParaRPr lang="zh-CN" altLang="en-US" dirty="0"/>
           </a:p>
           <a:p>
             <a:pPr lvl="4"/>
@@ -2154,6 +2219,7 @@
               <a:rPr lang="zh-CN" altLang="en-US" dirty="0"/>
               <a:t>第五级</a:t>
             </a:r>
+            <a:endParaRPr lang="zh-CN" altLang="en-US" dirty="0"/>
           </a:p>
         </p:txBody>
       </p:sp>
@@ -2202,7 +2268,7 @@
         <a:spcBef>
           <a:spcPts val="1000"/>
         </a:spcBef>
-        <a:buFont typeface="Arial" panose="020B0604020202090204" pitchFamily="34" charset="0"/>
+        <a:buFont typeface="Arial" panose="020B0604020202020204" pitchFamily="34" charset="0"/>
         <a:buChar char="•"/>
         <a:defRPr sz="2800" kern="1200">
           <a:solidFill>
@@ -2220,7 +2286,7 @@
         <a:spcBef>
           <a:spcPts val="500"/>
         </a:spcBef>
-        <a:buFont typeface="Arial" panose="020B0604020202090204" pitchFamily="34" charset="0"/>
+        <a:buFont typeface="Arial" panose="020B0604020202020204" pitchFamily="34" charset="0"/>
         <a:buChar char="•"/>
         <a:defRPr sz="2400" kern="1200">
           <a:solidFill>
@@ -2238,7 +2304,7 @@
         <a:spcBef>
           <a:spcPts val="500"/>
         </a:spcBef>
-        <a:buFont typeface="Arial" panose="020B0604020202090204" pitchFamily="34" charset="0"/>
+        <a:buFont typeface="Arial" panose="020B0604020202020204" pitchFamily="34" charset="0"/>
         <a:buChar char="•"/>
         <a:defRPr sz="2000" kern="1200">
           <a:solidFill>
@@ -2256,7 +2322,7 @@
         <a:spcBef>
           <a:spcPts val="500"/>
         </a:spcBef>
-        <a:buFont typeface="Arial" panose="020B0604020202090204" pitchFamily="34" charset="0"/>
+        <a:buFont typeface="Arial" panose="020B0604020202020204" pitchFamily="34" charset="0"/>
         <a:buChar char="•"/>
         <a:defRPr sz="1800" kern="1200">
           <a:solidFill>
@@ -2274,7 +2340,7 @@
         <a:spcBef>
           <a:spcPts val="500"/>
         </a:spcBef>
-        <a:buFont typeface="Arial" panose="020B0604020202090204" pitchFamily="34" charset="0"/>
+        <a:buFont typeface="Arial" panose="020B0604020202020204" pitchFamily="34" charset="0"/>
         <a:buChar char="•"/>
         <a:defRPr sz="1800" kern="1200">
           <a:solidFill>
@@ -2292,7 +2358,7 @@
         <a:spcBef>
           <a:spcPts val="500"/>
         </a:spcBef>
-        <a:buFont typeface="Arial" panose="020B0604020202090204" pitchFamily="34" charset="0"/>
+        <a:buFont typeface="Arial" panose="020B0604020202020204" pitchFamily="34" charset="0"/>
         <a:buChar char="•"/>
         <a:defRPr sz="1800" kern="1200">
           <a:solidFill>
@@ -2310,7 +2376,7 @@
         <a:spcBef>
           <a:spcPts val="500"/>
         </a:spcBef>
-        <a:buFont typeface="Arial" panose="020B0604020202090204" pitchFamily="34" charset="0"/>
+        <a:buFont typeface="Arial" panose="020B0604020202020204" pitchFamily="34" charset="0"/>
         <a:buChar char="•"/>
         <a:defRPr sz="1800" kern="1200">
           <a:solidFill>
@@ -2328,7 +2394,7 @@
         <a:spcBef>
           <a:spcPts val="500"/>
         </a:spcBef>
-        <a:buFont typeface="Arial" panose="020B0604020202090204" pitchFamily="34" charset="0"/>
+        <a:buFont typeface="Arial" panose="020B0604020202020204" pitchFamily="34" charset="0"/>
         <a:buChar char="•"/>
         <a:defRPr sz="1800" kern="1200">
           <a:solidFill>
@@ -2346,7 +2412,7 @@
         <a:spcBef>
           <a:spcPts val="500"/>
         </a:spcBef>
-        <a:buFont typeface="Arial" panose="020B0604020202090204" pitchFamily="34" charset="0"/>
+        <a:buFont typeface="Arial" panose="020B0604020202020204" pitchFamily="34" charset="0"/>
         <a:buChar char="•"/>
         <a:defRPr sz="1800" kern="1200">
           <a:solidFill>
@@ -2476,16 +2542,16 @@
       </p:grpSpPr>
       <p:grpSp>
         <p:nvGrpSpPr>
-          <p:cNvPr id="149" name="Group 148"/>
+          <p:cNvPr id="5" name="组合 4"/>
           <p:cNvGrpSpPr/>
           <p:nvPr/>
         </p:nvGrpSpPr>
         <p:grpSpPr>
           <a:xfrm>
-            <a:off x="1283295" y="1301842"/>
-            <a:ext cx="8801470" cy="4063459"/>
-            <a:chOff x="1283295" y="1301842"/>
-            <a:chExt cx="8801470" cy="4063459"/>
+            <a:off x="1283335" y="1301750"/>
+            <a:ext cx="8801735" cy="4063365"/>
+            <a:chOff x="2021" y="2050"/>
+            <a:chExt cx="13861" cy="6399"/>
           </a:xfrm>
         </p:grpSpPr>
         <p:sp>
@@ -2496,8 +2562,8 @@
           </p:nvSpPr>
           <p:spPr>
             <a:xfrm>
-              <a:off x="1994124" y="1811355"/>
-              <a:ext cx="1992353" cy="626555"/>
+              <a:off x="3140" y="2853"/>
+              <a:ext cx="3138" cy="987"/>
             </a:xfrm>
             <a:prstGeom prst="rect">
               <a:avLst/>
@@ -2553,6 +2619,11 @@
                 </a:rPr>
                 <a:t>ID</a:t>
               </a:r>
+              <a:endParaRPr lang="en-US" altLang="zh-CN" sz="1200" dirty="0">
+                <a:solidFill>
+                  <a:schemeClr val="tx1"/>
+                </a:solidFill>
+              </a:endParaRPr>
             </a:p>
             <a:p>
               <a:r>
@@ -2579,6 +2650,11 @@
                 </a:rPr>
                 <a:t>String</a:t>
               </a:r>
+              <a:endParaRPr lang="en-US" altLang="zh-CN" sz="1200" dirty="0">
+                <a:solidFill>
+                  <a:schemeClr val="tx1"/>
+                </a:solidFill>
+              </a:endParaRPr>
             </a:p>
             <a:p>
               <a:r>
@@ -2613,6 +2689,11 @@
                 </a:rPr>
                 <a:t>Boolean</a:t>
               </a:r>
+              <a:endParaRPr lang="en-US" altLang="zh-CN" sz="1200" dirty="0">
+                <a:solidFill>
+                  <a:schemeClr val="tx1"/>
+                </a:solidFill>
+              </a:endParaRPr>
             </a:p>
           </p:txBody>
         </p:sp>
@@ -2624,8 +2705,8 @@
           </p:nvSpPr>
           <p:spPr>
             <a:xfrm>
-              <a:off x="1994124" y="1422117"/>
-              <a:ext cx="1992353" cy="387178"/>
+              <a:off x="3140" y="2240"/>
+              <a:ext cx="3138" cy="610"/>
             </a:xfrm>
             <a:prstGeom prst="rect">
               <a:avLst/>
@@ -2687,8 +2768,8 @@
           </p:nvSpPr>
           <p:spPr>
             <a:xfrm>
-              <a:off x="1994124" y="3981030"/>
-              <a:ext cx="1992353" cy="694031"/>
+              <a:off x="3140" y="6269"/>
+              <a:ext cx="3138" cy="1093"/>
             </a:xfrm>
             <a:prstGeom prst="rect">
               <a:avLst/>
@@ -2744,6 +2825,11 @@
                 </a:rPr>
                 <a:t>ID</a:t>
               </a:r>
+              <a:endParaRPr lang="en-US" altLang="zh-CN" sz="1200" dirty="0">
+                <a:solidFill>
+                  <a:schemeClr val="tx1"/>
+                </a:solidFill>
+              </a:endParaRPr>
             </a:p>
             <a:p>
               <a:r>
@@ -2770,6 +2856,11 @@
                 </a:rPr>
                 <a:t>String</a:t>
               </a:r>
+              <a:endParaRPr lang="en-US" altLang="zh-CN" sz="1200" dirty="0">
+                <a:solidFill>
+                  <a:schemeClr val="tx1"/>
+                </a:solidFill>
+              </a:endParaRPr>
             </a:p>
             <a:p>
               <a:r>
@@ -2804,6 +2895,11 @@
                 </a:rPr>
                 <a:t>Boolean</a:t>
               </a:r>
+              <a:endParaRPr lang="en-US" altLang="zh-CN" sz="1200" dirty="0">
+                <a:solidFill>
+                  <a:schemeClr val="tx1"/>
+                </a:solidFill>
+              </a:endParaRPr>
             </a:p>
           </p:txBody>
         </p:sp>
@@ -2815,8 +2911,8 @@
           </p:nvSpPr>
           <p:spPr>
             <a:xfrm>
-              <a:off x="1994124" y="3591792"/>
-              <a:ext cx="1992353" cy="387178"/>
+              <a:off x="3140" y="5656"/>
+              <a:ext cx="3138" cy="610"/>
             </a:xfrm>
             <a:prstGeom prst="rect">
               <a:avLst/>
@@ -2877,8 +2973,8 @@
           </p:nvSpPr>
           <p:spPr>
             <a:xfrm>
-              <a:off x="5001036" y="2630368"/>
-              <a:ext cx="2010538" cy="851378"/>
+              <a:off x="7876" y="4142"/>
+              <a:ext cx="3166" cy="1341"/>
             </a:xfrm>
             <a:prstGeom prst="rect">
               <a:avLst/>
@@ -2934,6 +3030,11 @@
                 </a:rPr>
                 <a:t>ID</a:t>
               </a:r>
+              <a:endParaRPr lang="en-US" altLang="zh-CN" sz="1200" dirty="0">
+                <a:solidFill>
+                  <a:schemeClr val="tx1"/>
+                </a:solidFill>
+              </a:endParaRPr>
             </a:p>
             <a:p>
               <a:r>
@@ -3015,6 +3116,11 @@
                 </a:rPr>
                 <a:t>Boolean</a:t>
               </a:r>
+              <a:endParaRPr lang="en-US" altLang="zh-CN" sz="1200" dirty="0">
+                <a:solidFill>
+                  <a:schemeClr val="tx1"/>
+                </a:solidFill>
+              </a:endParaRPr>
             </a:p>
             <a:p>
               <a:r>
@@ -3073,8 +3179,8 @@
           </p:nvSpPr>
           <p:spPr>
             <a:xfrm>
-              <a:off x="5001036" y="2241129"/>
-              <a:ext cx="2010536" cy="387178"/>
+              <a:off x="7876" y="3529"/>
+              <a:ext cx="3166" cy="610"/>
             </a:xfrm>
             <a:prstGeom prst="rect">
               <a:avLst/>
@@ -3135,9 +3241,9 @@
             <p:nvPr/>
           </p:nvGrpSpPr>
           <p:grpSpPr>
-            <a:xfrm>
-              <a:off x="8092412" y="2231373"/>
-              <a:ext cx="1992353" cy="1250373"/>
+            <a:xfrm rot="0">
+              <a:off x="12744" y="3514"/>
+              <a:ext cx="3138" cy="1969"/>
               <a:chOff x="8543646" y="2231373"/>
               <a:chExt cx="1992353" cy="1250373"/>
             </a:xfrm>
@@ -3207,6 +3313,11 @@
                   </a:rPr>
                   <a:t>ID</a:t>
                 </a:r>
+                <a:endParaRPr lang="en-US" altLang="zh-CN" sz="1200" dirty="0">
+                  <a:solidFill>
+                    <a:schemeClr val="tx1"/>
+                  </a:solidFill>
+                </a:endParaRPr>
               </a:p>
               <a:p>
                 <a:r>
@@ -3233,6 +3344,11 @@
                   </a:rPr>
                   <a:t>String</a:t>
                 </a:r>
+                <a:endParaRPr lang="en-US" altLang="zh-CN" sz="1200" dirty="0">
+                  <a:solidFill>
+                    <a:schemeClr val="tx1"/>
+                  </a:solidFill>
+                </a:endParaRPr>
               </a:p>
               <a:p>
                 <a:r>
@@ -3350,8 +3466,8 @@
           </p:nvCxnSpPr>
           <p:spPr>
             <a:xfrm>
-              <a:off x="3986477" y="1615706"/>
-              <a:ext cx="1014559" cy="1440351"/>
+              <a:off x="6278" y="2544"/>
+              <a:ext cx="1598" cy="2268"/>
             </a:xfrm>
             <a:prstGeom prst="bentConnector3">
               <a:avLst>
@@ -3362,7 +3478,7 @@
               <a:solidFill>
                 <a:schemeClr val="tx1"/>
               </a:solidFill>
-              <a:prstDash val="solid"/>
+              <a:prstDash val="lgDash"/>
               <a:tailEnd type="triangle"/>
             </a:ln>
             <a:effectLst/>
@@ -3393,8 +3509,8 @@
           </p:nvCxnSpPr>
           <p:spPr>
             <a:xfrm flipV="1">
-              <a:off x="3986477" y="3249000"/>
-              <a:ext cx="1022923" cy="536381"/>
+              <a:off x="6278" y="5117"/>
+              <a:ext cx="1611" cy="845"/>
             </a:xfrm>
             <a:prstGeom prst="bentConnector3">
               <a:avLst>
@@ -3405,6 +3521,7 @@
               <a:solidFill>
                 <a:schemeClr val="tx1"/>
               </a:solidFill>
+              <a:prstDash val="lgDash"/>
               <a:tailEnd type="triangle"/>
             </a:ln>
             <a:effectLst/>
@@ -3428,7 +3545,6 @@
           <p:nvCxnSpPr>
             <p:cNvPr id="28" name="Straight Arrow Connector 27"/>
             <p:cNvCxnSpPr>
-              <a:cxnSpLocks/>
               <a:stCxn id="9" idx="2"/>
               <a:endCxn id="13" idx="0"/>
             </p:cNvCxnSpPr>
@@ -3436,8 +3552,8 @@
           </p:nvCxnSpPr>
           <p:spPr>
             <a:xfrm>
-              <a:off x="2990301" y="2437910"/>
-              <a:ext cx="0" cy="1153882"/>
+              <a:off x="4709" y="3839"/>
+              <a:ext cx="0" cy="1817"/>
             </a:xfrm>
             <a:prstGeom prst="straightConnector1">
               <a:avLst/>
@@ -3446,6 +3562,7 @@
               <a:solidFill>
                 <a:schemeClr val="tx1"/>
               </a:solidFill>
+              <a:prstDash val="lgDash"/>
               <a:tailEnd type="triangle"/>
             </a:ln>
             <a:effectLst/>
@@ -3476,8 +3593,8 @@
           </p:nvCxnSpPr>
           <p:spPr>
             <a:xfrm rot="10800000" flipV="1">
-              <a:off x="7011574" y="3055027"/>
-              <a:ext cx="1080838" cy="1030"/>
+              <a:off x="11042" y="4811"/>
+              <a:ext cx="1702" cy="2"/>
             </a:xfrm>
             <a:prstGeom prst="bentConnector3">
               <a:avLst/>
@@ -3486,7 +3603,7 @@
               <a:solidFill>
                 <a:schemeClr val="tx1"/>
               </a:solidFill>
-              <a:prstDash val="lgDash"/>
+              <a:prstDash val="solid"/>
               <a:tailEnd type="triangle"/>
             </a:ln>
             <a:effectLst/>
@@ -3514,8 +3631,8 @@
           </p:nvSpPr>
           <p:spPr>
             <a:xfrm>
-              <a:off x="4001179" y="1301842"/>
-              <a:ext cx="465192" cy="276999"/>
+              <a:off x="6301" y="2050"/>
+              <a:ext cx="733" cy="436"/>
             </a:xfrm>
             <a:prstGeom prst="rect">
               <a:avLst/>
@@ -3544,8 +3661,8 @@
           </p:nvSpPr>
           <p:spPr>
             <a:xfrm>
-              <a:off x="7263292" y="3055026"/>
-              <a:ext cx="577402" cy="276999"/>
+              <a:off x="11438" y="4811"/>
+              <a:ext cx="909" cy="436"/>
             </a:xfrm>
             <a:prstGeom prst="rect">
               <a:avLst/>
@@ -3573,9 +3690,9 @@
             <p:nvPr/>
           </p:nvGrpSpPr>
           <p:grpSpPr>
-            <a:xfrm>
-              <a:off x="5000985" y="4287884"/>
-              <a:ext cx="2010595" cy="1077417"/>
+            <a:xfrm rot="0">
+              <a:off x="7876" y="6753"/>
+              <a:ext cx="3166" cy="1697"/>
               <a:chOff x="2789712" y="3039762"/>
               <a:chExt cx="2010595" cy="1077417"/>
             </a:xfrm>
@@ -3645,6 +3762,11 @@
                   </a:rPr>
                   <a:t>ID</a:t>
                 </a:r>
+                <a:endParaRPr lang="en-US" altLang="zh-CN" sz="1200" dirty="0">
+                  <a:solidFill>
+                    <a:schemeClr val="tx1"/>
+                  </a:solidFill>
+                </a:endParaRPr>
               </a:p>
               <a:p>
                 <a:r>
@@ -3695,6 +3817,11 @@
                   </a:rPr>
                   <a:t>Integer</a:t>
                 </a:r>
+                <a:endParaRPr lang="en-US" altLang="zh-CN" sz="1200" dirty="0">
+                  <a:solidFill>
+                    <a:schemeClr val="tx1"/>
+                  </a:solidFill>
+                </a:endParaRPr>
               </a:p>
               <a:p>
                 <a:r>
@@ -3812,8 +3939,8 @@
           </p:nvCxnSpPr>
           <p:spPr>
             <a:xfrm rot="10800000" flipH="1" flipV="1">
-              <a:off x="1994124" y="1615706"/>
-              <a:ext cx="2994228" cy="3605350"/>
+              <a:off x="3140" y="2544"/>
+              <a:ext cx="4715" cy="5678"/>
             </a:xfrm>
             <a:prstGeom prst="bentConnector3">
               <a:avLst>
@@ -3824,6 +3951,7 @@
               <a:solidFill>
                 <a:schemeClr val="tx1"/>
               </a:solidFill>
+              <a:prstDash val="lgDash"/>
               <a:tailEnd type="triangle"/>
             </a:ln>
             <a:effectLst/>
@@ -3854,8 +3982,8 @@
           </p:nvCxnSpPr>
           <p:spPr>
             <a:xfrm rot="10800000" flipH="1" flipV="1">
-              <a:off x="1994123" y="3785380"/>
-              <a:ext cx="3006861" cy="1235831"/>
+              <a:off x="3140" y="5961"/>
+              <a:ext cx="4735" cy="1946"/>
             </a:xfrm>
             <a:prstGeom prst="bentConnector3">
               <a:avLst>
@@ -3866,6 +3994,7 @@
               <a:solidFill>
                 <a:schemeClr val="tx1"/>
               </a:solidFill>
+              <a:prstDash val="lgDash"/>
               <a:tailEnd type="triangle"/>
             </a:ln>
             <a:effectLst/>
@@ -3893,8 +4022,8 @@
           </p:nvSpPr>
           <p:spPr>
             <a:xfrm>
-              <a:off x="1283295" y="1341811"/>
-              <a:ext cx="543739" cy="276999"/>
+              <a:off x="2021" y="2113"/>
+              <a:ext cx="856" cy="436"/>
             </a:xfrm>
             <a:prstGeom prst="rect">
               <a:avLst/>
@@ -3923,8 +4052,8 @@
           </p:nvSpPr>
           <p:spPr>
             <a:xfrm>
-              <a:off x="1388169" y="3497225"/>
-              <a:ext cx="543739" cy="276999"/>
+              <a:off x="2186" y="5507"/>
+              <a:ext cx="856" cy="436"/>
             </a:xfrm>
             <a:prstGeom prst="rect">
               <a:avLst/>
@@ -3953,8 +4082,8 @@
           </p:nvCxnSpPr>
           <p:spPr>
             <a:xfrm flipV="1">
-              <a:off x="6235241" y="3481746"/>
-              <a:ext cx="0" cy="824620"/>
+              <a:off x="9819" y="5483"/>
+              <a:ext cx="0" cy="1299"/>
             </a:xfrm>
             <a:prstGeom prst="straightConnector1">
               <a:avLst/>
@@ -3963,7 +4092,7 @@
               <a:solidFill>
                 <a:schemeClr val="tx1"/>
               </a:solidFill>
-              <a:prstDash val="dash"/>
+              <a:prstDash val="solid"/>
               <a:tailEnd type="triangle"/>
             </a:ln>
             <a:effectLst/>
@@ -3991,8 +4120,8 @@
           </p:nvSpPr>
           <p:spPr>
             <a:xfrm>
-              <a:off x="6234638" y="3724775"/>
-              <a:ext cx="673582" cy="276999"/>
+              <a:off x="9818" y="5866"/>
+              <a:ext cx="1061" cy="436"/>
             </a:xfrm>
             <a:prstGeom prst="rect">
               <a:avLst/>
@@ -4021,8 +4150,8 @@
           </p:nvSpPr>
           <p:spPr>
             <a:xfrm>
-              <a:off x="2429494" y="2741092"/>
-              <a:ext cx="566181" cy="276999"/>
+              <a:off x="3826" y="4317"/>
+              <a:ext cx="892" cy="436"/>
             </a:xfrm>
             <a:prstGeom prst="rect">
               <a:avLst/>
@@ -4039,6 +4168,7 @@
                 <a:rPr lang="en-US" altLang="zh-CN" sz="1200" dirty="0"/>
                 <a:t>invest</a:t>
               </a:r>
+              <a:endParaRPr lang="en-US" altLang="zh-CN" sz="1200" dirty="0"/>
             </a:p>
           </p:txBody>
         </p:sp>
@@ -4050,8 +4180,8 @@
           </p:nvCxnSpPr>
           <p:spPr>
             <a:xfrm>
-              <a:off x="5763201" y="3521690"/>
-              <a:ext cx="0" cy="766194"/>
+              <a:off x="9076" y="5546"/>
+              <a:ext cx="0" cy="1207"/>
             </a:xfrm>
             <a:prstGeom prst="straightConnector1">
               <a:avLst/>
@@ -4060,7 +4190,7 @@
               <a:solidFill>
                 <a:schemeClr val="tx1"/>
               </a:solidFill>
-              <a:prstDash val="dash"/>
+              <a:prstDash val="solid"/>
               <a:tailEnd type="triangle"/>
             </a:ln>
             <a:effectLst/>
@@ -4088,8 +4218,8 @@
           </p:nvSpPr>
           <p:spPr>
             <a:xfrm>
-              <a:off x="5205331" y="3724775"/>
-              <a:ext cx="553357" cy="276999"/>
+              <a:off x="8197" y="5866"/>
+              <a:ext cx="871" cy="436"/>
             </a:xfrm>
             <a:prstGeom prst="rect">
               <a:avLst/>
@@ -4121,8 +4251,8 @@
           </p:nvCxnSpPr>
           <p:spPr>
             <a:xfrm rot="16200000" flipH="1" flipV="1">
-              <a:off x="5088274" y="2140996"/>
-              <a:ext cx="602697" cy="784253"/>
+              <a:off x="8013" y="3372"/>
+              <a:ext cx="949" cy="1235"/>
             </a:xfrm>
             <a:prstGeom prst="bentConnector4">
               <a:avLst>
@@ -4134,7 +4264,7 @@
               <a:solidFill>
                 <a:schemeClr val="tx1"/>
               </a:solidFill>
-              <a:prstDash val="lgDash"/>
+              <a:prstDash val="solid"/>
               <a:tailEnd type="triangle"/>
             </a:ln>
             <a:effectLst/>
@@ -4162,8 +4292,8 @@
           </p:nvSpPr>
           <p:spPr>
             <a:xfrm>
-              <a:off x="4906078" y="1701083"/>
-              <a:ext cx="688009" cy="276999"/>
+              <a:off x="7726" y="2679"/>
+              <a:ext cx="1083" cy="436"/>
             </a:xfrm>
             <a:prstGeom prst="rect">
               <a:avLst/>
@@ -4180,6 +4310,7 @@
                 <a:rPr lang="en-US" altLang="zh-CN" sz="1200" dirty="0"/>
                 <a:t>transfer</a:t>
               </a:r>
+              <a:endParaRPr lang="en-US" altLang="zh-CN" sz="1200" dirty="0"/>
             </a:p>
           </p:txBody>
         </p:sp>
@@ -4187,7 +4318,6 @@
           <p:nvCxnSpPr>
             <p:cNvPr id="84" name="Elbow Connector 83"/>
             <p:cNvCxnSpPr>
-              <a:cxnSpLocks/>
               <a:stCxn id="12" idx="2"/>
               <a:endCxn id="12" idx="3"/>
             </p:cNvCxnSpPr>
@@ -4195,8 +4325,8 @@
           </p:nvCxnSpPr>
           <p:spPr>
             <a:xfrm rot="5400000" flipH="1" flipV="1">
-              <a:off x="3314881" y="4003466"/>
-              <a:ext cx="347015" cy="996176"/>
+              <a:off x="5220" y="6305"/>
+              <a:ext cx="546" cy="1569"/>
             </a:xfrm>
             <a:prstGeom prst="bentConnector4">
               <a:avLst>
@@ -4208,6 +4338,7 @@
               <a:solidFill>
                 <a:schemeClr val="tx1"/>
               </a:solidFill>
+              <a:prstDash val="lgDash"/>
               <a:tailEnd type="triangle"/>
             </a:ln>
             <a:effectLst/>
@@ -4235,8 +4366,8 @@
           </p:nvSpPr>
           <p:spPr>
             <a:xfrm>
-              <a:off x="3187561" y="4650497"/>
-              <a:ext cx="764322" cy="276999"/>
+              <a:off x="5020" y="7324"/>
+              <a:ext cx="1204" cy="436"/>
             </a:xfrm>
             <a:prstGeom prst="rect">
               <a:avLst/>
@@ -4254,6 +4385,7 @@
                 <a:rPr lang="en-US" altLang="zh-CN" sz="1200" dirty="0"/>
                 <a:t>invest</a:t>
               </a:r>
+              <a:endParaRPr lang="en-US" altLang="zh-CN" sz="1200" dirty="0"/>
             </a:p>
           </p:txBody>
         </p:sp>
@@ -4265,8 +4397,8 @@
           </p:nvSpPr>
           <p:spPr>
             <a:xfrm>
-              <a:off x="4001179" y="3456466"/>
-              <a:ext cx="465192" cy="276999"/>
+              <a:off x="6301" y="5443"/>
+              <a:ext cx="733" cy="436"/>
             </a:xfrm>
             <a:prstGeom prst="rect">
               <a:avLst/>
@@ -4283,6 +4415,7 @@
                 <a:rPr lang="en-US" altLang="zh-CN" sz="1200" dirty="0"/>
                 <a:t>own</a:t>
               </a:r>
+              <a:endParaRPr lang="en-US" altLang="zh-CN" sz="1200" dirty="0"/>
             </a:p>
           </p:txBody>
         </p:sp>
@@ -4297,8 +4430,8 @@
           </p:nvCxnSpPr>
           <p:spPr>
             <a:xfrm rot="16200000" flipH="1">
-              <a:off x="6339125" y="2161000"/>
-              <a:ext cx="601387" cy="745556"/>
+              <a:off x="9983" y="3403"/>
+              <a:ext cx="947" cy="1174"/>
             </a:xfrm>
             <a:prstGeom prst="bentConnector4">
               <a:avLst>
@@ -4310,7 +4443,7 @@
               <a:solidFill>
                 <a:schemeClr val="tx1"/>
               </a:solidFill>
-              <a:prstDash val="lgDash"/>
+              <a:prstDash val="solid"/>
               <a:tailEnd type="triangle"/>
             </a:ln>
             <a:effectLst/>
@@ -4338,8 +4471,8 @@
           </p:nvSpPr>
           <p:spPr>
             <a:xfrm>
-              <a:off x="6335825" y="1701083"/>
-              <a:ext cx="785793" cy="276999"/>
+              <a:off x="9978" y="2679"/>
+              <a:ext cx="1237" cy="436"/>
             </a:xfrm>
             <a:prstGeom prst="rect">
               <a:avLst/>
@@ -4364,7 +4497,6 @@
           <p:nvCxnSpPr>
             <p:cNvPr id="52" name="Elbow Connector 51"/>
             <p:cNvCxnSpPr>
-              <a:cxnSpLocks/>
               <a:stCxn id="9" idx="2"/>
               <a:endCxn id="9" idx="3"/>
             </p:cNvCxnSpPr>
@@ -4372,8 +4504,8 @@
           </p:nvCxnSpPr>
           <p:spPr>
             <a:xfrm rot="5400000" flipH="1" flipV="1">
-              <a:off x="3331750" y="1783184"/>
-              <a:ext cx="313277" cy="996176"/>
+              <a:off x="5247" y="2808"/>
+              <a:ext cx="493" cy="1569"/>
             </a:xfrm>
             <a:prstGeom prst="bentConnector4">
               <a:avLst>
@@ -4385,6 +4517,7 @@
               <a:solidFill>
                 <a:schemeClr val="tx1"/>
               </a:solidFill>
+              <a:prstDash val="lgDash"/>
               <a:tailEnd type="triangle"/>
             </a:ln>
             <a:effectLst/>
@@ -4412,8 +4545,8 @@
           </p:nvSpPr>
           <p:spPr>
             <a:xfrm>
-              <a:off x="3194536" y="2669914"/>
-              <a:ext cx="856325" cy="276999"/>
+              <a:off x="5031" y="4205"/>
+              <a:ext cx="1349" cy="436"/>
             </a:xfrm>
             <a:prstGeom prst="rect">
               <a:avLst/>
@@ -4430,21 +4563,20 @@
                 <a:rPr lang="en-US" altLang="zh-CN" sz="1200" dirty="0"/>
                 <a:t>guarantee</a:t>
               </a:r>
+              <a:endParaRPr lang="en-US" altLang="zh-CN" sz="1200" dirty="0"/>
             </a:p>
           </p:txBody>
         </p:sp>
         <p:cxnSp>
           <p:nvCxnSpPr>
             <p:cNvPr id="59" name="Straight Arrow Connector 58"/>
-            <p:cNvCxnSpPr>
-              <a:cxnSpLocks/>
-            </p:cNvCxnSpPr>
+            <p:cNvCxnSpPr/>
             <p:nvPr/>
           </p:nvCxnSpPr>
           <p:spPr>
             <a:xfrm>
-              <a:off x="2380255" y="2437910"/>
-              <a:ext cx="0" cy="1153882"/>
+              <a:off x="3748" y="3839"/>
+              <a:ext cx="0" cy="1817"/>
             </a:xfrm>
             <a:prstGeom prst="straightConnector1">
               <a:avLst/>
@@ -4453,6 +4585,7 @@
               <a:solidFill>
                 <a:schemeClr val="tx1"/>
               </a:solidFill>
+              <a:prstDash val="lgDash"/>
               <a:tailEnd type="triangle"/>
             </a:ln>
             <a:effectLst/>
@@ -4480,8 +4613,8 @@
           </p:nvSpPr>
           <p:spPr>
             <a:xfrm>
-              <a:off x="1730873" y="2741092"/>
-              <a:ext cx="629734" cy="276999"/>
+              <a:off x="2726" y="4317"/>
+              <a:ext cx="992" cy="436"/>
             </a:xfrm>
             <a:prstGeom prst="rect">
               <a:avLst/>
@@ -4506,7 +4639,6 @@
           <p:nvCxnSpPr>
             <p:cNvPr id="50" name="Elbow Connector 49"/>
             <p:cNvCxnSpPr>
-              <a:cxnSpLocks/>
               <a:stCxn id="12" idx="2"/>
               <a:endCxn id="12" idx="1"/>
             </p:cNvCxnSpPr>
@@ -4514,8 +4646,8 @@
           </p:nvCxnSpPr>
           <p:spPr>
             <a:xfrm rot="5400000" flipH="1">
-              <a:off x="2318705" y="4003466"/>
-              <a:ext cx="347015" cy="996177"/>
+              <a:off x="3652" y="6305"/>
+              <a:ext cx="546" cy="1569"/>
             </a:xfrm>
             <a:prstGeom prst="bentConnector4">
               <a:avLst>
@@ -4527,6 +4659,7 @@
               <a:solidFill>
                 <a:schemeClr val="tx1"/>
               </a:solidFill>
+              <a:prstDash val="lgDash"/>
               <a:tailEnd type="triangle"/>
             </a:ln>
             <a:effectLst/>
@@ -4554,8 +4687,8 @@
           </p:nvSpPr>
           <p:spPr>
             <a:xfrm>
-              <a:off x="1929021" y="4640877"/>
-              <a:ext cx="856325" cy="276999"/>
+              <a:off x="3038" y="7308"/>
+              <a:ext cx="1349" cy="436"/>
             </a:xfrm>
             <a:prstGeom prst="rect">
               <a:avLst/>
@@ -4572,6 +4705,7 @@
                 <a:rPr lang="en-US" altLang="zh-CN" sz="1200" dirty="0"/>
                 <a:t>guarantee</a:t>
               </a:r>
+              <a:endParaRPr lang="en-US" altLang="zh-CN" sz="1200" dirty="0"/>
             </a:p>
           </p:txBody>
         </p:sp>
@@ -4583,8 +4717,8 @@
           </p:nvSpPr>
           <p:spPr>
             <a:xfrm>
-              <a:off x="2445348" y="4475493"/>
-              <a:ext cx="18000" cy="18000"/>
+              <a:off x="3851" y="7048"/>
+              <a:ext cx="28" cy="28"/>
             </a:xfrm>
             <a:prstGeom prst="ellipse">
               <a:avLst/>
@@ -4629,8 +4763,8 @@
           </p:nvSpPr>
           <p:spPr>
             <a:xfrm>
-              <a:off x="3452288" y="4476952"/>
-              <a:ext cx="18000" cy="18000"/>
+              <a:off x="5437" y="7050"/>
+              <a:ext cx="28" cy="28"/>
             </a:xfrm>
             <a:prstGeom prst="ellipse">
               <a:avLst/>
@@ -4675,8 +4809,8 @@
           </p:nvSpPr>
           <p:spPr>
             <a:xfrm>
-              <a:off x="3452288" y="2269728"/>
-              <a:ext cx="18000" cy="18000"/>
+              <a:off x="5437" y="3574"/>
+              <a:ext cx="28" cy="28"/>
             </a:xfrm>
             <a:prstGeom prst="ellipse">
               <a:avLst/>
@@ -4721,8 +4855,8 @@
           </p:nvSpPr>
           <p:spPr>
             <a:xfrm>
-              <a:off x="4991400" y="3240000"/>
-              <a:ext cx="18000" cy="18000"/>
+              <a:off x="7860" y="5102"/>
+              <a:ext cx="28" cy="28"/>
             </a:xfrm>
             <a:prstGeom prst="ellipse">
               <a:avLst/>
@@ -4767,8 +4901,8 @@
           </p:nvSpPr>
           <p:spPr>
             <a:xfrm>
-              <a:off x="4997496" y="3005304"/>
-              <a:ext cx="18000" cy="18000"/>
+              <a:off x="7870" y="4733"/>
+              <a:ext cx="28" cy="28"/>
             </a:xfrm>
             <a:prstGeom prst="ellipse">
               <a:avLst/>
@@ -4813,8 +4947,8 @@
           </p:nvSpPr>
           <p:spPr>
             <a:xfrm>
-              <a:off x="4997496" y="2825472"/>
-              <a:ext cx="18000" cy="18000"/>
+              <a:off x="7870" y="4450"/>
+              <a:ext cx="28" cy="28"/>
             </a:xfrm>
             <a:prstGeom prst="ellipse">
               <a:avLst/>
@@ -4859,8 +4993,8 @@
           </p:nvSpPr>
           <p:spPr>
             <a:xfrm>
-              <a:off x="4988352" y="5212056"/>
-              <a:ext cx="18000" cy="18000"/>
+              <a:off x="7856" y="8208"/>
+              <a:ext cx="28" cy="28"/>
             </a:xfrm>
             <a:prstGeom prst="ellipse">
               <a:avLst/>
@@ -4905,8 +5039,8 @@
           </p:nvSpPr>
           <p:spPr>
             <a:xfrm>
-              <a:off x="6994597" y="2825472"/>
-              <a:ext cx="18000" cy="18000"/>
+              <a:off x="11015" y="4450"/>
+              <a:ext cx="28" cy="28"/>
             </a:xfrm>
             <a:prstGeom prst="ellipse">
               <a:avLst/>
@@ -4951,8 +5085,8 @@
           </p:nvSpPr>
           <p:spPr>
             <a:xfrm>
-              <a:off x="6264405" y="2230449"/>
-              <a:ext cx="18000" cy="18000"/>
+              <a:off x="9865" y="3513"/>
+              <a:ext cx="28" cy="28"/>
             </a:xfrm>
             <a:prstGeom prst="ellipse">
               <a:avLst/>
@@ -4997,8 +5131,8 @@
           </p:nvSpPr>
           <p:spPr>
             <a:xfrm>
-              <a:off x="5772749" y="2231775"/>
-              <a:ext cx="18000" cy="18000"/>
+              <a:off x="9091" y="3515"/>
+              <a:ext cx="28" cy="28"/>
             </a:xfrm>
             <a:prstGeom prst="ellipse">
               <a:avLst/>
@@ -5037,16 +5171,16 @@
         </p:sp>
         <p:grpSp>
           <p:nvGrpSpPr>
-            <p:cNvPr id="140" name="Group 139"/>
+            <p:cNvPr id="3" name="组合 2"/>
             <p:cNvGrpSpPr/>
             <p:nvPr/>
           </p:nvGrpSpPr>
           <p:grpSpPr>
-            <a:xfrm>
-              <a:off x="7743830" y="3871701"/>
-              <a:ext cx="2058538" cy="1163832"/>
-              <a:chOff x="7972430" y="3871701"/>
-              <a:chExt cx="2058538" cy="1163832"/>
+            <a:xfrm rot="0">
+              <a:off x="12195" y="6097"/>
+              <a:ext cx="3242" cy="1832"/>
+              <a:chOff x="12195" y="6097"/>
+              <a:chExt cx="3242" cy="1832"/>
             </a:xfrm>
           </p:grpSpPr>
           <p:sp>
@@ -5059,8 +5193,8 @@
             </p:nvSpPr>
             <p:spPr>
               <a:xfrm>
-                <a:off x="8574063" y="3871701"/>
-                <a:ext cx="1456905" cy="607387"/>
+                <a:off x="13143" y="6097"/>
+                <a:ext cx="2294" cy="957"/>
               </a:xfrm>
               <a:prstGeom prst="rect">
                 <a:avLst/>
@@ -5086,9 +5220,9 @@
                         <a:lumOff val="35000"/>
                       </a:schemeClr>
                     </a:solidFill>
-                    <a:latin typeface="Agency FB" pitchFamily="34" charset="0"/>
-                    <a:ea typeface="微软雅黑" pitchFamily="34" charset="-122"/>
-                    <a:cs typeface="Calibri" pitchFamily="34" charset="0"/>
+                    <a:latin typeface="Agency FB" panose="020B0503020202020204" pitchFamily="34" charset="0"/>
+                    <a:ea typeface="微软雅黑" panose="020B0503020204020204" pitchFamily="34" charset="-122"/>
+                    <a:cs typeface="Calibri" panose="020F0502020204030204" pitchFamily="34" charset="0"/>
                   </a:defRPr>
                 </a:lvl1pPr>
               </a:lstStyle>
@@ -5235,8 +5369,46 @@
             </p:nvCxnSpPr>
             <p:spPr>
               <a:xfrm>
-                <a:off x="7972430" y="4175395"/>
-                <a:ext cx="540000" cy="0"/>
+                <a:off x="12195" y="6575"/>
+                <a:ext cx="850" cy="0"/>
+              </a:xfrm>
+              <a:prstGeom prst="straightConnector1">
+                <a:avLst/>
+              </a:prstGeom>
+              <a:noFill/>
+              <a:ln w="25400" cap="flat">
+                <a:solidFill>
+                  <a:srgbClr val="000000"/>
+                </a:solidFill>
+                <a:prstDash val="lgDash"/>
+                <a:miter lim="400000"/>
+                <a:tailEnd type="triangle"/>
+              </a:ln>
+              <a:effectLst/>
+            </p:spPr>
+            <p:style>
+              <a:lnRef idx="0">
+                <a:scrgbClr r="0" g="0" b="0"/>
+              </a:lnRef>
+              <a:fillRef idx="0">
+                <a:scrgbClr r="0" g="0" b="0"/>
+              </a:fillRef>
+              <a:effectRef idx="0">
+                <a:scrgbClr r="0" g="0" b="0"/>
+              </a:effectRef>
+              <a:fontRef idx="none"/>
+            </p:style>
+          </p:cxnSp>
+          <p:cxnSp>
+            <p:nvCxnSpPr>
+              <p:cNvPr id="136" name="Straight Arrow Connector 135"/>
+              <p:cNvCxnSpPr/>
+              <p:nvPr/>
+            </p:nvCxnSpPr>
+            <p:spPr>
+              <a:xfrm>
+                <a:off x="12195" y="7452"/>
+                <a:ext cx="850" cy="0"/>
               </a:xfrm>
               <a:prstGeom prst="straightConnector1">
                 <a:avLst/>
@@ -5265,44 +5437,6 @@
               <a:fontRef idx="none"/>
             </p:style>
           </p:cxnSp>
-          <p:cxnSp>
-            <p:nvCxnSpPr>
-              <p:cNvPr id="136" name="Straight Arrow Connector 135"/>
-              <p:cNvCxnSpPr/>
-              <p:nvPr/>
-            </p:nvCxnSpPr>
-            <p:spPr>
-              <a:xfrm>
-                <a:off x="7972430" y="4731840"/>
-                <a:ext cx="540000" cy="0"/>
-              </a:xfrm>
-              <a:prstGeom prst="straightConnector1">
-                <a:avLst/>
-              </a:prstGeom>
-              <a:noFill/>
-              <a:ln w="25400" cap="flat">
-                <a:solidFill>
-                  <a:srgbClr val="000000"/>
-                </a:solidFill>
-                <a:prstDash val="dash"/>
-                <a:miter lim="400000"/>
-                <a:tailEnd type="triangle"/>
-              </a:ln>
-              <a:effectLst/>
-            </p:spPr>
-            <p:style>
-              <a:lnRef idx="0">
-                <a:scrgbClr r="0" g="0" b="0"/>
-              </a:lnRef>
-              <a:fillRef idx="0">
-                <a:scrgbClr r="0" g="0" b="0"/>
-              </a:fillRef>
-              <a:effectRef idx="0">
-                <a:scrgbClr r="0" g="0" b="0"/>
-              </a:effectRef>
-              <a:fontRef idx="none"/>
-            </p:style>
-          </p:cxnSp>
           <p:sp>
             <p:nvSpPr>
               <p:cNvPr id="137" name="TextBox 36"/>
@@ -5313,8 +5447,8 @@
             </p:nvSpPr>
             <p:spPr>
               <a:xfrm>
-                <a:off x="8574062" y="4428146"/>
-                <a:ext cx="1456905" cy="607387"/>
+                <a:off x="13143" y="6973"/>
+                <a:ext cx="2294" cy="957"/>
               </a:xfrm>
               <a:prstGeom prst="rect">
                 <a:avLst/>
@@ -5340,9 +5474,9 @@
                         <a:lumOff val="35000"/>
                       </a:schemeClr>
                     </a:solidFill>
-                    <a:latin typeface="Agency FB" pitchFamily="34" charset="0"/>
-                    <a:ea typeface="微软雅黑" pitchFamily="34" charset="-122"/>
-                    <a:cs typeface="Calibri" pitchFamily="34" charset="0"/>
+                    <a:latin typeface="Agency FB" panose="020B0503020202020204" pitchFamily="34" charset="0"/>
+                    <a:ea typeface="微软雅黑" panose="020B0503020204020204" pitchFamily="34" charset="-122"/>
+                    <a:cs typeface="Calibri" panose="020F0502020204030204" pitchFamily="34" charset="0"/>
                   </a:defRPr>
                 </a:lvl1pPr>
               </a:lstStyle>
@@ -5499,7 +5633,7 @@
       </p:grpSpPr>
       <p:grpSp>
         <p:nvGrpSpPr>
-          <p:cNvPr id="2" name="组合 1"/>
+          <p:cNvPr id="3" name="组合 2"/>
           <p:cNvGrpSpPr/>
           <p:nvPr/>
         </p:nvGrpSpPr>
@@ -5507,7 +5641,7 @@
           <a:xfrm>
             <a:off x="4793615" y="2189480"/>
             <a:ext cx="2605405" cy="2479040"/>
-            <a:chOff x="7467" y="2215"/>
+            <a:chOff x="7549" y="3448"/>
             <a:chExt cx="4103" cy="3904"/>
           </a:xfrm>
         </p:grpSpPr>
@@ -5519,7 +5653,7 @@
           </p:nvSpPr>
           <p:spPr>
             <a:xfrm>
-              <a:off x="7876" y="4159"/>
+              <a:off x="7958" y="5392"/>
               <a:ext cx="3694" cy="1960"/>
             </a:xfrm>
             <a:prstGeom prst="rect">
@@ -5576,6 +5710,11 @@
                 </a:rPr>
                 <a:t>ID</a:t>
               </a:r>
+              <a:endParaRPr lang="en-US" altLang="zh-CN" sz="1200" dirty="0">
+                <a:solidFill>
+                  <a:schemeClr val="tx1"/>
+                </a:solidFill>
+              </a:endParaRPr>
             </a:p>
             <a:p>
               <a:r>
@@ -5586,6 +5725,11 @@
                 </a:rPr>
                 <a:t>name: String</a:t>
               </a:r>
+              <a:endParaRPr lang="en-US" altLang="zh-CN" sz="1200" dirty="0">
+                <a:solidFill>
+                  <a:schemeClr val="tx1"/>
+                </a:solidFill>
+              </a:endParaRPr>
             </a:p>
             <a:p>
               <a:r>
@@ -5632,6 +5776,12 @@
                 </a:rPr>
                 <a:t>Integer</a:t>
               </a:r>
+              <a:endParaRPr lang="en-US" altLang="zh-CN" sz="1200" dirty="0">
+                <a:solidFill>
+                  <a:schemeClr val="tx1"/>
+                </a:solidFill>
+                <a:sym typeface="+mn-ea"/>
+              </a:endParaRPr>
             </a:p>
             <a:p>
               <a:r>
@@ -5678,6 +5828,12 @@
                 </a:rPr>
                 <a:t>Integer</a:t>
               </a:r>
+              <a:endParaRPr lang="en-US" altLang="zh-CN" sz="1200" dirty="0">
+                <a:solidFill>
+                  <a:schemeClr val="tx1"/>
+                </a:solidFill>
+                <a:sym typeface="+mn-ea"/>
+              </a:endParaRPr>
             </a:p>
             <a:p>
               <a:r>
@@ -5688,6 +5844,11 @@
                 </a:rPr>
                 <a:t>transHistory: [64-bit Integer]</a:t>
               </a:r>
+              <a:endParaRPr lang="en-US" sz="1200" dirty="0">
+                <a:solidFill>
+                  <a:schemeClr val="tx1"/>
+                </a:solidFill>
+              </a:endParaRPr>
             </a:p>
             <a:p>
               <a:r>
@@ -5698,6 +5859,11 @@
                 </a:rPr>
                 <a:t>versionHistory: [64-bit Integer]</a:t>
               </a:r>
+              <a:endParaRPr lang="en-US" sz="1200" dirty="0">
+                <a:solidFill>
+                  <a:schemeClr val="tx1"/>
+                </a:solidFill>
+              </a:endParaRPr>
             </a:p>
           </p:txBody>
         </p:sp>
@@ -5709,7 +5875,7 @@
           </p:nvSpPr>
           <p:spPr>
             <a:xfrm>
-              <a:off x="7876" y="3546"/>
+              <a:off x="7958" y="4779"/>
               <a:ext cx="3693" cy="598"/>
             </a:xfrm>
             <a:prstGeom prst="rect">
@@ -5775,7 +5941,7 @@
           </p:nvCxnSpPr>
           <p:spPr>
             <a:xfrm rot="16200000" flipH="1" flipV="1">
-              <a:off x="8002" y="3419"/>
+              <a:off x="8084" y="4652"/>
               <a:ext cx="1593" cy="1847"/>
             </a:xfrm>
             <a:prstGeom prst="bentConnector4">
@@ -5788,7 +5954,7 @@
               <a:solidFill>
                 <a:schemeClr val="tx1"/>
               </a:solidFill>
-              <a:prstDash val="lgDash"/>
+              <a:prstDash val="solid"/>
               <a:tailEnd type="triangle"/>
             </a:ln>
             <a:effectLst/>
@@ -5816,7 +5982,7 @@
           </p:nvSpPr>
           <p:spPr>
             <a:xfrm>
-              <a:off x="7467" y="2215"/>
+              <a:off x="7549" y="3448"/>
               <a:ext cx="3693" cy="725"/>
             </a:xfrm>
             <a:prstGeom prst="rect">
@@ -5834,6 +6000,7 @@
                 <a:rPr lang="en-US" altLang="zh-CN" sz="1200" dirty="0"/>
                 <a:t>transfer{amount: 64-bit Integer, versionHistory: [64-bit Integer]}</a:t>
               </a:r>
+              <a:endParaRPr lang="en-US" altLang="zh-CN" sz="1200" dirty="0"/>
             </a:p>
           </p:txBody>
         </p:sp>
@@ -5845,7 +6012,7 @@
           </p:nvSpPr>
           <p:spPr>
             <a:xfrm>
-              <a:off x="7860" y="5119"/>
+              <a:off x="7942" y="6352"/>
               <a:ext cx="29" cy="29"/>
             </a:xfrm>
             <a:prstGeom prst="ellipse">
@@ -5891,7 +6058,7 @@
           </p:nvSpPr>
           <p:spPr>
             <a:xfrm>
-              <a:off x="7870" y="4750"/>
+              <a:off x="7952" y="5983"/>
               <a:ext cx="28" cy="28"/>
             </a:xfrm>
             <a:prstGeom prst="ellipse">
@@ -5937,7 +6104,7 @@
           </p:nvSpPr>
           <p:spPr>
             <a:xfrm>
-              <a:off x="7870" y="4467"/>
+              <a:off x="7952" y="5700"/>
               <a:ext cx="28" cy="28"/>
             </a:xfrm>
             <a:prstGeom prst="ellipse">
@@ -5983,7 +6150,7 @@
           </p:nvSpPr>
           <p:spPr>
             <a:xfrm>
-              <a:off x="11015" y="4467"/>
+              <a:off x="11097" y="5700"/>
               <a:ext cx="28" cy="28"/>
             </a:xfrm>
             <a:prstGeom prst="ellipse">
@@ -6029,7 +6196,7 @@
           </p:nvSpPr>
           <p:spPr>
             <a:xfrm>
-              <a:off x="9865" y="3530"/>
+              <a:off x="9947" y="4763"/>
               <a:ext cx="29" cy="28"/>
             </a:xfrm>
             <a:prstGeom prst="ellipse">
@@ -6075,7 +6242,7 @@
           </p:nvSpPr>
           <p:spPr>
             <a:xfrm>
-              <a:off x="9091" y="3532"/>
+              <a:off x="9173" y="4765"/>
               <a:ext cx="28" cy="28"/>
             </a:xfrm>
             <a:prstGeom prst="ellipse">
@@ -6459,6 +6626,13 @@
     <a:masterClrMapping/>
   </p:clrMapOvr>
 </p:sld>
+</file>
+
+<file path=ppt/tags/tag1.xml><?xml version="1.0" encoding="utf-8"?>
+<p:tagLst xmlns:p="http://schemas.openxmlformats.org/presentationml/2006/main">
+  <p:tag name="KSO_WPP_MARK_KEY" val="3e354841-6969-42a4-9c4a-eb932c12467a"/>
+  <p:tag name="COMMONDATA" val="eyJoZGlkIjoiY2UzZmQ1NDYyMTk1MjkyNjAxNzY5ZmQ2ZjBmNmY2NWYifQ=="/>
+</p:tagLst>
 </file>
 
 <file path=ppt/theme/theme1.xml><?xml version="1.0" encoding="utf-8"?>
@@ -6712,8 +6886,6 @@
       </a:bgFillStyleLst>
     </a:fmtScheme>
   </a:themeElements>
-  <a:objectDefaults/>
-  <a:extraClrSchemeLst/>
   <a:extLst>
     <a:ext uri="{05A4C25C-085E-4340-85A3-A5531E510DB2}">
       <thm15:themeFamily xmlns:thm15="http://schemas.microsoft.com/office/thememl/2012/main" name="Office Theme" id="{62F939B6-93AF-4DB8-9C6B-D6C7DFDC589F}" vid="{4A3C46E8-61CC-4603-A589-7422A47A8E4A}"/>
@@ -6973,8 +7145,6 @@
       </a:bgFillStyleLst>
     </a:fmtScheme>
   </a:themeElements>
-  <a:objectDefaults/>
-  <a:extraClrSchemeLst/>
   <a:extLst>
     <a:ext uri="{05A4C25C-085E-4340-85A3-A5531E510DB2}">
       <thm15:themeFamily xmlns:thm15="http://schemas.microsoft.com/office/thememl/2012/main" name="Office Theme" id="{62F939B6-93AF-4DB8-9C6B-D6C7DFDC589F}" vid="{4A3C46E8-61CC-4603-A589-7422A47A8E4A}"/>

</xml_diff>

<commit_message>
update pattern and schema line (#78)
</commit_message>
<xml_diff>
--- a/figures/schema.pptx
+++ b/figures/schema.pptx
@@ -8,12 +8,15 @@
     <p:notesMasterId r:id="rId5"/>
   </p:notesMasterIdLst>
   <p:sldIdLst>
-    <p:sldId id="415" r:id="rId2"/>
-    <p:sldId id="417" r:id="rId3"/>
-    <p:sldId id="416" r:id="rId4"/>
+    <p:sldId id="415" r:id="rId3"/>
+    <p:sldId id="417" r:id="rId4"/>
+    <p:sldId id="416" r:id="rId6"/>
   </p:sldIdLst>
   <p:sldSz cx="12192000" cy="6858000"/>
   <p:notesSz cx="6858000" cy="9144000"/>
+  <p:custDataLst>
+    <p:tags r:id="rId10"/>
+  </p:custDataLst>
   <p:defaultTextStyle>
     <a:defPPr>
       <a:defRPr lang="zh-CN"/>
@@ -121,9 +124,6 @@
         </p14:section>
       </p14:sectionLst>
     </p:ext>
-    <p:ext uri="{EFAFB233-063F-42B5-8137-9DF3F51BA10A}">
-      <p15:sldGuideLst xmlns:p15="http://schemas.microsoft.com/office/powerpoint/2012/main"/>
-    </p:ext>
   </p:extLst>
 </p:presentation>
 </file>
@@ -210,7 +210,6 @@
           <a:p>
             <a:fld id="{CAD4BD24-A097-4F9D-85E9-6A2A24CA2D98}" type="datetimeFigureOut">
               <a:rPr lang="zh-CN" altLang="en-US" smtClean="0"/>
-              <a:t>2023/5/4</a:t>
             </a:fld>
             <a:endParaRPr lang="zh-CN" altLang="en-US"/>
           </a:p>
@@ -277,6 +276,7 @@
               <a:rPr lang="zh-CN" altLang="en-US"/>
               <a:t>单击此处编辑母版文本样式</a:t>
             </a:r>
+            <a:endParaRPr lang="zh-CN" altLang="en-US"/>
           </a:p>
           <a:p>
             <a:pPr lvl="1"/>
@@ -284,6 +284,7 @@
               <a:rPr lang="zh-CN" altLang="en-US"/>
               <a:t>第二级</a:t>
             </a:r>
+            <a:endParaRPr lang="zh-CN" altLang="en-US"/>
           </a:p>
           <a:p>
             <a:pPr lvl="2"/>
@@ -291,6 +292,7 @@
               <a:rPr lang="zh-CN" altLang="en-US"/>
               <a:t>第三级</a:t>
             </a:r>
+            <a:endParaRPr lang="zh-CN" altLang="en-US"/>
           </a:p>
           <a:p>
             <a:pPr lvl="3"/>
@@ -298,6 +300,7 @@
               <a:rPr lang="zh-CN" altLang="en-US"/>
               <a:t>第四级</a:t>
             </a:r>
+            <a:endParaRPr lang="zh-CN" altLang="en-US"/>
           </a:p>
           <a:p>
             <a:pPr lvl="4"/>
@@ -305,6 +308,7 @@
               <a:rPr lang="zh-CN" altLang="en-US"/>
               <a:t>第五级</a:t>
             </a:r>
+            <a:endParaRPr lang="zh-CN" altLang="en-US"/>
           </a:p>
         </p:txBody>
       </p:sp>
@@ -368,7 +372,6 @@
           <a:p>
             <a:fld id="{4F292EE1-EB42-416D-BE21-6D6219010E5F}" type="slidenum">
               <a:rPr lang="zh-CN" altLang="en-US" smtClean="0"/>
-              <a:t>‹#›</a:t>
             </a:fld>
             <a:endParaRPr lang="zh-CN" altLang="en-US"/>
           </a:p>
@@ -573,6 +576,7 @@
               <a:rPr lang="zh-CN" altLang="en-US"/>
               <a:t>单击此处编辑母版标题样式</a:t>
             </a:r>
+            <a:endParaRPr lang="zh-CN" altLang="en-US"/>
           </a:p>
         </p:txBody>
       </p:sp>
@@ -637,6 +641,7 @@
               <a:rPr lang="zh-CN" altLang="en-US"/>
               <a:t>单击此处编辑母版副标题样式</a:t>
             </a:r>
+            <a:endParaRPr lang="zh-CN" altLang="en-US"/>
           </a:p>
         </p:txBody>
       </p:sp>
@@ -684,6 +689,7 @@
               <a:rPr lang="zh-CN" altLang="en-US"/>
               <a:t>单击此处编辑母版标题样式</a:t>
             </a:r>
+            <a:endParaRPr lang="zh-CN" altLang="en-US"/>
           </a:p>
         </p:txBody>
       </p:sp>
@@ -707,6 +713,7 @@
               <a:rPr lang="zh-CN" altLang="en-US"/>
               <a:t>编辑母版文本样式</a:t>
             </a:r>
+            <a:endParaRPr lang="zh-CN" altLang="en-US"/>
           </a:p>
           <a:p>
             <a:pPr lvl="1"/>
@@ -714,6 +721,7 @@
               <a:rPr lang="zh-CN" altLang="en-US"/>
               <a:t>第二级</a:t>
             </a:r>
+            <a:endParaRPr lang="zh-CN" altLang="en-US"/>
           </a:p>
           <a:p>
             <a:pPr lvl="2"/>
@@ -721,6 +729,7 @@
               <a:rPr lang="zh-CN" altLang="en-US"/>
               <a:t>第三级</a:t>
             </a:r>
+            <a:endParaRPr lang="zh-CN" altLang="en-US"/>
           </a:p>
           <a:p>
             <a:pPr lvl="3"/>
@@ -728,6 +737,7 @@
               <a:rPr lang="zh-CN" altLang="en-US"/>
               <a:t>第四级</a:t>
             </a:r>
+            <a:endParaRPr lang="zh-CN" altLang="en-US"/>
           </a:p>
           <a:p>
             <a:pPr lvl="4"/>
@@ -735,6 +745,7 @@
               <a:rPr lang="zh-CN" altLang="en-US"/>
               <a:t>第五级</a:t>
             </a:r>
+            <a:endParaRPr lang="zh-CN" altLang="en-US"/>
           </a:p>
         </p:txBody>
       </p:sp>
@@ -787,6 +798,7 @@
               <a:rPr lang="zh-CN" altLang="en-US"/>
               <a:t>单击此处编辑母版标题样式</a:t>
             </a:r>
+            <a:endParaRPr lang="zh-CN" altLang="en-US"/>
           </a:p>
         </p:txBody>
       </p:sp>
@@ -815,6 +827,7 @@
               <a:rPr lang="zh-CN" altLang="en-US"/>
               <a:t>编辑母版文本样式</a:t>
             </a:r>
+            <a:endParaRPr lang="zh-CN" altLang="en-US"/>
           </a:p>
           <a:p>
             <a:pPr lvl="1"/>
@@ -822,6 +835,7 @@
               <a:rPr lang="zh-CN" altLang="en-US"/>
               <a:t>第二级</a:t>
             </a:r>
+            <a:endParaRPr lang="zh-CN" altLang="en-US"/>
           </a:p>
           <a:p>
             <a:pPr lvl="2"/>
@@ -829,6 +843,7 @@
               <a:rPr lang="zh-CN" altLang="en-US"/>
               <a:t>第三级</a:t>
             </a:r>
+            <a:endParaRPr lang="zh-CN" altLang="en-US"/>
           </a:p>
           <a:p>
             <a:pPr lvl="3"/>
@@ -836,6 +851,7 @@
               <a:rPr lang="zh-CN" altLang="en-US"/>
               <a:t>第四级</a:t>
             </a:r>
+            <a:endParaRPr lang="zh-CN" altLang="en-US"/>
           </a:p>
           <a:p>
             <a:pPr lvl="4"/>
@@ -843,6 +859,7 @@
               <a:rPr lang="zh-CN" altLang="en-US"/>
               <a:t>第五级</a:t>
             </a:r>
+            <a:endParaRPr lang="zh-CN" altLang="en-US"/>
           </a:p>
         </p:txBody>
       </p:sp>
@@ -890,6 +907,7 @@
               <a:rPr lang="zh-CN" altLang="en-US"/>
               <a:t>单击此处编辑母版标题样式</a:t>
             </a:r>
+            <a:endParaRPr lang="zh-CN" altLang="en-US"/>
           </a:p>
         </p:txBody>
       </p:sp>
@@ -913,6 +931,7 @@
               <a:rPr lang="zh-CN" altLang="en-US"/>
               <a:t>编辑母版文本样式</a:t>
             </a:r>
+            <a:endParaRPr lang="zh-CN" altLang="en-US"/>
           </a:p>
           <a:p>
             <a:pPr lvl="1"/>
@@ -920,6 +939,7 @@
               <a:rPr lang="zh-CN" altLang="en-US"/>
               <a:t>第二级</a:t>
             </a:r>
+            <a:endParaRPr lang="zh-CN" altLang="en-US"/>
           </a:p>
           <a:p>
             <a:pPr lvl="2"/>
@@ -927,6 +947,7 @@
               <a:rPr lang="zh-CN" altLang="en-US"/>
               <a:t>第三级</a:t>
             </a:r>
+            <a:endParaRPr lang="zh-CN" altLang="en-US"/>
           </a:p>
           <a:p>
             <a:pPr lvl="3"/>
@@ -934,6 +955,7 @@
               <a:rPr lang="zh-CN" altLang="en-US"/>
               <a:t>第四级</a:t>
             </a:r>
+            <a:endParaRPr lang="zh-CN" altLang="en-US"/>
           </a:p>
           <a:p>
             <a:pPr lvl="4"/>
@@ -941,6 +963,7 @@
               <a:rPr lang="zh-CN" altLang="en-US"/>
               <a:t>第五级</a:t>
             </a:r>
+            <a:endParaRPr lang="zh-CN" altLang="en-US"/>
           </a:p>
         </p:txBody>
       </p:sp>
@@ -997,6 +1020,7 @@
               <a:rPr lang="zh-CN" altLang="en-US"/>
               <a:t>单击此处编辑母版标题样式</a:t>
             </a:r>
+            <a:endParaRPr lang="zh-CN" altLang="en-US"/>
           </a:p>
         </p:txBody>
       </p:sp>
@@ -1116,6 +1140,7 @@
               <a:rPr lang="zh-CN" altLang="en-US"/>
               <a:t>编辑母版文本样式</a:t>
             </a:r>
+            <a:endParaRPr lang="zh-CN" altLang="en-US"/>
           </a:p>
         </p:txBody>
       </p:sp>
@@ -1163,6 +1188,7 @@
               <a:rPr lang="zh-CN" altLang="en-US"/>
               <a:t>单击此处编辑母版标题样式</a:t>
             </a:r>
+            <a:endParaRPr lang="zh-CN" altLang="en-US"/>
           </a:p>
         </p:txBody>
       </p:sp>
@@ -1191,6 +1217,7 @@
               <a:rPr lang="zh-CN" altLang="en-US"/>
               <a:t>编辑母版文本样式</a:t>
             </a:r>
+            <a:endParaRPr lang="zh-CN" altLang="en-US"/>
           </a:p>
           <a:p>
             <a:pPr lvl="1"/>
@@ -1198,6 +1225,7 @@
               <a:rPr lang="zh-CN" altLang="en-US"/>
               <a:t>第二级</a:t>
             </a:r>
+            <a:endParaRPr lang="zh-CN" altLang="en-US"/>
           </a:p>
           <a:p>
             <a:pPr lvl="2"/>
@@ -1205,6 +1233,7 @@
               <a:rPr lang="zh-CN" altLang="en-US"/>
               <a:t>第三级</a:t>
             </a:r>
+            <a:endParaRPr lang="zh-CN" altLang="en-US"/>
           </a:p>
           <a:p>
             <a:pPr lvl="3"/>
@@ -1212,6 +1241,7 @@
               <a:rPr lang="zh-CN" altLang="en-US"/>
               <a:t>第四级</a:t>
             </a:r>
+            <a:endParaRPr lang="zh-CN" altLang="en-US"/>
           </a:p>
           <a:p>
             <a:pPr lvl="4"/>
@@ -1219,6 +1249,7 @@
               <a:rPr lang="zh-CN" altLang="en-US"/>
               <a:t>第五级</a:t>
             </a:r>
+            <a:endParaRPr lang="zh-CN" altLang="en-US"/>
           </a:p>
         </p:txBody>
       </p:sp>
@@ -1247,6 +1278,7 @@
               <a:rPr lang="zh-CN" altLang="en-US"/>
               <a:t>编辑母版文本样式</a:t>
             </a:r>
+            <a:endParaRPr lang="zh-CN" altLang="en-US"/>
           </a:p>
           <a:p>
             <a:pPr lvl="1"/>
@@ -1254,6 +1286,7 @@
               <a:rPr lang="zh-CN" altLang="en-US"/>
               <a:t>第二级</a:t>
             </a:r>
+            <a:endParaRPr lang="zh-CN" altLang="en-US"/>
           </a:p>
           <a:p>
             <a:pPr lvl="2"/>
@@ -1261,6 +1294,7 @@
               <a:rPr lang="zh-CN" altLang="en-US"/>
               <a:t>第三级</a:t>
             </a:r>
+            <a:endParaRPr lang="zh-CN" altLang="en-US"/>
           </a:p>
           <a:p>
             <a:pPr lvl="3"/>
@@ -1268,6 +1302,7 @@
               <a:rPr lang="zh-CN" altLang="en-US"/>
               <a:t>第四级</a:t>
             </a:r>
+            <a:endParaRPr lang="zh-CN" altLang="en-US"/>
           </a:p>
           <a:p>
             <a:pPr lvl="4"/>
@@ -1275,6 +1310,7 @@
               <a:rPr lang="zh-CN" altLang="en-US"/>
               <a:t>第五级</a:t>
             </a:r>
+            <a:endParaRPr lang="zh-CN" altLang="en-US"/>
           </a:p>
         </p:txBody>
       </p:sp>
@@ -1327,6 +1363,7 @@
               <a:rPr lang="zh-CN" altLang="en-US"/>
               <a:t>单击此处编辑母版标题样式</a:t>
             </a:r>
+            <a:endParaRPr lang="zh-CN" altLang="en-US"/>
           </a:p>
         </p:txBody>
       </p:sp>
@@ -1392,6 +1429,7 @@
               <a:rPr lang="zh-CN" altLang="en-US"/>
               <a:t>编辑母版文本样式</a:t>
             </a:r>
+            <a:endParaRPr lang="zh-CN" altLang="en-US"/>
           </a:p>
         </p:txBody>
       </p:sp>
@@ -1420,6 +1458,7 @@
               <a:rPr lang="zh-CN" altLang="en-US"/>
               <a:t>编辑母版文本样式</a:t>
             </a:r>
+            <a:endParaRPr lang="zh-CN" altLang="en-US"/>
           </a:p>
           <a:p>
             <a:pPr lvl="1"/>
@@ -1427,6 +1466,7 @@
               <a:rPr lang="zh-CN" altLang="en-US"/>
               <a:t>第二级</a:t>
             </a:r>
+            <a:endParaRPr lang="zh-CN" altLang="en-US"/>
           </a:p>
           <a:p>
             <a:pPr lvl="2"/>
@@ -1434,6 +1474,7 @@
               <a:rPr lang="zh-CN" altLang="en-US"/>
               <a:t>第三级</a:t>
             </a:r>
+            <a:endParaRPr lang="zh-CN" altLang="en-US"/>
           </a:p>
           <a:p>
             <a:pPr lvl="3"/>
@@ -1441,6 +1482,7 @@
               <a:rPr lang="zh-CN" altLang="en-US"/>
               <a:t>第四级</a:t>
             </a:r>
+            <a:endParaRPr lang="zh-CN" altLang="en-US"/>
           </a:p>
           <a:p>
             <a:pPr lvl="4"/>
@@ -1448,6 +1490,7 @@
               <a:rPr lang="zh-CN" altLang="en-US"/>
               <a:t>第五级</a:t>
             </a:r>
+            <a:endParaRPr lang="zh-CN" altLang="en-US"/>
           </a:p>
         </p:txBody>
       </p:sp>
@@ -1513,6 +1556,7 @@
               <a:rPr lang="zh-CN" altLang="en-US"/>
               <a:t>编辑母版文本样式</a:t>
             </a:r>
+            <a:endParaRPr lang="zh-CN" altLang="en-US"/>
           </a:p>
         </p:txBody>
       </p:sp>
@@ -1541,6 +1585,7 @@
               <a:rPr lang="zh-CN" altLang="en-US"/>
               <a:t>编辑母版文本样式</a:t>
             </a:r>
+            <a:endParaRPr lang="zh-CN" altLang="en-US"/>
           </a:p>
           <a:p>
             <a:pPr lvl="1"/>
@@ -1548,6 +1593,7 @@
               <a:rPr lang="zh-CN" altLang="en-US"/>
               <a:t>第二级</a:t>
             </a:r>
+            <a:endParaRPr lang="zh-CN" altLang="en-US"/>
           </a:p>
           <a:p>
             <a:pPr lvl="2"/>
@@ -1555,6 +1601,7 @@
               <a:rPr lang="zh-CN" altLang="en-US"/>
               <a:t>第三级</a:t>
             </a:r>
+            <a:endParaRPr lang="zh-CN" altLang="en-US"/>
           </a:p>
           <a:p>
             <a:pPr lvl="3"/>
@@ -1562,6 +1609,7 @@
               <a:rPr lang="zh-CN" altLang="en-US"/>
               <a:t>第四级</a:t>
             </a:r>
+            <a:endParaRPr lang="zh-CN" altLang="en-US"/>
           </a:p>
           <a:p>
             <a:pPr lvl="4"/>
@@ -1569,6 +1617,7 @@
               <a:rPr lang="zh-CN" altLang="en-US"/>
               <a:t>第五级</a:t>
             </a:r>
+            <a:endParaRPr lang="zh-CN" altLang="en-US"/>
           </a:p>
         </p:txBody>
       </p:sp>
@@ -1616,6 +1665,7 @@
               <a:rPr lang="zh-CN" altLang="en-US"/>
               <a:t>单击此处编辑母版标题样式</a:t>
             </a:r>
+            <a:endParaRPr lang="zh-CN" altLang="en-US"/>
           </a:p>
         </p:txBody>
       </p:sp>
@@ -1697,6 +1747,7 @@
               <a:rPr lang="zh-CN" altLang="en-US"/>
               <a:t>单击此处编辑母版标题样式</a:t>
             </a:r>
+            <a:endParaRPr lang="zh-CN" altLang="en-US"/>
           </a:p>
         </p:txBody>
       </p:sp>
@@ -1753,6 +1804,7 @@
               <a:rPr lang="zh-CN" altLang="en-US"/>
               <a:t>编辑母版文本样式</a:t>
             </a:r>
+            <a:endParaRPr lang="zh-CN" altLang="en-US"/>
           </a:p>
           <a:p>
             <a:pPr lvl="1"/>
@@ -1760,6 +1812,7 @@
               <a:rPr lang="zh-CN" altLang="en-US"/>
               <a:t>第二级</a:t>
             </a:r>
+            <a:endParaRPr lang="zh-CN" altLang="en-US"/>
           </a:p>
           <a:p>
             <a:pPr lvl="2"/>
@@ -1767,6 +1820,7 @@
               <a:rPr lang="zh-CN" altLang="en-US"/>
               <a:t>第三级</a:t>
             </a:r>
+            <a:endParaRPr lang="zh-CN" altLang="en-US"/>
           </a:p>
           <a:p>
             <a:pPr lvl="3"/>
@@ -1774,6 +1828,7 @@
               <a:rPr lang="zh-CN" altLang="en-US"/>
               <a:t>第四级</a:t>
             </a:r>
+            <a:endParaRPr lang="zh-CN" altLang="en-US"/>
           </a:p>
           <a:p>
             <a:pPr lvl="4"/>
@@ -1781,6 +1836,7 @@
               <a:rPr lang="zh-CN" altLang="en-US"/>
               <a:t>第五级</a:t>
             </a:r>
+            <a:endParaRPr lang="zh-CN" altLang="en-US"/>
           </a:p>
         </p:txBody>
       </p:sp>
@@ -1846,6 +1902,7 @@
               <a:rPr lang="zh-CN" altLang="en-US"/>
               <a:t>编辑母版文本样式</a:t>
             </a:r>
+            <a:endParaRPr lang="zh-CN" altLang="en-US"/>
           </a:p>
         </p:txBody>
       </p:sp>
@@ -1902,6 +1959,7 @@
               <a:rPr lang="zh-CN" altLang="en-US"/>
               <a:t>单击此处编辑母版标题样式</a:t>
             </a:r>
+            <a:endParaRPr lang="zh-CN" altLang="en-US"/>
           </a:p>
         </p:txBody>
       </p:sp>
@@ -1966,6 +2024,7 @@
               <a:rPr lang="zh-CN" altLang="en-US"/>
               <a:t>单击图标添加图片</a:t>
             </a:r>
+            <a:endParaRPr lang="zh-CN" altLang="en-US"/>
           </a:p>
         </p:txBody>
       </p:sp>
@@ -2031,6 +2090,7 @@
               <a:rPr lang="zh-CN" altLang="en-US"/>
               <a:t>编辑母版文本样式</a:t>
             </a:r>
+            <a:endParaRPr lang="zh-CN" altLang="en-US"/>
           </a:p>
         </p:txBody>
       </p:sp>
@@ -2093,6 +2153,7 @@
               <a:rPr lang="zh-CN" altLang="en-US"/>
               <a:t>单击此处编辑母版标题样式</a:t>
             </a:r>
+            <a:endParaRPr lang="zh-CN" altLang="en-US"/>
           </a:p>
         </p:txBody>
       </p:sp>
@@ -2126,6 +2187,7 @@
               <a:rPr lang="zh-CN" altLang="en-US" dirty="0"/>
               <a:t>编辑母版文本样式</a:t>
             </a:r>
+            <a:endParaRPr lang="zh-CN" altLang="en-US" dirty="0"/>
           </a:p>
           <a:p>
             <a:pPr lvl="1"/>
@@ -2133,6 +2195,7 @@
               <a:rPr lang="zh-CN" altLang="en-US" dirty="0"/>
               <a:t>第二级</a:t>
             </a:r>
+            <a:endParaRPr lang="zh-CN" altLang="en-US" dirty="0"/>
           </a:p>
           <a:p>
             <a:pPr lvl="2"/>
@@ -2140,6 +2203,7 @@
               <a:rPr lang="zh-CN" altLang="en-US" dirty="0"/>
               <a:t>第三级</a:t>
             </a:r>
+            <a:endParaRPr lang="zh-CN" altLang="en-US" dirty="0"/>
           </a:p>
           <a:p>
             <a:pPr lvl="3"/>
@@ -2147,6 +2211,7 @@
               <a:rPr lang="zh-CN" altLang="en-US" dirty="0"/>
               <a:t>第四级</a:t>
             </a:r>
+            <a:endParaRPr lang="zh-CN" altLang="en-US" dirty="0"/>
           </a:p>
           <a:p>
             <a:pPr lvl="4"/>
@@ -2154,6 +2219,7 @@
               <a:rPr lang="zh-CN" altLang="en-US" dirty="0"/>
               <a:t>第五级</a:t>
             </a:r>
+            <a:endParaRPr lang="zh-CN" altLang="en-US" dirty="0"/>
           </a:p>
         </p:txBody>
       </p:sp>
@@ -2202,7 +2268,7 @@
         <a:spcBef>
           <a:spcPts val="1000"/>
         </a:spcBef>
-        <a:buFont typeface="Arial" panose="020B0604020202090204" pitchFamily="34" charset="0"/>
+        <a:buFont typeface="Arial" panose="020B0604020202020204" pitchFamily="34" charset="0"/>
         <a:buChar char="•"/>
         <a:defRPr sz="2800" kern="1200">
           <a:solidFill>
@@ -2220,7 +2286,7 @@
         <a:spcBef>
           <a:spcPts val="500"/>
         </a:spcBef>
-        <a:buFont typeface="Arial" panose="020B0604020202090204" pitchFamily="34" charset="0"/>
+        <a:buFont typeface="Arial" panose="020B0604020202020204" pitchFamily="34" charset="0"/>
         <a:buChar char="•"/>
         <a:defRPr sz="2400" kern="1200">
           <a:solidFill>
@@ -2238,7 +2304,7 @@
         <a:spcBef>
           <a:spcPts val="500"/>
         </a:spcBef>
-        <a:buFont typeface="Arial" panose="020B0604020202090204" pitchFamily="34" charset="0"/>
+        <a:buFont typeface="Arial" panose="020B0604020202020204" pitchFamily="34" charset="0"/>
         <a:buChar char="•"/>
         <a:defRPr sz="2000" kern="1200">
           <a:solidFill>
@@ -2256,7 +2322,7 @@
         <a:spcBef>
           <a:spcPts val="500"/>
         </a:spcBef>
-        <a:buFont typeface="Arial" panose="020B0604020202090204" pitchFamily="34" charset="0"/>
+        <a:buFont typeface="Arial" panose="020B0604020202020204" pitchFamily="34" charset="0"/>
         <a:buChar char="•"/>
         <a:defRPr sz="1800" kern="1200">
           <a:solidFill>
@@ -2274,7 +2340,7 @@
         <a:spcBef>
           <a:spcPts val="500"/>
         </a:spcBef>
-        <a:buFont typeface="Arial" panose="020B0604020202090204" pitchFamily="34" charset="0"/>
+        <a:buFont typeface="Arial" panose="020B0604020202020204" pitchFamily="34" charset="0"/>
         <a:buChar char="•"/>
         <a:defRPr sz="1800" kern="1200">
           <a:solidFill>
@@ -2292,7 +2358,7 @@
         <a:spcBef>
           <a:spcPts val="500"/>
         </a:spcBef>
-        <a:buFont typeface="Arial" panose="020B0604020202090204" pitchFamily="34" charset="0"/>
+        <a:buFont typeface="Arial" panose="020B0604020202020204" pitchFamily="34" charset="0"/>
         <a:buChar char="•"/>
         <a:defRPr sz="1800" kern="1200">
           <a:solidFill>
@@ -2310,7 +2376,7 @@
         <a:spcBef>
           <a:spcPts val="500"/>
         </a:spcBef>
-        <a:buFont typeface="Arial" panose="020B0604020202090204" pitchFamily="34" charset="0"/>
+        <a:buFont typeface="Arial" panose="020B0604020202020204" pitchFamily="34" charset="0"/>
         <a:buChar char="•"/>
         <a:defRPr sz="1800" kern="1200">
           <a:solidFill>
@@ -2328,7 +2394,7 @@
         <a:spcBef>
           <a:spcPts val="500"/>
         </a:spcBef>
-        <a:buFont typeface="Arial" panose="020B0604020202090204" pitchFamily="34" charset="0"/>
+        <a:buFont typeface="Arial" panose="020B0604020202020204" pitchFamily="34" charset="0"/>
         <a:buChar char="•"/>
         <a:defRPr sz="1800" kern="1200">
           <a:solidFill>
@@ -2346,7 +2412,7 @@
         <a:spcBef>
           <a:spcPts val="500"/>
         </a:spcBef>
-        <a:buFont typeface="Arial" panose="020B0604020202090204" pitchFamily="34" charset="0"/>
+        <a:buFont typeface="Arial" panose="020B0604020202020204" pitchFamily="34" charset="0"/>
         <a:buChar char="•"/>
         <a:defRPr sz="1800" kern="1200">
           <a:solidFill>
@@ -2476,16 +2542,16 @@
       </p:grpSpPr>
       <p:grpSp>
         <p:nvGrpSpPr>
-          <p:cNvPr id="149" name="Group 148"/>
+          <p:cNvPr id="5" name="组合 4"/>
           <p:cNvGrpSpPr/>
           <p:nvPr/>
         </p:nvGrpSpPr>
         <p:grpSpPr>
           <a:xfrm>
-            <a:off x="1283295" y="1301842"/>
-            <a:ext cx="8801470" cy="4063459"/>
-            <a:chOff x="1283295" y="1301842"/>
-            <a:chExt cx="8801470" cy="4063459"/>
+            <a:off x="1283335" y="1301750"/>
+            <a:ext cx="8801735" cy="4063365"/>
+            <a:chOff x="2021" y="2050"/>
+            <a:chExt cx="13861" cy="6399"/>
           </a:xfrm>
         </p:grpSpPr>
         <p:sp>
@@ -2496,8 +2562,8 @@
           </p:nvSpPr>
           <p:spPr>
             <a:xfrm>
-              <a:off x="1994124" y="1811355"/>
-              <a:ext cx="1992353" cy="626555"/>
+              <a:off x="3140" y="2853"/>
+              <a:ext cx="3138" cy="987"/>
             </a:xfrm>
             <a:prstGeom prst="rect">
               <a:avLst/>
@@ -2553,6 +2619,11 @@
                 </a:rPr>
                 <a:t>ID</a:t>
               </a:r>
+              <a:endParaRPr lang="en-US" altLang="zh-CN" sz="1200" dirty="0">
+                <a:solidFill>
+                  <a:schemeClr val="tx1"/>
+                </a:solidFill>
+              </a:endParaRPr>
             </a:p>
             <a:p>
               <a:r>
@@ -2579,6 +2650,11 @@
                 </a:rPr>
                 <a:t>String</a:t>
               </a:r>
+              <a:endParaRPr lang="en-US" altLang="zh-CN" sz="1200" dirty="0">
+                <a:solidFill>
+                  <a:schemeClr val="tx1"/>
+                </a:solidFill>
+              </a:endParaRPr>
             </a:p>
             <a:p>
               <a:r>
@@ -2613,6 +2689,11 @@
                 </a:rPr>
                 <a:t>Boolean</a:t>
               </a:r>
+              <a:endParaRPr lang="en-US" altLang="zh-CN" sz="1200" dirty="0">
+                <a:solidFill>
+                  <a:schemeClr val="tx1"/>
+                </a:solidFill>
+              </a:endParaRPr>
             </a:p>
           </p:txBody>
         </p:sp>
@@ -2624,8 +2705,8 @@
           </p:nvSpPr>
           <p:spPr>
             <a:xfrm>
-              <a:off x="1994124" y="1422117"/>
-              <a:ext cx="1992353" cy="387178"/>
+              <a:off x="3140" y="2240"/>
+              <a:ext cx="3138" cy="610"/>
             </a:xfrm>
             <a:prstGeom prst="rect">
               <a:avLst/>
@@ -2687,8 +2768,8 @@
           </p:nvSpPr>
           <p:spPr>
             <a:xfrm>
-              <a:off x="1994124" y="3981030"/>
-              <a:ext cx="1992353" cy="694031"/>
+              <a:off x="3140" y="6269"/>
+              <a:ext cx="3138" cy="1093"/>
             </a:xfrm>
             <a:prstGeom prst="rect">
               <a:avLst/>
@@ -2744,6 +2825,11 @@
                 </a:rPr>
                 <a:t>ID</a:t>
               </a:r>
+              <a:endParaRPr lang="en-US" altLang="zh-CN" sz="1200" dirty="0">
+                <a:solidFill>
+                  <a:schemeClr val="tx1"/>
+                </a:solidFill>
+              </a:endParaRPr>
             </a:p>
             <a:p>
               <a:r>
@@ -2770,6 +2856,11 @@
                 </a:rPr>
                 <a:t>String</a:t>
               </a:r>
+              <a:endParaRPr lang="en-US" altLang="zh-CN" sz="1200" dirty="0">
+                <a:solidFill>
+                  <a:schemeClr val="tx1"/>
+                </a:solidFill>
+              </a:endParaRPr>
             </a:p>
             <a:p>
               <a:r>
@@ -2804,6 +2895,11 @@
                 </a:rPr>
                 <a:t>Boolean</a:t>
               </a:r>
+              <a:endParaRPr lang="en-US" altLang="zh-CN" sz="1200" dirty="0">
+                <a:solidFill>
+                  <a:schemeClr val="tx1"/>
+                </a:solidFill>
+              </a:endParaRPr>
             </a:p>
           </p:txBody>
         </p:sp>
@@ -2815,8 +2911,8 @@
           </p:nvSpPr>
           <p:spPr>
             <a:xfrm>
-              <a:off x="1994124" y="3591792"/>
-              <a:ext cx="1992353" cy="387178"/>
+              <a:off x="3140" y="5656"/>
+              <a:ext cx="3138" cy="610"/>
             </a:xfrm>
             <a:prstGeom prst="rect">
               <a:avLst/>
@@ -2877,8 +2973,8 @@
           </p:nvSpPr>
           <p:spPr>
             <a:xfrm>
-              <a:off x="5001036" y="2630368"/>
-              <a:ext cx="2010538" cy="851378"/>
+              <a:off x="7876" y="4142"/>
+              <a:ext cx="3166" cy="1341"/>
             </a:xfrm>
             <a:prstGeom prst="rect">
               <a:avLst/>
@@ -2934,6 +3030,11 @@
                 </a:rPr>
                 <a:t>ID</a:t>
               </a:r>
+              <a:endParaRPr lang="en-US" altLang="zh-CN" sz="1200" dirty="0">
+                <a:solidFill>
+                  <a:schemeClr val="tx1"/>
+                </a:solidFill>
+              </a:endParaRPr>
             </a:p>
             <a:p>
               <a:r>
@@ -3015,6 +3116,11 @@
                 </a:rPr>
                 <a:t>Boolean</a:t>
               </a:r>
+              <a:endParaRPr lang="en-US" altLang="zh-CN" sz="1200" dirty="0">
+                <a:solidFill>
+                  <a:schemeClr val="tx1"/>
+                </a:solidFill>
+              </a:endParaRPr>
             </a:p>
             <a:p>
               <a:r>
@@ -3073,8 +3179,8 @@
           </p:nvSpPr>
           <p:spPr>
             <a:xfrm>
-              <a:off x="5001036" y="2241129"/>
-              <a:ext cx="2010536" cy="387178"/>
+              <a:off x="7876" y="3529"/>
+              <a:ext cx="3166" cy="610"/>
             </a:xfrm>
             <a:prstGeom prst="rect">
               <a:avLst/>
@@ -3135,9 +3241,9 @@
             <p:nvPr/>
           </p:nvGrpSpPr>
           <p:grpSpPr>
-            <a:xfrm>
-              <a:off x="8092412" y="2231373"/>
-              <a:ext cx="1992353" cy="1250373"/>
+            <a:xfrm rot="0">
+              <a:off x="12744" y="3514"/>
+              <a:ext cx="3138" cy="1969"/>
               <a:chOff x="8543646" y="2231373"/>
               <a:chExt cx="1992353" cy="1250373"/>
             </a:xfrm>
@@ -3207,6 +3313,11 @@
                   </a:rPr>
                   <a:t>ID</a:t>
                 </a:r>
+                <a:endParaRPr lang="en-US" altLang="zh-CN" sz="1200" dirty="0">
+                  <a:solidFill>
+                    <a:schemeClr val="tx1"/>
+                  </a:solidFill>
+                </a:endParaRPr>
               </a:p>
               <a:p>
                 <a:r>
@@ -3233,6 +3344,11 @@
                   </a:rPr>
                   <a:t>String</a:t>
                 </a:r>
+                <a:endParaRPr lang="en-US" altLang="zh-CN" sz="1200" dirty="0">
+                  <a:solidFill>
+                    <a:schemeClr val="tx1"/>
+                  </a:solidFill>
+                </a:endParaRPr>
               </a:p>
               <a:p>
                 <a:r>
@@ -3350,8 +3466,8 @@
           </p:nvCxnSpPr>
           <p:spPr>
             <a:xfrm>
-              <a:off x="3986477" y="1615706"/>
-              <a:ext cx="1014559" cy="1440351"/>
+              <a:off x="6278" y="2544"/>
+              <a:ext cx="1598" cy="2268"/>
             </a:xfrm>
             <a:prstGeom prst="bentConnector3">
               <a:avLst>
@@ -3362,7 +3478,7 @@
               <a:solidFill>
                 <a:schemeClr val="tx1"/>
               </a:solidFill>
-              <a:prstDash val="solid"/>
+              <a:prstDash val="lgDash"/>
               <a:tailEnd type="triangle"/>
             </a:ln>
             <a:effectLst/>
@@ -3393,8 +3509,8 @@
           </p:nvCxnSpPr>
           <p:spPr>
             <a:xfrm flipV="1">
-              <a:off x="3986477" y="3249000"/>
-              <a:ext cx="1022923" cy="536381"/>
+              <a:off x="6278" y="5117"/>
+              <a:ext cx="1611" cy="845"/>
             </a:xfrm>
             <a:prstGeom prst="bentConnector3">
               <a:avLst>
@@ -3405,6 +3521,7 @@
               <a:solidFill>
                 <a:schemeClr val="tx1"/>
               </a:solidFill>
+              <a:prstDash val="lgDash"/>
               <a:tailEnd type="triangle"/>
             </a:ln>
             <a:effectLst/>
@@ -3428,7 +3545,6 @@
           <p:nvCxnSpPr>
             <p:cNvPr id="28" name="Straight Arrow Connector 27"/>
             <p:cNvCxnSpPr>
-              <a:cxnSpLocks/>
               <a:stCxn id="9" idx="2"/>
               <a:endCxn id="13" idx="0"/>
             </p:cNvCxnSpPr>
@@ -3436,8 +3552,8 @@
           </p:nvCxnSpPr>
           <p:spPr>
             <a:xfrm>
-              <a:off x="2990301" y="2437910"/>
-              <a:ext cx="0" cy="1153882"/>
+              <a:off x="4709" y="3839"/>
+              <a:ext cx="0" cy="1817"/>
             </a:xfrm>
             <a:prstGeom prst="straightConnector1">
               <a:avLst/>
@@ -3446,6 +3562,7 @@
               <a:solidFill>
                 <a:schemeClr val="tx1"/>
               </a:solidFill>
+              <a:prstDash val="lgDash"/>
               <a:tailEnd type="triangle"/>
             </a:ln>
             <a:effectLst/>
@@ -3476,8 +3593,8 @@
           </p:nvCxnSpPr>
           <p:spPr>
             <a:xfrm rot="10800000" flipV="1">
-              <a:off x="7011574" y="3055027"/>
-              <a:ext cx="1080838" cy="1030"/>
+              <a:off x="11042" y="4811"/>
+              <a:ext cx="1702" cy="2"/>
             </a:xfrm>
             <a:prstGeom prst="bentConnector3">
               <a:avLst/>
@@ -3486,7 +3603,7 @@
               <a:solidFill>
                 <a:schemeClr val="tx1"/>
               </a:solidFill>
-              <a:prstDash val="lgDash"/>
+              <a:prstDash val="solid"/>
               <a:tailEnd type="triangle"/>
             </a:ln>
             <a:effectLst/>
@@ -3514,8 +3631,8 @@
           </p:nvSpPr>
           <p:spPr>
             <a:xfrm>
-              <a:off x="4001179" y="1301842"/>
-              <a:ext cx="465192" cy="276999"/>
+              <a:off x="6301" y="2050"/>
+              <a:ext cx="733" cy="436"/>
             </a:xfrm>
             <a:prstGeom prst="rect">
               <a:avLst/>
@@ -3544,8 +3661,8 @@
           </p:nvSpPr>
           <p:spPr>
             <a:xfrm>
-              <a:off x="7263292" y="3055026"/>
-              <a:ext cx="577402" cy="276999"/>
+              <a:off x="11438" y="4811"/>
+              <a:ext cx="909" cy="436"/>
             </a:xfrm>
             <a:prstGeom prst="rect">
               <a:avLst/>
@@ -3573,9 +3690,9 @@
             <p:nvPr/>
           </p:nvGrpSpPr>
           <p:grpSpPr>
-            <a:xfrm>
-              <a:off x="5000985" y="4287884"/>
-              <a:ext cx="2010595" cy="1077417"/>
+            <a:xfrm rot="0">
+              <a:off x="7876" y="6753"/>
+              <a:ext cx="3166" cy="1697"/>
               <a:chOff x="2789712" y="3039762"/>
               <a:chExt cx="2010595" cy="1077417"/>
             </a:xfrm>
@@ -3645,6 +3762,11 @@
                   </a:rPr>
                   <a:t>ID</a:t>
                 </a:r>
+                <a:endParaRPr lang="en-US" altLang="zh-CN" sz="1200" dirty="0">
+                  <a:solidFill>
+                    <a:schemeClr val="tx1"/>
+                  </a:solidFill>
+                </a:endParaRPr>
               </a:p>
               <a:p>
                 <a:r>
@@ -3695,6 +3817,11 @@
                   </a:rPr>
                   <a:t>Integer</a:t>
                 </a:r>
+                <a:endParaRPr lang="en-US" altLang="zh-CN" sz="1200" dirty="0">
+                  <a:solidFill>
+                    <a:schemeClr val="tx1"/>
+                  </a:solidFill>
+                </a:endParaRPr>
               </a:p>
               <a:p>
                 <a:r>
@@ -3812,8 +3939,8 @@
           </p:nvCxnSpPr>
           <p:spPr>
             <a:xfrm rot="10800000" flipH="1" flipV="1">
-              <a:off x="1994124" y="1615706"/>
-              <a:ext cx="2994228" cy="3605350"/>
+              <a:off x="3140" y="2544"/>
+              <a:ext cx="4715" cy="5678"/>
             </a:xfrm>
             <a:prstGeom prst="bentConnector3">
               <a:avLst>
@@ -3824,6 +3951,7 @@
               <a:solidFill>
                 <a:schemeClr val="tx1"/>
               </a:solidFill>
+              <a:prstDash val="lgDash"/>
               <a:tailEnd type="triangle"/>
             </a:ln>
             <a:effectLst/>
@@ -3854,8 +3982,8 @@
           </p:nvCxnSpPr>
           <p:spPr>
             <a:xfrm rot="10800000" flipH="1" flipV="1">
-              <a:off x="1994123" y="3785380"/>
-              <a:ext cx="3006861" cy="1235831"/>
+              <a:off x="3140" y="5961"/>
+              <a:ext cx="4735" cy="1946"/>
             </a:xfrm>
             <a:prstGeom prst="bentConnector3">
               <a:avLst>
@@ -3866,6 +3994,7 @@
               <a:solidFill>
                 <a:schemeClr val="tx1"/>
               </a:solidFill>
+              <a:prstDash val="lgDash"/>
               <a:tailEnd type="triangle"/>
             </a:ln>
             <a:effectLst/>
@@ -3893,8 +4022,8 @@
           </p:nvSpPr>
           <p:spPr>
             <a:xfrm>
-              <a:off x="1283295" y="1341811"/>
-              <a:ext cx="543739" cy="276999"/>
+              <a:off x="2021" y="2113"/>
+              <a:ext cx="856" cy="436"/>
             </a:xfrm>
             <a:prstGeom prst="rect">
               <a:avLst/>
@@ -3923,8 +4052,8 @@
           </p:nvSpPr>
           <p:spPr>
             <a:xfrm>
-              <a:off x="1388169" y="3497225"/>
-              <a:ext cx="543739" cy="276999"/>
+              <a:off x="2186" y="5507"/>
+              <a:ext cx="856" cy="436"/>
             </a:xfrm>
             <a:prstGeom prst="rect">
               <a:avLst/>
@@ -3953,8 +4082,8 @@
           </p:nvCxnSpPr>
           <p:spPr>
             <a:xfrm flipV="1">
-              <a:off x="6235241" y="3481746"/>
-              <a:ext cx="0" cy="824620"/>
+              <a:off x="9819" y="5483"/>
+              <a:ext cx="0" cy="1299"/>
             </a:xfrm>
             <a:prstGeom prst="straightConnector1">
               <a:avLst/>
@@ -3963,7 +4092,7 @@
               <a:solidFill>
                 <a:schemeClr val="tx1"/>
               </a:solidFill>
-              <a:prstDash val="dash"/>
+              <a:prstDash val="solid"/>
               <a:tailEnd type="triangle"/>
             </a:ln>
             <a:effectLst/>
@@ -3991,8 +4120,8 @@
           </p:nvSpPr>
           <p:spPr>
             <a:xfrm>
-              <a:off x="6234638" y="3724775"/>
-              <a:ext cx="673582" cy="276999"/>
+              <a:off x="9818" y="5866"/>
+              <a:ext cx="1061" cy="436"/>
             </a:xfrm>
             <a:prstGeom prst="rect">
               <a:avLst/>
@@ -4021,8 +4150,8 @@
           </p:nvSpPr>
           <p:spPr>
             <a:xfrm>
-              <a:off x="2429494" y="2741092"/>
-              <a:ext cx="566181" cy="276999"/>
+              <a:off x="3826" y="4317"/>
+              <a:ext cx="892" cy="436"/>
             </a:xfrm>
             <a:prstGeom prst="rect">
               <a:avLst/>
@@ -4039,6 +4168,7 @@
                 <a:rPr lang="en-US" altLang="zh-CN" sz="1200" dirty="0"/>
                 <a:t>invest</a:t>
               </a:r>
+              <a:endParaRPr lang="en-US" altLang="zh-CN" sz="1200" dirty="0"/>
             </a:p>
           </p:txBody>
         </p:sp>
@@ -4050,8 +4180,8 @@
           </p:nvCxnSpPr>
           <p:spPr>
             <a:xfrm>
-              <a:off x="5763201" y="3521690"/>
-              <a:ext cx="0" cy="766194"/>
+              <a:off x="9076" y="5546"/>
+              <a:ext cx="0" cy="1207"/>
             </a:xfrm>
             <a:prstGeom prst="straightConnector1">
               <a:avLst/>
@@ -4060,7 +4190,7 @@
               <a:solidFill>
                 <a:schemeClr val="tx1"/>
               </a:solidFill>
-              <a:prstDash val="dash"/>
+              <a:prstDash val="solid"/>
               <a:tailEnd type="triangle"/>
             </a:ln>
             <a:effectLst/>
@@ -4088,8 +4218,8 @@
           </p:nvSpPr>
           <p:spPr>
             <a:xfrm>
-              <a:off x="5205331" y="3724775"/>
-              <a:ext cx="553357" cy="276999"/>
+              <a:off x="8197" y="5866"/>
+              <a:ext cx="871" cy="436"/>
             </a:xfrm>
             <a:prstGeom prst="rect">
               <a:avLst/>
@@ -4121,8 +4251,8 @@
           </p:nvCxnSpPr>
           <p:spPr>
             <a:xfrm rot="16200000" flipH="1" flipV="1">
-              <a:off x="5088274" y="2140996"/>
-              <a:ext cx="602697" cy="784253"/>
+              <a:off x="8013" y="3372"/>
+              <a:ext cx="949" cy="1235"/>
             </a:xfrm>
             <a:prstGeom prst="bentConnector4">
               <a:avLst>
@@ -4134,7 +4264,7 @@
               <a:solidFill>
                 <a:schemeClr val="tx1"/>
               </a:solidFill>
-              <a:prstDash val="lgDash"/>
+              <a:prstDash val="solid"/>
               <a:tailEnd type="triangle"/>
             </a:ln>
             <a:effectLst/>
@@ -4162,8 +4292,8 @@
           </p:nvSpPr>
           <p:spPr>
             <a:xfrm>
-              <a:off x="4906078" y="1701083"/>
-              <a:ext cx="688009" cy="276999"/>
+              <a:off x="7726" y="2679"/>
+              <a:ext cx="1083" cy="436"/>
             </a:xfrm>
             <a:prstGeom prst="rect">
               <a:avLst/>
@@ -4180,6 +4310,7 @@
                 <a:rPr lang="en-US" altLang="zh-CN" sz="1200" dirty="0"/>
                 <a:t>transfer</a:t>
               </a:r>
+              <a:endParaRPr lang="en-US" altLang="zh-CN" sz="1200" dirty="0"/>
             </a:p>
           </p:txBody>
         </p:sp>
@@ -4187,7 +4318,6 @@
           <p:nvCxnSpPr>
             <p:cNvPr id="84" name="Elbow Connector 83"/>
             <p:cNvCxnSpPr>
-              <a:cxnSpLocks/>
               <a:stCxn id="12" idx="2"/>
               <a:endCxn id="12" idx="3"/>
             </p:cNvCxnSpPr>
@@ -4195,8 +4325,8 @@
           </p:nvCxnSpPr>
           <p:spPr>
             <a:xfrm rot="5400000" flipH="1" flipV="1">
-              <a:off x="3314881" y="4003466"/>
-              <a:ext cx="347015" cy="996176"/>
+              <a:off x="5220" y="6305"/>
+              <a:ext cx="546" cy="1569"/>
             </a:xfrm>
             <a:prstGeom prst="bentConnector4">
               <a:avLst>
@@ -4208,6 +4338,7 @@
               <a:solidFill>
                 <a:schemeClr val="tx1"/>
               </a:solidFill>
+              <a:prstDash val="lgDash"/>
               <a:tailEnd type="triangle"/>
             </a:ln>
             <a:effectLst/>
@@ -4235,8 +4366,8 @@
           </p:nvSpPr>
           <p:spPr>
             <a:xfrm>
-              <a:off x="3187561" y="4650497"/>
-              <a:ext cx="764322" cy="276999"/>
+              <a:off x="5020" y="7324"/>
+              <a:ext cx="1204" cy="436"/>
             </a:xfrm>
             <a:prstGeom prst="rect">
               <a:avLst/>
@@ -4254,6 +4385,7 @@
                 <a:rPr lang="en-US" altLang="zh-CN" sz="1200" dirty="0"/>
                 <a:t>invest</a:t>
               </a:r>
+              <a:endParaRPr lang="en-US" altLang="zh-CN" sz="1200" dirty="0"/>
             </a:p>
           </p:txBody>
         </p:sp>
@@ -4265,8 +4397,8 @@
           </p:nvSpPr>
           <p:spPr>
             <a:xfrm>
-              <a:off x="4001179" y="3456466"/>
-              <a:ext cx="465192" cy="276999"/>
+              <a:off x="6301" y="5443"/>
+              <a:ext cx="733" cy="436"/>
             </a:xfrm>
             <a:prstGeom prst="rect">
               <a:avLst/>
@@ -4283,6 +4415,7 @@
                 <a:rPr lang="en-US" altLang="zh-CN" sz="1200" dirty="0"/>
                 <a:t>own</a:t>
               </a:r>
+              <a:endParaRPr lang="en-US" altLang="zh-CN" sz="1200" dirty="0"/>
             </a:p>
           </p:txBody>
         </p:sp>
@@ -4297,8 +4430,8 @@
           </p:nvCxnSpPr>
           <p:spPr>
             <a:xfrm rot="16200000" flipH="1">
-              <a:off x="6339125" y="2161000"/>
-              <a:ext cx="601387" cy="745556"/>
+              <a:off x="9983" y="3403"/>
+              <a:ext cx="947" cy="1174"/>
             </a:xfrm>
             <a:prstGeom prst="bentConnector4">
               <a:avLst>
@@ -4310,7 +4443,7 @@
               <a:solidFill>
                 <a:schemeClr val="tx1"/>
               </a:solidFill>
-              <a:prstDash val="lgDash"/>
+              <a:prstDash val="solid"/>
               <a:tailEnd type="triangle"/>
             </a:ln>
             <a:effectLst/>
@@ -4338,8 +4471,8 @@
           </p:nvSpPr>
           <p:spPr>
             <a:xfrm>
-              <a:off x="6335825" y="1701083"/>
-              <a:ext cx="785793" cy="276999"/>
+              <a:off x="9978" y="2679"/>
+              <a:ext cx="1237" cy="436"/>
             </a:xfrm>
             <a:prstGeom prst="rect">
               <a:avLst/>
@@ -4364,7 +4497,6 @@
           <p:nvCxnSpPr>
             <p:cNvPr id="52" name="Elbow Connector 51"/>
             <p:cNvCxnSpPr>
-              <a:cxnSpLocks/>
               <a:stCxn id="9" idx="2"/>
               <a:endCxn id="9" idx="3"/>
             </p:cNvCxnSpPr>
@@ -4372,8 +4504,8 @@
           </p:nvCxnSpPr>
           <p:spPr>
             <a:xfrm rot="5400000" flipH="1" flipV="1">
-              <a:off x="3331750" y="1783184"/>
-              <a:ext cx="313277" cy="996176"/>
+              <a:off x="5247" y="2808"/>
+              <a:ext cx="493" cy="1569"/>
             </a:xfrm>
             <a:prstGeom prst="bentConnector4">
               <a:avLst>
@@ -4385,6 +4517,7 @@
               <a:solidFill>
                 <a:schemeClr val="tx1"/>
               </a:solidFill>
+              <a:prstDash val="lgDash"/>
               <a:tailEnd type="triangle"/>
             </a:ln>
             <a:effectLst/>
@@ -4412,8 +4545,8 @@
           </p:nvSpPr>
           <p:spPr>
             <a:xfrm>
-              <a:off x="3194536" y="2669914"/>
-              <a:ext cx="856325" cy="276999"/>
+              <a:off x="5031" y="4205"/>
+              <a:ext cx="1349" cy="436"/>
             </a:xfrm>
             <a:prstGeom prst="rect">
               <a:avLst/>
@@ -4430,21 +4563,20 @@
                 <a:rPr lang="en-US" altLang="zh-CN" sz="1200" dirty="0"/>
                 <a:t>guarantee</a:t>
               </a:r>
+              <a:endParaRPr lang="en-US" altLang="zh-CN" sz="1200" dirty="0"/>
             </a:p>
           </p:txBody>
         </p:sp>
         <p:cxnSp>
           <p:nvCxnSpPr>
             <p:cNvPr id="59" name="Straight Arrow Connector 58"/>
-            <p:cNvCxnSpPr>
-              <a:cxnSpLocks/>
-            </p:cNvCxnSpPr>
+            <p:cNvCxnSpPr/>
             <p:nvPr/>
           </p:nvCxnSpPr>
           <p:spPr>
             <a:xfrm>
-              <a:off x="2380255" y="2437910"/>
-              <a:ext cx="0" cy="1153882"/>
+              <a:off x="3748" y="3839"/>
+              <a:ext cx="0" cy="1817"/>
             </a:xfrm>
             <a:prstGeom prst="straightConnector1">
               <a:avLst/>
@@ -4453,6 +4585,7 @@
               <a:solidFill>
                 <a:schemeClr val="tx1"/>
               </a:solidFill>
+              <a:prstDash val="lgDash"/>
               <a:tailEnd type="triangle"/>
             </a:ln>
             <a:effectLst/>
@@ -4480,8 +4613,8 @@
           </p:nvSpPr>
           <p:spPr>
             <a:xfrm>
-              <a:off x="1730873" y="2741092"/>
-              <a:ext cx="629734" cy="276999"/>
+              <a:off x="2726" y="4317"/>
+              <a:ext cx="992" cy="436"/>
             </a:xfrm>
             <a:prstGeom prst="rect">
               <a:avLst/>
@@ -4506,7 +4639,6 @@
           <p:nvCxnSpPr>
             <p:cNvPr id="50" name="Elbow Connector 49"/>
             <p:cNvCxnSpPr>
-              <a:cxnSpLocks/>
               <a:stCxn id="12" idx="2"/>
               <a:endCxn id="12" idx="1"/>
             </p:cNvCxnSpPr>
@@ -4514,8 +4646,8 @@
           </p:nvCxnSpPr>
           <p:spPr>
             <a:xfrm rot="5400000" flipH="1">
-              <a:off x="2318705" y="4003466"/>
-              <a:ext cx="347015" cy="996177"/>
+              <a:off x="3652" y="6305"/>
+              <a:ext cx="546" cy="1569"/>
             </a:xfrm>
             <a:prstGeom prst="bentConnector4">
               <a:avLst>
@@ -4527,6 +4659,7 @@
               <a:solidFill>
                 <a:schemeClr val="tx1"/>
               </a:solidFill>
+              <a:prstDash val="lgDash"/>
               <a:tailEnd type="triangle"/>
             </a:ln>
             <a:effectLst/>
@@ -4554,8 +4687,8 @@
           </p:nvSpPr>
           <p:spPr>
             <a:xfrm>
-              <a:off x="1929021" y="4640877"/>
-              <a:ext cx="856325" cy="276999"/>
+              <a:off x="3038" y="7308"/>
+              <a:ext cx="1349" cy="436"/>
             </a:xfrm>
             <a:prstGeom prst="rect">
               <a:avLst/>
@@ -4572,6 +4705,7 @@
                 <a:rPr lang="en-US" altLang="zh-CN" sz="1200" dirty="0"/>
                 <a:t>guarantee</a:t>
               </a:r>
+              <a:endParaRPr lang="en-US" altLang="zh-CN" sz="1200" dirty="0"/>
             </a:p>
           </p:txBody>
         </p:sp>
@@ -4583,8 +4717,8 @@
           </p:nvSpPr>
           <p:spPr>
             <a:xfrm>
-              <a:off x="2445348" y="4475493"/>
-              <a:ext cx="18000" cy="18000"/>
+              <a:off x="3851" y="7048"/>
+              <a:ext cx="28" cy="28"/>
             </a:xfrm>
             <a:prstGeom prst="ellipse">
               <a:avLst/>
@@ -4629,8 +4763,8 @@
           </p:nvSpPr>
           <p:spPr>
             <a:xfrm>
-              <a:off x="3452288" y="4476952"/>
-              <a:ext cx="18000" cy="18000"/>
+              <a:off x="5437" y="7050"/>
+              <a:ext cx="28" cy="28"/>
             </a:xfrm>
             <a:prstGeom prst="ellipse">
               <a:avLst/>
@@ -4675,8 +4809,8 @@
           </p:nvSpPr>
           <p:spPr>
             <a:xfrm>
-              <a:off x="3452288" y="2269728"/>
-              <a:ext cx="18000" cy="18000"/>
+              <a:off x="5437" y="3574"/>
+              <a:ext cx="28" cy="28"/>
             </a:xfrm>
             <a:prstGeom prst="ellipse">
               <a:avLst/>
@@ -4721,8 +4855,8 @@
           </p:nvSpPr>
           <p:spPr>
             <a:xfrm>
-              <a:off x="4991400" y="3240000"/>
-              <a:ext cx="18000" cy="18000"/>
+              <a:off x="7860" y="5102"/>
+              <a:ext cx="28" cy="28"/>
             </a:xfrm>
             <a:prstGeom prst="ellipse">
               <a:avLst/>
@@ -4767,8 +4901,8 @@
           </p:nvSpPr>
           <p:spPr>
             <a:xfrm>
-              <a:off x="4997496" y="3005304"/>
-              <a:ext cx="18000" cy="18000"/>
+              <a:off x="7870" y="4733"/>
+              <a:ext cx="28" cy="28"/>
             </a:xfrm>
             <a:prstGeom prst="ellipse">
               <a:avLst/>
@@ -4813,8 +4947,8 @@
           </p:nvSpPr>
           <p:spPr>
             <a:xfrm>
-              <a:off x="4997496" y="2825472"/>
-              <a:ext cx="18000" cy="18000"/>
+              <a:off x="7870" y="4450"/>
+              <a:ext cx="28" cy="28"/>
             </a:xfrm>
             <a:prstGeom prst="ellipse">
               <a:avLst/>
@@ -4859,8 +4993,8 @@
           </p:nvSpPr>
           <p:spPr>
             <a:xfrm>
-              <a:off x="4988352" y="5212056"/>
-              <a:ext cx="18000" cy="18000"/>
+              <a:off x="7856" y="8208"/>
+              <a:ext cx="28" cy="28"/>
             </a:xfrm>
             <a:prstGeom prst="ellipse">
               <a:avLst/>
@@ -4905,8 +5039,8 @@
           </p:nvSpPr>
           <p:spPr>
             <a:xfrm>
-              <a:off x="6994597" y="2825472"/>
-              <a:ext cx="18000" cy="18000"/>
+              <a:off x="11015" y="4450"/>
+              <a:ext cx="28" cy="28"/>
             </a:xfrm>
             <a:prstGeom prst="ellipse">
               <a:avLst/>
@@ -4951,8 +5085,8 @@
           </p:nvSpPr>
           <p:spPr>
             <a:xfrm>
-              <a:off x="6264405" y="2230449"/>
-              <a:ext cx="18000" cy="18000"/>
+              <a:off x="9865" y="3513"/>
+              <a:ext cx="28" cy="28"/>
             </a:xfrm>
             <a:prstGeom prst="ellipse">
               <a:avLst/>
@@ -4997,8 +5131,8 @@
           </p:nvSpPr>
           <p:spPr>
             <a:xfrm>
-              <a:off x="5772749" y="2231775"/>
-              <a:ext cx="18000" cy="18000"/>
+              <a:off x="9091" y="3515"/>
+              <a:ext cx="28" cy="28"/>
             </a:xfrm>
             <a:prstGeom prst="ellipse">
               <a:avLst/>
@@ -5037,16 +5171,16 @@
         </p:sp>
         <p:grpSp>
           <p:nvGrpSpPr>
-            <p:cNvPr id="140" name="Group 139"/>
+            <p:cNvPr id="3" name="组合 2"/>
             <p:cNvGrpSpPr/>
             <p:nvPr/>
           </p:nvGrpSpPr>
           <p:grpSpPr>
-            <a:xfrm>
-              <a:off x="7743830" y="3871701"/>
-              <a:ext cx="2058538" cy="1163832"/>
-              <a:chOff x="7972430" y="3871701"/>
-              <a:chExt cx="2058538" cy="1163832"/>
+            <a:xfrm rot="0">
+              <a:off x="12195" y="6097"/>
+              <a:ext cx="3242" cy="1832"/>
+              <a:chOff x="12195" y="6097"/>
+              <a:chExt cx="3242" cy="1832"/>
             </a:xfrm>
           </p:grpSpPr>
           <p:sp>
@@ -5059,8 +5193,8 @@
             </p:nvSpPr>
             <p:spPr>
               <a:xfrm>
-                <a:off x="8574063" y="3871701"/>
-                <a:ext cx="1456905" cy="607387"/>
+                <a:off x="13143" y="6097"/>
+                <a:ext cx="2294" cy="957"/>
               </a:xfrm>
               <a:prstGeom prst="rect">
                 <a:avLst/>
@@ -5086,9 +5220,9 @@
                         <a:lumOff val="35000"/>
                       </a:schemeClr>
                     </a:solidFill>
-                    <a:latin typeface="Agency FB" pitchFamily="34" charset="0"/>
-                    <a:ea typeface="微软雅黑" pitchFamily="34" charset="-122"/>
-                    <a:cs typeface="Calibri" pitchFamily="34" charset="0"/>
+                    <a:latin typeface="Agency FB" panose="020B0503020202020204" pitchFamily="34" charset="0"/>
+                    <a:ea typeface="微软雅黑" panose="020B0503020204020204" pitchFamily="34" charset="-122"/>
+                    <a:cs typeface="Calibri" panose="020F0502020204030204" pitchFamily="34" charset="0"/>
                   </a:defRPr>
                 </a:lvl1pPr>
               </a:lstStyle>
@@ -5235,8 +5369,46 @@
             </p:nvCxnSpPr>
             <p:spPr>
               <a:xfrm>
-                <a:off x="7972430" y="4175395"/>
-                <a:ext cx="540000" cy="0"/>
+                <a:off x="12195" y="6575"/>
+                <a:ext cx="850" cy="0"/>
+              </a:xfrm>
+              <a:prstGeom prst="straightConnector1">
+                <a:avLst/>
+              </a:prstGeom>
+              <a:noFill/>
+              <a:ln w="25400" cap="flat">
+                <a:solidFill>
+                  <a:srgbClr val="000000"/>
+                </a:solidFill>
+                <a:prstDash val="lgDash"/>
+                <a:miter lim="400000"/>
+                <a:tailEnd type="triangle"/>
+              </a:ln>
+              <a:effectLst/>
+            </p:spPr>
+            <p:style>
+              <a:lnRef idx="0">
+                <a:scrgbClr r="0" g="0" b="0"/>
+              </a:lnRef>
+              <a:fillRef idx="0">
+                <a:scrgbClr r="0" g="0" b="0"/>
+              </a:fillRef>
+              <a:effectRef idx="0">
+                <a:scrgbClr r="0" g="0" b="0"/>
+              </a:effectRef>
+              <a:fontRef idx="none"/>
+            </p:style>
+          </p:cxnSp>
+          <p:cxnSp>
+            <p:nvCxnSpPr>
+              <p:cNvPr id="136" name="Straight Arrow Connector 135"/>
+              <p:cNvCxnSpPr/>
+              <p:nvPr/>
+            </p:nvCxnSpPr>
+            <p:spPr>
+              <a:xfrm>
+                <a:off x="12195" y="7452"/>
+                <a:ext cx="850" cy="0"/>
               </a:xfrm>
               <a:prstGeom prst="straightConnector1">
                 <a:avLst/>
@@ -5265,44 +5437,6 @@
               <a:fontRef idx="none"/>
             </p:style>
           </p:cxnSp>
-          <p:cxnSp>
-            <p:nvCxnSpPr>
-              <p:cNvPr id="136" name="Straight Arrow Connector 135"/>
-              <p:cNvCxnSpPr/>
-              <p:nvPr/>
-            </p:nvCxnSpPr>
-            <p:spPr>
-              <a:xfrm>
-                <a:off x="7972430" y="4731840"/>
-                <a:ext cx="540000" cy="0"/>
-              </a:xfrm>
-              <a:prstGeom prst="straightConnector1">
-                <a:avLst/>
-              </a:prstGeom>
-              <a:noFill/>
-              <a:ln w="25400" cap="flat">
-                <a:solidFill>
-                  <a:srgbClr val="000000"/>
-                </a:solidFill>
-                <a:prstDash val="dash"/>
-                <a:miter lim="400000"/>
-                <a:tailEnd type="triangle"/>
-              </a:ln>
-              <a:effectLst/>
-            </p:spPr>
-            <p:style>
-              <a:lnRef idx="0">
-                <a:scrgbClr r="0" g="0" b="0"/>
-              </a:lnRef>
-              <a:fillRef idx="0">
-                <a:scrgbClr r="0" g="0" b="0"/>
-              </a:fillRef>
-              <a:effectRef idx="0">
-                <a:scrgbClr r="0" g="0" b="0"/>
-              </a:effectRef>
-              <a:fontRef idx="none"/>
-            </p:style>
-          </p:cxnSp>
           <p:sp>
             <p:nvSpPr>
               <p:cNvPr id="137" name="TextBox 36"/>
@@ -5313,8 +5447,8 @@
             </p:nvSpPr>
             <p:spPr>
               <a:xfrm>
-                <a:off x="8574062" y="4428146"/>
-                <a:ext cx="1456905" cy="607387"/>
+                <a:off x="13143" y="6973"/>
+                <a:ext cx="2294" cy="957"/>
               </a:xfrm>
               <a:prstGeom prst="rect">
                 <a:avLst/>
@@ -5340,9 +5474,9 @@
                         <a:lumOff val="35000"/>
                       </a:schemeClr>
                     </a:solidFill>
-                    <a:latin typeface="Agency FB" pitchFamily="34" charset="0"/>
-                    <a:ea typeface="微软雅黑" pitchFamily="34" charset="-122"/>
-                    <a:cs typeface="Calibri" pitchFamily="34" charset="0"/>
+                    <a:latin typeface="Agency FB" panose="020B0503020202020204" pitchFamily="34" charset="0"/>
+                    <a:ea typeface="微软雅黑" panose="020B0503020204020204" pitchFamily="34" charset="-122"/>
+                    <a:cs typeface="Calibri" panose="020F0502020204030204" pitchFamily="34" charset="0"/>
                   </a:defRPr>
                 </a:lvl1pPr>
               </a:lstStyle>
@@ -5499,7 +5633,7 @@
       </p:grpSpPr>
       <p:grpSp>
         <p:nvGrpSpPr>
-          <p:cNvPr id="2" name="组合 1"/>
+          <p:cNvPr id="3" name="组合 2"/>
           <p:cNvGrpSpPr/>
           <p:nvPr/>
         </p:nvGrpSpPr>
@@ -5507,7 +5641,7 @@
           <a:xfrm>
             <a:off x="4793615" y="2189480"/>
             <a:ext cx="2605405" cy="2479040"/>
-            <a:chOff x="7467" y="2215"/>
+            <a:chOff x="7549" y="3448"/>
             <a:chExt cx="4103" cy="3904"/>
           </a:xfrm>
         </p:grpSpPr>
@@ -5519,7 +5653,7 @@
           </p:nvSpPr>
           <p:spPr>
             <a:xfrm>
-              <a:off x="7876" y="4159"/>
+              <a:off x="7958" y="5392"/>
               <a:ext cx="3694" cy="1960"/>
             </a:xfrm>
             <a:prstGeom prst="rect">
@@ -5576,6 +5710,11 @@
                 </a:rPr>
                 <a:t>ID</a:t>
               </a:r>
+              <a:endParaRPr lang="en-US" altLang="zh-CN" sz="1200" dirty="0">
+                <a:solidFill>
+                  <a:schemeClr val="tx1"/>
+                </a:solidFill>
+              </a:endParaRPr>
             </a:p>
             <a:p>
               <a:r>
@@ -5586,6 +5725,11 @@
                 </a:rPr>
                 <a:t>name: String</a:t>
               </a:r>
+              <a:endParaRPr lang="en-US" altLang="zh-CN" sz="1200" dirty="0">
+                <a:solidFill>
+                  <a:schemeClr val="tx1"/>
+                </a:solidFill>
+              </a:endParaRPr>
             </a:p>
             <a:p>
               <a:r>
@@ -5632,6 +5776,12 @@
                 </a:rPr>
                 <a:t>Integer</a:t>
               </a:r>
+              <a:endParaRPr lang="en-US" altLang="zh-CN" sz="1200" dirty="0">
+                <a:solidFill>
+                  <a:schemeClr val="tx1"/>
+                </a:solidFill>
+                <a:sym typeface="+mn-ea"/>
+              </a:endParaRPr>
             </a:p>
             <a:p>
               <a:r>
@@ -5678,6 +5828,12 @@
                 </a:rPr>
                 <a:t>Integer</a:t>
               </a:r>
+              <a:endParaRPr lang="en-US" altLang="zh-CN" sz="1200" dirty="0">
+                <a:solidFill>
+                  <a:schemeClr val="tx1"/>
+                </a:solidFill>
+                <a:sym typeface="+mn-ea"/>
+              </a:endParaRPr>
             </a:p>
             <a:p>
               <a:r>
@@ -5688,6 +5844,11 @@
                 </a:rPr>
                 <a:t>transHistory: [64-bit Integer]</a:t>
               </a:r>
+              <a:endParaRPr lang="en-US" sz="1200" dirty="0">
+                <a:solidFill>
+                  <a:schemeClr val="tx1"/>
+                </a:solidFill>
+              </a:endParaRPr>
             </a:p>
             <a:p>
               <a:r>
@@ -5698,6 +5859,11 @@
                 </a:rPr>
                 <a:t>versionHistory: [64-bit Integer]</a:t>
               </a:r>
+              <a:endParaRPr lang="en-US" sz="1200" dirty="0">
+                <a:solidFill>
+                  <a:schemeClr val="tx1"/>
+                </a:solidFill>
+              </a:endParaRPr>
             </a:p>
           </p:txBody>
         </p:sp>
@@ -5709,7 +5875,7 @@
           </p:nvSpPr>
           <p:spPr>
             <a:xfrm>
-              <a:off x="7876" y="3546"/>
+              <a:off x="7958" y="4779"/>
               <a:ext cx="3693" cy="598"/>
             </a:xfrm>
             <a:prstGeom prst="rect">
@@ -5775,7 +5941,7 @@
           </p:nvCxnSpPr>
           <p:spPr>
             <a:xfrm rot="16200000" flipH="1" flipV="1">
-              <a:off x="8002" y="3419"/>
+              <a:off x="8084" y="4652"/>
               <a:ext cx="1593" cy="1847"/>
             </a:xfrm>
             <a:prstGeom prst="bentConnector4">
@@ -5788,7 +5954,7 @@
               <a:solidFill>
                 <a:schemeClr val="tx1"/>
               </a:solidFill>
-              <a:prstDash val="lgDash"/>
+              <a:prstDash val="solid"/>
               <a:tailEnd type="triangle"/>
             </a:ln>
             <a:effectLst/>
@@ -5816,7 +5982,7 @@
           </p:nvSpPr>
           <p:spPr>
             <a:xfrm>
-              <a:off x="7467" y="2215"/>
+              <a:off x="7549" y="3448"/>
               <a:ext cx="3693" cy="725"/>
             </a:xfrm>
             <a:prstGeom prst="rect">
@@ -5834,6 +6000,7 @@
                 <a:rPr lang="en-US" altLang="zh-CN" sz="1200" dirty="0"/>
                 <a:t>transfer{amount: 64-bit Integer, versionHistory: [64-bit Integer]}</a:t>
               </a:r>
+              <a:endParaRPr lang="en-US" altLang="zh-CN" sz="1200" dirty="0"/>
             </a:p>
           </p:txBody>
         </p:sp>
@@ -5845,7 +6012,7 @@
           </p:nvSpPr>
           <p:spPr>
             <a:xfrm>
-              <a:off x="7860" y="5119"/>
+              <a:off x="7942" y="6352"/>
               <a:ext cx="29" cy="29"/>
             </a:xfrm>
             <a:prstGeom prst="ellipse">
@@ -5891,7 +6058,7 @@
           </p:nvSpPr>
           <p:spPr>
             <a:xfrm>
-              <a:off x="7870" y="4750"/>
+              <a:off x="7952" y="5983"/>
               <a:ext cx="28" cy="28"/>
             </a:xfrm>
             <a:prstGeom prst="ellipse">
@@ -5937,7 +6104,7 @@
           </p:nvSpPr>
           <p:spPr>
             <a:xfrm>
-              <a:off x="7870" y="4467"/>
+              <a:off x="7952" y="5700"/>
               <a:ext cx="28" cy="28"/>
             </a:xfrm>
             <a:prstGeom prst="ellipse">
@@ -5983,7 +6150,7 @@
           </p:nvSpPr>
           <p:spPr>
             <a:xfrm>
-              <a:off x="11015" y="4467"/>
+              <a:off x="11097" y="5700"/>
               <a:ext cx="28" cy="28"/>
             </a:xfrm>
             <a:prstGeom prst="ellipse">
@@ -6029,7 +6196,7 @@
           </p:nvSpPr>
           <p:spPr>
             <a:xfrm>
-              <a:off x="9865" y="3530"/>
+              <a:off x="9947" y="4763"/>
               <a:ext cx="29" cy="28"/>
             </a:xfrm>
             <a:prstGeom prst="ellipse">
@@ -6075,7 +6242,7 @@
           </p:nvSpPr>
           <p:spPr>
             <a:xfrm>
-              <a:off x="9091" y="3532"/>
+              <a:off x="9173" y="4765"/>
               <a:ext cx="28" cy="28"/>
             </a:xfrm>
             <a:prstGeom prst="ellipse">
@@ -6459,6 +6626,13 @@
     <a:masterClrMapping/>
   </p:clrMapOvr>
 </p:sld>
+</file>
+
+<file path=ppt/tags/tag1.xml><?xml version="1.0" encoding="utf-8"?>
+<p:tagLst xmlns:p="http://schemas.openxmlformats.org/presentationml/2006/main">
+  <p:tag name="KSO_WPP_MARK_KEY" val="3e354841-6969-42a4-9c4a-eb932c12467a"/>
+  <p:tag name="COMMONDATA" val="eyJoZGlkIjoiY2UzZmQ1NDYyMTk1MjkyNjAxNzY5ZmQ2ZjBmNmY2NWYifQ=="/>
+</p:tagLst>
 </file>
 
 <file path=ppt/theme/theme1.xml><?xml version="1.0" encoding="utf-8"?>
@@ -6712,8 +6886,6 @@
       </a:bgFillStyleLst>
     </a:fmtScheme>
   </a:themeElements>
-  <a:objectDefaults/>
-  <a:extraClrSchemeLst/>
   <a:extLst>
     <a:ext uri="{05A4C25C-085E-4340-85A3-A5531E510DB2}">
       <thm15:themeFamily xmlns:thm15="http://schemas.microsoft.com/office/thememl/2012/main" name="Office Theme" id="{62F939B6-93AF-4DB8-9C6B-D6C7DFDC589F}" vid="{4A3C46E8-61CC-4603-A589-7422A47A8E4A}"/>
@@ -6973,8 +7145,6 @@
       </a:bgFillStyleLst>
     </a:fmtScheme>
   </a:themeElements>
-  <a:objectDefaults/>
-  <a:extraClrSchemeLst/>
   <a:extLst>
     <a:ext uri="{05A4C25C-085E-4340-85A3-A5531E510DB2}">
       <thm15:themeFamily xmlns:thm15="http://schemas.microsoft.com/office/thememl/2012/main" name="Office Theme" id="{62F939B6-93AF-4DB8-9C6B-D6C7DFDC589F}" vid="{4A3C46E8-61CC-4603-A589-7422A47A8E4A}"/>

</xml_diff>

<commit_message>
update amount type 64-bit integer to 64-bit float
</commit_message>
<xml_diff>
--- a/figures/schema.pptx
+++ b/figures/schema.pptx
@@ -3815,7 +3815,7 @@
                       <a:schemeClr val="tx1"/>
                     </a:solidFill>
                   </a:rPr>
-                  <a:t>Integer</a:t>
+                  <a:t>Float</a:t>
                 </a:r>
                 <a:endParaRPr lang="en-US" altLang="zh-CN" sz="1200" dirty="0">
                   <a:solidFill>
@@ -3854,9 +3854,9 @@
                       <a:schemeClr val="tx1"/>
                     </a:solidFill>
                   </a:rPr>
-                  <a:t>Integer</a:t>
+                  <a:t>Float</a:t>
                 </a:r>
-                <a:endParaRPr lang="en-US" sz="1200" dirty="0">
+                <a:endParaRPr lang="en-US" altLang="zh-CN" sz="1200" dirty="0">
                   <a:solidFill>
                     <a:schemeClr val="tx1"/>
                   </a:solidFill>
@@ -5633,7 +5633,7 @@
       </p:grpSpPr>
       <p:grpSp>
         <p:nvGrpSpPr>
-          <p:cNvPr id="3" name="组合 2"/>
+          <p:cNvPr id="4" name="组合 3"/>
           <p:cNvGrpSpPr/>
           <p:nvPr/>
         </p:nvGrpSpPr>
@@ -5774,7 +5774,7 @@
                   </a:solidFill>
                   <a:sym typeface="+mn-ea"/>
                 </a:rPr>
-                <a:t>Integer</a:t>
+                <a:t>Float</a:t>
               </a:r>
               <a:endParaRPr lang="en-US" altLang="zh-CN" sz="1200" dirty="0">
                 <a:solidFill>
@@ -5998,7 +5998,11 @@
             <a:p>
               <a:r>
                 <a:rPr lang="en-US" altLang="zh-CN" sz="1200" dirty="0"/>
-                <a:t>transfer{amount: 64-bit Integer, versionHistory: [64-bit Integer]}</a:t>
+                <a:t>transfer{amount: 64-bit </a:t>
+              </a:r>
+              <a:r>
+                <a:rPr lang="en-US" altLang="zh-CN" sz="1200" dirty="0"/>
+                <a:t>Float, versionHistory: [64-bit Integer]}</a:t>
               </a:r>
               <a:endParaRPr lang="en-US" altLang="zh-CN" sz="1200" dirty="0"/>
             </a:p>

</xml_diff>

<commit_message>
update amount type 64-bit integer to 64-bit float (#81)
</commit_message>
<xml_diff>
--- a/figures/schema.pptx
+++ b/figures/schema.pptx
@@ -3815,7 +3815,7 @@
                       <a:schemeClr val="tx1"/>
                     </a:solidFill>
                   </a:rPr>
-                  <a:t>Integer</a:t>
+                  <a:t>Float</a:t>
                 </a:r>
                 <a:endParaRPr lang="en-US" altLang="zh-CN" sz="1200" dirty="0">
                   <a:solidFill>
@@ -3854,9 +3854,9 @@
                       <a:schemeClr val="tx1"/>
                     </a:solidFill>
                   </a:rPr>
-                  <a:t>Integer</a:t>
+                  <a:t>Float</a:t>
                 </a:r>
-                <a:endParaRPr lang="en-US" sz="1200" dirty="0">
+                <a:endParaRPr lang="en-US" altLang="zh-CN" sz="1200" dirty="0">
                   <a:solidFill>
                     <a:schemeClr val="tx1"/>
                   </a:solidFill>
@@ -5633,7 +5633,7 @@
       </p:grpSpPr>
       <p:grpSp>
         <p:nvGrpSpPr>
-          <p:cNvPr id="3" name="组合 2"/>
+          <p:cNvPr id="4" name="组合 3"/>
           <p:cNvGrpSpPr/>
           <p:nvPr/>
         </p:nvGrpSpPr>
@@ -5774,7 +5774,7 @@
                   </a:solidFill>
                   <a:sym typeface="+mn-ea"/>
                 </a:rPr>
-                <a:t>Integer</a:t>
+                <a:t>Float</a:t>
               </a:r>
               <a:endParaRPr lang="en-US" altLang="zh-CN" sz="1200" dirty="0">
                 <a:solidFill>
@@ -5998,7 +5998,11 @@
             <a:p>
               <a:r>
                 <a:rPr lang="en-US" altLang="zh-CN" sz="1200" dirty="0"/>
-                <a:t>transfer{amount: 64-bit Integer, versionHistory: [64-bit Integer]}</a:t>
+                <a:t>transfer{amount: 64-bit </a:t>
+              </a:r>
+              <a:r>
+                <a:rPr lang="en-US" altLang="zh-CN" sz="1200" dirty="0"/>
+                <a:t>Float, versionHistory: [64-bit Integer]}</a:t>
               </a:r>
               <a:endParaRPr lang="en-US" altLang="zh-CN" sz="1200" dirty="0"/>
             </a:p>

</xml_diff>

<commit_message>
delete edge workin (#83)
</commit_message>
<xml_diff>
--- a/figures/schema.pptx
+++ b/figures/schema.pptx
@@ -2542,7 +2542,7 @@
       </p:grpSpPr>
       <p:grpSp>
         <p:nvGrpSpPr>
-          <p:cNvPr id="5" name="组合 4"/>
+          <p:cNvPr id="2" name="组合 1"/>
           <p:cNvGrpSpPr/>
           <p:nvPr/>
         </p:nvGrpSpPr>
@@ -4564,74 +4564,6 @@
                 <a:t>guarantee</a:t>
               </a:r>
               <a:endParaRPr lang="en-US" altLang="zh-CN" sz="1200" dirty="0"/>
-            </a:p>
-          </p:txBody>
-        </p:sp>
-        <p:cxnSp>
-          <p:nvCxnSpPr>
-            <p:cNvPr id="59" name="Straight Arrow Connector 58"/>
-            <p:cNvCxnSpPr/>
-            <p:nvPr/>
-          </p:nvCxnSpPr>
-          <p:spPr>
-            <a:xfrm>
-              <a:off x="3748" y="3839"/>
-              <a:ext cx="0" cy="1817"/>
-            </a:xfrm>
-            <a:prstGeom prst="straightConnector1">
-              <a:avLst/>
-            </a:prstGeom>
-            <a:ln w="19050">
-              <a:solidFill>
-                <a:schemeClr val="tx1"/>
-              </a:solidFill>
-              <a:prstDash val="lgDash"/>
-              <a:tailEnd type="triangle"/>
-            </a:ln>
-            <a:effectLst/>
-          </p:spPr>
-          <p:style>
-            <a:lnRef idx="1">
-              <a:schemeClr val="accent1"/>
-            </a:lnRef>
-            <a:fillRef idx="0">
-              <a:schemeClr val="accent1"/>
-            </a:fillRef>
-            <a:effectRef idx="0">
-              <a:schemeClr val="accent1"/>
-            </a:effectRef>
-            <a:fontRef idx="minor">
-              <a:schemeClr val="tx1"/>
-            </a:fontRef>
-          </p:style>
-        </p:cxnSp>
-        <p:sp>
-          <p:nvSpPr>
-            <p:cNvPr id="7" name="Rectangle 6"/>
-            <p:cNvSpPr/>
-            <p:nvPr/>
-          </p:nvSpPr>
-          <p:spPr>
-            <a:xfrm>
-              <a:off x="2726" y="4317"/>
-              <a:ext cx="992" cy="436"/>
-            </a:xfrm>
-            <a:prstGeom prst="rect">
-              <a:avLst/>
-            </a:prstGeom>
-          </p:spPr>
-          <p:txBody>
-            <a:bodyPr wrap="square">
-              <a:spAutoFit/>
-            </a:bodyPr>
-            <a:lstStyle/>
-            <a:p>
-              <a:pPr algn="ctr"/>
-              <a:r>
-                <a:rPr lang="en-US" altLang="zh-CN" sz="1200" dirty="0" err="1"/>
-                <a:t>workIn</a:t>
-              </a:r>
-              <a:endParaRPr lang="en-US" sz="1200" dirty="0"/>
             </a:p>
           </p:txBody>
         </p:sp>

</xml_diff>

<commit_message>
fix #39 : enrich the properites of vertices and edges (#89)
</commit_message>
<xml_diff>
--- a/figures/schema.pptx
+++ b/figures/schema.pptx
@@ -8,14 +8,14 @@
     <p:notesMasterId r:id="rId5"/>
   </p:notesMasterIdLst>
   <p:sldIdLst>
-    <p:sldId id="415" r:id="rId3"/>
-    <p:sldId id="417" r:id="rId4"/>
-    <p:sldId id="416" r:id="rId6"/>
+    <p:sldId id="415" r:id="rId2"/>
+    <p:sldId id="417" r:id="rId3"/>
+    <p:sldId id="416" r:id="rId4"/>
   </p:sldIdLst>
   <p:sldSz cx="12192000" cy="6858000"/>
   <p:notesSz cx="6858000" cy="9144000"/>
   <p:custDataLst>
-    <p:tags r:id="rId10"/>
+    <p:tags r:id="rId6"/>
   </p:custDataLst>
   <p:defaultTextStyle>
     <a:defPPr>
@@ -124,6 +124,9 @@
         </p14:section>
       </p14:sectionLst>
     </p:ext>
+    <p:ext uri="{EFAFB233-063F-42B5-8137-9DF3F51BA10A}">
+      <p15:sldGuideLst xmlns:p15="http://schemas.microsoft.com/office/powerpoint/2012/main"/>
+    </p:ext>
   </p:extLst>
 </p:presentation>
 </file>
@@ -210,6 +213,7 @@
           <a:p>
             <a:fld id="{CAD4BD24-A097-4F9D-85E9-6A2A24CA2D98}" type="datetimeFigureOut">
               <a:rPr lang="zh-CN" altLang="en-US" smtClean="0"/>
+              <a:t>2023/5/31</a:t>
             </a:fld>
             <a:endParaRPr lang="zh-CN" altLang="en-US"/>
           </a:p>
@@ -276,7 +280,6 @@
               <a:rPr lang="zh-CN" altLang="en-US"/>
               <a:t>单击此处编辑母版文本样式</a:t>
             </a:r>
-            <a:endParaRPr lang="zh-CN" altLang="en-US"/>
           </a:p>
           <a:p>
             <a:pPr lvl="1"/>
@@ -284,7 +287,6 @@
               <a:rPr lang="zh-CN" altLang="en-US"/>
               <a:t>第二级</a:t>
             </a:r>
-            <a:endParaRPr lang="zh-CN" altLang="en-US"/>
           </a:p>
           <a:p>
             <a:pPr lvl="2"/>
@@ -292,7 +294,6 @@
               <a:rPr lang="zh-CN" altLang="en-US"/>
               <a:t>第三级</a:t>
             </a:r>
-            <a:endParaRPr lang="zh-CN" altLang="en-US"/>
           </a:p>
           <a:p>
             <a:pPr lvl="3"/>
@@ -300,7 +301,6 @@
               <a:rPr lang="zh-CN" altLang="en-US"/>
               <a:t>第四级</a:t>
             </a:r>
-            <a:endParaRPr lang="zh-CN" altLang="en-US"/>
           </a:p>
           <a:p>
             <a:pPr lvl="4"/>
@@ -308,7 +308,6 @@
               <a:rPr lang="zh-CN" altLang="en-US"/>
               <a:t>第五级</a:t>
             </a:r>
-            <a:endParaRPr lang="zh-CN" altLang="en-US"/>
           </a:p>
         </p:txBody>
       </p:sp>
@@ -372,6 +371,7 @@
           <a:p>
             <a:fld id="{4F292EE1-EB42-416D-BE21-6D6219010E5F}" type="slidenum">
               <a:rPr lang="zh-CN" altLang="en-US" smtClean="0"/>
+              <a:t>‹#›</a:t>
             </a:fld>
             <a:endParaRPr lang="zh-CN" altLang="en-US"/>
           </a:p>
@@ -576,7 +576,6 @@
               <a:rPr lang="zh-CN" altLang="en-US"/>
               <a:t>单击此处编辑母版标题样式</a:t>
             </a:r>
-            <a:endParaRPr lang="zh-CN" altLang="en-US"/>
           </a:p>
         </p:txBody>
       </p:sp>
@@ -641,7 +640,6 @@
               <a:rPr lang="zh-CN" altLang="en-US"/>
               <a:t>单击此处编辑母版副标题样式</a:t>
             </a:r>
-            <a:endParaRPr lang="zh-CN" altLang="en-US"/>
           </a:p>
         </p:txBody>
       </p:sp>
@@ -689,7 +687,6 @@
               <a:rPr lang="zh-CN" altLang="en-US"/>
               <a:t>单击此处编辑母版标题样式</a:t>
             </a:r>
-            <a:endParaRPr lang="zh-CN" altLang="en-US"/>
           </a:p>
         </p:txBody>
       </p:sp>
@@ -713,7 +710,6 @@
               <a:rPr lang="zh-CN" altLang="en-US"/>
               <a:t>编辑母版文本样式</a:t>
             </a:r>
-            <a:endParaRPr lang="zh-CN" altLang="en-US"/>
           </a:p>
           <a:p>
             <a:pPr lvl="1"/>
@@ -721,7 +717,6 @@
               <a:rPr lang="zh-CN" altLang="en-US"/>
               <a:t>第二级</a:t>
             </a:r>
-            <a:endParaRPr lang="zh-CN" altLang="en-US"/>
           </a:p>
           <a:p>
             <a:pPr lvl="2"/>
@@ -729,7 +724,6 @@
               <a:rPr lang="zh-CN" altLang="en-US"/>
               <a:t>第三级</a:t>
             </a:r>
-            <a:endParaRPr lang="zh-CN" altLang="en-US"/>
           </a:p>
           <a:p>
             <a:pPr lvl="3"/>
@@ -737,7 +731,6 @@
               <a:rPr lang="zh-CN" altLang="en-US"/>
               <a:t>第四级</a:t>
             </a:r>
-            <a:endParaRPr lang="zh-CN" altLang="en-US"/>
           </a:p>
           <a:p>
             <a:pPr lvl="4"/>
@@ -745,7 +738,6 @@
               <a:rPr lang="zh-CN" altLang="en-US"/>
               <a:t>第五级</a:t>
             </a:r>
-            <a:endParaRPr lang="zh-CN" altLang="en-US"/>
           </a:p>
         </p:txBody>
       </p:sp>
@@ -798,7 +790,6 @@
               <a:rPr lang="zh-CN" altLang="en-US"/>
               <a:t>单击此处编辑母版标题样式</a:t>
             </a:r>
-            <a:endParaRPr lang="zh-CN" altLang="en-US"/>
           </a:p>
         </p:txBody>
       </p:sp>
@@ -827,7 +818,6 @@
               <a:rPr lang="zh-CN" altLang="en-US"/>
               <a:t>编辑母版文本样式</a:t>
             </a:r>
-            <a:endParaRPr lang="zh-CN" altLang="en-US"/>
           </a:p>
           <a:p>
             <a:pPr lvl="1"/>
@@ -835,7 +825,6 @@
               <a:rPr lang="zh-CN" altLang="en-US"/>
               <a:t>第二级</a:t>
             </a:r>
-            <a:endParaRPr lang="zh-CN" altLang="en-US"/>
           </a:p>
           <a:p>
             <a:pPr lvl="2"/>
@@ -843,7 +832,6 @@
               <a:rPr lang="zh-CN" altLang="en-US"/>
               <a:t>第三级</a:t>
             </a:r>
-            <a:endParaRPr lang="zh-CN" altLang="en-US"/>
           </a:p>
           <a:p>
             <a:pPr lvl="3"/>
@@ -851,7 +839,6 @@
               <a:rPr lang="zh-CN" altLang="en-US"/>
               <a:t>第四级</a:t>
             </a:r>
-            <a:endParaRPr lang="zh-CN" altLang="en-US"/>
           </a:p>
           <a:p>
             <a:pPr lvl="4"/>
@@ -859,7 +846,6 @@
               <a:rPr lang="zh-CN" altLang="en-US"/>
               <a:t>第五级</a:t>
             </a:r>
-            <a:endParaRPr lang="zh-CN" altLang="en-US"/>
           </a:p>
         </p:txBody>
       </p:sp>
@@ -907,7 +893,6 @@
               <a:rPr lang="zh-CN" altLang="en-US"/>
               <a:t>单击此处编辑母版标题样式</a:t>
             </a:r>
-            <a:endParaRPr lang="zh-CN" altLang="en-US"/>
           </a:p>
         </p:txBody>
       </p:sp>
@@ -931,7 +916,6 @@
               <a:rPr lang="zh-CN" altLang="en-US"/>
               <a:t>编辑母版文本样式</a:t>
             </a:r>
-            <a:endParaRPr lang="zh-CN" altLang="en-US"/>
           </a:p>
           <a:p>
             <a:pPr lvl="1"/>
@@ -939,7 +923,6 @@
               <a:rPr lang="zh-CN" altLang="en-US"/>
               <a:t>第二级</a:t>
             </a:r>
-            <a:endParaRPr lang="zh-CN" altLang="en-US"/>
           </a:p>
           <a:p>
             <a:pPr lvl="2"/>
@@ -947,7 +930,6 @@
               <a:rPr lang="zh-CN" altLang="en-US"/>
               <a:t>第三级</a:t>
             </a:r>
-            <a:endParaRPr lang="zh-CN" altLang="en-US"/>
           </a:p>
           <a:p>
             <a:pPr lvl="3"/>
@@ -955,7 +937,6 @@
               <a:rPr lang="zh-CN" altLang="en-US"/>
               <a:t>第四级</a:t>
             </a:r>
-            <a:endParaRPr lang="zh-CN" altLang="en-US"/>
           </a:p>
           <a:p>
             <a:pPr lvl="4"/>
@@ -963,7 +944,6 @@
               <a:rPr lang="zh-CN" altLang="en-US"/>
               <a:t>第五级</a:t>
             </a:r>
-            <a:endParaRPr lang="zh-CN" altLang="en-US"/>
           </a:p>
         </p:txBody>
       </p:sp>
@@ -1020,7 +1000,6 @@
               <a:rPr lang="zh-CN" altLang="en-US"/>
               <a:t>单击此处编辑母版标题样式</a:t>
             </a:r>
-            <a:endParaRPr lang="zh-CN" altLang="en-US"/>
           </a:p>
         </p:txBody>
       </p:sp>
@@ -1140,7 +1119,6 @@
               <a:rPr lang="zh-CN" altLang="en-US"/>
               <a:t>编辑母版文本样式</a:t>
             </a:r>
-            <a:endParaRPr lang="zh-CN" altLang="en-US"/>
           </a:p>
         </p:txBody>
       </p:sp>
@@ -1188,7 +1166,6 @@
               <a:rPr lang="zh-CN" altLang="en-US"/>
               <a:t>单击此处编辑母版标题样式</a:t>
             </a:r>
-            <a:endParaRPr lang="zh-CN" altLang="en-US"/>
           </a:p>
         </p:txBody>
       </p:sp>
@@ -1217,7 +1194,6 @@
               <a:rPr lang="zh-CN" altLang="en-US"/>
               <a:t>编辑母版文本样式</a:t>
             </a:r>
-            <a:endParaRPr lang="zh-CN" altLang="en-US"/>
           </a:p>
           <a:p>
             <a:pPr lvl="1"/>
@@ -1225,7 +1201,6 @@
               <a:rPr lang="zh-CN" altLang="en-US"/>
               <a:t>第二级</a:t>
             </a:r>
-            <a:endParaRPr lang="zh-CN" altLang="en-US"/>
           </a:p>
           <a:p>
             <a:pPr lvl="2"/>
@@ -1233,7 +1208,6 @@
               <a:rPr lang="zh-CN" altLang="en-US"/>
               <a:t>第三级</a:t>
             </a:r>
-            <a:endParaRPr lang="zh-CN" altLang="en-US"/>
           </a:p>
           <a:p>
             <a:pPr lvl="3"/>
@@ -1241,7 +1215,6 @@
               <a:rPr lang="zh-CN" altLang="en-US"/>
               <a:t>第四级</a:t>
             </a:r>
-            <a:endParaRPr lang="zh-CN" altLang="en-US"/>
           </a:p>
           <a:p>
             <a:pPr lvl="4"/>
@@ -1249,7 +1222,6 @@
               <a:rPr lang="zh-CN" altLang="en-US"/>
               <a:t>第五级</a:t>
             </a:r>
-            <a:endParaRPr lang="zh-CN" altLang="en-US"/>
           </a:p>
         </p:txBody>
       </p:sp>
@@ -1278,7 +1250,6 @@
               <a:rPr lang="zh-CN" altLang="en-US"/>
               <a:t>编辑母版文本样式</a:t>
             </a:r>
-            <a:endParaRPr lang="zh-CN" altLang="en-US"/>
           </a:p>
           <a:p>
             <a:pPr lvl="1"/>
@@ -1286,7 +1257,6 @@
               <a:rPr lang="zh-CN" altLang="en-US"/>
               <a:t>第二级</a:t>
             </a:r>
-            <a:endParaRPr lang="zh-CN" altLang="en-US"/>
           </a:p>
           <a:p>
             <a:pPr lvl="2"/>
@@ -1294,7 +1264,6 @@
               <a:rPr lang="zh-CN" altLang="en-US"/>
               <a:t>第三级</a:t>
             </a:r>
-            <a:endParaRPr lang="zh-CN" altLang="en-US"/>
           </a:p>
           <a:p>
             <a:pPr lvl="3"/>
@@ -1302,7 +1271,6 @@
               <a:rPr lang="zh-CN" altLang="en-US"/>
               <a:t>第四级</a:t>
             </a:r>
-            <a:endParaRPr lang="zh-CN" altLang="en-US"/>
           </a:p>
           <a:p>
             <a:pPr lvl="4"/>
@@ -1310,7 +1278,6 @@
               <a:rPr lang="zh-CN" altLang="en-US"/>
               <a:t>第五级</a:t>
             </a:r>
-            <a:endParaRPr lang="zh-CN" altLang="en-US"/>
           </a:p>
         </p:txBody>
       </p:sp>
@@ -1363,7 +1330,6 @@
               <a:rPr lang="zh-CN" altLang="en-US"/>
               <a:t>单击此处编辑母版标题样式</a:t>
             </a:r>
-            <a:endParaRPr lang="zh-CN" altLang="en-US"/>
           </a:p>
         </p:txBody>
       </p:sp>
@@ -1429,7 +1395,6 @@
               <a:rPr lang="zh-CN" altLang="en-US"/>
               <a:t>编辑母版文本样式</a:t>
             </a:r>
-            <a:endParaRPr lang="zh-CN" altLang="en-US"/>
           </a:p>
         </p:txBody>
       </p:sp>
@@ -1458,7 +1423,6 @@
               <a:rPr lang="zh-CN" altLang="en-US"/>
               <a:t>编辑母版文本样式</a:t>
             </a:r>
-            <a:endParaRPr lang="zh-CN" altLang="en-US"/>
           </a:p>
           <a:p>
             <a:pPr lvl="1"/>
@@ -1466,7 +1430,6 @@
               <a:rPr lang="zh-CN" altLang="en-US"/>
               <a:t>第二级</a:t>
             </a:r>
-            <a:endParaRPr lang="zh-CN" altLang="en-US"/>
           </a:p>
           <a:p>
             <a:pPr lvl="2"/>
@@ -1474,7 +1437,6 @@
               <a:rPr lang="zh-CN" altLang="en-US"/>
               <a:t>第三级</a:t>
             </a:r>
-            <a:endParaRPr lang="zh-CN" altLang="en-US"/>
           </a:p>
           <a:p>
             <a:pPr lvl="3"/>
@@ -1482,7 +1444,6 @@
               <a:rPr lang="zh-CN" altLang="en-US"/>
               <a:t>第四级</a:t>
             </a:r>
-            <a:endParaRPr lang="zh-CN" altLang="en-US"/>
           </a:p>
           <a:p>
             <a:pPr lvl="4"/>
@@ -1490,7 +1451,6 @@
               <a:rPr lang="zh-CN" altLang="en-US"/>
               <a:t>第五级</a:t>
             </a:r>
-            <a:endParaRPr lang="zh-CN" altLang="en-US"/>
           </a:p>
         </p:txBody>
       </p:sp>
@@ -1556,7 +1516,6 @@
               <a:rPr lang="zh-CN" altLang="en-US"/>
               <a:t>编辑母版文本样式</a:t>
             </a:r>
-            <a:endParaRPr lang="zh-CN" altLang="en-US"/>
           </a:p>
         </p:txBody>
       </p:sp>
@@ -1585,7 +1544,6 @@
               <a:rPr lang="zh-CN" altLang="en-US"/>
               <a:t>编辑母版文本样式</a:t>
             </a:r>
-            <a:endParaRPr lang="zh-CN" altLang="en-US"/>
           </a:p>
           <a:p>
             <a:pPr lvl="1"/>
@@ -1593,7 +1551,6 @@
               <a:rPr lang="zh-CN" altLang="en-US"/>
               <a:t>第二级</a:t>
             </a:r>
-            <a:endParaRPr lang="zh-CN" altLang="en-US"/>
           </a:p>
           <a:p>
             <a:pPr lvl="2"/>
@@ -1601,7 +1558,6 @@
               <a:rPr lang="zh-CN" altLang="en-US"/>
               <a:t>第三级</a:t>
             </a:r>
-            <a:endParaRPr lang="zh-CN" altLang="en-US"/>
           </a:p>
           <a:p>
             <a:pPr lvl="3"/>
@@ -1609,7 +1565,6 @@
               <a:rPr lang="zh-CN" altLang="en-US"/>
               <a:t>第四级</a:t>
             </a:r>
-            <a:endParaRPr lang="zh-CN" altLang="en-US"/>
           </a:p>
           <a:p>
             <a:pPr lvl="4"/>
@@ -1617,7 +1572,6 @@
               <a:rPr lang="zh-CN" altLang="en-US"/>
               <a:t>第五级</a:t>
             </a:r>
-            <a:endParaRPr lang="zh-CN" altLang="en-US"/>
           </a:p>
         </p:txBody>
       </p:sp>
@@ -1665,7 +1619,6 @@
               <a:rPr lang="zh-CN" altLang="en-US"/>
               <a:t>单击此处编辑母版标题样式</a:t>
             </a:r>
-            <a:endParaRPr lang="zh-CN" altLang="en-US"/>
           </a:p>
         </p:txBody>
       </p:sp>
@@ -1747,7 +1700,6 @@
               <a:rPr lang="zh-CN" altLang="en-US"/>
               <a:t>单击此处编辑母版标题样式</a:t>
             </a:r>
-            <a:endParaRPr lang="zh-CN" altLang="en-US"/>
           </a:p>
         </p:txBody>
       </p:sp>
@@ -1804,7 +1756,6 @@
               <a:rPr lang="zh-CN" altLang="en-US"/>
               <a:t>编辑母版文本样式</a:t>
             </a:r>
-            <a:endParaRPr lang="zh-CN" altLang="en-US"/>
           </a:p>
           <a:p>
             <a:pPr lvl="1"/>
@@ -1812,7 +1763,6 @@
               <a:rPr lang="zh-CN" altLang="en-US"/>
               <a:t>第二级</a:t>
             </a:r>
-            <a:endParaRPr lang="zh-CN" altLang="en-US"/>
           </a:p>
           <a:p>
             <a:pPr lvl="2"/>
@@ -1820,7 +1770,6 @@
               <a:rPr lang="zh-CN" altLang="en-US"/>
               <a:t>第三级</a:t>
             </a:r>
-            <a:endParaRPr lang="zh-CN" altLang="en-US"/>
           </a:p>
           <a:p>
             <a:pPr lvl="3"/>
@@ -1828,7 +1777,6 @@
               <a:rPr lang="zh-CN" altLang="en-US"/>
               <a:t>第四级</a:t>
             </a:r>
-            <a:endParaRPr lang="zh-CN" altLang="en-US"/>
           </a:p>
           <a:p>
             <a:pPr lvl="4"/>
@@ -1836,7 +1784,6 @@
               <a:rPr lang="zh-CN" altLang="en-US"/>
               <a:t>第五级</a:t>
             </a:r>
-            <a:endParaRPr lang="zh-CN" altLang="en-US"/>
           </a:p>
         </p:txBody>
       </p:sp>
@@ -1902,7 +1849,6 @@
               <a:rPr lang="zh-CN" altLang="en-US"/>
               <a:t>编辑母版文本样式</a:t>
             </a:r>
-            <a:endParaRPr lang="zh-CN" altLang="en-US"/>
           </a:p>
         </p:txBody>
       </p:sp>
@@ -1959,7 +1905,6 @@
               <a:rPr lang="zh-CN" altLang="en-US"/>
               <a:t>单击此处编辑母版标题样式</a:t>
             </a:r>
-            <a:endParaRPr lang="zh-CN" altLang="en-US"/>
           </a:p>
         </p:txBody>
       </p:sp>
@@ -2024,7 +1969,6 @@
               <a:rPr lang="zh-CN" altLang="en-US"/>
               <a:t>单击图标添加图片</a:t>
             </a:r>
-            <a:endParaRPr lang="zh-CN" altLang="en-US"/>
           </a:p>
         </p:txBody>
       </p:sp>
@@ -2090,7 +2034,6 @@
               <a:rPr lang="zh-CN" altLang="en-US"/>
               <a:t>编辑母版文本样式</a:t>
             </a:r>
-            <a:endParaRPr lang="zh-CN" altLang="en-US"/>
           </a:p>
         </p:txBody>
       </p:sp>
@@ -2153,7 +2096,6 @@
               <a:rPr lang="zh-CN" altLang="en-US"/>
               <a:t>单击此处编辑母版标题样式</a:t>
             </a:r>
-            <a:endParaRPr lang="zh-CN" altLang="en-US"/>
           </a:p>
         </p:txBody>
       </p:sp>
@@ -2187,7 +2129,6 @@
               <a:rPr lang="zh-CN" altLang="en-US" dirty="0"/>
               <a:t>编辑母版文本样式</a:t>
             </a:r>
-            <a:endParaRPr lang="zh-CN" altLang="en-US" dirty="0"/>
           </a:p>
           <a:p>
             <a:pPr lvl="1"/>
@@ -2195,7 +2136,6 @@
               <a:rPr lang="zh-CN" altLang="en-US" dirty="0"/>
               <a:t>第二级</a:t>
             </a:r>
-            <a:endParaRPr lang="zh-CN" altLang="en-US" dirty="0"/>
           </a:p>
           <a:p>
             <a:pPr lvl="2"/>
@@ -2203,7 +2143,6 @@
               <a:rPr lang="zh-CN" altLang="en-US" dirty="0"/>
               <a:t>第三级</a:t>
             </a:r>
-            <a:endParaRPr lang="zh-CN" altLang="en-US" dirty="0"/>
           </a:p>
           <a:p>
             <a:pPr lvl="3"/>
@@ -2211,7 +2150,6 @@
               <a:rPr lang="zh-CN" altLang="en-US" dirty="0"/>
               <a:t>第四级</a:t>
             </a:r>
-            <a:endParaRPr lang="zh-CN" altLang="en-US" dirty="0"/>
           </a:p>
           <a:p>
             <a:pPr lvl="4"/>
@@ -2219,7 +2157,6 @@
               <a:rPr lang="zh-CN" altLang="en-US" dirty="0"/>
               <a:t>第五级</a:t>
             </a:r>
-            <a:endParaRPr lang="zh-CN" altLang="en-US" dirty="0"/>
           </a:p>
         </p:txBody>
       </p:sp>
@@ -2542,28 +2479,350 @@
       </p:grpSpPr>
       <p:grpSp>
         <p:nvGrpSpPr>
-          <p:cNvPr id="2" name="组合 1"/>
+          <p:cNvPr id="38" name="Group 37">
+            <a:extLst>
+              <a:ext uri="{FF2B5EF4-FFF2-40B4-BE49-F238E27FC236}">
+                <a16:creationId xmlns:a16="http://schemas.microsoft.com/office/drawing/2014/main" id="{FDE60ED2-7EEF-2490-77A6-92DA3E9D3F34}"/>
+              </a:ext>
+            </a:extLst>
+          </p:cNvPr>
           <p:cNvGrpSpPr/>
           <p:nvPr/>
         </p:nvGrpSpPr>
         <p:grpSpPr>
           <a:xfrm>
-            <a:off x="1283335" y="1301750"/>
-            <a:ext cx="8801735" cy="4063365"/>
-            <a:chOff x="2021" y="2050"/>
-            <a:chExt cx="13861" cy="6399"/>
+            <a:off x="1601386" y="890269"/>
+            <a:ext cx="9255676" cy="5250274"/>
+            <a:chOff x="1601386" y="890269"/>
+            <a:chExt cx="9255676" cy="5250274"/>
           </a:xfrm>
         </p:grpSpPr>
+        <p:grpSp>
+          <p:nvGrpSpPr>
+            <p:cNvPr id="14" name="Group 13">
+              <a:extLst>
+                <a:ext uri="{FF2B5EF4-FFF2-40B4-BE49-F238E27FC236}">
+                  <a16:creationId xmlns:a16="http://schemas.microsoft.com/office/drawing/2014/main" id="{AAB5EBB0-BA5F-38C3-996D-76EA3B6590BC}"/>
+                </a:ext>
+              </a:extLst>
+            </p:cNvPr>
+            <p:cNvGrpSpPr/>
+            <p:nvPr/>
+          </p:nvGrpSpPr>
+          <p:grpSpPr>
+            <a:xfrm>
+              <a:off x="2311951" y="890269"/>
+              <a:ext cx="1992630" cy="1630112"/>
+              <a:chOff x="1993900" y="1027760"/>
+              <a:chExt cx="1992630" cy="1630112"/>
+            </a:xfrm>
+          </p:grpSpPr>
+          <p:sp>
+            <p:nvSpPr>
+              <p:cNvPr id="9" name="Rectangle 8"/>
+              <p:cNvSpPr/>
+              <p:nvPr/>
+            </p:nvSpPr>
+            <p:spPr>
+              <a:xfrm>
+                <a:off x="1993900" y="1417319"/>
+                <a:ext cx="1992630" cy="1240553"/>
+              </a:xfrm>
+              <a:prstGeom prst="rect">
+                <a:avLst/>
+              </a:prstGeom>
+              <a:noFill/>
+              <a:ln w="22225">
+                <a:solidFill>
+                  <a:schemeClr val="tx1"/>
+                </a:solidFill>
+              </a:ln>
+            </p:spPr>
+            <p:style>
+              <a:lnRef idx="2">
+                <a:schemeClr val="accent1">
+                  <a:shade val="50000"/>
+                </a:schemeClr>
+              </a:lnRef>
+              <a:fillRef idx="1">
+                <a:schemeClr val="accent1"/>
+              </a:fillRef>
+              <a:effectRef idx="0">
+                <a:schemeClr val="accent1"/>
+              </a:effectRef>
+              <a:fontRef idx="minor">
+                <a:schemeClr val="lt1"/>
+              </a:fontRef>
+            </p:style>
+            <p:txBody>
+              <a:bodyPr rtlCol="0" anchor="ctr"/>
+              <a:lstStyle/>
+              <a:p>
+                <a:r>
+                  <a:rPr lang="en-US" altLang="zh-CN" sz="1000" dirty="0">
+                    <a:solidFill>
+                      <a:schemeClr val="tx1"/>
+                    </a:solidFill>
+                  </a:rPr>
+                  <a:t>id:</a:t>
+                </a:r>
+                <a:r>
+                  <a:rPr lang="zh-CN" altLang="en-US" sz="1000" dirty="0">
+                    <a:solidFill>
+                      <a:schemeClr val="tx1"/>
+                    </a:solidFill>
+                  </a:rPr>
+                  <a:t> </a:t>
+                </a:r>
+                <a:r>
+                  <a:rPr lang="en-US" altLang="zh-CN" sz="1000" dirty="0">
+                    <a:solidFill>
+                      <a:schemeClr val="tx1"/>
+                    </a:solidFill>
+                  </a:rPr>
+                  <a:t>ID</a:t>
+                </a:r>
+              </a:p>
+              <a:p>
+                <a:r>
+                  <a:rPr lang="en-US" altLang="zh-CN" sz="1000" dirty="0">
+                    <a:solidFill>
+                      <a:schemeClr val="tx1"/>
+                    </a:solidFill>
+                  </a:rPr>
+                  <a:t>name:</a:t>
+                </a:r>
+                <a:r>
+                  <a:rPr lang="zh-CN" altLang="en-US" sz="1000" dirty="0">
+                    <a:solidFill>
+                      <a:schemeClr val="tx1"/>
+                    </a:solidFill>
+                  </a:rPr>
+                  <a:t> </a:t>
+                </a:r>
+                <a:r>
+                  <a:rPr lang="en-US" altLang="zh-CN" sz="1000" dirty="0">
+                    <a:solidFill>
+                      <a:schemeClr val="tx1"/>
+                    </a:solidFill>
+                  </a:rPr>
+                  <a:t>String</a:t>
+                </a:r>
+              </a:p>
+              <a:p>
+                <a:r>
+                  <a:rPr lang="en-US" altLang="zh-CN" sz="1000" dirty="0" err="1">
+                    <a:solidFill>
+                      <a:schemeClr val="tx1"/>
+                    </a:solidFill>
+                  </a:rPr>
+                  <a:t>isBlocked</a:t>
+                </a:r>
+                <a:r>
+                  <a:rPr lang="en-US" altLang="zh-CN" sz="1000" dirty="0">
+                    <a:solidFill>
+                      <a:schemeClr val="tx1"/>
+                    </a:solidFill>
+                  </a:rPr>
+                  <a:t>:</a:t>
+                </a:r>
+                <a:r>
+                  <a:rPr lang="zh-CN" altLang="en-US" sz="1000" dirty="0">
+                    <a:solidFill>
+                      <a:schemeClr val="tx1"/>
+                    </a:solidFill>
+                  </a:rPr>
+                  <a:t> </a:t>
+                </a:r>
+                <a:r>
+                  <a:rPr lang="en-US" altLang="zh-CN" sz="1000" dirty="0">
+                    <a:solidFill>
+                      <a:schemeClr val="tx1"/>
+                    </a:solidFill>
+                  </a:rPr>
+                  <a:t>Boolean</a:t>
+                </a:r>
+              </a:p>
+              <a:p>
+                <a:r>
+                  <a:rPr lang="en-US" altLang="zh-CN" sz="1000" dirty="0">
+                    <a:solidFill>
+                      <a:schemeClr val="tx1"/>
+                    </a:solidFill>
+                  </a:rPr>
+                  <a:t>gender:</a:t>
+                </a:r>
+                <a:r>
+                  <a:rPr lang="zh-CN" altLang="en-US" sz="1000" dirty="0">
+                    <a:solidFill>
+                      <a:schemeClr val="tx1"/>
+                    </a:solidFill>
+                  </a:rPr>
+                  <a:t> </a:t>
+                </a:r>
+                <a:r>
+                  <a:rPr lang="en-US" altLang="zh-CN" sz="1000" dirty="0">
+                    <a:solidFill>
+                      <a:schemeClr val="tx1"/>
+                    </a:solidFill>
+                  </a:rPr>
+                  <a:t>String</a:t>
+                </a:r>
+              </a:p>
+              <a:p>
+                <a:r>
+                  <a:rPr lang="en-US" altLang="zh-CN" sz="1000" dirty="0">
+                    <a:solidFill>
+                      <a:schemeClr val="tx1"/>
+                    </a:solidFill>
+                  </a:rPr>
+                  <a:t>birthday:</a:t>
+                </a:r>
+                <a:r>
+                  <a:rPr lang="zh-CN" altLang="en-US" sz="1000" dirty="0">
+                    <a:solidFill>
+                      <a:schemeClr val="tx1"/>
+                    </a:solidFill>
+                  </a:rPr>
+                  <a:t> </a:t>
+                </a:r>
+                <a:r>
+                  <a:rPr lang="en-US" altLang="zh-CN" sz="1000" dirty="0">
+                    <a:solidFill>
+                      <a:schemeClr val="tx1"/>
+                    </a:solidFill>
+                  </a:rPr>
+                  <a:t>Date</a:t>
+                </a:r>
+              </a:p>
+              <a:p>
+                <a:r>
+                  <a:rPr lang="en-US" altLang="zh-CN" sz="1000" dirty="0">
+                    <a:solidFill>
+                      <a:schemeClr val="tx1"/>
+                    </a:solidFill>
+                  </a:rPr>
+                  <a:t>country:</a:t>
+                </a:r>
+                <a:r>
+                  <a:rPr lang="zh-CN" altLang="en-US" sz="1000" dirty="0">
+                    <a:solidFill>
+                      <a:schemeClr val="tx1"/>
+                    </a:solidFill>
+                  </a:rPr>
+                  <a:t> </a:t>
+                </a:r>
+                <a:r>
+                  <a:rPr lang="en-US" altLang="zh-CN" sz="1000" dirty="0">
+                    <a:solidFill>
+                      <a:schemeClr val="tx1"/>
+                    </a:solidFill>
+                  </a:rPr>
+                  <a:t>String</a:t>
+                </a:r>
+              </a:p>
+              <a:p>
+                <a:r>
+                  <a:rPr lang="en-US" altLang="zh-CN" sz="1000" dirty="0">
+                    <a:solidFill>
+                      <a:schemeClr val="tx1"/>
+                    </a:solidFill>
+                  </a:rPr>
+                  <a:t>city:</a:t>
+                </a:r>
+                <a:r>
+                  <a:rPr lang="zh-CN" altLang="en-US" sz="1000" dirty="0">
+                    <a:solidFill>
+                      <a:schemeClr val="tx1"/>
+                    </a:solidFill>
+                  </a:rPr>
+                  <a:t> </a:t>
+                </a:r>
+                <a:r>
+                  <a:rPr lang="en-US" altLang="zh-CN" sz="1000" dirty="0">
+                    <a:solidFill>
+                      <a:schemeClr val="tx1"/>
+                    </a:solidFill>
+                  </a:rPr>
+                  <a:t>String</a:t>
+                </a:r>
+              </a:p>
+            </p:txBody>
+          </p:sp>
+          <p:sp>
+            <p:nvSpPr>
+              <p:cNvPr id="10" name="Rectangle 9"/>
+              <p:cNvSpPr/>
+              <p:nvPr/>
+            </p:nvSpPr>
+            <p:spPr>
+              <a:xfrm>
+                <a:off x="1993900" y="1027760"/>
+                <a:ext cx="1992630" cy="387350"/>
+              </a:xfrm>
+              <a:prstGeom prst="rect">
+                <a:avLst/>
+              </a:prstGeom>
+              <a:solidFill>
+                <a:schemeClr val="accent6">
+                  <a:lumMod val="60000"/>
+                  <a:lumOff val="40000"/>
+                </a:schemeClr>
+              </a:solidFill>
+              <a:ln w="22225">
+                <a:solidFill>
+                  <a:schemeClr val="tx1"/>
+                </a:solidFill>
+              </a:ln>
+            </p:spPr>
+            <p:style>
+              <a:lnRef idx="2">
+                <a:schemeClr val="accent1">
+                  <a:shade val="50000"/>
+                </a:schemeClr>
+              </a:lnRef>
+              <a:fillRef idx="1">
+                <a:schemeClr val="accent1"/>
+              </a:fillRef>
+              <a:effectRef idx="0">
+                <a:schemeClr val="accent1"/>
+              </a:effectRef>
+              <a:fontRef idx="minor">
+                <a:schemeClr val="lt1"/>
+              </a:fontRef>
+            </p:style>
+            <p:txBody>
+              <a:bodyPr rtlCol="0" anchor="ctr"/>
+              <a:lstStyle/>
+              <a:p>
+                <a:pPr algn="ctr"/>
+                <a:r>
+                  <a:rPr lang="en-US" altLang="zh-CN" b="1" dirty="0">
+                    <a:solidFill>
+                      <a:schemeClr val="tx1"/>
+                    </a:solidFill>
+                  </a:rPr>
+                  <a:t>Person</a:t>
+                </a:r>
+                <a:endParaRPr lang="en-US" b="1" dirty="0">
+                  <a:solidFill>
+                    <a:schemeClr val="tx1"/>
+                  </a:solidFill>
+                </a:endParaRPr>
+              </a:p>
+            </p:txBody>
+          </p:sp>
+        </p:grpSp>
         <p:sp>
           <p:nvSpPr>
-            <p:cNvPr id="9" name="Rectangle 8"/>
+            <p:cNvPr id="12" name="Rectangle 11"/>
             <p:cNvSpPr/>
             <p:nvPr/>
           </p:nvSpPr>
           <p:spPr>
             <a:xfrm>
-              <a:off x="3140" y="2853"/>
-              <a:ext cx="3138" cy="987"/>
+              <a:off x="2311951" y="3843324"/>
+              <a:ext cx="1992630" cy="1283217"/>
             </a:xfrm>
             <a:prstGeom prst="rect">
               <a:avLst/>
@@ -2596,7 +2855,7 @@
             <a:lstStyle/>
             <a:p>
               <a:r>
-                <a:rPr lang="en-US" altLang="zh-CN" sz="1200" dirty="0">
+                <a:rPr lang="en-US" altLang="zh-CN" sz="1000" dirty="0">
                   <a:solidFill>
                     <a:schemeClr val="tx1"/>
                   </a:solidFill>
@@ -2604,7 +2863,7 @@
                 <a:t>id:</a:t>
               </a:r>
               <a:r>
-                <a:rPr lang="zh-CN" altLang="en-US" sz="1200" dirty="0">
+                <a:rPr lang="zh-CN" altLang="en-US" sz="1000" dirty="0">
                   <a:solidFill>
                     <a:schemeClr val="tx1"/>
                   </a:solidFill>
@@ -2612,22 +2871,17 @@
                 <a:t> </a:t>
               </a:r>
               <a:r>
-                <a:rPr lang="en-US" altLang="zh-CN" sz="1200" dirty="0">
+                <a:rPr lang="en-US" altLang="zh-CN" sz="1000" dirty="0">
                   <a:solidFill>
                     <a:schemeClr val="tx1"/>
                   </a:solidFill>
                 </a:rPr>
                 <a:t>ID</a:t>
               </a:r>
-              <a:endParaRPr lang="en-US" altLang="zh-CN" sz="1200" dirty="0">
-                <a:solidFill>
-                  <a:schemeClr val="tx1"/>
-                </a:solidFill>
-              </a:endParaRPr>
             </a:p>
             <a:p>
               <a:r>
-                <a:rPr lang="en-US" altLang="zh-CN" sz="1200" dirty="0">
+                <a:rPr lang="en-US" altLang="zh-CN" sz="1000" dirty="0">
                   <a:solidFill>
                     <a:schemeClr val="tx1"/>
                   </a:solidFill>
@@ -2635,7 +2889,7 @@
                 <a:t>name:</a:t>
               </a:r>
               <a:r>
-                <a:rPr lang="zh-CN" altLang="en-US" sz="1200" dirty="0">
+                <a:rPr lang="zh-CN" altLang="en-US" sz="1000" dirty="0">
                   <a:solidFill>
                     <a:schemeClr val="tx1"/>
                   </a:solidFill>
@@ -2643,22 +2897,17 @@
                 <a:t> </a:t>
               </a:r>
               <a:r>
-                <a:rPr lang="en-US" altLang="zh-CN" sz="1200" dirty="0">
+                <a:rPr lang="en-US" altLang="zh-CN" sz="1000" dirty="0">
                   <a:solidFill>
                     <a:schemeClr val="tx1"/>
                   </a:solidFill>
                 </a:rPr>
                 <a:t>String</a:t>
               </a:r>
-              <a:endParaRPr lang="en-US" altLang="zh-CN" sz="1200" dirty="0">
-                <a:solidFill>
-                  <a:schemeClr val="tx1"/>
-                </a:solidFill>
-              </a:endParaRPr>
             </a:p>
             <a:p>
               <a:r>
-                <a:rPr lang="en-US" altLang="zh-CN" sz="1200" dirty="0" err="1">
+                <a:rPr lang="en-US" altLang="zh-CN" sz="1000" dirty="0" err="1">
                   <a:solidFill>
                     <a:schemeClr val="tx1"/>
                   </a:solidFill>
@@ -2666,7 +2915,7 @@
                 <a:t>isBlocked</a:t>
               </a:r>
               <a:r>
-                <a:rPr lang="en-US" altLang="zh-CN" sz="1200" dirty="0">
+                <a:rPr lang="en-US" altLang="zh-CN" sz="1000" dirty="0">
                   <a:solidFill>
                     <a:schemeClr val="tx1"/>
                   </a:solidFill>
@@ -2674,7 +2923,7 @@
                 <a:t>:</a:t>
               </a:r>
               <a:r>
-                <a:rPr lang="zh-CN" altLang="en-US" sz="1200" dirty="0">
+                <a:rPr lang="zh-CN" altLang="en-US" sz="1000" dirty="0">
                   <a:solidFill>
                     <a:schemeClr val="tx1"/>
                   </a:solidFill>
@@ -2682,135 +2931,25 @@
                 <a:t> </a:t>
               </a:r>
               <a:r>
-                <a:rPr lang="en-US" altLang="zh-CN" sz="1200" dirty="0">
+                <a:rPr lang="en-US" altLang="zh-CN" sz="1000" dirty="0">
                   <a:solidFill>
                     <a:schemeClr val="tx1"/>
                   </a:solidFill>
                 </a:rPr>
                 <a:t>Boolean</a:t>
               </a:r>
-              <a:endParaRPr lang="en-US" altLang="zh-CN" sz="1200" dirty="0">
-                <a:solidFill>
-                  <a:schemeClr val="tx1"/>
-                </a:solidFill>
-              </a:endParaRPr>
             </a:p>
-          </p:txBody>
-        </p:sp>
-        <p:sp>
-          <p:nvSpPr>
-            <p:cNvPr id="10" name="Rectangle 9"/>
-            <p:cNvSpPr/>
-            <p:nvPr/>
-          </p:nvSpPr>
-          <p:spPr>
-            <a:xfrm>
-              <a:off x="3140" y="2240"/>
-              <a:ext cx="3138" cy="610"/>
-            </a:xfrm>
-            <a:prstGeom prst="rect">
-              <a:avLst/>
-            </a:prstGeom>
-            <a:solidFill>
-              <a:schemeClr val="accent6">
-                <a:lumMod val="60000"/>
-                <a:lumOff val="40000"/>
-              </a:schemeClr>
-            </a:solidFill>
-            <a:ln w="22225">
-              <a:solidFill>
-                <a:schemeClr val="tx1"/>
-              </a:solidFill>
-            </a:ln>
-          </p:spPr>
-          <p:style>
-            <a:lnRef idx="2">
-              <a:schemeClr val="accent1">
-                <a:shade val="50000"/>
-              </a:schemeClr>
-            </a:lnRef>
-            <a:fillRef idx="1">
-              <a:schemeClr val="accent1"/>
-            </a:fillRef>
-            <a:effectRef idx="0">
-              <a:schemeClr val="accent1"/>
-            </a:effectRef>
-            <a:fontRef idx="minor">
-              <a:schemeClr val="lt1"/>
-            </a:fontRef>
-          </p:style>
-          <p:txBody>
-            <a:bodyPr rtlCol="0" anchor="ctr"/>
-            <a:lstStyle/>
             <a:p>
-              <a:pPr algn="ctr"/>
               <a:r>
-                <a:rPr lang="en-US" altLang="zh-CN" b="1" dirty="0">
+                <a:rPr lang="en-US" altLang="zh-CN" sz="1000" dirty="0">
                   <a:solidFill>
                     <a:schemeClr val="tx1"/>
                   </a:solidFill>
                 </a:rPr>
-                <a:t>Person</a:t>
-              </a:r>
-              <a:endParaRPr lang="en-US" b="1" dirty="0">
-                <a:solidFill>
-                  <a:schemeClr val="tx1"/>
-                </a:solidFill>
-              </a:endParaRPr>
-            </a:p>
-          </p:txBody>
-        </p:sp>
-        <p:sp>
-          <p:nvSpPr>
-            <p:cNvPr id="12" name="Rectangle 11"/>
-            <p:cNvSpPr/>
-            <p:nvPr/>
-          </p:nvSpPr>
-          <p:spPr>
-            <a:xfrm>
-              <a:off x="3140" y="6269"/>
-              <a:ext cx="3138" cy="1093"/>
-            </a:xfrm>
-            <a:prstGeom prst="rect">
-              <a:avLst/>
-            </a:prstGeom>
-            <a:noFill/>
-            <a:ln w="22225">
-              <a:solidFill>
-                <a:schemeClr val="tx1"/>
-              </a:solidFill>
-            </a:ln>
-          </p:spPr>
-          <p:style>
-            <a:lnRef idx="2">
-              <a:schemeClr val="accent1">
-                <a:shade val="50000"/>
-              </a:schemeClr>
-            </a:lnRef>
-            <a:fillRef idx="1">
-              <a:schemeClr val="accent1"/>
-            </a:fillRef>
-            <a:effectRef idx="0">
-              <a:schemeClr val="accent1"/>
-            </a:effectRef>
-            <a:fontRef idx="minor">
-              <a:schemeClr val="lt1"/>
-            </a:fontRef>
-          </p:style>
-          <p:txBody>
-            <a:bodyPr rtlCol="0" anchor="ctr"/>
-            <a:lstStyle/>
-            <a:p>
-              <a:r>
-                <a:rPr lang="en-US" altLang="zh-CN" sz="1200" dirty="0">
-                  <a:solidFill>
-                    <a:schemeClr val="tx1"/>
-                  </a:solidFill>
-                </a:rPr>
-                <a:t>id:</a:t>
+                <a:t>country:</a:t>
               </a:r>
               <a:r>
-                <a:rPr lang="zh-CN" altLang="en-US" sz="1200" dirty="0">
+                <a:rPr lang="zh-CN" altLang="en-US" sz="1000" dirty="0">
                   <a:solidFill>
                     <a:schemeClr val="tx1"/>
                   </a:solidFill>
@@ -2818,30 +2957,25 @@
                 <a:t> </a:t>
               </a:r>
               <a:r>
-                <a:rPr lang="en-US" altLang="zh-CN" sz="1200" dirty="0">
+                <a:rPr lang="en-US" altLang="zh-CN" sz="1000" dirty="0">
                   <a:solidFill>
                     <a:schemeClr val="tx1"/>
                   </a:solidFill>
                 </a:rPr>
-                <a:t>ID</a:t>
+                <a:t>String</a:t>
               </a:r>
-              <a:endParaRPr lang="en-US" altLang="zh-CN" sz="1200" dirty="0">
-                <a:solidFill>
-                  <a:schemeClr val="tx1"/>
-                </a:solidFill>
-              </a:endParaRPr>
             </a:p>
             <a:p>
               <a:r>
-                <a:rPr lang="en-US" altLang="zh-CN" sz="1200" dirty="0">
+                <a:rPr lang="en-US" altLang="zh-CN" sz="1000" dirty="0">
                   <a:solidFill>
                     <a:schemeClr val="tx1"/>
                   </a:solidFill>
                 </a:rPr>
-                <a:t>name:</a:t>
+                <a:t>city:</a:t>
               </a:r>
               <a:r>
-                <a:rPr lang="zh-CN" altLang="en-US" sz="1200" dirty="0">
+                <a:rPr lang="zh-CN" altLang="en-US" sz="1000" dirty="0">
                   <a:solidFill>
                     <a:schemeClr val="tx1"/>
                   </a:solidFill>
@@ -2849,30 +2983,77 @@
                 <a:t> </a:t>
               </a:r>
               <a:r>
-                <a:rPr lang="en-US" altLang="zh-CN" sz="1200" dirty="0">
+                <a:rPr lang="en-US" altLang="zh-CN" sz="1000" dirty="0">
                   <a:solidFill>
                     <a:schemeClr val="tx1"/>
                   </a:solidFill>
                 </a:rPr>
                 <a:t>String</a:t>
               </a:r>
-              <a:endParaRPr lang="en-US" altLang="zh-CN" sz="1200" dirty="0">
-                <a:solidFill>
-                  <a:schemeClr val="tx1"/>
-                </a:solidFill>
-              </a:endParaRPr>
             </a:p>
             <a:p>
               <a:r>
-                <a:rPr lang="en-US" altLang="zh-CN" sz="1200" dirty="0" err="1">
+                <a:rPr lang="en-US" altLang="zh-CN" sz="1000" dirty="0">
                   <a:solidFill>
                     <a:schemeClr val="tx1"/>
                   </a:solidFill>
                 </a:rPr>
-                <a:t>isBlocked</a:t>
+                <a:t>business:</a:t>
               </a:r>
               <a:r>
-                <a:rPr lang="en-US" altLang="zh-CN" sz="1200" dirty="0">
+                <a:rPr lang="zh-CN" altLang="en-US" sz="1000" dirty="0">
+                  <a:solidFill>
+                    <a:schemeClr val="tx1"/>
+                  </a:solidFill>
+                </a:rPr>
+                <a:t> </a:t>
+              </a:r>
+              <a:r>
+                <a:rPr lang="en-US" altLang="zh-CN" sz="1000" dirty="0">
+                  <a:solidFill>
+                    <a:schemeClr val="tx1"/>
+                  </a:solidFill>
+                </a:rPr>
+                <a:t>String</a:t>
+              </a:r>
+            </a:p>
+            <a:p>
+              <a:r>
+                <a:rPr lang="en-US" altLang="zh-CN" sz="1000" dirty="0">
+                  <a:solidFill>
+                    <a:schemeClr val="tx1"/>
+                  </a:solidFill>
+                </a:rPr>
+                <a:t>description:</a:t>
+              </a:r>
+              <a:r>
+                <a:rPr lang="zh-CN" altLang="en-US" sz="1000" dirty="0">
+                  <a:solidFill>
+                    <a:schemeClr val="tx1"/>
+                  </a:solidFill>
+                </a:rPr>
+                <a:t> </a:t>
+              </a:r>
+              <a:r>
+                <a:rPr lang="en-US" altLang="zh-CN" sz="1000" dirty="0">
+                  <a:solidFill>
+                    <a:schemeClr val="tx1"/>
+                  </a:solidFill>
+                </a:rPr>
+                <a:t>String</a:t>
+              </a:r>
+            </a:p>
+            <a:p>
+              <a:r>
+                <a:rPr lang="en-US" altLang="zh-CN" sz="1000" dirty="0" err="1">
+                  <a:solidFill>
+                    <a:schemeClr val="tx1"/>
+                  </a:solidFill>
+                </a:rPr>
+                <a:t>url</a:t>
+              </a:r>
+              <a:r>
+                <a:rPr lang="en-US" altLang="zh-CN" sz="1000" dirty="0">
                   <a:solidFill>
                     <a:schemeClr val="tx1"/>
                   </a:solidFill>
@@ -2880,7 +3061,7 @@
                 <a:t>:</a:t>
               </a:r>
               <a:r>
-                <a:rPr lang="zh-CN" altLang="en-US" sz="1200" dirty="0">
+                <a:rPr lang="zh-CN" altLang="en-US" sz="1000" dirty="0">
                   <a:solidFill>
                     <a:schemeClr val="tx1"/>
                   </a:solidFill>
@@ -2888,18 +3069,13 @@
                 <a:t> </a:t>
               </a:r>
               <a:r>
-                <a:rPr lang="en-US" altLang="zh-CN" sz="1200" dirty="0">
+                <a:rPr lang="en-US" altLang="zh-CN" sz="1000" dirty="0">
                   <a:solidFill>
                     <a:schemeClr val="tx1"/>
                   </a:solidFill>
                 </a:rPr>
-                <a:t>Boolean</a:t>
+                <a:t>String</a:t>
               </a:r>
-              <a:endParaRPr lang="en-US" altLang="zh-CN" sz="1200" dirty="0">
-                <a:solidFill>
-                  <a:schemeClr val="tx1"/>
-                </a:solidFill>
-              </a:endParaRPr>
             </a:p>
           </p:txBody>
         </p:sp>
@@ -2911,8 +3087,8 @@
           </p:nvSpPr>
           <p:spPr>
             <a:xfrm>
-              <a:off x="3140" y="5656"/>
-              <a:ext cx="3138" cy="610"/>
+              <a:off x="2311951" y="3454069"/>
+              <a:ext cx="1992630" cy="387350"/>
             </a:xfrm>
             <a:prstGeom prst="rect">
               <a:avLst/>
@@ -2965,275 +3141,490 @@
             </a:p>
           </p:txBody>
         </p:sp>
-        <p:sp>
-          <p:nvSpPr>
-            <p:cNvPr id="15" name="Rectangle 14"/>
-            <p:cNvSpPr/>
+        <p:grpSp>
+          <p:nvGrpSpPr>
+            <p:cNvPr id="138" name="Group 137">
+              <a:extLst>
+                <a:ext uri="{FF2B5EF4-FFF2-40B4-BE49-F238E27FC236}">
+                  <a16:creationId xmlns:a16="http://schemas.microsoft.com/office/drawing/2014/main" id="{AD460002-16CE-2F3C-2EC1-7FB5BE502311}"/>
+                </a:ext>
+              </a:extLst>
+            </p:cNvPr>
+            <p:cNvGrpSpPr/>
             <p:nvPr/>
-          </p:nvSpPr>
-          <p:spPr>
+          </p:nvGrpSpPr>
+          <p:grpSpPr>
             <a:xfrm>
-              <a:off x="7876" y="4142"/>
-              <a:ext cx="3166" cy="1341"/>
+              <a:off x="5319311" y="2103424"/>
+              <a:ext cx="2010410" cy="2090221"/>
+              <a:chOff x="5001260" y="2240915"/>
+              <a:chExt cx="2010410" cy="2090221"/>
             </a:xfrm>
-            <a:prstGeom prst="rect">
-              <a:avLst/>
-            </a:prstGeom>
-            <a:noFill/>
-            <a:ln w="22225">
-              <a:solidFill>
-                <a:schemeClr val="tx1"/>
-              </a:solidFill>
-            </a:ln>
-          </p:spPr>
-          <p:style>
-            <a:lnRef idx="2">
-              <a:schemeClr val="accent1">
-                <a:shade val="50000"/>
-              </a:schemeClr>
-            </a:lnRef>
-            <a:fillRef idx="1">
-              <a:schemeClr val="accent1"/>
-            </a:fillRef>
-            <a:effectRef idx="0">
-              <a:schemeClr val="accent1"/>
-            </a:effectRef>
-            <a:fontRef idx="minor">
-              <a:schemeClr val="lt1"/>
-            </a:fontRef>
-          </p:style>
-          <p:txBody>
-            <a:bodyPr rtlCol="0" anchor="ctr"/>
-            <a:lstStyle/>
-            <a:p>
-              <a:r>
-                <a:rPr lang="en-US" altLang="zh-CN" sz="1200" dirty="0">
+          </p:grpSpPr>
+          <p:sp>
+            <p:nvSpPr>
+              <p:cNvPr id="15" name="Rectangle 14"/>
+              <p:cNvSpPr/>
+              <p:nvPr/>
+            </p:nvSpPr>
+            <p:spPr>
+              <a:xfrm>
+                <a:off x="5001260" y="2630169"/>
+                <a:ext cx="2010410" cy="1700967"/>
+              </a:xfrm>
+              <a:prstGeom prst="rect">
+                <a:avLst/>
+              </a:prstGeom>
+              <a:noFill/>
+              <a:ln w="22225">
+                <a:solidFill>
+                  <a:schemeClr val="tx1"/>
+                </a:solidFill>
+              </a:ln>
+            </p:spPr>
+            <p:style>
+              <a:lnRef idx="2">
+                <a:schemeClr val="accent1">
+                  <a:shade val="50000"/>
+                </a:schemeClr>
+              </a:lnRef>
+              <a:fillRef idx="1">
+                <a:schemeClr val="accent1"/>
+              </a:fillRef>
+              <a:effectRef idx="0">
+                <a:schemeClr val="accent1"/>
+              </a:effectRef>
+              <a:fontRef idx="minor">
+                <a:schemeClr val="lt1"/>
+              </a:fontRef>
+            </p:style>
+            <p:txBody>
+              <a:bodyPr rtlCol="0" anchor="ctr"/>
+              <a:lstStyle/>
+              <a:p>
+                <a:r>
+                  <a:rPr lang="en-US" altLang="zh-CN" sz="1000" dirty="0">
+                    <a:solidFill>
+                      <a:schemeClr val="tx1"/>
+                    </a:solidFill>
+                  </a:rPr>
+                  <a:t>id:</a:t>
+                </a:r>
+                <a:r>
+                  <a:rPr lang="zh-CN" altLang="en-US" sz="1000" dirty="0">
+                    <a:solidFill>
+                      <a:schemeClr val="tx1"/>
+                    </a:solidFill>
+                  </a:rPr>
+                  <a:t> </a:t>
+                </a:r>
+                <a:r>
+                  <a:rPr lang="en-US" altLang="zh-CN" sz="1000" dirty="0">
+                    <a:solidFill>
+                      <a:schemeClr val="tx1"/>
+                    </a:solidFill>
+                  </a:rPr>
+                  <a:t>ID</a:t>
+                </a:r>
+              </a:p>
+              <a:p>
+                <a:r>
+                  <a:rPr lang="en-US" sz="1000" dirty="0" err="1">
+                    <a:solidFill>
+                      <a:schemeClr val="tx1"/>
+                    </a:solidFill>
+                  </a:rPr>
+                  <a:t>cr</a:t>
+                </a:r>
+                <a:r>
+                  <a:rPr lang="en-US" altLang="zh-CN" sz="1000" dirty="0" err="1">
+                    <a:solidFill>
+                      <a:schemeClr val="tx1"/>
+                    </a:solidFill>
+                  </a:rPr>
+                  <a:t>eateTime</a:t>
+                </a:r>
+                <a:r>
+                  <a:rPr lang="en-US" altLang="zh-CN" sz="1000" dirty="0">
+                    <a:solidFill>
+                      <a:schemeClr val="tx1"/>
+                    </a:solidFill>
+                  </a:rPr>
+                  <a:t>:</a:t>
+                </a:r>
+                <a:r>
+                  <a:rPr lang="zh-CN" altLang="en-US" sz="1000" dirty="0">
+                    <a:solidFill>
+                      <a:schemeClr val="tx1"/>
+                    </a:solidFill>
+                  </a:rPr>
+                  <a:t> </a:t>
+                </a:r>
+                <a:r>
+                  <a:rPr lang="en-US" altLang="zh-CN" sz="1000" dirty="0" err="1">
+                    <a:solidFill>
+                      <a:schemeClr val="tx1"/>
+                    </a:solidFill>
+                  </a:rPr>
+                  <a:t>DateTime</a:t>
+                </a:r>
+                <a:endParaRPr lang="en-US" altLang="zh-CN" sz="1000" dirty="0">
                   <a:solidFill>
                     <a:schemeClr val="tx1"/>
                   </a:solidFill>
-                </a:rPr>
-                <a:t>id:</a:t>
-              </a:r>
-              <a:r>
-                <a:rPr lang="zh-CN" altLang="en-US" sz="1200" dirty="0">
+                </a:endParaRPr>
+              </a:p>
+              <a:p>
+                <a:r>
+                  <a:rPr lang="en-US" altLang="zh-CN" sz="1000" dirty="0" err="1">
+                    <a:solidFill>
+                      <a:schemeClr val="tx1"/>
+                    </a:solidFill>
+                  </a:rPr>
+                  <a:t>isBlocked</a:t>
+                </a:r>
+                <a:r>
+                  <a:rPr lang="en-US" altLang="zh-CN" sz="1000" dirty="0">
+                    <a:solidFill>
+                      <a:schemeClr val="tx1"/>
+                    </a:solidFill>
+                  </a:rPr>
+                  <a:t>:</a:t>
+                </a:r>
+                <a:r>
+                  <a:rPr lang="zh-CN" altLang="en-US" sz="1000" dirty="0">
+                    <a:solidFill>
+                      <a:schemeClr val="tx1"/>
+                    </a:solidFill>
+                  </a:rPr>
+                  <a:t> </a:t>
+                </a:r>
+                <a:r>
+                  <a:rPr lang="en-US" altLang="zh-CN" sz="1000" dirty="0">
+                    <a:solidFill>
+                      <a:schemeClr val="tx1"/>
+                    </a:solidFill>
+                  </a:rPr>
+                  <a:t>Boolean</a:t>
+                </a:r>
+              </a:p>
+              <a:p>
+                <a:r>
+                  <a:rPr lang="en-US" altLang="zh-CN" sz="1000" dirty="0">
+                    <a:solidFill>
+                      <a:schemeClr val="tx1"/>
+                    </a:solidFill>
+                  </a:rPr>
+                  <a:t>t</a:t>
+                </a:r>
+                <a:r>
+                  <a:rPr lang="en-US" sz="1000" dirty="0">
+                    <a:solidFill>
+                      <a:schemeClr val="tx1"/>
+                    </a:solidFill>
+                  </a:rPr>
+                  <a:t>ype</a:t>
+                </a:r>
+                <a:r>
+                  <a:rPr lang="en-US" altLang="zh-CN" sz="1000" dirty="0">
+                    <a:solidFill>
+                      <a:schemeClr val="tx1"/>
+                    </a:solidFill>
+                  </a:rPr>
+                  <a:t>:</a:t>
+                </a:r>
+                <a:r>
+                  <a:rPr lang="zh-CN" altLang="en-US" sz="1000" dirty="0">
+                    <a:solidFill>
+                      <a:schemeClr val="tx1"/>
+                    </a:solidFill>
+                  </a:rPr>
+                  <a:t> </a:t>
+                </a:r>
+                <a:r>
+                  <a:rPr lang="en-US" altLang="zh-CN" sz="1000" dirty="0">
+                    <a:solidFill>
+                      <a:schemeClr val="tx1"/>
+                    </a:solidFill>
+                  </a:rPr>
+                  <a:t>String</a:t>
+                </a:r>
+              </a:p>
+              <a:p>
+                <a:r>
+                  <a:rPr lang="en-US" altLang="zh-CN" sz="1000" dirty="0">
+                    <a:solidFill>
+                      <a:schemeClr val="tx1"/>
+                    </a:solidFill>
+                  </a:rPr>
+                  <a:t>nickname:</a:t>
+                </a:r>
+                <a:r>
+                  <a:rPr lang="zh-CN" altLang="en-US" sz="1000" dirty="0">
+                    <a:solidFill>
+                      <a:schemeClr val="tx1"/>
+                    </a:solidFill>
+                  </a:rPr>
+                  <a:t> </a:t>
+                </a:r>
+                <a:r>
+                  <a:rPr lang="en-US" altLang="zh-CN" sz="1000" dirty="0">
+                    <a:solidFill>
+                      <a:schemeClr val="tx1"/>
+                    </a:solidFill>
+                  </a:rPr>
+                  <a:t>String</a:t>
+                </a:r>
+              </a:p>
+              <a:p>
+                <a:r>
+                  <a:rPr lang="en-US" altLang="zh-CN" sz="1000" dirty="0" err="1">
+                    <a:solidFill>
+                      <a:schemeClr val="tx1"/>
+                    </a:solidFill>
+                  </a:rPr>
+                  <a:t>phoneNumber</a:t>
+                </a:r>
+                <a:r>
+                  <a:rPr lang="en-US" altLang="zh-CN" sz="1000" dirty="0">
+                    <a:solidFill>
+                      <a:schemeClr val="tx1"/>
+                    </a:solidFill>
+                  </a:rPr>
+                  <a:t>:</a:t>
+                </a:r>
+                <a:r>
+                  <a:rPr lang="zh-CN" altLang="en-US" sz="1000" dirty="0">
+                    <a:solidFill>
+                      <a:schemeClr val="tx1"/>
+                    </a:solidFill>
+                  </a:rPr>
+                  <a:t> </a:t>
+                </a:r>
+                <a:r>
+                  <a:rPr lang="en-US" altLang="zh-CN" sz="1000" dirty="0">
+                    <a:solidFill>
+                      <a:schemeClr val="tx1"/>
+                    </a:solidFill>
+                  </a:rPr>
+                  <a:t>String</a:t>
+                </a:r>
+              </a:p>
+              <a:p>
+                <a:r>
+                  <a:rPr lang="en-US" altLang="zh-CN" sz="1000" dirty="0">
+                    <a:solidFill>
+                      <a:schemeClr val="tx1"/>
+                    </a:solidFill>
+                  </a:rPr>
+                  <a:t>email:</a:t>
+                </a:r>
+                <a:r>
+                  <a:rPr lang="zh-CN" altLang="en-US" sz="1000" dirty="0">
+                    <a:solidFill>
+                      <a:schemeClr val="tx1"/>
+                    </a:solidFill>
+                  </a:rPr>
+                  <a:t> </a:t>
+                </a:r>
+                <a:r>
+                  <a:rPr lang="en-US" altLang="zh-CN" sz="1000" dirty="0">
+                    <a:solidFill>
+                      <a:schemeClr val="tx1"/>
+                    </a:solidFill>
+                  </a:rPr>
+                  <a:t>Long</a:t>
+                </a:r>
+                <a:r>
+                  <a:rPr lang="zh-CN" altLang="en-US" sz="1000" dirty="0">
+                    <a:solidFill>
+                      <a:schemeClr val="tx1"/>
+                    </a:solidFill>
+                  </a:rPr>
+                  <a:t> </a:t>
+                </a:r>
+                <a:r>
+                  <a:rPr lang="en-US" altLang="zh-CN" sz="1000" dirty="0">
+                    <a:solidFill>
+                      <a:schemeClr val="tx1"/>
+                    </a:solidFill>
+                  </a:rPr>
+                  <a:t>String</a:t>
+                </a:r>
+              </a:p>
+              <a:p>
+                <a:r>
+                  <a:rPr lang="en-US" altLang="zh-CN" sz="1000" dirty="0" err="1">
+                    <a:solidFill>
+                      <a:schemeClr val="tx1"/>
+                    </a:solidFill>
+                  </a:rPr>
+                  <a:t>freqLoginType</a:t>
+                </a:r>
+                <a:r>
+                  <a:rPr lang="en-US" altLang="zh-CN" sz="1000" dirty="0">
+                    <a:solidFill>
+                      <a:schemeClr val="tx1"/>
+                    </a:solidFill>
+                  </a:rPr>
+                  <a:t>:</a:t>
+                </a:r>
+                <a:r>
+                  <a:rPr lang="zh-CN" altLang="en-US" sz="1000" dirty="0">
+                    <a:solidFill>
+                      <a:schemeClr val="tx1"/>
+                    </a:solidFill>
+                  </a:rPr>
+                  <a:t> </a:t>
+                </a:r>
+                <a:r>
+                  <a:rPr lang="en-US" altLang="zh-CN" sz="1000" dirty="0">
+                    <a:solidFill>
+                      <a:schemeClr val="tx1"/>
+                    </a:solidFill>
+                  </a:rPr>
+                  <a:t>String</a:t>
+                </a:r>
+              </a:p>
+              <a:p>
+                <a:r>
+                  <a:rPr lang="en-US" altLang="zh-CN" sz="1000" dirty="0" err="1">
+                    <a:solidFill>
+                      <a:schemeClr val="tx1"/>
+                    </a:solidFill>
+                  </a:rPr>
+                  <a:t>lastLogin</a:t>
+                </a:r>
+                <a:r>
+                  <a:rPr lang="en-US" altLang="zh-CN" sz="1000" dirty="0">
+                    <a:solidFill>
+                      <a:schemeClr val="tx1"/>
+                    </a:solidFill>
+                  </a:rPr>
+                  <a:t>:</a:t>
+                </a:r>
+                <a:r>
+                  <a:rPr lang="zh-CN" altLang="en-US" sz="1000" dirty="0">
+                    <a:solidFill>
+                      <a:schemeClr val="tx1"/>
+                    </a:solidFill>
+                  </a:rPr>
+                  <a:t> </a:t>
+                </a:r>
+                <a:r>
+                  <a:rPr lang="en-US" altLang="zh-CN" sz="1000" dirty="0" err="1">
+                    <a:solidFill>
+                      <a:schemeClr val="tx1"/>
+                    </a:solidFill>
+                  </a:rPr>
+                  <a:t>DateTime</a:t>
+                </a:r>
+                <a:endParaRPr lang="en-US" altLang="zh-CN" sz="1000" dirty="0">
                   <a:solidFill>
                     <a:schemeClr val="tx1"/>
                   </a:solidFill>
-                </a:rPr>
-                <a:t> </a:t>
-              </a:r>
-              <a:r>
-                <a:rPr lang="en-US" altLang="zh-CN" sz="1200" dirty="0">
+                </a:endParaRPr>
+              </a:p>
+              <a:p>
+                <a:r>
+                  <a:rPr lang="en-US" altLang="zh-CN" sz="1000" dirty="0" err="1">
+                    <a:solidFill>
+                      <a:schemeClr val="tx1"/>
+                    </a:solidFill>
+                  </a:rPr>
+                  <a:t>accountLevel</a:t>
+                </a:r>
+                <a:r>
+                  <a:rPr lang="en-US" altLang="zh-CN" sz="1000" dirty="0">
+                    <a:solidFill>
+                      <a:schemeClr val="tx1"/>
+                    </a:solidFill>
+                  </a:rPr>
+                  <a:t>:</a:t>
+                </a:r>
+                <a:r>
+                  <a:rPr lang="zh-CN" altLang="en-US" sz="1000" dirty="0">
+                    <a:solidFill>
+                      <a:schemeClr val="tx1"/>
+                    </a:solidFill>
+                  </a:rPr>
+                  <a:t> </a:t>
+                </a:r>
+                <a:r>
+                  <a:rPr lang="en-US" altLang="zh-CN" sz="1000" dirty="0">
+                    <a:solidFill>
+                      <a:schemeClr val="tx1"/>
+                    </a:solidFill>
+                  </a:rPr>
+                  <a:t>String</a:t>
+                </a:r>
+              </a:p>
+            </p:txBody>
+          </p:sp>
+          <p:sp>
+            <p:nvSpPr>
+              <p:cNvPr id="16" name="Rectangle 15"/>
+              <p:cNvSpPr/>
+              <p:nvPr/>
+            </p:nvSpPr>
+            <p:spPr>
+              <a:xfrm>
+                <a:off x="5001260" y="2240915"/>
+                <a:ext cx="2010410" cy="387350"/>
+              </a:xfrm>
+              <a:prstGeom prst="rect">
+                <a:avLst/>
+              </a:prstGeom>
+              <a:solidFill>
+                <a:schemeClr val="accent1">
+                  <a:lumMod val="60000"/>
+                  <a:lumOff val="40000"/>
+                </a:schemeClr>
+              </a:solidFill>
+              <a:ln w="22225">
+                <a:solidFill>
+                  <a:schemeClr val="tx1"/>
+                </a:solidFill>
+              </a:ln>
+            </p:spPr>
+            <p:style>
+              <a:lnRef idx="2">
+                <a:schemeClr val="accent1">
+                  <a:shade val="50000"/>
+                </a:schemeClr>
+              </a:lnRef>
+              <a:fillRef idx="1">
+                <a:schemeClr val="accent1"/>
+              </a:fillRef>
+              <a:effectRef idx="0">
+                <a:schemeClr val="accent1"/>
+              </a:effectRef>
+              <a:fontRef idx="minor">
+                <a:schemeClr val="lt1"/>
+              </a:fontRef>
+            </p:style>
+            <p:txBody>
+              <a:bodyPr rtlCol="0" anchor="ctr"/>
+              <a:lstStyle/>
+              <a:p>
+                <a:pPr algn="ctr"/>
+                <a:r>
+                  <a:rPr lang="en-US" altLang="zh-CN" b="1" dirty="0">
+                    <a:solidFill>
+                      <a:schemeClr val="tx1"/>
+                    </a:solidFill>
+                  </a:rPr>
+                  <a:t>Account</a:t>
+                </a:r>
+                <a:endParaRPr lang="en-US" b="1" dirty="0">
                   <a:solidFill>
                     <a:schemeClr val="tx1"/>
                   </a:solidFill>
-                </a:rPr>
-                <a:t>ID</a:t>
-              </a:r>
-              <a:endParaRPr lang="en-US" altLang="zh-CN" sz="1200" dirty="0">
-                <a:solidFill>
-                  <a:schemeClr val="tx1"/>
-                </a:solidFill>
-              </a:endParaRPr>
-            </a:p>
-            <a:p>
-              <a:r>
-                <a:rPr lang="en-US" sz="1200" dirty="0" err="1">
-                  <a:solidFill>
-                    <a:schemeClr val="tx1"/>
-                  </a:solidFill>
-                </a:rPr>
-                <a:t>cr</a:t>
-              </a:r>
-              <a:r>
-                <a:rPr lang="en-US" altLang="zh-CN" sz="1200" dirty="0" err="1">
-                  <a:solidFill>
-                    <a:schemeClr val="tx1"/>
-                  </a:solidFill>
-                </a:rPr>
-                <a:t>eateTime</a:t>
-              </a:r>
-              <a:r>
-                <a:rPr lang="en-US" altLang="zh-CN" sz="1200" dirty="0">
-                  <a:solidFill>
-                    <a:schemeClr val="tx1"/>
-                  </a:solidFill>
-                </a:rPr>
-                <a:t>:</a:t>
-              </a:r>
-              <a:r>
-                <a:rPr lang="zh-CN" altLang="en-US" sz="1200" dirty="0">
-                  <a:solidFill>
-                    <a:schemeClr val="tx1"/>
-                  </a:solidFill>
-                </a:rPr>
-                <a:t> </a:t>
-              </a:r>
-              <a:r>
-                <a:rPr lang="en-US" altLang="zh-CN" sz="1200" dirty="0" err="1">
-                  <a:solidFill>
-                    <a:schemeClr val="tx1"/>
-                  </a:solidFill>
-                </a:rPr>
-                <a:t>DateTime</a:t>
-              </a:r>
-              <a:endParaRPr lang="en-US" altLang="zh-CN" sz="1200" dirty="0">
-                <a:solidFill>
-                  <a:schemeClr val="tx1"/>
-                </a:solidFill>
-              </a:endParaRPr>
-            </a:p>
-            <a:p>
-              <a:r>
-                <a:rPr lang="en-US" altLang="zh-CN" sz="1200" dirty="0" err="1">
-                  <a:solidFill>
-                    <a:schemeClr val="tx1"/>
-                  </a:solidFill>
-                </a:rPr>
-                <a:t>isBlocked</a:t>
-              </a:r>
-              <a:r>
-                <a:rPr lang="en-US" altLang="zh-CN" sz="1200" dirty="0">
-                  <a:solidFill>
-                    <a:schemeClr val="tx1"/>
-                  </a:solidFill>
-                </a:rPr>
-                <a:t>:</a:t>
-              </a:r>
-              <a:r>
-                <a:rPr lang="zh-CN" altLang="en-US" sz="1200" dirty="0">
-                  <a:solidFill>
-                    <a:schemeClr val="tx1"/>
-                  </a:solidFill>
-                </a:rPr>
-                <a:t> </a:t>
-              </a:r>
-              <a:r>
-                <a:rPr lang="en-US" altLang="zh-CN" sz="1200" dirty="0">
-                  <a:solidFill>
-                    <a:schemeClr val="tx1"/>
-                  </a:solidFill>
-                </a:rPr>
-                <a:t>Boolean</a:t>
-              </a:r>
-              <a:endParaRPr lang="en-US" altLang="zh-CN" sz="1200" dirty="0">
-                <a:solidFill>
-                  <a:schemeClr val="tx1"/>
-                </a:solidFill>
-              </a:endParaRPr>
-            </a:p>
-            <a:p>
-              <a:r>
-                <a:rPr lang="en-US" altLang="zh-CN" sz="1200" dirty="0">
-                  <a:solidFill>
-                    <a:schemeClr val="tx1"/>
-                  </a:solidFill>
-                </a:rPr>
-                <a:t>t</a:t>
-              </a:r>
-              <a:r>
-                <a:rPr lang="en-US" sz="1200" dirty="0">
-                  <a:solidFill>
-                    <a:schemeClr val="tx1"/>
-                  </a:solidFill>
-                </a:rPr>
-                <a:t>ype</a:t>
-              </a:r>
-              <a:r>
-                <a:rPr lang="en-US" altLang="zh-CN" sz="1200" dirty="0">
-                  <a:solidFill>
-                    <a:schemeClr val="tx1"/>
-                  </a:solidFill>
-                </a:rPr>
-                <a:t>:</a:t>
-              </a:r>
-              <a:r>
-                <a:rPr lang="zh-CN" altLang="en-US" sz="1200" dirty="0">
-                  <a:solidFill>
-                    <a:schemeClr val="tx1"/>
-                  </a:solidFill>
-                </a:rPr>
-                <a:t> </a:t>
-              </a:r>
-              <a:r>
-                <a:rPr lang="en-US" altLang="zh-CN" sz="1200" dirty="0">
-                  <a:solidFill>
-                    <a:schemeClr val="tx1"/>
-                  </a:solidFill>
-                </a:rPr>
-                <a:t>String</a:t>
-              </a:r>
-              <a:endParaRPr lang="en-US" sz="1200" dirty="0">
-                <a:solidFill>
-                  <a:schemeClr val="tx1"/>
-                </a:solidFill>
-              </a:endParaRPr>
-            </a:p>
-          </p:txBody>
-        </p:sp>
-        <p:sp>
-          <p:nvSpPr>
-            <p:cNvPr id="16" name="Rectangle 15"/>
-            <p:cNvSpPr/>
-            <p:nvPr/>
-          </p:nvSpPr>
-          <p:spPr>
-            <a:xfrm>
-              <a:off x="7876" y="3529"/>
-              <a:ext cx="3166" cy="610"/>
-            </a:xfrm>
-            <a:prstGeom prst="rect">
-              <a:avLst/>
-            </a:prstGeom>
-            <a:solidFill>
-              <a:schemeClr val="accent1">
-                <a:lumMod val="60000"/>
-                <a:lumOff val="40000"/>
-              </a:schemeClr>
-            </a:solidFill>
-            <a:ln w="22225">
-              <a:solidFill>
-                <a:schemeClr val="tx1"/>
-              </a:solidFill>
-            </a:ln>
-          </p:spPr>
-          <p:style>
-            <a:lnRef idx="2">
-              <a:schemeClr val="accent1">
-                <a:shade val="50000"/>
-              </a:schemeClr>
-            </a:lnRef>
-            <a:fillRef idx="1">
-              <a:schemeClr val="accent1"/>
-            </a:fillRef>
-            <a:effectRef idx="0">
-              <a:schemeClr val="accent1"/>
-            </a:effectRef>
-            <a:fontRef idx="minor">
-              <a:schemeClr val="lt1"/>
-            </a:fontRef>
-          </p:style>
-          <p:txBody>
-            <a:bodyPr rtlCol="0" anchor="ctr"/>
-            <a:lstStyle/>
-            <a:p>
-              <a:pPr algn="ctr"/>
-              <a:r>
-                <a:rPr lang="en-US" altLang="zh-CN" b="1" dirty="0">
-                  <a:solidFill>
-                    <a:schemeClr val="tx1"/>
-                  </a:solidFill>
-                </a:rPr>
-                <a:t>Account</a:t>
-              </a:r>
-              <a:endParaRPr lang="en-US" b="1" dirty="0">
-                <a:solidFill>
-                  <a:schemeClr val="tx1"/>
-                </a:solidFill>
-              </a:endParaRPr>
-            </a:p>
-          </p:txBody>
-        </p:sp>
+                </a:endParaRPr>
+              </a:p>
+            </p:txBody>
+          </p:sp>
+        </p:grpSp>
         <p:grpSp>
           <p:nvGrpSpPr>
             <p:cNvPr id="131" name="Group 130"/>
@@ -3241,9 +3632,9 @@
             <p:nvPr/>
           </p:nvGrpSpPr>
           <p:grpSpPr>
-            <a:xfrm rot="0">
-              <a:off x="12744" y="3514"/>
-              <a:ext cx="3138" cy="1969"/>
+            <a:xfrm>
+              <a:off x="8864432" y="2523377"/>
+              <a:ext cx="1992630" cy="1250315"/>
               <a:chOff x="8543646" y="2231373"/>
               <a:chExt cx="1992353" cy="1250373"/>
             </a:xfrm>
@@ -3290,7 +3681,7 @@
               <a:lstStyle/>
               <a:p>
                 <a:r>
-                  <a:rPr lang="en-US" altLang="zh-CN" sz="1200" dirty="0">
+                  <a:rPr lang="en-US" altLang="zh-CN" sz="1000" dirty="0">
                     <a:solidFill>
                       <a:schemeClr val="tx1"/>
                     </a:solidFill>
@@ -3298,7 +3689,7 @@
                   <a:t>id:</a:t>
                 </a:r>
                 <a:r>
-                  <a:rPr lang="zh-CN" altLang="en-US" sz="1200" dirty="0">
+                  <a:rPr lang="zh-CN" altLang="en-US" sz="1000" dirty="0">
                     <a:solidFill>
                       <a:schemeClr val="tx1"/>
                     </a:solidFill>
@@ -3306,14 +3697,108 @@
                   <a:t> </a:t>
                 </a:r>
                 <a:r>
-                  <a:rPr lang="en-US" altLang="zh-CN" sz="1200" dirty="0">
+                  <a:rPr lang="en-US" altLang="zh-CN" sz="1000" dirty="0">
                     <a:solidFill>
                       <a:schemeClr val="tx1"/>
                     </a:solidFill>
                   </a:rPr>
                   <a:t>ID</a:t>
                 </a:r>
-                <a:endParaRPr lang="en-US" altLang="zh-CN" sz="1200" dirty="0">
+              </a:p>
+              <a:p>
+                <a:r>
+                  <a:rPr lang="en-US" altLang="zh-CN" sz="1000" dirty="0">
+                    <a:solidFill>
+                      <a:schemeClr val="tx1"/>
+                    </a:solidFill>
+                  </a:rPr>
+                  <a:t>type:</a:t>
+                </a:r>
+                <a:r>
+                  <a:rPr lang="zh-CN" altLang="en-US" sz="1000" dirty="0">
+                    <a:solidFill>
+                      <a:schemeClr val="tx1"/>
+                    </a:solidFill>
+                  </a:rPr>
+                  <a:t> </a:t>
+                </a:r>
+                <a:r>
+                  <a:rPr lang="en-US" altLang="zh-CN" sz="1000" dirty="0">
+                    <a:solidFill>
+                      <a:schemeClr val="tx1"/>
+                    </a:solidFill>
+                  </a:rPr>
+                  <a:t>String</a:t>
+                </a:r>
+              </a:p>
+              <a:p>
+                <a:r>
+                  <a:rPr lang="en-US" altLang="zh-CN" sz="1000" dirty="0" err="1">
+                    <a:solidFill>
+                      <a:schemeClr val="tx1"/>
+                    </a:solidFill>
+                  </a:rPr>
+                  <a:t>isBlocked</a:t>
+                </a:r>
+                <a:r>
+                  <a:rPr lang="en-US" altLang="zh-CN" sz="1000" dirty="0">
+                    <a:solidFill>
+                      <a:schemeClr val="tx1"/>
+                    </a:solidFill>
+                  </a:rPr>
+                  <a:t>:</a:t>
+                </a:r>
+                <a:r>
+                  <a:rPr lang="zh-CN" altLang="en-US" sz="1000" dirty="0">
+                    <a:solidFill>
+                      <a:schemeClr val="tx1"/>
+                    </a:solidFill>
+                  </a:rPr>
+                  <a:t> </a:t>
+                </a:r>
+                <a:r>
+                  <a:rPr lang="en-US" altLang="zh-CN" sz="1000" dirty="0">
+                    <a:solidFill>
+                      <a:schemeClr val="tx1"/>
+                    </a:solidFill>
+                  </a:rPr>
+                  <a:t>Boolean</a:t>
+                </a:r>
+              </a:p>
+              <a:p>
+                <a:r>
+                  <a:rPr lang="en-US" altLang="zh-CN" sz="1000" dirty="0" err="1">
+                    <a:solidFill>
+                      <a:schemeClr val="tx1"/>
+                    </a:solidFill>
+                  </a:rPr>
+                  <a:t>lastLogin</a:t>
+                </a:r>
+                <a:r>
+                  <a:rPr lang="en-US" altLang="zh-CN" sz="1000" dirty="0">
+                    <a:solidFill>
+                      <a:schemeClr val="tx1"/>
+                    </a:solidFill>
+                  </a:rPr>
+                  <a:t>:</a:t>
+                </a:r>
+                <a:r>
+                  <a:rPr lang="zh-CN" altLang="en-US" sz="1000" dirty="0">
+                    <a:solidFill>
+                      <a:schemeClr val="tx1"/>
+                    </a:solidFill>
+                  </a:rPr>
+                  <a:t> </a:t>
+                </a:r>
+                <a:r>
+                  <a:rPr lang="en-US" altLang="zh-CN" sz="1000" dirty="0" err="1">
+                    <a:solidFill>
+                      <a:schemeClr val="tx1"/>
+                    </a:solidFill>
+                  </a:rPr>
+                  <a:t>DateTime</a:t>
+                </a:r>
+                <a:endParaRPr lang="en-US" altLang="zh-CN" sz="1000" dirty="0">
                   <a:solidFill>
                     <a:schemeClr val="tx1"/>
                   </a:solidFill>
@@ -3321,15 +3806,23 @@
               </a:p>
               <a:p>
                 <a:r>
-                  <a:rPr lang="en-US" altLang="zh-CN" sz="1200" dirty="0">
-                    <a:solidFill>
-                      <a:schemeClr val="tx1"/>
-                    </a:solidFill>
-                  </a:rPr>
-                  <a:t>type:</a:t>
-                </a:r>
-                <a:r>
-                  <a:rPr lang="zh-CN" altLang="en-US" sz="1200" dirty="0">
+                  <a:rPr lang="en-US" altLang="zh-CN" sz="1000" dirty="0" err="1">
+                    <a:solidFill>
+                      <a:schemeClr val="tx1"/>
+                    </a:solidFill>
+                  </a:rPr>
+                  <a:t>riskLevel</a:t>
+                </a:r>
+                <a:r>
+                  <a:rPr lang="en-US" altLang="zh-CN" sz="1000" dirty="0">
+                    <a:solidFill>
+                      <a:schemeClr val="tx1"/>
+                    </a:solidFill>
+                  </a:rPr>
+                  <a:t>:</a:t>
+                </a:r>
+                <a:r>
+                  <a:rPr lang="zh-CN" altLang="en-US" sz="1000" dirty="0">
                     <a:solidFill>
                       <a:schemeClr val="tx1"/>
                     </a:solidFill>
@@ -3337,53 +3830,14 @@
                   <a:t> </a:t>
                 </a:r>
                 <a:r>
-                  <a:rPr lang="en-US" altLang="zh-CN" sz="1200" dirty="0">
+                  <a:rPr lang="en-US" altLang="zh-CN" sz="1000" dirty="0">
                     <a:solidFill>
                       <a:schemeClr val="tx1"/>
                     </a:solidFill>
                   </a:rPr>
                   <a:t>String</a:t>
                 </a:r>
-                <a:endParaRPr lang="en-US" altLang="zh-CN" sz="1200" dirty="0">
-                  <a:solidFill>
-                    <a:schemeClr val="tx1"/>
-                  </a:solidFill>
-                </a:endParaRPr>
-              </a:p>
-              <a:p>
-                <a:r>
-                  <a:rPr lang="en-US" altLang="zh-CN" sz="1200" dirty="0" err="1">
-                    <a:solidFill>
-                      <a:schemeClr val="tx1"/>
-                    </a:solidFill>
-                  </a:rPr>
-                  <a:t>isBlocked</a:t>
-                </a:r>
-                <a:r>
-                  <a:rPr lang="en-US" altLang="zh-CN" sz="1200" dirty="0">
-                    <a:solidFill>
-                      <a:schemeClr val="tx1"/>
-                    </a:solidFill>
-                  </a:rPr>
-                  <a:t>:</a:t>
-                </a:r>
-                <a:r>
-                  <a:rPr lang="zh-CN" altLang="en-US" sz="1200" dirty="0">
-                    <a:solidFill>
-                      <a:schemeClr val="tx1"/>
-                    </a:solidFill>
-                  </a:rPr>
-                  <a:t> </a:t>
-                </a:r>
-                <a:r>
-                  <a:rPr lang="en-US" altLang="zh-CN" sz="1200" dirty="0">
-                    <a:solidFill>
-                      <a:schemeClr val="tx1"/>
-                    </a:solidFill>
-                  </a:rPr>
-                  <a:t>Boolean</a:t>
-                </a:r>
-                <a:endParaRPr lang="en-US" sz="1200" dirty="0">
+                <a:endParaRPr lang="en-US" sz="1000" dirty="0">
                   <a:solidFill>
                     <a:schemeClr val="tx1"/>
                   </a:solidFill>
@@ -3459,6 +3913,7 @@
           <p:nvCxnSpPr>
             <p:cNvPr id="26" name="Elbow Connector 25"/>
             <p:cNvCxnSpPr>
+              <a:cxnSpLocks/>
               <a:stCxn id="10" idx="3"/>
               <a:endCxn id="15" idx="1"/>
             </p:cNvCxnSpPr>
@@ -3466,12 +3921,12 @@
           </p:nvCxnSpPr>
           <p:spPr>
             <a:xfrm>
-              <a:off x="6278" y="2544"/>
-              <a:ext cx="1598" cy="2268"/>
+              <a:off x="4304581" y="1083944"/>
+              <a:ext cx="1014730" cy="2259218"/>
             </a:xfrm>
             <a:prstGeom prst="bentConnector3">
               <a:avLst>
-                <a:gd name="adj1" fmla="val 47296"/>
+                <a:gd name="adj1" fmla="val 50000"/>
               </a:avLst>
             </a:prstGeom>
             <a:ln w="19050" cmpd="sng">
@@ -3502,19 +3957,19 @@
           <p:nvCxnSpPr>
             <p:cNvPr id="27" name="Elbow Connector 26"/>
             <p:cNvCxnSpPr>
+              <a:cxnSpLocks/>
               <a:stCxn id="13" idx="3"/>
-              <a:endCxn id="100" idx="6"/>
             </p:cNvCxnSpPr>
             <p:nvPr/>
           </p:nvCxnSpPr>
           <p:spPr>
-            <a:xfrm flipV="1">
-              <a:off x="6278" y="5117"/>
-              <a:ext cx="1611" cy="845"/>
+            <a:xfrm>
+              <a:off x="4304581" y="3647744"/>
+              <a:ext cx="1028064" cy="635"/>
             </a:xfrm>
             <a:prstGeom prst="bentConnector3">
               <a:avLst>
-                <a:gd name="adj1" fmla="val 46366"/>
+                <a:gd name="adj1" fmla="val 50000"/>
               </a:avLst>
             </a:prstGeom>
             <a:ln w="19050">
@@ -3545,6 +4000,7 @@
           <p:nvCxnSpPr>
             <p:cNvPr id="28" name="Straight Arrow Connector 27"/>
             <p:cNvCxnSpPr>
+              <a:cxnSpLocks/>
               <a:stCxn id="9" idx="2"/>
               <a:endCxn id="13" idx="0"/>
             </p:cNvCxnSpPr>
@@ -3552,8 +4008,8 @@
           </p:nvCxnSpPr>
           <p:spPr>
             <a:xfrm>
-              <a:off x="4709" y="3839"/>
-              <a:ext cx="0" cy="1817"/>
+              <a:off x="3308266" y="2520381"/>
+              <a:ext cx="0" cy="933688"/>
             </a:xfrm>
             <a:prstGeom prst="straightConnector1">
               <a:avLst/>
@@ -3586,15 +4042,16 @@
           <p:nvCxnSpPr>
             <p:cNvPr id="30" name="Elbow Connector 29"/>
             <p:cNvCxnSpPr>
+              <a:cxnSpLocks/>
               <a:stCxn id="21" idx="1"/>
               <a:endCxn id="15" idx="3"/>
             </p:cNvCxnSpPr>
             <p:nvPr/>
           </p:nvCxnSpPr>
           <p:spPr>
-            <a:xfrm rot="10800000" flipV="1">
-              <a:off x="11042" y="4811"/>
-              <a:ext cx="1702" cy="2"/>
+            <a:xfrm rot="10800000">
+              <a:off x="7329722" y="3343163"/>
+              <a:ext cx="1534711" cy="3831"/>
             </a:xfrm>
             <a:prstGeom prst="bentConnector3">
               <a:avLst/>
@@ -3631,8 +4088,8 @@
           </p:nvSpPr>
           <p:spPr>
             <a:xfrm>
-              <a:off x="6301" y="2050"/>
-              <a:ext cx="733" cy="436"/>
+              <a:off x="4319186" y="1164259"/>
+              <a:ext cx="441146" cy="261610"/>
             </a:xfrm>
             <a:prstGeom prst="rect">
               <a:avLst/>
@@ -3646,10 +4103,10 @@
             <a:lstStyle/>
             <a:p>
               <a:r>
-                <a:rPr lang="en-US" altLang="zh-CN" sz="1200" dirty="0"/>
+                <a:rPr lang="en-US" altLang="zh-CN" sz="1100" dirty="0"/>
                 <a:t>own</a:t>
               </a:r>
-              <a:endParaRPr lang="en-US" sz="1400" dirty="0"/>
+              <a:endParaRPr lang="en-US" sz="1200" dirty="0"/>
             </a:p>
           </p:txBody>
         </p:sp>
@@ -3661,8 +4118,8 @@
           </p:nvSpPr>
           <p:spPr>
             <a:xfrm>
-              <a:off x="11438" y="4811"/>
-              <a:ext cx="909" cy="436"/>
+              <a:off x="7581181" y="2917494"/>
+              <a:ext cx="545342" cy="261610"/>
             </a:xfrm>
             <a:prstGeom prst="rect">
               <a:avLst/>
@@ -3676,10 +4133,10 @@
             <a:lstStyle/>
             <a:p>
               <a:r>
-                <a:rPr lang="en-US" altLang="zh-CN" sz="1200" dirty="0" err="1"/>
+                <a:rPr lang="en-US" altLang="zh-CN" sz="1100" dirty="0" err="1"/>
                 <a:t>signIn</a:t>
               </a:r>
-              <a:endParaRPr lang="en-US" sz="1200" dirty="0"/>
+              <a:endParaRPr lang="en-US" sz="1100" dirty="0"/>
             </a:p>
           </p:txBody>
         </p:sp>
@@ -3690,11 +4147,11 @@
             <p:nvPr/>
           </p:nvGrpSpPr>
           <p:grpSpPr>
-            <a:xfrm rot="0">
-              <a:off x="7876" y="6753"/>
-              <a:ext cx="3166" cy="1697"/>
+            <a:xfrm>
+              <a:off x="5319311" y="4890137"/>
+              <a:ext cx="2010410" cy="1250406"/>
               <a:chOff x="2789712" y="3039762"/>
-              <a:chExt cx="2010595" cy="1077417"/>
+              <a:chExt cx="2010595" cy="1250199"/>
             </a:xfrm>
           </p:grpSpPr>
           <p:sp>
@@ -3706,7 +4163,7 @@
             <p:spPr>
               <a:xfrm>
                 <a:off x="2789712" y="3429001"/>
-                <a:ext cx="2010594" cy="688178"/>
+                <a:ext cx="2010594" cy="860960"/>
               </a:xfrm>
               <a:prstGeom prst="rect">
                 <a:avLst/>
@@ -3739,7 +4196,7 @@
               <a:lstStyle/>
               <a:p>
                 <a:r>
-                  <a:rPr lang="en-US" altLang="zh-CN" sz="1200" dirty="0">
+                  <a:rPr lang="en-US" altLang="zh-CN" sz="1000" dirty="0">
                     <a:solidFill>
                       <a:schemeClr val="tx1"/>
                     </a:solidFill>
@@ -3747,7 +4204,7 @@
                   <a:t>id:</a:t>
                 </a:r>
                 <a:r>
-                  <a:rPr lang="zh-CN" altLang="en-US" sz="1200" dirty="0">
+                  <a:rPr lang="zh-CN" altLang="en-US" sz="1000" dirty="0">
                     <a:solidFill>
                       <a:schemeClr val="tx1"/>
                     </a:solidFill>
@@ -3755,22 +4212,17 @@
                   <a:t> </a:t>
                 </a:r>
                 <a:r>
-                  <a:rPr lang="en-US" altLang="zh-CN" sz="1200" dirty="0">
+                  <a:rPr lang="en-US" altLang="zh-CN" sz="1000" dirty="0">
                     <a:solidFill>
                       <a:schemeClr val="tx1"/>
                     </a:solidFill>
                   </a:rPr>
                   <a:t>ID</a:t>
                 </a:r>
-                <a:endParaRPr lang="en-US" altLang="zh-CN" sz="1200" dirty="0">
-                  <a:solidFill>
-                    <a:schemeClr val="tx1"/>
-                  </a:solidFill>
-                </a:endParaRPr>
               </a:p>
               <a:p>
                 <a:r>
-                  <a:rPr lang="en-US" altLang="zh-CN" sz="1200" dirty="0" err="1">
+                  <a:rPr lang="en-US" altLang="zh-CN" sz="1000" dirty="0" err="1">
                     <a:solidFill>
                       <a:schemeClr val="tx1"/>
                     </a:solidFill>
@@ -3778,7 +4230,7 @@
                   <a:t>loanAmount</a:t>
                 </a:r>
                 <a:r>
-                  <a:rPr lang="en-US" altLang="zh-CN" sz="1200" dirty="0">
+                  <a:rPr lang="en-US" altLang="zh-CN" sz="1000" dirty="0">
                     <a:solidFill>
                       <a:schemeClr val="tx1"/>
                     </a:solidFill>
@@ -3786,7 +4238,7 @@
                   <a:t>:</a:t>
                 </a:r>
                 <a:r>
-                  <a:rPr lang="zh-CN" altLang="en-US" sz="1200" dirty="0">
+                  <a:rPr lang="zh-CN" altLang="en-US" sz="1000" dirty="0">
                     <a:solidFill>
                       <a:schemeClr val="tx1"/>
                     </a:solidFill>
@@ -3794,7 +4246,7 @@
                   <a:t> </a:t>
                 </a:r>
                 <a:r>
-                  <a:rPr lang="en-US" altLang="zh-CN" sz="1200" dirty="0">
+                  <a:rPr lang="en-US" altLang="zh-CN" sz="1000" dirty="0">
                     <a:solidFill>
                       <a:schemeClr val="tx1"/>
                     </a:solidFill>
@@ -3802,7 +4254,7 @@
                   <a:t>64-bit</a:t>
                 </a:r>
                 <a:r>
-                  <a:rPr lang="zh-CN" altLang="en-US" sz="1200" dirty="0">
+                  <a:rPr lang="zh-CN" altLang="en-US" sz="1000" dirty="0">
                     <a:solidFill>
                       <a:schemeClr val="tx1"/>
                     </a:solidFill>
@@ -3810,22 +4262,17 @@
                   <a:t> </a:t>
                 </a:r>
                 <a:r>
-                  <a:rPr lang="en-US" altLang="zh-CN" sz="1200" dirty="0">
+                  <a:rPr lang="en-US" altLang="zh-CN" sz="1000" dirty="0">
                     <a:solidFill>
                       <a:schemeClr val="tx1"/>
                     </a:solidFill>
                   </a:rPr>
                   <a:t>Float</a:t>
                 </a:r>
-                <a:endParaRPr lang="en-US" altLang="zh-CN" sz="1200" dirty="0">
-                  <a:solidFill>
-                    <a:schemeClr val="tx1"/>
-                  </a:solidFill>
-                </a:endParaRPr>
               </a:p>
               <a:p>
                 <a:r>
-                  <a:rPr lang="en-US" sz="1200" dirty="0">
+                  <a:rPr lang="en-US" sz="1000" dirty="0">
                     <a:solidFill>
                       <a:schemeClr val="tx1"/>
                     </a:solidFill>
@@ -3833,7 +4280,7 @@
                   <a:t>balance: </a:t>
                 </a:r>
                 <a:r>
-                  <a:rPr lang="en-US" altLang="zh-CN" sz="1200" dirty="0">
+                  <a:rPr lang="en-US" altLang="zh-CN" sz="1000" dirty="0">
                     <a:solidFill>
                       <a:schemeClr val="tx1"/>
                     </a:solidFill>
@@ -3841,7 +4288,7 @@
                   <a:t>64-bit</a:t>
                 </a:r>
                 <a:r>
-                  <a:rPr lang="zh-CN" altLang="en-US" sz="1200" dirty="0">
+                  <a:rPr lang="zh-CN" altLang="en-US" sz="1000" dirty="0">
                     <a:solidFill>
                       <a:schemeClr val="tx1"/>
                     </a:solidFill>
@@ -3849,18 +4296,89 @@
                   <a:t> </a:t>
                 </a:r>
                 <a:r>
-                  <a:rPr lang="en-US" altLang="zh-CN" sz="1200" dirty="0">
+                  <a:rPr lang="en-US" altLang="zh-CN" sz="1000" dirty="0">
                     <a:solidFill>
                       <a:schemeClr val="tx1"/>
                     </a:solidFill>
                   </a:rPr>
                   <a:t>Float</a:t>
                 </a:r>
-                <a:endParaRPr lang="en-US" altLang="zh-CN" sz="1200" dirty="0">
-                  <a:solidFill>
-                    <a:schemeClr val="tx1"/>
-                  </a:solidFill>
-                </a:endParaRPr>
+              </a:p>
+              <a:p>
+                <a:r>
+                  <a:rPr lang="en-US" altLang="zh-CN" sz="1000" dirty="0">
+                    <a:solidFill>
+                      <a:schemeClr val="tx1"/>
+                    </a:solidFill>
+                  </a:rPr>
+                  <a:t>usage:</a:t>
+                </a:r>
+                <a:r>
+                  <a:rPr lang="zh-CN" altLang="en-US" sz="1000" dirty="0">
+                    <a:solidFill>
+                      <a:schemeClr val="tx1"/>
+                    </a:solidFill>
+                  </a:rPr>
+                  <a:t> </a:t>
+                </a:r>
+                <a:r>
+                  <a:rPr lang="en-US" altLang="zh-CN" sz="1000" dirty="0">
+                    <a:solidFill>
+                      <a:schemeClr val="tx1"/>
+                    </a:solidFill>
+                  </a:rPr>
+                  <a:t>String</a:t>
+                </a:r>
+              </a:p>
+              <a:p>
+                <a:r>
+                  <a:rPr lang="en-US" altLang="zh-CN" sz="1000" dirty="0" err="1">
+                    <a:solidFill>
+                      <a:schemeClr val="tx1"/>
+                    </a:solidFill>
+                  </a:rPr>
+                  <a:t>interestRate</a:t>
+                </a:r>
+                <a:r>
+                  <a:rPr lang="en-US" altLang="zh-CN" sz="1000" dirty="0">
+                    <a:solidFill>
+                      <a:schemeClr val="tx1"/>
+                    </a:solidFill>
+                  </a:rPr>
+                  <a:t>:</a:t>
+                </a:r>
+                <a:r>
+                  <a:rPr lang="zh-CN" altLang="en-US" sz="1000" dirty="0">
+                    <a:solidFill>
+                      <a:schemeClr val="tx1"/>
+                    </a:solidFill>
+                  </a:rPr>
+                  <a:t> </a:t>
+                </a:r>
+                <a:r>
+                  <a:rPr lang="en-US" altLang="zh-CN" sz="1000" dirty="0">
+                    <a:solidFill>
+                      <a:schemeClr val="tx1"/>
+                    </a:solidFill>
+                  </a:rPr>
+                  <a:t>32-bit</a:t>
+                </a:r>
+                <a:r>
+                  <a:rPr lang="zh-CN" altLang="en-US" sz="1000" dirty="0">
+                    <a:solidFill>
+                      <a:schemeClr val="tx1"/>
+                    </a:solidFill>
+                  </a:rPr>
+                  <a:t> </a:t>
+                </a:r>
+                <a:r>
+                  <a:rPr lang="en-US" altLang="zh-CN" sz="1000" dirty="0">
+                    <a:solidFill>
+                      <a:schemeClr val="tx1"/>
+                    </a:solidFill>
+                  </a:rPr>
+                  <a:t>Float</a:t>
+                </a:r>
               </a:p>
             </p:txBody>
           </p:sp>
@@ -3932,19 +4450,20 @@
           <p:nvCxnSpPr>
             <p:cNvPr id="42" name="Elbow Connector 41"/>
             <p:cNvCxnSpPr>
+              <a:cxnSpLocks/>
               <a:stCxn id="10" idx="1"/>
-              <a:endCxn id="112" idx="2"/>
+              <a:endCxn id="40" idx="1"/>
             </p:cNvCxnSpPr>
             <p:nvPr/>
           </p:nvCxnSpPr>
           <p:spPr>
             <a:xfrm rot="10800000" flipH="1" flipV="1">
-              <a:off x="3140" y="2544"/>
-              <a:ext cx="4715" cy="5678"/>
+              <a:off x="2311951" y="1083944"/>
+              <a:ext cx="3007360" cy="4626048"/>
             </a:xfrm>
             <a:prstGeom prst="bentConnector3">
               <a:avLst>
-                <a:gd name="adj1" fmla="val -26569"/>
+                <a:gd name="adj1" fmla="val -34766"/>
               </a:avLst>
             </a:prstGeom>
             <a:ln w="19050" cmpd="sng">
@@ -3975,19 +4494,19 @@
           <p:nvCxnSpPr>
             <p:cNvPr id="43" name="Elbow Connector 42"/>
             <p:cNvCxnSpPr>
+              <a:cxnSpLocks/>
               <a:stCxn id="13" idx="1"/>
-              <a:endCxn id="40" idx="1"/>
             </p:cNvCxnSpPr>
             <p:nvPr/>
           </p:nvCxnSpPr>
           <p:spPr>
             <a:xfrm rot="10800000" flipH="1" flipV="1">
-              <a:off x="3140" y="5961"/>
-              <a:ext cx="4735" cy="1946"/>
+              <a:off x="2311950" y="3647744"/>
+              <a:ext cx="3020693" cy="1922592"/>
             </a:xfrm>
             <a:prstGeom prst="bentConnector3">
               <a:avLst>
-                <a:gd name="adj1" fmla="val -18855"/>
+                <a:gd name="adj1" fmla="val -23696"/>
               </a:avLst>
             </a:prstGeom>
             <a:ln w="19050">
@@ -4022,8 +4541,8 @@
           </p:nvSpPr>
           <p:spPr>
             <a:xfrm>
-              <a:off x="2021" y="2113"/>
-              <a:ext cx="856" cy="436"/>
+              <a:off x="1601386" y="1204264"/>
+              <a:ext cx="513282" cy="261610"/>
             </a:xfrm>
             <a:prstGeom prst="rect">
               <a:avLst/>
@@ -4037,10 +4556,10 @@
             <a:lstStyle/>
             <a:p>
               <a:r>
-                <a:rPr lang="en-US" altLang="zh-CN" sz="1200" dirty="0"/>
+                <a:rPr lang="en-US" altLang="zh-CN" sz="1100" dirty="0"/>
                 <a:t>apply</a:t>
               </a:r>
-              <a:endParaRPr lang="en-US" sz="1400" dirty="0"/>
+              <a:endParaRPr lang="en-US" sz="1200" dirty="0"/>
             </a:p>
           </p:txBody>
         </p:sp>
@@ -4052,8 +4571,8 @@
           </p:nvSpPr>
           <p:spPr>
             <a:xfrm>
-              <a:off x="2186" y="5507"/>
-              <a:ext cx="856" cy="436"/>
+              <a:off x="1706161" y="3359454"/>
+              <a:ext cx="513282" cy="261610"/>
             </a:xfrm>
             <a:prstGeom prst="rect">
               <a:avLst/>
@@ -4067,23 +4586,25 @@
             <a:lstStyle/>
             <a:p>
               <a:r>
-                <a:rPr lang="en-US" altLang="zh-CN" sz="1200" dirty="0"/>
+                <a:rPr lang="en-US" altLang="zh-CN" sz="1100" dirty="0"/>
                 <a:t>apply</a:t>
               </a:r>
-              <a:endParaRPr lang="en-US" sz="1400" dirty="0"/>
+              <a:endParaRPr lang="en-US" sz="1200" dirty="0"/>
             </a:p>
           </p:txBody>
         </p:sp>
         <p:cxnSp>
           <p:nvCxnSpPr>
             <p:cNvPr id="48" name="Straight Arrow Connector 47"/>
-            <p:cNvCxnSpPr/>
+            <p:cNvCxnSpPr>
+              <a:cxnSpLocks/>
+            </p:cNvCxnSpPr>
             <p:nvPr/>
           </p:nvCxnSpPr>
           <p:spPr>
             <a:xfrm flipV="1">
-              <a:off x="9819" y="5483"/>
-              <a:ext cx="0" cy="1299"/>
+              <a:off x="6552481" y="4193645"/>
+              <a:ext cx="0" cy="696491"/>
             </a:xfrm>
             <a:prstGeom prst="straightConnector1">
               <a:avLst/>
@@ -4120,8 +4641,8 @@
           </p:nvSpPr>
           <p:spPr>
             <a:xfrm>
-              <a:off x="9818" y="5866"/>
-              <a:ext cx="1061" cy="436"/>
+              <a:off x="6552481" y="4380716"/>
+              <a:ext cx="633507" cy="261610"/>
             </a:xfrm>
             <a:prstGeom prst="rect">
               <a:avLst/>
@@ -4135,10 +4656,10 @@
             <a:lstStyle/>
             <a:p>
               <a:r>
-                <a:rPr lang="en-US" altLang="zh-CN" sz="1200" dirty="0"/>
+                <a:rPr lang="en-US" altLang="zh-CN" sz="1100" dirty="0"/>
                 <a:t>deposit</a:t>
               </a:r>
-              <a:endParaRPr lang="en-US" sz="1400" dirty="0"/>
+              <a:endParaRPr lang="en-US" sz="1200" dirty="0"/>
             </a:p>
           </p:txBody>
         </p:sp>
@@ -4150,8 +4671,8 @@
           </p:nvSpPr>
           <p:spPr>
             <a:xfrm>
-              <a:off x="3826" y="4317"/>
-              <a:ext cx="892" cy="436"/>
+              <a:off x="2780829" y="2735336"/>
+              <a:ext cx="534121" cy="261610"/>
             </a:xfrm>
             <a:prstGeom prst="rect">
               <a:avLst/>
@@ -4165,23 +4686,24 @@
             <a:lstStyle/>
             <a:p>
               <a:r>
-                <a:rPr lang="en-US" altLang="zh-CN" sz="1200" dirty="0"/>
+                <a:rPr lang="en-US" altLang="zh-CN" sz="1100" dirty="0"/>
                 <a:t>invest</a:t>
               </a:r>
-              <a:endParaRPr lang="en-US" altLang="zh-CN" sz="1200" dirty="0"/>
             </a:p>
           </p:txBody>
         </p:sp>
         <p:cxnSp>
           <p:nvCxnSpPr>
             <p:cNvPr id="58" name="Straight Arrow Connector 57"/>
-            <p:cNvCxnSpPr/>
+            <p:cNvCxnSpPr>
+              <a:cxnSpLocks/>
+            </p:cNvCxnSpPr>
             <p:nvPr/>
           </p:nvCxnSpPr>
           <p:spPr>
-            <a:xfrm>
-              <a:off x="9076" y="5546"/>
-              <a:ext cx="0" cy="1207"/>
+            <a:xfrm flipH="1">
+              <a:off x="6090836" y="4193645"/>
+              <a:ext cx="8890" cy="696491"/>
             </a:xfrm>
             <a:prstGeom prst="straightConnector1">
               <a:avLst/>
@@ -4218,8 +4740,8 @@
           </p:nvSpPr>
           <p:spPr>
             <a:xfrm>
-              <a:off x="8197" y="5866"/>
-              <a:ext cx="871" cy="436"/>
+              <a:off x="5510147" y="4337989"/>
+              <a:ext cx="521297" cy="261610"/>
             </a:xfrm>
             <a:prstGeom prst="rect">
               <a:avLst/>
@@ -4233,10 +4755,10 @@
             <a:lstStyle/>
             <a:p>
               <a:r>
-                <a:rPr lang="en-US" altLang="zh-CN" sz="1200" dirty="0"/>
+                <a:rPr lang="en-US" altLang="zh-CN" sz="1100" dirty="0"/>
                 <a:t>repay</a:t>
               </a:r>
-              <a:endParaRPr lang="en-US" sz="1400" dirty="0"/>
+              <a:endParaRPr lang="en-US" sz="1200" dirty="0"/>
             </a:p>
           </p:txBody>
         </p:sp>
@@ -4251,8 +4773,8 @@
           </p:nvCxnSpPr>
           <p:spPr>
             <a:xfrm rot="16200000" flipH="1" flipV="1">
-              <a:off x="8013" y="3372"/>
-              <a:ext cx="949" cy="1235"/>
+              <a:off x="5406306" y="2003729"/>
+              <a:ext cx="602615" cy="784225"/>
             </a:xfrm>
             <a:prstGeom prst="bentConnector4">
               <a:avLst>
@@ -4292,8 +4814,8 @@
           </p:nvSpPr>
           <p:spPr>
             <a:xfrm>
-              <a:off x="7726" y="2679"/>
-              <a:ext cx="1083" cy="436"/>
+              <a:off x="5224061" y="1563674"/>
+              <a:ext cx="644728" cy="261610"/>
             </a:xfrm>
             <a:prstGeom prst="rect">
               <a:avLst/>
@@ -4307,10 +4829,9 @@
             <a:lstStyle/>
             <a:p>
               <a:r>
-                <a:rPr lang="en-US" altLang="zh-CN" sz="1200" dirty="0"/>
+                <a:rPr lang="en-US" altLang="zh-CN" sz="1100" dirty="0"/>
                 <a:t>transfer</a:t>
               </a:r>
-              <a:endParaRPr lang="en-US" altLang="zh-CN" sz="1200" dirty="0"/>
             </a:p>
           </p:txBody>
         </p:sp>
@@ -4318,20 +4839,20 @@
           <p:nvCxnSpPr>
             <p:cNvPr id="84" name="Elbow Connector 83"/>
             <p:cNvCxnSpPr>
-              <a:stCxn id="12" idx="2"/>
+              <a:cxnSpLocks/>
               <a:endCxn id="12" idx="3"/>
             </p:cNvCxnSpPr>
             <p:nvPr/>
           </p:nvCxnSpPr>
           <p:spPr>
             <a:xfrm rot="5400000" flipH="1" flipV="1">
-              <a:off x="5220" y="6305"/>
-              <a:ext cx="546" cy="1569"/>
+              <a:off x="3725649" y="4547610"/>
+              <a:ext cx="641608" cy="516255"/>
             </a:xfrm>
             <a:prstGeom prst="bentConnector4">
               <a:avLst>
-                <a:gd name="adj1" fmla="val -65876"/>
-                <a:gd name="adj2" fmla="val 122948"/>
+                <a:gd name="adj1" fmla="val -47069"/>
+                <a:gd name="adj2" fmla="val 144280"/>
               </a:avLst>
             </a:prstGeom>
             <a:ln w="19050">
@@ -4366,8 +4887,8 @@
           </p:nvSpPr>
           <p:spPr>
             <a:xfrm>
-              <a:off x="5020" y="7324"/>
-              <a:ext cx="1204" cy="436"/>
+              <a:off x="3770546" y="5135366"/>
+              <a:ext cx="764540" cy="261610"/>
             </a:xfrm>
             <a:prstGeom prst="rect">
               <a:avLst/>
@@ -4382,10 +4903,9 @@
             <a:p>
               <a:pPr algn="ctr"/>
               <a:r>
-                <a:rPr lang="en-US" altLang="zh-CN" sz="1200" dirty="0"/>
+                <a:rPr lang="en-US" altLang="zh-CN" sz="1100" dirty="0"/>
                 <a:t>invest</a:t>
               </a:r>
-              <a:endParaRPr lang="en-US" altLang="zh-CN" sz="1200" dirty="0"/>
             </a:p>
           </p:txBody>
         </p:sp>
@@ -4397,8 +4917,8 @@
           </p:nvSpPr>
           <p:spPr>
             <a:xfrm>
-              <a:off x="6301" y="5443"/>
-              <a:ext cx="733" cy="436"/>
+              <a:off x="4319186" y="3318814"/>
+              <a:ext cx="441146" cy="261610"/>
             </a:xfrm>
             <a:prstGeom prst="rect">
               <a:avLst/>
@@ -4412,10 +4932,9 @@
             <a:lstStyle/>
             <a:p>
               <a:r>
-                <a:rPr lang="en-US" altLang="zh-CN" sz="1200" dirty="0"/>
+                <a:rPr lang="en-US" altLang="zh-CN" sz="1100" dirty="0"/>
                 <a:t>own</a:t>
               </a:r>
-              <a:endParaRPr lang="en-US" altLang="zh-CN" sz="1200" dirty="0"/>
             </a:p>
           </p:txBody>
         </p:sp>
@@ -4430,8 +4949,8 @@
           </p:nvCxnSpPr>
           <p:spPr>
             <a:xfrm rot="16200000" flipH="1">
-              <a:off x="9983" y="3403"/>
-              <a:ext cx="947" cy="1174"/>
+              <a:off x="6657256" y="2023414"/>
+              <a:ext cx="601345" cy="745490"/>
             </a:xfrm>
             <a:prstGeom prst="bentConnector4">
               <a:avLst>
@@ -4471,8 +4990,8 @@
           </p:nvSpPr>
           <p:spPr>
             <a:xfrm>
-              <a:off x="9978" y="2679"/>
-              <a:ext cx="1237" cy="436"/>
+              <a:off x="6654081" y="1563674"/>
+              <a:ext cx="737702" cy="261610"/>
             </a:xfrm>
             <a:prstGeom prst="rect">
               <a:avLst/>
@@ -4486,10 +5005,10 @@
             <a:lstStyle/>
             <a:p>
               <a:r>
-                <a:rPr lang="en-US" altLang="zh-CN" sz="1200" dirty="0"/>
+                <a:rPr lang="en-US" altLang="zh-CN" sz="1100" dirty="0"/>
                 <a:t>withdraw</a:t>
               </a:r>
-              <a:endParaRPr lang="en-US" sz="1400" dirty="0"/>
+              <a:endParaRPr lang="en-US" sz="1200" dirty="0"/>
             </a:p>
           </p:txBody>
         </p:sp>
@@ -4497,20 +5016,20 @@
           <p:nvCxnSpPr>
             <p:cNvPr id="52" name="Elbow Connector 51"/>
             <p:cNvCxnSpPr>
-              <a:stCxn id="9" idx="2"/>
-              <a:endCxn id="9" idx="3"/>
+              <a:cxnSpLocks/>
+              <a:endCxn id="9" idx="1"/>
             </p:cNvCxnSpPr>
             <p:nvPr/>
           </p:nvCxnSpPr>
           <p:spPr>
-            <a:xfrm rot="5400000" flipH="1" flipV="1">
-              <a:off x="5247" y="2808"/>
-              <a:ext cx="493" cy="1569"/>
+            <a:xfrm rot="16200000" flipV="1">
+              <a:off x="2179454" y="2032603"/>
+              <a:ext cx="618727" cy="353731"/>
             </a:xfrm>
             <a:prstGeom prst="bentConnector4">
               <a:avLst>
-                <a:gd name="adj1" fmla="val -72971"/>
-                <a:gd name="adj2" fmla="val 122948"/>
+                <a:gd name="adj1" fmla="val -60800"/>
+                <a:gd name="adj2" fmla="val 253617"/>
               </a:avLst>
             </a:prstGeom>
             <a:ln w="19050">
@@ -4545,8 +5064,8 @@
           </p:nvSpPr>
           <p:spPr>
             <a:xfrm>
-              <a:off x="5031" y="4205"/>
-              <a:ext cx="1349" cy="436"/>
+              <a:off x="1841512" y="2601295"/>
+              <a:ext cx="798617" cy="261610"/>
             </a:xfrm>
             <a:prstGeom prst="rect">
               <a:avLst/>
@@ -4560,10 +5079,9 @@
             <a:lstStyle/>
             <a:p>
               <a:r>
-                <a:rPr lang="en-US" altLang="zh-CN" sz="1200" dirty="0"/>
+                <a:rPr lang="en-US" altLang="zh-CN" sz="1100" dirty="0"/>
                 <a:t>guarantee</a:t>
               </a:r>
-              <a:endParaRPr lang="en-US" altLang="zh-CN" sz="1200" dirty="0"/>
             </a:p>
           </p:txBody>
         </p:sp>
@@ -4571,20 +5089,20 @@
           <p:nvCxnSpPr>
             <p:cNvPr id="50" name="Elbow Connector 49"/>
             <p:cNvCxnSpPr>
-              <a:stCxn id="12" idx="2"/>
+              <a:cxnSpLocks/>
               <a:endCxn id="12" idx="1"/>
             </p:cNvCxnSpPr>
             <p:nvPr/>
           </p:nvCxnSpPr>
           <p:spPr>
-            <a:xfrm rot="5400000" flipH="1">
-              <a:off x="3652" y="6305"/>
-              <a:ext cx="546" cy="1569"/>
+            <a:xfrm rot="16200000" flipV="1">
+              <a:off x="2153341" y="4643544"/>
+              <a:ext cx="670951" cy="353730"/>
             </a:xfrm>
             <a:prstGeom prst="bentConnector4">
               <a:avLst>
-                <a:gd name="adj1" fmla="val -65876"/>
-                <a:gd name="adj2" fmla="val 122948"/>
+                <a:gd name="adj1" fmla="val -38028"/>
+                <a:gd name="adj2" fmla="val 255738"/>
               </a:avLst>
             </a:prstGeom>
             <a:ln w="19050">
@@ -4619,8 +5137,8 @@
           </p:nvSpPr>
           <p:spPr>
             <a:xfrm>
-              <a:off x="3038" y="7308"/>
-              <a:ext cx="1349" cy="436"/>
+              <a:off x="1791247" y="5109550"/>
+              <a:ext cx="798617" cy="261610"/>
             </a:xfrm>
             <a:prstGeom prst="rect">
               <a:avLst/>
@@ -4634,10 +5152,9 @@
             <a:lstStyle/>
             <a:p>
               <a:r>
-                <a:rPr lang="en-US" altLang="zh-CN" sz="1200" dirty="0"/>
+                <a:rPr lang="en-US" altLang="zh-CN" sz="1100" dirty="0"/>
                 <a:t>guarantee</a:t>
               </a:r>
-              <a:endParaRPr lang="en-US" altLang="zh-CN" sz="1200" dirty="0"/>
             </a:p>
           </p:txBody>
         </p:sp>
@@ -4649,8 +5166,8 @@
           </p:nvSpPr>
           <p:spPr>
             <a:xfrm>
-              <a:off x="3851" y="7048"/>
-              <a:ext cx="28" cy="28"/>
+              <a:off x="2763436" y="4337989"/>
+              <a:ext cx="17780" cy="17780"/>
             </a:xfrm>
             <a:prstGeom prst="ellipse">
               <a:avLst/>
@@ -4695,8 +5212,8 @@
           </p:nvSpPr>
           <p:spPr>
             <a:xfrm>
-              <a:off x="5437" y="7050"/>
-              <a:ext cx="28" cy="28"/>
+              <a:off x="3770546" y="4339259"/>
+              <a:ext cx="17780" cy="17780"/>
             </a:xfrm>
             <a:prstGeom prst="ellipse">
               <a:avLst/>
@@ -4741,8 +5258,8 @@
           </p:nvSpPr>
           <p:spPr>
             <a:xfrm>
-              <a:off x="5437" y="3574"/>
-              <a:ext cx="28" cy="28"/>
+              <a:off x="3770546" y="2131999"/>
+              <a:ext cx="17780" cy="17780"/>
             </a:xfrm>
             <a:prstGeom prst="ellipse">
               <a:avLst/>
@@ -4787,8 +5304,8 @@
           </p:nvSpPr>
           <p:spPr>
             <a:xfrm>
-              <a:off x="7860" y="5102"/>
-              <a:ext cx="28" cy="28"/>
+              <a:off x="5309151" y="3102279"/>
+              <a:ext cx="17780" cy="17780"/>
             </a:xfrm>
             <a:prstGeom prst="ellipse">
               <a:avLst/>
@@ -4833,8 +5350,8 @@
           </p:nvSpPr>
           <p:spPr>
             <a:xfrm>
-              <a:off x="7870" y="4733"/>
-              <a:ext cx="28" cy="28"/>
+              <a:off x="5315501" y="2867964"/>
+              <a:ext cx="17780" cy="17780"/>
             </a:xfrm>
             <a:prstGeom prst="ellipse">
               <a:avLst/>
@@ -4879,8 +5396,8 @@
           </p:nvSpPr>
           <p:spPr>
             <a:xfrm>
-              <a:off x="7870" y="4450"/>
-              <a:ext cx="28" cy="28"/>
+              <a:off x="5315501" y="2688259"/>
+              <a:ext cx="17780" cy="17780"/>
             </a:xfrm>
             <a:prstGeom prst="ellipse">
               <a:avLst/>
@@ -4925,8 +5442,8 @@
           </p:nvSpPr>
           <p:spPr>
             <a:xfrm>
-              <a:off x="7856" y="8208"/>
-              <a:ext cx="28" cy="28"/>
+              <a:off x="5306611" y="5074589"/>
+              <a:ext cx="17780" cy="17780"/>
             </a:xfrm>
             <a:prstGeom prst="ellipse">
               <a:avLst/>
@@ -4971,8 +5488,8 @@
           </p:nvSpPr>
           <p:spPr>
             <a:xfrm>
-              <a:off x="11015" y="4450"/>
-              <a:ext cx="28" cy="28"/>
+              <a:off x="7312576" y="2688259"/>
+              <a:ext cx="17780" cy="17780"/>
             </a:xfrm>
             <a:prstGeom prst="ellipse">
               <a:avLst/>
@@ -5017,8 +5534,8 @@
           </p:nvSpPr>
           <p:spPr>
             <a:xfrm>
-              <a:off x="9865" y="3513"/>
-              <a:ext cx="28" cy="28"/>
+              <a:off x="6582326" y="2093264"/>
+              <a:ext cx="17780" cy="17780"/>
             </a:xfrm>
             <a:prstGeom prst="ellipse">
               <a:avLst/>
@@ -5063,8 +5580,8 @@
           </p:nvSpPr>
           <p:spPr>
             <a:xfrm>
-              <a:off x="9091" y="3515"/>
-              <a:ext cx="28" cy="28"/>
+              <a:off x="6090836" y="2094534"/>
+              <a:ext cx="17780" cy="17780"/>
             </a:xfrm>
             <a:prstGeom prst="ellipse">
               <a:avLst/>
@@ -5108,9 +5625,9 @@
             <p:nvPr/>
           </p:nvGrpSpPr>
           <p:grpSpPr>
-            <a:xfrm rot="0">
-              <a:off x="12195" y="6097"/>
-              <a:ext cx="3242" cy="1832"/>
+            <a:xfrm>
+              <a:off x="8794969" y="4709911"/>
+              <a:ext cx="2058670" cy="1163320"/>
               <a:chOff x="12195" y="6097"/>
               <a:chExt cx="3242" cy="1832"/>
             </a:xfrm>
@@ -5642,11 +6159,6 @@
                 </a:rPr>
                 <a:t>ID</a:t>
               </a:r>
-              <a:endParaRPr lang="en-US" altLang="zh-CN" sz="1200" dirty="0">
-                <a:solidFill>
-                  <a:schemeClr val="tx1"/>
-                </a:solidFill>
-              </a:endParaRPr>
             </a:p>
             <a:p>
               <a:r>
@@ -5657,11 +6169,6 @@
                 </a:rPr>
                 <a:t>name: String</a:t>
               </a:r>
-              <a:endParaRPr lang="en-US" altLang="zh-CN" sz="1200" dirty="0">
-                <a:solidFill>
-                  <a:schemeClr val="tx1"/>
-                </a:solidFill>
-              </a:endParaRPr>
             </a:p>
             <a:p>
               <a:r>
@@ -5708,12 +6215,6 @@
                 </a:rPr>
                 <a:t>Float</a:t>
               </a:r>
-              <a:endParaRPr lang="en-US" altLang="zh-CN" sz="1200" dirty="0">
-                <a:solidFill>
-                  <a:schemeClr val="tx1"/>
-                </a:solidFill>
-                <a:sym typeface="+mn-ea"/>
-              </a:endParaRPr>
             </a:p>
             <a:p>
               <a:r>
@@ -5760,12 +6261,6 @@
                 </a:rPr>
                 <a:t>Integer</a:t>
               </a:r>
-              <a:endParaRPr lang="en-US" altLang="zh-CN" sz="1200" dirty="0">
-                <a:solidFill>
-                  <a:schemeClr val="tx1"/>
-                </a:solidFill>
-                <a:sym typeface="+mn-ea"/>
-              </a:endParaRPr>
             </a:p>
             <a:p>
               <a:r>
@@ -5776,11 +6271,6 @@
                 </a:rPr>
                 <a:t>transHistory: [64-bit Integer]</a:t>
               </a:r>
-              <a:endParaRPr lang="en-US" sz="1200" dirty="0">
-                <a:solidFill>
-                  <a:schemeClr val="tx1"/>
-                </a:solidFill>
-              </a:endParaRPr>
             </a:p>
             <a:p>
               <a:r>
@@ -5791,11 +6281,6 @@
                 </a:rPr>
                 <a:t>versionHistory: [64-bit Integer]</a:t>
               </a:r>
-              <a:endParaRPr lang="en-US" sz="1200" dirty="0">
-                <a:solidFill>
-                  <a:schemeClr val="tx1"/>
-                </a:solidFill>
-              </a:endParaRPr>
             </a:p>
           </p:txBody>
         </p:sp>
@@ -5930,13 +6415,8 @@
             <a:p>
               <a:r>
                 <a:rPr lang="en-US" altLang="zh-CN" sz="1200" dirty="0"/>
-                <a:t>transfer{amount: 64-bit </a:t>
+                <a:t>transfer{amount: 64-bit Float, versionHistory: [64-bit Integer]}</a:t>
               </a:r>
-              <a:r>
-                <a:rPr lang="en-US" altLang="zh-CN" sz="1200" dirty="0"/>
-                <a:t>Float, versionHistory: [64-bit Integer]}</a:t>
-              </a:r>
-              <a:endParaRPr lang="en-US" altLang="zh-CN" sz="1200" dirty="0"/>
             </a:p>
           </p:txBody>
         </p:sp>
@@ -6565,7 +7045,7 @@
 </file>
 
 <file path=ppt/tags/tag1.xml><?xml version="1.0" encoding="utf-8"?>
-<p:tagLst xmlns:p="http://schemas.openxmlformats.org/presentationml/2006/main">
+<p:tagLst xmlns:a="http://schemas.openxmlformats.org/drawingml/2006/main" xmlns:r="http://schemas.openxmlformats.org/officeDocument/2006/relationships" xmlns:p="http://schemas.openxmlformats.org/presentationml/2006/main">
   <p:tag name="KSO_WPP_MARK_KEY" val="3e354841-6969-42a4-9c4a-eb932c12467a"/>
   <p:tag name="COMMONDATA" val="eyJoZGlkIjoiY2UzZmQ1NDYyMTk1MjkyNjAxNzY5ZmQ2ZjBmNmY2NWYifQ=="/>
 </p:tagLst>
@@ -6822,6 +7302,8 @@
       </a:bgFillStyleLst>
     </a:fmtScheme>
   </a:themeElements>
+  <a:objectDefaults/>
+  <a:extraClrSchemeLst/>
   <a:extLst>
     <a:ext uri="{05A4C25C-085E-4340-85A3-A5531E510DB2}">
       <thm15:themeFamily xmlns:thm15="http://schemas.microsoft.com/office/thememl/2012/main" name="Office Theme" id="{62F939B6-93AF-4DB8-9C6B-D6C7DFDC589F}" vid="{4A3C46E8-61CC-4603-A589-7422A47A8E4A}"/>
@@ -7081,6 +7563,8 @@
       </a:bgFillStyleLst>
     </a:fmtScheme>
   </a:themeElements>
+  <a:objectDefaults/>
+  <a:extraClrSchemeLst/>
   <a:extLst>
     <a:ext uri="{05A4C25C-085E-4340-85A3-A5531E510DB2}">
       <thm15:themeFamily xmlns:thm15="http://schemas.microsoft.com/office/thememl/2012/main" name="Office Theme" id="{62F939B6-93AF-4DB8-9C6B-D6C7DFDC589F}" vid="{4A3C46E8-61CC-4603-A589-7422A47A8E4A}"/>

</xml_diff>

<commit_message>
update figures in schema and queries (#107)
adjust the font size in figure for FinBench paper
</commit_message>
<xml_diff>
--- a/figures/schema.pptx
+++ b/figures/schema.pptx
@@ -5,17 +5,18 @@
     <p:sldMasterId id="2147483648" r:id="rId1"/>
   </p:sldMasterIdLst>
   <p:notesMasterIdLst>
-    <p:notesMasterId r:id="rId5"/>
+    <p:notesMasterId r:id="rId6"/>
   </p:notesMasterIdLst>
   <p:sldIdLst>
-    <p:sldId id="415" r:id="rId2"/>
-    <p:sldId id="417" r:id="rId3"/>
-    <p:sldId id="416" r:id="rId4"/>
+    <p:sldId id="419" r:id="rId2"/>
+    <p:sldId id="418" r:id="rId3"/>
+    <p:sldId id="417" r:id="rId4"/>
+    <p:sldId id="416" r:id="rId5"/>
   </p:sldIdLst>
   <p:sldSz cx="12192000" cy="6858000"/>
   <p:notesSz cx="6858000" cy="9144000"/>
   <p:custDataLst>
-    <p:tags r:id="rId6"/>
+    <p:tags r:id="rId7"/>
   </p:custDataLst>
   <p:defaultTextStyle>
     <a:defPPr>
@@ -117,7 +118,8 @@
       <p14:sectionLst xmlns:p14="http://schemas.microsoft.com/office/powerpoint/2010/main">
         <p14:section name="默认节" id="{1EEC304E-9EA9-44B3-83A5-4400A19A585D}">
           <p14:sldIdLst>
-            <p14:sldId id="415"/>
+            <p14:sldId id="419"/>
+            <p14:sldId id="418"/>
             <p14:sldId id="417"/>
             <p14:sldId id="416"/>
           </p14:sldIdLst>
@@ -213,7 +215,7 @@
           <a:p>
             <a:fld id="{CAD4BD24-A097-4F9D-85E9-6A2A24CA2D98}" type="datetimeFigureOut">
               <a:rPr lang="zh-CN" altLang="en-US" smtClean="0"/>
-              <a:t>2023/6/2</a:t>
+              <a:t>2024/9/5</a:t>
             </a:fld>
             <a:endParaRPr lang="zh-CN" altLang="en-US"/>
           </a:p>
@@ -476,6 +478,110 @@
 </file>
 
 <file path=ppt/notesSlides/notesSlide1.xml><?xml version="1.0" encoding="utf-8"?>
+<p:notes xmlns:a="http://schemas.openxmlformats.org/drawingml/2006/main" xmlns:r="http://schemas.openxmlformats.org/officeDocument/2006/relationships" xmlns:p="http://schemas.openxmlformats.org/presentationml/2006/main">
+  <p:cSld>
+    <p:spTree>
+      <p:nvGrpSpPr>
+        <p:cNvPr id="1" name=""/>
+        <p:cNvGrpSpPr/>
+        <p:nvPr/>
+      </p:nvGrpSpPr>
+      <p:grpSpPr>
+        <a:xfrm>
+          <a:off x="0" y="0"/>
+          <a:ext cx="0" cy="0"/>
+          <a:chOff x="0" y="0"/>
+          <a:chExt cx="0" cy="0"/>
+        </a:xfrm>
+      </p:grpSpPr>
+      <p:sp>
+        <p:nvSpPr>
+          <p:cNvPr id="2" name="幻灯片图像占位符 1"/>
+          <p:cNvSpPr>
+            <a:spLocks noGrp="1" noRot="1" noChangeAspect="1"/>
+          </p:cNvSpPr>
+          <p:nvPr>
+            <p:ph type="sldImg"/>
+          </p:nvPr>
+        </p:nvSpPr>
+        <p:spPr/>
+      </p:sp>
+      <p:sp>
+        <p:nvSpPr>
+          <p:cNvPr id="3" name="备注占位符 2"/>
+          <p:cNvSpPr>
+            <a:spLocks noGrp="1"/>
+          </p:cNvSpPr>
+          <p:nvPr>
+            <p:ph type="body" idx="1"/>
+          </p:nvPr>
+        </p:nvSpPr>
+        <p:spPr/>
+        <p:txBody>
+          <a:bodyPr/>
+          <a:lstStyle/>
+          <a:p>
+            <a:r>
+              <a:rPr lang="en-US" altLang="zh-CN" dirty="0"/>
+              <a:t>Update on Sep. 5</a:t>
+            </a:r>
+            <a:r>
+              <a:rPr lang="en-US" altLang="zh-CN" baseline="30000" dirty="0"/>
+              <a:t>th</a:t>
+            </a:r>
+            <a:r>
+              <a:rPr lang="en-US" altLang="zh-CN" dirty="0"/>
+              <a:t>,</a:t>
+            </a:r>
+            <a:r>
+              <a:rPr lang="zh-CN" altLang="en-US" dirty="0"/>
+              <a:t> </a:t>
+            </a:r>
+            <a:r>
+              <a:rPr lang="en-US" altLang="zh-CN" dirty="0"/>
+              <a:t>2024</a:t>
+            </a:r>
+            <a:endParaRPr lang="zh-CN" altLang="en-US" dirty="0"/>
+          </a:p>
+        </p:txBody>
+      </p:sp>
+      <p:sp>
+        <p:nvSpPr>
+          <p:cNvPr id="4" name="灯片编号占位符 3"/>
+          <p:cNvSpPr>
+            <a:spLocks noGrp="1"/>
+          </p:cNvSpPr>
+          <p:nvPr>
+            <p:ph type="sldNum" sz="quarter" idx="5"/>
+          </p:nvPr>
+        </p:nvSpPr>
+        <p:spPr/>
+        <p:txBody>
+          <a:bodyPr/>
+          <a:lstStyle/>
+          <a:p>
+            <a:fld id="{4F292EE1-EB42-416D-BE21-6D6219010E5F}" type="slidenum">
+              <a:rPr lang="zh-CN" altLang="en-US" smtClean="0"/>
+              <a:t>1</a:t>
+            </a:fld>
+            <a:endParaRPr lang="zh-CN" altLang="en-US"/>
+          </a:p>
+        </p:txBody>
+      </p:sp>
+    </p:spTree>
+    <p:extLst>
+      <p:ext uri="{BB962C8B-B14F-4D97-AF65-F5344CB8AC3E}">
+        <p14:creationId xmlns:p14="http://schemas.microsoft.com/office/powerpoint/2010/main" val="3314642754"/>
+      </p:ext>
+    </p:extLst>
+  </p:cSld>
+  <p:clrMapOvr>
+    <a:masterClrMapping/>
+  </p:clrMapOvr>
+</p:notes>
+</file>
+
+<file path=ppt/notesSlides/notesSlide2.xml><?xml version="1.0" encoding="utf-8"?>
 <p:notes xmlns:a="http://schemas.openxmlformats.org/drawingml/2006/main" xmlns:r="http://schemas.openxmlformats.org/officeDocument/2006/relationships" xmlns:p="http://schemas.openxmlformats.org/presentationml/2006/main">
   <p:cSld>
     <p:spTree>
@@ -2479,6 +2585,3702 @@
       </p:grpSpPr>
       <p:grpSp>
         <p:nvGrpSpPr>
+          <p:cNvPr id="2" name="组合 1">
+            <a:extLst>
+              <a:ext uri="{FF2B5EF4-FFF2-40B4-BE49-F238E27FC236}">
+                <a16:creationId xmlns:a16="http://schemas.microsoft.com/office/drawing/2014/main" id="{843E06F4-F832-0E6A-EF17-41E5C704E718}"/>
+              </a:ext>
+            </a:extLst>
+          </p:cNvPr>
+          <p:cNvGrpSpPr/>
+          <p:nvPr/>
+        </p:nvGrpSpPr>
+        <p:grpSpPr>
+          <a:xfrm>
+            <a:off x="1491767" y="315635"/>
+            <a:ext cx="8671884" cy="6321525"/>
+            <a:chOff x="1491767" y="315635"/>
+            <a:chExt cx="8671884" cy="6321525"/>
+          </a:xfrm>
+        </p:grpSpPr>
+        <p:grpSp>
+          <p:nvGrpSpPr>
+            <p:cNvPr id="14" name="Group 13">
+              <a:extLst>
+                <a:ext uri="{FF2B5EF4-FFF2-40B4-BE49-F238E27FC236}">
+                  <a16:creationId xmlns:a16="http://schemas.microsoft.com/office/drawing/2014/main" id="{AAB5EBB0-BA5F-38C3-996D-76EA3B6590BC}"/>
+                </a:ext>
+              </a:extLst>
+            </p:cNvPr>
+            <p:cNvGrpSpPr/>
+            <p:nvPr/>
+          </p:nvGrpSpPr>
+          <p:grpSpPr>
+            <a:xfrm>
+              <a:off x="2272140" y="377857"/>
+              <a:ext cx="1992630" cy="2009558"/>
+              <a:chOff x="1993900" y="1027760"/>
+              <a:chExt cx="1992630" cy="2009558"/>
+            </a:xfrm>
+          </p:grpSpPr>
+          <p:sp>
+            <p:nvSpPr>
+              <p:cNvPr id="9" name="Rectangle 8"/>
+              <p:cNvSpPr/>
+              <p:nvPr/>
+            </p:nvSpPr>
+            <p:spPr>
+              <a:xfrm>
+                <a:off x="1993900" y="1417318"/>
+                <a:ext cx="1992630" cy="1620000"/>
+              </a:xfrm>
+              <a:prstGeom prst="rect">
+                <a:avLst/>
+              </a:prstGeom>
+              <a:noFill/>
+              <a:ln w="22225">
+                <a:solidFill>
+                  <a:schemeClr val="tx1"/>
+                </a:solidFill>
+              </a:ln>
+            </p:spPr>
+            <p:style>
+              <a:lnRef idx="2">
+                <a:schemeClr val="accent1">
+                  <a:shade val="50000"/>
+                </a:schemeClr>
+              </a:lnRef>
+              <a:fillRef idx="1">
+                <a:schemeClr val="accent1"/>
+              </a:fillRef>
+              <a:effectRef idx="0">
+                <a:schemeClr val="accent1"/>
+              </a:effectRef>
+              <a:fontRef idx="minor">
+                <a:schemeClr val="lt1"/>
+              </a:fontRef>
+            </p:style>
+            <p:txBody>
+              <a:bodyPr rtlCol="0" anchor="ctr"/>
+              <a:lstStyle/>
+              <a:p>
+                <a:r>
+                  <a:rPr lang="en-US" altLang="zh-CN" sz="1200" dirty="0">
+                    <a:solidFill>
+                      <a:schemeClr val="tx1"/>
+                    </a:solidFill>
+                    <a:latin typeface="Arial" panose="020B0604020202020204" pitchFamily="34" charset="0"/>
+                    <a:cs typeface="Arial" panose="020B0604020202020204" pitchFamily="34" charset="0"/>
+                  </a:rPr>
+                  <a:t>id:</a:t>
+                </a:r>
+                <a:r>
+                  <a:rPr lang="zh-CN" altLang="en-US" sz="1200" dirty="0">
+                    <a:solidFill>
+                      <a:schemeClr val="tx1"/>
+                    </a:solidFill>
+                    <a:latin typeface="Arial" panose="020B0604020202020204" pitchFamily="34" charset="0"/>
+                    <a:cs typeface="Arial" panose="020B0604020202020204" pitchFamily="34" charset="0"/>
+                  </a:rPr>
+                  <a:t> </a:t>
+                </a:r>
+                <a:r>
+                  <a:rPr lang="en-US" altLang="zh-CN" sz="1200" dirty="0">
+                    <a:solidFill>
+                      <a:schemeClr val="tx1"/>
+                    </a:solidFill>
+                    <a:latin typeface="Arial" panose="020B0604020202020204" pitchFamily="34" charset="0"/>
+                    <a:cs typeface="Arial" panose="020B0604020202020204" pitchFamily="34" charset="0"/>
+                  </a:rPr>
+                  <a:t>ID</a:t>
+                </a:r>
+              </a:p>
+              <a:p>
+                <a:r>
+                  <a:rPr lang="en-US" altLang="zh-CN" sz="1200" dirty="0">
+                    <a:solidFill>
+                      <a:schemeClr val="tx1"/>
+                    </a:solidFill>
+                    <a:latin typeface="Arial" panose="020B0604020202020204" pitchFamily="34" charset="0"/>
+                    <a:cs typeface="Arial" panose="020B0604020202020204" pitchFamily="34" charset="0"/>
+                  </a:rPr>
+                  <a:t>name:</a:t>
+                </a:r>
+                <a:r>
+                  <a:rPr lang="zh-CN" altLang="en-US" sz="1200" dirty="0">
+                    <a:solidFill>
+                      <a:schemeClr val="tx1"/>
+                    </a:solidFill>
+                    <a:latin typeface="Arial" panose="020B0604020202020204" pitchFamily="34" charset="0"/>
+                    <a:cs typeface="Arial" panose="020B0604020202020204" pitchFamily="34" charset="0"/>
+                  </a:rPr>
+                  <a:t> </a:t>
+                </a:r>
+                <a:r>
+                  <a:rPr lang="en-US" altLang="zh-CN" sz="1200" dirty="0">
+                    <a:solidFill>
+                      <a:schemeClr val="tx1"/>
+                    </a:solidFill>
+                    <a:latin typeface="Arial" panose="020B0604020202020204" pitchFamily="34" charset="0"/>
+                    <a:cs typeface="Arial" panose="020B0604020202020204" pitchFamily="34" charset="0"/>
+                  </a:rPr>
+                  <a:t>String</a:t>
+                </a:r>
+              </a:p>
+              <a:p>
+                <a:r>
+                  <a:rPr lang="en-US" altLang="zh-CN" sz="1200" dirty="0">
+                    <a:solidFill>
+                      <a:schemeClr val="tx1"/>
+                    </a:solidFill>
+                    <a:latin typeface="Arial" panose="020B0604020202020204" pitchFamily="34" charset="0"/>
+                    <a:cs typeface="Arial" panose="020B0604020202020204" pitchFamily="34" charset="0"/>
+                  </a:rPr>
+                  <a:t>isBlocked:</a:t>
+                </a:r>
+                <a:r>
+                  <a:rPr lang="zh-CN" altLang="en-US" sz="1200" dirty="0">
+                    <a:solidFill>
+                      <a:schemeClr val="tx1"/>
+                    </a:solidFill>
+                    <a:latin typeface="Arial" panose="020B0604020202020204" pitchFamily="34" charset="0"/>
+                    <a:cs typeface="Arial" panose="020B0604020202020204" pitchFamily="34" charset="0"/>
+                  </a:rPr>
+                  <a:t> </a:t>
+                </a:r>
+                <a:r>
+                  <a:rPr lang="en-US" altLang="zh-CN" sz="1200" dirty="0">
+                    <a:solidFill>
+                      <a:schemeClr val="tx1"/>
+                    </a:solidFill>
+                    <a:latin typeface="Arial" panose="020B0604020202020204" pitchFamily="34" charset="0"/>
+                    <a:cs typeface="Arial" panose="020B0604020202020204" pitchFamily="34" charset="0"/>
+                  </a:rPr>
+                  <a:t>Boolean</a:t>
+                </a:r>
+              </a:p>
+              <a:p>
+                <a:r>
+                  <a:rPr lang="en-US" altLang="zh-CN" sz="1200" dirty="0">
+                    <a:solidFill>
+                      <a:schemeClr val="tx1"/>
+                    </a:solidFill>
+                    <a:latin typeface="Arial" panose="020B0604020202020204" pitchFamily="34" charset="0"/>
+                    <a:cs typeface="Arial" panose="020B0604020202020204" pitchFamily="34" charset="0"/>
+                  </a:rPr>
+                  <a:t>createTime:</a:t>
+                </a:r>
+                <a:r>
+                  <a:rPr lang="zh-CN" altLang="en-US" sz="1200" dirty="0">
+                    <a:solidFill>
+                      <a:schemeClr val="tx1"/>
+                    </a:solidFill>
+                    <a:latin typeface="Arial" panose="020B0604020202020204" pitchFamily="34" charset="0"/>
+                    <a:cs typeface="Arial" panose="020B0604020202020204" pitchFamily="34" charset="0"/>
+                  </a:rPr>
+                  <a:t> </a:t>
+                </a:r>
+                <a:r>
+                  <a:rPr lang="en-US" altLang="zh-CN" sz="1200" dirty="0">
+                    <a:solidFill>
+                      <a:schemeClr val="tx1"/>
+                    </a:solidFill>
+                    <a:latin typeface="Arial" panose="020B0604020202020204" pitchFamily="34" charset="0"/>
+                    <a:cs typeface="Arial" panose="020B0604020202020204" pitchFamily="34" charset="0"/>
+                  </a:rPr>
+                  <a:t>DateTime</a:t>
+                </a:r>
+              </a:p>
+              <a:p>
+                <a:r>
+                  <a:rPr lang="en-US" altLang="zh-CN" sz="1200" dirty="0">
+                    <a:solidFill>
+                      <a:schemeClr val="tx1"/>
+                    </a:solidFill>
+                    <a:latin typeface="Arial" panose="020B0604020202020204" pitchFamily="34" charset="0"/>
+                    <a:cs typeface="Arial" panose="020B0604020202020204" pitchFamily="34" charset="0"/>
+                  </a:rPr>
+                  <a:t>gender:</a:t>
+                </a:r>
+                <a:r>
+                  <a:rPr lang="zh-CN" altLang="en-US" sz="1200" dirty="0">
+                    <a:solidFill>
+                      <a:schemeClr val="tx1"/>
+                    </a:solidFill>
+                    <a:latin typeface="Arial" panose="020B0604020202020204" pitchFamily="34" charset="0"/>
+                    <a:cs typeface="Arial" panose="020B0604020202020204" pitchFamily="34" charset="0"/>
+                  </a:rPr>
+                  <a:t> </a:t>
+                </a:r>
+                <a:r>
+                  <a:rPr lang="en-US" altLang="zh-CN" sz="1200" dirty="0">
+                    <a:solidFill>
+                      <a:schemeClr val="tx1"/>
+                    </a:solidFill>
+                    <a:latin typeface="Arial" panose="020B0604020202020204" pitchFamily="34" charset="0"/>
+                    <a:cs typeface="Arial" panose="020B0604020202020204" pitchFamily="34" charset="0"/>
+                  </a:rPr>
+                  <a:t>String</a:t>
+                </a:r>
+              </a:p>
+              <a:p>
+                <a:r>
+                  <a:rPr lang="en-US" altLang="zh-CN" sz="1200" dirty="0">
+                    <a:solidFill>
+                      <a:schemeClr val="tx1"/>
+                    </a:solidFill>
+                    <a:latin typeface="Arial" panose="020B0604020202020204" pitchFamily="34" charset="0"/>
+                    <a:cs typeface="Arial" panose="020B0604020202020204" pitchFamily="34" charset="0"/>
+                  </a:rPr>
+                  <a:t>birthday:</a:t>
+                </a:r>
+                <a:r>
+                  <a:rPr lang="zh-CN" altLang="en-US" sz="1200" dirty="0">
+                    <a:solidFill>
+                      <a:schemeClr val="tx1"/>
+                    </a:solidFill>
+                    <a:latin typeface="Arial" panose="020B0604020202020204" pitchFamily="34" charset="0"/>
+                    <a:cs typeface="Arial" panose="020B0604020202020204" pitchFamily="34" charset="0"/>
+                  </a:rPr>
+                  <a:t> </a:t>
+                </a:r>
+                <a:r>
+                  <a:rPr lang="en-US" altLang="zh-CN" sz="1200" dirty="0">
+                    <a:solidFill>
+                      <a:schemeClr val="tx1"/>
+                    </a:solidFill>
+                    <a:latin typeface="Arial" panose="020B0604020202020204" pitchFamily="34" charset="0"/>
+                    <a:cs typeface="Arial" panose="020B0604020202020204" pitchFamily="34" charset="0"/>
+                  </a:rPr>
+                  <a:t>Date</a:t>
+                </a:r>
+              </a:p>
+              <a:p>
+                <a:r>
+                  <a:rPr lang="en-US" altLang="zh-CN" sz="1200" dirty="0">
+                    <a:solidFill>
+                      <a:schemeClr val="tx1"/>
+                    </a:solidFill>
+                    <a:latin typeface="Arial" panose="020B0604020202020204" pitchFamily="34" charset="0"/>
+                    <a:cs typeface="Arial" panose="020B0604020202020204" pitchFamily="34" charset="0"/>
+                  </a:rPr>
+                  <a:t>country:</a:t>
+                </a:r>
+                <a:r>
+                  <a:rPr lang="zh-CN" altLang="en-US" sz="1200" dirty="0">
+                    <a:solidFill>
+                      <a:schemeClr val="tx1"/>
+                    </a:solidFill>
+                    <a:latin typeface="Arial" panose="020B0604020202020204" pitchFamily="34" charset="0"/>
+                    <a:cs typeface="Arial" panose="020B0604020202020204" pitchFamily="34" charset="0"/>
+                  </a:rPr>
+                  <a:t> </a:t>
+                </a:r>
+                <a:r>
+                  <a:rPr lang="en-US" altLang="zh-CN" sz="1200" dirty="0">
+                    <a:solidFill>
+                      <a:schemeClr val="tx1"/>
+                    </a:solidFill>
+                    <a:latin typeface="Arial" panose="020B0604020202020204" pitchFamily="34" charset="0"/>
+                    <a:cs typeface="Arial" panose="020B0604020202020204" pitchFamily="34" charset="0"/>
+                  </a:rPr>
+                  <a:t>String</a:t>
+                </a:r>
+              </a:p>
+              <a:p>
+                <a:r>
+                  <a:rPr lang="en-US" altLang="zh-CN" sz="1200" dirty="0">
+                    <a:solidFill>
+                      <a:schemeClr val="tx1"/>
+                    </a:solidFill>
+                    <a:latin typeface="Arial" panose="020B0604020202020204" pitchFamily="34" charset="0"/>
+                    <a:cs typeface="Arial" panose="020B0604020202020204" pitchFamily="34" charset="0"/>
+                  </a:rPr>
+                  <a:t>city:</a:t>
+                </a:r>
+                <a:r>
+                  <a:rPr lang="zh-CN" altLang="en-US" sz="1200" dirty="0">
+                    <a:solidFill>
+                      <a:schemeClr val="tx1"/>
+                    </a:solidFill>
+                    <a:latin typeface="Arial" panose="020B0604020202020204" pitchFamily="34" charset="0"/>
+                    <a:cs typeface="Arial" panose="020B0604020202020204" pitchFamily="34" charset="0"/>
+                  </a:rPr>
+                  <a:t> </a:t>
+                </a:r>
+                <a:r>
+                  <a:rPr lang="en-US" altLang="zh-CN" sz="1200" dirty="0">
+                    <a:solidFill>
+                      <a:schemeClr val="tx1"/>
+                    </a:solidFill>
+                    <a:latin typeface="Arial" panose="020B0604020202020204" pitchFamily="34" charset="0"/>
+                    <a:cs typeface="Arial" panose="020B0604020202020204" pitchFamily="34" charset="0"/>
+                  </a:rPr>
+                  <a:t>String</a:t>
+                </a:r>
+              </a:p>
+            </p:txBody>
+          </p:sp>
+          <p:sp>
+            <p:nvSpPr>
+              <p:cNvPr id="10" name="Rectangle 9"/>
+              <p:cNvSpPr/>
+              <p:nvPr/>
+            </p:nvSpPr>
+            <p:spPr>
+              <a:xfrm>
+                <a:off x="1993900" y="1027760"/>
+                <a:ext cx="1992630" cy="396000"/>
+              </a:xfrm>
+              <a:prstGeom prst="rect">
+                <a:avLst/>
+              </a:prstGeom>
+              <a:solidFill>
+                <a:schemeClr val="accent6">
+                  <a:lumMod val="60000"/>
+                  <a:lumOff val="40000"/>
+                </a:schemeClr>
+              </a:solidFill>
+              <a:ln w="22225">
+                <a:solidFill>
+                  <a:schemeClr val="tx1"/>
+                </a:solidFill>
+              </a:ln>
+            </p:spPr>
+            <p:style>
+              <a:lnRef idx="2">
+                <a:schemeClr val="accent1">
+                  <a:shade val="50000"/>
+                </a:schemeClr>
+              </a:lnRef>
+              <a:fillRef idx="1">
+                <a:schemeClr val="accent1"/>
+              </a:fillRef>
+              <a:effectRef idx="0">
+                <a:schemeClr val="accent1"/>
+              </a:effectRef>
+              <a:fontRef idx="minor">
+                <a:schemeClr val="lt1"/>
+              </a:fontRef>
+            </p:style>
+            <p:txBody>
+              <a:bodyPr rtlCol="0" anchor="ctr"/>
+              <a:lstStyle/>
+              <a:p>
+                <a:pPr algn="ctr"/>
+                <a:r>
+                  <a:rPr lang="en-US" altLang="zh-CN" b="1" dirty="0">
+                    <a:solidFill>
+                      <a:schemeClr val="tx1"/>
+                    </a:solidFill>
+                    <a:latin typeface="Arial" panose="020B0604020202020204" pitchFamily="34" charset="0"/>
+                    <a:cs typeface="Arial" panose="020B0604020202020204" pitchFamily="34" charset="0"/>
+                  </a:rPr>
+                  <a:t>Person</a:t>
+                </a:r>
+                <a:endParaRPr lang="en-US" b="1" dirty="0">
+                  <a:solidFill>
+                    <a:schemeClr val="tx1"/>
+                  </a:solidFill>
+                  <a:latin typeface="Arial" panose="020B0604020202020204" pitchFamily="34" charset="0"/>
+                  <a:cs typeface="Arial" panose="020B0604020202020204" pitchFamily="34" charset="0"/>
+                </a:endParaRPr>
+              </a:p>
+            </p:txBody>
+          </p:sp>
+        </p:grpSp>
+        <p:sp>
+          <p:nvSpPr>
+            <p:cNvPr id="12" name="Rectangle 11"/>
+            <p:cNvSpPr/>
+            <p:nvPr/>
+          </p:nvSpPr>
+          <p:spPr>
+            <a:xfrm>
+              <a:off x="2272140" y="3536955"/>
+              <a:ext cx="1992630" cy="1800000"/>
+            </a:xfrm>
+            <a:prstGeom prst="rect">
+              <a:avLst/>
+            </a:prstGeom>
+            <a:noFill/>
+            <a:ln w="22225">
+              <a:solidFill>
+                <a:schemeClr val="tx1"/>
+              </a:solidFill>
+            </a:ln>
+          </p:spPr>
+          <p:style>
+            <a:lnRef idx="2">
+              <a:schemeClr val="accent1">
+                <a:shade val="50000"/>
+              </a:schemeClr>
+            </a:lnRef>
+            <a:fillRef idx="1">
+              <a:schemeClr val="accent1"/>
+            </a:fillRef>
+            <a:effectRef idx="0">
+              <a:schemeClr val="accent1"/>
+            </a:effectRef>
+            <a:fontRef idx="minor">
+              <a:schemeClr val="lt1"/>
+            </a:fontRef>
+          </p:style>
+          <p:txBody>
+            <a:bodyPr rtlCol="0" anchor="ctr"/>
+            <a:lstStyle/>
+            <a:p>
+              <a:r>
+                <a:rPr lang="en-US" altLang="zh-CN" sz="1200" dirty="0">
+                  <a:solidFill>
+                    <a:schemeClr val="tx1"/>
+                  </a:solidFill>
+                  <a:latin typeface="Arial" panose="020B0604020202020204" pitchFamily="34" charset="0"/>
+                  <a:cs typeface="Arial" panose="020B0604020202020204" pitchFamily="34" charset="0"/>
+                </a:rPr>
+                <a:t>id:</a:t>
+              </a:r>
+              <a:r>
+                <a:rPr lang="zh-CN" altLang="en-US" sz="1200" dirty="0">
+                  <a:solidFill>
+                    <a:schemeClr val="tx1"/>
+                  </a:solidFill>
+                  <a:latin typeface="Arial" panose="020B0604020202020204" pitchFamily="34" charset="0"/>
+                  <a:cs typeface="Arial" panose="020B0604020202020204" pitchFamily="34" charset="0"/>
+                </a:rPr>
+                <a:t> </a:t>
+              </a:r>
+              <a:r>
+                <a:rPr lang="en-US" altLang="zh-CN" sz="1200" dirty="0">
+                  <a:solidFill>
+                    <a:schemeClr val="tx1"/>
+                  </a:solidFill>
+                  <a:latin typeface="Arial" panose="020B0604020202020204" pitchFamily="34" charset="0"/>
+                  <a:cs typeface="Arial" panose="020B0604020202020204" pitchFamily="34" charset="0"/>
+                </a:rPr>
+                <a:t>ID</a:t>
+              </a:r>
+            </a:p>
+            <a:p>
+              <a:r>
+                <a:rPr lang="en-US" altLang="zh-CN" sz="1200" dirty="0">
+                  <a:solidFill>
+                    <a:schemeClr val="tx1"/>
+                  </a:solidFill>
+                  <a:latin typeface="Arial" panose="020B0604020202020204" pitchFamily="34" charset="0"/>
+                  <a:cs typeface="Arial" panose="020B0604020202020204" pitchFamily="34" charset="0"/>
+                </a:rPr>
+                <a:t>name:</a:t>
+              </a:r>
+              <a:r>
+                <a:rPr lang="zh-CN" altLang="en-US" sz="1200" dirty="0">
+                  <a:solidFill>
+                    <a:schemeClr val="tx1"/>
+                  </a:solidFill>
+                  <a:latin typeface="Arial" panose="020B0604020202020204" pitchFamily="34" charset="0"/>
+                  <a:cs typeface="Arial" panose="020B0604020202020204" pitchFamily="34" charset="0"/>
+                </a:rPr>
+                <a:t> </a:t>
+              </a:r>
+              <a:r>
+                <a:rPr lang="en-US" altLang="zh-CN" sz="1200" dirty="0">
+                  <a:solidFill>
+                    <a:schemeClr val="tx1"/>
+                  </a:solidFill>
+                  <a:latin typeface="Arial" panose="020B0604020202020204" pitchFamily="34" charset="0"/>
+                  <a:cs typeface="Arial" panose="020B0604020202020204" pitchFamily="34" charset="0"/>
+                </a:rPr>
+                <a:t>String</a:t>
+              </a:r>
+            </a:p>
+            <a:p>
+              <a:r>
+                <a:rPr lang="en-US" altLang="zh-CN" sz="1200" dirty="0">
+                  <a:solidFill>
+                    <a:schemeClr val="tx1"/>
+                  </a:solidFill>
+                  <a:latin typeface="Arial" panose="020B0604020202020204" pitchFamily="34" charset="0"/>
+                  <a:cs typeface="Arial" panose="020B0604020202020204" pitchFamily="34" charset="0"/>
+                </a:rPr>
+                <a:t>isBlocked:</a:t>
+              </a:r>
+              <a:r>
+                <a:rPr lang="zh-CN" altLang="en-US" sz="1200" dirty="0">
+                  <a:solidFill>
+                    <a:schemeClr val="tx1"/>
+                  </a:solidFill>
+                  <a:latin typeface="Arial" panose="020B0604020202020204" pitchFamily="34" charset="0"/>
+                  <a:cs typeface="Arial" panose="020B0604020202020204" pitchFamily="34" charset="0"/>
+                </a:rPr>
+                <a:t> </a:t>
+              </a:r>
+              <a:r>
+                <a:rPr lang="en-US" altLang="zh-CN" sz="1200" dirty="0">
+                  <a:solidFill>
+                    <a:schemeClr val="tx1"/>
+                  </a:solidFill>
+                  <a:latin typeface="Arial" panose="020B0604020202020204" pitchFamily="34" charset="0"/>
+                  <a:cs typeface="Arial" panose="020B0604020202020204" pitchFamily="34" charset="0"/>
+                </a:rPr>
+                <a:t>Boolean</a:t>
+              </a:r>
+            </a:p>
+            <a:p>
+              <a:r>
+                <a:rPr lang="en-US" altLang="zh-CN" sz="1200" dirty="0">
+                  <a:solidFill>
+                    <a:schemeClr val="tx1"/>
+                  </a:solidFill>
+                  <a:latin typeface="Arial" panose="020B0604020202020204" pitchFamily="34" charset="0"/>
+                  <a:cs typeface="Arial" panose="020B0604020202020204" pitchFamily="34" charset="0"/>
+                </a:rPr>
+                <a:t>createTime:</a:t>
+              </a:r>
+              <a:r>
+                <a:rPr lang="zh-CN" altLang="en-US" sz="1200" dirty="0">
+                  <a:solidFill>
+                    <a:schemeClr val="tx1"/>
+                  </a:solidFill>
+                  <a:latin typeface="Arial" panose="020B0604020202020204" pitchFamily="34" charset="0"/>
+                  <a:cs typeface="Arial" panose="020B0604020202020204" pitchFamily="34" charset="0"/>
+                </a:rPr>
+                <a:t> </a:t>
+              </a:r>
+              <a:r>
+                <a:rPr lang="en-US" altLang="zh-CN" sz="1200" dirty="0">
+                  <a:solidFill>
+                    <a:schemeClr val="tx1"/>
+                  </a:solidFill>
+                  <a:latin typeface="Arial" panose="020B0604020202020204" pitchFamily="34" charset="0"/>
+                  <a:cs typeface="Arial" panose="020B0604020202020204" pitchFamily="34" charset="0"/>
+                </a:rPr>
+                <a:t>DateTime</a:t>
+              </a:r>
+            </a:p>
+            <a:p>
+              <a:r>
+                <a:rPr lang="en-US" altLang="zh-CN" sz="1200" dirty="0">
+                  <a:solidFill>
+                    <a:schemeClr val="tx1"/>
+                  </a:solidFill>
+                  <a:latin typeface="Arial" panose="020B0604020202020204" pitchFamily="34" charset="0"/>
+                  <a:cs typeface="Arial" panose="020B0604020202020204" pitchFamily="34" charset="0"/>
+                </a:rPr>
+                <a:t>country:</a:t>
+              </a:r>
+              <a:r>
+                <a:rPr lang="zh-CN" altLang="en-US" sz="1200" dirty="0">
+                  <a:solidFill>
+                    <a:schemeClr val="tx1"/>
+                  </a:solidFill>
+                  <a:latin typeface="Arial" panose="020B0604020202020204" pitchFamily="34" charset="0"/>
+                  <a:cs typeface="Arial" panose="020B0604020202020204" pitchFamily="34" charset="0"/>
+                </a:rPr>
+                <a:t> </a:t>
+              </a:r>
+              <a:r>
+                <a:rPr lang="en-US" altLang="zh-CN" sz="1200" dirty="0">
+                  <a:solidFill>
+                    <a:schemeClr val="tx1"/>
+                  </a:solidFill>
+                  <a:latin typeface="Arial" panose="020B0604020202020204" pitchFamily="34" charset="0"/>
+                  <a:cs typeface="Arial" panose="020B0604020202020204" pitchFamily="34" charset="0"/>
+                </a:rPr>
+                <a:t>String</a:t>
+              </a:r>
+            </a:p>
+            <a:p>
+              <a:r>
+                <a:rPr lang="en-US" altLang="zh-CN" sz="1200" dirty="0">
+                  <a:solidFill>
+                    <a:schemeClr val="tx1"/>
+                  </a:solidFill>
+                  <a:latin typeface="Arial" panose="020B0604020202020204" pitchFamily="34" charset="0"/>
+                  <a:cs typeface="Arial" panose="020B0604020202020204" pitchFamily="34" charset="0"/>
+                </a:rPr>
+                <a:t>city:</a:t>
+              </a:r>
+              <a:r>
+                <a:rPr lang="zh-CN" altLang="en-US" sz="1200" dirty="0">
+                  <a:solidFill>
+                    <a:schemeClr val="tx1"/>
+                  </a:solidFill>
+                  <a:latin typeface="Arial" panose="020B0604020202020204" pitchFamily="34" charset="0"/>
+                  <a:cs typeface="Arial" panose="020B0604020202020204" pitchFamily="34" charset="0"/>
+                </a:rPr>
+                <a:t> </a:t>
+              </a:r>
+              <a:r>
+                <a:rPr lang="en-US" altLang="zh-CN" sz="1200" dirty="0">
+                  <a:solidFill>
+                    <a:schemeClr val="tx1"/>
+                  </a:solidFill>
+                  <a:latin typeface="Arial" panose="020B0604020202020204" pitchFamily="34" charset="0"/>
+                  <a:cs typeface="Arial" panose="020B0604020202020204" pitchFamily="34" charset="0"/>
+                </a:rPr>
+                <a:t>String</a:t>
+              </a:r>
+            </a:p>
+            <a:p>
+              <a:r>
+                <a:rPr lang="en-US" altLang="zh-CN" sz="1200" dirty="0">
+                  <a:solidFill>
+                    <a:schemeClr val="tx1"/>
+                  </a:solidFill>
+                  <a:latin typeface="Arial" panose="020B0604020202020204" pitchFamily="34" charset="0"/>
+                  <a:cs typeface="Arial" panose="020B0604020202020204" pitchFamily="34" charset="0"/>
+                </a:rPr>
+                <a:t>business:</a:t>
+              </a:r>
+              <a:r>
+                <a:rPr lang="zh-CN" altLang="en-US" sz="1200" dirty="0">
+                  <a:solidFill>
+                    <a:schemeClr val="tx1"/>
+                  </a:solidFill>
+                  <a:latin typeface="Arial" panose="020B0604020202020204" pitchFamily="34" charset="0"/>
+                  <a:cs typeface="Arial" panose="020B0604020202020204" pitchFamily="34" charset="0"/>
+                </a:rPr>
+                <a:t> </a:t>
+              </a:r>
+              <a:r>
+                <a:rPr lang="en-US" altLang="zh-CN" sz="1200" dirty="0">
+                  <a:solidFill>
+                    <a:schemeClr val="tx1"/>
+                  </a:solidFill>
+                  <a:latin typeface="Arial" panose="020B0604020202020204" pitchFamily="34" charset="0"/>
+                  <a:cs typeface="Arial" panose="020B0604020202020204" pitchFamily="34" charset="0"/>
+                </a:rPr>
+                <a:t>String</a:t>
+              </a:r>
+            </a:p>
+            <a:p>
+              <a:r>
+                <a:rPr lang="en-US" altLang="zh-CN" sz="1200" dirty="0">
+                  <a:solidFill>
+                    <a:schemeClr val="tx1"/>
+                  </a:solidFill>
+                  <a:latin typeface="Arial" panose="020B0604020202020204" pitchFamily="34" charset="0"/>
+                  <a:cs typeface="Arial" panose="020B0604020202020204" pitchFamily="34" charset="0"/>
+                </a:rPr>
+                <a:t>description:</a:t>
+              </a:r>
+              <a:r>
+                <a:rPr lang="zh-CN" altLang="en-US" sz="1200" dirty="0">
+                  <a:solidFill>
+                    <a:schemeClr val="tx1"/>
+                  </a:solidFill>
+                  <a:latin typeface="Arial" panose="020B0604020202020204" pitchFamily="34" charset="0"/>
+                  <a:cs typeface="Arial" panose="020B0604020202020204" pitchFamily="34" charset="0"/>
+                </a:rPr>
+                <a:t> </a:t>
+              </a:r>
+              <a:r>
+                <a:rPr lang="en-US" altLang="zh-CN" sz="1200" dirty="0">
+                  <a:solidFill>
+                    <a:schemeClr val="tx1"/>
+                  </a:solidFill>
+                  <a:latin typeface="Arial" panose="020B0604020202020204" pitchFamily="34" charset="0"/>
+                  <a:cs typeface="Arial" panose="020B0604020202020204" pitchFamily="34" charset="0"/>
+                </a:rPr>
+                <a:t>String</a:t>
+              </a:r>
+            </a:p>
+            <a:p>
+              <a:r>
+                <a:rPr lang="en-US" altLang="zh-CN" sz="1200" dirty="0" err="1">
+                  <a:solidFill>
+                    <a:schemeClr val="tx1"/>
+                  </a:solidFill>
+                  <a:latin typeface="Arial" panose="020B0604020202020204" pitchFamily="34" charset="0"/>
+                  <a:cs typeface="Arial" panose="020B0604020202020204" pitchFamily="34" charset="0"/>
+                </a:rPr>
+                <a:t>url</a:t>
+              </a:r>
+              <a:r>
+                <a:rPr lang="en-US" altLang="zh-CN" sz="1200" dirty="0">
+                  <a:solidFill>
+                    <a:schemeClr val="tx1"/>
+                  </a:solidFill>
+                  <a:latin typeface="Arial" panose="020B0604020202020204" pitchFamily="34" charset="0"/>
+                  <a:cs typeface="Arial" panose="020B0604020202020204" pitchFamily="34" charset="0"/>
+                </a:rPr>
+                <a:t>:</a:t>
+              </a:r>
+              <a:r>
+                <a:rPr lang="zh-CN" altLang="en-US" sz="1200" dirty="0">
+                  <a:solidFill>
+                    <a:schemeClr val="tx1"/>
+                  </a:solidFill>
+                  <a:latin typeface="Arial" panose="020B0604020202020204" pitchFamily="34" charset="0"/>
+                  <a:cs typeface="Arial" panose="020B0604020202020204" pitchFamily="34" charset="0"/>
+                </a:rPr>
+                <a:t> </a:t>
+              </a:r>
+              <a:r>
+                <a:rPr lang="en-US" altLang="zh-CN" sz="1200" dirty="0">
+                  <a:solidFill>
+                    <a:schemeClr val="tx1"/>
+                  </a:solidFill>
+                  <a:latin typeface="Arial" panose="020B0604020202020204" pitchFamily="34" charset="0"/>
+                  <a:cs typeface="Arial" panose="020B0604020202020204" pitchFamily="34" charset="0"/>
+                </a:rPr>
+                <a:t>String</a:t>
+              </a:r>
+            </a:p>
+          </p:txBody>
+        </p:sp>
+        <p:sp>
+          <p:nvSpPr>
+            <p:cNvPr id="13" name="Rectangle 12"/>
+            <p:cNvSpPr/>
+            <p:nvPr/>
+          </p:nvSpPr>
+          <p:spPr>
+            <a:xfrm>
+              <a:off x="2272140" y="3140948"/>
+              <a:ext cx="1992630" cy="396000"/>
+            </a:xfrm>
+            <a:prstGeom prst="rect">
+              <a:avLst/>
+            </a:prstGeom>
+            <a:solidFill>
+              <a:srgbClr val="FF0000">
+                <a:alpha val="30000"/>
+              </a:srgbClr>
+            </a:solidFill>
+            <a:ln w="22225">
+              <a:solidFill>
+                <a:schemeClr val="tx1"/>
+              </a:solidFill>
+            </a:ln>
+          </p:spPr>
+          <p:style>
+            <a:lnRef idx="2">
+              <a:schemeClr val="accent1">
+                <a:shade val="50000"/>
+              </a:schemeClr>
+            </a:lnRef>
+            <a:fillRef idx="1">
+              <a:schemeClr val="accent1"/>
+            </a:fillRef>
+            <a:effectRef idx="0">
+              <a:schemeClr val="accent1"/>
+            </a:effectRef>
+            <a:fontRef idx="minor">
+              <a:schemeClr val="lt1"/>
+            </a:fontRef>
+          </p:style>
+          <p:txBody>
+            <a:bodyPr rtlCol="0" anchor="ctr"/>
+            <a:lstStyle/>
+            <a:p>
+              <a:pPr algn="ctr"/>
+              <a:r>
+                <a:rPr lang="en-US" altLang="zh-CN" b="1" dirty="0">
+                  <a:solidFill>
+                    <a:schemeClr val="tx1"/>
+                  </a:solidFill>
+                  <a:latin typeface="Arial" panose="020B0604020202020204" pitchFamily="34" charset="0"/>
+                  <a:cs typeface="Arial" panose="020B0604020202020204" pitchFamily="34" charset="0"/>
+                </a:rPr>
+                <a:t>Company</a:t>
+              </a:r>
+              <a:endParaRPr lang="en-US" b="1" dirty="0">
+                <a:solidFill>
+                  <a:schemeClr val="tx1"/>
+                </a:solidFill>
+                <a:latin typeface="Arial" panose="020B0604020202020204" pitchFamily="34" charset="0"/>
+                <a:cs typeface="Arial" panose="020B0604020202020204" pitchFamily="34" charset="0"/>
+              </a:endParaRPr>
+            </a:p>
+          </p:txBody>
+        </p:sp>
+        <p:grpSp>
+          <p:nvGrpSpPr>
+            <p:cNvPr id="138" name="Group 137">
+              <a:extLst>
+                <a:ext uri="{FF2B5EF4-FFF2-40B4-BE49-F238E27FC236}">
+                  <a16:creationId xmlns:a16="http://schemas.microsoft.com/office/drawing/2014/main" id="{AD460002-16CE-2F3C-2EC1-7FB5BE502311}"/>
+                </a:ext>
+              </a:extLst>
+            </p:cNvPr>
+            <p:cNvGrpSpPr/>
+            <p:nvPr/>
+          </p:nvGrpSpPr>
+          <p:grpSpPr>
+            <a:xfrm>
+              <a:off x="5279500" y="1591012"/>
+              <a:ext cx="2016000" cy="2369253"/>
+              <a:chOff x="5001260" y="2240915"/>
+              <a:chExt cx="2016000" cy="2369253"/>
+            </a:xfrm>
+          </p:grpSpPr>
+          <p:sp>
+            <p:nvSpPr>
+              <p:cNvPr id="15" name="Rectangle 14"/>
+              <p:cNvSpPr/>
+              <p:nvPr/>
+            </p:nvSpPr>
+            <p:spPr>
+              <a:xfrm>
+                <a:off x="5001260" y="2630168"/>
+                <a:ext cx="2016000" cy="1980000"/>
+              </a:xfrm>
+              <a:prstGeom prst="rect">
+                <a:avLst/>
+              </a:prstGeom>
+              <a:noFill/>
+              <a:ln w="22225">
+                <a:solidFill>
+                  <a:schemeClr val="tx1"/>
+                </a:solidFill>
+              </a:ln>
+            </p:spPr>
+            <p:style>
+              <a:lnRef idx="2">
+                <a:schemeClr val="accent1">
+                  <a:shade val="50000"/>
+                </a:schemeClr>
+              </a:lnRef>
+              <a:fillRef idx="1">
+                <a:schemeClr val="accent1"/>
+              </a:fillRef>
+              <a:effectRef idx="0">
+                <a:schemeClr val="accent1"/>
+              </a:effectRef>
+              <a:fontRef idx="minor">
+                <a:schemeClr val="lt1"/>
+              </a:fontRef>
+            </p:style>
+            <p:txBody>
+              <a:bodyPr rtlCol="0" anchor="ctr"/>
+              <a:lstStyle/>
+              <a:p>
+                <a:r>
+                  <a:rPr lang="en-US" altLang="zh-CN" sz="1200" dirty="0">
+                    <a:solidFill>
+                      <a:schemeClr val="tx1"/>
+                    </a:solidFill>
+                    <a:latin typeface="Arial" panose="020B0604020202020204" pitchFamily="34" charset="0"/>
+                    <a:cs typeface="Arial" panose="020B0604020202020204" pitchFamily="34" charset="0"/>
+                  </a:rPr>
+                  <a:t>id:</a:t>
+                </a:r>
+                <a:r>
+                  <a:rPr lang="zh-CN" altLang="en-US" sz="1200" dirty="0">
+                    <a:solidFill>
+                      <a:schemeClr val="tx1"/>
+                    </a:solidFill>
+                    <a:latin typeface="Arial" panose="020B0604020202020204" pitchFamily="34" charset="0"/>
+                    <a:cs typeface="Arial" panose="020B0604020202020204" pitchFamily="34" charset="0"/>
+                  </a:rPr>
+                  <a:t> </a:t>
+                </a:r>
+                <a:r>
+                  <a:rPr lang="en-US" altLang="zh-CN" sz="1200" dirty="0">
+                    <a:solidFill>
+                      <a:schemeClr val="tx1"/>
+                    </a:solidFill>
+                    <a:latin typeface="Arial" panose="020B0604020202020204" pitchFamily="34" charset="0"/>
+                    <a:cs typeface="Arial" panose="020B0604020202020204" pitchFamily="34" charset="0"/>
+                  </a:rPr>
+                  <a:t>ID</a:t>
+                </a:r>
+              </a:p>
+              <a:p>
+                <a:r>
+                  <a:rPr lang="en-US" sz="1200" dirty="0">
+                    <a:solidFill>
+                      <a:schemeClr val="tx1"/>
+                    </a:solidFill>
+                    <a:latin typeface="Arial" panose="020B0604020202020204" pitchFamily="34" charset="0"/>
+                    <a:cs typeface="Arial" panose="020B0604020202020204" pitchFamily="34" charset="0"/>
+                  </a:rPr>
+                  <a:t>cr</a:t>
+                </a:r>
+                <a:r>
+                  <a:rPr lang="en-US" altLang="zh-CN" sz="1200" dirty="0">
+                    <a:solidFill>
+                      <a:schemeClr val="tx1"/>
+                    </a:solidFill>
+                    <a:latin typeface="Arial" panose="020B0604020202020204" pitchFamily="34" charset="0"/>
+                    <a:cs typeface="Arial" panose="020B0604020202020204" pitchFamily="34" charset="0"/>
+                  </a:rPr>
+                  <a:t>eateTime:</a:t>
+                </a:r>
+                <a:r>
+                  <a:rPr lang="zh-CN" altLang="en-US" sz="1200" dirty="0">
+                    <a:solidFill>
+                      <a:schemeClr val="tx1"/>
+                    </a:solidFill>
+                    <a:latin typeface="Arial" panose="020B0604020202020204" pitchFamily="34" charset="0"/>
+                    <a:cs typeface="Arial" panose="020B0604020202020204" pitchFamily="34" charset="0"/>
+                  </a:rPr>
+                  <a:t> </a:t>
+                </a:r>
+                <a:r>
+                  <a:rPr lang="en-US" altLang="zh-CN" sz="1200" dirty="0">
+                    <a:solidFill>
+                      <a:schemeClr val="tx1"/>
+                    </a:solidFill>
+                    <a:latin typeface="Arial" panose="020B0604020202020204" pitchFamily="34" charset="0"/>
+                    <a:cs typeface="Arial" panose="020B0604020202020204" pitchFamily="34" charset="0"/>
+                  </a:rPr>
+                  <a:t>DateTime</a:t>
+                </a:r>
+              </a:p>
+              <a:p>
+                <a:r>
+                  <a:rPr lang="en-US" altLang="zh-CN" sz="1200" dirty="0">
+                    <a:solidFill>
+                      <a:schemeClr val="tx1"/>
+                    </a:solidFill>
+                    <a:latin typeface="Arial" panose="020B0604020202020204" pitchFamily="34" charset="0"/>
+                    <a:cs typeface="Arial" panose="020B0604020202020204" pitchFamily="34" charset="0"/>
+                  </a:rPr>
+                  <a:t>isBlocked:</a:t>
+                </a:r>
+                <a:r>
+                  <a:rPr lang="zh-CN" altLang="en-US" sz="1200" dirty="0">
+                    <a:solidFill>
+                      <a:schemeClr val="tx1"/>
+                    </a:solidFill>
+                    <a:latin typeface="Arial" panose="020B0604020202020204" pitchFamily="34" charset="0"/>
+                    <a:cs typeface="Arial" panose="020B0604020202020204" pitchFamily="34" charset="0"/>
+                  </a:rPr>
+                  <a:t> </a:t>
+                </a:r>
+                <a:r>
+                  <a:rPr lang="en-US" altLang="zh-CN" sz="1200" dirty="0">
+                    <a:solidFill>
+                      <a:schemeClr val="tx1"/>
+                    </a:solidFill>
+                    <a:latin typeface="Arial" panose="020B0604020202020204" pitchFamily="34" charset="0"/>
+                    <a:cs typeface="Arial" panose="020B0604020202020204" pitchFamily="34" charset="0"/>
+                  </a:rPr>
+                  <a:t>Boolean</a:t>
+                </a:r>
+              </a:p>
+              <a:p>
+                <a:r>
+                  <a:rPr lang="en-US" altLang="zh-CN" sz="1200" dirty="0">
+                    <a:solidFill>
+                      <a:schemeClr val="tx1"/>
+                    </a:solidFill>
+                    <a:latin typeface="Arial" panose="020B0604020202020204" pitchFamily="34" charset="0"/>
+                    <a:cs typeface="Arial" panose="020B0604020202020204" pitchFamily="34" charset="0"/>
+                  </a:rPr>
+                  <a:t>t</a:t>
+                </a:r>
+                <a:r>
+                  <a:rPr lang="en-US" sz="1200" dirty="0">
+                    <a:solidFill>
+                      <a:schemeClr val="tx1"/>
+                    </a:solidFill>
+                    <a:latin typeface="Arial" panose="020B0604020202020204" pitchFamily="34" charset="0"/>
+                    <a:cs typeface="Arial" panose="020B0604020202020204" pitchFamily="34" charset="0"/>
+                  </a:rPr>
+                  <a:t>ype</a:t>
+                </a:r>
+                <a:r>
+                  <a:rPr lang="en-US" altLang="zh-CN" sz="1200" dirty="0">
+                    <a:solidFill>
+                      <a:schemeClr val="tx1"/>
+                    </a:solidFill>
+                    <a:latin typeface="Arial" panose="020B0604020202020204" pitchFamily="34" charset="0"/>
+                    <a:cs typeface="Arial" panose="020B0604020202020204" pitchFamily="34" charset="0"/>
+                  </a:rPr>
+                  <a:t>:</a:t>
+                </a:r>
+                <a:r>
+                  <a:rPr lang="zh-CN" altLang="en-US" sz="1200" dirty="0">
+                    <a:solidFill>
+                      <a:schemeClr val="tx1"/>
+                    </a:solidFill>
+                    <a:latin typeface="Arial" panose="020B0604020202020204" pitchFamily="34" charset="0"/>
+                    <a:cs typeface="Arial" panose="020B0604020202020204" pitchFamily="34" charset="0"/>
+                  </a:rPr>
+                  <a:t> </a:t>
+                </a:r>
+                <a:r>
+                  <a:rPr lang="en-US" altLang="zh-CN" sz="1200" dirty="0">
+                    <a:solidFill>
+                      <a:schemeClr val="tx1"/>
+                    </a:solidFill>
+                    <a:latin typeface="Arial" panose="020B0604020202020204" pitchFamily="34" charset="0"/>
+                    <a:cs typeface="Arial" panose="020B0604020202020204" pitchFamily="34" charset="0"/>
+                  </a:rPr>
+                  <a:t>String</a:t>
+                </a:r>
+              </a:p>
+              <a:p>
+                <a:r>
+                  <a:rPr lang="en-US" altLang="zh-CN" sz="1200" dirty="0">
+                    <a:solidFill>
+                      <a:schemeClr val="tx1"/>
+                    </a:solidFill>
+                    <a:latin typeface="Arial" panose="020B0604020202020204" pitchFamily="34" charset="0"/>
+                    <a:cs typeface="Arial" panose="020B0604020202020204" pitchFamily="34" charset="0"/>
+                  </a:rPr>
+                  <a:t>nickname:</a:t>
+                </a:r>
+                <a:r>
+                  <a:rPr lang="zh-CN" altLang="en-US" sz="1200" dirty="0">
+                    <a:solidFill>
+                      <a:schemeClr val="tx1"/>
+                    </a:solidFill>
+                    <a:latin typeface="Arial" panose="020B0604020202020204" pitchFamily="34" charset="0"/>
+                    <a:cs typeface="Arial" panose="020B0604020202020204" pitchFamily="34" charset="0"/>
+                  </a:rPr>
+                  <a:t> </a:t>
+                </a:r>
+                <a:r>
+                  <a:rPr lang="en-US" altLang="zh-CN" sz="1200" dirty="0">
+                    <a:solidFill>
+                      <a:schemeClr val="tx1"/>
+                    </a:solidFill>
+                    <a:latin typeface="Arial" panose="020B0604020202020204" pitchFamily="34" charset="0"/>
+                    <a:cs typeface="Arial" panose="020B0604020202020204" pitchFamily="34" charset="0"/>
+                  </a:rPr>
+                  <a:t>String</a:t>
+                </a:r>
+              </a:p>
+              <a:p>
+                <a:r>
+                  <a:rPr lang="en-US" altLang="zh-CN" sz="1200" dirty="0">
+                    <a:solidFill>
+                      <a:schemeClr val="tx1"/>
+                    </a:solidFill>
+                    <a:latin typeface="Arial" panose="020B0604020202020204" pitchFamily="34" charset="0"/>
+                    <a:cs typeface="Arial" panose="020B0604020202020204" pitchFamily="34" charset="0"/>
+                  </a:rPr>
+                  <a:t>phoneNumber:</a:t>
+                </a:r>
+                <a:r>
+                  <a:rPr lang="zh-CN" altLang="en-US" sz="1200" dirty="0">
+                    <a:solidFill>
+                      <a:schemeClr val="tx1"/>
+                    </a:solidFill>
+                    <a:latin typeface="Arial" panose="020B0604020202020204" pitchFamily="34" charset="0"/>
+                    <a:cs typeface="Arial" panose="020B0604020202020204" pitchFamily="34" charset="0"/>
+                  </a:rPr>
+                  <a:t> </a:t>
+                </a:r>
+                <a:r>
+                  <a:rPr lang="en-US" altLang="zh-CN" sz="1200" dirty="0">
+                    <a:solidFill>
+                      <a:schemeClr val="tx1"/>
+                    </a:solidFill>
+                    <a:latin typeface="Arial" panose="020B0604020202020204" pitchFamily="34" charset="0"/>
+                    <a:cs typeface="Arial" panose="020B0604020202020204" pitchFamily="34" charset="0"/>
+                  </a:rPr>
+                  <a:t>String</a:t>
+                </a:r>
+              </a:p>
+              <a:p>
+                <a:r>
+                  <a:rPr lang="en-US" altLang="zh-CN" sz="1200" dirty="0">
+                    <a:solidFill>
+                      <a:schemeClr val="tx1"/>
+                    </a:solidFill>
+                    <a:latin typeface="Arial" panose="020B0604020202020204" pitchFamily="34" charset="0"/>
+                    <a:cs typeface="Arial" panose="020B0604020202020204" pitchFamily="34" charset="0"/>
+                  </a:rPr>
+                  <a:t>email:</a:t>
+                </a:r>
+                <a:r>
+                  <a:rPr lang="zh-CN" altLang="en-US" sz="1200" dirty="0">
+                    <a:solidFill>
+                      <a:schemeClr val="tx1"/>
+                    </a:solidFill>
+                    <a:latin typeface="Arial" panose="020B0604020202020204" pitchFamily="34" charset="0"/>
+                    <a:cs typeface="Arial" panose="020B0604020202020204" pitchFamily="34" charset="0"/>
+                  </a:rPr>
+                  <a:t> </a:t>
+                </a:r>
+                <a:r>
+                  <a:rPr lang="en-US" altLang="zh-CN" sz="1200" dirty="0">
+                    <a:solidFill>
+                      <a:schemeClr val="tx1"/>
+                    </a:solidFill>
+                    <a:latin typeface="Arial" panose="020B0604020202020204" pitchFamily="34" charset="0"/>
+                    <a:cs typeface="Arial" panose="020B0604020202020204" pitchFamily="34" charset="0"/>
+                  </a:rPr>
+                  <a:t>Long</a:t>
+                </a:r>
+                <a:r>
+                  <a:rPr lang="zh-CN" altLang="en-US" sz="1200" dirty="0">
+                    <a:solidFill>
+                      <a:schemeClr val="tx1"/>
+                    </a:solidFill>
+                    <a:latin typeface="Arial" panose="020B0604020202020204" pitchFamily="34" charset="0"/>
+                    <a:cs typeface="Arial" panose="020B0604020202020204" pitchFamily="34" charset="0"/>
+                  </a:rPr>
+                  <a:t> </a:t>
+                </a:r>
+                <a:r>
+                  <a:rPr lang="en-US" altLang="zh-CN" sz="1200" dirty="0">
+                    <a:solidFill>
+                      <a:schemeClr val="tx1"/>
+                    </a:solidFill>
+                    <a:latin typeface="Arial" panose="020B0604020202020204" pitchFamily="34" charset="0"/>
+                    <a:cs typeface="Arial" panose="020B0604020202020204" pitchFamily="34" charset="0"/>
+                  </a:rPr>
+                  <a:t>String</a:t>
+                </a:r>
+              </a:p>
+              <a:p>
+                <a:r>
+                  <a:rPr lang="en-US" altLang="zh-CN" sz="1200" dirty="0">
+                    <a:solidFill>
+                      <a:schemeClr val="tx1"/>
+                    </a:solidFill>
+                    <a:latin typeface="Arial" panose="020B0604020202020204" pitchFamily="34" charset="0"/>
+                    <a:cs typeface="Arial" panose="020B0604020202020204" pitchFamily="34" charset="0"/>
+                  </a:rPr>
+                  <a:t>freqLoginType:</a:t>
+                </a:r>
+                <a:r>
+                  <a:rPr lang="zh-CN" altLang="en-US" sz="1200" dirty="0">
+                    <a:solidFill>
+                      <a:schemeClr val="tx1"/>
+                    </a:solidFill>
+                    <a:latin typeface="Arial" panose="020B0604020202020204" pitchFamily="34" charset="0"/>
+                    <a:cs typeface="Arial" panose="020B0604020202020204" pitchFamily="34" charset="0"/>
+                  </a:rPr>
+                  <a:t> </a:t>
+                </a:r>
+                <a:r>
+                  <a:rPr lang="en-US" altLang="zh-CN" sz="1200" dirty="0">
+                    <a:solidFill>
+                      <a:schemeClr val="tx1"/>
+                    </a:solidFill>
+                    <a:latin typeface="Arial" panose="020B0604020202020204" pitchFamily="34" charset="0"/>
+                    <a:cs typeface="Arial" panose="020B0604020202020204" pitchFamily="34" charset="0"/>
+                  </a:rPr>
+                  <a:t>String</a:t>
+                </a:r>
+              </a:p>
+              <a:p>
+                <a:r>
+                  <a:rPr lang="en-US" altLang="zh-CN" sz="1200" dirty="0">
+                    <a:solidFill>
+                      <a:schemeClr val="tx1"/>
+                    </a:solidFill>
+                    <a:latin typeface="Arial" panose="020B0604020202020204" pitchFamily="34" charset="0"/>
+                    <a:cs typeface="Arial" panose="020B0604020202020204" pitchFamily="34" charset="0"/>
+                  </a:rPr>
+                  <a:t>lastLoginTime:</a:t>
+                </a:r>
+                <a:r>
+                  <a:rPr lang="zh-CN" altLang="en-US" sz="1200" dirty="0">
+                    <a:solidFill>
+                      <a:schemeClr val="tx1"/>
+                    </a:solidFill>
+                    <a:latin typeface="Arial" panose="020B0604020202020204" pitchFamily="34" charset="0"/>
+                    <a:cs typeface="Arial" panose="020B0604020202020204" pitchFamily="34" charset="0"/>
+                  </a:rPr>
+                  <a:t> </a:t>
+                </a:r>
+                <a:r>
+                  <a:rPr lang="en-US" altLang="zh-CN" sz="1200" dirty="0">
+                    <a:solidFill>
+                      <a:schemeClr val="tx1"/>
+                    </a:solidFill>
+                    <a:latin typeface="Arial" panose="020B0604020202020204" pitchFamily="34" charset="0"/>
+                    <a:cs typeface="Arial" panose="020B0604020202020204" pitchFamily="34" charset="0"/>
+                  </a:rPr>
+                  <a:t>DateTime</a:t>
+                </a:r>
+              </a:p>
+              <a:p>
+                <a:r>
+                  <a:rPr lang="en-US" altLang="zh-CN" sz="1200" dirty="0">
+                    <a:solidFill>
+                      <a:schemeClr val="tx1"/>
+                    </a:solidFill>
+                    <a:latin typeface="Arial" panose="020B0604020202020204" pitchFamily="34" charset="0"/>
+                    <a:cs typeface="Arial" panose="020B0604020202020204" pitchFamily="34" charset="0"/>
+                  </a:rPr>
+                  <a:t>accountLevel:</a:t>
+                </a:r>
+                <a:r>
+                  <a:rPr lang="zh-CN" altLang="en-US" sz="1200" dirty="0">
+                    <a:solidFill>
+                      <a:schemeClr val="tx1"/>
+                    </a:solidFill>
+                    <a:latin typeface="Arial" panose="020B0604020202020204" pitchFamily="34" charset="0"/>
+                    <a:cs typeface="Arial" panose="020B0604020202020204" pitchFamily="34" charset="0"/>
+                  </a:rPr>
+                  <a:t> </a:t>
+                </a:r>
+                <a:r>
+                  <a:rPr lang="en-US" altLang="zh-CN" sz="1200" dirty="0">
+                    <a:solidFill>
+                      <a:schemeClr val="tx1"/>
+                    </a:solidFill>
+                    <a:latin typeface="Arial" panose="020B0604020202020204" pitchFamily="34" charset="0"/>
+                    <a:cs typeface="Arial" panose="020B0604020202020204" pitchFamily="34" charset="0"/>
+                  </a:rPr>
+                  <a:t>String</a:t>
+                </a:r>
+              </a:p>
+            </p:txBody>
+          </p:sp>
+          <p:sp>
+            <p:nvSpPr>
+              <p:cNvPr id="16" name="Rectangle 15"/>
+              <p:cNvSpPr/>
+              <p:nvPr/>
+            </p:nvSpPr>
+            <p:spPr>
+              <a:xfrm>
+                <a:off x="5001260" y="2240915"/>
+                <a:ext cx="2010410" cy="396000"/>
+              </a:xfrm>
+              <a:prstGeom prst="rect">
+                <a:avLst/>
+              </a:prstGeom>
+              <a:solidFill>
+                <a:schemeClr val="accent1">
+                  <a:lumMod val="60000"/>
+                  <a:lumOff val="40000"/>
+                </a:schemeClr>
+              </a:solidFill>
+              <a:ln w="22225">
+                <a:solidFill>
+                  <a:schemeClr val="tx1"/>
+                </a:solidFill>
+              </a:ln>
+            </p:spPr>
+            <p:style>
+              <a:lnRef idx="2">
+                <a:schemeClr val="accent1">
+                  <a:shade val="50000"/>
+                </a:schemeClr>
+              </a:lnRef>
+              <a:fillRef idx="1">
+                <a:schemeClr val="accent1"/>
+              </a:fillRef>
+              <a:effectRef idx="0">
+                <a:schemeClr val="accent1"/>
+              </a:effectRef>
+              <a:fontRef idx="minor">
+                <a:schemeClr val="lt1"/>
+              </a:fontRef>
+            </p:style>
+            <p:txBody>
+              <a:bodyPr rtlCol="0" anchor="ctr"/>
+              <a:lstStyle/>
+              <a:p>
+                <a:pPr algn="ctr"/>
+                <a:r>
+                  <a:rPr lang="en-US" altLang="zh-CN" b="1" dirty="0">
+                    <a:solidFill>
+                      <a:schemeClr val="tx1"/>
+                    </a:solidFill>
+                    <a:latin typeface="Arial" panose="020B0604020202020204" pitchFamily="34" charset="0"/>
+                    <a:cs typeface="Arial" panose="020B0604020202020204" pitchFamily="34" charset="0"/>
+                  </a:rPr>
+                  <a:t>Account</a:t>
+                </a:r>
+                <a:endParaRPr lang="en-US" b="1" dirty="0">
+                  <a:solidFill>
+                    <a:schemeClr val="tx1"/>
+                  </a:solidFill>
+                  <a:latin typeface="Arial" panose="020B0604020202020204" pitchFamily="34" charset="0"/>
+                  <a:cs typeface="Arial" panose="020B0604020202020204" pitchFamily="34" charset="0"/>
+                </a:endParaRPr>
+              </a:p>
+            </p:txBody>
+          </p:sp>
+        </p:grpSp>
+        <p:grpSp>
+          <p:nvGrpSpPr>
+            <p:cNvPr id="131" name="Group 130"/>
+            <p:cNvGrpSpPr/>
+            <p:nvPr/>
+          </p:nvGrpSpPr>
+          <p:grpSpPr>
+            <a:xfrm>
+              <a:off x="8104981" y="1963991"/>
+              <a:ext cx="1992630" cy="1619445"/>
+              <a:chOff x="8543646" y="2115706"/>
+              <a:chExt cx="1992353" cy="1619520"/>
+            </a:xfrm>
+          </p:grpSpPr>
+          <p:sp>
+            <p:nvSpPr>
+              <p:cNvPr id="21" name="Rectangle 20"/>
+              <p:cNvSpPr/>
+              <p:nvPr/>
+            </p:nvSpPr>
+            <p:spPr>
+              <a:xfrm>
+                <a:off x="8543646" y="2511170"/>
+                <a:ext cx="1992353" cy="1224056"/>
+              </a:xfrm>
+              <a:prstGeom prst="rect">
+                <a:avLst/>
+              </a:prstGeom>
+              <a:noFill/>
+              <a:ln w="22225">
+                <a:solidFill>
+                  <a:schemeClr val="tx1"/>
+                </a:solidFill>
+              </a:ln>
+            </p:spPr>
+            <p:style>
+              <a:lnRef idx="2">
+                <a:schemeClr val="accent1">
+                  <a:shade val="50000"/>
+                </a:schemeClr>
+              </a:lnRef>
+              <a:fillRef idx="1">
+                <a:schemeClr val="accent1"/>
+              </a:fillRef>
+              <a:effectRef idx="0">
+                <a:schemeClr val="accent1"/>
+              </a:effectRef>
+              <a:fontRef idx="minor">
+                <a:schemeClr val="lt1"/>
+              </a:fontRef>
+            </p:style>
+            <p:txBody>
+              <a:bodyPr rtlCol="0" anchor="ctr"/>
+              <a:lstStyle/>
+              <a:p>
+                <a:r>
+                  <a:rPr lang="en-US" altLang="zh-CN" sz="1200" dirty="0">
+                    <a:solidFill>
+                      <a:schemeClr val="tx1"/>
+                    </a:solidFill>
+                    <a:latin typeface="Arial" panose="020B0604020202020204" pitchFamily="34" charset="0"/>
+                    <a:cs typeface="Arial" panose="020B0604020202020204" pitchFamily="34" charset="0"/>
+                  </a:rPr>
+                  <a:t>id:</a:t>
+                </a:r>
+                <a:r>
+                  <a:rPr lang="zh-CN" altLang="en-US" sz="1200" dirty="0">
+                    <a:solidFill>
+                      <a:schemeClr val="tx1"/>
+                    </a:solidFill>
+                    <a:latin typeface="Arial" panose="020B0604020202020204" pitchFamily="34" charset="0"/>
+                    <a:cs typeface="Arial" panose="020B0604020202020204" pitchFamily="34" charset="0"/>
+                  </a:rPr>
+                  <a:t> </a:t>
+                </a:r>
+                <a:r>
+                  <a:rPr lang="en-US" altLang="zh-CN" sz="1200" dirty="0">
+                    <a:solidFill>
+                      <a:schemeClr val="tx1"/>
+                    </a:solidFill>
+                    <a:latin typeface="Arial" panose="020B0604020202020204" pitchFamily="34" charset="0"/>
+                    <a:cs typeface="Arial" panose="020B0604020202020204" pitchFamily="34" charset="0"/>
+                  </a:rPr>
+                  <a:t>ID</a:t>
+                </a:r>
+              </a:p>
+              <a:p>
+                <a:r>
+                  <a:rPr lang="en-US" altLang="zh-CN" sz="1200" dirty="0">
+                    <a:solidFill>
+                      <a:schemeClr val="tx1"/>
+                    </a:solidFill>
+                    <a:latin typeface="Arial" panose="020B0604020202020204" pitchFamily="34" charset="0"/>
+                    <a:cs typeface="Arial" panose="020B0604020202020204" pitchFamily="34" charset="0"/>
+                  </a:rPr>
+                  <a:t>type:</a:t>
+                </a:r>
+                <a:r>
+                  <a:rPr lang="zh-CN" altLang="en-US" sz="1200" dirty="0">
+                    <a:solidFill>
+                      <a:schemeClr val="tx1"/>
+                    </a:solidFill>
+                    <a:latin typeface="Arial" panose="020B0604020202020204" pitchFamily="34" charset="0"/>
+                    <a:cs typeface="Arial" panose="020B0604020202020204" pitchFamily="34" charset="0"/>
+                  </a:rPr>
+                  <a:t> </a:t>
+                </a:r>
+                <a:r>
+                  <a:rPr lang="en-US" altLang="zh-CN" sz="1200" dirty="0">
+                    <a:solidFill>
+                      <a:schemeClr val="tx1"/>
+                    </a:solidFill>
+                    <a:latin typeface="Arial" panose="020B0604020202020204" pitchFamily="34" charset="0"/>
+                    <a:cs typeface="Arial" panose="020B0604020202020204" pitchFamily="34" charset="0"/>
+                  </a:rPr>
+                  <a:t>String</a:t>
+                </a:r>
+              </a:p>
+              <a:p>
+                <a:r>
+                  <a:rPr lang="en-US" altLang="zh-CN" sz="1200" dirty="0">
+                    <a:solidFill>
+                      <a:schemeClr val="tx1"/>
+                    </a:solidFill>
+                    <a:latin typeface="Arial" panose="020B0604020202020204" pitchFamily="34" charset="0"/>
+                    <a:cs typeface="Arial" panose="020B0604020202020204" pitchFamily="34" charset="0"/>
+                  </a:rPr>
+                  <a:t>createTime:</a:t>
+                </a:r>
+                <a:r>
+                  <a:rPr lang="zh-CN" altLang="en-US" sz="1200" dirty="0">
+                    <a:solidFill>
+                      <a:schemeClr val="tx1"/>
+                    </a:solidFill>
+                    <a:latin typeface="Arial" panose="020B0604020202020204" pitchFamily="34" charset="0"/>
+                    <a:cs typeface="Arial" panose="020B0604020202020204" pitchFamily="34" charset="0"/>
+                  </a:rPr>
+                  <a:t> </a:t>
+                </a:r>
+                <a:r>
+                  <a:rPr lang="en-US" altLang="zh-CN" sz="1200" dirty="0">
+                    <a:solidFill>
+                      <a:schemeClr val="tx1"/>
+                    </a:solidFill>
+                    <a:latin typeface="Arial" panose="020B0604020202020204" pitchFamily="34" charset="0"/>
+                    <a:cs typeface="Arial" panose="020B0604020202020204" pitchFamily="34" charset="0"/>
+                  </a:rPr>
+                  <a:t>DateTime</a:t>
+                </a:r>
+              </a:p>
+              <a:p>
+                <a:r>
+                  <a:rPr lang="en-US" altLang="zh-CN" sz="1200" dirty="0">
+                    <a:solidFill>
+                      <a:schemeClr val="tx1"/>
+                    </a:solidFill>
+                    <a:latin typeface="Arial" panose="020B0604020202020204" pitchFamily="34" charset="0"/>
+                    <a:cs typeface="Arial" panose="020B0604020202020204" pitchFamily="34" charset="0"/>
+                  </a:rPr>
+                  <a:t>isBlocked:</a:t>
+                </a:r>
+                <a:r>
+                  <a:rPr lang="zh-CN" altLang="en-US" sz="1200" dirty="0">
+                    <a:solidFill>
+                      <a:schemeClr val="tx1"/>
+                    </a:solidFill>
+                    <a:latin typeface="Arial" panose="020B0604020202020204" pitchFamily="34" charset="0"/>
+                    <a:cs typeface="Arial" panose="020B0604020202020204" pitchFamily="34" charset="0"/>
+                  </a:rPr>
+                  <a:t> </a:t>
+                </a:r>
+                <a:r>
+                  <a:rPr lang="en-US" altLang="zh-CN" sz="1200" dirty="0">
+                    <a:solidFill>
+                      <a:schemeClr val="tx1"/>
+                    </a:solidFill>
+                    <a:latin typeface="Arial" panose="020B0604020202020204" pitchFamily="34" charset="0"/>
+                    <a:cs typeface="Arial" panose="020B0604020202020204" pitchFamily="34" charset="0"/>
+                  </a:rPr>
+                  <a:t>Boolean</a:t>
+                </a:r>
+              </a:p>
+              <a:p>
+                <a:r>
+                  <a:rPr lang="en-US" altLang="zh-CN" sz="1200" dirty="0">
+                    <a:solidFill>
+                      <a:schemeClr val="tx1"/>
+                    </a:solidFill>
+                    <a:latin typeface="Arial" panose="020B0604020202020204" pitchFamily="34" charset="0"/>
+                    <a:cs typeface="Arial" panose="020B0604020202020204" pitchFamily="34" charset="0"/>
+                  </a:rPr>
+                  <a:t>lastLoginTime:</a:t>
+                </a:r>
+                <a:r>
+                  <a:rPr lang="zh-CN" altLang="en-US" sz="1200" dirty="0">
+                    <a:solidFill>
+                      <a:schemeClr val="tx1"/>
+                    </a:solidFill>
+                    <a:latin typeface="Arial" panose="020B0604020202020204" pitchFamily="34" charset="0"/>
+                    <a:cs typeface="Arial" panose="020B0604020202020204" pitchFamily="34" charset="0"/>
+                  </a:rPr>
+                  <a:t> </a:t>
+                </a:r>
+                <a:r>
+                  <a:rPr lang="en-US" altLang="zh-CN" sz="1200" dirty="0">
+                    <a:solidFill>
+                      <a:schemeClr val="tx1"/>
+                    </a:solidFill>
+                    <a:latin typeface="Arial" panose="020B0604020202020204" pitchFamily="34" charset="0"/>
+                    <a:cs typeface="Arial" panose="020B0604020202020204" pitchFamily="34" charset="0"/>
+                  </a:rPr>
+                  <a:t>DateTime</a:t>
+                </a:r>
+              </a:p>
+              <a:p>
+                <a:r>
+                  <a:rPr lang="en-US" altLang="zh-CN" sz="1200" dirty="0">
+                    <a:solidFill>
+                      <a:schemeClr val="tx1"/>
+                    </a:solidFill>
+                    <a:latin typeface="Arial" panose="020B0604020202020204" pitchFamily="34" charset="0"/>
+                    <a:cs typeface="Arial" panose="020B0604020202020204" pitchFamily="34" charset="0"/>
+                  </a:rPr>
+                  <a:t>riskLevel:</a:t>
+                </a:r>
+                <a:r>
+                  <a:rPr lang="zh-CN" altLang="en-US" sz="1200" dirty="0">
+                    <a:solidFill>
+                      <a:schemeClr val="tx1"/>
+                    </a:solidFill>
+                    <a:latin typeface="Arial" panose="020B0604020202020204" pitchFamily="34" charset="0"/>
+                    <a:cs typeface="Arial" panose="020B0604020202020204" pitchFamily="34" charset="0"/>
+                  </a:rPr>
+                  <a:t> </a:t>
+                </a:r>
+                <a:r>
+                  <a:rPr lang="en-US" altLang="zh-CN" sz="1200" dirty="0">
+                    <a:solidFill>
+                      <a:schemeClr val="tx1"/>
+                    </a:solidFill>
+                    <a:latin typeface="Arial" panose="020B0604020202020204" pitchFamily="34" charset="0"/>
+                    <a:cs typeface="Arial" panose="020B0604020202020204" pitchFamily="34" charset="0"/>
+                  </a:rPr>
+                  <a:t>String</a:t>
+                </a:r>
+                <a:endParaRPr lang="en-US" sz="1200" dirty="0">
+                  <a:solidFill>
+                    <a:schemeClr val="tx1"/>
+                  </a:solidFill>
+                  <a:latin typeface="Arial" panose="020B0604020202020204" pitchFamily="34" charset="0"/>
+                  <a:cs typeface="Arial" panose="020B0604020202020204" pitchFamily="34" charset="0"/>
+                </a:endParaRPr>
+              </a:p>
+            </p:txBody>
+          </p:sp>
+          <p:sp>
+            <p:nvSpPr>
+              <p:cNvPr id="22" name="Rectangle 21"/>
+              <p:cNvSpPr/>
+              <p:nvPr/>
+            </p:nvSpPr>
+            <p:spPr>
+              <a:xfrm>
+                <a:off x="8543646" y="2115706"/>
+                <a:ext cx="1992353" cy="396018"/>
+              </a:xfrm>
+              <a:prstGeom prst="rect">
+                <a:avLst/>
+              </a:prstGeom>
+              <a:solidFill>
+                <a:schemeClr val="accent4">
+                  <a:lumMod val="60000"/>
+                  <a:lumOff val="40000"/>
+                </a:schemeClr>
+              </a:solidFill>
+              <a:ln w="22225">
+                <a:solidFill>
+                  <a:schemeClr val="tx1"/>
+                </a:solidFill>
+              </a:ln>
+            </p:spPr>
+            <p:style>
+              <a:lnRef idx="2">
+                <a:schemeClr val="accent1">
+                  <a:shade val="50000"/>
+                </a:schemeClr>
+              </a:lnRef>
+              <a:fillRef idx="1">
+                <a:schemeClr val="accent1"/>
+              </a:fillRef>
+              <a:effectRef idx="0">
+                <a:schemeClr val="accent1"/>
+              </a:effectRef>
+              <a:fontRef idx="minor">
+                <a:schemeClr val="lt1"/>
+              </a:fontRef>
+            </p:style>
+            <p:txBody>
+              <a:bodyPr rtlCol="0" anchor="ctr"/>
+              <a:lstStyle/>
+              <a:p>
+                <a:pPr algn="ctr"/>
+                <a:r>
+                  <a:rPr lang="en-US" altLang="zh-CN" b="1" dirty="0">
+                    <a:solidFill>
+                      <a:schemeClr val="tx1"/>
+                    </a:solidFill>
+                    <a:latin typeface="Arial" panose="020B0604020202020204" pitchFamily="34" charset="0"/>
+                    <a:cs typeface="Arial" panose="020B0604020202020204" pitchFamily="34" charset="0"/>
+                  </a:rPr>
+                  <a:t>Medium</a:t>
+                </a:r>
+                <a:endParaRPr lang="en-US" b="1" dirty="0">
+                  <a:solidFill>
+                    <a:schemeClr val="tx1"/>
+                  </a:solidFill>
+                  <a:latin typeface="Arial" panose="020B0604020202020204" pitchFamily="34" charset="0"/>
+                  <a:cs typeface="Arial" panose="020B0604020202020204" pitchFamily="34" charset="0"/>
+                </a:endParaRPr>
+              </a:p>
+            </p:txBody>
+          </p:sp>
+        </p:grpSp>
+        <p:cxnSp>
+          <p:nvCxnSpPr>
+            <p:cNvPr id="26" name="Elbow Connector 25"/>
+            <p:cNvCxnSpPr>
+              <a:cxnSpLocks/>
+              <a:stCxn id="10" idx="3"/>
+              <a:endCxn id="15" idx="1"/>
+            </p:cNvCxnSpPr>
+            <p:nvPr/>
+          </p:nvCxnSpPr>
+          <p:spPr>
+            <a:xfrm>
+              <a:off x="4264770" y="575857"/>
+              <a:ext cx="1014730" cy="2394408"/>
+            </a:xfrm>
+            <a:prstGeom prst="bentConnector3">
+              <a:avLst>
+                <a:gd name="adj1" fmla="val 50000"/>
+              </a:avLst>
+            </a:prstGeom>
+            <a:ln w="19050" cmpd="sng">
+              <a:solidFill>
+                <a:schemeClr val="tx1"/>
+              </a:solidFill>
+              <a:prstDash val="lgDash"/>
+              <a:tailEnd type="triangle"/>
+            </a:ln>
+            <a:effectLst/>
+          </p:spPr>
+          <p:style>
+            <a:lnRef idx="1">
+              <a:schemeClr val="accent1"/>
+            </a:lnRef>
+            <a:fillRef idx="0">
+              <a:schemeClr val="accent1"/>
+            </a:fillRef>
+            <a:effectRef idx="0">
+              <a:schemeClr val="accent1"/>
+            </a:effectRef>
+            <a:fontRef idx="minor">
+              <a:schemeClr val="tx1"/>
+            </a:fontRef>
+          </p:style>
+        </p:cxnSp>
+        <p:cxnSp>
+          <p:nvCxnSpPr>
+            <p:cNvPr id="27" name="Elbow Connector 26"/>
+            <p:cNvCxnSpPr>
+              <a:cxnSpLocks/>
+            </p:cNvCxnSpPr>
+            <p:nvPr/>
+          </p:nvCxnSpPr>
+          <p:spPr>
+            <a:xfrm flipV="1">
+              <a:off x="4274382" y="3346246"/>
+              <a:ext cx="1008000" cy="0"/>
+            </a:xfrm>
+            <a:prstGeom prst="bentConnector3">
+              <a:avLst>
+                <a:gd name="adj1" fmla="val 50000"/>
+              </a:avLst>
+            </a:prstGeom>
+            <a:ln w="19050">
+              <a:solidFill>
+                <a:schemeClr val="tx1"/>
+              </a:solidFill>
+              <a:prstDash val="lgDash"/>
+              <a:tailEnd type="triangle"/>
+            </a:ln>
+            <a:effectLst/>
+          </p:spPr>
+          <p:style>
+            <a:lnRef idx="1">
+              <a:schemeClr val="accent1"/>
+            </a:lnRef>
+            <a:fillRef idx="0">
+              <a:schemeClr val="accent1"/>
+            </a:fillRef>
+            <a:effectRef idx="0">
+              <a:schemeClr val="accent1"/>
+            </a:effectRef>
+            <a:fontRef idx="minor">
+              <a:schemeClr val="tx1"/>
+            </a:fontRef>
+          </p:style>
+        </p:cxnSp>
+        <p:cxnSp>
+          <p:nvCxnSpPr>
+            <p:cNvPr id="28" name="Straight Arrow Connector 27"/>
+            <p:cNvCxnSpPr>
+              <a:cxnSpLocks/>
+              <a:stCxn id="9" idx="2"/>
+              <a:endCxn id="13" idx="0"/>
+            </p:cNvCxnSpPr>
+            <p:nvPr/>
+          </p:nvCxnSpPr>
+          <p:spPr>
+            <a:xfrm>
+              <a:off x="3268455" y="2387415"/>
+              <a:ext cx="0" cy="753533"/>
+            </a:xfrm>
+            <a:prstGeom prst="straightConnector1">
+              <a:avLst/>
+            </a:prstGeom>
+            <a:ln w="19050">
+              <a:solidFill>
+                <a:schemeClr val="tx1"/>
+              </a:solidFill>
+              <a:prstDash val="lgDash"/>
+              <a:tailEnd type="triangle"/>
+            </a:ln>
+            <a:effectLst/>
+          </p:spPr>
+          <p:style>
+            <a:lnRef idx="1">
+              <a:schemeClr val="accent1"/>
+            </a:lnRef>
+            <a:fillRef idx="0">
+              <a:schemeClr val="accent1"/>
+            </a:fillRef>
+            <a:effectRef idx="0">
+              <a:schemeClr val="accent1"/>
+            </a:effectRef>
+            <a:fontRef idx="minor">
+              <a:schemeClr val="tx1"/>
+            </a:fontRef>
+          </p:style>
+        </p:cxnSp>
+        <p:cxnSp>
+          <p:nvCxnSpPr>
+            <p:cNvPr id="30" name="Elbow Connector 29"/>
+            <p:cNvCxnSpPr>
+              <a:cxnSpLocks/>
+              <a:stCxn id="21" idx="1"/>
+              <a:endCxn id="15" idx="3"/>
+            </p:cNvCxnSpPr>
+            <p:nvPr/>
+          </p:nvCxnSpPr>
+          <p:spPr>
+            <a:xfrm rot="10800000">
+              <a:off x="7295501" y="2970265"/>
+              <a:ext cx="809481" cy="1172"/>
+            </a:xfrm>
+            <a:prstGeom prst="bentConnector3">
+              <a:avLst/>
+            </a:prstGeom>
+            <a:ln w="19050">
+              <a:solidFill>
+                <a:schemeClr val="tx1"/>
+              </a:solidFill>
+              <a:prstDash val="solid"/>
+              <a:tailEnd type="triangle"/>
+            </a:ln>
+            <a:effectLst/>
+          </p:spPr>
+          <p:style>
+            <a:lnRef idx="1">
+              <a:schemeClr val="accent1"/>
+            </a:lnRef>
+            <a:fillRef idx="0">
+              <a:schemeClr val="accent1"/>
+            </a:fillRef>
+            <a:effectRef idx="0">
+              <a:schemeClr val="accent1"/>
+            </a:effectRef>
+            <a:fontRef idx="minor">
+              <a:schemeClr val="tx1"/>
+            </a:fontRef>
+          </p:style>
+        </p:cxnSp>
+        <p:sp>
+          <p:nvSpPr>
+            <p:cNvPr id="32" name="TextBox 31"/>
+            <p:cNvSpPr txBox="1"/>
+            <p:nvPr/>
+          </p:nvSpPr>
+          <p:spPr>
+            <a:xfrm>
+              <a:off x="4250800" y="315635"/>
+              <a:ext cx="519694" cy="292388"/>
+            </a:xfrm>
+            <a:prstGeom prst="rect">
+              <a:avLst/>
+            </a:prstGeom>
+            <a:noFill/>
+          </p:spPr>
+          <p:txBody>
+            <a:bodyPr wrap="none" rtlCol="0">
+              <a:spAutoFit/>
+            </a:bodyPr>
+            <a:lstStyle>
+              <a:defPPr>
+                <a:defRPr lang="zh-CN"/>
+              </a:defPPr>
+              <a:lvl1pPr>
+                <a:defRPr sz="1300" b="1">
+                  <a:latin typeface="Arial" panose="020B0604020202020204" pitchFamily="34" charset="0"/>
+                  <a:cs typeface="Arial" panose="020B0604020202020204" pitchFamily="34" charset="0"/>
+                </a:defRPr>
+              </a:lvl1pPr>
+            </a:lstStyle>
+            <a:p>
+              <a:r>
+                <a:rPr lang="en-US" altLang="zh-CN" dirty="0"/>
+                <a:t>own</a:t>
+              </a:r>
+              <a:endParaRPr lang="en-US" dirty="0"/>
+            </a:p>
+          </p:txBody>
+        </p:sp>
+        <p:sp>
+          <p:nvSpPr>
+            <p:cNvPr id="35" name="TextBox 34"/>
+            <p:cNvSpPr txBox="1"/>
+            <p:nvPr/>
+          </p:nvSpPr>
+          <p:spPr>
+            <a:xfrm>
+              <a:off x="7361045" y="2682265"/>
+              <a:ext cx="678391" cy="288000"/>
+            </a:xfrm>
+            <a:prstGeom prst="rect">
+              <a:avLst/>
+            </a:prstGeom>
+            <a:noFill/>
+          </p:spPr>
+          <p:txBody>
+            <a:bodyPr wrap="none" rtlCol="0">
+              <a:spAutoFit/>
+            </a:bodyPr>
+            <a:lstStyle>
+              <a:defPPr>
+                <a:defRPr lang="zh-CN"/>
+              </a:defPPr>
+              <a:lvl1pPr>
+                <a:defRPr sz="1300" b="1">
+                  <a:latin typeface="Arial" panose="020B0604020202020204" pitchFamily="34" charset="0"/>
+                  <a:cs typeface="Arial" panose="020B0604020202020204" pitchFamily="34" charset="0"/>
+                </a:defRPr>
+              </a:lvl1pPr>
+            </a:lstStyle>
+            <a:p>
+              <a:r>
+                <a:rPr lang="en-US" altLang="zh-CN" dirty="0"/>
+                <a:t>signIn</a:t>
+              </a:r>
+              <a:endParaRPr lang="en-US" dirty="0"/>
+            </a:p>
+          </p:txBody>
+        </p:sp>
+        <p:grpSp>
+          <p:nvGrpSpPr>
+            <p:cNvPr id="39" name="Group 38"/>
+            <p:cNvGrpSpPr/>
+            <p:nvPr/>
+          </p:nvGrpSpPr>
+          <p:grpSpPr>
+            <a:xfrm>
+              <a:off x="5279500" y="5125162"/>
+              <a:ext cx="2010410" cy="1511998"/>
+              <a:chOff x="2789712" y="2952363"/>
+              <a:chExt cx="2010595" cy="1511748"/>
+            </a:xfrm>
+          </p:grpSpPr>
+          <p:sp>
+            <p:nvSpPr>
+              <p:cNvPr id="40" name="Rectangle 39"/>
+              <p:cNvSpPr/>
+              <p:nvPr/>
+            </p:nvSpPr>
+            <p:spPr>
+              <a:xfrm>
+                <a:off x="2789712" y="3348296"/>
+                <a:ext cx="2010594" cy="1115815"/>
+              </a:xfrm>
+              <a:prstGeom prst="rect">
+                <a:avLst/>
+              </a:prstGeom>
+              <a:noFill/>
+              <a:ln w="22225">
+                <a:solidFill>
+                  <a:schemeClr val="tx1"/>
+                </a:solidFill>
+              </a:ln>
+            </p:spPr>
+            <p:style>
+              <a:lnRef idx="2">
+                <a:schemeClr val="accent1">
+                  <a:shade val="50000"/>
+                </a:schemeClr>
+              </a:lnRef>
+              <a:fillRef idx="1">
+                <a:schemeClr val="accent1"/>
+              </a:fillRef>
+              <a:effectRef idx="0">
+                <a:schemeClr val="accent1"/>
+              </a:effectRef>
+              <a:fontRef idx="minor">
+                <a:schemeClr val="lt1"/>
+              </a:fontRef>
+            </p:style>
+            <p:txBody>
+              <a:bodyPr rtlCol="0" anchor="ctr"/>
+              <a:lstStyle/>
+              <a:p>
+                <a:r>
+                  <a:rPr lang="en-US" altLang="zh-CN" sz="1200" dirty="0">
+                    <a:solidFill>
+                      <a:schemeClr val="tx1"/>
+                    </a:solidFill>
+                    <a:latin typeface="Arial" panose="020B0604020202020204" pitchFamily="34" charset="0"/>
+                    <a:cs typeface="Arial" panose="020B0604020202020204" pitchFamily="34" charset="0"/>
+                  </a:rPr>
+                  <a:t>id:</a:t>
+                </a:r>
+                <a:r>
+                  <a:rPr lang="zh-CN" altLang="en-US" sz="1200" dirty="0">
+                    <a:solidFill>
+                      <a:schemeClr val="tx1"/>
+                    </a:solidFill>
+                    <a:latin typeface="Arial" panose="020B0604020202020204" pitchFamily="34" charset="0"/>
+                    <a:cs typeface="Arial" panose="020B0604020202020204" pitchFamily="34" charset="0"/>
+                  </a:rPr>
+                  <a:t> </a:t>
+                </a:r>
+                <a:r>
+                  <a:rPr lang="en-US" altLang="zh-CN" sz="1200" dirty="0">
+                    <a:solidFill>
+                      <a:schemeClr val="tx1"/>
+                    </a:solidFill>
+                    <a:latin typeface="Arial" panose="020B0604020202020204" pitchFamily="34" charset="0"/>
+                    <a:cs typeface="Arial" panose="020B0604020202020204" pitchFamily="34" charset="0"/>
+                  </a:rPr>
+                  <a:t>ID</a:t>
+                </a:r>
+              </a:p>
+              <a:p>
+                <a:r>
+                  <a:rPr lang="en-US" altLang="zh-CN" sz="1200" dirty="0">
+                    <a:solidFill>
+                      <a:schemeClr val="tx1"/>
+                    </a:solidFill>
+                    <a:latin typeface="Arial" panose="020B0604020202020204" pitchFamily="34" charset="0"/>
+                    <a:cs typeface="Arial" panose="020B0604020202020204" pitchFamily="34" charset="0"/>
+                  </a:rPr>
+                  <a:t>loanAmount:</a:t>
+                </a:r>
+                <a:r>
+                  <a:rPr lang="zh-CN" altLang="en-US" sz="1200" dirty="0">
+                    <a:solidFill>
+                      <a:schemeClr val="tx1"/>
+                    </a:solidFill>
+                    <a:latin typeface="Arial" panose="020B0604020202020204" pitchFamily="34" charset="0"/>
+                    <a:cs typeface="Arial" panose="020B0604020202020204" pitchFamily="34" charset="0"/>
+                  </a:rPr>
+                  <a:t> </a:t>
+                </a:r>
+                <a:r>
+                  <a:rPr lang="en-US" altLang="zh-CN" sz="1200" dirty="0">
+                    <a:solidFill>
+                      <a:schemeClr val="tx1"/>
+                    </a:solidFill>
+                    <a:latin typeface="Arial" panose="020B0604020202020204" pitchFamily="34" charset="0"/>
+                    <a:cs typeface="Arial" panose="020B0604020202020204" pitchFamily="34" charset="0"/>
+                  </a:rPr>
+                  <a:t>64-bit</a:t>
+                </a:r>
+                <a:r>
+                  <a:rPr lang="zh-CN" altLang="en-US" sz="1200" dirty="0">
+                    <a:solidFill>
+                      <a:schemeClr val="tx1"/>
+                    </a:solidFill>
+                    <a:latin typeface="Arial" panose="020B0604020202020204" pitchFamily="34" charset="0"/>
+                    <a:cs typeface="Arial" panose="020B0604020202020204" pitchFamily="34" charset="0"/>
+                  </a:rPr>
+                  <a:t> </a:t>
+                </a:r>
+                <a:r>
+                  <a:rPr lang="en-US" altLang="zh-CN" sz="1200" dirty="0">
+                    <a:solidFill>
+                      <a:schemeClr val="tx1"/>
+                    </a:solidFill>
+                    <a:latin typeface="Arial" panose="020B0604020202020204" pitchFamily="34" charset="0"/>
+                    <a:cs typeface="Arial" panose="020B0604020202020204" pitchFamily="34" charset="0"/>
+                  </a:rPr>
+                  <a:t>Float</a:t>
+                </a:r>
+              </a:p>
+              <a:p>
+                <a:r>
+                  <a:rPr lang="en-US" sz="1200" dirty="0">
+                    <a:solidFill>
+                      <a:schemeClr val="tx1"/>
+                    </a:solidFill>
+                    <a:latin typeface="Arial" panose="020B0604020202020204" pitchFamily="34" charset="0"/>
+                    <a:cs typeface="Arial" panose="020B0604020202020204" pitchFamily="34" charset="0"/>
+                  </a:rPr>
+                  <a:t>balance: </a:t>
+                </a:r>
+                <a:r>
+                  <a:rPr lang="en-US" altLang="zh-CN" sz="1200" dirty="0">
+                    <a:solidFill>
+                      <a:schemeClr val="tx1"/>
+                    </a:solidFill>
+                    <a:latin typeface="Arial" panose="020B0604020202020204" pitchFamily="34" charset="0"/>
+                    <a:cs typeface="Arial" panose="020B0604020202020204" pitchFamily="34" charset="0"/>
+                  </a:rPr>
+                  <a:t>64-bit</a:t>
+                </a:r>
+                <a:r>
+                  <a:rPr lang="zh-CN" altLang="en-US" sz="1200" dirty="0">
+                    <a:solidFill>
+                      <a:schemeClr val="tx1"/>
+                    </a:solidFill>
+                    <a:latin typeface="Arial" panose="020B0604020202020204" pitchFamily="34" charset="0"/>
+                    <a:cs typeface="Arial" panose="020B0604020202020204" pitchFamily="34" charset="0"/>
+                  </a:rPr>
+                  <a:t> </a:t>
+                </a:r>
+                <a:r>
+                  <a:rPr lang="en-US" altLang="zh-CN" sz="1200" dirty="0">
+                    <a:solidFill>
+                      <a:schemeClr val="tx1"/>
+                    </a:solidFill>
+                    <a:latin typeface="Arial" panose="020B0604020202020204" pitchFamily="34" charset="0"/>
+                    <a:cs typeface="Arial" panose="020B0604020202020204" pitchFamily="34" charset="0"/>
+                  </a:rPr>
+                  <a:t>Float</a:t>
+                </a:r>
+              </a:p>
+              <a:p>
+                <a:r>
+                  <a:rPr lang="en-US" altLang="zh-CN" sz="1200" dirty="0">
+                    <a:solidFill>
+                      <a:schemeClr val="tx1"/>
+                    </a:solidFill>
+                    <a:latin typeface="Arial" panose="020B0604020202020204" pitchFamily="34" charset="0"/>
+                    <a:cs typeface="Arial" panose="020B0604020202020204" pitchFamily="34" charset="0"/>
+                  </a:rPr>
+                  <a:t>usage:</a:t>
+                </a:r>
+                <a:r>
+                  <a:rPr lang="zh-CN" altLang="en-US" sz="1200" dirty="0">
+                    <a:solidFill>
+                      <a:schemeClr val="tx1"/>
+                    </a:solidFill>
+                    <a:latin typeface="Arial" panose="020B0604020202020204" pitchFamily="34" charset="0"/>
+                    <a:cs typeface="Arial" panose="020B0604020202020204" pitchFamily="34" charset="0"/>
+                  </a:rPr>
+                  <a:t> </a:t>
+                </a:r>
+                <a:r>
+                  <a:rPr lang="en-US" altLang="zh-CN" sz="1200" dirty="0">
+                    <a:solidFill>
+                      <a:schemeClr val="tx1"/>
+                    </a:solidFill>
+                    <a:latin typeface="Arial" panose="020B0604020202020204" pitchFamily="34" charset="0"/>
+                    <a:cs typeface="Arial" panose="020B0604020202020204" pitchFamily="34" charset="0"/>
+                  </a:rPr>
+                  <a:t>String</a:t>
+                </a:r>
+              </a:p>
+              <a:p>
+                <a:r>
+                  <a:rPr lang="en-US" altLang="zh-CN" sz="1200" dirty="0">
+                    <a:solidFill>
+                      <a:schemeClr val="tx1"/>
+                    </a:solidFill>
+                    <a:latin typeface="Arial" panose="020B0604020202020204" pitchFamily="34" charset="0"/>
+                    <a:cs typeface="Arial" panose="020B0604020202020204" pitchFamily="34" charset="0"/>
+                  </a:rPr>
+                  <a:t>interestRate:</a:t>
+                </a:r>
+                <a:r>
+                  <a:rPr lang="zh-CN" altLang="en-US" sz="1200" dirty="0">
+                    <a:solidFill>
+                      <a:schemeClr val="tx1"/>
+                    </a:solidFill>
+                    <a:latin typeface="Arial" panose="020B0604020202020204" pitchFamily="34" charset="0"/>
+                    <a:cs typeface="Arial" panose="020B0604020202020204" pitchFamily="34" charset="0"/>
+                  </a:rPr>
+                  <a:t> </a:t>
+                </a:r>
+                <a:r>
+                  <a:rPr lang="en-US" altLang="zh-CN" sz="1200" dirty="0">
+                    <a:solidFill>
+                      <a:schemeClr val="tx1"/>
+                    </a:solidFill>
+                    <a:latin typeface="Arial" panose="020B0604020202020204" pitchFamily="34" charset="0"/>
+                    <a:cs typeface="Arial" panose="020B0604020202020204" pitchFamily="34" charset="0"/>
+                  </a:rPr>
+                  <a:t>32-bit</a:t>
+                </a:r>
+                <a:r>
+                  <a:rPr lang="zh-CN" altLang="en-US" sz="1200" dirty="0">
+                    <a:solidFill>
+                      <a:schemeClr val="tx1"/>
+                    </a:solidFill>
+                    <a:latin typeface="Arial" panose="020B0604020202020204" pitchFamily="34" charset="0"/>
+                    <a:cs typeface="Arial" panose="020B0604020202020204" pitchFamily="34" charset="0"/>
+                  </a:rPr>
+                  <a:t> </a:t>
+                </a:r>
+                <a:r>
+                  <a:rPr lang="en-US" altLang="zh-CN" sz="1200" dirty="0">
+                    <a:solidFill>
+                      <a:schemeClr val="tx1"/>
+                    </a:solidFill>
+                    <a:latin typeface="Arial" panose="020B0604020202020204" pitchFamily="34" charset="0"/>
+                    <a:cs typeface="Arial" panose="020B0604020202020204" pitchFamily="34" charset="0"/>
+                  </a:rPr>
+                  <a:t>Float</a:t>
+                </a:r>
+              </a:p>
+            </p:txBody>
+          </p:sp>
+          <p:sp>
+            <p:nvSpPr>
+              <p:cNvPr id="41" name="Rectangle 40"/>
+              <p:cNvSpPr/>
+              <p:nvPr/>
+            </p:nvSpPr>
+            <p:spPr>
+              <a:xfrm>
+                <a:off x="2789713" y="2952363"/>
+                <a:ext cx="2010594" cy="395935"/>
+              </a:xfrm>
+              <a:prstGeom prst="rect">
+                <a:avLst/>
+              </a:prstGeom>
+              <a:solidFill>
+                <a:schemeClr val="accent2">
+                  <a:lumMod val="60000"/>
+                  <a:lumOff val="40000"/>
+                </a:schemeClr>
+              </a:solidFill>
+              <a:ln w="22225">
+                <a:solidFill>
+                  <a:schemeClr val="tx1"/>
+                </a:solidFill>
+              </a:ln>
+            </p:spPr>
+            <p:style>
+              <a:lnRef idx="2">
+                <a:schemeClr val="accent1">
+                  <a:shade val="50000"/>
+                </a:schemeClr>
+              </a:lnRef>
+              <a:fillRef idx="1">
+                <a:schemeClr val="accent1"/>
+              </a:fillRef>
+              <a:effectRef idx="0">
+                <a:schemeClr val="accent1"/>
+              </a:effectRef>
+              <a:fontRef idx="minor">
+                <a:schemeClr val="lt1"/>
+              </a:fontRef>
+            </p:style>
+            <p:txBody>
+              <a:bodyPr rtlCol="0" anchor="ctr"/>
+              <a:lstStyle/>
+              <a:p>
+                <a:pPr algn="ctr"/>
+                <a:r>
+                  <a:rPr lang="en-US" altLang="zh-CN" b="1" dirty="0">
+                    <a:solidFill>
+                      <a:schemeClr val="tx1"/>
+                    </a:solidFill>
+                    <a:latin typeface="Arial" panose="020B0604020202020204" pitchFamily="34" charset="0"/>
+                    <a:cs typeface="Arial" panose="020B0604020202020204" pitchFamily="34" charset="0"/>
+                  </a:rPr>
+                  <a:t>Loan</a:t>
+                </a:r>
+                <a:endParaRPr lang="en-US" b="1" dirty="0">
+                  <a:solidFill>
+                    <a:schemeClr val="tx1"/>
+                  </a:solidFill>
+                  <a:latin typeface="Arial" panose="020B0604020202020204" pitchFamily="34" charset="0"/>
+                  <a:cs typeface="Arial" panose="020B0604020202020204" pitchFamily="34" charset="0"/>
+                </a:endParaRPr>
+              </a:p>
+            </p:txBody>
+          </p:sp>
+        </p:grpSp>
+        <p:cxnSp>
+          <p:nvCxnSpPr>
+            <p:cNvPr id="42" name="Elbow Connector 41"/>
+            <p:cNvCxnSpPr>
+              <a:cxnSpLocks/>
+            </p:cNvCxnSpPr>
+            <p:nvPr/>
+          </p:nvCxnSpPr>
+          <p:spPr>
+            <a:xfrm rot="10800000" flipH="1" flipV="1">
+              <a:off x="2272140" y="605010"/>
+              <a:ext cx="3007360" cy="5436000"/>
+            </a:xfrm>
+            <a:prstGeom prst="bentConnector3">
+              <a:avLst>
+                <a:gd name="adj1" fmla="val -30160"/>
+              </a:avLst>
+            </a:prstGeom>
+            <a:ln w="19050" cmpd="sng">
+              <a:solidFill>
+                <a:schemeClr val="tx1"/>
+              </a:solidFill>
+              <a:prstDash val="lgDash"/>
+              <a:tailEnd type="triangle"/>
+            </a:ln>
+            <a:effectLst/>
+          </p:spPr>
+          <p:style>
+            <a:lnRef idx="1">
+              <a:schemeClr val="accent1"/>
+            </a:lnRef>
+            <a:fillRef idx="0">
+              <a:schemeClr val="accent1"/>
+            </a:fillRef>
+            <a:effectRef idx="0">
+              <a:schemeClr val="accent1"/>
+            </a:effectRef>
+            <a:fontRef idx="minor">
+              <a:schemeClr val="tx1"/>
+            </a:fontRef>
+          </p:style>
+        </p:cxnSp>
+        <p:cxnSp>
+          <p:nvCxnSpPr>
+            <p:cNvPr id="43" name="Elbow Connector 42"/>
+            <p:cNvCxnSpPr>
+              <a:cxnSpLocks/>
+            </p:cNvCxnSpPr>
+            <p:nvPr/>
+          </p:nvCxnSpPr>
+          <p:spPr>
+            <a:xfrm rot="10800000" flipH="1" flipV="1">
+              <a:off x="2272140" y="3359511"/>
+              <a:ext cx="2994660" cy="2484000"/>
+            </a:xfrm>
+            <a:prstGeom prst="bentConnector3">
+              <a:avLst>
+                <a:gd name="adj1" fmla="val -25035"/>
+              </a:avLst>
+            </a:prstGeom>
+            <a:ln w="19050">
+              <a:solidFill>
+                <a:schemeClr val="tx1"/>
+              </a:solidFill>
+              <a:prstDash val="lgDash"/>
+              <a:tailEnd type="triangle"/>
+            </a:ln>
+            <a:effectLst/>
+          </p:spPr>
+          <p:style>
+            <a:lnRef idx="1">
+              <a:schemeClr val="accent1"/>
+            </a:lnRef>
+            <a:fillRef idx="0">
+              <a:schemeClr val="accent1"/>
+            </a:fillRef>
+            <a:effectRef idx="0">
+              <a:schemeClr val="accent1"/>
+            </a:effectRef>
+            <a:fontRef idx="minor">
+              <a:schemeClr val="tx1"/>
+            </a:fontRef>
+          </p:style>
+        </p:cxnSp>
+        <p:sp>
+          <p:nvSpPr>
+            <p:cNvPr id="46" name="TextBox 45"/>
+            <p:cNvSpPr txBox="1"/>
+            <p:nvPr/>
+          </p:nvSpPr>
+          <p:spPr>
+            <a:xfrm>
+              <a:off x="1491767" y="316797"/>
+              <a:ext cx="651140" cy="307777"/>
+            </a:xfrm>
+            <a:prstGeom prst="rect">
+              <a:avLst/>
+            </a:prstGeom>
+            <a:noFill/>
+          </p:spPr>
+          <p:txBody>
+            <a:bodyPr wrap="none" rtlCol="0">
+              <a:spAutoFit/>
+            </a:bodyPr>
+            <a:lstStyle>
+              <a:defPPr>
+                <a:defRPr lang="zh-CN"/>
+              </a:defPPr>
+              <a:lvl1pPr>
+                <a:defRPr sz="1300" b="1">
+                  <a:latin typeface="Arial" panose="020B0604020202020204" pitchFamily="34" charset="0"/>
+                  <a:cs typeface="Arial" panose="020B0604020202020204" pitchFamily="34" charset="0"/>
+                </a:defRPr>
+              </a:lvl1pPr>
+            </a:lstStyle>
+            <a:p>
+              <a:r>
+                <a:rPr lang="en-US" altLang="zh-CN" dirty="0"/>
+                <a:t>apply</a:t>
+              </a:r>
+              <a:endParaRPr lang="en-US" dirty="0"/>
+            </a:p>
+          </p:txBody>
+        </p:sp>
+        <p:sp>
+          <p:nvSpPr>
+            <p:cNvPr id="47" name="TextBox 46"/>
+            <p:cNvSpPr txBox="1"/>
+            <p:nvPr/>
+          </p:nvSpPr>
+          <p:spPr>
+            <a:xfrm>
+              <a:off x="1603626" y="3067587"/>
+              <a:ext cx="651140" cy="307777"/>
+            </a:xfrm>
+            <a:prstGeom prst="rect">
+              <a:avLst/>
+            </a:prstGeom>
+            <a:noFill/>
+          </p:spPr>
+          <p:txBody>
+            <a:bodyPr wrap="none" rtlCol="0">
+              <a:spAutoFit/>
+            </a:bodyPr>
+            <a:lstStyle>
+              <a:defPPr>
+                <a:defRPr lang="zh-CN"/>
+              </a:defPPr>
+              <a:lvl1pPr>
+                <a:defRPr sz="1300" b="1">
+                  <a:latin typeface="Arial" panose="020B0604020202020204" pitchFamily="34" charset="0"/>
+                  <a:cs typeface="Arial" panose="020B0604020202020204" pitchFamily="34" charset="0"/>
+                </a:defRPr>
+              </a:lvl1pPr>
+            </a:lstStyle>
+            <a:p>
+              <a:r>
+                <a:rPr lang="en-US" altLang="zh-CN" dirty="0"/>
+                <a:t>apply</a:t>
+              </a:r>
+              <a:endParaRPr lang="en-US" dirty="0"/>
+            </a:p>
+          </p:txBody>
+        </p:sp>
+        <p:cxnSp>
+          <p:nvCxnSpPr>
+            <p:cNvPr id="48" name="Straight Arrow Connector 47"/>
+            <p:cNvCxnSpPr>
+              <a:cxnSpLocks/>
+            </p:cNvCxnSpPr>
+            <p:nvPr/>
+          </p:nvCxnSpPr>
+          <p:spPr>
+            <a:xfrm flipV="1">
+              <a:off x="6403438" y="3967869"/>
+              <a:ext cx="0" cy="1152000"/>
+            </a:xfrm>
+            <a:prstGeom prst="straightConnector1">
+              <a:avLst/>
+            </a:prstGeom>
+            <a:ln w="19050">
+              <a:solidFill>
+                <a:schemeClr val="tx1"/>
+              </a:solidFill>
+              <a:prstDash val="solid"/>
+              <a:tailEnd type="triangle"/>
+            </a:ln>
+            <a:effectLst/>
+          </p:spPr>
+          <p:style>
+            <a:lnRef idx="1">
+              <a:schemeClr val="accent1"/>
+            </a:lnRef>
+            <a:fillRef idx="0">
+              <a:schemeClr val="accent1"/>
+            </a:fillRef>
+            <a:effectRef idx="0">
+              <a:schemeClr val="accent1"/>
+            </a:effectRef>
+            <a:fontRef idx="minor">
+              <a:schemeClr val="tx1"/>
+            </a:fontRef>
+          </p:style>
+        </p:cxnSp>
+        <p:sp>
+          <p:nvSpPr>
+            <p:cNvPr id="51" name="TextBox 50"/>
+            <p:cNvSpPr txBox="1"/>
+            <p:nvPr/>
+          </p:nvSpPr>
+          <p:spPr>
+            <a:xfrm>
+              <a:off x="6415012" y="4389980"/>
+              <a:ext cx="819455" cy="307777"/>
+            </a:xfrm>
+            <a:prstGeom prst="rect">
+              <a:avLst/>
+            </a:prstGeom>
+            <a:noFill/>
+          </p:spPr>
+          <p:txBody>
+            <a:bodyPr wrap="none" rtlCol="0">
+              <a:spAutoFit/>
+            </a:bodyPr>
+            <a:lstStyle>
+              <a:defPPr>
+                <a:defRPr lang="zh-CN"/>
+              </a:defPPr>
+              <a:lvl1pPr>
+                <a:defRPr sz="1300" b="1">
+                  <a:latin typeface="Arial" panose="020B0604020202020204" pitchFamily="34" charset="0"/>
+                  <a:cs typeface="Arial" panose="020B0604020202020204" pitchFamily="34" charset="0"/>
+                </a:defRPr>
+              </a:lvl1pPr>
+            </a:lstStyle>
+            <a:p>
+              <a:r>
+                <a:rPr lang="en-US" altLang="zh-CN" dirty="0"/>
+                <a:t>deposit</a:t>
+              </a:r>
+              <a:endParaRPr lang="en-US" dirty="0"/>
+            </a:p>
+          </p:txBody>
+        </p:sp>
+        <p:sp>
+          <p:nvSpPr>
+            <p:cNvPr id="54" name="TextBox 53"/>
+            <p:cNvSpPr txBox="1"/>
+            <p:nvPr/>
+          </p:nvSpPr>
+          <p:spPr>
+            <a:xfrm>
+              <a:off x="3257080" y="2594520"/>
+              <a:ext cx="700833" cy="307777"/>
+            </a:xfrm>
+            <a:prstGeom prst="rect">
+              <a:avLst/>
+            </a:prstGeom>
+            <a:noFill/>
+          </p:spPr>
+          <p:txBody>
+            <a:bodyPr wrap="none" rtlCol="0">
+              <a:spAutoFit/>
+            </a:bodyPr>
+            <a:lstStyle>
+              <a:defPPr>
+                <a:defRPr lang="zh-CN"/>
+              </a:defPPr>
+              <a:lvl1pPr>
+                <a:defRPr sz="1300" b="1">
+                  <a:latin typeface="Arial" panose="020B0604020202020204" pitchFamily="34" charset="0"/>
+                  <a:cs typeface="Arial" panose="020B0604020202020204" pitchFamily="34" charset="0"/>
+                </a:defRPr>
+              </a:lvl1pPr>
+            </a:lstStyle>
+            <a:p>
+              <a:r>
+                <a:rPr lang="en-US" altLang="zh-CN" dirty="0"/>
+                <a:t>invest</a:t>
+              </a:r>
+            </a:p>
+          </p:txBody>
+        </p:sp>
+        <p:cxnSp>
+          <p:nvCxnSpPr>
+            <p:cNvPr id="58" name="Straight Arrow Connector 57"/>
+            <p:cNvCxnSpPr>
+              <a:cxnSpLocks/>
+            </p:cNvCxnSpPr>
+            <p:nvPr/>
+          </p:nvCxnSpPr>
+          <p:spPr>
+            <a:xfrm>
+              <a:off x="6074825" y="3972945"/>
+              <a:ext cx="0" cy="1152000"/>
+            </a:xfrm>
+            <a:prstGeom prst="straightConnector1">
+              <a:avLst/>
+            </a:prstGeom>
+            <a:ln w="19050">
+              <a:solidFill>
+                <a:schemeClr val="tx1"/>
+              </a:solidFill>
+              <a:prstDash val="solid"/>
+              <a:tailEnd type="triangle"/>
+            </a:ln>
+            <a:effectLst/>
+          </p:spPr>
+          <p:style>
+            <a:lnRef idx="1">
+              <a:schemeClr val="accent1"/>
+            </a:lnRef>
+            <a:fillRef idx="0">
+              <a:schemeClr val="accent1"/>
+            </a:fillRef>
+            <a:effectRef idx="0">
+              <a:schemeClr val="accent1"/>
+            </a:effectRef>
+            <a:fontRef idx="minor">
+              <a:schemeClr val="tx1"/>
+            </a:fontRef>
+          </p:style>
+        </p:cxnSp>
+        <p:sp>
+          <p:nvSpPr>
+            <p:cNvPr id="63" name="TextBox 62"/>
+            <p:cNvSpPr txBox="1"/>
+            <p:nvPr/>
+          </p:nvSpPr>
+          <p:spPr>
+            <a:xfrm>
+              <a:off x="5469334" y="4389980"/>
+              <a:ext cx="662361" cy="307777"/>
+            </a:xfrm>
+            <a:prstGeom prst="rect">
+              <a:avLst/>
+            </a:prstGeom>
+            <a:noFill/>
+          </p:spPr>
+          <p:txBody>
+            <a:bodyPr wrap="none" rtlCol="0">
+              <a:spAutoFit/>
+            </a:bodyPr>
+            <a:lstStyle>
+              <a:defPPr>
+                <a:defRPr lang="zh-CN"/>
+              </a:defPPr>
+              <a:lvl1pPr>
+                <a:defRPr sz="1300" b="1">
+                  <a:latin typeface="Arial" panose="020B0604020202020204" pitchFamily="34" charset="0"/>
+                  <a:cs typeface="Arial" panose="020B0604020202020204" pitchFamily="34" charset="0"/>
+                </a:defRPr>
+              </a:lvl1pPr>
+            </a:lstStyle>
+            <a:p>
+              <a:r>
+                <a:rPr lang="en-US" altLang="zh-CN" dirty="0"/>
+                <a:t>repay</a:t>
+              </a:r>
+              <a:endParaRPr lang="en-US" dirty="0"/>
+            </a:p>
+          </p:txBody>
+        </p:sp>
+        <p:cxnSp>
+          <p:nvCxnSpPr>
+            <p:cNvPr id="72" name="Elbow Connector 71"/>
+            <p:cNvCxnSpPr>
+              <a:cxnSpLocks/>
+              <a:stCxn id="124" idx="0"/>
+            </p:cNvCxnSpPr>
+            <p:nvPr/>
+          </p:nvCxnSpPr>
+          <p:spPr>
+            <a:xfrm rot="16200000" flipH="1" flipV="1">
+              <a:off x="5366495" y="1491317"/>
+              <a:ext cx="602615" cy="784225"/>
+            </a:xfrm>
+            <a:prstGeom prst="bentConnector4">
+              <a:avLst>
+                <a:gd name="adj1" fmla="val -37930"/>
+                <a:gd name="adj2" fmla="val 129149"/>
+              </a:avLst>
+            </a:prstGeom>
+            <a:ln w="19050">
+              <a:solidFill>
+                <a:schemeClr val="tx1"/>
+              </a:solidFill>
+              <a:prstDash val="solid"/>
+              <a:tailEnd type="triangle"/>
+            </a:ln>
+            <a:effectLst/>
+          </p:spPr>
+          <p:style>
+            <a:lnRef idx="1">
+              <a:schemeClr val="accent1"/>
+            </a:lnRef>
+            <a:fillRef idx="0">
+              <a:schemeClr val="accent1"/>
+            </a:fillRef>
+            <a:effectRef idx="0">
+              <a:schemeClr val="accent1"/>
+            </a:effectRef>
+            <a:fontRef idx="minor">
+              <a:schemeClr val="tx1"/>
+            </a:fontRef>
+          </p:style>
+        </p:cxnSp>
+        <p:sp>
+          <p:nvSpPr>
+            <p:cNvPr id="75" name="TextBox 74"/>
+            <p:cNvSpPr txBox="1"/>
+            <p:nvPr/>
+          </p:nvSpPr>
+          <p:spPr>
+            <a:xfrm>
+              <a:off x="5119689" y="1090330"/>
+              <a:ext cx="755335" cy="276999"/>
+            </a:xfrm>
+            <a:prstGeom prst="rect">
+              <a:avLst/>
+            </a:prstGeom>
+            <a:noFill/>
+          </p:spPr>
+          <p:txBody>
+            <a:bodyPr wrap="none" rtlCol="0">
+              <a:spAutoFit/>
+            </a:bodyPr>
+            <a:lstStyle>
+              <a:defPPr>
+                <a:defRPr lang="zh-CN"/>
+              </a:defPPr>
+              <a:lvl1pPr>
+                <a:defRPr sz="1300" b="1">
+                  <a:latin typeface="Arial" panose="020B0604020202020204" pitchFamily="34" charset="0"/>
+                  <a:cs typeface="Arial" panose="020B0604020202020204" pitchFamily="34" charset="0"/>
+                </a:defRPr>
+              </a:lvl1pPr>
+            </a:lstStyle>
+            <a:p>
+              <a:r>
+                <a:rPr lang="en-US" altLang="zh-CN" dirty="0"/>
+                <a:t>transfer</a:t>
+              </a:r>
+            </a:p>
+          </p:txBody>
+        </p:sp>
+        <p:cxnSp>
+          <p:nvCxnSpPr>
+            <p:cNvPr id="84" name="Elbow Connector 83"/>
+            <p:cNvCxnSpPr>
+              <a:cxnSpLocks/>
+            </p:cNvCxnSpPr>
+            <p:nvPr/>
+          </p:nvCxnSpPr>
+          <p:spPr>
+            <a:xfrm rot="5400000" flipH="1" flipV="1">
+              <a:off x="3567199" y="4649376"/>
+              <a:ext cx="900000" cy="504000"/>
+            </a:xfrm>
+            <a:prstGeom prst="bentConnector4">
+              <a:avLst>
+                <a:gd name="adj1" fmla="val -28474"/>
+                <a:gd name="adj2" fmla="val 161112"/>
+              </a:avLst>
+            </a:prstGeom>
+            <a:ln w="19050">
+              <a:solidFill>
+                <a:schemeClr val="tx1"/>
+              </a:solidFill>
+              <a:prstDash val="lgDash"/>
+              <a:tailEnd type="triangle"/>
+            </a:ln>
+            <a:effectLst/>
+          </p:spPr>
+          <p:style>
+            <a:lnRef idx="1">
+              <a:schemeClr val="accent1"/>
+            </a:lnRef>
+            <a:fillRef idx="0">
+              <a:schemeClr val="accent1"/>
+            </a:fillRef>
+            <a:effectRef idx="0">
+              <a:schemeClr val="accent1"/>
+            </a:effectRef>
+            <a:fontRef idx="minor">
+              <a:schemeClr val="tx1"/>
+            </a:fontRef>
+          </p:style>
+        </p:cxnSp>
+        <p:sp>
+          <p:nvSpPr>
+            <p:cNvPr id="87" name="TextBox 86"/>
+            <p:cNvSpPr txBox="1"/>
+            <p:nvPr/>
+          </p:nvSpPr>
+          <p:spPr>
+            <a:xfrm>
+              <a:off x="3809814" y="5349155"/>
+              <a:ext cx="700833" cy="307777"/>
+            </a:xfrm>
+            <a:prstGeom prst="rect">
+              <a:avLst/>
+            </a:prstGeom>
+            <a:noFill/>
+          </p:spPr>
+          <p:txBody>
+            <a:bodyPr wrap="none" rtlCol="0">
+              <a:spAutoFit/>
+            </a:bodyPr>
+            <a:lstStyle>
+              <a:defPPr>
+                <a:defRPr lang="zh-CN"/>
+              </a:defPPr>
+              <a:lvl1pPr>
+                <a:defRPr sz="1300" b="1">
+                  <a:latin typeface="Arial" panose="020B0604020202020204" pitchFamily="34" charset="0"/>
+                  <a:cs typeface="Arial" panose="020B0604020202020204" pitchFamily="34" charset="0"/>
+                </a:defRPr>
+              </a:lvl1pPr>
+            </a:lstStyle>
+            <a:p>
+              <a:r>
+                <a:rPr lang="en-US" altLang="zh-CN" dirty="0"/>
+                <a:t>invest</a:t>
+              </a:r>
+            </a:p>
+          </p:txBody>
+        </p:sp>
+        <p:sp>
+          <p:nvSpPr>
+            <p:cNvPr id="69" name="TextBox 68"/>
+            <p:cNvSpPr txBox="1"/>
+            <p:nvPr/>
+          </p:nvSpPr>
+          <p:spPr>
+            <a:xfrm>
+              <a:off x="4432501" y="3082497"/>
+              <a:ext cx="542136" cy="307777"/>
+            </a:xfrm>
+            <a:prstGeom prst="rect">
+              <a:avLst/>
+            </a:prstGeom>
+            <a:noFill/>
+          </p:spPr>
+          <p:txBody>
+            <a:bodyPr wrap="none" rtlCol="0">
+              <a:spAutoFit/>
+            </a:bodyPr>
+            <a:lstStyle>
+              <a:defPPr>
+                <a:defRPr lang="zh-CN"/>
+              </a:defPPr>
+              <a:lvl1pPr>
+                <a:defRPr sz="1300" b="1">
+                  <a:latin typeface="Arial" panose="020B0604020202020204" pitchFamily="34" charset="0"/>
+                  <a:cs typeface="Arial" panose="020B0604020202020204" pitchFamily="34" charset="0"/>
+                </a:defRPr>
+              </a:lvl1pPr>
+            </a:lstStyle>
+            <a:p>
+              <a:r>
+                <a:rPr lang="en-US" altLang="zh-CN" dirty="0"/>
+                <a:t>own</a:t>
+              </a:r>
+            </a:p>
+          </p:txBody>
+        </p:sp>
+        <p:cxnSp>
+          <p:nvCxnSpPr>
+            <p:cNvPr id="73" name="Elbow Connector 72"/>
+            <p:cNvCxnSpPr>
+              <a:cxnSpLocks/>
+            </p:cNvCxnSpPr>
+            <p:nvPr/>
+          </p:nvCxnSpPr>
+          <p:spPr>
+            <a:xfrm rot="16200000" flipH="1">
+              <a:off x="6711453" y="1596065"/>
+              <a:ext cx="601345" cy="576000"/>
+            </a:xfrm>
+            <a:prstGeom prst="bentConnector4">
+              <a:avLst>
+                <a:gd name="adj1" fmla="val -38450"/>
+                <a:gd name="adj2" fmla="val 148933"/>
+              </a:avLst>
+            </a:prstGeom>
+            <a:ln w="19050">
+              <a:solidFill>
+                <a:schemeClr val="tx1"/>
+              </a:solidFill>
+              <a:prstDash val="solid"/>
+              <a:tailEnd type="triangle"/>
+            </a:ln>
+            <a:effectLst/>
+          </p:spPr>
+          <p:style>
+            <a:lnRef idx="1">
+              <a:schemeClr val="accent1"/>
+            </a:lnRef>
+            <a:fillRef idx="0">
+              <a:schemeClr val="accent1"/>
+            </a:fillRef>
+            <a:effectRef idx="0">
+              <a:schemeClr val="accent1"/>
+            </a:effectRef>
+            <a:fontRef idx="minor">
+              <a:schemeClr val="tx1"/>
+            </a:fontRef>
+          </p:style>
+        </p:cxnSp>
+        <p:sp>
+          <p:nvSpPr>
+            <p:cNvPr id="76" name="TextBox 75"/>
+            <p:cNvSpPr txBox="1"/>
+            <p:nvPr/>
+          </p:nvSpPr>
+          <p:spPr>
+            <a:xfrm>
+              <a:off x="6708755" y="1085287"/>
+              <a:ext cx="960519" cy="307777"/>
+            </a:xfrm>
+            <a:prstGeom prst="rect">
+              <a:avLst/>
+            </a:prstGeom>
+            <a:noFill/>
+          </p:spPr>
+          <p:txBody>
+            <a:bodyPr wrap="none" rtlCol="0">
+              <a:spAutoFit/>
+            </a:bodyPr>
+            <a:lstStyle>
+              <a:defPPr>
+                <a:defRPr lang="zh-CN"/>
+              </a:defPPr>
+              <a:lvl1pPr>
+                <a:defRPr sz="1300" b="1">
+                  <a:latin typeface="Arial" panose="020B0604020202020204" pitchFamily="34" charset="0"/>
+                  <a:cs typeface="Arial" panose="020B0604020202020204" pitchFamily="34" charset="0"/>
+                </a:defRPr>
+              </a:lvl1pPr>
+            </a:lstStyle>
+            <a:p>
+              <a:r>
+                <a:rPr lang="en-US" altLang="zh-CN" dirty="0"/>
+                <a:t>withdraw</a:t>
+              </a:r>
+              <a:endParaRPr lang="en-US" dirty="0"/>
+            </a:p>
+          </p:txBody>
+        </p:sp>
+        <p:cxnSp>
+          <p:nvCxnSpPr>
+            <p:cNvPr id="52" name="Elbow Connector 51"/>
+            <p:cNvCxnSpPr>
+              <a:cxnSpLocks/>
+            </p:cNvCxnSpPr>
+            <p:nvPr/>
+          </p:nvCxnSpPr>
+          <p:spPr>
+            <a:xfrm rot="16200000" flipV="1">
+              <a:off x="2110141" y="1930329"/>
+              <a:ext cx="648000" cy="324000"/>
+            </a:xfrm>
+            <a:prstGeom prst="bentConnector4">
+              <a:avLst>
+                <a:gd name="adj1" fmla="val -55407"/>
+                <a:gd name="adj2" fmla="val 286702"/>
+              </a:avLst>
+            </a:prstGeom>
+            <a:ln w="19050">
+              <a:solidFill>
+                <a:schemeClr val="tx1"/>
+              </a:solidFill>
+              <a:prstDash val="lgDash"/>
+              <a:tailEnd type="triangle"/>
+            </a:ln>
+            <a:effectLst/>
+          </p:spPr>
+          <p:style>
+            <a:lnRef idx="1">
+              <a:schemeClr val="accent1"/>
+            </a:lnRef>
+            <a:fillRef idx="0">
+              <a:schemeClr val="accent1"/>
+            </a:fillRef>
+            <a:effectRef idx="0">
+              <a:schemeClr val="accent1"/>
+            </a:effectRef>
+            <a:fontRef idx="minor">
+              <a:schemeClr val="tx1"/>
+            </a:fontRef>
+          </p:style>
+        </p:cxnSp>
+        <p:sp>
+          <p:nvSpPr>
+            <p:cNvPr id="55" name="TextBox 54"/>
+            <p:cNvSpPr txBox="1"/>
+            <p:nvPr/>
+          </p:nvSpPr>
+          <p:spPr>
+            <a:xfrm>
+              <a:off x="1623373" y="2508483"/>
+              <a:ext cx="1039067" cy="252000"/>
+            </a:xfrm>
+            <a:prstGeom prst="rect">
+              <a:avLst/>
+            </a:prstGeom>
+            <a:noFill/>
+          </p:spPr>
+          <p:txBody>
+            <a:bodyPr wrap="none" rtlCol="0">
+              <a:spAutoFit/>
+            </a:bodyPr>
+            <a:lstStyle>
+              <a:defPPr>
+                <a:defRPr lang="zh-CN"/>
+              </a:defPPr>
+              <a:lvl1pPr>
+                <a:defRPr sz="1300" b="1">
+                  <a:latin typeface="Arial" panose="020B0604020202020204" pitchFamily="34" charset="0"/>
+                  <a:cs typeface="Arial" panose="020B0604020202020204" pitchFamily="34" charset="0"/>
+                </a:defRPr>
+              </a:lvl1pPr>
+            </a:lstStyle>
+            <a:p>
+              <a:r>
+                <a:rPr lang="en-US" altLang="zh-CN" dirty="0"/>
+                <a:t>guarantee</a:t>
+              </a:r>
+            </a:p>
+          </p:txBody>
+        </p:sp>
+        <p:cxnSp>
+          <p:nvCxnSpPr>
+            <p:cNvPr id="50" name="Elbow Connector 49"/>
+            <p:cNvCxnSpPr>
+              <a:cxnSpLocks/>
+            </p:cNvCxnSpPr>
+            <p:nvPr/>
+          </p:nvCxnSpPr>
+          <p:spPr>
+            <a:xfrm rot="16200000" flipV="1">
+              <a:off x="1986231" y="4747996"/>
+              <a:ext cx="900000" cy="328181"/>
+            </a:xfrm>
+            <a:prstGeom prst="bentConnector4">
+              <a:avLst>
+                <a:gd name="adj1" fmla="val -31259"/>
+                <a:gd name="adj2" fmla="val 275996"/>
+              </a:avLst>
+            </a:prstGeom>
+            <a:ln w="19050">
+              <a:solidFill>
+                <a:schemeClr val="tx1"/>
+              </a:solidFill>
+              <a:prstDash val="lgDash"/>
+              <a:tailEnd type="triangle"/>
+            </a:ln>
+            <a:effectLst/>
+          </p:spPr>
+          <p:style>
+            <a:lnRef idx="1">
+              <a:schemeClr val="accent1"/>
+            </a:lnRef>
+            <a:fillRef idx="0">
+              <a:schemeClr val="accent1"/>
+            </a:fillRef>
+            <a:effectRef idx="0">
+              <a:schemeClr val="accent1"/>
+            </a:effectRef>
+            <a:fontRef idx="minor">
+              <a:schemeClr val="tx1"/>
+            </a:fontRef>
+          </p:style>
+        </p:cxnSp>
+        <p:sp>
+          <p:nvSpPr>
+            <p:cNvPr id="56" name="TextBox 55"/>
+            <p:cNvSpPr txBox="1"/>
+            <p:nvPr/>
+          </p:nvSpPr>
+          <p:spPr>
+            <a:xfrm>
+              <a:off x="1652638" y="5354125"/>
+              <a:ext cx="1039067" cy="307777"/>
+            </a:xfrm>
+            <a:prstGeom prst="rect">
+              <a:avLst/>
+            </a:prstGeom>
+            <a:noFill/>
+          </p:spPr>
+          <p:txBody>
+            <a:bodyPr wrap="none" rtlCol="0">
+              <a:spAutoFit/>
+            </a:bodyPr>
+            <a:lstStyle>
+              <a:defPPr>
+                <a:defRPr lang="zh-CN"/>
+              </a:defPPr>
+              <a:lvl1pPr>
+                <a:defRPr sz="1300" b="1">
+                  <a:latin typeface="Arial" panose="020B0604020202020204" pitchFamily="34" charset="0"/>
+                  <a:cs typeface="Arial" panose="020B0604020202020204" pitchFamily="34" charset="0"/>
+                </a:defRPr>
+              </a:lvl1pPr>
+            </a:lstStyle>
+            <a:p>
+              <a:r>
+                <a:rPr lang="en-US" altLang="zh-CN" dirty="0"/>
+                <a:t>guarantee</a:t>
+              </a:r>
+            </a:p>
+          </p:txBody>
+        </p:sp>
+        <p:sp>
+          <p:nvSpPr>
+            <p:cNvPr id="85" name="Oval 84"/>
+            <p:cNvSpPr/>
+            <p:nvPr/>
+          </p:nvSpPr>
+          <p:spPr>
+            <a:xfrm>
+              <a:off x="2723625" y="3825577"/>
+              <a:ext cx="17780" cy="17780"/>
+            </a:xfrm>
+            <a:prstGeom prst="ellipse">
+              <a:avLst/>
+            </a:prstGeom>
+            <a:solidFill>
+              <a:schemeClr val="tx1"/>
+            </a:solidFill>
+            <a:ln>
+              <a:noFill/>
+            </a:ln>
+          </p:spPr>
+          <p:style>
+            <a:lnRef idx="2">
+              <a:schemeClr val="accent1">
+                <a:shade val="50000"/>
+              </a:schemeClr>
+            </a:lnRef>
+            <a:fillRef idx="1">
+              <a:schemeClr val="accent1"/>
+            </a:fillRef>
+            <a:effectRef idx="0">
+              <a:schemeClr val="accent1"/>
+            </a:effectRef>
+            <a:fontRef idx="minor">
+              <a:schemeClr val="lt1"/>
+            </a:fontRef>
+          </p:style>
+          <p:txBody>
+            <a:bodyPr lIns="90000" rtlCol="0" anchor="ctr"/>
+            <a:lstStyle/>
+            <a:p>
+              <a:pPr algn="ctr"/>
+              <a:endParaRPr lang="en-US">
+                <a:latin typeface="Arial" panose="020B0604020202020204" pitchFamily="34" charset="0"/>
+                <a:cs typeface="Arial" panose="020B0604020202020204" pitchFamily="34" charset="0"/>
+              </a:endParaRPr>
+            </a:p>
+          </p:txBody>
+        </p:sp>
+        <p:sp>
+          <p:nvSpPr>
+            <p:cNvPr id="100" name="Oval 99"/>
+            <p:cNvSpPr/>
+            <p:nvPr/>
+          </p:nvSpPr>
+          <p:spPr>
+            <a:xfrm>
+              <a:off x="5269340" y="2589867"/>
+              <a:ext cx="17780" cy="17780"/>
+            </a:xfrm>
+            <a:prstGeom prst="ellipse">
+              <a:avLst/>
+            </a:prstGeom>
+            <a:solidFill>
+              <a:schemeClr val="tx1"/>
+            </a:solidFill>
+            <a:ln>
+              <a:noFill/>
+            </a:ln>
+          </p:spPr>
+          <p:style>
+            <a:lnRef idx="2">
+              <a:schemeClr val="accent1">
+                <a:shade val="50000"/>
+              </a:schemeClr>
+            </a:lnRef>
+            <a:fillRef idx="1">
+              <a:schemeClr val="accent1"/>
+            </a:fillRef>
+            <a:effectRef idx="0">
+              <a:schemeClr val="accent1"/>
+            </a:effectRef>
+            <a:fontRef idx="minor">
+              <a:schemeClr val="lt1"/>
+            </a:fontRef>
+          </p:style>
+          <p:txBody>
+            <a:bodyPr lIns="90000" rtlCol="0" anchor="ctr"/>
+            <a:lstStyle/>
+            <a:p>
+              <a:pPr algn="ctr"/>
+              <a:endParaRPr lang="en-US">
+                <a:latin typeface="Arial" panose="020B0604020202020204" pitchFamily="34" charset="0"/>
+                <a:cs typeface="Arial" panose="020B0604020202020204" pitchFamily="34" charset="0"/>
+              </a:endParaRPr>
+            </a:p>
+          </p:txBody>
+        </p:sp>
+        <p:sp>
+          <p:nvSpPr>
+            <p:cNvPr id="122" name="Oval 121"/>
+            <p:cNvSpPr/>
+            <p:nvPr/>
+          </p:nvSpPr>
+          <p:spPr>
+            <a:xfrm>
+              <a:off x="6542515" y="1580852"/>
+              <a:ext cx="17780" cy="17780"/>
+            </a:xfrm>
+            <a:prstGeom prst="ellipse">
+              <a:avLst/>
+            </a:prstGeom>
+            <a:solidFill>
+              <a:schemeClr val="tx1"/>
+            </a:solidFill>
+            <a:ln>
+              <a:noFill/>
+            </a:ln>
+          </p:spPr>
+          <p:style>
+            <a:lnRef idx="2">
+              <a:schemeClr val="accent1">
+                <a:shade val="50000"/>
+              </a:schemeClr>
+            </a:lnRef>
+            <a:fillRef idx="1">
+              <a:schemeClr val="accent1"/>
+            </a:fillRef>
+            <a:effectRef idx="0">
+              <a:schemeClr val="accent1"/>
+            </a:effectRef>
+            <a:fontRef idx="minor">
+              <a:schemeClr val="lt1"/>
+            </a:fontRef>
+          </p:style>
+          <p:txBody>
+            <a:bodyPr lIns="90000" rtlCol="0" anchor="ctr"/>
+            <a:lstStyle/>
+            <a:p>
+              <a:pPr algn="ctr"/>
+              <a:endParaRPr lang="en-US">
+                <a:latin typeface="Arial" panose="020B0604020202020204" pitchFamily="34" charset="0"/>
+                <a:cs typeface="Arial" panose="020B0604020202020204" pitchFamily="34" charset="0"/>
+              </a:endParaRPr>
+            </a:p>
+          </p:txBody>
+        </p:sp>
+        <p:sp>
+          <p:nvSpPr>
+            <p:cNvPr id="124" name="Oval 123"/>
+            <p:cNvSpPr/>
+            <p:nvPr/>
+          </p:nvSpPr>
+          <p:spPr>
+            <a:xfrm>
+              <a:off x="6051025" y="1582122"/>
+              <a:ext cx="17780" cy="17780"/>
+            </a:xfrm>
+            <a:prstGeom prst="ellipse">
+              <a:avLst/>
+            </a:prstGeom>
+            <a:solidFill>
+              <a:schemeClr val="tx1"/>
+            </a:solidFill>
+            <a:ln>
+              <a:noFill/>
+            </a:ln>
+          </p:spPr>
+          <p:style>
+            <a:lnRef idx="2">
+              <a:schemeClr val="accent1">
+                <a:shade val="50000"/>
+              </a:schemeClr>
+            </a:lnRef>
+            <a:fillRef idx="1">
+              <a:schemeClr val="accent1"/>
+            </a:fillRef>
+            <a:effectRef idx="0">
+              <a:schemeClr val="accent1"/>
+            </a:effectRef>
+            <a:fontRef idx="minor">
+              <a:schemeClr val="lt1"/>
+            </a:fontRef>
+          </p:style>
+          <p:txBody>
+            <a:bodyPr lIns="90000" rtlCol="0" anchor="ctr"/>
+            <a:lstStyle/>
+            <a:p>
+              <a:pPr algn="ctr"/>
+              <a:endParaRPr lang="en-US">
+                <a:latin typeface="Arial" panose="020B0604020202020204" pitchFamily="34" charset="0"/>
+                <a:cs typeface="Arial" panose="020B0604020202020204" pitchFamily="34" charset="0"/>
+              </a:endParaRPr>
+            </a:p>
+          </p:txBody>
+        </p:sp>
+        <p:grpSp>
+          <p:nvGrpSpPr>
+            <p:cNvPr id="3" name="组合 2"/>
+            <p:cNvGrpSpPr/>
+            <p:nvPr/>
+          </p:nvGrpSpPr>
+          <p:grpSpPr>
+            <a:xfrm>
+              <a:off x="8104981" y="5453972"/>
+              <a:ext cx="2058670" cy="1163955"/>
+              <a:chOff x="12195" y="6303"/>
+              <a:chExt cx="3242" cy="1833"/>
+            </a:xfrm>
+          </p:grpSpPr>
+          <p:sp>
+            <p:nvSpPr>
+              <p:cNvPr id="134" name="TextBox 36"/>
+              <p:cNvSpPr txBox="1">
+                <a:spLocks noChangeAspect="1"/>
+              </p:cNvSpPr>
+              <p:nvPr/>
+            </p:nvSpPr>
+            <p:spPr>
+              <a:xfrm>
+                <a:off x="13143" y="6303"/>
+                <a:ext cx="2294" cy="957"/>
+              </a:xfrm>
+              <a:prstGeom prst="rect">
+                <a:avLst/>
+              </a:prstGeom>
+              <a:noFill/>
+            </p:spPr>
+            <p:txBody>
+              <a:bodyPr wrap="square" rtlCol="0" anchor="ctr">
+                <a:noAutofit/>
+              </a:bodyPr>
+              <a:lstStyle>
+                <a:defPPr>
+                  <a:defRPr lang="en-US"/>
+                </a:defPPr>
+                <a:lvl1pPr>
+                  <a:lnSpc>
+                    <a:spcPct val="130000"/>
+                  </a:lnSpc>
+                  <a:defRPr sz="5400" b="1">
+                    <a:solidFill>
+                      <a:schemeClr val="tx1">
+                        <a:lumMod val="65000"/>
+                        <a:lumOff val="35000"/>
+                      </a:schemeClr>
+                    </a:solidFill>
+                    <a:latin typeface="Agency FB" panose="020B0503020202020204" pitchFamily="34" charset="0"/>
+                    <a:ea typeface="微软雅黑" panose="020B0503020204020204" pitchFamily="34" charset="-122"/>
+                    <a:cs typeface="Calibri" panose="020F0502020204030204" pitchFamily="34" charset="0"/>
+                  </a:defRPr>
+                </a:lvl1pPr>
+              </a:lstStyle>
+              <a:p>
+                <a:pPr>
+                  <a:lnSpc>
+                    <a:spcPct val="100000"/>
+                  </a:lnSpc>
+                  <a:defRPr/>
+                </a:pPr>
+                <a:r>
+                  <a:rPr lang="en-US" altLang="zh-CN" sz="1400" b="0" dirty="0">
+                    <a:solidFill>
+                      <a:srgbClr val="000000"/>
+                    </a:solidFill>
+                    <a:latin typeface="Arial" panose="020B0604020202020204" pitchFamily="34" charset="0"/>
+                    <a:ea typeface="Alibaba PuHuiTi R" pitchFamily="18" charset="-122"/>
+                    <a:cs typeface="Arial" panose="020B0604020202020204" pitchFamily="34" charset="0"/>
+                  </a:rPr>
+                  <a:t>Single </a:t>
+                </a:r>
+                <a:r>
+                  <a:rPr lang="en-US" sz="1400" b="0" dirty="0">
+                    <a:solidFill>
+                      <a:srgbClr val="000000"/>
+                    </a:solidFill>
+                    <a:latin typeface="Arial" panose="020B0604020202020204" pitchFamily="34" charset="0"/>
+                    <a:ea typeface="Alibaba PuHuiTi R" pitchFamily="18" charset="-122"/>
+                    <a:cs typeface="Arial" panose="020B0604020202020204" pitchFamily="34" charset="0"/>
+                  </a:rPr>
+                  <a:t>edges</a:t>
+                </a:r>
+                <a:r>
+                  <a:rPr lang="zh-CN" altLang="en-US" sz="1400" b="0" dirty="0">
+                    <a:solidFill>
+                      <a:srgbClr val="000000"/>
+                    </a:solidFill>
+                    <a:latin typeface="Arial" panose="020B0604020202020204" pitchFamily="34" charset="0"/>
+                    <a:ea typeface="Alibaba PuHuiTi R" pitchFamily="18" charset="-122"/>
+                    <a:cs typeface="Arial" panose="020B0604020202020204" pitchFamily="34" charset="0"/>
+                  </a:rPr>
+                  <a:t> </a:t>
+                </a:r>
+                <a:r>
+                  <a:rPr lang="en-US" altLang="zh-CN" sz="1400" b="0" dirty="0">
+                    <a:solidFill>
+                      <a:srgbClr val="000000"/>
+                    </a:solidFill>
+                    <a:latin typeface="Arial" panose="020B0604020202020204" pitchFamily="34" charset="0"/>
+                    <a:ea typeface="Alibaba PuHuiTi R" pitchFamily="18" charset="-122"/>
+                    <a:cs typeface="Arial" panose="020B0604020202020204" pitchFamily="34" charset="0"/>
+                  </a:rPr>
+                  <a:t>from</a:t>
+                </a:r>
+                <a:r>
+                  <a:rPr lang="zh-CN" altLang="en-US" sz="1400" b="0" dirty="0">
+                    <a:solidFill>
+                      <a:srgbClr val="000000"/>
+                    </a:solidFill>
+                    <a:latin typeface="Arial" panose="020B0604020202020204" pitchFamily="34" charset="0"/>
+                    <a:ea typeface="Alibaba PuHuiTi R" pitchFamily="18" charset="-122"/>
+                    <a:cs typeface="Arial" panose="020B0604020202020204" pitchFamily="34" charset="0"/>
+                  </a:rPr>
+                  <a:t> </a:t>
+                </a:r>
+                <a:r>
+                  <a:rPr lang="en-US" altLang="zh-CN" sz="1400" b="0" dirty="0">
+                    <a:solidFill>
+                      <a:srgbClr val="000000"/>
+                    </a:solidFill>
+                    <a:latin typeface="Arial" panose="020B0604020202020204" pitchFamily="34" charset="0"/>
+                    <a:ea typeface="Alibaba PuHuiTi R" pitchFamily="18" charset="-122"/>
+                    <a:cs typeface="Arial" panose="020B0604020202020204" pitchFamily="34" charset="0"/>
+                  </a:rPr>
+                  <a:t>src</a:t>
+                </a:r>
+                <a:r>
+                  <a:rPr lang="zh-CN" altLang="en-US" sz="1400" b="0" dirty="0">
+                    <a:solidFill>
+                      <a:srgbClr val="000000"/>
+                    </a:solidFill>
+                    <a:latin typeface="Arial" panose="020B0604020202020204" pitchFamily="34" charset="0"/>
+                    <a:ea typeface="Alibaba PuHuiTi R" pitchFamily="18" charset="-122"/>
+                    <a:cs typeface="Arial" panose="020B0604020202020204" pitchFamily="34" charset="0"/>
+                  </a:rPr>
+                  <a:t> </a:t>
+                </a:r>
+                <a:r>
+                  <a:rPr lang="en-US" altLang="zh-CN" sz="1400" b="0" dirty="0">
+                    <a:solidFill>
+                      <a:srgbClr val="000000"/>
+                    </a:solidFill>
+                    <a:latin typeface="Arial" panose="020B0604020202020204" pitchFamily="34" charset="0"/>
+                    <a:ea typeface="Alibaba PuHuiTi R" pitchFamily="18" charset="-122"/>
+                    <a:cs typeface="Arial" panose="020B0604020202020204" pitchFamily="34" charset="0"/>
+                  </a:rPr>
+                  <a:t>to</a:t>
+                </a:r>
+                <a:r>
+                  <a:rPr lang="zh-CN" altLang="en-US" sz="1400" b="0" dirty="0">
+                    <a:solidFill>
+                      <a:srgbClr val="000000"/>
+                    </a:solidFill>
+                    <a:latin typeface="Arial" panose="020B0604020202020204" pitchFamily="34" charset="0"/>
+                    <a:ea typeface="Alibaba PuHuiTi R" pitchFamily="18" charset="-122"/>
+                    <a:cs typeface="Arial" panose="020B0604020202020204" pitchFamily="34" charset="0"/>
+                  </a:rPr>
+                  <a:t> </a:t>
+                </a:r>
+                <a:r>
+                  <a:rPr lang="en-US" altLang="zh-CN" sz="1400" b="0" dirty="0">
+                    <a:solidFill>
+                      <a:srgbClr val="000000"/>
+                    </a:solidFill>
+                    <a:latin typeface="Arial" panose="020B0604020202020204" pitchFamily="34" charset="0"/>
+                    <a:ea typeface="Alibaba PuHuiTi R" pitchFamily="18" charset="-122"/>
+                    <a:cs typeface="Arial" panose="020B0604020202020204" pitchFamily="34" charset="0"/>
+                  </a:rPr>
+                  <a:t>dst</a:t>
+                </a:r>
+                <a:endParaRPr kumimoji="0" lang="zh-CN" altLang="en-US" sz="1400" b="0" u="none" strike="noStrike" kern="0" cap="none" spc="0" normalizeH="0" baseline="0" noProof="0" dirty="0">
+                  <a:ln>
+                    <a:noFill/>
+                  </a:ln>
+                  <a:solidFill>
+                    <a:srgbClr val="000000"/>
+                  </a:solidFill>
+                  <a:effectLst/>
+                  <a:uLnTx/>
+                  <a:uFillTx/>
+                  <a:latin typeface="Arial" panose="020B0604020202020204" pitchFamily="34" charset="0"/>
+                  <a:ea typeface="Alibaba PuHuiTi R" pitchFamily="18" charset="-122"/>
+                  <a:cs typeface="Arial" panose="020B0604020202020204" pitchFamily="34" charset="0"/>
+                  <a:sym typeface="Helvetica Light"/>
+                </a:endParaRPr>
+              </a:p>
+            </p:txBody>
+          </p:sp>
+          <p:cxnSp>
+            <p:nvCxnSpPr>
+              <p:cNvPr id="135" name="Straight Arrow Connector 134"/>
+              <p:cNvCxnSpPr/>
+              <p:nvPr/>
+            </p:nvCxnSpPr>
+            <p:spPr>
+              <a:xfrm>
+                <a:off x="12195" y="6781"/>
+                <a:ext cx="850" cy="0"/>
+              </a:xfrm>
+              <a:prstGeom prst="straightConnector1">
+                <a:avLst/>
+              </a:prstGeom>
+              <a:noFill/>
+              <a:ln w="25400" cap="flat">
+                <a:solidFill>
+                  <a:srgbClr val="000000"/>
+                </a:solidFill>
+                <a:prstDash val="lgDash"/>
+                <a:miter lim="400000"/>
+                <a:tailEnd type="triangle"/>
+              </a:ln>
+              <a:effectLst/>
+            </p:spPr>
+            <p:style>
+              <a:lnRef idx="0">
+                <a:scrgbClr r="0" g="0" b="0"/>
+              </a:lnRef>
+              <a:fillRef idx="0">
+                <a:scrgbClr r="0" g="0" b="0"/>
+              </a:fillRef>
+              <a:effectRef idx="0">
+                <a:scrgbClr r="0" g="0" b="0"/>
+              </a:effectRef>
+              <a:fontRef idx="none"/>
+            </p:style>
+          </p:cxnSp>
+          <p:cxnSp>
+            <p:nvCxnSpPr>
+              <p:cNvPr id="136" name="Straight Arrow Connector 135"/>
+              <p:cNvCxnSpPr/>
+              <p:nvPr/>
+            </p:nvCxnSpPr>
+            <p:spPr>
+              <a:xfrm>
+                <a:off x="12195" y="7658"/>
+                <a:ext cx="850" cy="0"/>
+              </a:xfrm>
+              <a:prstGeom prst="straightConnector1">
+                <a:avLst/>
+              </a:prstGeom>
+              <a:noFill/>
+              <a:ln w="25400" cap="flat">
+                <a:solidFill>
+                  <a:srgbClr val="000000"/>
+                </a:solidFill>
+                <a:prstDash val="solid"/>
+                <a:miter lim="400000"/>
+                <a:tailEnd type="triangle"/>
+              </a:ln>
+              <a:effectLst/>
+            </p:spPr>
+            <p:style>
+              <a:lnRef idx="0">
+                <a:scrgbClr r="0" g="0" b="0"/>
+              </a:lnRef>
+              <a:fillRef idx="0">
+                <a:scrgbClr r="0" g="0" b="0"/>
+              </a:fillRef>
+              <a:effectRef idx="0">
+                <a:scrgbClr r="0" g="0" b="0"/>
+              </a:effectRef>
+              <a:fontRef idx="none"/>
+            </p:style>
+          </p:cxnSp>
+          <p:sp>
+            <p:nvSpPr>
+              <p:cNvPr id="137" name="TextBox 36"/>
+              <p:cNvSpPr txBox="1">
+                <a:spLocks noChangeAspect="1"/>
+              </p:cNvSpPr>
+              <p:nvPr/>
+            </p:nvSpPr>
+            <p:spPr>
+              <a:xfrm>
+                <a:off x="13143" y="7179"/>
+                <a:ext cx="2294" cy="957"/>
+              </a:xfrm>
+              <a:prstGeom prst="rect">
+                <a:avLst/>
+              </a:prstGeom>
+              <a:noFill/>
+            </p:spPr>
+            <p:txBody>
+              <a:bodyPr wrap="square" rtlCol="0" anchor="ctr">
+                <a:noAutofit/>
+              </a:bodyPr>
+              <a:lstStyle>
+                <a:defPPr>
+                  <a:defRPr lang="en-US"/>
+                </a:defPPr>
+                <a:lvl1pPr>
+                  <a:lnSpc>
+                    <a:spcPct val="130000"/>
+                  </a:lnSpc>
+                  <a:defRPr sz="5400" b="1">
+                    <a:solidFill>
+                      <a:schemeClr val="tx1">
+                        <a:lumMod val="65000"/>
+                        <a:lumOff val="35000"/>
+                      </a:schemeClr>
+                    </a:solidFill>
+                    <a:latin typeface="Agency FB" panose="020B0503020202020204" pitchFamily="34" charset="0"/>
+                    <a:ea typeface="微软雅黑" panose="020B0503020204020204" pitchFamily="34" charset="-122"/>
+                    <a:cs typeface="Calibri" panose="020F0502020204030204" pitchFamily="34" charset="0"/>
+                  </a:defRPr>
+                </a:lvl1pPr>
+              </a:lstStyle>
+              <a:p>
+                <a:pPr>
+                  <a:lnSpc>
+                    <a:spcPct val="100000"/>
+                  </a:lnSpc>
+                  <a:defRPr/>
+                </a:pPr>
+                <a:r>
+                  <a:rPr lang="en-US" sz="1400" b="0" dirty="0">
+                    <a:solidFill>
+                      <a:srgbClr val="000000"/>
+                    </a:solidFill>
+                    <a:latin typeface="Arial" panose="020B0604020202020204" pitchFamily="34" charset="0"/>
+                    <a:ea typeface="Alibaba PuHuiTi R" pitchFamily="18" charset="-122"/>
+                    <a:cs typeface="Arial" panose="020B0604020202020204" pitchFamily="34" charset="0"/>
+                  </a:rPr>
+                  <a:t>Multiple edges</a:t>
+                </a:r>
+                <a:r>
+                  <a:rPr lang="zh-CN" altLang="en-US" sz="1400" b="0" dirty="0">
+                    <a:solidFill>
+                      <a:srgbClr val="000000"/>
+                    </a:solidFill>
+                    <a:latin typeface="Arial" panose="020B0604020202020204" pitchFamily="34" charset="0"/>
+                    <a:ea typeface="Alibaba PuHuiTi R" pitchFamily="18" charset="-122"/>
+                    <a:cs typeface="Arial" panose="020B0604020202020204" pitchFamily="34" charset="0"/>
+                  </a:rPr>
+                  <a:t> </a:t>
+                </a:r>
+                <a:r>
+                  <a:rPr lang="en-US" altLang="zh-CN" sz="1400" b="0" dirty="0">
+                    <a:solidFill>
+                      <a:srgbClr val="000000"/>
+                    </a:solidFill>
+                    <a:latin typeface="Arial" panose="020B0604020202020204" pitchFamily="34" charset="0"/>
+                    <a:ea typeface="Alibaba PuHuiTi R" pitchFamily="18" charset="-122"/>
+                    <a:cs typeface="Arial" panose="020B0604020202020204" pitchFamily="34" charset="0"/>
+                  </a:rPr>
+                  <a:t>from</a:t>
+                </a:r>
+                <a:r>
+                  <a:rPr lang="zh-CN" altLang="en-US" sz="1400" b="0" dirty="0">
+                    <a:solidFill>
+                      <a:srgbClr val="000000"/>
+                    </a:solidFill>
+                    <a:latin typeface="Arial" panose="020B0604020202020204" pitchFamily="34" charset="0"/>
+                    <a:ea typeface="Alibaba PuHuiTi R" pitchFamily="18" charset="-122"/>
+                    <a:cs typeface="Arial" panose="020B0604020202020204" pitchFamily="34" charset="0"/>
+                  </a:rPr>
+                  <a:t> </a:t>
+                </a:r>
+                <a:r>
+                  <a:rPr lang="en-US" altLang="zh-CN" sz="1400" b="0" dirty="0">
+                    <a:solidFill>
+                      <a:srgbClr val="000000"/>
+                    </a:solidFill>
+                    <a:latin typeface="Arial" panose="020B0604020202020204" pitchFamily="34" charset="0"/>
+                    <a:ea typeface="Alibaba PuHuiTi R" pitchFamily="18" charset="-122"/>
+                    <a:cs typeface="Arial" panose="020B0604020202020204" pitchFamily="34" charset="0"/>
+                  </a:rPr>
+                  <a:t>src</a:t>
+                </a:r>
+                <a:r>
+                  <a:rPr lang="zh-CN" altLang="en-US" sz="1400" b="0" dirty="0">
+                    <a:solidFill>
+                      <a:srgbClr val="000000"/>
+                    </a:solidFill>
+                    <a:latin typeface="Arial" panose="020B0604020202020204" pitchFamily="34" charset="0"/>
+                    <a:ea typeface="Alibaba PuHuiTi R" pitchFamily="18" charset="-122"/>
+                    <a:cs typeface="Arial" panose="020B0604020202020204" pitchFamily="34" charset="0"/>
+                  </a:rPr>
+                  <a:t> </a:t>
+                </a:r>
+                <a:r>
+                  <a:rPr lang="en-US" altLang="zh-CN" sz="1400" b="0" dirty="0">
+                    <a:solidFill>
+                      <a:srgbClr val="000000"/>
+                    </a:solidFill>
+                    <a:latin typeface="Arial" panose="020B0604020202020204" pitchFamily="34" charset="0"/>
+                    <a:ea typeface="Alibaba PuHuiTi R" pitchFamily="18" charset="-122"/>
+                    <a:cs typeface="Arial" panose="020B0604020202020204" pitchFamily="34" charset="0"/>
+                  </a:rPr>
+                  <a:t>to</a:t>
+                </a:r>
+                <a:r>
+                  <a:rPr lang="zh-CN" altLang="en-US" sz="1400" b="0" dirty="0">
+                    <a:solidFill>
+                      <a:srgbClr val="000000"/>
+                    </a:solidFill>
+                    <a:latin typeface="Arial" panose="020B0604020202020204" pitchFamily="34" charset="0"/>
+                    <a:ea typeface="Alibaba PuHuiTi R" pitchFamily="18" charset="-122"/>
+                    <a:cs typeface="Arial" panose="020B0604020202020204" pitchFamily="34" charset="0"/>
+                  </a:rPr>
+                  <a:t> </a:t>
+                </a:r>
+                <a:r>
+                  <a:rPr lang="en-US" altLang="zh-CN" sz="1400" b="0" dirty="0">
+                    <a:solidFill>
+                      <a:srgbClr val="000000"/>
+                    </a:solidFill>
+                    <a:latin typeface="Arial" panose="020B0604020202020204" pitchFamily="34" charset="0"/>
+                    <a:ea typeface="Alibaba PuHuiTi R" pitchFamily="18" charset="-122"/>
+                    <a:cs typeface="Arial" panose="020B0604020202020204" pitchFamily="34" charset="0"/>
+                  </a:rPr>
+                  <a:t>dst</a:t>
+                </a:r>
+                <a:endParaRPr kumimoji="0" lang="zh-CN" altLang="en-US" sz="1400" b="0" u="none" strike="noStrike" kern="0" cap="none" spc="0" normalizeH="0" baseline="0" noProof="0" dirty="0">
+                  <a:ln>
+                    <a:noFill/>
+                  </a:ln>
+                  <a:solidFill>
+                    <a:srgbClr val="000000"/>
+                  </a:solidFill>
+                  <a:effectLst/>
+                  <a:uLnTx/>
+                  <a:uFillTx/>
+                  <a:latin typeface="Arial" panose="020B0604020202020204" pitchFamily="34" charset="0"/>
+                  <a:ea typeface="Alibaba PuHuiTi R" pitchFamily="18" charset="-122"/>
+                  <a:cs typeface="Arial" panose="020B0604020202020204" pitchFamily="34" charset="0"/>
+                  <a:sym typeface="Helvetica Light"/>
+                </a:endParaRPr>
+              </a:p>
+            </p:txBody>
+          </p:sp>
+        </p:grpSp>
+      </p:grpSp>
+    </p:spTree>
+    <p:extLst>
+      <p:ext uri="{BB962C8B-B14F-4D97-AF65-F5344CB8AC3E}">
+        <p14:creationId xmlns:p14="http://schemas.microsoft.com/office/powerpoint/2010/main" val="703878611"/>
+      </p:ext>
+    </p:extLst>
+  </p:cSld>
+  <p:clrMapOvr>
+    <a:masterClrMapping/>
+  </p:clrMapOvr>
+</p:sld>
+</file>
+
+<file path=ppt/slides/slide2.xml><?xml version="1.0" encoding="utf-8"?>
+<p:sld xmlns:a="http://schemas.openxmlformats.org/drawingml/2006/main" xmlns:r="http://schemas.openxmlformats.org/officeDocument/2006/relationships" xmlns:p="http://schemas.openxmlformats.org/presentationml/2006/main">
+  <p:cSld>
+    <p:spTree>
+      <p:nvGrpSpPr>
+        <p:cNvPr id="1" name=""/>
+        <p:cNvGrpSpPr/>
+        <p:nvPr/>
+      </p:nvGrpSpPr>
+      <p:grpSpPr>
+        <a:xfrm>
+          <a:off x="0" y="0"/>
+          <a:ext cx="0" cy="0"/>
+          <a:chOff x="0" y="0"/>
+          <a:chExt cx="0" cy="0"/>
+        </a:xfrm>
+      </p:grpSpPr>
+      <p:grpSp>
+        <p:nvGrpSpPr>
           <p:cNvPr id="65" name="Group 64">
             <a:extLst>
               <a:ext uri="{FF2B5EF4-FFF2-40B4-BE49-F238E27FC236}">
@@ -2611,20 +6413,12 @@
               </a:p>
               <a:p>
                 <a:r>
-                  <a:rPr lang="en-US" altLang="zh-CN" sz="1000" dirty="0" err="1">
-                    <a:solidFill>
-                      <a:schemeClr val="tx1"/>
-                    </a:solidFill>
-                  </a:rPr>
-                  <a:t>isBlocked</a:t>
-                </a:r>
-                <a:r>
                   <a:rPr lang="en-US" altLang="zh-CN" sz="1000" dirty="0">
                     <a:solidFill>
                       <a:schemeClr val="tx1"/>
                     </a:solidFill>
                   </a:rPr>
-                  <a:t>:</a:t>
+                  <a:t>isBlocked:</a:t>
                 </a:r>
                 <a:r>
                   <a:rPr lang="zh-CN" altLang="en-US" sz="1000" dirty="0">
@@ -2645,20 +6439,12 @@
               </a:p>
               <a:p>
                 <a:r>
-                  <a:rPr lang="en-US" altLang="zh-CN" sz="1000" dirty="0" err="1">
-                    <a:solidFill>
-                      <a:schemeClr val="tx1"/>
-                    </a:solidFill>
-                  </a:rPr>
-                  <a:t>createTime</a:t>
-                </a:r>
-                <a:r>
                   <a:rPr lang="en-US" altLang="zh-CN" sz="1000" dirty="0">
                     <a:solidFill>
                       <a:schemeClr val="tx1"/>
                     </a:solidFill>
                   </a:rPr>
-                  <a:t>:</a:t>
+                  <a:t>createTime:</a:t>
                 </a:r>
                 <a:r>
                   <a:rPr lang="zh-CN" altLang="en-US" sz="1000" dirty="0">
@@ -2669,18 +6455,13 @@
                   <a:t> </a:t>
                 </a:r>
                 <a:r>
-                  <a:rPr lang="en-US" altLang="zh-CN" sz="1000" dirty="0" err="1">
+                  <a:rPr lang="en-US" altLang="zh-CN" sz="1000" dirty="0">
                     <a:solidFill>
                       <a:schemeClr val="tx1"/>
                     </a:solidFill>
                   </a:rPr>
                   <a:t>DateTime</a:t>
                 </a:r>
-                <a:endParaRPr lang="en-US" altLang="zh-CN" sz="1000" dirty="0">
-                  <a:solidFill>
-                    <a:schemeClr val="tx1"/>
-                  </a:solidFill>
-                </a:endParaRPr>
               </a:p>
               <a:p>
                 <a:r>
@@ -2946,20 +6727,12 @@
             </a:p>
             <a:p>
               <a:r>
-                <a:rPr lang="en-US" altLang="zh-CN" sz="1000" dirty="0" err="1">
-                  <a:solidFill>
-                    <a:schemeClr val="tx1"/>
-                  </a:solidFill>
-                </a:rPr>
-                <a:t>isBlocked</a:t>
-              </a:r>
-              <a:r>
                 <a:rPr lang="en-US" altLang="zh-CN" sz="1000" dirty="0">
                   <a:solidFill>
                     <a:schemeClr val="tx1"/>
                   </a:solidFill>
                 </a:rPr>
-                <a:t>:</a:t>
+                <a:t>isBlocked:</a:t>
               </a:r>
               <a:r>
                 <a:rPr lang="zh-CN" altLang="en-US" sz="1000" dirty="0">
@@ -2980,20 +6753,12 @@
             </a:p>
             <a:p>
               <a:r>
-                <a:rPr lang="en-US" altLang="zh-CN" sz="1000" dirty="0" err="1">
-                  <a:solidFill>
-                    <a:schemeClr val="tx1"/>
-                  </a:solidFill>
-                </a:rPr>
-                <a:t>createTime</a:t>
-              </a:r>
-              <a:r>
                 <a:rPr lang="en-US" altLang="zh-CN" sz="1000" dirty="0">
                   <a:solidFill>
                     <a:schemeClr val="tx1"/>
                   </a:solidFill>
                 </a:rPr>
-                <a:t>:</a:t>
+                <a:t>createTime:</a:t>
               </a:r>
               <a:r>
                 <a:rPr lang="zh-CN" altLang="en-US" sz="1000" dirty="0">
@@ -3004,18 +6769,13 @@
                 <a:t> </a:t>
               </a:r>
               <a:r>
-                <a:rPr lang="en-US" altLang="zh-CN" sz="1000" dirty="0" err="1">
+                <a:rPr lang="en-US" altLang="zh-CN" sz="1000" dirty="0">
                   <a:solidFill>
                     <a:schemeClr val="tx1"/>
                   </a:solidFill>
                 </a:rPr>
                 <a:t>DateTime</a:t>
               </a:r>
-              <a:endParaRPr lang="en-US" altLang="zh-CN" sz="1000" dirty="0">
-                <a:solidFill>
-                  <a:schemeClr val="tx1"/>
-                </a:solidFill>
-              </a:endParaRPr>
             </a:p>
             <a:p>
               <a:r>
@@ -3307,7 +7067,7 @@
               </a:p>
               <a:p>
                 <a:r>
-                  <a:rPr lang="en-US" sz="1000" dirty="0" err="1">
+                  <a:rPr lang="en-US" sz="1000" dirty="0">
                     <a:solidFill>
                       <a:schemeClr val="tx1"/>
                     </a:solidFill>
@@ -3315,20 +7075,12 @@
                   <a:t>cr</a:t>
                 </a:r>
                 <a:r>
-                  <a:rPr lang="en-US" altLang="zh-CN" sz="1000" dirty="0" err="1">
-                    <a:solidFill>
-                      <a:schemeClr val="tx1"/>
-                    </a:solidFill>
-                  </a:rPr>
-                  <a:t>eateTime</a:t>
-                </a:r>
-                <a:r>
                   <a:rPr lang="en-US" altLang="zh-CN" sz="1000" dirty="0">
                     <a:solidFill>
                       <a:schemeClr val="tx1"/>
                     </a:solidFill>
                   </a:rPr>
-                  <a:t>:</a:t>
+                  <a:t>eateTime:</a:t>
                 </a:r>
                 <a:r>
                   <a:rPr lang="zh-CN" altLang="en-US" sz="1000" dirty="0">
@@ -3339,35 +7091,22 @@
                   <a:t> </a:t>
                 </a:r>
                 <a:r>
-                  <a:rPr lang="en-US" altLang="zh-CN" sz="1000" dirty="0" err="1">
+                  <a:rPr lang="en-US" altLang="zh-CN" sz="1000" dirty="0">
                     <a:solidFill>
                       <a:schemeClr val="tx1"/>
                     </a:solidFill>
                   </a:rPr>
                   <a:t>DateTime</a:t>
                 </a:r>
-                <a:endParaRPr lang="en-US" altLang="zh-CN" sz="1000" dirty="0">
-                  <a:solidFill>
-                    <a:schemeClr val="tx1"/>
-                  </a:solidFill>
-                </a:endParaRPr>
               </a:p>
               <a:p>
                 <a:r>
-                  <a:rPr lang="en-US" altLang="zh-CN" sz="1000" dirty="0" err="1">
-                    <a:solidFill>
-                      <a:schemeClr val="tx1"/>
-                    </a:solidFill>
-                  </a:rPr>
-                  <a:t>isBlocked</a:t>
-                </a:r>
-                <a:r>
                   <a:rPr lang="en-US" altLang="zh-CN" sz="1000" dirty="0">
                     <a:solidFill>
                       <a:schemeClr val="tx1"/>
                     </a:solidFill>
                   </a:rPr>
-                  <a:t>:</a:t>
+                  <a:t>isBlocked:</a:t>
                 </a:r>
                 <a:r>
                   <a:rPr lang="zh-CN" altLang="en-US" sz="1000" dirty="0">
@@ -3456,20 +7195,12 @@
               </a:p>
               <a:p>
                 <a:r>
-                  <a:rPr lang="en-US" altLang="zh-CN" sz="1000" dirty="0" err="1">
-                    <a:solidFill>
-                      <a:schemeClr val="tx1"/>
-                    </a:solidFill>
-                  </a:rPr>
-                  <a:t>phoneNumber</a:t>
-                </a:r>
-                <a:r>
                   <a:rPr lang="en-US" altLang="zh-CN" sz="1000" dirty="0">
                     <a:solidFill>
                       <a:schemeClr val="tx1"/>
                     </a:solidFill>
                   </a:rPr>
-                  <a:t>:</a:t>
+                  <a:t>phoneNumber:</a:t>
                 </a:r>
                 <a:r>
                   <a:rPr lang="zh-CN" altLang="en-US" sz="1000" dirty="0">
@@ -3532,20 +7263,12 @@
               </a:p>
               <a:p>
                 <a:r>
-                  <a:rPr lang="en-US" altLang="zh-CN" sz="1000" dirty="0" err="1">
-                    <a:solidFill>
-                      <a:schemeClr val="tx1"/>
-                    </a:solidFill>
-                  </a:rPr>
-                  <a:t>freqLoginType</a:t>
-                </a:r>
-                <a:r>
                   <a:rPr lang="en-US" altLang="zh-CN" sz="1000" dirty="0">
                     <a:solidFill>
                       <a:schemeClr val="tx1"/>
                     </a:solidFill>
                   </a:rPr>
-                  <a:t>:</a:t>
+                  <a:t>freqLoginType:</a:t>
                 </a:r>
                 <a:r>
                   <a:rPr lang="zh-CN" altLang="en-US" sz="1000" dirty="0">
@@ -3566,20 +7289,12 @@
               </a:p>
               <a:p>
                 <a:r>
-                  <a:rPr lang="en-US" altLang="zh-CN" sz="1000" dirty="0" err="1">
-                    <a:solidFill>
-                      <a:schemeClr val="tx1"/>
-                    </a:solidFill>
-                  </a:rPr>
-                  <a:t>lastLoginTime</a:t>
-                </a:r>
-                <a:r>
                   <a:rPr lang="en-US" altLang="zh-CN" sz="1000" dirty="0">
                     <a:solidFill>
                       <a:schemeClr val="tx1"/>
                     </a:solidFill>
                   </a:rPr>
-                  <a:t>:</a:t>
+                  <a:t>lastLoginTime:</a:t>
                 </a:r>
                 <a:r>
                   <a:rPr lang="zh-CN" altLang="en-US" sz="1000" dirty="0">
@@ -3590,35 +7305,22 @@
                   <a:t> </a:t>
                 </a:r>
                 <a:r>
-                  <a:rPr lang="en-US" altLang="zh-CN" sz="1000" dirty="0" err="1">
+                  <a:rPr lang="en-US" altLang="zh-CN" sz="1000" dirty="0">
                     <a:solidFill>
                       <a:schemeClr val="tx1"/>
                     </a:solidFill>
                   </a:rPr>
                   <a:t>DateTime</a:t>
                 </a:r>
-                <a:endParaRPr lang="en-US" altLang="zh-CN" sz="1000" dirty="0">
-                  <a:solidFill>
-                    <a:schemeClr val="tx1"/>
-                  </a:solidFill>
-                </a:endParaRPr>
               </a:p>
               <a:p>
                 <a:r>
-                  <a:rPr lang="en-US" altLang="zh-CN" sz="1000" dirty="0" err="1">
-                    <a:solidFill>
-                      <a:schemeClr val="tx1"/>
-                    </a:solidFill>
-                  </a:rPr>
-                  <a:t>accountLevel</a:t>
-                </a:r>
-                <a:r>
                   <a:rPr lang="en-US" altLang="zh-CN" sz="1000" dirty="0">
                     <a:solidFill>
                       <a:schemeClr val="tx1"/>
                     </a:solidFill>
                   </a:rPr>
-                  <a:t>:</a:t>
+                  <a:t>accountLevel:</a:t>
                 </a:r>
                 <a:r>
                   <a:rPr lang="zh-CN" altLang="en-US" sz="1000" dirty="0">
@@ -3811,20 +7513,12 @@
               </a:p>
               <a:p>
                 <a:r>
-                  <a:rPr lang="en-US" altLang="zh-CN" sz="1000" dirty="0" err="1">
-                    <a:solidFill>
-                      <a:schemeClr val="tx1"/>
-                    </a:solidFill>
-                  </a:rPr>
-                  <a:t>createTime</a:t>
-                </a:r>
-                <a:r>
                   <a:rPr lang="en-US" altLang="zh-CN" sz="1000" dirty="0">
                     <a:solidFill>
                       <a:schemeClr val="tx1"/>
                     </a:solidFill>
                   </a:rPr>
-                  <a:t>:</a:t>
+                  <a:t>createTime:</a:t>
                 </a:r>
                 <a:r>
                   <a:rPr lang="zh-CN" altLang="en-US" sz="1000" dirty="0">
@@ -3835,35 +7529,22 @@
                   <a:t> </a:t>
                 </a:r>
                 <a:r>
-                  <a:rPr lang="en-US" altLang="zh-CN" sz="1000" dirty="0" err="1">
+                  <a:rPr lang="en-US" altLang="zh-CN" sz="1000" dirty="0">
                     <a:solidFill>
                       <a:schemeClr val="tx1"/>
                     </a:solidFill>
                   </a:rPr>
                   <a:t>DateTime</a:t>
                 </a:r>
-                <a:endParaRPr lang="en-US" altLang="zh-CN" sz="1000" dirty="0">
-                  <a:solidFill>
-                    <a:schemeClr val="tx1"/>
-                  </a:solidFill>
-                </a:endParaRPr>
               </a:p>
               <a:p>
                 <a:r>
-                  <a:rPr lang="en-US" altLang="zh-CN" sz="1000" dirty="0" err="1">
-                    <a:solidFill>
-                      <a:schemeClr val="tx1"/>
-                    </a:solidFill>
-                  </a:rPr>
-                  <a:t>isBlocked</a:t>
-                </a:r>
-                <a:r>
                   <a:rPr lang="en-US" altLang="zh-CN" sz="1000" dirty="0">
                     <a:solidFill>
                       <a:schemeClr val="tx1"/>
                     </a:solidFill>
                   </a:rPr>
-                  <a:t>:</a:t>
+                  <a:t>isBlocked:</a:t>
                 </a:r>
                 <a:r>
                   <a:rPr lang="zh-CN" altLang="en-US" sz="1000" dirty="0">
@@ -3884,20 +7565,12 @@
               </a:p>
               <a:p>
                 <a:r>
-                  <a:rPr lang="en-US" altLang="zh-CN" sz="1000" dirty="0" err="1">
-                    <a:solidFill>
-                      <a:schemeClr val="tx1"/>
-                    </a:solidFill>
-                  </a:rPr>
-                  <a:t>lastLoginTime</a:t>
-                </a:r>
-                <a:r>
                   <a:rPr lang="en-US" altLang="zh-CN" sz="1000" dirty="0">
                     <a:solidFill>
                       <a:schemeClr val="tx1"/>
                     </a:solidFill>
                   </a:rPr>
-                  <a:t>:</a:t>
+                  <a:t>lastLoginTime:</a:t>
                 </a:r>
                 <a:r>
                   <a:rPr lang="zh-CN" altLang="en-US" sz="1000" dirty="0">
@@ -3908,35 +7581,22 @@
                   <a:t> </a:t>
                 </a:r>
                 <a:r>
-                  <a:rPr lang="en-US" altLang="zh-CN" sz="1000" dirty="0" err="1">
+                  <a:rPr lang="en-US" altLang="zh-CN" sz="1000" dirty="0">
                     <a:solidFill>
                       <a:schemeClr val="tx1"/>
                     </a:solidFill>
                   </a:rPr>
                   <a:t>DateTime</a:t>
                 </a:r>
-                <a:endParaRPr lang="en-US" altLang="zh-CN" sz="1000" dirty="0">
-                  <a:solidFill>
-                    <a:schemeClr val="tx1"/>
-                  </a:solidFill>
-                </a:endParaRPr>
               </a:p>
               <a:p>
                 <a:r>
-                  <a:rPr lang="en-US" altLang="zh-CN" sz="1000" dirty="0" err="1">
-                    <a:solidFill>
-                      <a:schemeClr val="tx1"/>
-                    </a:solidFill>
-                  </a:rPr>
-                  <a:t>riskLevel</a:t>
-                </a:r>
-                <a:r>
                   <a:rPr lang="en-US" altLang="zh-CN" sz="1000" dirty="0">
                     <a:solidFill>
                       <a:schemeClr val="tx1"/>
                     </a:solidFill>
                   </a:rPr>
-                  <a:t>:</a:t>
+                  <a:t>riskLevel:</a:t>
                 </a:r>
                 <a:r>
                   <a:rPr lang="zh-CN" altLang="en-US" sz="1000" dirty="0">
@@ -4250,7 +7910,7 @@
             <a:lstStyle/>
             <a:p>
               <a:r>
-                <a:rPr lang="en-US" altLang="zh-CN" sz="1100" dirty="0" err="1"/>
+                <a:rPr lang="en-US" altLang="zh-CN" sz="1100" dirty="0"/>
                 <a:t>signIn</a:t>
               </a:r>
               <a:endParaRPr lang="en-US" sz="1100" dirty="0"/>
@@ -4339,20 +7999,12 @@
               </a:p>
               <a:p>
                 <a:r>
-                  <a:rPr lang="en-US" altLang="zh-CN" sz="1000" dirty="0" err="1">
-                    <a:solidFill>
-                      <a:schemeClr val="tx1"/>
-                    </a:solidFill>
-                  </a:rPr>
-                  <a:t>loanAmount</a:t>
-                </a:r>
-                <a:r>
                   <a:rPr lang="en-US" altLang="zh-CN" sz="1000" dirty="0">
                     <a:solidFill>
                       <a:schemeClr val="tx1"/>
                     </a:solidFill>
                   </a:rPr>
-                  <a:t>:</a:t>
+                  <a:t>loanAmount:</a:t>
                 </a:r>
                 <a:r>
                   <a:rPr lang="zh-CN" altLang="en-US" sz="1000" dirty="0">
@@ -4449,20 +8101,12 @@
               </a:p>
               <a:p>
                 <a:r>
-                  <a:rPr lang="en-US" altLang="zh-CN" sz="1000" dirty="0" err="1">
-                    <a:solidFill>
-                      <a:schemeClr val="tx1"/>
-                    </a:solidFill>
-                  </a:rPr>
-                  <a:t>interestRate</a:t>
-                </a:r>
-                <a:r>
                   <a:rPr lang="en-US" altLang="zh-CN" sz="1000" dirty="0">
                     <a:solidFill>
                       <a:schemeClr val="tx1"/>
                     </a:solidFill>
                   </a:rPr>
-                  <a:t>:</a:t>
+                  <a:t>interestRate:</a:t>
                 </a:r>
                 <a:r>
                   <a:rPr lang="zh-CN" altLang="en-US" sz="1000" dirty="0">
@@ -5855,7 +9499,7 @@
                   <a:t> </a:t>
                 </a:r>
                 <a:r>
-                  <a:rPr lang="en-US" altLang="zh-CN" sz="1400" b="0" dirty="0" err="1">
+                  <a:rPr lang="en-US" altLang="zh-CN" sz="1400" b="0" dirty="0">
                     <a:solidFill>
                       <a:srgbClr val="000000"/>
                     </a:solidFill>
@@ -5899,7 +9543,7 @@
                   <a:t> </a:t>
                 </a:r>
                 <a:r>
-                  <a:rPr lang="en-US" altLang="zh-CN" sz="1400" b="0" dirty="0" err="1">
+                  <a:rPr lang="en-US" altLang="zh-CN" sz="1400" b="0" dirty="0">
                     <a:solidFill>
                       <a:srgbClr val="000000"/>
                     </a:solidFill>
@@ -6098,7 +9742,7 @@
                   <a:t> </a:t>
                 </a:r>
                 <a:r>
-                  <a:rPr lang="en-US" altLang="zh-CN" sz="1400" b="0" dirty="0" err="1">
+                  <a:rPr lang="en-US" altLang="zh-CN" sz="1400" b="0" dirty="0">
                     <a:solidFill>
                       <a:srgbClr val="000000"/>
                     </a:solidFill>
@@ -6142,7 +9786,7 @@
                   <a:t> </a:t>
                 </a:r>
                 <a:r>
-                  <a:rPr lang="en-US" altLang="zh-CN" sz="1400" b="0" dirty="0" err="1">
+                  <a:rPr lang="en-US" altLang="zh-CN" sz="1400" b="0" dirty="0">
                     <a:solidFill>
                       <a:srgbClr val="000000"/>
                     </a:solidFill>
@@ -6173,6 +9817,11 @@
         </p:grpSp>
       </p:grpSp>
     </p:spTree>
+    <p:extLst>
+      <p:ext uri="{BB962C8B-B14F-4D97-AF65-F5344CB8AC3E}">
+        <p14:creationId xmlns:p14="http://schemas.microsoft.com/office/powerpoint/2010/main" val="1069086312"/>
+      </p:ext>
+    </p:extLst>
   </p:cSld>
   <p:clrMapOvr>
     <a:masterClrMapping/>
@@ -6180,7 +9829,7 @@
 </p:sld>
 </file>
 
-<file path=ppt/slides/slide2.xml><?xml version="1.0" encoding="utf-8"?>
+<file path=ppt/slides/slide3.xml><?xml version="1.0" encoding="utf-8"?>
 <p:sld xmlns:a="http://schemas.openxmlformats.org/drawingml/2006/main" xmlns:r="http://schemas.openxmlformats.org/officeDocument/2006/relationships" xmlns:p="http://schemas.openxmlformats.org/presentationml/2006/main">
   <p:cSld>
     <p:spTree>
@@ -6822,7 +10471,7 @@
 </p:sld>
 </file>
 
-<file path=ppt/slides/slide3.xml><?xml version="1.0" encoding="utf-8"?>
+<file path=ppt/slides/slide4.xml><?xml version="1.0" encoding="utf-8"?>
 <p:sld xmlns:a="http://schemas.openxmlformats.org/drawingml/2006/main" xmlns:r="http://schemas.openxmlformats.org/officeDocument/2006/relationships" xmlns:p="http://schemas.openxmlformats.org/presentationml/2006/main">
   <p:cSld>
     <p:spTree>

</xml_diff>